<commit_message>
Add Secret Manager in CLI slide
</commit_message>
<xml_diff>
--- a/Protecting App Secrets.pptx
+++ b/Protecting App Secrets.pptx
@@ -6,7 +6,7 @@
     <p:sldMasterId id="2147483660" r:id="rId2"/>
   </p:sldMasterIdLst>
   <p:notesMasterIdLst>
-    <p:notesMasterId r:id="rId13"/>
+    <p:notesMasterId r:id="rId15"/>
   </p:notesMasterIdLst>
   <p:sldIdLst>
     <p:sldId id="256" r:id="rId3"/>
@@ -15,10 +15,12 @@
     <p:sldId id="328" r:id="rId6"/>
     <p:sldId id="330" r:id="rId7"/>
     <p:sldId id="323" r:id="rId8"/>
-    <p:sldId id="327" r:id="rId9"/>
-    <p:sldId id="324" r:id="rId10"/>
-    <p:sldId id="325" r:id="rId11"/>
-    <p:sldId id="326" r:id="rId12"/>
+    <p:sldId id="324" r:id="rId9"/>
+    <p:sldId id="332" r:id="rId10"/>
+    <p:sldId id="333" r:id="rId11"/>
+    <p:sldId id="325" r:id="rId12"/>
+    <p:sldId id="331" r:id="rId13"/>
+    <p:sldId id="326" r:id="rId14"/>
   </p:sldIdLst>
   <p:sldSz cx="12192000" cy="6858000"/>
   <p:notesSz cx="6858000" cy="9144000"/>
@@ -613,7 +615,10 @@
           <a:bodyPr/>
           <a:lstStyle/>
           <a:p>
-            <a:endParaRPr lang="en-US"/>
+            <a:r>
+              <a:rPr lang="en-US" dirty="0"/>
+              <a:t>- Key Vault takes precedence over Secret Manager at runtime, since it’s more secure</a:t>
+            </a:r>
           </a:p>
         </p:txBody>
       </p:sp>
@@ -703,6 +708,294 @@
     </p:spTree>
     <p:extLst>
       <p:ext uri="{BB962C8B-B14F-4D97-AF65-F5344CB8AC3E}">
+        <p14:creationId xmlns:p14="http://schemas.microsoft.com/office/powerpoint/2010/main" val="2216393245"/>
+      </p:ext>
+    </p:extLst>
+  </p:cSld>
+  <p:clrMapOvr>
+    <a:masterClrMapping/>
+  </p:clrMapOvr>
+</p:notes>
+</file>
+
+<file path=ppt/notesSlides/notesSlide11.xml><?xml version="1.0" encoding="utf-8"?>
+<p:notes xmlns:a="http://schemas.openxmlformats.org/drawingml/2006/main" xmlns:r="http://schemas.openxmlformats.org/officeDocument/2006/relationships" xmlns:p="http://schemas.openxmlformats.org/presentationml/2006/main">
+  <p:cSld>
+    <p:spTree>
+      <p:nvGrpSpPr>
+        <p:cNvPr id="1" name=""/>
+        <p:cNvGrpSpPr/>
+        <p:nvPr/>
+      </p:nvGrpSpPr>
+      <p:grpSpPr>
+        <a:xfrm>
+          <a:off x="0" y="0"/>
+          <a:ext cx="0" cy="0"/>
+          <a:chOff x="0" y="0"/>
+          <a:chExt cx="0" cy="0"/>
+        </a:xfrm>
+      </p:grpSpPr>
+      <p:sp>
+        <p:nvSpPr>
+          <p:cNvPr id="2" name="Slide Image Placeholder 1"/>
+          <p:cNvSpPr>
+            <a:spLocks noGrp="1" noRot="1" noChangeAspect="1"/>
+          </p:cNvSpPr>
+          <p:nvPr>
+            <p:ph type="sldImg"/>
+          </p:nvPr>
+        </p:nvSpPr>
+        <p:spPr/>
+      </p:sp>
+      <p:sp>
+        <p:nvSpPr>
+          <p:cNvPr id="3" name="Notes Placeholder 2"/>
+          <p:cNvSpPr>
+            <a:spLocks noGrp="1"/>
+          </p:cNvSpPr>
+          <p:nvPr>
+            <p:ph type="body" idx="1"/>
+          </p:nvPr>
+        </p:nvSpPr>
+        <p:spPr/>
+        <p:txBody>
+          <a:bodyPr/>
+          <a:lstStyle/>
+          <a:p>
+            <a:endParaRPr lang="en-US" dirty="0"/>
+          </a:p>
+        </p:txBody>
+      </p:sp>
+      <p:sp>
+        <p:nvSpPr>
+          <p:cNvPr id="4" name="Slide Number Placeholder 3"/>
+          <p:cNvSpPr>
+            <a:spLocks noGrp="1"/>
+          </p:cNvSpPr>
+          <p:nvPr>
+            <p:ph type="sldNum" sz="quarter" idx="10"/>
+          </p:nvPr>
+        </p:nvSpPr>
+        <p:spPr/>
+        <p:txBody>
+          <a:bodyPr/>
+          <a:lstStyle/>
+          <a:p>
+            <a:pPr marL="0" marR="0" lvl="0" indent="0" algn="r" defTabSz="457200" rtl="0" eaLnBrk="1" fontAlgn="auto" latinLnBrk="0" hangingPunct="1">
+              <a:lnSpc>
+                <a:spcPct val="100000"/>
+              </a:lnSpc>
+              <a:spcBef>
+                <a:spcPts val="0"/>
+              </a:spcBef>
+              <a:spcAft>
+                <a:spcPts val="0"/>
+              </a:spcAft>
+              <a:buClrTx/>
+              <a:buSzTx/>
+              <a:buFontTx/>
+              <a:buNone/>
+              <a:tabLst/>
+              <a:defRPr/>
+            </a:pPr>
+            <a:fld id="{16A87904-88DE-4022-A424-ACD2E6FC1751}" type="slidenum">
+              <a:rPr kumimoji="0" lang="en-US" sz="1200" b="0" i="0" u="none" strike="noStrike" kern="1200" cap="none" spc="0" normalizeH="0" baseline="0" noProof="0" smtClean="0">
+                <a:ln>
+                  <a:noFill/>
+                </a:ln>
+                <a:solidFill>
+                  <a:prstClr val="black"/>
+                </a:solidFill>
+                <a:effectLst/>
+                <a:uLnTx/>
+                <a:uFillTx/>
+                <a:latin typeface="Calibri" panose="020F0502020204030204"/>
+                <a:ea typeface="+mn-ea"/>
+                <a:cs typeface="+mn-cs"/>
+              </a:rPr>
+              <a:pPr marL="0" marR="0" lvl="0" indent="0" algn="r" defTabSz="457200" rtl="0" eaLnBrk="1" fontAlgn="auto" latinLnBrk="0" hangingPunct="1">
+                <a:lnSpc>
+                  <a:spcPct val="100000"/>
+                </a:lnSpc>
+                <a:spcBef>
+                  <a:spcPts val="0"/>
+                </a:spcBef>
+                <a:spcAft>
+                  <a:spcPts val="0"/>
+                </a:spcAft>
+                <a:buClrTx/>
+                <a:buSzTx/>
+                <a:buFontTx/>
+                <a:buNone/>
+                <a:tabLst/>
+                <a:defRPr/>
+              </a:pPr>
+              <a:t>11</a:t>
+            </a:fld>
+            <a:endParaRPr kumimoji="0" lang="en-US" sz="1200" b="0" i="0" u="none" strike="noStrike" kern="1200" cap="none" spc="0" normalizeH="0" baseline="0" noProof="0">
+              <a:ln>
+                <a:noFill/>
+              </a:ln>
+              <a:solidFill>
+                <a:prstClr val="black"/>
+              </a:solidFill>
+              <a:effectLst/>
+              <a:uLnTx/>
+              <a:uFillTx/>
+              <a:latin typeface="Calibri" panose="020F0502020204030204"/>
+              <a:ea typeface="+mn-ea"/>
+              <a:cs typeface="+mn-cs"/>
+            </a:endParaRPr>
+          </a:p>
+        </p:txBody>
+      </p:sp>
+    </p:spTree>
+    <p:extLst>
+      <p:ext uri="{BB962C8B-B14F-4D97-AF65-F5344CB8AC3E}">
+        <p14:creationId xmlns:p14="http://schemas.microsoft.com/office/powerpoint/2010/main" val="2232734480"/>
+      </p:ext>
+    </p:extLst>
+  </p:cSld>
+  <p:clrMapOvr>
+    <a:masterClrMapping/>
+  </p:clrMapOvr>
+</p:notes>
+</file>
+
+<file path=ppt/notesSlides/notesSlide12.xml><?xml version="1.0" encoding="utf-8"?>
+<p:notes xmlns:a="http://schemas.openxmlformats.org/drawingml/2006/main" xmlns:r="http://schemas.openxmlformats.org/officeDocument/2006/relationships" xmlns:p="http://schemas.openxmlformats.org/presentationml/2006/main">
+  <p:cSld>
+    <p:spTree>
+      <p:nvGrpSpPr>
+        <p:cNvPr id="1" name=""/>
+        <p:cNvGrpSpPr/>
+        <p:nvPr/>
+      </p:nvGrpSpPr>
+      <p:grpSpPr>
+        <a:xfrm>
+          <a:off x="0" y="0"/>
+          <a:ext cx="0" cy="0"/>
+          <a:chOff x="0" y="0"/>
+          <a:chExt cx="0" cy="0"/>
+        </a:xfrm>
+      </p:grpSpPr>
+      <p:sp>
+        <p:nvSpPr>
+          <p:cNvPr id="2" name="Slide Image Placeholder 1"/>
+          <p:cNvSpPr>
+            <a:spLocks noGrp="1" noRot="1" noChangeAspect="1"/>
+          </p:cNvSpPr>
+          <p:nvPr>
+            <p:ph type="sldImg"/>
+          </p:nvPr>
+        </p:nvSpPr>
+        <p:spPr/>
+      </p:sp>
+      <p:sp>
+        <p:nvSpPr>
+          <p:cNvPr id="3" name="Notes Placeholder 2"/>
+          <p:cNvSpPr>
+            <a:spLocks noGrp="1"/>
+          </p:cNvSpPr>
+          <p:nvPr>
+            <p:ph type="body" idx="1"/>
+          </p:nvPr>
+        </p:nvSpPr>
+        <p:spPr/>
+        <p:txBody>
+          <a:bodyPr/>
+          <a:lstStyle/>
+          <a:p>
+            <a:endParaRPr lang="en-US"/>
+          </a:p>
+        </p:txBody>
+      </p:sp>
+      <p:sp>
+        <p:nvSpPr>
+          <p:cNvPr id="4" name="Slide Number Placeholder 3"/>
+          <p:cNvSpPr>
+            <a:spLocks noGrp="1"/>
+          </p:cNvSpPr>
+          <p:nvPr>
+            <p:ph type="sldNum" sz="quarter" idx="10"/>
+          </p:nvPr>
+        </p:nvSpPr>
+        <p:spPr/>
+        <p:txBody>
+          <a:bodyPr/>
+          <a:lstStyle/>
+          <a:p>
+            <a:pPr marL="0" marR="0" lvl="0" indent="0" algn="r" defTabSz="457200" rtl="0" eaLnBrk="1" fontAlgn="auto" latinLnBrk="0" hangingPunct="1">
+              <a:lnSpc>
+                <a:spcPct val="100000"/>
+              </a:lnSpc>
+              <a:spcBef>
+                <a:spcPts val="0"/>
+              </a:spcBef>
+              <a:spcAft>
+                <a:spcPts val="0"/>
+              </a:spcAft>
+              <a:buClrTx/>
+              <a:buSzTx/>
+              <a:buFontTx/>
+              <a:buNone/>
+              <a:tabLst/>
+              <a:defRPr/>
+            </a:pPr>
+            <a:fld id="{16A87904-88DE-4022-A424-ACD2E6FC1751}" type="slidenum">
+              <a:rPr kumimoji="0" lang="en-US" sz="1200" b="0" i="0" u="none" strike="noStrike" kern="1200" cap="none" spc="0" normalizeH="0" baseline="0" noProof="0" smtClean="0">
+                <a:ln>
+                  <a:noFill/>
+                </a:ln>
+                <a:solidFill>
+                  <a:prstClr val="black"/>
+                </a:solidFill>
+                <a:effectLst/>
+                <a:uLnTx/>
+                <a:uFillTx/>
+                <a:latin typeface="Calibri" panose="020F0502020204030204"/>
+                <a:ea typeface="+mn-ea"/>
+                <a:cs typeface="+mn-cs"/>
+              </a:rPr>
+              <a:pPr marL="0" marR="0" lvl="0" indent="0" algn="r" defTabSz="457200" rtl="0" eaLnBrk="1" fontAlgn="auto" latinLnBrk="0" hangingPunct="1">
+                <a:lnSpc>
+                  <a:spcPct val="100000"/>
+                </a:lnSpc>
+                <a:spcBef>
+                  <a:spcPts val="0"/>
+                </a:spcBef>
+                <a:spcAft>
+                  <a:spcPts val="0"/>
+                </a:spcAft>
+                <a:buClrTx/>
+                <a:buSzTx/>
+                <a:buFontTx/>
+                <a:buNone/>
+                <a:tabLst/>
+                <a:defRPr/>
+              </a:pPr>
+              <a:t>12</a:t>
+            </a:fld>
+            <a:endParaRPr kumimoji="0" lang="en-US" sz="1200" b="0" i="0" u="none" strike="noStrike" kern="1200" cap="none" spc="0" normalizeH="0" baseline="0" noProof="0">
+              <a:ln>
+                <a:noFill/>
+              </a:ln>
+              <a:solidFill>
+                <a:prstClr val="black"/>
+              </a:solidFill>
+              <a:effectLst/>
+              <a:uLnTx/>
+              <a:uFillTx/>
+              <a:latin typeface="Calibri" panose="020F0502020204030204"/>
+              <a:ea typeface="+mn-ea"/>
+              <a:cs typeface="+mn-cs"/>
+            </a:endParaRPr>
+          </a:p>
+        </p:txBody>
+      </p:sp>
+    </p:spTree>
+    <p:extLst>
+      <p:ext uri="{BB962C8B-B14F-4D97-AF65-F5344CB8AC3E}">
         <p14:creationId xmlns:p14="http://schemas.microsoft.com/office/powerpoint/2010/main" val="2271797707"/>
       </p:ext>
     </p:extLst>
@@ -1480,7 +1773,30 @@
           <a:bodyPr/>
           <a:lstStyle/>
           <a:p>
-            <a:endParaRPr lang="en-US" dirty="0"/>
+            <a:r>
+              <a:rPr lang="en-US" u="sng" dirty="0"/>
+              <a:t>VS SUPPORT</a:t>
+            </a:r>
+          </a:p>
+          <a:p>
+            <a:r>
+              <a:rPr lang="en-US" dirty="0"/>
+              <a:t>- .NET Core support ONLY in 15.7 (</a:t>
+            </a:r>
+            <a:r>
+              <a:rPr lang="en-US" dirty="0" err="1"/>
+              <a:t>secrets.json</a:t>
+            </a:r>
+            <a:r>
+              <a:rPr lang="en-US" dirty="0"/>
+              <a:t>)</a:t>
+            </a:r>
+          </a:p>
+          <a:p>
+            <a:r>
+              <a:rPr lang="en-US" dirty="0"/>
+              <a:t>- .NET Framework support in 15.8 (secrets.xml)</a:t>
+            </a:r>
           </a:p>
         </p:txBody>
       </p:sp>
@@ -1570,7 +1886,7 @@
     </p:spTree>
     <p:extLst>
       <p:ext uri="{BB962C8B-B14F-4D97-AF65-F5344CB8AC3E}">
-        <p14:creationId xmlns:p14="http://schemas.microsoft.com/office/powerpoint/2010/main" val="2260955387"/>
+        <p14:creationId xmlns:p14="http://schemas.microsoft.com/office/powerpoint/2010/main" val="2727991651"/>
       </p:ext>
     </p:extLst>
   </p:cSld>
@@ -1714,7 +2030,7 @@
     </p:spTree>
     <p:extLst>
       <p:ext uri="{BB962C8B-B14F-4D97-AF65-F5344CB8AC3E}">
-        <p14:creationId xmlns:p14="http://schemas.microsoft.com/office/powerpoint/2010/main" val="2727991651"/>
+        <p14:creationId xmlns:p14="http://schemas.microsoft.com/office/powerpoint/2010/main" val="2365127105"/>
       </p:ext>
     </p:extLst>
   </p:cSld>
@@ -1768,10 +2084,7 @@
           <a:bodyPr/>
           <a:lstStyle/>
           <a:p>
-            <a:r>
-              <a:rPr lang="en-US" dirty="0"/>
-              <a:t>- Key Vault takes precedence over Secret Manager at runtime, since it’s more secure</a:t>
-            </a:r>
+            <a:endParaRPr lang="en-US"/>
           </a:p>
         </p:txBody>
       </p:sp>
@@ -1861,7 +2174,7 @@
     </p:spTree>
     <p:extLst>
       <p:ext uri="{BB962C8B-B14F-4D97-AF65-F5344CB8AC3E}">
-        <p14:creationId xmlns:p14="http://schemas.microsoft.com/office/powerpoint/2010/main" val="2216393245"/>
+        <p14:creationId xmlns:p14="http://schemas.microsoft.com/office/powerpoint/2010/main" val="2133419073"/>
       </p:ext>
     </p:extLst>
   </p:cSld>
@@ -8592,6 +8905,1253 @@
 </file>
 
 <file path=ppt/slides/slide10.xml><?xml version="1.0" encoding="utf-8"?>
+<p:sld xmlns:a="http://schemas.openxmlformats.org/drawingml/2006/main" xmlns:r="http://schemas.openxmlformats.org/officeDocument/2006/relationships" xmlns:p="http://schemas.openxmlformats.org/presentationml/2006/main">
+  <p:cSld>
+    <p:bg>
+      <p:bgPr>
+        <a:solidFill>
+          <a:srgbClr val="505050"/>
+        </a:solidFill>
+        <a:effectLst/>
+      </p:bgPr>
+    </p:bg>
+    <p:spTree>
+      <p:nvGrpSpPr>
+        <p:cNvPr id="1" name=""/>
+        <p:cNvGrpSpPr/>
+        <p:nvPr/>
+      </p:nvGrpSpPr>
+      <p:grpSpPr>
+        <a:xfrm>
+          <a:off x="0" y="0"/>
+          <a:ext cx="0" cy="0"/>
+          <a:chOff x="0" y="0"/>
+          <a:chExt cx="0" cy="0"/>
+        </a:xfrm>
+      </p:grpSpPr>
+      <p:sp>
+        <p:nvSpPr>
+          <p:cNvPr id="2" name="Title 1"/>
+          <p:cNvSpPr>
+            <a:spLocks noGrp="1"/>
+          </p:cNvSpPr>
+          <p:nvPr>
+            <p:ph type="title"/>
+          </p:nvPr>
+        </p:nvSpPr>
+        <p:spPr>
+          <a:xfrm>
+            <a:off x="838200" y="365125"/>
+            <a:ext cx="10515600" cy="1325563"/>
+          </a:xfrm>
+        </p:spPr>
+        <p:txBody>
+          <a:bodyPr/>
+          <a:lstStyle/>
+          <a:p>
+            <a:r>
+              <a:rPr lang="en-US"/>
+              <a:t>Azure Key Vault</a:t>
+            </a:r>
+            <a:endParaRPr lang="en-US" dirty="0"/>
+          </a:p>
+        </p:txBody>
+      </p:sp>
+      <p:sp>
+        <p:nvSpPr>
+          <p:cNvPr id="3" name="Content Placeholder 2"/>
+          <p:cNvSpPr>
+            <a:spLocks noGrp="1"/>
+          </p:cNvSpPr>
+          <p:nvPr>
+            <p:ph idx="1"/>
+          </p:nvPr>
+        </p:nvSpPr>
+        <p:spPr>
+          <a:xfrm>
+            <a:off x="838200" y="1825625"/>
+            <a:ext cx="10515600" cy="4351338"/>
+          </a:xfrm>
+        </p:spPr>
+        <p:txBody>
+          <a:bodyPr/>
+          <a:lstStyle/>
+          <a:p>
+            <a:r>
+              <a:rPr lang="en-US" dirty="0"/>
+              <a:t>VS 15.7 introduces Connected Services node Key Vault creation</a:t>
+            </a:r>
+          </a:p>
+          <a:p>
+            <a:pPr lvl="1"/>
+            <a:r>
+              <a:rPr lang="en-US" dirty="0"/>
+              <a:t>Solution Explorer &gt; double-click Connected Services &gt; Secure Secrets with Azure Key Vault</a:t>
+            </a:r>
+          </a:p>
+        </p:txBody>
+      </p:sp>
+    </p:spTree>
+    <p:extLst>
+      <p:ext uri="{BB962C8B-B14F-4D97-AF65-F5344CB8AC3E}">
+        <p14:creationId xmlns:p14="http://schemas.microsoft.com/office/powerpoint/2010/main" val="1332892662"/>
+      </p:ext>
+    </p:extLst>
+  </p:cSld>
+  <p:clrMapOvr>
+    <a:masterClrMapping/>
+  </p:clrMapOvr>
+  <p:timing>
+    <p:tnLst>
+      <p:par>
+        <p:cTn id="1" dur="indefinite" restart="never" nodeType="tmRoot">
+          <p:childTnLst>
+            <p:seq concurrent="1" nextAc="seek">
+              <p:cTn id="2" dur="indefinite" nodeType="mainSeq">
+                <p:childTnLst>
+                  <p:par>
+                    <p:cTn id="3" fill="hold">
+                      <p:stCondLst>
+                        <p:cond delay="indefinite"/>
+                      </p:stCondLst>
+                      <p:childTnLst>
+                        <p:par>
+                          <p:cTn id="4" fill="hold">
+                            <p:stCondLst>
+                              <p:cond delay="0"/>
+                            </p:stCondLst>
+                            <p:childTnLst>
+                              <p:par>
+                                <p:cTn id="5" presetID="10" presetClass="entr" presetSubtype="0" fill="hold" nodeType="clickEffect">
+                                  <p:stCondLst>
+                                    <p:cond delay="0"/>
+                                  </p:stCondLst>
+                                  <p:childTnLst>
+                                    <p:set>
+                                      <p:cBhvr>
+                                        <p:cTn id="6" dur="1" fill="hold">
+                                          <p:stCondLst>
+                                            <p:cond delay="0"/>
+                                          </p:stCondLst>
+                                        </p:cTn>
+                                        <p:tgtEl>
+                                          <p:spTgt spid="3">
+                                            <p:txEl>
+                                              <p:pRg st="0" end="0"/>
+                                            </p:txEl>
+                                          </p:spTgt>
+                                        </p:tgtEl>
+                                        <p:attrNameLst>
+                                          <p:attrName>style.visibility</p:attrName>
+                                        </p:attrNameLst>
+                                      </p:cBhvr>
+                                      <p:to>
+                                        <p:strVal val="visible"/>
+                                      </p:to>
+                                    </p:set>
+                                    <p:animEffect transition="in" filter="fade">
+                                      <p:cBhvr>
+                                        <p:cTn id="7" dur="500"/>
+                                        <p:tgtEl>
+                                          <p:spTgt spid="3">
+                                            <p:txEl>
+                                              <p:pRg st="0" end="0"/>
+                                            </p:txEl>
+                                          </p:spTgt>
+                                        </p:tgtEl>
+                                      </p:cBhvr>
+                                    </p:animEffect>
+                                  </p:childTnLst>
+                                </p:cTn>
+                              </p:par>
+                            </p:childTnLst>
+                          </p:cTn>
+                        </p:par>
+                      </p:childTnLst>
+                    </p:cTn>
+                  </p:par>
+                  <p:par>
+                    <p:cTn id="8" fill="hold">
+                      <p:stCondLst>
+                        <p:cond delay="indefinite"/>
+                      </p:stCondLst>
+                      <p:childTnLst>
+                        <p:par>
+                          <p:cTn id="9" fill="hold">
+                            <p:stCondLst>
+                              <p:cond delay="0"/>
+                            </p:stCondLst>
+                            <p:childTnLst>
+                              <p:par>
+                                <p:cTn id="10" presetID="10" presetClass="entr" presetSubtype="0" fill="hold" nodeType="clickEffect">
+                                  <p:stCondLst>
+                                    <p:cond delay="0"/>
+                                  </p:stCondLst>
+                                  <p:childTnLst>
+                                    <p:set>
+                                      <p:cBhvr>
+                                        <p:cTn id="11" dur="1" fill="hold">
+                                          <p:stCondLst>
+                                            <p:cond delay="0"/>
+                                          </p:stCondLst>
+                                        </p:cTn>
+                                        <p:tgtEl>
+                                          <p:spTgt spid="3">
+                                            <p:txEl>
+                                              <p:pRg st="1" end="1"/>
+                                            </p:txEl>
+                                          </p:spTgt>
+                                        </p:tgtEl>
+                                        <p:attrNameLst>
+                                          <p:attrName>style.visibility</p:attrName>
+                                        </p:attrNameLst>
+                                      </p:cBhvr>
+                                      <p:to>
+                                        <p:strVal val="visible"/>
+                                      </p:to>
+                                    </p:set>
+                                    <p:animEffect transition="in" filter="fade">
+                                      <p:cBhvr>
+                                        <p:cTn id="12" dur="500"/>
+                                        <p:tgtEl>
+                                          <p:spTgt spid="3">
+                                            <p:txEl>
+                                              <p:pRg st="1" end="1"/>
+                                            </p:txEl>
+                                          </p:spTgt>
+                                        </p:tgtEl>
+                                      </p:cBhvr>
+                                    </p:animEffect>
+                                  </p:childTnLst>
+                                </p:cTn>
+                              </p:par>
+                            </p:childTnLst>
+                          </p:cTn>
+                        </p:par>
+                      </p:childTnLst>
+                    </p:cTn>
+                  </p:par>
+                </p:childTnLst>
+              </p:cTn>
+              <p:prevCondLst>
+                <p:cond evt="onPrev" delay="0">
+                  <p:tgtEl>
+                    <p:sldTgt/>
+                  </p:tgtEl>
+                </p:cond>
+              </p:prevCondLst>
+              <p:nextCondLst>
+                <p:cond evt="onNext" delay="0">
+                  <p:tgtEl>
+                    <p:sldTgt/>
+                  </p:tgtEl>
+                </p:cond>
+              </p:nextCondLst>
+            </p:seq>
+          </p:childTnLst>
+        </p:cTn>
+      </p:par>
+    </p:tnLst>
+  </p:timing>
+</p:sld>
+</file>
+
+<file path=ppt/slides/slide11.xml><?xml version="1.0" encoding="utf-8"?>
+<p:sld xmlns:a="http://schemas.openxmlformats.org/drawingml/2006/main" xmlns:r="http://schemas.openxmlformats.org/officeDocument/2006/relationships" xmlns:p="http://schemas.openxmlformats.org/presentationml/2006/main">
+  <p:cSld>
+    <p:bg>
+      <p:bgPr>
+        <a:solidFill>
+          <a:srgbClr val="505050"/>
+        </a:solidFill>
+        <a:effectLst/>
+      </p:bgPr>
+    </p:bg>
+    <p:spTree>
+      <p:nvGrpSpPr>
+        <p:cNvPr id="1" name=""/>
+        <p:cNvGrpSpPr/>
+        <p:nvPr/>
+      </p:nvGrpSpPr>
+      <p:grpSpPr>
+        <a:xfrm>
+          <a:off x="0" y="0"/>
+          <a:ext cx="0" cy="0"/>
+          <a:chOff x="0" y="0"/>
+          <a:chExt cx="0" cy="0"/>
+        </a:xfrm>
+      </p:grpSpPr>
+      <p:sp>
+        <p:nvSpPr>
+          <p:cNvPr id="9" name="Content Placeholder 8">
+            <a:extLst>
+              <a:ext uri="{FF2B5EF4-FFF2-40B4-BE49-F238E27FC236}">
+                <a16:creationId xmlns:a16="http://schemas.microsoft.com/office/drawing/2014/main" id="{1D1D5618-6BDF-4FDD-A68D-6252FC8A99C0}"/>
+              </a:ext>
+            </a:extLst>
+          </p:cNvPr>
+          <p:cNvSpPr>
+            <a:spLocks noGrp="1"/>
+          </p:cNvSpPr>
+          <p:nvPr>
+            <p:ph idx="1"/>
+          </p:nvPr>
+        </p:nvSpPr>
+        <p:spPr/>
+        <p:txBody>
+          <a:bodyPr/>
+          <a:lstStyle/>
+          <a:p>
+            <a:pPr marL="0" indent="0">
+              <a:buNone/>
+            </a:pPr>
+            <a:endParaRPr lang="en-US" dirty="0"/>
+          </a:p>
+        </p:txBody>
+      </p:sp>
+      <p:sp>
+        <p:nvSpPr>
+          <p:cNvPr id="2" name="Title 1"/>
+          <p:cNvSpPr>
+            <a:spLocks noGrp="1"/>
+          </p:cNvSpPr>
+          <p:nvPr>
+            <p:ph type="title"/>
+          </p:nvPr>
+        </p:nvSpPr>
+        <p:spPr/>
+        <p:txBody>
+          <a:bodyPr/>
+          <a:lstStyle/>
+          <a:p>
+            <a:r>
+              <a:rPr lang="en-US" dirty="0"/>
+              <a:t>Comparison of solutions</a:t>
+            </a:r>
+          </a:p>
+        </p:txBody>
+      </p:sp>
+      <p:graphicFrame>
+        <p:nvGraphicFramePr>
+          <p:cNvPr id="5" name="Table 4">
+            <a:extLst>
+              <a:ext uri="{FF2B5EF4-FFF2-40B4-BE49-F238E27FC236}">
+                <a16:creationId xmlns:a16="http://schemas.microsoft.com/office/drawing/2014/main" id="{B11B5F89-CEA0-4F9B-8FF2-082E53048DC8}"/>
+              </a:ext>
+            </a:extLst>
+          </p:cNvPr>
+          <p:cNvGraphicFramePr>
+            <a:graphicFrameLocks noGrp="1"/>
+          </p:cNvGraphicFramePr>
+          <p:nvPr>
+            <p:extLst>
+              <p:ext uri="{D42A27DB-BD31-4B8C-83A1-F6EECF244321}">
+                <p14:modId xmlns:p14="http://schemas.microsoft.com/office/powerpoint/2010/main" val="1432491185"/>
+              </p:ext>
+            </p:extLst>
+          </p:nvPr>
+        </p:nvGraphicFramePr>
+        <p:xfrm>
+          <a:off x="976923" y="2017151"/>
+          <a:ext cx="8575201" cy="3017520"/>
+        </p:xfrm>
+        <a:graphic>
+          <a:graphicData uri="http://schemas.openxmlformats.org/drawingml/2006/table">
+            <a:tbl>
+              <a:tblPr firstRow="1" bandRow="1">
+                <a:tableStyleId>{327F97BB-C833-4FB7-BDE5-3F7075034690}</a:tableStyleId>
+              </a:tblPr>
+              <a:tblGrid>
+                <a:gridCol w="3374195">
+                  <a:extLst>
+                    <a:ext uri="{9D8B030D-6E8A-4147-A177-3AD203B41FA5}">
+                      <a16:colId xmlns:a16="http://schemas.microsoft.com/office/drawing/2014/main" val="3393553294"/>
+                    </a:ext>
+                  </a:extLst>
+                </a:gridCol>
+                <a:gridCol w="2623693">
+                  <a:extLst>
+                    <a:ext uri="{9D8B030D-6E8A-4147-A177-3AD203B41FA5}">
+                      <a16:colId xmlns:a16="http://schemas.microsoft.com/office/drawing/2014/main" val="3103465248"/>
+                    </a:ext>
+                  </a:extLst>
+                </a:gridCol>
+                <a:gridCol w="2577313">
+                  <a:extLst>
+                    <a:ext uri="{9D8B030D-6E8A-4147-A177-3AD203B41FA5}">
+                      <a16:colId xmlns:a16="http://schemas.microsoft.com/office/drawing/2014/main" val="1329647999"/>
+                    </a:ext>
+                  </a:extLst>
+                </a:gridCol>
+              </a:tblGrid>
+              <a:tr h="0">
+                <a:tc>
+                  <a:txBody>
+                    <a:bodyPr/>
+                    <a:lstStyle/>
+                    <a:p>
+                      <a:endParaRPr lang="en-US" sz="2800" b="1" dirty="0"/>
+                    </a:p>
+                  </a:txBody>
+                  <a:tcPr>
+                    <a:lnL w="12700" cap="flat" cmpd="sng" algn="ctr">
+                      <a:solidFill>
+                        <a:schemeClr val="tx1"/>
+                      </a:solidFill>
+                      <a:prstDash val="solid"/>
+                      <a:round/>
+                      <a:headEnd type="none" w="med" len="med"/>
+                      <a:tailEnd type="none" w="med" len="med"/>
+                    </a:lnL>
+                    <a:lnR w="12700" cap="flat" cmpd="sng" algn="ctr">
+                      <a:solidFill>
+                        <a:schemeClr val="tx1"/>
+                      </a:solidFill>
+                      <a:prstDash val="solid"/>
+                      <a:round/>
+                      <a:headEnd type="none" w="med" len="med"/>
+                      <a:tailEnd type="none" w="med" len="med"/>
+                    </a:lnR>
+                    <a:lnT w="12700" cap="flat" cmpd="sng" algn="ctr">
+                      <a:solidFill>
+                        <a:schemeClr val="tx1"/>
+                      </a:solidFill>
+                      <a:prstDash val="solid"/>
+                      <a:round/>
+                      <a:headEnd type="none" w="med" len="med"/>
+                      <a:tailEnd type="none" w="med" len="med"/>
+                    </a:lnT>
+                    <a:lnB w="12700" cap="flat" cmpd="sng" algn="ctr">
+                      <a:solidFill>
+                        <a:schemeClr val="tx1"/>
+                      </a:solidFill>
+                      <a:prstDash val="solid"/>
+                      <a:round/>
+                      <a:headEnd type="none" w="med" len="med"/>
+                      <a:tailEnd type="none" w="med" len="med"/>
+                    </a:lnB>
+                  </a:tcPr>
+                </a:tc>
+                <a:tc>
+                  <a:txBody>
+                    <a:bodyPr/>
+                    <a:lstStyle/>
+                    <a:p>
+                      <a:r>
+                        <a:rPr lang="en-US" sz="2800" dirty="0"/>
+                        <a:t>Secret Manager</a:t>
+                      </a:r>
+                    </a:p>
+                  </a:txBody>
+                  <a:tcPr>
+                    <a:lnL w="12700" cap="flat" cmpd="sng" algn="ctr">
+                      <a:solidFill>
+                        <a:schemeClr val="tx1"/>
+                      </a:solidFill>
+                      <a:prstDash val="solid"/>
+                      <a:round/>
+                      <a:headEnd type="none" w="med" len="med"/>
+                      <a:tailEnd type="none" w="med" len="med"/>
+                    </a:lnL>
+                    <a:lnR w="12700" cap="flat" cmpd="sng" algn="ctr">
+                      <a:solidFill>
+                        <a:schemeClr val="tx1"/>
+                      </a:solidFill>
+                      <a:prstDash val="solid"/>
+                      <a:round/>
+                      <a:headEnd type="none" w="med" len="med"/>
+                      <a:tailEnd type="none" w="med" len="med"/>
+                    </a:lnR>
+                    <a:lnT w="12700" cap="flat" cmpd="sng" algn="ctr">
+                      <a:solidFill>
+                        <a:schemeClr val="tx1"/>
+                      </a:solidFill>
+                      <a:prstDash val="solid"/>
+                      <a:round/>
+                      <a:headEnd type="none" w="med" len="med"/>
+                      <a:tailEnd type="none" w="med" len="med"/>
+                    </a:lnT>
+                    <a:lnB w="12700" cap="flat" cmpd="sng" algn="ctr">
+                      <a:solidFill>
+                        <a:schemeClr val="tx1"/>
+                      </a:solidFill>
+                      <a:prstDash val="solid"/>
+                      <a:round/>
+                      <a:headEnd type="none" w="med" len="med"/>
+                      <a:tailEnd type="none" w="med" len="med"/>
+                    </a:lnB>
+                  </a:tcPr>
+                </a:tc>
+                <a:tc>
+                  <a:txBody>
+                    <a:bodyPr/>
+                    <a:lstStyle/>
+                    <a:p>
+                      <a:r>
+                        <a:rPr lang="en-US" sz="2800" dirty="0"/>
+                        <a:t>Azure Key Vault</a:t>
+                      </a:r>
+                    </a:p>
+                  </a:txBody>
+                  <a:tcPr>
+                    <a:lnL w="12700" cap="flat" cmpd="sng" algn="ctr">
+                      <a:solidFill>
+                        <a:schemeClr val="tx1"/>
+                      </a:solidFill>
+                      <a:prstDash val="solid"/>
+                      <a:round/>
+                      <a:headEnd type="none" w="med" len="med"/>
+                      <a:tailEnd type="none" w="med" len="med"/>
+                    </a:lnL>
+                    <a:lnR w="12700" cap="flat" cmpd="sng" algn="ctr">
+                      <a:solidFill>
+                        <a:schemeClr val="tx1"/>
+                      </a:solidFill>
+                      <a:prstDash val="solid"/>
+                      <a:round/>
+                      <a:headEnd type="none" w="med" len="med"/>
+                      <a:tailEnd type="none" w="med" len="med"/>
+                    </a:lnR>
+                    <a:lnT w="12700" cap="flat" cmpd="sng" algn="ctr">
+                      <a:solidFill>
+                        <a:schemeClr val="tx1"/>
+                      </a:solidFill>
+                      <a:prstDash val="solid"/>
+                      <a:round/>
+                      <a:headEnd type="none" w="med" len="med"/>
+                      <a:tailEnd type="none" w="med" len="med"/>
+                    </a:lnT>
+                    <a:lnB w="12700" cap="flat" cmpd="sng" algn="ctr">
+                      <a:solidFill>
+                        <a:schemeClr val="tx1"/>
+                      </a:solidFill>
+                      <a:prstDash val="solid"/>
+                      <a:round/>
+                      <a:headEnd type="none" w="med" len="med"/>
+                      <a:tailEnd type="none" w="med" len="med"/>
+                    </a:lnB>
+                  </a:tcPr>
+                </a:tc>
+                <a:extLst>
+                  <a:ext uri="{0D108BD9-81ED-4DB2-BD59-A6C34878D82A}">
+                    <a16:rowId xmlns:a16="http://schemas.microsoft.com/office/drawing/2014/main" val="1056126699"/>
+                  </a:ext>
+                </a:extLst>
+              </a:tr>
+              <a:tr h="370840">
+                <a:tc>
+                  <a:txBody>
+                    <a:bodyPr/>
+                    <a:lstStyle/>
+                    <a:p>
+                      <a:pPr marL="0" marR="0" lvl="0" indent="0" algn="l" defTabSz="914400" rtl="0" eaLnBrk="1" fontAlgn="auto" latinLnBrk="0" hangingPunct="1">
+                        <a:lnSpc>
+                          <a:spcPct val="100000"/>
+                        </a:lnSpc>
+                        <a:spcBef>
+                          <a:spcPts val="0"/>
+                        </a:spcBef>
+                        <a:spcAft>
+                          <a:spcPts val="0"/>
+                        </a:spcAft>
+                        <a:buClrTx/>
+                        <a:buSzTx/>
+                        <a:buFontTx/>
+                        <a:buNone/>
+                        <a:tabLst/>
+                        <a:defRPr/>
+                      </a:pPr>
+                      <a:r>
+                        <a:rPr lang="en-US" sz="2800" b="1" dirty="0"/>
+                        <a:t>Environments</a:t>
+                      </a:r>
+                    </a:p>
+                  </a:txBody>
+                  <a:tcPr>
+                    <a:lnL w="12700" cap="flat" cmpd="sng" algn="ctr">
+                      <a:solidFill>
+                        <a:schemeClr val="tx1"/>
+                      </a:solidFill>
+                      <a:prstDash val="solid"/>
+                      <a:round/>
+                      <a:headEnd type="none" w="med" len="med"/>
+                      <a:tailEnd type="none" w="med" len="med"/>
+                    </a:lnL>
+                    <a:lnR w="12700" cap="flat" cmpd="sng" algn="ctr">
+                      <a:solidFill>
+                        <a:schemeClr val="tx1"/>
+                      </a:solidFill>
+                      <a:prstDash val="solid"/>
+                      <a:round/>
+                      <a:headEnd type="none" w="med" len="med"/>
+                      <a:tailEnd type="none" w="med" len="med"/>
+                    </a:lnR>
+                    <a:lnT w="12700" cap="flat" cmpd="sng" algn="ctr">
+                      <a:solidFill>
+                        <a:schemeClr val="tx1"/>
+                      </a:solidFill>
+                      <a:prstDash val="solid"/>
+                      <a:round/>
+                      <a:headEnd type="none" w="med" len="med"/>
+                      <a:tailEnd type="none" w="med" len="med"/>
+                    </a:lnT>
+                    <a:lnB w="12700" cap="flat" cmpd="sng" algn="ctr">
+                      <a:solidFill>
+                        <a:schemeClr val="tx1"/>
+                      </a:solidFill>
+                      <a:prstDash val="solid"/>
+                      <a:round/>
+                      <a:headEnd type="none" w="med" len="med"/>
+                      <a:tailEnd type="none" w="med" len="med"/>
+                    </a:lnB>
+                  </a:tcPr>
+                </a:tc>
+                <a:tc>
+                  <a:txBody>
+                    <a:bodyPr/>
+                    <a:lstStyle/>
+                    <a:p>
+                      <a:r>
+                        <a:rPr lang="en-US" sz="2800" dirty="0"/>
+                        <a:t>Dev</a:t>
+                      </a:r>
+                    </a:p>
+                  </a:txBody>
+                  <a:tcPr>
+                    <a:lnL w="12700" cap="flat" cmpd="sng" algn="ctr">
+                      <a:solidFill>
+                        <a:schemeClr val="tx1"/>
+                      </a:solidFill>
+                      <a:prstDash val="solid"/>
+                      <a:round/>
+                      <a:headEnd type="none" w="med" len="med"/>
+                      <a:tailEnd type="none" w="med" len="med"/>
+                    </a:lnL>
+                    <a:lnR w="12700" cap="flat" cmpd="sng" algn="ctr">
+                      <a:solidFill>
+                        <a:schemeClr val="tx1"/>
+                      </a:solidFill>
+                      <a:prstDash val="solid"/>
+                      <a:round/>
+                      <a:headEnd type="none" w="med" len="med"/>
+                      <a:tailEnd type="none" w="med" len="med"/>
+                    </a:lnR>
+                    <a:lnT w="12700" cap="flat" cmpd="sng" algn="ctr">
+                      <a:solidFill>
+                        <a:schemeClr val="tx1"/>
+                      </a:solidFill>
+                      <a:prstDash val="solid"/>
+                      <a:round/>
+                      <a:headEnd type="none" w="med" len="med"/>
+                      <a:tailEnd type="none" w="med" len="med"/>
+                    </a:lnT>
+                    <a:lnB w="12700" cap="flat" cmpd="sng" algn="ctr">
+                      <a:solidFill>
+                        <a:schemeClr val="tx1"/>
+                      </a:solidFill>
+                      <a:prstDash val="solid"/>
+                      <a:round/>
+                      <a:headEnd type="none" w="med" len="med"/>
+                      <a:tailEnd type="none" w="med" len="med"/>
+                    </a:lnB>
+                  </a:tcPr>
+                </a:tc>
+                <a:tc>
+                  <a:txBody>
+                    <a:bodyPr/>
+                    <a:lstStyle/>
+                    <a:p>
+                      <a:r>
+                        <a:rPr lang="en-US" sz="2800" dirty="0"/>
+                        <a:t>Dev, Prod</a:t>
+                      </a:r>
+                    </a:p>
+                  </a:txBody>
+                  <a:tcPr>
+                    <a:lnL w="12700" cap="flat" cmpd="sng" algn="ctr">
+                      <a:solidFill>
+                        <a:schemeClr val="tx1"/>
+                      </a:solidFill>
+                      <a:prstDash val="solid"/>
+                      <a:round/>
+                      <a:headEnd type="none" w="med" len="med"/>
+                      <a:tailEnd type="none" w="med" len="med"/>
+                    </a:lnL>
+                    <a:lnR w="12700" cap="flat" cmpd="sng" algn="ctr">
+                      <a:solidFill>
+                        <a:schemeClr val="tx1"/>
+                      </a:solidFill>
+                      <a:prstDash val="solid"/>
+                      <a:round/>
+                      <a:headEnd type="none" w="med" len="med"/>
+                      <a:tailEnd type="none" w="med" len="med"/>
+                    </a:lnR>
+                    <a:lnT w="12700" cap="flat" cmpd="sng" algn="ctr">
+                      <a:solidFill>
+                        <a:schemeClr val="tx1"/>
+                      </a:solidFill>
+                      <a:prstDash val="solid"/>
+                      <a:round/>
+                      <a:headEnd type="none" w="med" len="med"/>
+                      <a:tailEnd type="none" w="med" len="med"/>
+                    </a:lnT>
+                    <a:lnB w="12700" cap="flat" cmpd="sng" algn="ctr">
+                      <a:solidFill>
+                        <a:schemeClr val="tx1"/>
+                      </a:solidFill>
+                      <a:prstDash val="solid"/>
+                      <a:round/>
+                      <a:headEnd type="none" w="med" len="med"/>
+                      <a:tailEnd type="none" w="med" len="med"/>
+                    </a:lnB>
+                  </a:tcPr>
+                </a:tc>
+                <a:extLst>
+                  <a:ext uri="{0D108BD9-81ED-4DB2-BD59-A6C34878D82A}">
+                    <a16:rowId xmlns:a16="http://schemas.microsoft.com/office/drawing/2014/main" val="3600246297"/>
+                  </a:ext>
+                </a:extLst>
+              </a:tr>
+              <a:tr h="370840">
+                <a:tc>
+                  <a:txBody>
+                    <a:bodyPr/>
+                    <a:lstStyle/>
+                    <a:p>
+                      <a:pPr marL="0" marR="0" lvl="0" indent="0" algn="l" defTabSz="914400" rtl="0" eaLnBrk="1" fontAlgn="auto" latinLnBrk="0" hangingPunct="1">
+                        <a:lnSpc>
+                          <a:spcPct val="100000"/>
+                        </a:lnSpc>
+                        <a:spcBef>
+                          <a:spcPts val="0"/>
+                        </a:spcBef>
+                        <a:spcAft>
+                          <a:spcPts val="0"/>
+                        </a:spcAft>
+                        <a:buClrTx/>
+                        <a:buSzTx/>
+                        <a:buFontTx/>
+                        <a:buNone/>
+                        <a:tabLst/>
+                        <a:defRPr/>
+                      </a:pPr>
+                      <a:r>
+                        <a:rPr lang="en-US" sz="2800" b="1" dirty="0"/>
+                        <a:t>Pricing</a:t>
+                      </a:r>
+                    </a:p>
+                  </a:txBody>
+                  <a:tcPr>
+                    <a:lnL w="12700" cap="flat" cmpd="sng" algn="ctr">
+                      <a:solidFill>
+                        <a:schemeClr val="tx1"/>
+                      </a:solidFill>
+                      <a:prstDash val="solid"/>
+                      <a:round/>
+                      <a:headEnd type="none" w="med" len="med"/>
+                      <a:tailEnd type="none" w="med" len="med"/>
+                    </a:lnL>
+                    <a:lnR w="12700" cap="flat" cmpd="sng" algn="ctr">
+                      <a:solidFill>
+                        <a:schemeClr val="tx1"/>
+                      </a:solidFill>
+                      <a:prstDash val="solid"/>
+                      <a:round/>
+                      <a:headEnd type="none" w="med" len="med"/>
+                      <a:tailEnd type="none" w="med" len="med"/>
+                    </a:lnR>
+                    <a:lnT w="12700" cap="flat" cmpd="sng" algn="ctr">
+                      <a:solidFill>
+                        <a:schemeClr val="tx1"/>
+                      </a:solidFill>
+                      <a:prstDash val="solid"/>
+                      <a:round/>
+                      <a:headEnd type="none" w="med" len="med"/>
+                      <a:tailEnd type="none" w="med" len="med"/>
+                    </a:lnT>
+                    <a:lnB w="12700" cap="flat" cmpd="sng" algn="ctr">
+                      <a:solidFill>
+                        <a:schemeClr val="tx1"/>
+                      </a:solidFill>
+                      <a:prstDash val="solid"/>
+                      <a:round/>
+                      <a:headEnd type="none" w="med" len="med"/>
+                      <a:tailEnd type="none" w="med" len="med"/>
+                    </a:lnB>
+                  </a:tcPr>
+                </a:tc>
+                <a:tc>
+                  <a:txBody>
+                    <a:bodyPr/>
+                    <a:lstStyle/>
+                    <a:p>
+                      <a:r>
+                        <a:rPr lang="en-US" sz="2800" dirty="0"/>
+                        <a:t>Free</a:t>
+                      </a:r>
+                    </a:p>
+                  </a:txBody>
+                  <a:tcPr>
+                    <a:lnL w="12700" cap="flat" cmpd="sng" algn="ctr">
+                      <a:solidFill>
+                        <a:schemeClr val="tx1"/>
+                      </a:solidFill>
+                      <a:prstDash val="solid"/>
+                      <a:round/>
+                      <a:headEnd type="none" w="med" len="med"/>
+                      <a:tailEnd type="none" w="med" len="med"/>
+                    </a:lnL>
+                    <a:lnR w="12700" cap="flat" cmpd="sng" algn="ctr">
+                      <a:solidFill>
+                        <a:schemeClr val="tx1"/>
+                      </a:solidFill>
+                      <a:prstDash val="solid"/>
+                      <a:round/>
+                      <a:headEnd type="none" w="med" len="med"/>
+                      <a:tailEnd type="none" w="med" len="med"/>
+                    </a:lnR>
+                    <a:lnT w="12700" cap="flat" cmpd="sng" algn="ctr">
+                      <a:solidFill>
+                        <a:schemeClr val="tx1"/>
+                      </a:solidFill>
+                      <a:prstDash val="solid"/>
+                      <a:round/>
+                      <a:headEnd type="none" w="med" len="med"/>
+                      <a:tailEnd type="none" w="med" len="med"/>
+                    </a:lnT>
+                    <a:lnB w="12700" cap="flat" cmpd="sng" algn="ctr">
+                      <a:solidFill>
+                        <a:schemeClr val="tx1"/>
+                      </a:solidFill>
+                      <a:prstDash val="solid"/>
+                      <a:round/>
+                      <a:headEnd type="none" w="med" len="med"/>
+                      <a:tailEnd type="none" w="med" len="med"/>
+                    </a:lnB>
+                  </a:tcPr>
+                </a:tc>
+                <a:tc>
+                  <a:txBody>
+                    <a:bodyPr/>
+                    <a:lstStyle/>
+                    <a:p>
+                      <a:r>
+                        <a:rPr lang="en-US" sz="2800" dirty="0"/>
+                        <a:t>$0.03 / 10k operations</a:t>
+                      </a:r>
+                    </a:p>
+                  </a:txBody>
+                  <a:tcPr>
+                    <a:lnL w="12700" cap="flat" cmpd="sng" algn="ctr">
+                      <a:solidFill>
+                        <a:schemeClr val="tx1"/>
+                      </a:solidFill>
+                      <a:prstDash val="solid"/>
+                      <a:round/>
+                      <a:headEnd type="none" w="med" len="med"/>
+                      <a:tailEnd type="none" w="med" len="med"/>
+                    </a:lnL>
+                    <a:lnR w="12700" cap="flat" cmpd="sng" algn="ctr">
+                      <a:solidFill>
+                        <a:schemeClr val="tx1"/>
+                      </a:solidFill>
+                      <a:prstDash val="solid"/>
+                      <a:round/>
+                      <a:headEnd type="none" w="med" len="med"/>
+                      <a:tailEnd type="none" w="med" len="med"/>
+                    </a:lnR>
+                    <a:lnT w="12700" cap="flat" cmpd="sng" algn="ctr">
+                      <a:solidFill>
+                        <a:schemeClr val="tx1"/>
+                      </a:solidFill>
+                      <a:prstDash val="solid"/>
+                      <a:round/>
+                      <a:headEnd type="none" w="med" len="med"/>
+                      <a:tailEnd type="none" w="med" len="med"/>
+                    </a:lnT>
+                    <a:lnB w="12700" cap="flat" cmpd="sng" algn="ctr">
+                      <a:solidFill>
+                        <a:schemeClr val="tx1"/>
+                      </a:solidFill>
+                      <a:prstDash val="solid"/>
+                      <a:round/>
+                      <a:headEnd type="none" w="med" len="med"/>
+                      <a:tailEnd type="none" w="med" len="med"/>
+                    </a:lnB>
+                  </a:tcPr>
+                </a:tc>
+                <a:extLst>
+                  <a:ext uri="{0D108BD9-81ED-4DB2-BD59-A6C34878D82A}">
+                    <a16:rowId xmlns:a16="http://schemas.microsoft.com/office/drawing/2014/main" val="3242695606"/>
+                  </a:ext>
+                </a:extLst>
+              </a:tr>
+              <a:tr h="370840">
+                <a:tc>
+                  <a:txBody>
+                    <a:bodyPr/>
+                    <a:lstStyle/>
+                    <a:p>
+                      <a:pPr marL="0" marR="0" lvl="0" indent="0" algn="l" defTabSz="914400" rtl="0" eaLnBrk="1" fontAlgn="auto" latinLnBrk="0" hangingPunct="1">
+                        <a:lnSpc>
+                          <a:spcPct val="100000"/>
+                        </a:lnSpc>
+                        <a:spcBef>
+                          <a:spcPts val="0"/>
+                        </a:spcBef>
+                        <a:spcAft>
+                          <a:spcPts val="0"/>
+                        </a:spcAft>
+                        <a:buClrTx/>
+                        <a:buSzTx/>
+                        <a:buFontTx/>
+                        <a:buNone/>
+                        <a:tabLst/>
+                        <a:defRPr/>
+                      </a:pPr>
+                      <a:r>
+                        <a:rPr lang="en-US" sz="2800" b="1" dirty="0"/>
+                        <a:t>Encryption</a:t>
+                      </a:r>
+                    </a:p>
+                  </a:txBody>
+                  <a:tcPr>
+                    <a:lnL w="12700" cap="flat" cmpd="sng" algn="ctr">
+                      <a:solidFill>
+                        <a:schemeClr val="tx1"/>
+                      </a:solidFill>
+                      <a:prstDash val="solid"/>
+                      <a:round/>
+                      <a:headEnd type="none" w="med" len="med"/>
+                      <a:tailEnd type="none" w="med" len="med"/>
+                    </a:lnL>
+                    <a:lnR w="12700" cap="flat" cmpd="sng" algn="ctr">
+                      <a:solidFill>
+                        <a:schemeClr val="tx1"/>
+                      </a:solidFill>
+                      <a:prstDash val="solid"/>
+                      <a:round/>
+                      <a:headEnd type="none" w="med" len="med"/>
+                      <a:tailEnd type="none" w="med" len="med"/>
+                    </a:lnR>
+                    <a:lnT w="12700" cap="flat" cmpd="sng" algn="ctr">
+                      <a:solidFill>
+                        <a:schemeClr val="tx1"/>
+                      </a:solidFill>
+                      <a:prstDash val="solid"/>
+                      <a:round/>
+                      <a:headEnd type="none" w="med" len="med"/>
+                      <a:tailEnd type="none" w="med" len="med"/>
+                    </a:lnT>
+                    <a:lnB w="12700" cap="flat" cmpd="sng" algn="ctr">
+                      <a:solidFill>
+                        <a:schemeClr val="tx1"/>
+                      </a:solidFill>
+                      <a:prstDash val="solid"/>
+                      <a:round/>
+                      <a:headEnd type="none" w="med" len="med"/>
+                      <a:tailEnd type="none" w="med" len="med"/>
+                    </a:lnB>
+                  </a:tcPr>
+                </a:tc>
+                <a:tc>
+                  <a:txBody>
+                    <a:bodyPr/>
+                    <a:lstStyle/>
+                    <a:p>
+                      <a:r>
+                        <a:rPr lang="en-US" sz="2800" dirty="0"/>
+                        <a:t>No</a:t>
+                      </a:r>
+                    </a:p>
+                  </a:txBody>
+                  <a:tcPr>
+                    <a:lnL w="12700" cap="flat" cmpd="sng" algn="ctr">
+                      <a:solidFill>
+                        <a:schemeClr val="tx1"/>
+                      </a:solidFill>
+                      <a:prstDash val="solid"/>
+                      <a:round/>
+                      <a:headEnd type="none" w="med" len="med"/>
+                      <a:tailEnd type="none" w="med" len="med"/>
+                    </a:lnL>
+                    <a:lnR w="12700" cap="flat" cmpd="sng" algn="ctr">
+                      <a:solidFill>
+                        <a:schemeClr val="tx1"/>
+                      </a:solidFill>
+                      <a:prstDash val="solid"/>
+                      <a:round/>
+                      <a:headEnd type="none" w="med" len="med"/>
+                      <a:tailEnd type="none" w="med" len="med"/>
+                    </a:lnR>
+                    <a:lnT w="12700" cap="flat" cmpd="sng" algn="ctr">
+                      <a:solidFill>
+                        <a:schemeClr val="tx1"/>
+                      </a:solidFill>
+                      <a:prstDash val="solid"/>
+                      <a:round/>
+                      <a:headEnd type="none" w="med" len="med"/>
+                      <a:tailEnd type="none" w="med" len="med"/>
+                    </a:lnT>
+                    <a:lnB w="12700" cap="flat" cmpd="sng" algn="ctr">
+                      <a:solidFill>
+                        <a:schemeClr val="tx1"/>
+                      </a:solidFill>
+                      <a:prstDash val="solid"/>
+                      <a:round/>
+                      <a:headEnd type="none" w="med" len="med"/>
+                      <a:tailEnd type="none" w="med" len="med"/>
+                    </a:lnB>
+                  </a:tcPr>
+                </a:tc>
+                <a:tc>
+                  <a:txBody>
+                    <a:bodyPr/>
+                    <a:lstStyle/>
+                    <a:p>
+                      <a:r>
+                        <a:rPr lang="en-US" sz="2800" dirty="0"/>
+                        <a:t>Yes</a:t>
+                      </a:r>
+                    </a:p>
+                  </a:txBody>
+                  <a:tcPr>
+                    <a:lnL w="12700" cap="flat" cmpd="sng" algn="ctr">
+                      <a:solidFill>
+                        <a:schemeClr val="tx1"/>
+                      </a:solidFill>
+                      <a:prstDash val="solid"/>
+                      <a:round/>
+                      <a:headEnd type="none" w="med" len="med"/>
+                      <a:tailEnd type="none" w="med" len="med"/>
+                    </a:lnL>
+                    <a:lnR w="12700" cap="flat" cmpd="sng" algn="ctr">
+                      <a:solidFill>
+                        <a:schemeClr val="tx1"/>
+                      </a:solidFill>
+                      <a:prstDash val="solid"/>
+                      <a:round/>
+                      <a:headEnd type="none" w="med" len="med"/>
+                      <a:tailEnd type="none" w="med" len="med"/>
+                    </a:lnR>
+                    <a:lnT w="12700" cap="flat" cmpd="sng" algn="ctr">
+                      <a:solidFill>
+                        <a:schemeClr val="tx1"/>
+                      </a:solidFill>
+                      <a:prstDash val="solid"/>
+                      <a:round/>
+                      <a:headEnd type="none" w="med" len="med"/>
+                      <a:tailEnd type="none" w="med" len="med"/>
+                    </a:lnT>
+                    <a:lnB w="12700" cap="flat" cmpd="sng" algn="ctr">
+                      <a:solidFill>
+                        <a:schemeClr val="tx1"/>
+                      </a:solidFill>
+                      <a:prstDash val="solid"/>
+                      <a:round/>
+                      <a:headEnd type="none" w="med" len="med"/>
+                      <a:tailEnd type="none" w="med" len="med"/>
+                    </a:lnB>
+                  </a:tcPr>
+                </a:tc>
+                <a:extLst>
+                  <a:ext uri="{0D108BD9-81ED-4DB2-BD59-A6C34878D82A}">
+                    <a16:rowId xmlns:a16="http://schemas.microsoft.com/office/drawing/2014/main" val="4113498180"/>
+                  </a:ext>
+                </a:extLst>
+              </a:tr>
+              <a:tr h="370840">
+                <a:tc>
+                  <a:txBody>
+                    <a:bodyPr/>
+                    <a:lstStyle/>
+                    <a:p>
+                      <a:pPr marL="0" marR="0" lvl="0" indent="0" algn="l" defTabSz="914400" rtl="0" eaLnBrk="1" fontAlgn="auto" latinLnBrk="0" hangingPunct="1">
+                        <a:lnSpc>
+                          <a:spcPct val="100000"/>
+                        </a:lnSpc>
+                        <a:spcBef>
+                          <a:spcPts val="0"/>
+                        </a:spcBef>
+                        <a:spcAft>
+                          <a:spcPts val="0"/>
+                        </a:spcAft>
+                        <a:buClrTx/>
+                        <a:buSzTx/>
+                        <a:buFontTx/>
+                        <a:buNone/>
+                        <a:tabLst/>
+                        <a:defRPr/>
+                      </a:pPr>
+                      <a:r>
+                        <a:rPr lang="en-US" sz="2800" b="1" dirty="0"/>
+                        <a:t>Storage</a:t>
+                      </a:r>
+                    </a:p>
+                  </a:txBody>
+                  <a:tcPr>
+                    <a:lnL w="12700" cap="flat" cmpd="sng" algn="ctr">
+                      <a:solidFill>
+                        <a:schemeClr val="tx1"/>
+                      </a:solidFill>
+                      <a:prstDash val="solid"/>
+                      <a:round/>
+                      <a:headEnd type="none" w="med" len="med"/>
+                      <a:tailEnd type="none" w="med" len="med"/>
+                    </a:lnL>
+                    <a:lnR w="12700" cap="flat" cmpd="sng" algn="ctr">
+                      <a:solidFill>
+                        <a:schemeClr val="tx1"/>
+                      </a:solidFill>
+                      <a:prstDash val="solid"/>
+                      <a:round/>
+                      <a:headEnd type="none" w="med" len="med"/>
+                      <a:tailEnd type="none" w="med" len="med"/>
+                    </a:lnR>
+                    <a:lnT w="12700" cap="flat" cmpd="sng" algn="ctr">
+                      <a:solidFill>
+                        <a:schemeClr val="tx1"/>
+                      </a:solidFill>
+                      <a:prstDash val="solid"/>
+                      <a:round/>
+                      <a:headEnd type="none" w="med" len="med"/>
+                      <a:tailEnd type="none" w="med" len="med"/>
+                    </a:lnT>
+                    <a:lnB w="12700" cap="flat" cmpd="sng" algn="ctr">
+                      <a:solidFill>
+                        <a:schemeClr val="tx1"/>
+                      </a:solidFill>
+                      <a:prstDash val="solid"/>
+                      <a:round/>
+                      <a:headEnd type="none" w="med" len="med"/>
+                      <a:tailEnd type="none" w="med" len="med"/>
+                    </a:lnB>
+                  </a:tcPr>
+                </a:tc>
+                <a:tc>
+                  <a:txBody>
+                    <a:bodyPr/>
+                    <a:lstStyle/>
+                    <a:p>
+                      <a:r>
+                        <a:rPr lang="en-US" sz="2800" dirty="0"/>
+                        <a:t>Local machine</a:t>
+                      </a:r>
+                    </a:p>
+                  </a:txBody>
+                  <a:tcPr>
+                    <a:lnL w="12700" cap="flat" cmpd="sng" algn="ctr">
+                      <a:solidFill>
+                        <a:schemeClr val="tx1"/>
+                      </a:solidFill>
+                      <a:prstDash val="solid"/>
+                      <a:round/>
+                      <a:headEnd type="none" w="med" len="med"/>
+                      <a:tailEnd type="none" w="med" len="med"/>
+                    </a:lnL>
+                    <a:lnR w="12700" cap="flat" cmpd="sng" algn="ctr">
+                      <a:solidFill>
+                        <a:schemeClr val="tx1"/>
+                      </a:solidFill>
+                      <a:prstDash val="solid"/>
+                      <a:round/>
+                      <a:headEnd type="none" w="med" len="med"/>
+                      <a:tailEnd type="none" w="med" len="med"/>
+                    </a:lnR>
+                    <a:lnT w="12700" cap="flat" cmpd="sng" algn="ctr">
+                      <a:solidFill>
+                        <a:schemeClr val="tx1"/>
+                      </a:solidFill>
+                      <a:prstDash val="solid"/>
+                      <a:round/>
+                      <a:headEnd type="none" w="med" len="med"/>
+                      <a:tailEnd type="none" w="med" len="med"/>
+                    </a:lnT>
+                    <a:lnB w="12700" cap="flat" cmpd="sng" algn="ctr">
+                      <a:solidFill>
+                        <a:schemeClr val="tx1"/>
+                      </a:solidFill>
+                      <a:prstDash val="solid"/>
+                      <a:round/>
+                      <a:headEnd type="none" w="med" len="med"/>
+                      <a:tailEnd type="none" w="med" len="med"/>
+                    </a:lnB>
+                  </a:tcPr>
+                </a:tc>
+                <a:tc>
+                  <a:txBody>
+                    <a:bodyPr/>
+                    <a:lstStyle/>
+                    <a:p>
+                      <a:r>
+                        <a:rPr lang="en-US" sz="2800" dirty="0"/>
+                        <a:t>Azure Storage</a:t>
+                      </a:r>
+                    </a:p>
+                  </a:txBody>
+                  <a:tcPr>
+                    <a:lnL w="12700" cap="flat" cmpd="sng" algn="ctr">
+                      <a:solidFill>
+                        <a:schemeClr val="tx1"/>
+                      </a:solidFill>
+                      <a:prstDash val="solid"/>
+                      <a:round/>
+                      <a:headEnd type="none" w="med" len="med"/>
+                      <a:tailEnd type="none" w="med" len="med"/>
+                    </a:lnL>
+                    <a:lnR w="12700" cap="flat" cmpd="sng" algn="ctr">
+                      <a:solidFill>
+                        <a:schemeClr val="tx1"/>
+                      </a:solidFill>
+                      <a:prstDash val="solid"/>
+                      <a:round/>
+                      <a:headEnd type="none" w="med" len="med"/>
+                      <a:tailEnd type="none" w="med" len="med"/>
+                    </a:lnR>
+                    <a:lnT w="12700" cap="flat" cmpd="sng" algn="ctr">
+                      <a:solidFill>
+                        <a:schemeClr val="tx1"/>
+                      </a:solidFill>
+                      <a:prstDash val="solid"/>
+                      <a:round/>
+                      <a:headEnd type="none" w="med" len="med"/>
+                      <a:tailEnd type="none" w="med" len="med"/>
+                    </a:lnT>
+                    <a:lnB w="12700" cap="flat" cmpd="sng" algn="ctr">
+                      <a:solidFill>
+                        <a:schemeClr val="tx1"/>
+                      </a:solidFill>
+                      <a:prstDash val="solid"/>
+                      <a:round/>
+                      <a:headEnd type="none" w="med" len="med"/>
+                      <a:tailEnd type="none" w="med" len="med"/>
+                    </a:lnB>
+                  </a:tcPr>
+                </a:tc>
+                <a:extLst>
+                  <a:ext uri="{0D108BD9-81ED-4DB2-BD59-A6C34878D82A}">
+                    <a16:rowId xmlns:a16="http://schemas.microsoft.com/office/drawing/2014/main" val="2053637856"/>
+                  </a:ext>
+                </a:extLst>
+              </a:tr>
+            </a:tbl>
+          </a:graphicData>
+        </a:graphic>
+      </p:graphicFrame>
+    </p:spTree>
+    <p:extLst>
+      <p:ext uri="{BB962C8B-B14F-4D97-AF65-F5344CB8AC3E}">
+        <p14:creationId xmlns:p14="http://schemas.microsoft.com/office/powerpoint/2010/main" val="2274126501"/>
+      </p:ext>
+    </p:extLst>
+  </p:cSld>
+  <p:clrMapOvr>
+    <a:masterClrMapping/>
+  </p:clrMapOvr>
+</p:sld>
+</file>
+
+<file path=ppt/slides/slide12.xml><?xml version="1.0" encoding="utf-8"?>
 <p:sld xmlns:a="http://schemas.openxmlformats.org/drawingml/2006/main" xmlns:r="http://schemas.openxmlformats.org/officeDocument/2006/relationships" xmlns:p="http://schemas.openxmlformats.org/presentationml/2006/main">
   <p:cSld>
     <p:bg>
@@ -12028,13 +13588,29 @@
       </p:grpSpPr>
       <p:sp>
         <p:nvSpPr>
-          <p:cNvPr id="9" name="Content Placeholder 8">
-            <a:extLst>
-              <a:ext uri="{FF2B5EF4-FFF2-40B4-BE49-F238E27FC236}">
-                <a16:creationId xmlns:a16="http://schemas.microsoft.com/office/drawing/2014/main" id="{1D1D5618-6BDF-4FDD-A68D-6252FC8A99C0}"/>
-              </a:ext>
-            </a:extLst>
-          </p:cNvPr>
+          <p:cNvPr id="2" name="Title 1"/>
+          <p:cNvSpPr>
+            <a:spLocks noGrp="1"/>
+          </p:cNvSpPr>
+          <p:nvPr>
+            <p:ph type="title"/>
+          </p:nvPr>
+        </p:nvSpPr>
+        <p:spPr/>
+        <p:txBody>
+          <a:bodyPr/>
+          <a:lstStyle/>
+          <a:p>
+            <a:r>
+              <a:rPr lang="en-US" dirty="0"/>
+              <a:t>Secret Manager</a:t>
+            </a:r>
+          </a:p>
+        </p:txBody>
+      </p:sp>
+      <p:sp>
+        <p:nvSpPr>
+          <p:cNvPr id="3" name="Content Placeholder 2"/>
           <p:cNvSpPr>
             <a:spLocks noGrp="1"/>
           </p:cNvSpPr>
@@ -12044,921 +13620,485 @@
         </p:nvSpPr>
         <p:spPr/>
         <p:txBody>
-          <a:bodyPr/>
+          <a:bodyPr>
+            <a:normAutofit fontScale="92500" lnSpcReduction="10000"/>
+          </a:bodyPr>
           <a:lstStyle/>
           <a:p>
             <a:pPr marL="0" indent="0">
               <a:buNone/>
             </a:pPr>
+            <a:r>
+              <a:rPr lang="en-US" dirty="0">
+                <a:solidFill>
+                  <a:schemeClr val="accent4"/>
+                </a:solidFill>
+              </a:rPr>
+              <a:t>Prerequisites</a:t>
+            </a:r>
+          </a:p>
+          <a:p>
+            <a:r>
+              <a:rPr lang="en-US" dirty="0"/>
+              <a:t>.NET Core SDK v2.1</a:t>
+            </a:r>
+          </a:p>
+          <a:p>
+            <a:r>
+              <a:rPr lang="en-US" dirty="0"/>
+              <a:t>Visual Studio 2017</a:t>
+            </a:r>
+          </a:p>
+          <a:p>
+            <a:pPr lvl="1"/>
+            <a:r>
+              <a:rPr lang="en-US" dirty="0"/>
+              <a:t>.NET Core cross-platform development</a:t>
+            </a:r>
+          </a:p>
+          <a:p>
+            <a:pPr lvl="1"/>
+            <a:r>
+              <a:rPr lang="en-US" dirty="0"/>
+              <a:t>ASP.NET and web development</a:t>
+            </a:r>
+          </a:p>
+          <a:p>
+            <a:pPr lvl="1"/>
             <a:endParaRPr lang="en-US" dirty="0"/>
           </a:p>
-        </p:txBody>
-      </p:sp>
-      <p:sp>
-        <p:nvSpPr>
-          <p:cNvPr id="2" name="Title 1"/>
-          <p:cNvSpPr>
-            <a:spLocks noGrp="1"/>
-          </p:cNvSpPr>
-          <p:nvPr>
-            <p:ph type="title"/>
-          </p:nvPr>
-        </p:nvSpPr>
-        <p:spPr/>
-        <p:txBody>
-          <a:bodyPr/>
-          <a:lstStyle/>
-          <a:p>
+          <a:p>
+            <a:pPr marL="0" indent="0">
+              <a:buNone/>
+            </a:pPr>
+            <a:r>
+              <a:rPr lang="en-US" dirty="0">
+                <a:solidFill>
+                  <a:schemeClr val="accent4"/>
+                </a:solidFill>
+              </a:rPr>
+              <a:t>Usage</a:t>
+            </a:r>
+          </a:p>
+          <a:p>
+            <a:pPr marL="0" indent="0">
+              <a:buNone/>
+            </a:pPr>
+            <a:r>
+              <a:rPr lang="en-US" b="1" dirty="0">
+                <a:latin typeface="Courier New" panose="02070309020205020404" pitchFamily="49" charset="0"/>
+                <a:cs typeface="Courier New" panose="02070309020205020404" pitchFamily="49" charset="0"/>
+              </a:rPr>
+              <a:t>&gt;</a:t>
+            </a:r>
+            <a:r>
+              <a:rPr lang="en-US" dirty="0">
+                <a:latin typeface="Courier New" panose="02070309020205020404" pitchFamily="49" charset="0"/>
+                <a:cs typeface="Courier New" panose="02070309020205020404" pitchFamily="49" charset="0"/>
+              </a:rPr>
+              <a:t> dotnet user-secrets</a:t>
+            </a:r>
             <a:r>
               <a:rPr lang="en-US" dirty="0"/>
-              <a:t>Comparison of solutions</a:t>
-            </a:r>
-          </a:p>
-        </p:txBody>
-      </p:sp>
-      <p:graphicFrame>
-        <p:nvGraphicFramePr>
-          <p:cNvPr id="5" name="Table 4">
-            <a:extLst>
-              <a:ext uri="{FF2B5EF4-FFF2-40B4-BE49-F238E27FC236}">
-                <a16:creationId xmlns:a16="http://schemas.microsoft.com/office/drawing/2014/main" id="{B11B5F89-CEA0-4F9B-8FF2-082E53048DC8}"/>
-              </a:ext>
-            </a:extLst>
-          </p:cNvPr>
-          <p:cNvGraphicFramePr>
-            <a:graphicFrameLocks noGrp="1"/>
-          </p:cNvGraphicFramePr>
-          <p:nvPr>
-            <p:extLst>
-              <p:ext uri="{D42A27DB-BD31-4B8C-83A1-F6EECF244321}">
-                <p14:modId xmlns:p14="http://schemas.microsoft.com/office/powerpoint/2010/main" val="1083158645"/>
-              </p:ext>
-            </p:extLst>
-          </p:nvPr>
-        </p:nvGraphicFramePr>
-        <p:xfrm>
-          <a:off x="976923" y="2017151"/>
-          <a:ext cx="9583555" cy="3261360"/>
-        </p:xfrm>
-        <a:graphic>
-          <a:graphicData uri="http://schemas.openxmlformats.org/drawingml/2006/table">
-            <a:tbl>
-              <a:tblPr firstRow="1" bandRow="1">
-                <a:tableStyleId>{327F97BB-C833-4FB7-BDE5-3F7075034690}</a:tableStyleId>
-              </a:tblPr>
-              <a:tblGrid>
-                <a:gridCol w="2142461">
-                  <a:extLst>
-                    <a:ext uri="{9D8B030D-6E8A-4147-A177-3AD203B41FA5}">
-                      <a16:colId xmlns:a16="http://schemas.microsoft.com/office/drawing/2014/main" val="3393553294"/>
-                    </a:ext>
-                  </a:extLst>
-                </a:gridCol>
-                <a:gridCol w="2290318">
-                  <a:extLst>
-                    <a:ext uri="{9D8B030D-6E8A-4147-A177-3AD203B41FA5}">
-                      <a16:colId xmlns:a16="http://schemas.microsoft.com/office/drawing/2014/main" val="3103465248"/>
-                    </a:ext>
-                  </a:extLst>
-                </a:gridCol>
-                <a:gridCol w="1636477">
-                  <a:extLst>
-                    <a:ext uri="{9D8B030D-6E8A-4147-A177-3AD203B41FA5}">
-                      <a16:colId xmlns:a16="http://schemas.microsoft.com/office/drawing/2014/main" val="1329647999"/>
-                    </a:ext>
-                  </a:extLst>
-                </a:gridCol>
-                <a:gridCol w="1877822">
-                  <a:extLst>
-                    <a:ext uri="{9D8B030D-6E8A-4147-A177-3AD203B41FA5}">
-                      <a16:colId xmlns:a16="http://schemas.microsoft.com/office/drawing/2014/main" val="1748776855"/>
-                    </a:ext>
-                  </a:extLst>
-                </a:gridCol>
-                <a:gridCol w="1636477">
-                  <a:extLst>
-                    <a:ext uri="{9D8B030D-6E8A-4147-A177-3AD203B41FA5}">
-                      <a16:colId xmlns:a16="http://schemas.microsoft.com/office/drawing/2014/main" val="792689166"/>
-                    </a:ext>
-                  </a:extLst>
-                </a:gridCol>
-              </a:tblGrid>
-              <a:tr h="0">
-                <a:tc>
-                  <a:txBody>
-                    <a:bodyPr/>
-                    <a:lstStyle/>
-                    <a:p>
-                      <a:endParaRPr lang="en-US" sz="2800" b="1" dirty="0"/>
-                    </a:p>
-                  </a:txBody>
-                  <a:tcPr>
-                    <a:lnL w="12700" cap="flat" cmpd="sng" algn="ctr">
-                      <a:solidFill>
-                        <a:schemeClr val="tx1"/>
-                      </a:solidFill>
-                      <a:prstDash val="solid"/>
-                      <a:round/>
-                      <a:headEnd type="none" w="med" len="med"/>
-                      <a:tailEnd type="none" w="med" len="med"/>
-                    </a:lnL>
-                    <a:lnR w="12700" cap="flat" cmpd="sng" algn="ctr">
-                      <a:solidFill>
-                        <a:schemeClr val="tx1"/>
-                      </a:solidFill>
-                      <a:prstDash val="solid"/>
-                      <a:round/>
-                      <a:headEnd type="none" w="med" len="med"/>
-                      <a:tailEnd type="none" w="med" len="med"/>
-                    </a:lnR>
-                    <a:lnT w="12700" cap="flat" cmpd="sng" algn="ctr">
-                      <a:solidFill>
-                        <a:schemeClr val="tx1"/>
-                      </a:solidFill>
-                      <a:prstDash val="solid"/>
-                      <a:round/>
-                      <a:headEnd type="none" w="med" len="med"/>
-                      <a:tailEnd type="none" w="med" len="med"/>
-                    </a:lnT>
-                    <a:lnB w="12700" cap="flat" cmpd="sng" algn="ctr">
-                      <a:solidFill>
-                        <a:schemeClr val="tx1"/>
-                      </a:solidFill>
-                      <a:prstDash val="solid"/>
-                      <a:round/>
-                      <a:headEnd type="none" w="med" len="med"/>
-                      <a:tailEnd type="none" w="med" len="med"/>
-                    </a:lnB>
-                  </a:tcPr>
-                </a:tc>
-                <a:tc>
-                  <a:txBody>
-                    <a:bodyPr/>
-                    <a:lstStyle/>
-                    <a:p>
-                      <a:r>
-                        <a:rPr lang="en-US" sz="2800" dirty="0"/>
-                        <a:t>Environments</a:t>
-                      </a:r>
-                    </a:p>
-                  </a:txBody>
-                  <a:tcPr>
-                    <a:lnL w="12700" cap="flat" cmpd="sng" algn="ctr">
-                      <a:solidFill>
-                        <a:schemeClr val="tx1"/>
-                      </a:solidFill>
-                      <a:prstDash val="solid"/>
-                      <a:round/>
-                      <a:headEnd type="none" w="med" len="med"/>
-                      <a:tailEnd type="none" w="med" len="med"/>
-                    </a:lnL>
-                    <a:lnR w="12700" cap="flat" cmpd="sng" algn="ctr">
-                      <a:solidFill>
-                        <a:schemeClr val="tx1"/>
-                      </a:solidFill>
-                      <a:prstDash val="solid"/>
-                      <a:round/>
-                      <a:headEnd type="none" w="med" len="med"/>
-                      <a:tailEnd type="none" w="med" len="med"/>
-                    </a:lnR>
-                    <a:lnT w="12700" cap="flat" cmpd="sng" algn="ctr">
-                      <a:solidFill>
-                        <a:schemeClr val="tx1"/>
-                      </a:solidFill>
-                      <a:prstDash val="solid"/>
-                      <a:round/>
-                      <a:headEnd type="none" w="med" len="med"/>
-                      <a:tailEnd type="none" w="med" len="med"/>
-                    </a:lnT>
-                    <a:lnB w="12700" cap="flat" cmpd="sng" algn="ctr">
-                      <a:solidFill>
-                        <a:schemeClr val="tx1"/>
-                      </a:solidFill>
-                      <a:prstDash val="solid"/>
-                      <a:round/>
-                      <a:headEnd type="none" w="med" len="med"/>
-                      <a:tailEnd type="none" w="med" len="med"/>
-                    </a:lnB>
-                  </a:tcPr>
-                </a:tc>
-                <a:tc>
-                  <a:txBody>
-                    <a:bodyPr/>
-                    <a:lstStyle/>
-                    <a:p>
-                      <a:r>
-                        <a:rPr lang="en-US" sz="2800" dirty="0"/>
-                        <a:t>Pricing</a:t>
-                      </a:r>
-                    </a:p>
-                  </a:txBody>
-                  <a:tcPr>
-                    <a:lnL w="12700" cap="flat" cmpd="sng" algn="ctr">
-                      <a:solidFill>
-                        <a:schemeClr val="tx1"/>
-                      </a:solidFill>
-                      <a:prstDash val="solid"/>
-                      <a:round/>
-                      <a:headEnd type="none" w="med" len="med"/>
-                      <a:tailEnd type="none" w="med" len="med"/>
-                    </a:lnL>
-                    <a:lnR w="12700" cap="flat" cmpd="sng" algn="ctr">
-                      <a:solidFill>
-                        <a:schemeClr val="tx1"/>
-                      </a:solidFill>
-                      <a:prstDash val="solid"/>
-                      <a:round/>
-                      <a:headEnd type="none" w="med" len="med"/>
-                      <a:tailEnd type="none" w="med" len="med"/>
-                    </a:lnR>
-                    <a:lnT w="12700" cap="flat" cmpd="sng" algn="ctr">
-                      <a:solidFill>
-                        <a:schemeClr val="tx1"/>
-                      </a:solidFill>
-                      <a:prstDash val="solid"/>
-                      <a:round/>
-                      <a:headEnd type="none" w="med" len="med"/>
-                      <a:tailEnd type="none" w="med" len="med"/>
-                    </a:lnT>
-                    <a:lnB w="12700" cap="flat" cmpd="sng" algn="ctr">
-                      <a:solidFill>
-                        <a:schemeClr val="tx1"/>
-                      </a:solidFill>
-                      <a:prstDash val="solid"/>
-                      <a:round/>
-                      <a:headEnd type="none" w="med" len="med"/>
-                      <a:tailEnd type="none" w="med" len="med"/>
-                    </a:lnB>
-                  </a:tcPr>
-                </a:tc>
-                <a:tc>
-                  <a:txBody>
-                    <a:bodyPr/>
-                    <a:lstStyle/>
-                    <a:p>
-                      <a:r>
-                        <a:rPr lang="en-US" sz="2800" dirty="0"/>
-                        <a:t>Encryption</a:t>
-                      </a:r>
-                    </a:p>
-                  </a:txBody>
-                  <a:tcPr>
-                    <a:lnL w="12700" cap="flat" cmpd="sng" algn="ctr">
-                      <a:solidFill>
-                        <a:schemeClr val="tx1"/>
-                      </a:solidFill>
-                      <a:prstDash val="solid"/>
-                      <a:round/>
-                      <a:headEnd type="none" w="med" len="med"/>
-                      <a:tailEnd type="none" w="med" len="med"/>
-                    </a:lnL>
-                    <a:lnR w="12700" cap="flat" cmpd="sng" algn="ctr">
-                      <a:solidFill>
-                        <a:schemeClr val="tx1"/>
-                      </a:solidFill>
-                      <a:prstDash val="solid"/>
-                      <a:round/>
-                      <a:headEnd type="none" w="med" len="med"/>
-                      <a:tailEnd type="none" w="med" len="med"/>
-                    </a:lnR>
-                    <a:lnT w="12700" cap="flat" cmpd="sng" algn="ctr">
-                      <a:solidFill>
-                        <a:schemeClr val="tx1"/>
-                      </a:solidFill>
-                      <a:prstDash val="solid"/>
-                      <a:round/>
-                      <a:headEnd type="none" w="med" len="med"/>
-                      <a:tailEnd type="none" w="med" len="med"/>
-                    </a:lnT>
-                    <a:lnB w="12700" cap="flat" cmpd="sng" algn="ctr">
-                      <a:solidFill>
-                        <a:schemeClr val="tx1"/>
-                      </a:solidFill>
-                      <a:prstDash val="solid"/>
-                      <a:round/>
-                      <a:headEnd type="none" w="med" len="med"/>
-                      <a:tailEnd type="none" w="med" len="med"/>
-                    </a:lnB>
-                  </a:tcPr>
-                </a:tc>
-                <a:tc>
-                  <a:txBody>
-                    <a:bodyPr/>
-                    <a:lstStyle/>
-                    <a:p>
-                      <a:r>
-                        <a:rPr lang="en-US" sz="2800" dirty="0"/>
-                        <a:t>Storage</a:t>
-                      </a:r>
-                    </a:p>
-                  </a:txBody>
-                  <a:tcPr>
-                    <a:lnL w="12700" cap="flat" cmpd="sng" algn="ctr">
-                      <a:solidFill>
-                        <a:schemeClr val="tx1"/>
-                      </a:solidFill>
-                      <a:prstDash val="solid"/>
-                      <a:round/>
-                      <a:headEnd type="none" w="med" len="med"/>
-                      <a:tailEnd type="none" w="med" len="med"/>
-                    </a:lnL>
-                    <a:lnR w="12700" cap="flat" cmpd="sng" algn="ctr">
-                      <a:solidFill>
-                        <a:schemeClr val="tx1"/>
-                      </a:solidFill>
-                      <a:prstDash val="solid"/>
-                      <a:round/>
-                      <a:headEnd type="none" w="med" len="med"/>
-                      <a:tailEnd type="none" w="med" len="med"/>
-                    </a:lnR>
-                    <a:lnT w="12700" cap="flat" cmpd="sng" algn="ctr">
-                      <a:solidFill>
-                        <a:schemeClr val="tx1"/>
-                      </a:solidFill>
-                      <a:prstDash val="solid"/>
-                      <a:round/>
-                      <a:headEnd type="none" w="med" len="med"/>
-                      <a:tailEnd type="none" w="med" len="med"/>
-                    </a:lnT>
-                    <a:lnB w="12700" cap="flat" cmpd="sng" algn="ctr">
-                      <a:solidFill>
-                        <a:schemeClr val="tx1"/>
-                      </a:solidFill>
-                      <a:prstDash val="solid"/>
-                      <a:round/>
-                      <a:headEnd type="none" w="med" len="med"/>
-                      <a:tailEnd type="none" w="med" len="med"/>
-                    </a:lnB>
-                  </a:tcPr>
-                </a:tc>
-                <a:extLst>
-                  <a:ext uri="{0D108BD9-81ED-4DB2-BD59-A6C34878D82A}">
-                    <a16:rowId xmlns:a16="http://schemas.microsoft.com/office/drawing/2014/main" val="1056126699"/>
-                  </a:ext>
-                </a:extLst>
-              </a:tr>
-              <a:tr h="370840">
-                <a:tc>
-                  <a:txBody>
-                    <a:bodyPr/>
-                    <a:lstStyle/>
-                    <a:p>
-                      <a:pPr marL="0" marR="0" lvl="0" indent="0" algn="l" defTabSz="914400" rtl="0" eaLnBrk="1" fontAlgn="auto" latinLnBrk="0" hangingPunct="1">
-                        <a:lnSpc>
-                          <a:spcPct val="100000"/>
-                        </a:lnSpc>
-                        <a:spcBef>
-                          <a:spcPts val="0"/>
-                        </a:spcBef>
-                        <a:spcAft>
-                          <a:spcPts val="0"/>
-                        </a:spcAft>
-                        <a:buClrTx/>
-                        <a:buSzTx/>
-                        <a:buFontTx/>
-                        <a:buNone/>
-                        <a:tabLst/>
-                        <a:defRPr/>
-                      </a:pPr>
-                      <a:r>
-                        <a:rPr lang="en-US" sz="2800" b="1" dirty="0"/>
-                        <a:t>Secret Manager</a:t>
-                      </a:r>
-                    </a:p>
-                  </a:txBody>
-                  <a:tcPr>
-                    <a:lnL w="12700" cap="flat" cmpd="sng" algn="ctr">
-                      <a:solidFill>
-                        <a:schemeClr val="tx1"/>
-                      </a:solidFill>
-                      <a:prstDash val="solid"/>
-                      <a:round/>
-                      <a:headEnd type="none" w="med" len="med"/>
-                      <a:tailEnd type="none" w="med" len="med"/>
-                    </a:lnL>
-                    <a:lnR w="12700" cap="flat" cmpd="sng" algn="ctr">
-                      <a:solidFill>
-                        <a:schemeClr val="tx1"/>
-                      </a:solidFill>
-                      <a:prstDash val="solid"/>
-                      <a:round/>
-                      <a:headEnd type="none" w="med" len="med"/>
-                      <a:tailEnd type="none" w="med" len="med"/>
-                    </a:lnR>
-                    <a:lnT w="12700" cap="flat" cmpd="sng" algn="ctr">
-                      <a:solidFill>
-                        <a:schemeClr val="tx1"/>
-                      </a:solidFill>
-                      <a:prstDash val="solid"/>
-                      <a:round/>
-                      <a:headEnd type="none" w="med" len="med"/>
-                      <a:tailEnd type="none" w="med" len="med"/>
-                    </a:lnT>
-                    <a:lnB w="12700" cap="flat" cmpd="sng" algn="ctr">
-                      <a:solidFill>
-                        <a:schemeClr val="tx1"/>
-                      </a:solidFill>
-                      <a:prstDash val="solid"/>
-                      <a:round/>
-                      <a:headEnd type="none" w="med" len="med"/>
-                      <a:tailEnd type="none" w="med" len="med"/>
-                    </a:lnB>
-                  </a:tcPr>
-                </a:tc>
-                <a:tc>
-                  <a:txBody>
-                    <a:bodyPr/>
-                    <a:lstStyle/>
-                    <a:p>
-                      <a:r>
-                        <a:rPr lang="en-US" sz="2800" dirty="0"/>
-                        <a:t>Dev</a:t>
-                      </a:r>
-                    </a:p>
-                  </a:txBody>
-                  <a:tcPr>
-                    <a:lnL w="12700" cap="flat" cmpd="sng" algn="ctr">
-                      <a:solidFill>
-                        <a:schemeClr val="tx1"/>
-                      </a:solidFill>
-                      <a:prstDash val="solid"/>
-                      <a:round/>
-                      <a:headEnd type="none" w="med" len="med"/>
-                      <a:tailEnd type="none" w="med" len="med"/>
-                    </a:lnL>
-                    <a:lnR w="12700" cap="flat" cmpd="sng" algn="ctr">
-                      <a:solidFill>
-                        <a:schemeClr val="tx1"/>
-                      </a:solidFill>
-                      <a:prstDash val="solid"/>
-                      <a:round/>
-                      <a:headEnd type="none" w="med" len="med"/>
-                      <a:tailEnd type="none" w="med" len="med"/>
-                    </a:lnR>
-                    <a:lnT w="12700" cap="flat" cmpd="sng" algn="ctr">
-                      <a:solidFill>
-                        <a:schemeClr val="tx1"/>
-                      </a:solidFill>
-                      <a:prstDash val="solid"/>
-                      <a:round/>
-                      <a:headEnd type="none" w="med" len="med"/>
-                      <a:tailEnd type="none" w="med" len="med"/>
-                    </a:lnT>
-                    <a:lnB w="12700" cap="flat" cmpd="sng" algn="ctr">
-                      <a:solidFill>
-                        <a:schemeClr val="tx1"/>
-                      </a:solidFill>
-                      <a:prstDash val="solid"/>
-                      <a:round/>
-                      <a:headEnd type="none" w="med" len="med"/>
-                      <a:tailEnd type="none" w="med" len="med"/>
-                    </a:lnB>
-                  </a:tcPr>
-                </a:tc>
-                <a:tc>
-                  <a:txBody>
-                    <a:bodyPr/>
-                    <a:lstStyle/>
-                    <a:p>
-                      <a:r>
-                        <a:rPr lang="en-US" sz="2800" dirty="0"/>
-                        <a:t>Free</a:t>
-                      </a:r>
-                    </a:p>
-                  </a:txBody>
-                  <a:tcPr>
-                    <a:lnL w="12700" cap="flat" cmpd="sng" algn="ctr">
-                      <a:solidFill>
-                        <a:schemeClr val="tx1"/>
-                      </a:solidFill>
-                      <a:prstDash val="solid"/>
-                      <a:round/>
-                      <a:headEnd type="none" w="med" len="med"/>
-                      <a:tailEnd type="none" w="med" len="med"/>
-                    </a:lnL>
-                    <a:lnR w="12700" cap="flat" cmpd="sng" algn="ctr">
-                      <a:solidFill>
-                        <a:schemeClr val="tx1"/>
-                      </a:solidFill>
-                      <a:prstDash val="solid"/>
-                      <a:round/>
-                      <a:headEnd type="none" w="med" len="med"/>
-                      <a:tailEnd type="none" w="med" len="med"/>
-                    </a:lnR>
-                    <a:lnT w="12700" cap="flat" cmpd="sng" algn="ctr">
-                      <a:solidFill>
-                        <a:schemeClr val="tx1"/>
-                      </a:solidFill>
-                      <a:prstDash val="solid"/>
-                      <a:round/>
-                      <a:headEnd type="none" w="med" len="med"/>
-                      <a:tailEnd type="none" w="med" len="med"/>
-                    </a:lnT>
-                    <a:lnB w="12700" cap="flat" cmpd="sng" algn="ctr">
-                      <a:solidFill>
-                        <a:schemeClr val="tx1"/>
-                      </a:solidFill>
-                      <a:prstDash val="solid"/>
-                      <a:round/>
-                      <a:headEnd type="none" w="med" len="med"/>
-                      <a:tailEnd type="none" w="med" len="med"/>
-                    </a:lnB>
-                  </a:tcPr>
-                </a:tc>
-                <a:tc>
-                  <a:txBody>
-                    <a:bodyPr/>
-                    <a:lstStyle/>
-                    <a:p>
-                      <a:r>
-                        <a:rPr lang="en-US" sz="2800" dirty="0"/>
-                        <a:t>No</a:t>
-                      </a:r>
-                    </a:p>
-                  </a:txBody>
-                  <a:tcPr>
-                    <a:lnL w="12700" cap="flat" cmpd="sng" algn="ctr">
-                      <a:solidFill>
-                        <a:schemeClr val="tx1"/>
-                      </a:solidFill>
-                      <a:prstDash val="solid"/>
-                      <a:round/>
-                      <a:headEnd type="none" w="med" len="med"/>
-                      <a:tailEnd type="none" w="med" len="med"/>
-                    </a:lnL>
-                    <a:lnR w="12700" cap="flat" cmpd="sng" algn="ctr">
-                      <a:solidFill>
-                        <a:schemeClr val="tx1"/>
-                      </a:solidFill>
-                      <a:prstDash val="solid"/>
-                      <a:round/>
-                      <a:headEnd type="none" w="med" len="med"/>
-                      <a:tailEnd type="none" w="med" len="med"/>
-                    </a:lnR>
-                    <a:lnT w="12700" cap="flat" cmpd="sng" algn="ctr">
-                      <a:solidFill>
-                        <a:schemeClr val="tx1"/>
-                      </a:solidFill>
-                      <a:prstDash val="solid"/>
-                      <a:round/>
-                      <a:headEnd type="none" w="med" len="med"/>
-                      <a:tailEnd type="none" w="med" len="med"/>
-                    </a:lnT>
-                    <a:lnB w="12700" cap="flat" cmpd="sng" algn="ctr">
-                      <a:solidFill>
-                        <a:schemeClr val="tx1"/>
-                      </a:solidFill>
-                      <a:prstDash val="solid"/>
-                      <a:round/>
-                      <a:headEnd type="none" w="med" len="med"/>
-                      <a:tailEnd type="none" w="med" len="med"/>
-                    </a:lnB>
-                  </a:tcPr>
-                </a:tc>
-                <a:tc>
-                  <a:txBody>
-                    <a:bodyPr/>
-                    <a:lstStyle/>
-                    <a:p>
-                      <a:r>
-                        <a:rPr lang="en-US" sz="2800" dirty="0"/>
-                        <a:t>Local machine</a:t>
-                      </a:r>
-                    </a:p>
-                  </a:txBody>
-                  <a:tcPr>
-                    <a:lnL w="12700" cap="flat" cmpd="sng" algn="ctr">
-                      <a:solidFill>
-                        <a:schemeClr val="tx1"/>
-                      </a:solidFill>
-                      <a:prstDash val="solid"/>
-                      <a:round/>
-                      <a:headEnd type="none" w="med" len="med"/>
-                      <a:tailEnd type="none" w="med" len="med"/>
-                    </a:lnL>
-                    <a:lnR w="12700" cap="flat" cmpd="sng" algn="ctr">
-                      <a:solidFill>
-                        <a:schemeClr val="tx1"/>
-                      </a:solidFill>
-                      <a:prstDash val="solid"/>
-                      <a:round/>
-                      <a:headEnd type="none" w="med" len="med"/>
-                      <a:tailEnd type="none" w="med" len="med"/>
-                    </a:lnR>
-                    <a:lnT w="12700" cap="flat" cmpd="sng" algn="ctr">
-                      <a:solidFill>
-                        <a:schemeClr val="tx1"/>
-                      </a:solidFill>
-                      <a:prstDash val="solid"/>
-                      <a:round/>
-                      <a:headEnd type="none" w="med" len="med"/>
-                      <a:tailEnd type="none" w="med" len="med"/>
-                    </a:lnT>
-                    <a:lnB w="12700" cap="flat" cmpd="sng" algn="ctr">
-                      <a:solidFill>
-                        <a:schemeClr val="tx1"/>
-                      </a:solidFill>
-                      <a:prstDash val="solid"/>
-                      <a:round/>
-                      <a:headEnd type="none" w="med" len="med"/>
-                      <a:tailEnd type="none" w="med" len="med"/>
-                    </a:lnB>
-                  </a:tcPr>
-                </a:tc>
-                <a:extLst>
-                  <a:ext uri="{0D108BD9-81ED-4DB2-BD59-A6C34878D82A}">
-                    <a16:rowId xmlns:a16="http://schemas.microsoft.com/office/drawing/2014/main" val="3600246297"/>
-                  </a:ext>
-                </a:extLst>
-              </a:tr>
-              <a:tr h="370840">
-                <a:tc>
-                  <a:txBody>
-                    <a:bodyPr/>
-                    <a:lstStyle/>
-                    <a:p>
-                      <a:pPr marL="0" marR="0" lvl="0" indent="0" algn="l" defTabSz="914400" rtl="0" eaLnBrk="1" fontAlgn="auto" latinLnBrk="0" hangingPunct="1">
-                        <a:lnSpc>
-                          <a:spcPct val="100000"/>
-                        </a:lnSpc>
-                        <a:spcBef>
-                          <a:spcPts val="0"/>
-                        </a:spcBef>
-                        <a:spcAft>
-                          <a:spcPts val="0"/>
-                        </a:spcAft>
-                        <a:buClrTx/>
-                        <a:buSzTx/>
-                        <a:buFontTx/>
-                        <a:buNone/>
-                        <a:tabLst/>
-                        <a:defRPr/>
-                      </a:pPr>
-                      <a:r>
-                        <a:rPr lang="en-US" sz="2800" b="1" dirty="0"/>
-                        <a:t>Azure Key Vault</a:t>
-                      </a:r>
-                    </a:p>
-                  </a:txBody>
-                  <a:tcPr>
-                    <a:lnL w="12700" cap="flat" cmpd="sng" algn="ctr">
-                      <a:solidFill>
-                        <a:schemeClr val="tx1"/>
-                      </a:solidFill>
-                      <a:prstDash val="solid"/>
-                      <a:round/>
-                      <a:headEnd type="none" w="med" len="med"/>
-                      <a:tailEnd type="none" w="med" len="med"/>
-                    </a:lnL>
-                    <a:lnR w="12700" cap="flat" cmpd="sng" algn="ctr">
-                      <a:solidFill>
-                        <a:schemeClr val="tx1"/>
-                      </a:solidFill>
-                      <a:prstDash val="solid"/>
-                      <a:round/>
-                      <a:headEnd type="none" w="med" len="med"/>
-                      <a:tailEnd type="none" w="med" len="med"/>
-                    </a:lnR>
-                    <a:lnT w="12700" cap="flat" cmpd="sng" algn="ctr">
-                      <a:solidFill>
-                        <a:schemeClr val="tx1"/>
-                      </a:solidFill>
-                      <a:prstDash val="solid"/>
-                      <a:round/>
-                      <a:headEnd type="none" w="med" len="med"/>
-                      <a:tailEnd type="none" w="med" len="med"/>
-                    </a:lnT>
-                    <a:lnB w="12700" cap="flat" cmpd="sng" algn="ctr">
-                      <a:solidFill>
-                        <a:schemeClr val="tx1"/>
-                      </a:solidFill>
-                      <a:prstDash val="solid"/>
-                      <a:round/>
-                      <a:headEnd type="none" w="med" len="med"/>
-                      <a:tailEnd type="none" w="med" len="med"/>
-                    </a:lnB>
-                  </a:tcPr>
-                </a:tc>
-                <a:tc>
-                  <a:txBody>
-                    <a:bodyPr/>
-                    <a:lstStyle/>
-                    <a:p>
-                      <a:r>
-                        <a:rPr lang="en-US" sz="2800" dirty="0"/>
-                        <a:t>All</a:t>
-                      </a:r>
-                    </a:p>
-                  </a:txBody>
-                  <a:tcPr>
-                    <a:lnL w="12700" cap="flat" cmpd="sng" algn="ctr">
-                      <a:solidFill>
-                        <a:schemeClr val="tx1"/>
-                      </a:solidFill>
-                      <a:prstDash val="solid"/>
-                      <a:round/>
-                      <a:headEnd type="none" w="med" len="med"/>
-                      <a:tailEnd type="none" w="med" len="med"/>
-                    </a:lnL>
-                    <a:lnR w="12700" cap="flat" cmpd="sng" algn="ctr">
-                      <a:solidFill>
-                        <a:schemeClr val="tx1"/>
-                      </a:solidFill>
-                      <a:prstDash val="solid"/>
-                      <a:round/>
-                      <a:headEnd type="none" w="med" len="med"/>
-                      <a:tailEnd type="none" w="med" len="med"/>
-                    </a:lnR>
-                    <a:lnT w="12700" cap="flat" cmpd="sng" algn="ctr">
-                      <a:solidFill>
-                        <a:schemeClr val="tx1"/>
-                      </a:solidFill>
-                      <a:prstDash val="solid"/>
-                      <a:round/>
-                      <a:headEnd type="none" w="med" len="med"/>
-                      <a:tailEnd type="none" w="med" len="med"/>
-                    </a:lnT>
-                    <a:lnB w="12700" cap="flat" cmpd="sng" algn="ctr">
-                      <a:solidFill>
-                        <a:schemeClr val="tx1"/>
-                      </a:solidFill>
-                      <a:prstDash val="solid"/>
-                      <a:round/>
-                      <a:headEnd type="none" w="med" len="med"/>
-                      <a:tailEnd type="none" w="med" len="med"/>
-                    </a:lnB>
-                  </a:tcPr>
-                </a:tc>
-                <a:tc>
-                  <a:txBody>
-                    <a:bodyPr/>
-                    <a:lstStyle/>
-                    <a:p>
-                      <a:r>
-                        <a:rPr lang="en-US" sz="2800" dirty="0"/>
-                        <a:t>$0.03 / 10k operations</a:t>
-                      </a:r>
-                    </a:p>
-                  </a:txBody>
-                  <a:tcPr>
-                    <a:lnL w="12700" cap="flat" cmpd="sng" algn="ctr">
-                      <a:solidFill>
-                        <a:schemeClr val="tx1"/>
-                      </a:solidFill>
-                      <a:prstDash val="solid"/>
-                      <a:round/>
-                      <a:headEnd type="none" w="med" len="med"/>
-                      <a:tailEnd type="none" w="med" len="med"/>
-                    </a:lnL>
-                    <a:lnR w="12700" cap="flat" cmpd="sng" algn="ctr">
-                      <a:solidFill>
-                        <a:schemeClr val="tx1"/>
-                      </a:solidFill>
-                      <a:prstDash val="solid"/>
-                      <a:round/>
-                      <a:headEnd type="none" w="med" len="med"/>
-                      <a:tailEnd type="none" w="med" len="med"/>
-                    </a:lnR>
-                    <a:lnT w="12700" cap="flat" cmpd="sng" algn="ctr">
-                      <a:solidFill>
-                        <a:schemeClr val="tx1"/>
-                      </a:solidFill>
-                      <a:prstDash val="solid"/>
-                      <a:round/>
-                      <a:headEnd type="none" w="med" len="med"/>
-                      <a:tailEnd type="none" w="med" len="med"/>
-                    </a:lnT>
-                    <a:lnB w="12700" cap="flat" cmpd="sng" algn="ctr">
-                      <a:solidFill>
-                        <a:schemeClr val="tx1"/>
-                      </a:solidFill>
-                      <a:prstDash val="solid"/>
-                      <a:round/>
-                      <a:headEnd type="none" w="med" len="med"/>
-                      <a:tailEnd type="none" w="med" len="med"/>
-                    </a:lnB>
-                  </a:tcPr>
-                </a:tc>
-                <a:tc>
-                  <a:txBody>
-                    <a:bodyPr/>
-                    <a:lstStyle/>
-                    <a:p>
-                      <a:r>
-                        <a:rPr lang="en-US" sz="2800" dirty="0"/>
-                        <a:t>Yes</a:t>
-                      </a:r>
-                    </a:p>
-                  </a:txBody>
-                  <a:tcPr>
-                    <a:lnL w="12700" cap="flat" cmpd="sng" algn="ctr">
-                      <a:solidFill>
-                        <a:schemeClr val="tx1"/>
-                      </a:solidFill>
-                      <a:prstDash val="solid"/>
-                      <a:round/>
-                      <a:headEnd type="none" w="med" len="med"/>
-                      <a:tailEnd type="none" w="med" len="med"/>
-                    </a:lnL>
-                    <a:lnR w="12700" cap="flat" cmpd="sng" algn="ctr">
-                      <a:solidFill>
-                        <a:schemeClr val="tx1"/>
-                      </a:solidFill>
-                      <a:prstDash val="solid"/>
-                      <a:round/>
-                      <a:headEnd type="none" w="med" len="med"/>
-                      <a:tailEnd type="none" w="med" len="med"/>
-                    </a:lnR>
-                    <a:lnT w="12700" cap="flat" cmpd="sng" algn="ctr">
-                      <a:solidFill>
-                        <a:schemeClr val="tx1"/>
-                      </a:solidFill>
-                      <a:prstDash val="solid"/>
-                      <a:round/>
-                      <a:headEnd type="none" w="med" len="med"/>
-                      <a:tailEnd type="none" w="med" len="med"/>
-                    </a:lnT>
-                    <a:lnB w="12700" cap="flat" cmpd="sng" algn="ctr">
-                      <a:solidFill>
-                        <a:schemeClr val="tx1"/>
-                      </a:solidFill>
-                      <a:prstDash val="solid"/>
-                      <a:round/>
-                      <a:headEnd type="none" w="med" len="med"/>
-                      <a:tailEnd type="none" w="med" len="med"/>
-                    </a:lnB>
-                  </a:tcPr>
-                </a:tc>
-                <a:tc>
-                  <a:txBody>
-                    <a:bodyPr/>
-                    <a:lstStyle/>
-                    <a:p>
-                      <a:r>
-                        <a:rPr lang="en-US" sz="2800" dirty="0"/>
-                        <a:t>Azure Storage</a:t>
-                      </a:r>
-                    </a:p>
-                  </a:txBody>
-                  <a:tcPr>
-                    <a:lnL w="12700" cap="flat" cmpd="sng" algn="ctr">
-                      <a:solidFill>
-                        <a:schemeClr val="tx1"/>
-                      </a:solidFill>
-                      <a:prstDash val="solid"/>
-                      <a:round/>
-                      <a:headEnd type="none" w="med" len="med"/>
-                      <a:tailEnd type="none" w="med" len="med"/>
-                    </a:lnL>
-                    <a:lnR w="12700" cap="flat" cmpd="sng" algn="ctr">
-                      <a:solidFill>
-                        <a:schemeClr val="tx1"/>
-                      </a:solidFill>
-                      <a:prstDash val="solid"/>
-                      <a:round/>
-                      <a:headEnd type="none" w="med" len="med"/>
-                      <a:tailEnd type="none" w="med" len="med"/>
-                    </a:lnR>
-                    <a:lnT w="12700" cap="flat" cmpd="sng" algn="ctr">
-                      <a:solidFill>
-                        <a:schemeClr val="tx1"/>
-                      </a:solidFill>
-                      <a:prstDash val="solid"/>
-                      <a:round/>
-                      <a:headEnd type="none" w="med" len="med"/>
-                      <a:tailEnd type="none" w="med" len="med"/>
-                    </a:lnT>
-                    <a:lnB w="12700" cap="flat" cmpd="sng" algn="ctr">
-                      <a:solidFill>
-                        <a:schemeClr val="tx1"/>
-                      </a:solidFill>
-                      <a:prstDash val="solid"/>
-                      <a:round/>
-                      <a:headEnd type="none" w="med" len="med"/>
-                      <a:tailEnd type="none" w="med" len="med"/>
-                    </a:lnB>
-                  </a:tcPr>
-                </a:tc>
-                <a:extLst>
-                  <a:ext uri="{0D108BD9-81ED-4DB2-BD59-A6C34878D82A}">
-                    <a16:rowId xmlns:a16="http://schemas.microsoft.com/office/drawing/2014/main" val="3242695606"/>
-                  </a:ext>
-                </a:extLst>
-              </a:tr>
-            </a:tbl>
-          </a:graphicData>
-        </a:graphic>
-      </p:graphicFrame>
+              <a:t> </a:t>
+            </a:r>
+          </a:p>
+          <a:p>
+            <a:pPr marL="0" indent="0">
+              <a:buNone/>
+            </a:pPr>
+            <a:r>
+              <a:rPr lang="en-US" dirty="0"/>
+              <a:t>	- or -</a:t>
+            </a:r>
+          </a:p>
+          <a:p>
+            <a:pPr marL="0" indent="0">
+              <a:buNone/>
+            </a:pPr>
+            <a:r>
+              <a:rPr lang="en-US" dirty="0"/>
+              <a:t>Solution Explorer </a:t>
+            </a:r>
+            <a:r>
+              <a:rPr lang="en-US" sz="3500" b="1" dirty="0"/>
+              <a:t>&gt;</a:t>
+            </a:r>
+            <a:r>
+              <a:rPr lang="en-US" dirty="0"/>
+              <a:t> right-click project </a:t>
+            </a:r>
+            <a:r>
+              <a:rPr lang="en-US" sz="3500" b="1" dirty="0"/>
+              <a:t>&gt;</a:t>
+            </a:r>
+            <a:r>
+              <a:rPr lang="en-US" dirty="0"/>
+              <a:t> Manage User Secrets</a:t>
+            </a:r>
+          </a:p>
+        </p:txBody>
+      </p:sp>
     </p:spTree>
     <p:extLst>
       <p:ext uri="{BB962C8B-B14F-4D97-AF65-F5344CB8AC3E}">
-        <p14:creationId xmlns:p14="http://schemas.microsoft.com/office/powerpoint/2010/main" val="2315616826"/>
+        <p14:creationId xmlns:p14="http://schemas.microsoft.com/office/powerpoint/2010/main" val="1291707926"/>
       </p:ext>
     </p:extLst>
   </p:cSld>
   <p:clrMapOvr>
     <a:masterClrMapping/>
   </p:clrMapOvr>
+  <p:timing>
+    <p:tnLst>
+      <p:par>
+        <p:cTn id="1" dur="indefinite" restart="never" nodeType="tmRoot">
+          <p:childTnLst>
+            <p:seq concurrent="1" nextAc="seek">
+              <p:cTn id="2" dur="indefinite" nodeType="mainSeq">
+                <p:childTnLst>
+                  <p:par>
+                    <p:cTn id="3" fill="hold">
+                      <p:stCondLst>
+                        <p:cond delay="indefinite"/>
+                      </p:stCondLst>
+                      <p:childTnLst>
+                        <p:par>
+                          <p:cTn id="4" fill="hold">
+                            <p:stCondLst>
+                              <p:cond delay="0"/>
+                            </p:stCondLst>
+                            <p:childTnLst>
+                              <p:par>
+                                <p:cTn id="5" presetID="1" presetClass="entr" presetSubtype="0" fill="hold" nodeType="clickEffect">
+                                  <p:stCondLst>
+                                    <p:cond delay="0"/>
+                                  </p:stCondLst>
+                                  <p:childTnLst>
+                                    <p:set>
+                                      <p:cBhvr>
+                                        <p:cTn id="6" dur="1" fill="hold">
+                                          <p:stCondLst>
+                                            <p:cond delay="0"/>
+                                          </p:stCondLst>
+                                        </p:cTn>
+                                        <p:tgtEl>
+                                          <p:spTgt spid="3">
+                                            <p:txEl>
+                                              <p:pRg st="1" end="1"/>
+                                            </p:txEl>
+                                          </p:spTgt>
+                                        </p:tgtEl>
+                                        <p:attrNameLst>
+                                          <p:attrName>style.visibility</p:attrName>
+                                        </p:attrNameLst>
+                                      </p:cBhvr>
+                                      <p:to>
+                                        <p:strVal val="visible"/>
+                                      </p:to>
+                                    </p:set>
+                                  </p:childTnLst>
+                                </p:cTn>
+                              </p:par>
+                            </p:childTnLst>
+                          </p:cTn>
+                        </p:par>
+                      </p:childTnLst>
+                    </p:cTn>
+                  </p:par>
+                  <p:par>
+                    <p:cTn id="7" fill="hold">
+                      <p:stCondLst>
+                        <p:cond delay="indefinite"/>
+                      </p:stCondLst>
+                      <p:childTnLst>
+                        <p:par>
+                          <p:cTn id="8" fill="hold">
+                            <p:stCondLst>
+                              <p:cond delay="0"/>
+                            </p:stCondLst>
+                            <p:childTnLst>
+                              <p:par>
+                                <p:cTn id="9" presetID="1" presetClass="entr" presetSubtype="0" fill="hold" nodeType="clickEffect">
+                                  <p:stCondLst>
+                                    <p:cond delay="0"/>
+                                  </p:stCondLst>
+                                  <p:childTnLst>
+                                    <p:set>
+                                      <p:cBhvr>
+                                        <p:cTn id="10" dur="1" fill="hold">
+                                          <p:stCondLst>
+                                            <p:cond delay="0"/>
+                                          </p:stCondLst>
+                                        </p:cTn>
+                                        <p:tgtEl>
+                                          <p:spTgt spid="3">
+                                            <p:txEl>
+                                              <p:pRg st="2" end="2"/>
+                                            </p:txEl>
+                                          </p:spTgt>
+                                        </p:tgtEl>
+                                        <p:attrNameLst>
+                                          <p:attrName>style.visibility</p:attrName>
+                                        </p:attrNameLst>
+                                      </p:cBhvr>
+                                      <p:to>
+                                        <p:strVal val="visible"/>
+                                      </p:to>
+                                    </p:set>
+                                  </p:childTnLst>
+                                </p:cTn>
+                              </p:par>
+                              <p:par>
+                                <p:cTn id="11" presetID="1" presetClass="entr" presetSubtype="0" fill="hold" nodeType="withEffect">
+                                  <p:stCondLst>
+                                    <p:cond delay="0"/>
+                                  </p:stCondLst>
+                                  <p:childTnLst>
+                                    <p:set>
+                                      <p:cBhvr>
+                                        <p:cTn id="12" dur="1" fill="hold">
+                                          <p:stCondLst>
+                                            <p:cond delay="0"/>
+                                          </p:stCondLst>
+                                        </p:cTn>
+                                        <p:tgtEl>
+                                          <p:spTgt spid="3">
+                                            <p:txEl>
+                                              <p:pRg st="3" end="3"/>
+                                            </p:txEl>
+                                          </p:spTgt>
+                                        </p:tgtEl>
+                                        <p:attrNameLst>
+                                          <p:attrName>style.visibility</p:attrName>
+                                        </p:attrNameLst>
+                                      </p:cBhvr>
+                                      <p:to>
+                                        <p:strVal val="visible"/>
+                                      </p:to>
+                                    </p:set>
+                                  </p:childTnLst>
+                                </p:cTn>
+                              </p:par>
+                              <p:par>
+                                <p:cTn id="13" presetID="1" presetClass="entr" presetSubtype="0" fill="hold" nodeType="withEffect">
+                                  <p:stCondLst>
+                                    <p:cond delay="0"/>
+                                  </p:stCondLst>
+                                  <p:childTnLst>
+                                    <p:set>
+                                      <p:cBhvr>
+                                        <p:cTn id="14" dur="1" fill="hold">
+                                          <p:stCondLst>
+                                            <p:cond delay="0"/>
+                                          </p:stCondLst>
+                                        </p:cTn>
+                                        <p:tgtEl>
+                                          <p:spTgt spid="3">
+                                            <p:txEl>
+                                              <p:pRg st="4" end="4"/>
+                                            </p:txEl>
+                                          </p:spTgt>
+                                        </p:tgtEl>
+                                        <p:attrNameLst>
+                                          <p:attrName>style.visibility</p:attrName>
+                                        </p:attrNameLst>
+                                      </p:cBhvr>
+                                      <p:to>
+                                        <p:strVal val="visible"/>
+                                      </p:to>
+                                    </p:set>
+                                  </p:childTnLst>
+                                </p:cTn>
+                              </p:par>
+                            </p:childTnLst>
+                          </p:cTn>
+                        </p:par>
+                      </p:childTnLst>
+                    </p:cTn>
+                  </p:par>
+                  <p:par>
+                    <p:cTn id="15" fill="hold">
+                      <p:stCondLst>
+                        <p:cond delay="indefinite"/>
+                      </p:stCondLst>
+                      <p:childTnLst>
+                        <p:par>
+                          <p:cTn id="16" fill="hold">
+                            <p:stCondLst>
+                              <p:cond delay="0"/>
+                            </p:stCondLst>
+                            <p:childTnLst>
+                              <p:par>
+                                <p:cTn id="17" presetID="1" presetClass="entr" presetSubtype="0" fill="hold" nodeType="clickEffect">
+                                  <p:stCondLst>
+                                    <p:cond delay="0"/>
+                                  </p:stCondLst>
+                                  <p:childTnLst>
+                                    <p:set>
+                                      <p:cBhvr>
+                                        <p:cTn id="18" dur="1" fill="hold">
+                                          <p:stCondLst>
+                                            <p:cond delay="0"/>
+                                          </p:stCondLst>
+                                        </p:cTn>
+                                        <p:tgtEl>
+                                          <p:spTgt spid="3">
+                                            <p:txEl>
+                                              <p:pRg st="6" end="6"/>
+                                            </p:txEl>
+                                          </p:spTgt>
+                                        </p:tgtEl>
+                                        <p:attrNameLst>
+                                          <p:attrName>style.visibility</p:attrName>
+                                        </p:attrNameLst>
+                                      </p:cBhvr>
+                                      <p:to>
+                                        <p:strVal val="visible"/>
+                                      </p:to>
+                                    </p:set>
+                                  </p:childTnLst>
+                                </p:cTn>
+                              </p:par>
+                              <p:par>
+                                <p:cTn id="19" presetID="1" presetClass="entr" presetSubtype="0" fill="hold" nodeType="withEffect">
+                                  <p:stCondLst>
+                                    <p:cond delay="0"/>
+                                  </p:stCondLst>
+                                  <p:childTnLst>
+                                    <p:set>
+                                      <p:cBhvr>
+                                        <p:cTn id="20" dur="1" fill="hold">
+                                          <p:stCondLst>
+                                            <p:cond delay="0"/>
+                                          </p:stCondLst>
+                                        </p:cTn>
+                                        <p:tgtEl>
+                                          <p:spTgt spid="3">
+                                            <p:txEl>
+                                              <p:pRg st="7" end="7"/>
+                                            </p:txEl>
+                                          </p:spTgt>
+                                        </p:tgtEl>
+                                        <p:attrNameLst>
+                                          <p:attrName>style.visibility</p:attrName>
+                                        </p:attrNameLst>
+                                      </p:cBhvr>
+                                      <p:to>
+                                        <p:strVal val="visible"/>
+                                      </p:to>
+                                    </p:set>
+                                  </p:childTnLst>
+                                </p:cTn>
+                              </p:par>
+                            </p:childTnLst>
+                          </p:cTn>
+                        </p:par>
+                      </p:childTnLst>
+                    </p:cTn>
+                  </p:par>
+                  <p:par>
+                    <p:cTn id="21" fill="hold">
+                      <p:stCondLst>
+                        <p:cond delay="indefinite"/>
+                      </p:stCondLst>
+                      <p:childTnLst>
+                        <p:par>
+                          <p:cTn id="22" fill="hold">
+                            <p:stCondLst>
+                              <p:cond delay="0"/>
+                            </p:stCondLst>
+                            <p:childTnLst>
+                              <p:par>
+                                <p:cTn id="23" presetID="1" presetClass="entr" presetSubtype="0" fill="hold" nodeType="clickEffect">
+                                  <p:stCondLst>
+                                    <p:cond delay="0"/>
+                                  </p:stCondLst>
+                                  <p:childTnLst>
+                                    <p:set>
+                                      <p:cBhvr>
+                                        <p:cTn id="24" dur="1" fill="hold">
+                                          <p:stCondLst>
+                                            <p:cond delay="0"/>
+                                          </p:stCondLst>
+                                        </p:cTn>
+                                        <p:tgtEl>
+                                          <p:spTgt spid="3">
+                                            <p:txEl>
+                                              <p:pRg st="8" end="8"/>
+                                            </p:txEl>
+                                          </p:spTgt>
+                                        </p:tgtEl>
+                                        <p:attrNameLst>
+                                          <p:attrName>style.visibility</p:attrName>
+                                        </p:attrNameLst>
+                                      </p:cBhvr>
+                                      <p:to>
+                                        <p:strVal val="visible"/>
+                                      </p:to>
+                                    </p:set>
+                                  </p:childTnLst>
+                                </p:cTn>
+                              </p:par>
+                              <p:par>
+                                <p:cTn id="25" presetID="1" presetClass="entr" presetSubtype="0" fill="hold" nodeType="withEffect">
+                                  <p:stCondLst>
+                                    <p:cond delay="0"/>
+                                  </p:stCondLst>
+                                  <p:childTnLst>
+                                    <p:set>
+                                      <p:cBhvr>
+                                        <p:cTn id="26" dur="1" fill="hold">
+                                          <p:stCondLst>
+                                            <p:cond delay="0"/>
+                                          </p:stCondLst>
+                                        </p:cTn>
+                                        <p:tgtEl>
+                                          <p:spTgt spid="3">
+                                            <p:txEl>
+                                              <p:pRg st="9" end="9"/>
+                                            </p:txEl>
+                                          </p:spTgt>
+                                        </p:tgtEl>
+                                        <p:attrNameLst>
+                                          <p:attrName>style.visibility</p:attrName>
+                                        </p:attrNameLst>
+                                      </p:cBhvr>
+                                      <p:to>
+                                        <p:strVal val="visible"/>
+                                      </p:to>
+                                    </p:set>
+                                  </p:childTnLst>
+                                </p:cTn>
+                              </p:par>
+                            </p:childTnLst>
+                          </p:cTn>
+                        </p:par>
+                      </p:childTnLst>
+                    </p:cTn>
+                  </p:par>
+                </p:childTnLst>
+              </p:cTn>
+              <p:prevCondLst>
+                <p:cond evt="onPrev" delay="0">
+                  <p:tgtEl>
+                    <p:sldTgt/>
+                  </p:tgtEl>
+                </p:cond>
+              </p:prevCondLst>
+              <p:nextCondLst>
+                <p:cond evt="onNext" delay="0">
+                  <p:tgtEl>
+                    <p:sldTgt/>
+                  </p:tgtEl>
+                </p:cond>
+              </p:nextCondLst>
+            </p:seq>
+          </p:childTnLst>
+        </p:cTn>
+      </p:par>
+    </p:tnLst>
+  </p:timing>
 </p:sld>
 </file>
 
@@ -13004,7 +14144,7 @@
           <a:p>
             <a:r>
               <a:rPr lang="en-US" dirty="0"/>
-              <a:t>Secret Manager</a:t>
+              <a:t>Secret Manager: .NET Core CLI</a:t>
             </a:r>
           </a:p>
         </p:txBody>
@@ -13024,46 +14164,1000 @@
           <a:bodyPr/>
           <a:lstStyle/>
           <a:p>
-            <a:r>
-              <a:rPr lang="en-US" dirty="0"/>
-              <a:t>dotnet user-secrets </a:t>
-            </a:r>
-          </a:p>
-          <a:p>
-            <a:r>
-              <a:rPr lang="en-US" dirty="0"/>
-              <a:t>Solution Explorer &gt; right-click project &gt; Manage User Secrets</a:t>
-            </a:r>
-          </a:p>
-          <a:p>
-            <a:r>
-              <a:rPr lang="en-US" dirty="0"/>
-              <a:t>.NET Core only feature (before VS 15.8) (</a:t>
-            </a:r>
-            <a:r>
-              <a:rPr lang="en-US" i="1" dirty="0" err="1"/>
-              <a:t>secrets.json</a:t>
-            </a:r>
-            <a:r>
-              <a:rPr lang="en-US" dirty="0"/>
-              <a:t>)</a:t>
-            </a:r>
-          </a:p>
-          <a:p>
-            <a:r>
-              <a:rPr lang="en-US" dirty="0"/>
-              <a:t>15.8 adds support for .NET Framework projects (</a:t>
-            </a:r>
-            <a:r>
-              <a:rPr lang="en-US" i="1" dirty="0"/>
-              <a:t>secrets.xml</a:t>
-            </a:r>
-            <a:r>
-              <a:rPr lang="en-US" dirty="0"/>
-              <a:t>)</a:t>
-            </a:r>
-          </a:p>
-          <a:p>
+            <a:pPr marL="0" indent="0">
+              <a:buNone/>
+            </a:pPr>
+            <a:r>
+              <a:rPr lang="en-US" sz="2400" b="1" dirty="0">
+                <a:latin typeface="Courier New" panose="02070309020205020404" pitchFamily="49" charset="0"/>
+                <a:cs typeface="Courier New" panose="02070309020205020404" pitchFamily="49" charset="0"/>
+              </a:rPr>
+              <a:t>&gt; </a:t>
+            </a:r>
+            <a:r>
+              <a:rPr lang="en-US" sz="2400" dirty="0">
+                <a:latin typeface="Courier New" panose="02070309020205020404" pitchFamily="49" charset="0"/>
+                <a:cs typeface="Courier New" panose="02070309020205020404" pitchFamily="49" charset="0"/>
+              </a:rPr>
+              <a:t>dotnet user-secrets set “</a:t>
+            </a:r>
+            <a:r>
+              <a:rPr lang="en-US" sz="2400" dirty="0" err="1">
+                <a:latin typeface="Courier New" panose="02070309020205020404" pitchFamily="49" charset="0"/>
+                <a:cs typeface="Courier New" panose="02070309020205020404" pitchFamily="49" charset="0"/>
+              </a:rPr>
+              <a:t>Movies:Password</a:t>
+            </a:r>
+            <a:r>
+              <a:rPr lang="en-US" sz="2400" dirty="0">
+                <a:latin typeface="Courier New" panose="02070309020205020404" pitchFamily="49" charset="0"/>
+                <a:cs typeface="Courier New" panose="02070309020205020404" pitchFamily="49" charset="0"/>
+              </a:rPr>
+              <a:t>” “pass123”</a:t>
+            </a:r>
+          </a:p>
+          <a:p>
+            <a:pPr marL="0" indent="0">
+              <a:buNone/>
+            </a:pPr>
+            <a:r>
+              <a:rPr lang="en-US" sz="2400" b="1" dirty="0">
+                <a:latin typeface="Courier New" panose="02070309020205020404" pitchFamily="49" charset="0"/>
+                <a:cs typeface="Courier New" panose="02070309020205020404" pitchFamily="49" charset="0"/>
+              </a:rPr>
+              <a:t>&gt; </a:t>
+            </a:r>
+            <a:r>
+              <a:rPr lang="en-US" sz="2400" dirty="0">
+                <a:latin typeface="Courier New" panose="02070309020205020404" pitchFamily="49" charset="0"/>
+                <a:cs typeface="Courier New" panose="02070309020205020404" pitchFamily="49" charset="0"/>
+              </a:rPr>
+              <a:t>dotnet user-secrets set “</a:t>
+            </a:r>
+            <a:r>
+              <a:rPr lang="en-US" sz="2400" dirty="0" err="1">
+                <a:latin typeface="Courier New" panose="02070309020205020404" pitchFamily="49" charset="0"/>
+                <a:cs typeface="Courier New" panose="02070309020205020404" pitchFamily="49" charset="0"/>
+              </a:rPr>
+              <a:t>Movies:User</a:t>
+            </a:r>
+            <a:r>
+              <a:rPr lang="en-US" sz="2400" dirty="0">
+                <a:latin typeface="Courier New" panose="02070309020205020404" pitchFamily="49" charset="0"/>
+                <a:cs typeface="Courier New" panose="02070309020205020404" pitchFamily="49" charset="0"/>
+              </a:rPr>
+              <a:t>” “</a:t>
+            </a:r>
+            <a:r>
+              <a:rPr lang="en-US" sz="2400" dirty="0" err="1">
+                <a:latin typeface="Courier New" panose="02070309020205020404" pitchFamily="49" charset="0"/>
+                <a:cs typeface="Courier New" panose="02070309020205020404" pitchFamily="49" charset="0"/>
+              </a:rPr>
+              <a:t>johndoe</a:t>
+            </a:r>
+            <a:r>
+              <a:rPr lang="en-US" sz="2400" dirty="0">
+                <a:latin typeface="Courier New" panose="02070309020205020404" pitchFamily="49" charset="0"/>
+                <a:cs typeface="Courier New" panose="02070309020205020404" pitchFamily="49" charset="0"/>
+              </a:rPr>
+              <a:t>”</a:t>
+            </a:r>
+            <a:endParaRPr lang="en-US" dirty="0">
+              <a:latin typeface="Courier New" panose="02070309020205020404" pitchFamily="49" charset="0"/>
+              <a:cs typeface="Courier New" panose="02070309020205020404" pitchFamily="49" charset="0"/>
+            </a:endParaRPr>
+          </a:p>
+          <a:p>
+            <a:pPr marL="0" indent="0">
+              <a:buNone/>
+            </a:pPr>
+            <a:endParaRPr lang="en-US" b="1" dirty="0">
+              <a:latin typeface="Courier New" panose="02070309020205020404" pitchFamily="49" charset="0"/>
+              <a:cs typeface="Courier New" panose="02070309020205020404" pitchFamily="49" charset="0"/>
+            </a:endParaRPr>
+          </a:p>
+        </p:txBody>
+      </p:sp>
+      <p:sp>
+        <p:nvSpPr>
+          <p:cNvPr id="12" name="Rounded Rectangle 34">
+            <a:extLst>
+              <a:ext uri="{FF2B5EF4-FFF2-40B4-BE49-F238E27FC236}">
+                <a16:creationId xmlns:a16="http://schemas.microsoft.com/office/drawing/2014/main" id="{077CB370-22FE-4090-AAD0-2DF355C68841}"/>
+              </a:ext>
+            </a:extLst>
+          </p:cNvPr>
+          <p:cNvSpPr/>
+          <p:nvPr/>
+        </p:nvSpPr>
+        <p:spPr>
+          <a:xfrm>
+            <a:off x="1083272" y="3429000"/>
+            <a:ext cx="9062157" cy="691116"/>
+          </a:xfrm>
+          <a:prstGeom prst="roundRect">
+            <a:avLst/>
+          </a:prstGeom>
+          <a:solidFill>
+            <a:schemeClr val="bg2"/>
+          </a:solidFill>
+        </p:spPr>
+        <p:style>
+          <a:lnRef idx="2">
+            <a:schemeClr val="accent1">
+              <a:shade val="50000"/>
+            </a:schemeClr>
+          </a:lnRef>
+          <a:fillRef idx="1">
+            <a:schemeClr val="accent1"/>
+          </a:fillRef>
+          <a:effectRef idx="0">
+            <a:schemeClr val="accent1"/>
+          </a:effectRef>
+          <a:fontRef idx="minor">
+            <a:schemeClr val="lt1"/>
+          </a:fontRef>
+        </p:style>
+        <p:txBody>
+          <a:bodyPr rtlCol="0" anchor="ctr"/>
+          <a:lstStyle/>
+          <a:p>
+            <a:pPr marL="0" marR="0" lvl="0" indent="0" algn="l" defTabSz="457200" rtl="0" eaLnBrk="1" fontAlgn="auto" latinLnBrk="0" hangingPunct="1">
+              <a:lnSpc>
+                <a:spcPct val="100000"/>
+              </a:lnSpc>
+              <a:spcBef>
+                <a:spcPts val="0"/>
+              </a:spcBef>
+              <a:spcAft>
+                <a:spcPts val="0"/>
+              </a:spcAft>
+              <a:buClrTx/>
+              <a:buSzTx/>
+              <a:buFontTx/>
+              <a:buNone/>
+              <a:tabLst/>
+              <a:defRPr/>
+            </a:pPr>
+            <a:endParaRPr kumimoji="0" lang="en-US" sz="1600" b="1" i="0" u="none" strike="noStrike" kern="1200" cap="none" spc="0" normalizeH="0" baseline="0" noProof="0" dirty="0">
+              <a:ln>
+                <a:noFill/>
+              </a:ln>
+              <a:solidFill>
+                <a:prstClr val="white"/>
+              </a:solidFill>
+              <a:effectLst/>
+              <a:uLnTx/>
+              <a:uFillTx/>
+              <a:latin typeface="Segoe UI Light"/>
+              <a:ea typeface="+mn-ea"/>
+              <a:cs typeface="+mn-cs"/>
+            </a:endParaRPr>
+          </a:p>
+        </p:txBody>
+      </p:sp>
+      <p:pic>
+        <p:nvPicPr>
+          <p:cNvPr id="13" name="Picture 2" descr="http://files.softicons.com/download/system-icons/windows-8-metro-icons-by-dakirby309/png/512x512/Folders%20&amp;%20OS/Linux.png">
+            <a:extLst>
+              <a:ext uri="{FF2B5EF4-FFF2-40B4-BE49-F238E27FC236}">
+                <a16:creationId xmlns:a16="http://schemas.microsoft.com/office/drawing/2014/main" id="{38C17031-0BA0-4706-8ED9-57F2EB289A8A}"/>
+              </a:ext>
+            </a:extLst>
+          </p:cNvPr>
+          <p:cNvPicPr>
+            <a:picLocks noChangeAspect="1" noChangeArrowheads="1"/>
+          </p:cNvPicPr>
+          <p:nvPr/>
+        </p:nvPicPr>
+        <p:blipFill>
+          <a:blip r:embed="rId3" cstate="print">
+            <a:extLst>
+              <a:ext uri="{BEBA8EAE-BF5A-486C-A8C5-ECC9F3942E4B}">
+                <a14:imgProps xmlns:a14="http://schemas.microsoft.com/office/drawing/2010/main">
+                  <a14:imgLayer r:embed="rId4">
+                    <a14:imgEffect>
+                      <a14:backgroundRemoval t="10000" b="90000" l="10000" r="90000"/>
+                    </a14:imgEffect>
+                  </a14:imgLayer>
+                </a14:imgProps>
+              </a:ext>
+              <a:ext uri="{28A0092B-C50C-407E-A947-70E740481C1C}">
+                <a14:useLocalDpi xmlns:a14="http://schemas.microsoft.com/office/drawing/2010/main" val="0"/>
+              </a:ext>
+            </a:extLst>
+          </a:blip>
+          <a:srcRect/>
+          <a:stretch>
+            <a:fillRect/>
+          </a:stretch>
+        </p:blipFill>
+        <p:spPr bwMode="auto">
+          <a:xfrm>
+            <a:off x="1180650" y="3556720"/>
+            <a:ext cx="507863" cy="498593"/>
+          </a:xfrm>
+          <a:prstGeom prst="rect">
+            <a:avLst/>
+          </a:prstGeom>
+          <a:noFill/>
+          <a:extLst>
+            <a:ext uri="{909E8E84-426E-40DD-AFC4-6F175D3DCCD1}">
+              <a14:hiddenFill xmlns:a14="http://schemas.microsoft.com/office/drawing/2010/main">
+                <a:solidFill>
+                  <a:srgbClr val="FFFFFF"/>
+                </a:solidFill>
+              </a14:hiddenFill>
+            </a:ext>
+          </a:extLst>
+        </p:spPr>
+      </p:pic>
+      <p:pic>
+        <p:nvPicPr>
+          <p:cNvPr id="14" name="Picture 13">
+            <a:extLst>
+              <a:ext uri="{FF2B5EF4-FFF2-40B4-BE49-F238E27FC236}">
+                <a16:creationId xmlns:a16="http://schemas.microsoft.com/office/drawing/2014/main" id="{0046F8F4-4512-484A-933F-4FCFDDCDC868}"/>
+              </a:ext>
+            </a:extLst>
+          </p:cNvPr>
+          <p:cNvPicPr>
+            <a:picLocks noChangeAspect="1"/>
+          </p:cNvPicPr>
+          <p:nvPr/>
+        </p:nvPicPr>
+        <p:blipFill>
+          <a:blip r:embed="rId5" cstate="print">
+            <a:lum bright="70000" contrast="-70000"/>
+            <a:extLst>
+              <a:ext uri="{28A0092B-C50C-407E-A947-70E740481C1C}">
+                <a14:useLocalDpi xmlns:a14="http://schemas.microsoft.com/office/drawing/2010/main" val="0"/>
+              </a:ext>
+            </a:extLst>
+          </a:blip>
+          <a:stretch>
+            <a:fillRect/>
+          </a:stretch>
+        </p:blipFill>
+        <p:spPr>
+          <a:xfrm>
+            <a:off x="1681865" y="3556720"/>
+            <a:ext cx="385752" cy="454164"/>
+          </a:xfrm>
+          <a:prstGeom prst="rect">
+            <a:avLst/>
+          </a:prstGeom>
+        </p:spPr>
+      </p:pic>
+      <p:pic>
+        <p:nvPicPr>
+          <p:cNvPr id="15" name="Picture 6" descr="C:\temp\WinAzure_rgb_Wht_S.png">
+            <a:extLst>
+              <a:ext uri="{FF2B5EF4-FFF2-40B4-BE49-F238E27FC236}">
+                <a16:creationId xmlns:a16="http://schemas.microsoft.com/office/drawing/2014/main" id="{9E236C65-B717-4E03-A30D-5799CF2DF5E1}"/>
+              </a:ext>
+            </a:extLst>
+          </p:cNvPr>
+          <p:cNvPicPr>
+            <a:picLocks noChangeAspect="1" noChangeArrowheads="1"/>
+          </p:cNvPicPr>
+          <p:nvPr/>
+        </p:nvPicPr>
+        <p:blipFill rotWithShape="1">
+          <a:blip r:embed="rId6" cstate="print">
+            <a:extLst>
+              <a:ext uri="{28A0092B-C50C-407E-A947-70E740481C1C}">
+                <a14:useLocalDpi xmlns:a14="http://schemas.microsoft.com/office/drawing/2010/main" val="0"/>
+              </a:ext>
+            </a:extLst>
+          </a:blip>
+          <a:srcRect l="3371" t="15460" r="80628" b="15496"/>
+          <a:stretch/>
+        </p:blipFill>
+        <p:spPr bwMode="auto">
+          <a:xfrm>
+            <a:off x="5297712" y="3568233"/>
+            <a:ext cx="455848" cy="462964"/>
+          </a:xfrm>
+          <a:prstGeom prst="rect">
+            <a:avLst/>
+          </a:prstGeom>
+          <a:noFill/>
+          <a:extLst>
+            <a:ext uri="{909E8E84-426E-40DD-AFC4-6F175D3DCCD1}">
+              <a14:hiddenFill xmlns:a14="http://schemas.microsoft.com/office/drawing/2010/main">
+                <a:solidFill>
+                  <a:srgbClr val="FFFFFF"/>
+                </a:solidFill>
+              </a14:hiddenFill>
+            </a:ext>
+          </a:extLst>
+        </p:spPr>
+      </p:pic>
+      <p:cxnSp>
+        <p:nvCxnSpPr>
+          <p:cNvPr id="16" name="Straight Connector 15">
+            <a:extLst>
+              <a:ext uri="{FF2B5EF4-FFF2-40B4-BE49-F238E27FC236}">
+                <a16:creationId xmlns:a16="http://schemas.microsoft.com/office/drawing/2014/main" id="{F14BE7E3-F985-4FC4-8D5C-A84E7CB244A3}"/>
+              </a:ext>
+            </a:extLst>
+          </p:cNvPr>
+          <p:cNvCxnSpPr>
+            <a:cxnSpLocks/>
+          </p:cNvCxnSpPr>
+          <p:nvPr/>
+        </p:nvCxnSpPr>
+        <p:spPr>
+          <a:xfrm>
+            <a:off x="5211002" y="3437725"/>
+            <a:ext cx="0" cy="670439"/>
+          </a:xfrm>
+          <a:prstGeom prst="line">
+            <a:avLst/>
+          </a:prstGeom>
+          <a:ln>
+            <a:solidFill>
+              <a:schemeClr val="tx1"/>
+            </a:solidFill>
+          </a:ln>
+        </p:spPr>
+        <p:style>
+          <a:lnRef idx="3">
+            <a:schemeClr val="dk1"/>
+          </a:lnRef>
+          <a:fillRef idx="0">
+            <a:schemeClr val="dk1"/>
+          </a:fillRef>
+          <a:effectRef idx="2">
+            <a:schemeClr val="dk1"/>
+          </a:effectRef>
+          <a:fontRef idx="minor">
+            <a:schemeClr val="tx1"/>
+          </a:fontRef>
+        </p:style>
+      </p:cxnSp>
+      <p:sp>
+        <p:nvSpPr>
+          <p:cNvPr id="19" name="TextBox 18">
+            <a:extLst>
+              <a:ext uri="{FF2B5EF4-FFF2-40B4-BE49-F238E27FC236}">
+                <a16:creationId xmlns:a16="http://schemas.microsoft.com/office/drawing/2014/main" id="{8FFD9B3F-F792-46B2-9774-C75647C484FD}"/>
+              </a:ext>
+            </a:extLst>
+          </p:cNvPr>
+          <p:cNvSpPr txBox="1"/>
+          <p:nvPr/>
+        </p:nvSpPr>
+        <p:spPr>
+          <a:xfrm>
+            <a:off x="2061716" y="3610578"/>
+            <a:ext cx="3864488" cy="369332"/>
+          </a:xfrm>
+          <a:prstGeom prst="rect">
+            <a:avLst/>
+          </a:prstGeom>
+          <a:noFill/>
+        </p:spPr>
+        <p:txBody>
+          <a:bodyPr wrap="square" rtlCol="0">
+            <a:spAutoFit/>
+          </a:bodyPr>
+          <a:lstStyle/>
+          <a:p>
+            <a:r>
+              <a:rPr lang="en-US" b="1" dirty="0"/>
+              <a:t>~/.</a:t>
+            </a:r>
+            <a:r>
+              <a:rPr lang="en-US" b="1" dirty="0" err="1"/>
+              <a:t>microsoft</a:t>
+            </a:r>
+            <a:r>
+              <a:rPr lang="en-US" b="1" dirty="0"/>
+              <a:t>/</a:t>
+            </a:r>
+            <a:r>
+              <a:rPr lang="en-US" b="1" dirty="0" err="1"/>
+              <a:t>usersecrets</a:t>
+            </a:r>
+            <a:r>
+              <a:rPr lang="en-US" b="1" dirty="0"/>
+              <a:t>/&lt;id&gt;/</a:t>
+            </a:r>
+          </a:p>
+        </p:txBody>
+      </p:sp>
+      <p:sp>
+        <p:nvSpPr>
+          <p:cNvPr id="20" name="TextBox 19">
+            <a:extLst>
+              <a:ext uri="{FF2B5EF4-FFF2-40B4-BE49-F238E27FC236}">
+                <a16:creationId xmlns:a16="http://schemas.microsoft.com/office/drawing/2014/main" id="{36B146A5-2A1D-4338-A475-43BF6F17EBA0}"/>
+              </a:ext>
+            </a:extLst>
+          </p:cNvPr>
+          <p:cNvSpPr txBox="1"/>
+          <p:nvPr/>
+        </p:nvSpPr>
+        <p:spPr>
+          <a:xfrm>
+            <a:off x="5803635" y="3638222"/>
+            <a:ext cx="4286576" cy="369332"/>
+          </a:xfrm>
+          <a:prstGeom prst="rect">
+            <a:avLst/>
+          </a:prstGeom>
+          <a:noFill/>
+        </p:spPr>
+        <p:txBody>
+          <a:bodyPr wrap="square" rtlCol="0">
+            <a:spAutoFit/>
+          </a:bodyPr>
+          <a:lstStyle/>
+          <a:p>
+            <a:r>
+              <a:rPr lang="en-US" b="1" dirty="0"/>
+              <a:t>%APPDATA%\Microsoft\</a:t>
+            </a:r>
+            <a:r>
+              <a:rPr lang="en-US" b="1" dirty="0" err="1"/>
+              <a:t>UserSecrets</a:t>
+            </a:r>
+            <a:r>
+              <a:rPr lang="en-US" b="1" dirty="0"/>
+              <a:t>\&lt;id&gt;\</a:t>
+            </a:r>
+          </a:p>
+        </p:txBody>
+      </p:sp>
+      <p:graphicFrame>
+        <p:nvGraphicFramePr>
+          <p:cNvPr id="24" name="Table 23">
+            <a:extLst>
+              <a:ext uri="{FF2B5EF4-FFF2-40B4-BE49-F238E27FC236}">
+                <a16:creationId xmlns:a16="http://schemas.microsoft.com/office/drawing/2014/main" id="{67C1FFF0-174A-454A-90B0-BBEC81F03940}"/>
+              </a:ext>
+            </a:extLst>
+          </p:cNvPr>
+          <p:cNvGraphicFramePr>
+            <a:graphicFrameLocks noGrp="1"/>
+          </p:cNvGraphicFramePr>
+          <p:nvPr>
+            <p:extLst>
+              <p:ext uri="{D42A27DB-BD31-4B8C-83A1-F6EECF244321}">
+                <p14:modId xmlns:p14="http://schemas.microsoft.com/office/powerpoint/2010/main" val="30356997"/>
+              </p:ext>
+            </p:extLst>
+          </p:nvPr>
+        </p:nvGraphicFramePr>
+        <p:xfrm>
+          <a:off x="2932563" y="5304335"/>
+          <a:ext cx="4556877" cy="1310640"/>
+        </p:xfrm>
+        <a:graphic>
+          <a:graphicData uri="http://schemas.openxmlformats.org/drawingml/2006/table">
+            <a:tbl>
+              <a:tblPr firstRow="1" bandRow="1"/>
+              <a:tblGrid>
+                <a:gridCol w="4556877">
+                  <a:extLst>
+                    <a:ext uri="{9D8B030D-6E8A-4147-A177-3AD203B41FA5}">
+                      <a16:colId xmlns:a16="http://schemas.microsoft.com/office/drawing/2014/main" val="1057070397"/>
+                    </a:ext>
+                  </a:extLst>
+                </a:gridCol>
+              </a:tblGrid>
+              <a:tr h="584446">
+                <a:tc>
+                  <a:txBody>
+                    <a:bodyPr/>
+                    <a:lstStyle>
+                      <a:lvl1pPr marL="0" algn="l" defTabSz="914400" rtl="0" eaLnBrk="1" latinLnBrk="0" hangingPunct="1">
+                        <a:defRPr sz="1800" b="1" kern="1200">
+                          <a:solidFill>
+                            <a:schemeClr val="lt1"/>
+                          </a:solidFill>
+                          <a:latin typeface="Segoe UI Light"/>
+                        </a:defRPr>
+                      </a:lvl1pPr>
+                      <a:lvl2pPr marL="457200" algn="l" defTabSz="914400" rtl="0" eaLnBrk="1" latinLnBrk="0" hangingPunct="1">
+                        <a:defRPr sz="1800" b="1" kern="1200">
+                          <a:solidFill>
+                            <a:schemeClr val="lt1"/>
+                          </a:solidFill>
+                          <a:latin typeface="Segoe UI Light"/>
+                        </a:defRPr>
+                      </a:lvl2pPr>
+                      <a:lvl3pPr marL="914400" algn="l" defTabSz="914400" rtl="0" eaLnBrk="1" latinLnBrk="0" hangingPunct="1">
+                        <a:defRPr sz="1800" b="1" kern="1200">
+                          <a:solidFill>
+                            <a:schemeClr val="lt1"/>
+                          </a:solidFill>
+                          <a:latin typeface="Segoe UI Light"/>
+                        </a:defRPr>
+                      </a:lvl3pPr>
+                      <a:lvl4pPr marL="1371600" algn="l" defTabSz="914400" rtl="0" eaLnBrk="1" latinLnBrk="0" hangingPunct="1">
+                        <a:defRPr sz="1800" b="1" kern="1200">
+                          <a:solidFill>
+                            <a:schemeClr val="lt1"/>
+                          </a:solidFill>
+                          <a:latin typeface="Segoe UI Light"/>
+                        </a:defRPr>
+                      </a:lvl4pPr>
+                      <a:lvl5pPr marL="1828800" algn="l" defTabSz="914400" rtl="0" eaLnBrk="1" latinLnBrk="0" hangingPunct="1">
+                        <a:defRPr sz="1800" b="1" kern="1200">
+                          <a:solidFill>
+                            <a:schemeClr val="lt1"/>
+                          </a:solidFill>
+                          <a:latin typeface="Segoe UI Light"/>
+                        </a:defRPr>
+                      </a:lvl5pPr>
+                      <a:lvl6pPr marL="2286000" algn="l" defTabSz="914400" rtl="0" eaLnBrk="1" latinLnBrk="0" hangingPunct="1">
+                        <a:defRPr sz="1800" b="1" kern="1200">
+                          <a:solidFill>
+                            <a:schemeClr val="lt1"/>
+                          </a:solidFill>
+                          <a:latin typeface="Segoe UI Light"/>
+                        </a:defRPr>
+                      </a:lvl6pPr>
+                      <a:lvl7pPr marL="2743200" algn="l" defTabSz="914400" rtl="0" eaLnBrk="1" latinLnBrk="0" hangingPunct="1">
+                        <a:defRPr sz="1800" b="1" kern="1200">
+                          <a:solidFill>
+                            <a:schemeClr val="lt1"/>
+                          </a:solidFill>
+                          <a:latin typeface="Segoe UI Light"/>
+                        </a:defRPr>
+                      </a:lvl7pPr>
+                      <a:lvl8pPr marL="3200400" algn="l" defTabSz="914400" rtl="0" eaLnBrk="1" latinLnBrk="0" hangingPunct="1">
+                        <a:defRPr sz="1800" b="1" kern="1200">
+                          <a:solidFill>
+                            <a:schemeClr val="lt1"/>
+                          </a:solidFill>
+                          <a:latin typeface="Segoe UI Light"/>
+                        </a:defRPr>
+                      </a:lvl8pPr>
+                      <a:lvl9pPr marL="3657600" algn="l" defTabSz="914400" rtl="0" eaLnBrk="1" latinLnBrk="0" hangingPunct="1">
+                        <a:defRPr sz="1800" b="1" kern="1200">
+                          <a:solidFill>
+                            <a:schemeClr val="lt1"/>
+                          </a:solidFill>
+                          <a:latin typeface="Segoe UI Light"/>
+                        </a:defRPr>
+                      </a:lvl9pPr>
+                    </a:lstStyle>
+                    <a:p>
+                      <a:r>
+                        <a:rPr lang="en-US" sz="2000" dirty="0">
+                          <a:solidFill>
+                            <a:srgbClr val="000000"/>
+                          </a:solidFill>
+                          <a:latin typeface="Consolas" panose="020B0609020204030204" pitchFamily="49" charset="0"/>
+                        </a:rPr>
+                        <a:t>{</a:t>
+                      </a:r>
+                    </a:p>
+                    <a:p>
+                      <a:r>
+                        <a:rPr lang="en-US" sz="2000" dirty="0">
+                          <a:solidFill>
+                            <a:srgbClr val="000000"/>
+                          </a:solidFill>
+                          <a:latin typeface="Consolas" panose="020B0609020204030204" pitchFamily="49" charset="0"/>
+                        </a:rPr>
+                        <a:t>  </a:t>
+                      </a:r>
+                      <a:r>
+                        <a:rPr lang="en-US" sz="2000" dirty="0">
+                          <a:solidFill>
+                            <a:srgbClr val="2E75B6"/>
+                          </a:solidFill>
+                          <a:latin typeface="Consolas" panose="020B0609020204030204" pitchFamily="49" charset="0"/>
+                        </a:rPr>
+                        <a:t>"</a:t>
+                      </a:r>
+                      <a:r>
+                        <a:rPr lang="en-US" sz="2000" dirty="0" err="1">
+                          <a:solidFill>
+                            <a:srgbClr val="2E75B6"/>
+                          </a:solidFill>
+                          <a:latin typeface="Consolas" panose="020B0609020204030204" pitchFamily="49" charset="0"/>
+                        </a:rPr>
+                        <a:t>Movies:Password</a:t>
+                      </a:r>
+                      <a:r>
+                        <a:rPr lang="en-US" sz="2000" dirty="0">
+                          <a:solidFill>
+                            <a:srgbClr val="2E75B6"/>
+                          </a:solidFill>
+                          <a:latin typeface="Consolas" panose="020B0609020204030204" pitchFamily="49" charset="0"/>
+                        </a:rPr>
+                        <a:t>"</a:t>
+                      </a:r>
+                      <a:r>
+                        <a:rPr lang="en-US" sz="2000" dirty="0">
+                          <a:solidFill>
+                            <a:srgbClr val="000000"/>
+                          </a:solidFill>
+                          <a:latin typeface="Consolas" panose="020B0609020204030204" pitchFamily="49" charset="0"/>
+                        </a:rPr>
+                        <a:t>: </a:t>
+                      </a:r>
+                      <a:r>
+                        <a:rPr lang="en-US" sz="2000" dirty="0">
+                          <a:solidFill>
+                            <a:srgbClr val="A31515"/>
+                          </a:solidFill>
+                          <a:latin typeface="Consolas" panose="020B0609020204030204" pitchFamily="49" charset="0"/>
+                        </a:rPr>
+                        <a:t>"pass123",</a:t>
+                      </a:r>
+                      <a:endParaRPr lang="en-US" sz="2000" dirty="0">
+                        <a:solidFill>
+                          <a:srgbClr val="000000"/>
+                        </a:solidFill>
+                        <a:latin typeface="Consolas" panose="020B0609020204030204" pitchFamily="49" charset="0"/>
+                      </a:endParaRPr>
+                    </a:p>
+                    <a:p>
+                      <a:r>
+                        <a:rPr lang="en-US" sz="2000" dirty="0">
+                          <a:solidFill>
+                            <a:srgbClr val="000000"/>
+                          </a:solidFill>
+                          <a:latin typeface="Consolas" panose="020B0609020204030204" pitchFamily="49" charset="0"/>
+                        </a:rPr>
+                        <a:t>  </a:t>
+                      </a:r>
+                      <a:r>
+                        <a:rPr lang="en-US" sz="2000" dirty="0">
+                          <a:solidFill>
+                            <a:srgbClr val="2E75B6"/>
+                          </a:solidFill>
+                          <a:latin typeface="Consolas" panose="020B0609020204030204" pitchFamily="49" charset="0"/>
+                        </a:rPr>
+                        <a:t>"</a:t>
+                      </a:r>
+                      <a:r>
+                        <a:rPr lang="en-US" sz="2000" dirty="0" err="1">
+                          <a:solidFill>
+                            <a:srgbClr val="2E75B6"/>
+                          </a:solidFill>
+                          <a:latin typeface="Consolas" panose="020B0609020204030204" pitchFamily="49" charset="0"/>
+                        </a:rPr>
+                        <a:t>Movies:User</a:t>
+                      </a:r>
+                      <a:r>
+                        <a:rPr lang="en-US" sz="2000" dirty="0">
+                          <a:solidFill>
+                            <a:srgbClr val="2E75B6"/>
+                          </a:solidFill>
+                          <a:latin typeface="Consolas" panose="020B0609020204030204" pitchFamily="49" charset="0"/>
+                        </a:rPr>
+                        <a:t>"</a:t>
+                      </a:r>
+                      <a:r>
+                        <a:rPr lang="en-US" sz="2000" dirty="0">
+                          <a:solidFill>
+                            <a:srgbClr val="000000"/>
+                          </a:solidFill>
+                          <a:latin typeface="Consolas" panose="020B0609020204030204" pitchFamily="49" charset="0"/>
+                        </a:rPr>
+                        <a:t>: </a:t>
+                      </a:r>
+                      <a:r>
+                        <a:rPr lang="en-US" sz="2000" dirty="0">
+                          <a:solidFill>
+                            <a:srgbClr val="A31515"/>
+                          </a:solidFill>
+                          <a:latin typeface="Consolas" panose="020B0609020204030204" pitchFamily="49" charset="0"/>
+                        </a:rPr>
+                        <a:t>"</a:t>
+                      </a:r>
+                      <a:r>
+                        <a:rPr lang="en-US" sz="2000" dirty="0" err="1">
+                          <a:solidFill>
+                            <a:srgbClr val="A31515"/>
+                          </a:solidFill>
+                          <a:latin typeface="Consolas" panose="020B0609020204030204" pitchFamily="49" charset="0"/>
+                        </a:rPr>
+                        <a:t>johndoe</a:t>
+                      </a:r>
+                      <a:r>
+                        <a:rPr lang="en-US" sz="2000" dirty="0">
+                          <a:solidFill>
+                            <a:srgbClr val="A31515"/>
+                          </a:solidFill>
+                          <a:latin typeface="Consolas" panose="020B0609020204030204" pitchFamily="49" charset="0"/>
+                        </a:rPr>
+                        <a:t>"</a:t>
+                      </a:r>
+                      <a:endParaRPr lang="en-US" sz="2000" dirty="0">
+                        <a:solidFill>
+                          <a:srgbClr val="000000"/>
+                        </a:solidFill>
+                        <a:latin typeface="Consolas" panose="020B0609020204030204" pitchFamily="49" charset="0"/>
+                      </a:endParaRPr>
+                    </a:p>
+                    <a:p>
+                      <a:r>
+                        <a:rPr lang="en-US" sz="2000" dirty="0">
+                          <a:solidFill>
+                            <a:srgbClr val="000000"/>
+                          </a:solidFill>
+                          <a:latin typeface="Consolas" panose="020B0609020204030204" pitchFamily="49" charset="0"/>
+                        </a:rPr>
+                        <a:t>}</a:t>
+                      </a:r>
+                    </a:p>
+                  </a:txBody>
+                  <a:tcPr>
+                    <a:lnL w="12700" cap="flat" cmpd="sng" algn="ctr">
+                      <a:solidFill>
+                        <a:sysClr val="window" lastClr="FFFFFF"/>
+                      </a:solidFill>
+                      <a:prstDash val="solid"/>
+                      <a:round/>
+                      <a:headEnd type="none" w="med" len="med"/>
+                      <a:tailEnd type="none" w="med" len="med"/>
+                    </a:lnL>
+                    <a:lnR w="12700" cap="flat" cmpd="sng" algn="ctr">
+                      <a:solidFill>
+                        <a:sysClr val="window" lastClr="FFFFFF"/>
+                      </a:solidFill>
+                      <a:prstDash val="solid"/>
+                      <a:round/>
+                      <a:headEnd type="none" w="med" len="med"/>
+                      <a:tailEnd type="none" w="med" len="med"/>
+                    </a:lnR>
+                    <a:lnT w="12700" cap="flat" cmpd="sng" algn="ctr">
+                      <a:solidFill>
+                        <a:sysClr val="window" lastClr="FFFFFF"/>
+                      </a:solidFill>
+                      <a:prstDash val="solid"/>
+                      <a:round/>
+                      <a:headEnd type="none" w="med" len="med"/>
+                      <a:tailEnd type="none" w="med" len="med"/>
+                    </a:lnT>
+                    <a:lnB w="12700" cap="flat" cmpd="sng" algn="ctr">
+                      <a:solidFill>
+                        <a:sysClr val="window" lastClr="FFFFFF"/>
+                      </a:solidFill>
+                      <a:prstDash val="solid"/>
+                      <a:round/>
+                      <a:headEnd type="none" w="med" len="med"/>
+                      <a:tailEnd type="none" w="med" len="med"/>
+                    </a:lnB>
+                    <a:lnTlToBr w="12700" cmpd="sng">
+                      <a:noFill/>
+                      <a:prstDash val="solid"/>
+                    </a:lnTlToBr>
+                    <a:lnBlToTr w="12700" cmpd="sng">
+                      <a:noFill/>
+                      <a:prstDash val="solid"/>
+                    </a:lnBlToTr>
+                    <a:solidFill>
+                      <a:sysClr val="window" lastClr="FFFFFF"/>
+                    </a:solidFill>
+                  </a:tcPr>
+                </a:tc>
+                <a:extLst>
+                  <a:ext uri="{0D108BD9-81ED-4DB2-BD59-A6C34878D82A}">
+                    <a16:rowId xmlns:a16="http://schemas.microsoft.com/office/drawing/2014/main" val="3473222697"/>
+                  </a:ext>
+                </a:extLst>
+              </a:tr>
+            </a:tbl>
+          </a:graphicData>
+        </a:graphic>
+      </p:graphicFrame>
+      <p:sp>
+        <p:nvSpPr>
+          <p:cNvPr id="25" name="Rectangle 24">
+            <a:extLst>
+              <a:ext uri="{FF2B5EF4-FFF2-40B4-BE49-F238E27FC236}">
+                <a16:creationId xmlns:a16="http://schemas.microsoft.com/office/drawing/2014/main" id="{EE34EF64-5E28-4C84-9F46-DB4686EB6269}"/>
+              </a:ext>
+            </a:extLst>
+          </p:cNvPr>
+          <p:cNvSpPr/>
+          <p:nvPr/>
+        </p:nvSpPr>
+        <p:spPr>
+          <a:xfrm>
+            <a:off x="2926300" y="4857766"/>
+            <a:ext cx="1374817" cy="446567"/>
+          </a:xfrm>
+          <a:prstGeom prst="rect">
+            <a:avLst/>
+          </a:prstGeom>
+          <a:gradFill rotWithShape="1">
+            <a:gsLst>
+              <a:gs pos="0">
+                <a:srgbClr val="5B9BD5">
+                  <a:lumMod val="110000"/>
+                  <a:satMod val="105000"/>
+                  <a:tint val="67000"/>
+                </a:srgbClr>
+              </a:gs>
+              <a:gs pos="50000">
+                <a:srgbClr val="5B9BD5">
+                  <a:lumMod val="105000"/>
+                  <a:satMod val="103000"/>
+                  <a:tint val="73000"/>
+                </a:srgbClr>
+              </a:gs>
+              <a:gs pos="100000">
+                <a:srgbClr val="5B9BD5">
+                  <a:lumMod val="105000"/>
+                  <a:satMod val="109000"/>
+                  <a:tint val="81000"/>
+                </a:srgbClr>
+              </a:gs>
+            </a:gsLst>
+            <a:lin ang="5400000" scaled="0"/>
+          </a:gradFill>
+          <a:ln w="6350" cap="flat" cmpd="sng" algn="ctr">
+            <a:solidFill>
+              <a:srgbClr val="5B9BD5"/>
+            </a:solidFill>
+            <a:prstDash val="solid"/>
+            <a:miter lim="800000"/>
+          </a:ln>
+          <a:effectLst/>
+        </p:spPr>
+        <p:txBody>
+          <a:bodyPr rtlCol="0" anchor="ctr"/>
+          <a:lstStyle/>
+          <a:p>
+            <a:pPr marL="0" marR="0" lvl="0" indent="0" algn="ctr" defTabSz="914400" eaLnBrk="1" fontAlgn="auto" latinLnBrk="0" hangingPunct="1">
+              <a:lnSpc>
+                <a:spcPct val="100000"/>
+              </a:lnSpc>
+              <a:spcBef>
+                <a:spcPts val="0"/>
+              </a:spcBef>
+              <a:spcAft>
+                <a:spcPts val="0"/>
+              </a:spcAft>
+              <a:buClrTx/>
+              <a:buSzTx/>
+              <a:buFontTx/>
+              <a:buNone/>
+              <a:tabLst/>
+              <a:defRPr/>
+            </a:pPr>
+            <a:r>
+              <a:rPr lang="en-US" b="1" kern="0" dirty="0">
+                <a:solidFill>
+                  <a:prstClr val="black"/>
+                </a:solidFill>
+                <a:latin typeface="Segoe UI Light"/>
+              </a:rPr>
+              <a:t>secret</a:t>
+            </a:r>
+            <a:r>
+              <a:rPr kumimoji="0" lang="en-US" sz="1800" b="1" i="0" u="none" strike="noStrike" kern="0" cap="none" spc="0" normalizeH="0" baseline="0" noProof="0" dirty="0" err="1">
+                <a:ln>
+                  <a:noFill/>
+                </a:ln>
+                <a:solidFill>
+                  <a:prstClr val="black"/>
+                </a:solidFill>
+                <a:effectLst/>
+                <a:uLnTx/>
+                <a:uFillTx/>
+                <a:latin typeface="Segoe UI Light"/>
+                <a:ea typeface="+mn-ea"/>
+                <a:cs typeface="+mn-cs"/>
+              </a:rPr>
+              <a:t>s.json</a:t>
+            </a:r>
+            <a:endParaRPr kumimoji="0" lang="en-US" sz="1800" b="1" i="0" u="none" strike="noStrike" kern="0" cap="none" spc="0" normalizeH="0" baseline="0" noProof="0" dirty="0">
+              <a:ln>
+                <a:noFill/>
+              </a:ln>
+              <a:solidFill>
+                <a:prstClr val="black"/>
+              </a:solidFill>
+              <a:effectLst/>
+              <a:uLnTx/>
+              <a:uFillTx/>
+              <a:latin typeface="Segoe UI Light"/>
+              <a:ea typeface="+mn-ea"/>
+              <a:cs typeface="+mn-cs"/>
+            </a:endParaRPr>
+          </a:p>
+        </p:txBody>
+      </p:sp>
+      <p:sp>
+        <p:nvSpPr>
+          <p:cNvPr id="26" name="Arrow: Down 25">
+            <a:extLst>
+              <a:ext uri="{FF2B5EF4-FFF2-40B4-BE49-F238E27FC236}">
+                <a16:creationId xmlns:a16="http://schemas.microsoft.com/office/drawing/2014/main" id="{75402EAC-AD68-45D5-9633-1E3F2946480E}"/>
+              </a:ext>
+            </a:extLst>
+          </p:cNvPr>
+          <p:cNvSpPr/>
+          <p:nvPr/>
+        </p:nvSpPr>
+        <p:spPr>
+          <a:xfrm>
+            <a:off x="4998875" y="2711302"/>
+            <a:ext cx="424254" cy="628779"/>
+          </a:xfrm>
+          <a:prstGeom prst="downArrow">
+            <a:avLst/>
+          </a:prstGeom>
+        </p:spPr>
+        <p:style>
+          <a:lnRef idx="2">
+            <a:schemeClr val="accent1">
+              <a:shade val="50000"/>
+            </a:schemeClr>
+          </a:lnRef>
+          <a:fillRef idx="1">
+            <a:schemeClr val="accent1"/>
+          </a:fillRef>
+          <a:effectRef idx="0">
+            <a:schemeClr val="accent1"/>
+          </a:effectRef>
+          <a:fontRef idx="minor">
+            <a:schemeClr val="lt1"/>
+          </a:fontRef>
+        </p:style>
+        <p:txBody>
+          <a:bodyPr rtlCol="0" anchor="ctr"/>
+          <a:lstStyle/>
+          <a:p>
+            <a:pPr algn="ctr"/>
+            <a:endParaRPr lang="en-US"/>
+          </a:p>
+        </p:txBody>
+      </p:sp>
+      <p:sp>
+        <p:nvSpPr>
+          <p:cNvPr id="27" name="Arrow: Down 26">
+            <a:extLst>
+              <a:ext uri="{FF2B5EF4-FFF2-40B4-BE49-F238E27FC236}">
+                <a16:creationId xmlns:a16="http://schemas.microsoft.com/office/drawing/2014/main" id="{7CCD985B-8017-47CC-868C-6B7DA89AA851}"/>
+              </a:ext>
+            </a:extLst>
+          </p:cNvPr>
+          <p:cNvSpPr/>
+          <p:nvPr/>
+        </p:nvSpPr>
+        <p:spPr>
+          <a:xfrm rot="2984580">
+            <a:off x="4612609" y="4135011"/>
+            <a:ext cx="424254" cy="880286"/>
+          </a:xfrm>
+          <a:prstGeom prst="downArrow">
+            <a:avLst/>
+          </a:prstGeom>
+        </p:spPr>
+        <p:style>
+          <a:lnRef idx="2">
+            <a:schemeClr val="accent1">
+              <a:shade val="50000"/>
+            </a:schemeClr>
+          </a:lnRef>
+          <a:fillRef idx="1">
+            <a:schemeClr val="accent1"/>
+          </a:fillRef>
+          <a:effectRef idx="0">
+            <a:schemeClr val="accent1"/>
+          </a:effectRef>
+          <a:fontRef idx="minor">
+            <a:schemeClr val="lt1"/>
+          </a:fontRef>
+        </p:style>
+        <p:txBody>
+          <a:bodyPr rtlCol="0" anchor="ctr"/>
+          <a:lstStyle/>
+          <a:p>
+            <a:pPr algn="ctr"/>
             <a:endParaRPr lang="en-US" dirty="0"/>
           </a:p>
         </p:txBody>
@@ -13071,7 +15165,7 @@
     </p:spTree>
     <p:extLst>
       <p:ext uri="{BB962C8B-B14F-4D97-AF65-F5344CB8AC3E}">
-        <p14:creationId xmlns:p14="http://schemas.microsoft.com/office/powerpoint/2010/main" val="1291707926"/>
+        <p14:creationId xmlns:p14="http://schemas.microsoft.com/office/powerpoint/2010/main" val="1129120759"/>
       </p:ext>
     </p:extLst>
   </p:cSld>
@@ -13114,7 +15208,7 @@
                                         <p:tgtEl>
                                           <p:spTgt spid="3">
                                             <p:txEl>
-                                              <p:pRg st="2" end="2"/>
+                                              <p:pRg st="1" end="1"/>
                                             </p:txEl>
                                           </p:spTgt>
                                         </p:tgtEl>
@@ -13132,67 +15226,6 @@
                                         <p:tgtEl>
                                           <p:spTgt spid="3">
                                             <p:txEl>
-                                              <p:pRg st="2" end="2"/>
-                                            </p:txEl>
-                                          </p:spTgt>
-                                        </p:tgtEl>
-                                      </p:cBhvr>
-                                    </p:animEffect>
-                                  </p:childTnLst>
-                                </p:cTn>
-                              </p:par>
-                            </p:childTnLst>
-                          </p:cTn>
-                        </p:par>
-                      </p:childTnLst>
-                    </p:cTn>
-                  </p:par>
-                  <p:par>
-                    <p:cTn id="8" fill="hold">
-                      <p:stCondLst>
-                        <p:cond delay="indefinite"/>
-                      </p:stCondLst>
-                      <p:childTnLst>
-                        <p:par>
-                          <p:cTn id="9" fill="hold">
-                            <p:stCondLst>
-                              <p:cond delay="0"/>
-                            </p:stCondLst>
-                            <p:childTnLst>
-                              <p:par>
-                                <p:cTn id="10" presetID="10" presetClass="entr" presetSubtype="0" fill="hold" nodeType="clickEffect">
-                                  <p:stCondLst>
-                                    <p:cond delay="0"/>
-                                  </p:stCondLst>
-                                  <p:childTnLst>
-                                    <p:set>
-                                      <p:cBhvr>
-                                        <p:cTn id="11" dur="1" fill="hold">
-                                          <p:stCondLst>
-                                            <p:cond delay="0"/>
-                                          </p:stCondLst>
-                                        </p:cTn>
-                                        <p:tgtEl>
-                                          <p:spTgt spid="3">
-                                            <p:txEl>
-                                              <p:pRg st="1" end="1"/>
-                                            </p:txEl>
-                                          </p:spTgt>
-                                        </p:tgtEl>
-                                        <p:attrNameLst>
-                                          <p:attrName>style.visibility</p:attrName>
-                                        </p:attrNameLst>
-                                      </p:cBhvr>
-                                      <p:to>
-                                        <p:strVal val="visible"/>
-                                      </p:to>
-                                    </p:set>
-                                    <p:animEffect transition="in" filter="fade">
-                                      <p:cBhvr>
-                                        <p:cTn id="12" dur="500"/>
-                                        <p:tgtEl>
-                                          <p:spTgt spid="3">
-                                            <p:txEl>
                                               <p:pRg st="1" end="1"/>
                                             </p:txEl>
                                           </p:spTgt>
@@ -13202,33 +15235,15 @@
                                   </p:childTnLst>
                                 </p:cTn>
                               </p:par>
-                            </p:childTnLst>
-                          </p:cTn>
-                        </p:par>
-                      </p:childTnLst>
-                    </p:cTn>
-                  </p:par>
-                  <p:par>
-                    <p:cTn id="13" fill="hold">
-                      <p:stCondLst>
-                        <p:cond delay="indefinite"/>
-                      </p:stCondLst>
-                      <p:childTnLst>
-                        <p:par>
-                          <p:cTn id="14" fill="hold">
-                            <p:stCondLst>
-                              <p:cond delay="0"/>
-                            </p:stCondLst>
-                            <p:childTnLst>
                               <p:par>
-                                <p:cTn id="15" presetID="10" presetClass="entr" presetSubtype="0" fill="hold" nodeType="clickEffect">
+                                <p:cTn id="8" presetID="10" presetClass="entr" presetSubtype="0" fill="hold" nodeType="withEffect">
                                   <p:stCondLst>
                                     <p:cond delay="0"/>
                                   </p:stCondLst>
                                   <p:childTnLst>
                                     <p:set>
                                       <p:cBhvr>
-                                        <p:cTn id="16" dur="1" fill="hold">
+                                        <p:cTn id="9" dur="1" fill="hold">
                                           <p:stCondLst>
                                             <p:cond delay="0"/>
                                           </p:stCondLst>
@@ -13250,7 +15265,7 @@
                                     </p:set>
                                     <p:animEffect transition="in" filter="fade">
                                       <p:cBhvr>
-                                        <p:cTn id="17" dur="500"/>
+                                        <p:cTn id="10" dur="500"/>
                                         <p:tgtEl>
                                           <p:spTgt spid="3">
                                             <p:txEl>
@@ -13270,19 +15285,98 @@
                     </p:cTn>
                   </p:par>
                   <p:par>
-                    <p:cTn id="18" fill="hold">
+                    <p:cTn id="11" fill="hold">
                       <p:stCondLst>
                         <p:cond delay="indefinite"/>
                       </p:stCondLst>
                       <p:childTnLst>
                         <p:par>
-                          <p:cTn id="19" fill="hold">
+                          <p:cTn id="12" fill="hold">
                             <p:stCondLst>
                               <p:cond delay="0"/>
                             </p:stCondLst>
                             <p:childTnLst>
                               <p:par>
-                                <p:cTn id="20" presetID="10" presetClass="entr" presetSubtype="0" fill="hold" nodeType="clickEffect">
+                                <p:cTn id="13" presetID="10" presetClass="entr" presetSubtype="0" fill="hold" grpId="0" nodeType="clickEffect">
+                                  <p:stCondLst>
+                                    <p:cond delay="0"/>
+                                  </p:stCondLst>
+                                  <p:childTnLst>
+                                    <p:set>
+                                      <p:cBhvr>
+                                        <p:cTn id="14" dur="1" fill="hold">
+                                          <p:stCondLst>
+                                            <p:cond delay="0"/>
+                                          </p:stCondLst>
+                                        </p:cTn>
+                                        <p:tgtEl>
+                                          <p:spTgt spid="12"/>
+                                        </p:tgtEl>
+                                        <p:attrNameLst>
+                                          <p:attrName>style.visibility</p:attrName>
+                                        </p:attrNameLst>
+                                      </p:cBhvr>
+                                      <p:to>
+                                        <p:strVal val="visible"/>
+                                      </p:to>
+                                    </p:set>
+                                    <p:animEffect transition="in" filter="fade">
+                                      <p:cBhvr>
+                                        <p:cTn id="15" dur="500"/>
+                                        <p:tgtEl>
+                                          <p:spTgt spid="12"/>
+                                        </p:tgtEl>
+                                      </p:cBhvr>
+                                    </p:animEffect>
+                                  </p:childTnLst>
+                                </p:cTn>
+                              </p:par>
+                            </p:childTnLst>
+                          </p:cTn>
+                        </p:par>
+                        <p:par>
+                          <p:cTn id="16" fill="hold">
+                            <p:stCondLst>
+                              <p:cond delay="500"/>
+                            </p:stCondLst>
+                            <p:childTnLst>
+                              <p:par>
+                                <p:cTn id="17" presetID="10" presetClass="entr" presetSubtype="0" fill="hold" grpId="0" nodeType="afterEffect">
+                                  <p:stCondLst>
+                                    <p:cond delay="0"/>
+                                  </p:stCondLst>
+                                  <p:childTnLst>
+                                    <p:set>
+                                      <p:cBhvr>
+                                        <p:cTn id="18" dur="1" fill="hold">
+                                          <p:stCondLst>
+                                            <p:cond delay="0"/>
+                                          </p:stCondLst>
+                                        </p:cTn>
+                                        <p:tgtEl>
+                                          <p:spTgt spid="26"/>
+                                        </p:tgtEl>
+                                        <p:attrNameLst>
+                                          <p:attrName>style.visibility</p:attrName>
+                                        </p:attrNameLst>
+                                      </p:cBhvr>
+                                      <p:to>
+                                        <p:strVal val="visible"/>
+                                      </p:to>
+                                    </p:set>
+                                    <p:animEffect transition="in" filter="fade">
+                                      <p:cBhvr>
+                                        <p:cTn id="19" dur="500"/>
+                                        <p:tgtEl>
+                                          <p:spTgt spid="26"/>
+                                        </p:tgtEl>
+                                      </p:cBhvr>
+                                    </p:animEffect>
+                                  </p:childTnLst>
+                                </p:cTn>
+                              </p:par>
+                              <p:par>
+                                <p:cTn id="20" presetID="10" presetClass="entr" presetSubtype="0" fill="hold" nodeType="withEffect">
                                   <p:stCondLst>
                                     <p:cond delay="0"/>
                                   </p:stCondLst>
@@ -13295,11 +15389,7 @@
                                           </p:stCondLst>
                                         </p:cTn>
                                         <p:tgtEl>
-                                          <p:spTgt spid="3">
-                                            <p:txEl>
-                                              <p:pRg st="3" end="3"/>
-                                            </p:txEl>
-                                          </p:spTgt>
+                                          <p:spTgt spid="13"/>
                                         </p:tgtEl>
                                         <p:attrNameLst>
                                           <p:attrName>style.visibility</p:attrName>
@@ -13313,11 +15403,305 @@
                                       <p:cBhvr>
                                         <p:cTn id="22" dur="500"/>
                                         <p:tgtEl>
-                                          <p:spTgt spid="3">
-                                            <p:txEl>
-                                              <p:pRg st="3" end="3"/>
-                                            </p:txEl>
-                                          </p:spTgt>
+                                          <p:spTgt spid="13"/>
+                                        </p:tgtEl>
+                                      </p:cBhvr>
+                                    </p:animEffect>
+                                  </p:childTnLst>
+                                </p:cTn>
+                              </p:par>
+                              <p:par>
+                                <p:cTn id="23" presetID="10" presetClass="entr" presetSubtype="0" fill="hold" nodeType="withEffect">
+                                  <p:stCondLst>
+                                    <p:cond delay="0"/>
+                                  </p:stCondLst>
+                                  <p:childTnLst>
+                                    <p:set>
+                                      <p:cBhvr>
+                                        <p:cTn id="24" dur="1" fill="hold">
+                                          <p:stCondLst>
+                                            <p:cond delay="0"/>
+                                          </p:stCondLst>
+                                        </p:cTn>
+                                        <p:tgtEl>
+                                          <p:spTgt spid="14"/>
+                                        </p:tgtEl>
+                                        <p:attrNameLst>
+                                          <p:attrName>style.visibility</p:attrName>
+                                        </p:attrNameLst>
+                                      </p:cBhvr>
+                                      <p:to>
+                                        <p:strVal val="visible"/>
+                                      </p:to>
+                                    </p:set>
+                                    <p:animEffect transition="in" filter="fade">
+                                      <p:cBhvr>
+                                        <p:cTn id="25" dur="500"/>
+                                        <p:tgtEl>
+                                          <p:spTgt spid="14"/>
+                                        </p:tgtEl>
+                                      </p:cBhvr>
+                                    </p:animEffect>
+                                  </p:childTnLst>
+                                </p:cTn>
+                              </p:par>
+                              <p:par>
+                                <p:cTn id="26" presetID="10" presetClass="entr" presetSubtype="0" fill="hold" nodeType="withEffect">
+                                  <p:stCondLst>
+                                    <p:cond delay="0"/>
+                                  </p:stCondLst>
+                                  <p:childTnLst>
+                                    <p:set>
+                                      <p:cBhvr>
+                                        <p:cTn id="27" dur="1" fill="hold">
+                                          <p:stCondLst>
+                                            <p:cond delay="0"/>
+                                          </p:stCondLst>
+                                        </p:cTn>
+                                        <p:tgtEl>
+                                          <p:spTgt spid="15"/>
+                                        </p:tgtEl>
+                                        <p:attrNameLst>
+                                          <p:attrName>style.visibility</p:attrName>
+                                        </p:attrNameLst>
+                                      </p:cBhvr>
+                                      <p:to>
+                                        <p:strVal val="visible"/>
+                                      </p:to>
+                                    </p:set>
+                                    <p:animEffect transition="in" filter="fade">
+                                      <p:cBhvr>
+                                        <p:cTn id="28" dur="500"/>
+                                        <p:tgtEl>
+                                          <p:spTgt spid="15"/>
+                                        </p:tgtEl>
+                                      </p:cBhvr>
+                                    </p:animEffect>
+                                  </p:childTnLst>
+                                </p:cTn>
+                              </p:par>
+                              <p:par>
+                                <p:cTn id="29" presetID="10" presetClass="entr" presetSubtype="0" fill="hold" nodeType="withEffect">
+                                  <p:stCondLst>
+                                    <p:cond delay="0"/>
+                                  </p:stCondLst>
+                                  <p:childTnLst>
+                                    <p:set>
+                                      <p:cBhvr>
+                                        <p:cTn id="30" dur="1" fill="hold">
+                                          <p:stCondLst>
+                                            <p:cond delay="0"/>
+                                          </p:stCondLst>
+                                        </p:cTn>
+                                        <p:tgtEl>
+                                          <p:spTgt spid="16"/>
+                                        </p:tgtEl>
+                                        <p:attrNameLst>
+                                          <p:attrName>style.visibility</p:attrName>
+                                        </p:attrNameLst>
+                                      </p:cBhvr>
+                                      <p:to>
+                                        <p:strVal val="visible"/>
+                                      </p:to>
+                                    </p:set>
+                                    <p:animEffect transition="in" filter="fade">
+                                      <p:cBhvr>
+                                        <p:cTn id="31" dur="500"/>
+                                        <p:tgtEl>
+                                          <p:spTgt spid="16"/>
+                                        </p:tgtEl>
+                                      </p:cBhvr>
+                                    </p:animEffect>
+                                  </p:childTnLst>
+                                </p:cTn>
+                              </p:par>
+                              <p:par>
+                                <p:cTn id="32" presetID="10" presetClass="entr" presetSubtype="0" fill="hold" grpId="0" nodeType="withEffect">
+                                  <p:stCondLst>
+                                    <p:cond delay="0"/>
+                                  </p:stCondLst>
+                                  <p:childTnLst>
+                                    <p:set>
+                                      <p:cBhvr>
+                                        <p:cTn id="33" dur="1" fill="hold">
+                                          <p:stCondLst>
+                                            <p:cond delay="0"/>
+                                          </p:stCondLst>
+                                        </p:cTn>
+                                        <p:tgtEl>
+                                          <p:spTgt spid="19"/>
+                                        </p:tgtEl>
+                                        <p:attrNameLst>
+                                          <p:attrName>style.visibility</p:attrName>
+                                        </p:attrNameLst>
+                                      </p:cBhvr>
+                                      <p:to>
+                                        <p:strVal val="visible"/>
+                                      </p:to>
+                                    </p:set>
+                                    <p:animEffect transition="in" filter="fade">
+                                      <p:cBhvr>
+                                        <p:cTn id="34" dur="500"/>
+                                        <p:tgtEl>
+                                          <p:spTgt spid="19"/>
+                                        </p:tgtEl>
+                                      </p:cBhvr>
+                                    </p:animEffect>
+                                  </p:childTnLst>
+                                </p:cTn>
+                              </p:par>
+                              <p:par>
+                                <p:cTn id="35" presetID="10" presetClass="entr" presetSubtype="0" fill="hold" grpId="0" nodeType="withEffect">
+                                  <p:stCondLst>
+                                    <p:cond delay="0"/>
+                                  </p:stCondLst>
+                                  <p:childTnLst>
+                                    <p:set>
+                                      <p:cBhvr>
+                                        <p:cTn id="36" dur="1" fill="hold">
+                                          <p:stCondLst>
+                                            <p:cond delay="0"/>
+                                          </p:stCondLst>
+                                        </p:cTn>
+                                        <p:tgtEl>
+                                          <p:spTgt spid="20"/>
+                                        </p:tgtEl>
+                                        <p:attrNameLst>
+                                          <p:attrName>style.visibility</p:attrName>
+                                        </p:attrNameLst>
+                                      </p:cBhvr>
+                                      <p:to>
+                                        <p:strVal val="visible"/>
+                                      </p:to>
+                                    </p:set>
+                                    <p:animEffect transition="in" filter="fade">
+                                      <p:cBhvr>
+                                        <p:cTn id="37" dur="500"/>
+                                        <p:tgtEl>
+                                          <p:spTgt spid="20"/>
+                                        </p:tgtEl>
+                                      </p:cBhvr>
+                                    </p:animEffect>
+                                  </p:childTnLst>
+                                </p:cTn>
+                              </p:par>
+                            </p:childTnLst>
+                          </p:cTn>
+                        </p:par>
+                      </p:childTnLst>
+                    </p:cTn>
+                  </p:par>
+                  <p:par>
+                    <p:cTn id="38" fill="hold">
+                      <p:stCondLst>
+                        <p:cond delay="indefinite"/>
+                      </p:stCondLst>
+                      <p:childTnLst>
+                        <p:par>
+                          <p:cTn id="39" fill="hold">
+                            <p:stCondLst>
+                              <p:cond delay="0"/>
+                            </p:stCondLst>
+                            <p:childTnLst>
+                              <p:par>
+                                <p:cTn id="40" presetID="10" presetClass="entr" presetSubtype="0" fill="hold" grpId="0" nodeType="clickEffect">
+                                  <p:stCondLst>
+                                    <p:cond delay="0"/>
+                                  </p:stCondLst>
+                                  <p:childTnLst>
+                                    <p:set>
+                                      <p:cBhvr>
+                                        <p:cTn id="41" dur="1" fill="hold">
+                                          <p:stCondLst>
+                                            <p:cond delay="0"/>
+                                          </p:stCondLst>
+                                        </p:cTn>
+                                        <p:tgtEl>
+                                          <p:spTgt spid="27"/>
+                                        </p:tgtEl>
+                                        <p:attrNameLst>
+                                          <p:attrName>style.visibility</p:attrName>
+                                        </p:attrNameLst>
+                                      </p:cBhvr>
+                                      <p:to>
+                                        <p:strVal val="visible"/>
+                                      </p:to>
+                                    </p:set>
+                                    <p:animEffect transition="in" filter="fade">
+                                      <p:cBhvr>
+                                        <p:cTn id="42" dur="500"/>
+                                        <p:tgtEl>
+                                          <p:spTgt spid="27"/>
+                                        </p:tgtEl>
+                                      </p:cBhvr>
+                                    </p:animEffect>
+                                  </p:childTnLst>
+                                </p:cTn>
+                              </p:par>
+                              <p:par>
+                                <p:cTn id="43" presetID="10" presetClass="entr" presetSubtype="0" fill="hold" grpId="0" nodeType="withEffect">
+                                  <p:stCondLst>
+                                    <p:cond delay="0"/>
+                                  </p:stCondLst>
+                                  <p:childTnLst>
+                                    <p:set>
+                                      <p:cBhvr>
+                                        <p:cTn id="44" dur="1" fill="hold">
+                                          <p:stCondLst>
+                                            <p:cond delay="0"/>
+                                          </p:stCondLst>
+                                        </p:cTn>
+                                        <p:tgtEl>
+                                          <p:spTgt spid="25"/>
+                                        </p:tgtEl>
+                                        <p:attrNameLst>
+                                          <p:attrName>style.visibility</p:attrName>
+                                        </p:attrNameLst>
+                                      </p:cBhvr>
+                                      <p:to>
+                                        <p:strVal val="visible"/>
+                                      </p:to>
+                                    </p:set>
+                                    <p:animEffect transition="in" filter="fade">
+                                      <p:cBhvr>
+                                        <p:cTn id="45" dur="500"/>
+                                        <p:tgtEl>
+                                          <p:spTgt spid="25"/>
+                                        </p:tgtEl>
+                                      </p:cBhvr>
+                                    </p:animEffect>
+                                  </p:childTnLst>
+                                </p:cTn>
+                              </p:par>
+                              <p:par>
+                                <p:cTn id="46" presetID="10" presetClass="entr" presetSubtype="0" fill="hold" nodeType="withEffect">
+                                  <p:stCondLst>
+                                    <p:cond delay="0"/>
+                                  </p:stCondLst>
+                                  <p:childTnLst>
+                                    <p:set>
+                                      <p:cBhvr>
+                                        <p:cTn id="47" dur="1" fill="hold">
+                                          <p:stCondLst>
+                                            <p:cond delay="0"/>
+                                          </p:stCondLst>
+                                        </p:cTn>
+                                        <p:tgtEl>
+                                          <p:spTgt spid="24"/>
+                                        </p:tgtEl>
+                                        <p:attrNameLst>
+                                          <p:attrName>style.visibility</p:attrName>
+                                        </p:attrNameLst>
+                                      </p:cBhvr>
+                                      <p:to>
+                                        <p:strVal val="visible"/>
+                                      </p:to>
+                                    </p:set>
+                                    <p:animEffect transition="in" filter="fade">
+                                      <p:cBhvr>
+                                        <p:cTn id="48" dur="500"/>
+                                        <p:tgtEl>
+                                          <p:spTgt spid="24"/>
                                         </p:tgtEl>
                                       </p:cBhvr>
                                     </p:animEffect>
@@ -13351,6 +15735,14 @@
         </p:cTn>
       </p:par>
     </p:tnLst>
+    <p:bldLst>
+      <p:bldP spid="12" grpId="0" animBg="1"/>
+      <p:bldP spid="19" grpId="0"/>
+      <p:bldP spid="20" grpId="0"/>
+      <p:bldP spid="25" grpId="0" animBg="1"/>
+      <p:bldP spid="26" grpId="0" animBg="1"/>
+      <p:bldP spid="27" grpId="0" animBg="1"/>
+    </p:bldLst>
   </p:timing>
 </p:sld>
 </file>
@@ -13390,21 +15782,15 @@
             <p:ph type="title"/>
           </p:nvPr>
         </p:nvSpPr>
-        <p:spPr>
-          <a:xfrm>
-            <a:off x="838200" y="365125"/>
-            <a:ext cx="10515600" cy="1325563"/>
-          </a:xfrm>
-        </p:spPr>
+        <p:spPr/>
         <p:txBody>
           <a:bodyPr/>
           <a:lstStyle/>
           <a:p>
             <a:r>
-              <a:rPr lang="en-US"/>
-              <a:t>Azure Key Vault</a:t>
-            </a:r>
-            <a:endParaRPr lang="en-US" dirty="0"/>
+              <a:rPr lang="en-US" dirty="0"/>
+              <a:t>Secret Manager: VS 2017</a:t>
+            </a:r>
           </a:p>
         </p:txBody>
       </p:sp>
@@ -13418,27 +15804,11 @@
             <p:ph idx="1"/>
           </p:nvPr>
         </p:nvSpPr>
-        <p:spPr>
-          <a:xfrm>
-            <a:off x="838200" y="1825625"/>
-            <a:ext cx="10515600" cy="4351338"/>
-          </a:xfrm>
-        </p:spPr>
+        <p:spPr/>
         <p:txBody>
           <a:bodyPr/>
           <a:lstStyle/>
           <a:p>
-            <a:r>
-              <a:rPr lang="en-US"/>
-              <a:t>VS 15.7 introduces Connected Services node Key Vault creation</a:t>
-            </a:r>
-          </a:p>
-          <a:p>
-            <a:pPr lvl="1"/>
-            <a:r>
-              <a:rPr lang="en-US"/>
-              <a:t>Solution Explorer &gt; double-click Connected Services &gt; Secure Secrets with Azure Key Vault</a:t>
-            </a:r>
             <a:endParaRPr lang="en-US" dirty="0"/>
           </a:p>
         </p:txBody>
@@ -13446,7 +15816,7 @@
     </p:spTree>
     <p:extLst>
       <p:ext uri="{BB962C8B-B14F-4D97-AF65-F5344CB8AC3E}">
-        <p14:creationId xmlns:p14="http://schemas.microsoft.com/office/powerpoint/2010/main" val="1332892662"/>
+        <p14:creationId xmlns:p14="http://schemas.microsoft.com/office/powerpoint/2010/main" val="972511945"/>
       </p:ext>
     </p:extLst>
   </p:cSld>
@@ -13474,10 +15844,15 @@
                             </p:stCondLst>
                             <p:childTnLst>
                               <p:par>
-                                <p:cTn id="5" presetID="10" presetClass="entr" presetSubtype="0" fill="hold" nodeType="clickEffect">
+                                <p:cTn id="5" presetID="10" presetClass="entr" presetSubtype="0" fill="hold" nodeType="clickEffect" nodePh="1">
                                   <p:stCondLst>
                                     <p:cond delay="0"/>
                                   </p:stCondLst>
+                                  <p:endCondLst>
+                                    <p:cond evt="begin" delay="0">
+                                      <p:tn val="5"/>
+                                    </p:cond>
+                                  </p:endCondLst>
                                   <p:childTnLst>
                                     <p:set>
                                       <p:cBhvr>
@@ -13508,67 +15883,6 @@
                                           <p:spTgt spid="3">
                                             <p:txEl>
                                               <p:pRg st="0" end="0"/>
-                                            </p:txEl>
-                                          </p:spTgt>
-                                        </p:tgtEl>
-                                      </p:cBhvr>
-                                    </p:animEffect>
-                                  </p:childTnLst>
-                                </p:cTn>
-                              </p:par>
-                            </p:childTnLst>
-                          </p:cTn>
-                        </p:par>
-                      </p:childTnLst>
-                    </p:cTn>
-                  </p:par>
-                  <p:par>
-                    <p:cTn id="8" fill="hold">
-                      <p:stCondLst>
-                        <p:cond delay="indefinite"/>
-                      </p:stCondLst>
-                      <p:childTnLst>
-                        <p:par>
-                          <p:cTn id="9" fill="hold">
-                            <p:stCondLst>
-                              <p:cond delay="0"/>
-                            </p:stCondLst>
-                            <p:childTnLst>
-                              <p:par>
-                                <p:cTn id="10" presetID="10" presetClass="entr" presetSubtype="0" fill="hold" nodeType="clickEffect">
-                                  <p:stCondLst>
-                                    <p:cond delay="0"/>
-                                  </p:stCondLst>
-                                  <p:childTnLst>
-                                    <p:set>
-                                      <p:cBhvr>
-                                        <p:cTn id="11" dur="1" fill="hold">
-                                          <p:stCondLst>
-                                            <p:cond delay="0"/>
-                                          </p:stCondLst>
-                                        </p:cTn>
-                                        <p:tgtEl>
-                                          <p:spTgt spid="3">
-                                            <p:txEl>
-                                              <p:pRg st="1" end="1"/>
-                                            </p:txEl>
-                                          </p:spTgt>
-                                        </p:tgtEl>
-                                        <p:attrNameLst>
-                                          <p:attrName>style.visibility</p:attrName>
-                                        </p:attrNameLst>
-                                      </p:cBhvr>
-                                      <p:to>
-                                        <p:strVal val="visible"/>
-                                      </p:to>
-                                    </p:set>
-                                    <p:animEffect transition="in" filter="fade">
-                                      <p:cBhvr>
-                                        <p:cTn id="12" dur="500"/>
-                                        <p:tgtEl>
-                                          <p:spTgt spid="3">
-                                            <p:txEl>
-                                              <p:pRg st="1" end="1"/>
                                             </p:txEl>
                                           </p:spTgt>
                                         </p:tgtEl>

</xml_diff>

<commit_message>
Add Secret Manager retrieval slide
</commit_message>
<xml_diff>
--- a/Protecting App Secrets.pptx
+++ b/Protecting App Secrets.pptx
@@ -11432,6 +11432,11 @@
           <a:prstGeom prst="bentUpArrow">
             <a:avLst/>
           </a:prstGeom>
+          <a:solidFill>
+            <a:srgbClr val="4472C4">
+              <a:alpha val="69804"/>
+            </a:srgbClr>
+          </a:solidFill>
         </p:spPr>
         <p:style>
           <a:lnRef idx="2">
@@ -15789,7 +15794,7 @@
           <a:p>
             <a:r>
               <a:rPr lang="en-US" dirty="0"/>
-              <a:t>Secret Manager: VS 2017</a:t>
+              <a:t>Secret Manager: Retrieval</a:t>
             </a:r>
           </a:p>
         </p:txBody>
@@ -15809,7 +15814,1005 @@
           <a:bodyPr/>
           <a:lstStyle/>
           <a:p>
+            <a:pPr marL="0" indent="0">
+              <a:buNone/>
+            </a:pPr>
             <a:endParaRPr lang="en-US" dirty="0"/>
+          </a:p>
+        </p:txBody>
+      </p:sp>
+      <p:graphicFrame>
+        <p:nvGraphicFramePr>
+          <p:cNvPr id="4" name="Table 3">
+            <a:extLst>
+              <a:ext uri="{FF2B5EF4-FFF2-40B4-BE49-F238E27FC236}">
+                <a16:creationId xmlns:a16="http://schemas.microsoft.com/office/drawing/2014/main" id="{FB18C7D4-3492-4E4E-800A-CAFC344516DD}"/>
+              </a:ext>
+            </a:extLst>
+          </p:cNvPr>
+          <p:cNvGraphicFramePr>
+            <a:graphicFrameLocks noGrp="1"/>
+          </p:cNvGraphicFramePr>
+          <p:nvPr>
+            <p:extLst>
+              <p:ext uri="{D42A27DB-BD31-4B8C-83A1-F6EECF244321}">
+                <p14:modId xmlns:p14="http://schemas.microsoft.com/office/powerpoint/2010/main" val="3139221817"/>
+              </p:ext>
+            </p:extLst>
+          </p:nvPr>
+        </p:nvGraphicFramePr>
+        <p:xfrm>
+          <a:off x="844462" y="1920875"/>
+          <a:ext cx="9165812" cy="4849684"/>
+        </p:xfrm>
+        <a:graphic>
+          <a:graphicData uri="http://schemas.openxmlformats.org/drawingml/2006/table">
+            <a:tbl>
+              <a:tblPr firstRow="1" bandRow="1"/>
+              <a:tblGrid>
+                <a:gridCol w="9165812">
+                  <a:extLst>
+                    <a:ext uri="{9D8B030D-6E8A-4147-A177-3AD203B41FA5}">
+                      <a16:colId xmlns:a16="http://schemas.microsoft.com/office/drawing/2014/main" val="1057070397"/>
+                    </a:ext>
+                  </a:extLst>
+                </a:gridCol>
+              </a:tblGrid>
+              <a:tr h="4483924">
+                <a:tc>
+                  <a:txBody>
+                    <a:bodyPr/>
+                    <a:lstStyle>
+                      <a:lvl1pPr marL="0" algn="l" defTabSz="914400" rtl="0" eaLnBrk="1" latinLnBrk="0" hangingPunct="1">
+                        <a:defRPr sz="1800" b="1" kern="1200">
+                          <a:solidFill>
+                            <a:schemeClr val="lt1"/>
+                          </a:solidFill>
+                          <a:latin typeface="Segoe UI Light"/>
+                        </a:defRPr>
+                      </a:lvl1pPr>
+                      <a:lvl2pPr marL="457200" algn="l" defTabSz="914400" rtl="0" eaLnBrk="1" latinLnBrk="0" hangingPunct="1">
+                        <a:defRPr sz="1800" b="1" kern="1200">
+                          <a:solidFill>
+                            <a:schemeClr val="lt1"/>
+                          </a:solidFill>
+                          <a:latin typeface="Segoe UI Light"/>
+                        </a:defRPr>
+                      </a:lvl2pPr>
+                      <a:lvl3pPr marL="914400" algn="l" defTabSz="914400" rtl="0" eaLnBrk="1" latinLnBrk="0" hangingPunct="1">
+                        <a:defRPr sz="1800" b="1" kern="1200">
+                          <a:solidFill>
+                            <a:schemeClr val="lt1"/>
+                          </a:solidFill>
+                          <a:latin typeface="Segoe UI Light"/>
+                        </a:defRPr>
+                      </a:lvl3pPr>
+                      <a:lvl4pPr marL="1371600" algn="l" defTabSz="914400" rtl="0" eaLnBrk="1" latinLnBrk="0" hangingPunct="1">
+                        <a:defRPr sz="1800" b="1" kern="1200">
+                          <a:solidFill>
+                            <a:schemeClr val="lt1"/>
+                          </a:solidFill>
+                          <a:latin typeface="Segoe UI Light"/>
+                        </a:defRPr>
+                      </a:lvl4pPr>
+                      <a:lvl5pPr marL="1828800" algn="l" defTabSz="914400" rtl="0" eaLnBrk="1" latinLnBrk="0" hangingPunct="1">
+                        <a:defRPr sz="1800" b="1" kern="1200">
+                          <a:solidFill>
+                            <a:schemeClr val="lt1"/>
+                          </a:solidFill>
+                          <a:latin typeface="Segoe UI Light"/>
+                        </a:defRPr>
+                      </a:lvl5pPr>
+                      <a:lvl6pPr marL="2286000" algn="l" defTabSz="914400" rtl="0" eaLnBrk="1" latinLnBrk="0" hangingPunct="1">
+                        <a:defRPr sz="1800" b="1" kern="1200">
+                          <a:solidFill>
+                            <a:schemeClr val="lt1"/>
+                          </a:solidFill>
+                          <a:latin typeface="Segoe UI Light"/>
+                        </a:defRPr>
+                      </a:lvl6pPr>
+                      <a:lvl7pPr marL="2743200" algn="l" defTabSz="914400" rtl="0" eaLnBrk="1" latinLnBrk="0" hangingPunct="1">
+                        <a:defRPr sz="1800" b="1" kern="1200">
+                          <a:solidFill>
+                            <a:schemeClr val="lt1"/>
+                          </a:solidFill>
+                          <a:latin typeface="Segoe UI Light"/>
+                        </a:defRPr>
+                      </a:lvl7pPr>
+                      <a:lvl8pPr marL="3200400" algn="l" defTabSz="914400" rtl="0" eaLnBrk="1" latinLnBrk="0" hangingPunct="1">
+                        <a:defRPr sz="1800" b="1" kern="1200">
+                          <a:solidFill>
+                            <a:schemeClr val="lt1"/>
+                          </a:solidFill>
+                          <a:latin typeface="Segoe UI Light"/>
+                        </a:defRPr>
+                      </a:lvl8pPr>
+                      <a:lvl9pPr marL="3657600" algn="l" defTabSz="914400" rtl="0" eaLnBrk="1" latinLnBrk="0" hangingPunct="1">
+                        <a:defRPr sz="1800" b="1" kern="1200">
+                          <a:solidFill>
+                            <a:schemeClr val="lt1"/>
+                          </a:solidFill>
+                          <a:latin typeface="Segoe UI Light"/>
+                        </a:defRPr>
+                      </a:lvl9pPr>
+                    </a:lstStyle>
+                    <a:p>
+                      <a:r>
+                        <a:rPr lang="en-US" sz="1800" dirty="0">
+                          <a:solidFill>
+                            <a:srgbClr val="0000FF"/>
+                          </a:solidFill>
+                          <a:latin typeface="Consolas" panose="020B0609020204030204" pitchFamily="49" charset="0"/>
+                        </a:rPr>
+                        <a:t>public</a:t>
+                      </a:r>
+                      <a:r>
+                        <a:rPr lang="en-US" sz="1800" dirty="0">
+                          <a:solidFill>
+                            <a:srgbClr val="000000"/>
+                          </a:solidFill>
+                          <a:latin typeface="Consolas" panose="020B0609020204030204" pitchFamily="49" charset="0"/>
+                        </a:rPr>
+                        <a:t> </a:t>
+                      </a:r>
+                      <a:r>
+                        <a:rPr lang="en-US" sz="1800" dirty="0">
+                          <a:solidFill>
+                            <a:srgbClr val="0000FF"/>
+                          </a:solidFill>
+                          <a:latin typeface="Consolas" panose="020B0609020204030204" pitchFamily="49" charset="0"/>
+                        </a:rPr>
+                        <a:t>class</a:t>
+                      </a:r>
+                      <a:r>
+                        <a:rPr lang="en-US" sz="1800" dirty="0">
+                          <a:solidFill>
+                            <a:srgbClr val="000000"/>
+                          </a:solidFill>
+                          <a:latin typeface="Consolas" panose="020B0609020204030204" pitchFamily="49" charset="0"/>
+                        </a:rPr>
+                        <a:t> </a:t>
+                      </a:r>
+                      <a:r>
+                        <a:rPr lang="en-US" sz="1800" dirty="0">
+                          <a:solidFill>
+                            <a:srgbClr val="2B91AF"/>
+                          </a:solidFill>
+                          <a:latin typeface="Consolas" panose="020B0609020204030204" pitchFamily="49" charset="0"/>
+                        </a:rPr>
+                        <a:t>Startup</a:t>
+                      </a:r>
+                      <a:endParaRPr lang="en-US" sz="1800" dirty="0">
+                        <a:solidFill>
+                          <a:srgbClr val="000000"/>
+                        </a:solidFill>
+                        <a:latin typeface="Consolas" panose="020B0609020204030204" pitchFamily="49" charset="0"/>
+                      </a:endParaRPr>
+                    </a:p>
+                    <a:p>
+                      <a:r>
+                        <a:rPr lang="en-US" sz="1800" dirty="0">
+                          <a:solidFill>
+                            <a:srgbClr val="000000"/>
+                          </a:solidFill>
+                          <a:latin typeface="Consolas" panose="020B0609020204030204" pitchFamily="49" charset="0"/>
+                        </a:rPr>
+                        <a:t>{</a:t>
+                      </a:r>
+                    </a:p>
+                    <a:p>
+                      <a:r>
+                        <a:rPr lang="en-US" sz="1800" dirty="0">
+                          <a:solidFill>
+                            <a:srgbClr val="000000"/>
+                          </a:solidFill>
+                          <a:latin typeface="Consolas" panose="020B0609020204030204" pitchFamily="49" charset="0"/>
+                        </a:rPr>
+                        <a:t>    </a:t>
+                      </a:r>
+                      <a:r>
+                        <a:rPr lang="en-US" sz="1800" dirty="0">
+                          <a:solidFill>
+                            <a:srgbClr val="0000FF"/>
+                          </a:solidFill>
+                          <a:latin typeface="Consolas" panose="020B0609020204030204" pitchFamily="49" charset="0"/>
+                        </a:rPr>
+                        <a:t>private</a:t>
+                      </a:r>
+                      <a:r>
+                        <a:rPr lang="en-US" sz="1800" dirty="0">
+                          <a:solidFill>
+                            <a:srgbClr val="000000"/>
+                          </a:solidFill>
+                          <a:latin typeface="Consolas" panose="020B0609020204030204" pitchFamily="49" charset="0"/>
+                        </a:rPr>
+                        <a:t> </a:t>
+                      </a:r>
+                      <a:r>
+                        <a:rPr lang="en-US" sz="1800" dirty="0">
+                          <a:solidFill>
+                            <a:srgbClr val="0000FF"/>
+                          </a:solidFill>
+                          <a:latin typeface="Consolas" panose="020B0609020204030204" pitchFamily="49" charset="0"/>
+                        </a:rPr>
+                        <a:t>string</a:t>
+                      </a:r>
+                      <a:r>
+                        <a:rPr lang="en-US" sz="1800" dirty="0">
+                          <a:solidFill>
+                            <a:srgbClr val="000000"/>
+                          </a:solidFill>
+                          <a:latin typeface="Consolas" panose="020B0609020204030204" pitchFamily="49" charset="0"/>
+                        </a:rPr>
+                        <a:t> _connection = </a:t>
+                      </a:r>
+                      <a:r>
+                        <a:rPr lang="en-US" sz="1800" dirty="0">
+                          <a:solidFill>
+                            <a:srgbClr val="0000FF"/>
+                          </a:solidFill>
+                          <a:latin typeface="Consolas" panose="020B0609020204030204" pitchFamily="49" charset="0"/>
+                        </a:rPr>
+                        <a:t>null</a:t>
+                      </a:r>
+                      <a:r>
+                        <a:rPr lang="en-US" sz="1800" dirty="0">
+                          <a:solidFill>
+                            <a:srgbClr val="000000"/>
+                          </a:solidFill>
+                          <a:latin typeface="Consolas" panose="020B0609020204030204" pitchFamily="49" charset="0"/>
+                        </a:rPr>
+                        <a:t>;</a:t>
+                      </a:r>
+                    </a:p>
+                    <a:p>
+                      <a:endParaRPr lang="en-US" sz="1800" dirty="0">
+                        <a:solidFill>
+                          <a:srgbClr val="000000"/>
+                        </a:solidFill>
+                        <a:latin typeface="Consolas" panose="020B0609020204030204" pitchFamily="49" charset="0"/>
+                      </a:endParaRPr>
+                    </a:p>
+                    <a:p>
+                      <a:r>
+                        <a:rPr lang="en-US" sz="1800" dirty="0">
+                          <a:solidFill>
+                            <a:srgbClr val="000000"/>
+                          </a:solidFill>
+                          <a:latin typeface="Consolas" panose="020B0609020204030204" pitchFamily="49" charset="0"/>
+                        </a:rPr>
+                        <a:t>    </a:t>
+                      </a:r>
+                      <a:r>
+                        <a:rPr lang="en-US" sz="1800" dirty="0">
+                          <a:solidFill>
+                            <a:srgbClr val="0000FF"/>
+                          </a:solidFill>
+                          <a:latin typeface="Consolas" panose="020B0609020204030204" pitchFamily="49" charset="0"/>
+                        </a:rPr>
+                        <a:t>public</a:t>
+                      </a:r>
+                      <a:r>
+                        <a:rPr lang="en-US" sz="1800" dirty="0">
+                          <a:solidFill>
+                            <a:srgbClr val="000000"/>
+                          </a:solidFill>
+                          <a:latin typeface="Consolas" panose="020B0609020204030204" pitchFamily="49" charset="0"/>
+                        </a:rPr>
+                        <a:t> Startup(</a:t>
+                      </a:r>
+                      <a:r>
+                        <a:rPr lang="en-US" sz="1800" dirty="0" err="1">
+                          <a:solidFill>
+                            <a:srgbClr val="000000"/>
+                          </a:solidFill>
+                          <a:latin typeface="Consolas" panose="020B0609020204030204" pitchFamily="49" charset="0"/>
+                        </a:rPr>
+                        <a:t>IConfiguration</a:t>
+                      </a:r>
+                      <a:r>
+                        <a:rPr lang="en-US" sz="1800" dirty="0">
+                          <a:solidFill>
+                            <a:srgbClr val="000000"/>
+                          </a:solidFill>
+                          <a:latin typeface="Consolas" panose="020B0609020204030204" pitchFamily="49" charset="0"/>
+                        </a:rPr>
+                        <a:t> configuration)</a:t>
+                      </a:r>
+                    </a:p>
+                    <a:p>
+                      <a:r>
+                        <a:rPr lang="en-US" sz="1800" dirty="0">
+                          <a:solidFill>
+                            <a:srgbClr val="000000"/>
+                          </a:solidFill>
+                          <a:latin typeface="Consolas" panose="020B0609020204030204" pitchFamily="49" charset="0"/>
+                        </a:rPr>
+                        <a:t>        =&gt; Configuration = configuration;</a:t>
+                      </a:r>
+                    </a:p>
+                    <a:p>
+                      <a:endParaRPr lang="en-US" sz="1800" dirty="0">
+                        <a:solidFill>
+                          <a:srgbClr val="000000"/>
+                        </a:solidFill>
+                        <a:latin typeface="Consolas" panose="020B0609020204030204" pitchFamily="49" charset="0"/>
+                      </a:endParaRPr>
+                    </a:p>
+                    <a:p>
+                      <a:r>
+                        <a:rPr lang="en-US" sz="1800" dirty="0">
+                          <a:solidFill>
+                            <a:srgbClr val="000000"/>
+                          </a:solidFill>
+                          <a:latin typeface="Consolas" panose="020B0609020204030204" pitchFamily="49" charset="0"/>
+                        </a:rPr>
+                        <a:t>    </a:t>
+                      </a:r>
+                      <a:r>
+                        <a:rPr lang="en-US" sz="1800" dirty="0">
+                          <a:solidFill>
+                            <a:srgbClr val="0000FF"/>
+                          </a:solidFill>
+                          <a:latin typeface="Consolas" panose="020B0609020204030204" pitchFamily="49" charset="0"/>
+                        </a:rPr>
+                        <a:t>public</a:t>
+                      </a:r>
+                      <a:r>
+                        <a:rPr lang="en-US" sz="1800" dirty="0">
+                          <a:solidFill>
+                            <a:srgbClr val="000000"/>
+                          </a:solidFill>
+                          <a:latin typeface="Consolas" panose="020B0609020204030204" pitchFamily="49" charset="0"/>
+                        </a:rPr>
+                        <a:t> </a:t>
+                      </a:r>
+                      <a:r>
+                        <a:rPr lang="en-US" sz="1800" dirty="0" err="1">
+                          <a:solidFill>
+                            <a:srgbClr val="000000"/>
+                          </a:solidFill>
+                          <a:latin typeface="Consolas" panose="020B0609020204030204" pitchFamily="49" charset="0"/>
+                        </a:rPr>
+                        <a:t>IConfiguration</a:t>
+                      </a:r>
+                      <a:r>
+                        <a:rPr lang="en-US" sz="1800" dirty="0">
+                          <a:solidFill>
+                            <a:srgbClr val="000000"/>
+                          </a:solidFill>
+                          <a:latin typeface="Consolas" panose="020B0609020204030204" pitchFamily="49" charset="0"/>
+                        </a:rPr>
+                        <a:t> Configuration { </a:t>
+                      </a:r>
+                      <a:r>
+                        <a:rPr lang="en-US" sz="1800" dirty="0">
+                          <a:solidFill>
+                            <a:srgbClr val="0000FF"/>
+                          </a:solidFill>
+                          <a:latin typeface="Consolas" panose="020B0609020204030204" pitchFamily="49" charset="0"/>
+                        </a:rPr>
+                        <a:t>get</a:t>
+                      </a:r>
+                      <a:r>
+                        <a:rPr lang="en-US" sz="1800" dirty="0">
+                          <a:solidFill>
+                            <a:srgbClr val="000000"/>
+                          </a:solidFill>
+                          <a:latin typeface="Consolas" panose="020B0609020204030204" pitchFamily="49" charset="0"/>
+                        </a:rPr>
+                        <a:t>; }</a:t>
+                      </a:r>
+                    </a:p>
+                    <a:p>
+                      <a:endParaRPr lang="en-US" sz="1800" dirty="0">
+                        <a:solidFill>
+                          <a:srgbClr val="000000"/>
+                        </a:solidFill>
+                        <a:latin typeface="Consolas" panose="020B0609020204030204" pitchFamily="49" charset="0"/>
+                      </a:endParaRPr>
+                    </a:p>
+                    <a:p>
+                      <a:r>
+                        <a:rPr lang="en-US" sz="1800" dirty="0">
+                          <a:solidFill>
+                            <a:srgbClr val="000000"/>
+                          </a:solidFill>
+                          <a:latin typeface="Consolas" panose="020B0609020204030204" pitchFamily="49" charset="0"/>
+                        </a:rPr>
+                        <a:t>    </a:t>
+                      </a:r>
+                      <a:r>
+                        <a:rPr lang="en-US" sz="1800" dirty="0">
+                          <a:solidFill>
+                            <a:srgbClr val="0000FF"/>
+                          </a:solidFill>
+                          <a:latin typeface="Consolas" panose="020B0609020204030204" pitchFamily="49" charset="0"/>
+                        </a:rPr>
+                        <a:t>public</a:t>
+                      </a:r>
+                      <a:r>
+                        <a:rPr lang="en-US" sz="1800" dirty="0">
+                          <a:solidFill>
+                            <a:srgbClr val="000000"/>
+                          </a:solidFill>
+                          <a:latin typeface="Consolas" panose="020B0609020204030204" pitchFamily="49" charset="0"/>
+                        </a:rPr>
+                        <a:t> </a:t>
+                      </a:r>
+                      <a:r>
+                        <a:rPr lang="en-US" sz="1800" dirty="0">
+                          <a:solidFill>
+                            <a:srgbClr val="0000FF"/>
+                          </a:solidFill>
+                          <a:latin typeface="Consolas" panose="020B0609020204030204" pitchFamily="49" charset="0"/>
+                        </a:rPr>
+                        <a:t>void</a:t>
+                      </a:r>
+                      <a:r>
+                        <a:rPr lang="en-US" sz="1800" dirty="0">
+                          <a:solidFill>
+                            <a:srgbClr val="000000"/>
+                          </a:solidFill>
+                          <a:latin typeface="Consolas" panose="020B0609020204030204" pitchFamily="49" charset="0"/>
+                        </a:rPr>
+                        <a:t> </a:t>
+                      </a:r>
+                      <a:r>
+                        <a:rPr lang="en-US" sz="1800" dirty="0" err="1">
+                          <a:solidFill>
+                            <a:srgbClr val="000000"/>
+                          </a:solidFill>
+                          <a:latin typeface="Consolas" panose="020B0609020204030204" pitchFamily="49" charset="0"/>
+                        </a:rPr>
+                        <a:t>ConfigureServices</a:t>
+                      </a:r>
+                      <a:r>
+                        <a:rPr lang="en-US" sz="1800" dirty="0">
+                          <a:solidFill>
+                            <a:srgbClr val="000000"/>
+                          </a:solidFill>
+                          <a:latin typeface="Consolas" panose="020B0609020204030204" pitchFamily="49" charset="0"/>
+                        </a:rPr>
+                        <a:t>(</a:t>
+                      </a:r>
+                      <a:r>
+                        <a:rPr lang="en-US" sz="1800" dirty="0" err="1">
+                          <a:solidFill>
+                            <a:srgbClr val="000000"/>
+                          </a:solidFill>
+                          <a:latin typeface="Consolas" panose="020B0609020204030204" pitchFamily="49" charset="0"/>
+                        </a:rPr>
+                        <a:t>IServiceCollection</a:t>
+                      </a:r>
+                      <a:r>
+                        <a:rPr lang="en-US" sz="1800" dirty="0">
+                          <a:solidFill>
+                            <a:srgbClr val="000000"/>
+                          </a:solidFill>
+                          <a:latin typeface="Consolas" panose="020B0609020204030204" pitchFamily="49" charset="0"/>
+                        </a:rPr>
+                        <a:t> services)</a:t>
+                      </a:r>
+                    </a:p>
+                    <a:p>
+                      <a:r>
+                        <a:rPr lang="en-US" sz="1800" dirty="0">
+                          <a:solidFill>
+                            <a:srgbClr val="000000"/>
+                          </a:solidFill>
+                          <a:latin typeface="Consolas" panose="020B0609020204030204" pitchFamily="49" charset="0"/>
+                        </a:rPr>
+                        <a:t>    {</a:t>
+                      </a:r>
+                    </a:p>
+                    <a:p>
+                      <a:r>
+                        <a:rPr lang="en-US" sz="1800" dirty="0">
+                          <a:solidFill>
+                            <a:srgbClr val="000000"/>
+                          </a:solidFill>
+                          <a:latin typeface="Consolas" panose="020B0609020204030204" pitchFamily="49" charset="0"/>
+                        </a:rPr>
+                        <a:t>        </a:t>
+                      </a:r>
+                      <a:r>
+                        <a:rPr lang="en-US" sz="1800" dirty="0">
+                          <a:solidFill>
+                            <a:srgbClr val="0000FF"/>
+                          </a:solidFill>
+                          <a:latin typeface="Consolas" panose="020B0609020204030204" pitchFamily="49" charset="0"/>
+                        </a:rPr>
+                        <a:t>var</a:t>
+                      </a:r>
+                      <a:r>
+                        <a:rPr lang="en-US" sz="1800" dirty="0">
+                          <a:solidFill>
+                            <a:srgbClr val="000000"/>
+                          </a:solidFill>
+                          <a:latin typeface="Consolas" panose="020B0609020204030204" pitchFamily="49" charset="0"/>
+                        </a:rPr>
+                        <a:t> builder = </a:t>
+                      </a:r>
+                      <a:r>
+                        <a:rPr lang="en-US" sz="1800" dirty="0">
+                          <a:solidFill>
+                            <a:srgbClr val="0000FF"/>
+                          </a:solidFill>
+                          <a:latin typeface="Consolas" panose="020B0609020204030204" pitchFamily="49" charset="0"/>
+                        </a:rPr>
+                        <a:t>new</a:t>
+                      </a:r>
+                      <a:r>
+                        <a:rPr lang="en-US" sz="1800" dirty="0">
+                          <a:solidFill>
+                            <a:srgbClr val="000000"/>
+                          </a:solidFill>
+                          <a:latin typeface="Consolas" panose="020B0609020204030204" pitchFamily="49" charset="0"/>
+                        </a:rPr>
+                        <a:t> </a:t>
+                      </a:r>
+                      <a:r>
+                        <a:rPr lang="en-US" sz="1800" dirty="0" err="1">
+                          <a:solidFill>
+                            <a:srgbClr val="000000"/>
+                          </a:solidFill>
+                          <a:latin typeface="Consolas" panose="020B0609020204030204" pitchFamily="49" charset="0"/>
+                        </a:rPr>
+                        <a:t>SqlConnectionStringBuilder</a:t>
+                      </a:r>
+                      <a:r>
+                        <a:rPr lang="en-US" sz="1800" dirty="0">
+                          <a:solidFill>
+                            <a:srgbClr val="000000"/>
+                          </a:solidFill>
+                          <a:latin typeface="Consolas" panose="020B0609020204030204" pitchFamily="49" charset="0"/>
+                        </a:rPr>
+                        <a:t>(</a:t>
+                      </a:r>
+                    </a:p>
+                    <a:p>
+                      <a:r>
+                        <a:rPr lang="en-US" sz="1800" dirty="0">
+                          <a:solidFill>
+                            <a:srgbClr val="000000"/>
+                          </a:solidFill>
+                          <a:latin typeface="Consolas" panose="020B0609020204030204" pitchFamily="49" charset="0"/>
+                        </a:rPr>
+                        <a:t>            </a:t>
+                      </a:r>
+                      <a:r>
+                        <a:rPr lang="en-US" sz="1800" dirty="0" err="1">
+                          <a:solidFill>
+                            <a:srgbClr val="000000"/>
+                          </a:solidFill>
+                          <a:latin typeface="Consolas" panose="020B0609020204030204" pitchFamily="49" charset="0"/>
+                        </a:rPr>
+                        <a:t>Configuration.GetConnectionString</a:t>
+                      </a:r>
+                      <a:r>
+                        <a:rPr lang="en-US" sz="1800" dirty="0">
+                          <a:solidFill>
+                            <a:srgbClr val="000000"/>
+                          </a:solidFill>
+                          <a:latin typeface="Consolas" panose="020B0609020204030204" pitchFamily="49" charset="0"/>
+                        </a:rPr>
+                        <a:t>(</a:t>
+                      </a:r>
+                      <a:r>
+                        <a:rPr lang="en-US" sz="1800" dirty="0">
+                          <a:solidFill>
+                            <a:srgbClr val="A31515"/>
+                          </a:solidFill>
+                          <a:latin typeface="Consolas" panose="020B0609020204030204" pitchFamily="49" charset="0"/>
+                        </a:rPr>
+                        <a:t>"Movies"</a:t>
+                      </a:r>
+                      <a:r>
+                        <a:rPr lang="en-US" sz="1800" dirty="0">
+                          <a:solidFill>
+                            <a:srgbClr val="000000"/>
+                          </a:solidFill>
+                          <a:latin typeface="Consolas" panose="020B0609020204030204" pitchFamily="49" charset="0"/>
+                        </a:rPr>
+                        <a:t>));</a:t>
+                      </a:r>
+                    </a:p>
+                    <a:p>
+                      <a:r>
+                        <a:rPr lang="en-US" sz="1800" dirty="0">
+                          <a:solidFill>
+                            <a:srgbClr val="000000"/>
+                          </a:solidFill>
+                          <a:latin typeface="Consolas" panose="020B0609020204030204" pitchFamily="49" charset="0"/>
+                        </a:rPr>
+                        <a:t>        </a:t>
+                      </a:r>
+                      <a:r>
+                        <a:rPr lang="en-US" sz="1800" dirty="0" err="1">
+                          <a:solidFill>
+                            <a:srgbClr val="000000"/>
+                          </a:solidFill>
+                          <a:latin typeface="Consolas" panose="020B0609020204030204" pitchFamily="49" charset="0"/>
+                        </a:rPr>
+                        <a:t>builder.UserID</a:t>
+                      </a:r>
+                      <a:r>
+                        <a:rPr lang="en-US" sz="1800" dirty="0">
+                          <a:solidFill>
+                            <a:srgbClr val="000000"/>
+                          </a:solidFill>
+                          <a:latin typeface="Consolas" panose="020B0609020204030204" pitchFamily="49" charset="0"/>
+                        </a:rPr>
+                        <a:t> = Configuration[</a:t>
+                      </a:r>
+                      <a:r>
+                        <a:rPr lang="en-US" sz="1800" dirty="0">
+                          <a:solidFill>
+                            <a:srgbClr val="A31515"/>
+                          </a:solidFill>
+                          <a:latin typeface="Consolas" panose="020B0609020204030204" pitchFamily="49" charset="0"/>
+                        </a:rPr>
+                        <a:t>"</a:t>
+                      </a:r>
+                      <a:r>
+                        <a:rPr lang="en-US" sz="1800" dirty="0" err="1">
+                          <a:solidFill>
+                            <a:srgbClr val="A31515"/>
+                          </a:solidFill>
+                          <a:latin typeface="Consolas" panose="020B0609020204030204" pitchFamily="49" charset="0"/>
+                        </a:rPr>
+                        <a:t>Movies:User</a:t>
+                      </a:r>
+                      <a:r>
+                        <a:rPr lang="en-US" sz="1800" dirty="0">
+                          <a:solidFill>
+                            <a:srgbClr val="A31515"/>
+                          </a:solidFill>
+                          <a:latin typeface="Consolas" panose="020B0609020204030204" pitchFamily="49" charset="0"/>
+                        </a:rPr>
+                        <a:t>"</a:t>
+                      </a:r>
+                      <a:r>
+                        <a:rPr lang="en-US" sz="1800" dirty="0">
+                          <a:solidFill>
+                            <a:srgbClr val="000000"/>
+                          </a:solidFill>
+                          <a:latin typeface="Consolas" panose="020B0609020204030204" pitchFamily="49" charset="0"/>
+                        </a:rPr>
+                        <a:t>];</a:t>
+                      </a:r>
+                    </a:p>
+                    <a:p>
+                      <a:r>
+                        <a:rPr lang="en-US" sz="1800" dirty="0">
+                          <a:solidFill>
+                            <a:srgbClr val="000000"/>
+                          </a:solidFill>
+                          <a:latin typeface="Consolas" panose="020B0609020204030204" pitchFamily="49" charset="0"/>
+                        </a:rPr>
+                        <a:t>        </a:t>
+                      </a:r>
+                      <a:r>
+                        <a:rPr lang="en-US" sz="1800" dirty="0" err="1">
+                          <a:solidFill>
+                            <a:srgbClr val="000000"/>
+                          </a:solidFill>
+                          <a:latin typeface="Consolas" panose="020B0609020204030204" pitchFamily="49" charset="0"/>
+                        </a:rPr>
+                        <a:t>builder.Password</a:t>
+                      </a:r>
+                      <a:r>
+                        <a:rPr lang="en-US" sz="1800" dirty="0">
+                          <a:solidFill>
+                            <a:srgbClr val="000000"/>
+                          </a:solidFill>
+                          <a:latin typeface="Consolas" panose="020B0609020204030204" pitchFamily="49" charset="0"/>
+                        </a:rPr>
+                        <a:t> = Configuration[</a:t>
+                      </a:r>
+                      <a:r>
+                        <a:rPr lang="en-US" sz="1800" dirty="0">
+                          <a:solidFill>
+                            <a:srgbClr val="A31515"/>
+                          </a:solidFill>
+                          <a:latin typeface="Consolas" panose="020B0609020204030204" pitchFamily="49" charset="0"/>
+                        </a:rPr>
+                        <a:t>"</a:t>
+                      </a:r>
+                      <a:r>
+                        <a:rPr lang="en-US" sz="1800" dirty="0" err="1">
+                          <a:solidFill>
+                            <a:srgbClr val="A31515"/>
+                          </a:solidFill>
+                          <a:latin typeface="Consolas" panose="020B0609020204030204" pitchFamily="49" charset="0"/>
+                        </a:rPr>
+                        <a:t>Movies:Password</a:t>
+                      </a:r>
+                      <a:r>
+                        <a:rPr lang="en-US" sz="1800" dirty="0">
+                          <a:solidFill>
+                            <a:srgbClr val="A31515"/>
+                          </a:solidFill>
+                          <a:latin typeface="Consolas" panose="020B0609020204030204" pitchFamily="49" charset="0"/>
+                        </a:rPr>
+                        <a:t>"</a:t>
+                      </a:r>
+                      <a:r>
+                        <a:rPr lang="en-US" sz="1800" dirty="0">
+                          <a:solidFill>
+                            <a:srgbClr val="000000"/>
+                          </a:solidFill>
+                          <a:latin typeface="Consolas" panose="020B0609020204030204" pitchFamily="49" charset="0"/>
+                        </a:rPr>
+                        <a:t>];</a:t>
+                      </a:r>
+                    </a:p>
+                    <a:p>
+                      <a:r>
+                        <a:rPr lang="en-US" sz="1800" dirty="0">
+                          <a:solidFill>
+                            <a:srgbClr val="000000"/>
+                          </a:solidFill>
+                          <a:latin typeface="Consolas" panose="020B0609020204030204" pitchFamily="49" charset="0"/>
+                        </a:rPr>
+                        <a:t>        _connection = </a:t>
+                      </a:r>
+                      <a:r>
+                        <a:rPr lang="en-US" sz="1800" dirty="0" err="1">
+                          <a:solidFill>
+                            <a:srgbClr val="000000"/>
+                          </a:solidFill>
+                          <a:latin typeface="Consolas" panose="020B0609020204030204" pitchFamily="49" charset="0"/>
+                        </a:rPr>
+                        <a:t>builder.ConnectionString</a:t>
+                      </a:r>
+                      <a:r>
+                        <a:rPr lang="en-US" sz="1800">
+                          <a:solidFill>
+                            <a:srgbClr val="000000"/>
+                          </a:solidFill>
+                          <a:latin typeface="Consolas" panose="020B0609020204030204" pitchFamily="49" charset="0"/>
+                        </a:rPr>
+                        <a:t>;</a:t>
+                      </a:r>
+                      <a:endParaRPr lang="en-US" sz="1800" dirty="0">
+                        <a:solidFill>
+                          <a:srgbClr val="000000"/>
+                        </a:solidFill>
+                        <a:latin typeface="Consolas" panose="020B0609020204030204" pitchFamily="49" charset="0"/>
+                      </a:endParaRPr>
+                    </a:p>
+                  </a:txBody>
+                  <a:tcPr>
+                    <a:lnL w="12700" cap="flat" cmpd="sng" algn="ctr">
+                      <a:solidFill>
+                        <a:sysClr val="window" lastClr="FFFFFF"/>
+                      </a:solidFill>
+                      <a:prstDash val="solid"/>
+                      <a:round/>
+                      <a:headEnd type="none" w="med" len="med"/>
+                      <a:tailEnd type="none" w="med" len="med"/>
+                    </a:lnL>
+                    <a:lnR w="12700" cap="flat" cmpd="sng" algn="ctr">
+                      <a:solidFill>
+                        <a:sysClr val="window" lastClr="FFFFFF"/>
+                      </a:solidFill>
+                      <a:prstDash val="solid"/>
+                      <a:round/>
+                      <a:headEnd type="none" w="med" len="med"/>
+                      <a:tailEnd type="none" w="med" len="med"/>
+                    </a:lnR>
+                    <a:lnT w="12700" cap="flat" cmpd="sng" algn="ctr">
+                      <a:solidFill>
+                        <a:sysClr val="window" lastClr="FFFFFF"/>
+                      </a:solidFill>
+                      <a:prstDash val="solid"/>
+                      <a:round/>
+                      <a:headEnd type="none" w="med" len="med"/>
+                      <a:tailEnd type="none" w="med" len="med"/>
+                    </a:lnT>
+                    <a:lnB w="12700" cap="flat" cmpd="sng" algn="ctr">
+                      <a:solidFill>
+                        <a:sysClr val="window" lastClr="FFFFFF"/>
+                      </a:solidFill>
+                      <a:prstDash val="solid"/>
+                      <a:round/>
+                      <a:headEnd type="none" w="med" len="med"/>
+                      <a:tailEnd type="none" w="med" len="med"/>
+                    </a:lnB>
+                    <a:lnTlToBr w="12700" cmpd="sng">
+                      <a:noFill/>
+                      <a:prstDash val="solid"/>
+                    </a:lnTlToBr>
+                    <a:lnBlToTr w="12700" cmpd="sng">
+                      <a:noFill/>
+                      <a:prstDash val="solid"/>
+                    </a:lnBlToTr>
+                    <a:solidFill>
+                      <a:sysClr val="window" lastClr="FFFFFF"/>
+                    </a:solidFill>
+                  </a:tcPr>
+                </a:tc>
+                <a:extLst>
+                  <a:ext uri="{0D108BD9-81ED-4DB2-BD59-A6C34878D82A}">
+                    <a16:rowId xmlns:a16="http://schemas.microsoft.com/office/drawing/2014/main" val="3473222697"/>
+                  </a:ext>
+                </a:extLst>
+              </a:tr>
+              <a:tr h="344917">
+                <a:tc>
+                  <a:txBody>
+                    <a:bodyPr/>
+                    <a:lstStyle/>
+                    <a:p>
+                      <a:endParaRPr lang="en-US" sz="1800" dirty="0">
+                        <a:solidFill>
+                          <a:srgbClr val="000000"/>
+                        </a:solidFill>
+                        <a:latin typeface="Consolas" panose="020B0609020204030204" pitchFamily="49" charset="0"/>
+                      </a:endParaRPr>
+                    </a:p>
+                  </a:txBody>
+                  <a:tcPr>
+                    <a:lnL w="12700" cap="flat" cmpd="sng" algn="ctr">
+                      <a:solidFill>
+                        <a:sysClr val="window" lastClr="FFFFFF"/>
+                      </a:solidFill>
+                      <a:prstDash val="solid"/>
+                      <a:round/>
+                      <a:headEnd type="none" w="med" len="med"/>
+                      <a:tailEnd type="none" w="med" len="med"/>
+                    </a:lnL>
+                    <a:lnR w="12700" cap="flat" cmpd="sng" algn="ctr">
+                      <a:solidFill>
+                        <a:sysClr val="window" lastClr="FFFFFF"/>
+                      </a:solidFill>
+                      <a:prstDash val="solid"/>
+                      <a:round/>
+                      <a:headEnd type="none" w="med" len="med"/>
+                      <a:tailEnd type="none" w="med" len="med"/>
+                    </a:lnR>
+                    <a:lnT w="12700" cap="flat" cmpd="sng" algn="ctr">
+                      <a:solidFill>
+                        <a:sysClr val="window" lastClr="FFFFFF"/>
+                      </a:solidFill>
+                      <a:prstDash val="solid"/>
+                      <a:round/>
+                      <a:headEnd type="none" w="med" len="med"/>
+                      <a:tailEnd type="none" w="med" len="med"/>
+                    </a:lnT>
+                    <a:lnB w="12700" cap="flat" cmpd="sng" algn="ctr">
+                      <a:solidFill>
+                        <a:sysClr val="window" lastClr="FFFFFF"/>
+                      </a:solidFill>
+                      <a:prstDash val="solid"/>
+                      <a:round/>
+                      <a:headEnd type="none" w="med" len="med"/>
+                      <a:tailEnd type="none" w="med" len="med"/>
+                    </a:lnB>
+                    <a:lnTlToBr w="12700" cmpd="sng">
+                      <a:noFill/>
+                      <a:prstDash val="solid"/>
+                    </a:lnTlToBr>
+                    <a:lnBlToTr w="12700" cmpd="sng">
+                      <a:noFill/>
+                      <a:prstDash val="solid"/>
+                    </a:lnBlToTr>
+                    <a:solidFill>
+                      <a:sysClr val="window" lastClr="FFFFFF"/>
+                    </a:solidFill>
+                  </a:tcPr>
+                </a:tc>
+                <a:extLst>
+                  <a:ext uri="{0D108BD9-81ED-4DB2-BD59-A6C34878D82A}">
+                    <a16:rowId xmlns:a16="http://schemas.microsoft.com/office/drawing/2014/main" val="97062865"/>
+                  </a:ext>
+                </a:extLst>
+              </a:tr>
+            </a:tbl>
+          </a:graphicData>
+        </a:graphic>
+      </p:graphicFrame>
+      <p:sp>
+        <p:nvSpPr>
+          <p:cNvPr id="5" name="Rectangle 4">
+            <a:extLst>
+              <a:ext uri="{FF2B5EF4-FFF2-40B4-BE49-F238E27FC236}">
+                <a16:creationId xmlns:a16="http://schemas.microsoft.com/office/drawing/2014/main" id="{968B1320-9F80-48D4-8F49-987C2A75ECD9}"/>
+              </a:ext>
+            </a:extLst>
+          </p:cNvPr>
+          <p:cNvSpPr/>
+          <p:nvPr/>
+        </p:nvSpPr>
+        <p:spPr>
+          <a:xfrm>
+            <a:off x="838200" y="1474306"/>
+            <a:ext cx="1978891" cy="446567"/>
+          </a:xfrm>
+          <a:prstGeom prst="rect">
+            <a:avLst/>
+          </a:prstGeom>
+          <a:gradFill rotWithShape="1">
+            <a:gsLst>
+              <a:gs pos="0">
+                <a:srgbClr val="5B9BD5">
+                  <a:lumMod val="110000"/>
+                  <a:satMod val="105000"/>
+                  <a:tint val="67000"/>
+                </a:srgbClr>
+              </a:gs>
+              <a:gs pos="50000">
+                <a:srgbClr val="5B9BD5">
+                  <a:lumMod val="105000"/>
+                  <a:satMod val="103000"/>
+                  <a:tint val="73000"/>
+                </a:srgbClr>
+              </a:gs>
+              <a:gs pos="100000">
+                <a:srgbClr val="5B9BD5">
+                  <a:lumMod val="105000"/>
+                  <a:satMod val="109000"/>
+                  <a:tint val="81000"/>
+                </a:srgbClr>
+              </a:gs>
+            </a:gsLst>
+            <a:lin ang="5400000" scaled="0"/>
+          </a:gradFill>
+          <a:ln w="6350" cap="flat" cmpd="sng" algn="ctr">
+            <a:solidFill>
+              <a:srgbClr val="5B9BD5"/>
+            </a:solidFill>
+            <a:prstDash val="solid"/>
+            <a:miter lim="800000"/>
+          </a:ln>
+          <a:effectLst/>
+        </p:spPr>
+        <p:txBody>
+          <a:bodyPr rtlCol="0" anchor="ctr"/>
+          <a:lstStyle/>
+          <a:p>
+            <a:pPr marL="0" marR="0" lvl="0" indent="0" algn="ctr" defTabSz="914400" eaLnBrk="1" fontAlgn="auto" latinLnBrk="0" hangingPunct="1">
+              <a:lnSpc>
+                <a:spcPct val="100000"/>
+              </a:lnSpc>
+              <a:spcBef>
+                <a:spcPts val="0"/>
+              </a:spcBef>
+              <a:spcAft>
+                <a:spcPts val="0"/>
+              </a:spcAft>
+              <a:buClrTx/>
+              <a:buSzTx/>
+              <a:buFontTx/>
+              <a:buNone/>
+              <a:tabLst/>
+              <a:defRPr/>
+            </a:pPr>
+            <a:r>
+              <a:rPr lang="en-US" b="1" kern="0" dirty="0" err="1">
+                <a:solidFill>
+                  <a:prstClr val="black"/>
+                </a:solidFill>
+                <a:latin typeface="Segoe UI Light"/>
+              </a:rPr>
+              <a:t>Startup.cs</a:t>
+            </a:r>
+            <a:endParaRPr kumimoji="0" lang="en-US" sz="1800" b="1" i="0" u="none" strike="noStrike" kern="0" cap="none" spc="0" normalizeH="0" baseline="0" noProof="0" dirty="0">
+              <a:ln>
+                <a:noFill/>
+              </a:ln>
+              <a:solidFill>
+                <a:prstClr val="black"/>
+              </a:solidFill>
+              <a:effectLst/>
+              <a:uLnTx/>
+              <a:uFillTx/>
+              <a:latin typeface="Segoe UI Light"/>
+              <a:ea typeface="+mn-ea"/>
+              <a:cs typeface="+mn-cs"/>
+            </a:endParaRPr>
           </a:p>
         </p:txBody>
       </p:sp>
@@ -15891,6 +16894,76 @@
                                   </p:childTnLst>
                                 </p:cTn>
                               </p:par>
+                              <p:par>
+                                <p:cTn id="8" presetID="10" presetClass="entr" presetSubtype="0" fill="hold" grpId="0" nodeType="withEffect">
+                                  <p:stCondLst>
+                                    <p:cond delay="0"/>
+                                  </p:stCondLst>
+                                  <p:childTnLst>
+                                    <p:set>
+                                      <p:cBhvr>
+                                        <p:cTn id="9" dur="1" fill="hold">
+                                          <p:stCondLst>
+                                            <p:cond delay="0"/>
+                                          </p:stCondLst>
+                                        </p:cTn>
+                                        <p:tgtEl>
+                                          <p:spTgt spid="5"/>
+                                        </p:tgtEl>
+                                        <p:attrNameLst>
+                                          <p:attrName>style.visibility</p:attrName>
+                                        </p:attrNameLst>
+                                      </p:cBhvr>
+                                      <p:to>
+                                        <p:strVal val="visible"/>
+                                      </p:to>
+                                    </p:set>
+                                    <p:animEffect transition="in" filter="fade">
+                                      <p:cBhvr>
+                                        <p:cTn id="10" dur="500"/>
+                                        <p:tgtEl>
+                                          <p:spTgt spid="5"/>
+                                        </p:tgtEl>
+                                      </p:cBhvr>
+                                    </p:animEffect>
+                                  </p:childTnLst>
+                                </p:cTn>
+                              </p:par>
+                              <p:par>
+                                <p:cTn id="11" presetID="10" presetClass="entr" presetSubtype="0" fill="hold" nodeType="withEffect">
+                                  <p:stCondLst>
+                                    <p:cond delay="0"/>
+                                  </p:stCondLst>
+                                  <p:childTnLst>
+                                    <p:set>
+                                      <p:cBhvr>
+                                        <p:cTn id="12" dur="1" fill="hold">
+                                          <p:stCondLst>
+                                            <p:cond delay="0"/>
+                                          </p:stCondLst>
+                                        </p:cTn>
+                                        <p:tgtEl>
+                                          <p:spTgt spid="4"/>
+                                        </p:tgtEl>
+                                        <p:attrNameLst>
+                                          <p:attrName>style.visibility</p:attrName>
+                                        </p:attrNameLst>
+                                      </p:cBhvr>
+                                      <p:to>
+                                        <p:strVal val="visible"/>
+                                      </p:to>
+                                    </p:set>
+                                    <p:animEffect transition="in" filter="fade">
+                                      <p:cBhvr>
+                                        <p:cTn id="13" dur="500"/>
+                                        <p:tgtEl>
+                                          <p:spTgt spid="4"/>
+                                        </p:tgtEl>
+                                      </p:cBhvr>
+                                    </p:animEffect>
+                                  </p:childTnLst>
+                                </p:cTn>
+                              </p:par>
                             </p:childTnLst>
                           </p:cTn>
                         </p:par>
@@ -15918,6 +16991,9 @@
         </p:cTn>
       </p:par>
     </p:tnLst>
+    <p:bldLst>
+      <p:bldP spid="5" grpId="0" animBg="1"/>
+    </p:bldLst>
   </p:timing>
 </p:sld>
 </file>

</xml_diff>

<commit_message>
Edit Secret Manager flow diagram
</commit_message>
<xml_diff>
--- a/Protecting App Secrets.pptx
+++ b/Protecting App Secrets.pptx
@@ -220,7 +220,7 @@
           <a:p>
             <a:fld id="{03886B9A-ACA2-4D2C-AAF6-D8003DE96699}" type="datetimeFigureOut">
               <a:rPr lang="en-US" smtClean="0"/>
-              <a:t>8/29/2018</a:t>
+              <a:t>8/31/2018</a:t>
             </a:fld>
             <a:endParaRPr lang="en-US"/>
           </a:p>
@@ -2331,7 +2331,7 @@
           <a:p>
             <a:fld id="{B5D86D52-4857-4668-9EB7-B41E21252CF7}" type="datetimeFigureOut">
               <a:rPr lang="en-US" smtClean="0"/>
-              <a:t>8/29/2018</a:t>
+              <a:t>8/31/2018</a:t>
             </a:fld>
             <a:endParaRPr lang="en-US"/>
           </a:p>
@@ -2529,7 +2529,7 @@
           <a:p>
             <a:fld id="{B5D86D52-4857-4668-9EB7-B41E21252CF7}" type="datetimeFigureOut">
               <a:rPr lang="en-US" smtClean="0"/>
-              <a:t>8/29/2018</a:t>
+              <a:t>8/31/2018</a:t>
             </a:fld>
             <a:endParaRPr lang="en-US"/>
           </a:p>
@@ -2737,7 +2737,7 @@
           <a:p>
             <a:fld id="{B5D86D52-4857-4668-9EB7-B41E21252CF7}" type="datetimeFigureOut">
               <a:rPr lang="en-US" smtClean="0"/>
-              <a:t>8/29/2018</a:t>
+              <a:t>8/31/2018</a:t>
             </a:fld>
             <a:endParaRPr lang="en-US"/>
           </a:p>
@@ -2941,7 +2941,7 @@
           <a:p>
             <a:fld id="{EEC3160E-2579-4584-9765-DC1BA0B358F9}" type="datetimeFigureOut">
               <a:rPr lang="en-US" smtClean="0"/>
-              <a:t>8/29/2018</a:t>
+              <a:t>8/31/2018</a:t>
             </a:fld>
             <a:endParaRPr lang="en-US"/>
           </a:p>
@@ -3111,7 +3111,7 @@
           <a:p>
             <a:fld id="{EEC3160E-2579-4584-9765-DC1BA0B358F9}" type="datetimeFigureOut">
               <a:rPr lang="en-US" smtClean="0"/>
-              <a:t>8/29/2018</a:t>
+              <a:t>8/31/2018</a:t>
             </a:fld>
             <a:endParaRPr lang="en-US"/>
           </a:p>
@@ -3357,7 +3357,7 @@
           <a:p>
             <a:fld id="{EEC3160E-2579-4584-9765-DC1BA0B358F9}" type="datetimeFigureOut">
               <a:rPr lang="en-US" smtClean="0"/>
-              <a:t>8/29/2018</a:t>
+              <a:t>8/31/2018</a:t>
             </a:fld>
             <a:endParaRPr lang="en-US"/>
           </a:p>
@@ -3589,7 +3589,7 @@
           <a:p>
             <a:fld id="{EEC3160E-2579-4584-9765-DC1BA0B358F9}" type="datetimeFigureOut">
               <a:rPr lang="en-US" smtClean="0"/>
-              <a:t>8/29/2018</a:t>
+              <a:t>8/31/2018</a:t>
             </a:fld>
             <a:endParaRPr lang="en-US"/>
           </a:p>
@@ -3956,7 +3956,7 @@
           <a:p>
             <a:fld id="{EEC3160E-2579-4584-9765-DC1BA0B358F9}" type="datetimeFigureOut">
               <a:rPr lang="en-US" smtClean="0"/>
-              <a:t>8/29/2018</a:t>
+              <a:t>8/31/2018</a:t>
             </a:fld>
             <a:endParaRPr lang="en-US"/>
           </a:p>
@@ -4074,7 +4074,7 @@
           <a:p>
             <a:fld id="{EEC3160E-2579-4584-9765-DC1BA0B358F9}" type="datetimeFigureOut">
               <a:rPr lang="en-US" smtClean="0"/>
-              <a:t>8/29/2018</a:t>
+              <a:t>8/31/2018</a:t>
             </a:fld>
             <a:endParaRPr lang="en-US"/>
           </a:p>
@@ -4169,7 +4169,7 @@
           <a:p>
             <a:fld id="{EEC3160E-2579-4584-9765-DC1BA0B358F9}" type="datetimeFigureOut">
               <a:rPr lang="en-US" smtClean="0"/>
-              <a:t>8/29/2018</a:t>
+              <a:t>8/31/2018</a:t>
             </a:fld>
             <a:endParaRPr lang="en-US"/>
           </a:p>
@@ -4446,7 +4446,7 @@
           <a:p>
             <a:fld id="{EEC3160E-2579-4584-9765-DC1BA0B358F9}" type="datetimeFigureOut">
               <a:rPr lang="en-US" smtClean="0"/>
-              <a:t>8/29/2018</a:t>
+              <a:t>8/31/2018</a:t>
             </a:fld>
             <a:endParaRPr lang="en-US"/>
           </a:p>
@@ -4632,7 +4632,7 @@
           <a:p>
             <a:fld id="{B5D86D52-4857-4668-9EB7-B41E21252CF7}" type="datetimeFigureOut">
               <a:rPr lang="en-US" smtClean="0"/>
-              <a:t>8/29/2018</a:t>
+              <a:t>8/31/2018</a:t>
             </a:fld>
             <a:endParaRPr lang="en-US"/>
           </a:p>
@@ -4901,7 +4901,7 @@
           <a:p>
             <a:fld id="{EEC3160E-2579-4584-9765-DC1BA0B358F9}" type="datetimeFigureOut">
               <a:rPr lang="en-US" smtClean="0"/>
-              <a:t>8/29/2018</a:t>
+              <a:t>8/31/2018</a:t>
             </a:fld>
             <a:endParaRPr lang="en-US"/>
           </a:p>
@@ -5071,7 +5071,7 @@
           <a:p>
             <a:fld id="{EEC3160E-2579-4584-9765-DC1BA0B358F9}" type="datetimeFigureOut">
               <a:rPr lang="en-US" smtClean="0"/>
-              <a:t>8/29/2018</a:t>
+              <a:t>8/31/2018</a:t>
             </a:fld>
             <a:endParaRPr lang="en-US"/>
           </a:p>
@@ -5251,7 +5251,7 @@
           <a:p>
             <a:fld id="{EEC3160E-2579-4584-9765-DC1BA0B358F9}" type="datetimeFigureOut">
               <a:rPr lang="en-US" smtClean="0"/>
-              <a:t>8/29/2018</a:t>
+              <a:t>8/31/2018</a:t>
             </a:fld>
             <a:endParaRPr lang="en-US"/>
           </a:p>
@@ -5514,7 +5514,7 @@
           <a:p>
             <a:fld id="{B5D86D52-4857-4668-9EB7-B41E21252CF7}" type="datetimeFigureOut">
               <a:rPr lang="en-US" smtClean="0"/>
-              <a:t>8/29/2018</a:t>
+              <a:t>8/31/2018</a:t>
             </a:fld>
             <a:endParaRPr lang="en-US"/>
           </a:p>
@@ -5779,7 +5779,7 @@
           <a:p>
             <a:fld id="{B5D86D52-4857-4668-9EB7-B41E21252CF7}" type="datetimeFigureOut">
               <a:rPr lang="en-US" smtClean="0"/>
-              <a:t>8/29/2018</a:t>
+              <a:t>8/31/2018</a:t>
             </a:fld>
             <a:endParaRPr lang="en-US"/>
           </a:p>
@@ -6191,7 +6191,7 @@
           <a:p>
             <a:fld id="{B5D86D52-4857-4668-9EB7-B41E21252CF7}" type="datetimeFigureOut">
               <a:rPr lang="en-US" smtClean="0"/>
-              <a:t>8/29/2018</a:t>
+              <a:t>8/31/2018</a:t>
             </a:fld>
             <a:endParaRPr lang="en-US"/>
           </a:p>
@@ -6332,7 +6332,7 @@
           <a:p>
             <a:fld id="{B5D86D52-4857-4668-9EB7-B41E21252CF7}" type="datetimeFigureOut">
               <a:rPr lang="en-US" smtClean="0"/>
-              <a:t>8/29/2018</a:t>
+              <a:t>8/31/2018</a:t>
             </a:fld>
             <a:endParaRPr lang="en-US"/>
           </a:p>
@@ -6445,7 +6445,7 @@
           <a:p>
             <a:fld id="{B5D86D52-4857-4668-9EB7-B41E21252CF7}" type="datetimeFigureOut">
               <a:rPr lang="en-US" smtClean="0"/>
-              <a:t>8/29/2018</a:t>
+              <a:t>8/31/2018</a:t>
             </a:fld>
             <a:endParaRPr lang="en-US"/>
           </a:p>
@@ -6756,7 +6756,7 @@
           <a:p>
             <a:fld id="{B5D86D52-4857-4668-9EB7-B41E21252CF7}" type="datetimeFigureOut">
               <a:rPr lang="en-US" smtClean="0"/>
-              <a:t>8/29/2018</a:t>
+              <a:t>8/31/2018</a:t>
             </a:fld>
             <a:endParaRPr lang="en-US"/>
           </a:p>
@@ -7044,7 +7044,7 @@
           <a:p>
             <a:fld id="{B5D86D52-4857-4668-9EB7-B41E21252CF7}" type="datetimeFigureOut">
               <a:rPr lang="en-US" smtClean="0"/>
-              <a:t>8/29/2018</a:t>
+              <a:t>8/31/2018</a:t>
             </a:fld>
             <a:endParaRPr lang="en-US"/>
           </a:p>
@@ -7285,7 +7285,7 @@
           <a:p>
             <a:fld id="{B5D86D52-4857-4668-9EB7-B41E21252CF7}" type="datetimeFigureOut">
               <a:rPr lang="en-US" smtClean="0"/>
-              <a:t>8/29/2018</a:t>
+              <a:t>8/31/2018</a:t>
             </a:fld>
             <a:endParaRPr lang="en-US"/>
           </a:p>
@@ -7837,7 +7837,7 @@
           <a:p>
             <a:fld id="{EEC3160E-2579-4584-9765-DC1BA0B358F9}" type="datetimeFigureOut">
               <a:rPr lang="en-US" smtClean="0"/>
-              <a:t>8/29/2018</a:t>
+              <a:t>8/31/2018</a:t>
             </a:fld>
             <a:endParaRPr lang="en-US"/>
           </a:p>
@@ -14263,359 +14263,6 @@
           </a:p>
         </p:txBody>
       </p:sp>
-      <p:sp>
-        <p:nvSpPr>
-          <p:cNvPr id="12" name="Rounded Rectangle 34">
-            <a:extLst>
-              <a:ext uri="{FF2B5EF4-FFF2-40B4-BE49-F238E27FC236}">
-                <a16:creationId xmlns:a16="http://schemas.microsoft.com/office/drawing/2014/main" id="{077CB370-22FE-4090-AAD0-2DF355C68841}"/>
-              </a:ext>
-            </a:extLst>
-          </p:cNvPr>
-          <p:cNvSpPr/>
-          <p:nvPr/>
-        </p:nvSpPr>
-        <p:spPr>
-          <a:xfrm>
-            <a:off x="1083272" y="3429000"/>
-            <a:ext cx="9062157" cy="691116"/>
-          </a:xfrm>
-          <a:prstGeom prst="roundRect">
-            <a:avLst/>
-          </a:prstGeom>
-          <a:solidFill>
-            <a:schemeClr val="bg2"/>
-          </a:solidFill>
-        </p:spPr>
-        <p:style>
-          <a:lnRef idx="2">
-            <a:schemeClr val="accent1">
-              <a:shade val="50000"/>
-            </a:schemeClr>
-          </a:lnRef>
-          <a:fillRef idx="1">
-            <a:schemeClr val="accent1"/>
-          </a:fillRef>
-          <a:effectRef idx="0">
-            <a:schemeClr val="accent1"/>
-          </a:effectRef>
-          <a:fontRef idx="minor">
-            <a:schemeClr val="lt1"/>
-          </a:fontRef>
-        </p:style>
-        <p:txBody>
-          <a:bodyPr rtlCol="0" anchor="ctr"/>
-          <a:lstStyle/>
-          <a:p>
-            <a:pPr marL="0" marR="0" lvl="0" indent="0" algn="l" defTabSz="457200" rtl="0" eaLnBrk="1" fontAlgn="auto" latinLnBrk="0" hangingPunct="1">
-              <a:lnSpc>
-                <a:spcPct val="100000"/>
-              </a:lnSpc>
-              <a:spcBef>
-                <a:spcPts val="0"/>
-              </a:spcBef>
-              <a:spcAft>
-                <a:spcPts val="0"/>
-              </a:spcAft>
-              <a:buClrTx/>
-              <a:buSzTx/>
-              <a:buFontTx/>
-              <a:buNone/>
-              <a:tabLst/>
-              <a:defRPr/>
-            </a:pPr>
-            <a:endParaRPr kumimoji="0" lang="en-US" sz="1600" b="1" i="0" u="none" strike="noStrike" kern="1200" cap="none" spc="0" normalizeH="0" baseline="0" noProof="0" dirty="0">
-              <a:ln>
-                <a:noFill/>
-              </a:ln>
-              <a:solidFill>
-                <a:prstClr val="white"/>
-              </a:solidFill>
-              <a:effectLst/>
-              <a:uLnTx/>
-              <a:uFillTx/>
-              <a:latin typeface="Segoe UI Light"/>
-              <a:ea typeface="+mn-ea"/>
-              <a:cs typeface="+mn-cs"/>
-            </a:endParaRPr>
-          </a:p>
-        </p:txBody>
-      </p:sp>
-      <p:pic>
-        <p:nvPicPr>
-          <p:cNvPr id="13" name="Picture 2" descr="http://files.softicons.com/download/system-icons/windows-8-metro-icons-by-dakirby309/png/512x512/Folders%20&amp;%20OS/Linux.png">
-            <a:extLst>
-              <a:ext uri="{FF2B5EF4-FFF2-40B4-BE49-F238E27FC236}">
-                <a16:creationId xmlns:a16="http://schemas.microsoft.com/office/drawing/2014/main" id="{38C17031-0BA0-4706-8ED9-57F2EB289A8A}"/>
-              </a:ext>
-            </a:extLst>
-          </p:cNvPr>
-          <p:cNvPicPr>
-            <a:picLocks noChangeAspect="1" noChangeArrowheads="1"/>
-          </p:cNvPicPr>
-          <p:nvPr/>
-        </p:nvPicPr>
-        <p:blipFill>
-          <a:blip r:embed="rId3" cstate="print">
-            <a:extLst>
-              <a:ext uri="{BEBA8EAE-BF5A-486C-A8C5-ECC9F3942E4B}">
-                <a14:imgProps xmlns:a14="http://schemas.microsoft.com/office/drawing/2010/main">
-                  <a14:imgLayer r:embed="rId4">
-                    <a14:imgEffect>
-                      <a14:backgroundRemoval t="10000" b="90000" l="10000" r="90000"/>
-                    </a14:imgEffect>
-                  </a14:imgLayer>
-                </a14:imgProps>
-              </a:ext>
-              <a:ext uri="{28A0092B-C50C-407E-A947-70E740481C1C}">
-                <a14:useLocalDpi xmlns:a14="http://schemas.microsoft.com/office/drawing/2010/main" val="0"/>
-              </a:ext>
-            </a:extLst>
-          </a:blip>
-          <a:srcRect/>
-          <a:stretch>
-            <a:fillRect/>
-          </a:stretch>
-        </p:blipFill>
-        <p:spPr bwMode="auto">
-          <a:xfrm>
-            <a:off x="1180650" y="3556720"/>
-            <a:ext cx="507863" cy="498593"/>
-          </a:xfrm>
-          <a:prstGeom prst="rect">
-            <a:avLst/>
-          </a:prstGeom>
-          <a:noFill/>
-          <a:extLst>
-            <a:ext uri="{909E8E84-426E-40DD-AFC4-6F175D3DCCD1}">
-              <a14:hiddenFill xmlns:a14="http://schemas.microsoft.com/office/drawing/2010/main">
-                <a:solidFill>
-                  <a:srgbClr val="FFFFFF"/>
-                </a:solidFill>
-              </a14:hiddenFill>
-            </a:ext>
-          </a:extLst>
-        </p:spPr>
-      </p:pic>
-      <p:pic>
-        <p:nvPicPr>
-          <p:cNvPr id="14" name="Picture 13">
-            <a:extLst>
-              <a:ext uri="{FF2B5EF4-FFF2-40B4-BE49-F238E27FC236}">
-                <a16:creationId xmlns:a16="http://schemas.microsoft.com/office/drawing/2014/main" id="{0046F8F4-4512-484A-933F-4FCFDDCDC868}"/>
-              </a:ext>
-            </a:extLst>
-          </p:cNvPr>
-          <p:cNvPicPr>
-            <a:picLocks noChangeAspect="1"/>
-          </p:cNvPicPr>
-          <p:nvPr/>
-        </p:nvPicPr>
-        <p:blipFill>
-          <a:blip r:embed="rId5" cstate="print">
-            <a:lum bright="70000" contrast="-70000"/>
-            <a:extLst>
-              <a:ext uri="{28A0092B-C50C-407E-A947-70E740481C1C}">
-                <a14:useLocalDpi xmlns:a14="http://schemas.microsoft.com/office/drawing/2010/main" val="0"/>
-              </a:ext>
-            </a:extLst>
-          </a:blip>
-          <a:stretch>
-            <a:fillRect/>
-          </a:stretch>
-        </p:blipFill>
-        <p:spPr>
-          <a:xfrm>
-            <a:off x="1681865" y="3556720"/>
-            <a:ext cx="385752" cy="454164"/>
-          </a:xfrm>
-          <a:prstGeom prst="rect">
-            <a:avLst/>
-          </a:prstGeom>
-        </p:spPr>
-      </p:pic>
-      <p:pic>
-        <p:nvPicPr>
-          <p:cNvPr id="15" name="Picture 6" descr="C:\temp\WinAzure_rgb_Wht_S.png">
-            <a:extLst>
-              <a:ext uri="{FF2B5EF4-FFF2-40B4-BE49-F238E27FC236}">
-                <a16:creationId xmlns:a16="http://schemas.microsoft.com/office/drawing/2014/main" id="{9E236C65-B717-4E03-A30D-5799CF2DF5E1}"/>
-              </a:ext>
-            </a:extLst>
-          </p:cNvPr>
-          <p:cNvPicPr>
-            <a:picLocks noChangeAspect="1" noChangeArrowheads="1"/>
-          </p:cNvPicPr>
-          <p:nvPr/>
-        </p:nvPicPr>
-        <p:blipFill rotWithShape="1">
-          <a:blip r:embed="rId6" cstate="print">
-            <a:extLst>
-              <a:ext uri="{28A0092B-C50C-407E-A947-70E740481C1C}">
-                <a14:useLocalDpi xmlns:a14="http://schemas.microsoft.com/office/drawing/2010/main" val="0"/>
-              </a:ext>
-            </a:extLst>
-          </a:blip>
-          <a:srcRect l="3371" t="15460" r="80628" b="15496"/>
-          <a:stretch/>
-        </p:blipFill>
-        <p:spPr bwMode="auto">
-          <a:xfrm>
-            <a:off x="5297712" y="3568233"/>
-            <a:ext cx="455848" cy="462964"/>
-          </a:xfrm>
-          <a:prstGeom prst="rect">
-            <a:avLst/>
-          </a:prstGeom>
-          <a:noFill/>
-          <a:extLst>
-            <a:ext uri="{909E8E84-426E-40DD-AFC4-6F175D3DCCD1}">
-              <a14:hiddenFill xmlns:a14="http://schemas.microsoft.com/office/drawing/2010/main">
-                <a:solidFill>
-                  <a:srgbClr val="FFFFFF"/>
-                </a:solidFill>
-              </a14:hiddenFill>
-            </a:ext>
-          </a:extLst>
-        </p:spPr>
-      </p:pic>
-      <p:cxnSp>
-        <p:nvCxnSpPr>
-          <p:cNvPr id="16" name="Straight Connector 15">
-            <a:extLst>
-              <a:ext uri="{FF2B5EF4-FFF2-40B4-BE49-F238E27FC236}">
-                <a16:creationId xmlns:a16="http://schemas.microsoft.com/office/drawing/2014/main" id="{F14BE7E3-F985-4FC4-8D5C-A84E7CB244A3}"/>
-              </a:ext>
-            </a:extLst>
-          </p:cNvPr>
-          <p:cNvCxnSpPr>
-            <a:cxnSpLocks/>
-          </p:cNvCxnSpPr>
-          <p:nvPr/>
-        </p:nvCxnSpPr>
-        <p:spPr>
-          <a:xfrm>
-            <a:off x="5211002" y="3437725"/>
-            <a:ext cx="0" cy="670439"/>
-          </a:xfrm>
-          <a:prstGeom prst="line">
-            <a:avLst/>
-          </a:prstGeom>
-          <a:ln>
-            <a:solidFill>
-              <a:schemeClr val="tx1"/>
-            </a:solidFill>
-          </a:ln>
-        </p:spPr>
-        <p:style>
-          <a:lnRef idx="3">
-            <a:schemeClr val="dk1"/>
-          </a:lnRef>
-          <a:fillRef idx="0">
-            <a:schemeClr val="dk1"/>
-          </a:fillRef>
-          <a:effectRef idx="2">
-            <a:schemeClr val="dk1"/>
-          </a:effectRef>
-          <a:fontRef idx="minor">
-            <a:schemeClr val="tx1"/>
-          </a:fontRef>
-        </p:style>
-      </p:cxnSp>
-      <p:sp>
-        <p:nvSpPr>
-          <p:cNvPr id="19" name="TextBox 18">
-            <a:extLst>
-              <a:ext uri="{FF2B5EF4-FFF2-40B4-BE49-F238E27FC236}">
-                <a16:creationId xmlns:a16="http://schemas.microsoft.com/office/drawing/2014/main" id="{8FFD9B3F-F792-46B2-9774-C75647C484FD}"/>
-              </a:ext>
-            </a:extLst>
-          </p:cNvPr>
-          <p:cNvSpPr txBox="1"/>
-          <p:nvPr/>
-        </p:nvSpPr>
-        <p:spPr>
-          <a:xfrm>
-            <a:off x="2061716" y="3610578"/>
-            <a:ext cx="3864488" cy="369332"/>
-          </a:xfrm>
-          <a:prstGeom prst="rect">
-            <a:avLst/>
-          </a:prstGeom>
-          <a:noFill/>
-        </p:spPr>
-        <p:txBody>
-          <a:bodyPr wrap="square" rtlCol="0">
-            <a:spAutoFit/>
-          </a:bodyPr>
-          <a:lstStyle/>
-          <a:p>
-            <a:r>
-              <a:rPr lang="en-US" b="1" dirty="0"/>
-              <a:t>~/.</a:t>
-            </a:r>
-            <a:r>
-              <a:rPr lang="en-US" b="1" dirty="0" err="1"/>
-              <a:t>microsoft</a:t>
-            </a:r>
-            <a:r>
-              <a:rPr lang="en-US" b="1" dirty="0"/>
-              <a:t>/</a:t>
-            </a:r>
-            <a:r>
-              <a:rPr lang="en-US" b="1" dirty="0" err="1"/>
-              <a:t>usersecrets</a:t>
-            </a:r>
-            <a:r>
-              <a:rPr lang="en-US" b="1" dirty="0"/>
-              <a:t>/&lt;id&gt;/</a:t>
-            </a:r>
-          </a:p>
-        </p:txBody>
-      </p:sp>
-      <p:sp>
-        <p:nvSpPr>
-          <p:cNvPr id="20" name="TextBox 19">
-            <a:extLst>
-              <a:ext uri="{FF2B5EF4-FFF2-40B4-BE49-F238E27FC236}">
-                <a16:creationId xmlns:a16="http://schemas.microsoft.com/office/drawing/2014/main" id="{36B146A5-2A1D-4338-A475-43BF6F17EBA0}"/>
-              </a:ext>
-            </a:extLst>
-          </p:cNvPr>
-          <p:cNvSpPr txBox="1"/>
-          <p:nvPr/>
-        </p:nvSpPr>
-        <p:spPr>
-          <a:xfrm>
-            <a:off x="5803635" y="3638222"/>
-            <a:ext cx="4286576" cy="369332"/>
-          </a:xfrm>
-          <a:prstGeom prst="rect">
-            <a:avLst/>
-          </a:prstGeom>
-          <a:noFill/>
-        </p:spPr>
-        <p:txBody>
-          <a:bodyPr wrap="square" rtlCol="0">
-            <a:spAutoFit/>
-          </a:bodyPr>
-          <a:lstStyle/>
-          <a:p>
-            <a:r>
-              <a:rPr lang="en-US" b="1" dirty="0"/>
-              <a:t>%APPDATA%\Microsoft\</a:t>
-            </a:r>
-            <a:r>
-              <a:rPr lang="en-US" b="1" dirty="0" err="1"/>
-              <a:t>UserSecrets</a:t>
-            </a:r>
-            <a:r>
-              <a:rPr lang="en-US" b="1" dirty="0"/>
-              <a:t>\&lt;id&gt;\</a:t>
-            </a:r>
-          </a:p>
-        </p:txBody>
-      </p:sp>
       <p:graphicFrame>
         <p:nvGraphicFramePr>
           <p:cNvPr id="24" name="Table 23">
@@ -14631,21 +14278,21 @@
           <p:nvPr>
             <p:extLst>
               <p:ext uri="{D42A27DB-BD31-4B8C-83A1-F6EECF244321}">
-                <p14:modId xmlns:p14="http://schemas.microsoft.com/office/powerpoint/2010/main" val="30356997"/>
+                <p14:modId xmlns:p14="http://schemas.microsoft.com/office/powerpoint/2010/main" val="2121491548"/>
               </p:ext>
             </p:extLst>
           </p:nvPr>
         </p:nvGraphicFramePr>
         <p:xfrm>
-          <a:off x="2932563" y="5304335"/>
-          <a:ext cx="4556877" cy="1310640"/>
+          <a:off x="6544491" y="5248939"/>
+          <a:ext cx="4150726" cy="1188720"/>
         </p:xfrm>
         <a:graphic>
           <a:graphicData uri="http://schemas.openxmlformats.org/drawingml/2006/table">
             <a:tbl>
               <a:tblPr firstRow="1" bandRow="1"/>
               <a:tblGrid>
-                <a:gridCol w="4556877">
+                <a:gridCol w="4150726">
                   <a:extLst>
                     <a:ext uri="{9D8B030D-6E8A-4147-A177-3AD203B41FA5}">
                       <a16:colId xmlns:a16="http://schemas.microsoft.com/office/drawing/2014/main" val="1057070397"/>
@@ -14733,7 +14380,7 @@
                     </a:lstStyle>
                     <a:p>
                       <a:r>
-                        <a:rPr lang="en-US" sz="2000" dirty="0">
+                        <a:rPr lang="en-US" sz="1800" dirty="0">
                           <a:solidFill>
                             <a:srgbClr val="000000"/>
                           </a:solidFill>
@@ -14744,7 +14391,7 @@
                     </a:p>
                     <a:p>
                       <a:r>
-                        <a:rPr lang="en-US" sz="2000" dirty="0">
+                        <a:rPr lang="en-US" sz="1800" dirty="0">
                           <a:solidFill>
                             <a:srgbClr val="000000"/>
                           </a:solidFill>
@@ -14753,7 +14400,7 @@
                         <a:t>  </a:t>
                       </a:r>
                       <a:r>
-                        <a:rPr lang="en-US" sz="2000" dirty="0">
+                        <a:rPr lang="en-US" sz="1800" dirty="0">
                           <a:solidFill>
                             <a:srgbClr val="2E75B6"/>
                           </a:solidFill>
@@ -14762,7 +14409,7 @@
                         <a:t>"</a:t>
                       </a:r>
                       <a:r>
-                        <a:rPr lang="en-US" sz="2000" dirty="0" err="1">
+                        <a:rPr lang="en-US" sz="1800" dirty="0" err="1">
                           <a:solidFill>
                             <a:srgbClr val="2E75B6"/>
                           </a:solidFill>
@@ -14771,7 +14418,7 @@
                         <a:t>Movies:Password</a:t>
                       </a:r>
                       <a:r>
-                        <a:rPr lang="en-US" sz="2000" dirty="0">
+                        <a:rPr lang="en-US" sz="1800" dirty="0">
                           <a:solidFill>
                             <a:srgbClr val="2E75B6"/>
                           </a:solidFill>
@@ -14780,7 +14427,7 @@
                         <a:t>"</a:t>
                       </a:r>
                       <a:r>
-                        <a:rPr lang="en-US" sz="2000" dirty="0">
+                        <a:rPr lang="en-US" sz="1800" dirty="0">
                           <a:solidFill>
                             <a:srgbClr val="000000"/>
                           </a:solidFill>
@@ -14789,7 +14436,7 @@
                         <a:t>: </a:t>
                       </a:r>
                       <a:r>
-                        <a:rPr lang="en-US" sz="2000" dirty="0">
+                        <a:rPr lang="en-US" sz="1800" dirty="0">
                           <a:solidFill>
                             <a:srgbClr val="A31515"/>
                           </a:solidFill>
@@ -14797,7 +14444,7 @@
                         </a:rPr>
                         <a:t>"pass123",</a:t>
                       </a:r>
-                      <a:endParaRPr lang="en-US" sz="2000" dirty="0">
+                      <a:endParaRPr lang="en-US" sz="1800" dirty="0">
                         <a:solidFill>
                           <a:srgbClr val="000000"/>
                         </a:solidFill>
@@ -14806,7 +14453,7 @@
                     </a:p>
                     <a:p>
                       <a:r>
-                        <a:rPr lang="en-US" sz="2000" dirty="0">
+                        <a:rPr lang="en-US" sz="1800" dirty="0">
                           <a:solidFill>
                             <a:srgbClr val="000000"/>
                           </a:solidFill>
@@ -14815,7 +14462,7 @@
                         <a:t>  </a:t>
                       </a:r>
                       <a:r>
-                        <a:rPr lang="en-US" sz="2000" dirty="0">
+                        <a:rPr lang="en-US" sz="1800" dirty="0">
                           <a:solidFill>
                             <a:srgbClr val="2E75B6"/>
                           </a:solidFill>
@@ -14824,7 +14471,7 @@
                         <a:t>"</a:t>
                       </a:r>
                       <a:r>
-                        <a:rPr lang="en-US" sz="2000" dirty="0" err="1">
+                        <a:rPr lang="en-US" sz="1800" dirty="0" err="1">
                           <a:solidFill>
                             <a:srgbClr val="2E75B6"/>
                           </a:solidFill>
@@ -14833,7 +14480,7 @@
                         <a:t>Movies:User</a:t>
                       </a:r>
                       <a:r>
-                        <a:rPr lang="en-US" sz="2000" dirty="0">
+                        <a:rPr lang="en-US" sz="1800" dirty="0">
                           <a:solidFill>
                             <a:srgbClr val="2E75B6"/>
                           </a:solidFill>
@@ -14842,7 +14489,7 @@
                         <a:t>"</a:t>
                       </a:r>
                       <a:r>
-                        <a:rPr lang="en-US" sz="2000" dirty="0">
+                        <a:rPr lang="en-US" sz="1800" dirty="0">
                           <a:solidFill>
                             <a:srgbClr val="000000"/>
                           </a:solidFill>
@@ -14851,7 +14498,7 @@
                         <a:t>: </a:t>
                       </a:r>
                       <a:r>
-                        <a:rPr lang="en-US" sz="2000" dirty="0">
+                        <a:rPr lang="en-US" sz="1800" dirty="0">
                           <a:solidFill>
                             <a:srgbClr val="A31515"/>
                           </a:solidFill>
@@ -14860,7 +14507,7 @@
                         <a:t>"</a:t>
                       </a:r>
                       <a:r>
-                        <a:rPr lang="en-US" sz="2000" dirty="0" err="1">
+                        <a:rPr lang="en-US" sz="1800" dirty="0" err="1">
                           <a:solidFill>
                             <a:srgbClr val="A31515"/>
                           </a:solidFill>
@@ -14869,7 +14516,7 @@
                         <a:t>johndoe</a:t>
                       </a:r>
                       <a:r>
-                        <a:rPr lang="en-US" sz="2000" dirty="0">
+                        <a:rPr lang="en-US" sz="1800" dirty="0">
                           <a:solidFill>
                             <a:srgbClr val="A31515"/>
                           </a:solidFill>
@@ -14877,7 +14524,7 @@
                         </a:rPr>
                         <a:t>"</a:t>
                       </a:r>
-                      <a:endParaRPr lang="en-US" sz="2000" dirty="0">
+                      <a:endParaRPr lang="en-US" sz="1800" dirty="0">
                         <a:solidFill>
                           <a:srgbClr val="000000"/>
                         </a:solidFill>
@@ -14886,7 +14533,7 @@
                     </a:p>
                     <a:p>
                       <a:r>
-                        <a:rPr lang="en-US" sz="2000" dirty="0">
+                        <a:rPr lang="en-US" sz="1800" dirty="0">
                           <a:solidFill>
                             <a:srgbClr val="000000"/>
                           </a:solidFill>
@@ -14970,7 +14617,7 @@
         </p:nvSpPr>
         <p:spPr>
           <a:xfrm>
-            <a:off x="2926300" y="4857766"/>
+            <a:off x="6541905" y="4796367"/>
             <a:ext cx="1374817" cy="446567"/>
           </a:xfrm>
           <a:prstGeom prst="rect">
@@ -15075,6 +14722,868 @@
           </a:p>
         </p:txBody>
       </p:sp>
+      <p:graphicFrame>
+        <p:nvGraphicFramePr>
+          <p:cNvPr id="17" name="Table 16">
+            <a:extLst>
+              <a:ext uri="{FF2B5EF4-FFF2-40B4-BE49-F238E27FC236}">
+                <a16:creationId xmlns:a16="http://schemas.microsoft.com/office/drawing/2014/main" id="{A713F803-C21F-4FEC-B9B8-F341DE09592E}"/>
+              </a:ext>
+            </a:extLst>
+          </p:cNvPr>
+          <p:cNvGraphicFramePr>
+            <a:graphicFrameLocks noGrp="1"/>
+          </p:cNvGraphicFramePr>
+          <p:nvPr>
+            <p:extLst>
+              <p:ext uri="{D42A27DB-BD31-4B8C-83A1-F6EECF244321}">
+                <p14:modId xmlns:p14="http://schemas.microsoft.com/office/powerpoint/2010/main" val="3142848316"/>
+              </p:ext>
+            </p:extLst>
+          </p:nvPr>
+        </p:nvGraphicFramePr>
+        <p:xfrm>
+          <a:off x="838665" y="3357095"/>
+          <a:ext cx="8082419" cy="1310640"/>
+        </p:xfrm>
+        <a:graphic>
+          <a:graphicData uri="http://schemas.openxmlformats.org/drawingml/2006/table">
+            <a:tbl>
+              <a:tblPr firstRow="1" bandRow="1"/>
+              <a:tblGrid>
+                <a:gridCol w="8082419">
+                  <a:extLst>
+                    <a:ext uri="{9D8B030D-6E8A-4147-A177-3AD203B41FA5}">
+                      <a16:colId xmlns:a16="http://schemas.microsoft.com/office/drawing/2014/main" val="1057070397"/>
+                    </a:ext>
+                  </a:extLst>
+                </a:gridCol>
+              </a:tblGrid>
+              <a:tr h="584446">
+                <a:tc>
+                  <a:txBody>
+                    <a:bodyPr/>
+                    <a:lstStyle>
+                      <a:lvl1pPr marL="0" algn="l" defTabSz="914400" rtl="0" eaLnBrk="1" latinLnBrk="0" hangingPunct="1">
+                        <a:defRPr sz="1800" b="1" kern="1200">
+                          <a:solidFill>
+                            <a:schemeClr val="lt1"/>
+                          </a:solidFill>
+                          <a:latin typeface="Segoe UI Light"/>
+                        </a:defRPr>
+                      </a:lvl1pPr>
+                      <a:lvl2pPr marL="457200" algn="l" defTabSz="914400" rtl="0" eaLnBrk="1" latinLnBrk="0" hangingPunct="1">
+                        <a:defRPr sz="1800" b="1" kern="1200">
+                          <a:solidFill>
+                            <a:schemeClr val="lt1"/>
+                          </a:solidFill>
+                          <a:latin typeface="Segoe UI Light"/>
+                        </a:defRPr>
+                      </a:lvl2pPr>
+                      <a:lvl3pPr marL="914400" algn="l" defTabSz="914400" rtl="0" eaLnBrk="1" latinLnBrk="0" hangingPunct="1">
+                        <a:defRPr sz="1800" b="1" kern="1200">
+                          <a:solidFill>
+                            <a:schemeClr val="lt1"/>
+                          </a:solidFill>
+                          <a:latin typeface="Segoe UI Light"/>
+                        </a:defRPr>
+                      </a:lvl3pPr>
+                      <a:lvl4pPr marL="1371600" algn="l" defTabSz="914400" rtl="0" eaLnBrk="1" latinLnBrk="0" hangingPunct="1">
+                        <a:defRPr sz="1800" b="1" kern="1200">
+                          <a:solidFill>
+                            <a:schemeClr val="lt1"/>
+                          </a:solidFill>
+                          <a:latin typeface="Segoe UI Light"/>
+                        </a:defRPr>
+                      </a:lvl4pPr>
+                      <a:lvl5pPr marL="1828800" algn="l" defTabSz="914400" rtl="0" eaLnBrk="1" latinLnBrk="0" hangingPunct="1">
+                        <a:defRPr sz="1800" b="1" kern="1200">
+                          <a:solidFill>
+                            <a:schemeClr val="lt1"/>
+                          </a:solidFill>
+                          <a:latin typeface="Segoe UI Light"/>
+                        </a:defRPr>
+                      </a:lvl5pPr>
+                      <a:lvl6pPr marL="2286000" algn="l" defTabSz="914400" rtl="0" eaLnBrk="1" latinLnBrk="0" hangingPunct="1">
+                        <a:defRPr sz="1800" b="1" kern="1200">
+                          <a:solidFill>
+                            <a:schemeClr val="lt1"/>
+                          </a:solidFill>
+                          <a:latin typeface="Segoe UI Light"/>
+                        </a:defRPr>
+                      </a:lvl6pPr>
+                      <a:lvl7pPr marL="2743200" algn="l" defTabSz="914400" rtl="0" eaLnBrk="1" latinLnBrk="0" hangingPunct="1">
+                        <a:defRPr sz="1800" b="1" kern="1200">
+                          <a:solidFill>
+                            <a:schemeClr val="lt1"/>
+                          </a:solidFill>
+                          <a:latin typeface="Segoe UI Light"/>
+                        </a:defRPr>
+                      </a:lvl7pPr>
+                      <a:lvl8pPr marL="3200400" algn="l" defTabSz="914400" rtl="0" eaLnBrk="1" latinLnBrk="0" hangingPunct="1">
+                        <a:defRPr sz="1800" b="1" kern="1200">
+                          <a:solidFill>
+                            <a:schemeClr val="lt1"/>
+                          </a:solidFill>
+                          <a:latin typeface="Segoe UI Light"/>
+                        </a:defRPr>
+                      </a:lvl8pPr>
+                      <a:lvl9pPr marL="3657600" algn="l" defTabSz="914400" rtl="0" eaLnBrk="1" latinLnBrk="0" hangingPunct="1">
+                        <a:defRPr sz="1800" b="1" kern="1200">
+                          <a:solidFill>
+                            <a:schemeClr val="lt1"/>
+                          </a:solidFill>
+                          <a:latin typeface="Segoe UI Light"/>
+                        </a:defRPr>
+                      </a:lvl9pPr>
+                    </a:lstStyle>
+                    <a:p>
+                      <a:r>
+                        <a:rPr lang="en-US" sz="1600" dirty="0">
+                          <a:solidFill>
+                            <a:srgbClr val="0000FF"/>
+                          </a:solidFill>
+                          <a:latin typeface="Consolas" panose="020B0609020204030204" pitchFamily="49" charset="0"/>
+                        </a:rPr>
+                        <a:t>&lt;</a:t>
+                      </a:r>
+                      <a:r>
+                        <a:rPr lang="en-US" sz="1600" dirty="0">
+                          <a:solidFill>
+                            <a:srgbClr val="A31515"/>
+                          </a:solidFill>
+                          <a:latin typeface="Consolas" panose="020B0609020204030204" pitchFamily="49" charset="0"/>
+                        </a:rPr>
+                        <a:t>Project</a:t>
+                      </a:r>
+                      <a:r>
+                        <a:rPr lang="en-US" sz="1600" dirty="0">
+                          <a:solidFill>
+                            <a:srgbClr val="0000FF"/>
+                          </a:solidFill>
+                          <a:latin typeface="Consolas" panose="020B0609020204030204" pitchFamily="49" charset="0"/>
+                        </a:rPr>
+                        <a:t> </a:t>
+                      </a:r>
+                      <a:r>
+                        <a:rPr lang="en-US" sz="1600" dirty="0" err="1">
+                          <a:solidFill>
+                            <a:srgbClr val="FF0000"/>
+                          </a:solidFill>
+                          <a:latin typeface="Consolas" panose="020B0609020204030204" pitchFamily="49" charset="0"/>
+                        </a:rPr>
+                        <a:t>Sdk</a:t>
+                      </a:r>
+                      <a:r>
+                        <a:rPr lang="en-US" sz="1600" dirty="0">
+                          <a:solidFill>
+                            <a:srgbClr val="0000FF"/>
+                          </a:solidFill>
+                          <a:latin typeface="Consolas" panose="020B0609020204030204" pitchFamily="49" charset="0"/>
+                        </a:rPr>
+                        <a:t>=</a:t>
+                      </a:r>
+                      <a:r>
+                        <a:rPr lang="en-US" sz="1600" dirty="0">
+                          <a:solidFill>
+                            <a:srgbClr val="000000"/>
+                          </a:solidFill>
+                          <a:latin typeface="Consolas" panose="020B0609020204030204" pitchFamily="49" charset="0"/>
+                        </a:rPr>
+                        <a:t>"</a:t>
+                      </a:r>
+                      <a:r>
+                        <a:rPr lang="en-US" sz="1600" dirty="0" err="1">
+                          <a:solidFill>
+                            <a:srgbClr val="0000FF"/>
+                          </a:solidFill>
+                          <a:latin typeface="Consolas" panose="020B0609020204030204" pitchFamily="49" charset="0"/>
+                        </a:rPr>
+                        <a:t>Microsoft.NET.Sdk.Web</a:t>
+                      </a:r>
+                      <a:r>
+                        <a:rPr lang="en-US" sz="1600" dirty="0">
+                          <a:solidFill>
+                            <a:srgbClr val="000000"/>
+                          </a:solidFill>
+                          <a:latin typeface="Consolas" panose="020B0609020204030204" pitchFamily="49" charset="0"/>
+                        </a:rPr>
+                        <a:t>"</a:t>
+                      </a:r>
+                      <a:r>
+                        <a:rPr lang="en-US" sz="1600" dirty="0">
+                          <a:solidFill>
+                            <a:srgbClr val="0000FF"/>
+                          </a:solidFill>
+                          <a:latin typeface="Consolas" panose="020B0609020204030204" pitchFamily="49" charset="0"/>
+                        </a:rPr>
+                        <a:t>&gt;</a:t>
+                      </a:r>
+                      <a:endParaRPr lang="en-US" sz="1600" dirty="0">
+                        <a:solidFill>
+                          <a:srgbClr val="000000"/>
+                        </a:solidFill>
+                        <a:latin typeface="Consolas" panose="020B0609020204030204" pitchFamily="49" charset="0"/>
+                      </a:endParaRPr>
+                    </a:p>
+                    <a:p>
+                      <a:r>
+                        <a:rPr lang="en-US" sz="1600" dirty="0">
+                          <a:solidFill>
+                            <a:srgbClr val="0000FF"/>
+                          </a:solidFill>
+                          <a:latin typeface="Consolas" panose="020B0609020204030204" pitchFamily="49" charset="0"/>
+                        </a:rPr>
+                        <a:t>  &lt;</a:t>
+                      </a:r>
+                      <a:r>
+                        <a:rPr lang="en-US" sz="1600" dirty="0" err="1">
+                          <a:solidFill>
+                            <a:srgbClr val="A31515"/>
+                          </a:solidFill>
+                          <a:latin typeface="Consolas" panose="020B0609020204030204" pitchFamily="49" charset="0"/>
+                        </a:rPr>
+                        <a:t>PropertyGroup</a:t>
+                      </a:r>
+                      <a:r>
+                        <a:rPr lang="en-US" sz="1600" dirty="0">
+                          <a:solidFill>
+                            <a:srgbClr val="0000FF"/>
+                          </a:solidFill>
+                          <a:latin typeface="Consolas" panose="020B0609020204030204" pitchFamily="49" charset="0"/>
+                        </a:rPr>
+                        <a:t>&gt;</a:t>
+                      </a:r>
+                      <a:endParaRPr lang="en-US" sz="1600" dirty="0">
+                        <a:solidFill>
+                          <a:srgbClr val="000000"/>
+                        </a:solidFill>
+                        <a:latin typeface="Consolas" panose="020B0609020204030204" pitchFamily="49" charset="0"/>
+                      </a:endParaRPr>
+                    </a:p>
+                    <a:p>
+                      <a:r>
+                        <a:rPr lang="en-US" sz="1600" dirty="0">
+                          <a:solidFill>
+                            <a:srgbClr val="0000FF"/>
+                          </a:solidFill>
+                          <a:latin typeface="Consolas" panose="020B0609020204030204" pitchFamily="49" charset="0"/>
+                        </a:rPr>
+                        <a:t>    &lt;</a:t>
+                      </a:r>
+                      <a:r>
+                        <a:rPr lang="en-US" sz="1600" dirty="0" err="1">
+                          <a:solidFill>
+                            <a:srgbClr val="A31515"/>
+                          </a:solidFill>
+                          <a:latin typeface="Consolas" panose="020B0609020204030204" pitchFamily="49" charset="0"/>
+                        </a:rPr>
+                        <a:t>TargetFramework</a:t>
+                      </a:r>
+                      <a:r>
+                        <a:rPr lang="en-US" sz="1600" dirty="0">
+                          <a:solidFill>
+                            <a:srgbClr val="0000FF"/>
+                          </a:solidFill>
+                          <a:latin typeface="Consolas" panose="020B0609020204030204" pitchFamily="49" charset="0"/>
+                        </a:rPr>
+                        <a:t>&gt;</a:t>
+                      </a:r>
+                      <a:r>
+                        <a:rPr lang="en-US" sz="1600" dirty="0">
+                          <a:solidFill>
+                            <a:srgbClr val="000000"/>
+                          </a:solidFill>
+                          <a:latin typeface="Consolas" panose="020B0609020204030204" pitchFamily="49" charset="0"/>
+                        </a:rPr>
+                        <a:t>netcoreapp2.1</a:t>
+                      </a:r>
+                      <a:r>
+                        <a:rPr lang="en-US" sz="1600" dirty="0">
+                          <a:solidFill>
+                            <a:srgbClr val="0000FF"/>
+                          </a:solidFill>
+                          <a:latin typeface="Consolas" panose="020B0609020204030204" pitchFamily="49" charset="0"/>
+                        </a:rPr>
+                        <a:t>&lt;/</a:t>
+                      </a:r>
+                      <a:r>
+                        <a:rPr lang="en-US" sz="1600" dirty="0" err="1">
+                          <a:solidFill>
+                            <a:srgbClr val="A31515"/>
+                          </a:solidFill>
+                          <a:latin typeface="Consolas" panose="020B0609020204030204" pitchFamily="49" charset="0"/>
+                        </a:rPr>
+                        <a:t>TargetFramework</a:t>
+                      </a:r>
+                      <a:r>
+                        <a:rPr lang="en-US" sz="1600" dirty="0">
+                          <a:solidFill>
+                            <a:srgbClr val="0000FF"/>
+                          </a:solidFill>
+                          <a:latin typeface="Consolas" panose="020B0609020204030204" pitchFamily="49" charset="0"/>
+                        </a:rPr>
+                        <a:t>&gt;</a:t>
+                      </a:r>
+                      <a:endParaRPr lang="en-US" sz="1600" dirty="0">
+                        <a:solidFill>
+                          <a:srgbClr val="000000"/>
+                        </a:solidFill>
+                        <a:latin typeface="Consolas" panose="020B0609020204030204" pitchFamily="49" charset="0"/>
+                      </a:endParaRPr>
+                    </a:p>
+                    <a:p>
+                      <a:r>
+                        <a:rPr lang="en-US" sz="1600" dirty="0">
+                          <a:solidFill>
+                            <a:srgbClr val="0000FF"/>
+                          </a:solidFill>
+                          <a:latin typeface="Consolas" panose="020B0609020204030204" pitchFamily="49" charset="0"/>
+                        </a:rPr>
+                        <a:t>    &lt;</a:t>
+                      </a:r>
+                      <a:r>
+                        <a:rPr lang="en-US" sz="1600" dirty="0" err="1">
+                          <a:solidFill>
+                            <a:srgbClr val="A31515"/>
+                          </a:solidFill>
+                          <a:latin typeface="Consolas" panose="020B0609020204030204" pitchFamily="49" charset="0"/>
+                        </a:rPr>
+                        <a:t>UserSecretsId</a:t>
+                      </a:r>
+                      <a:r>
+                        <a:rPr lang="en-US" sz="1600" dirty="0">
+                          <a:solidFill>
+                            <a:srgbClr val="0000FF"/>
+                          </a:solidFill>
+                          <a:latin typeface="Consolas" panose="020B0609020204030204" pitchFamily="49" charset="0"/>
+                        </a:rPr>
+                        <a:t>&gt;</a:t>
+                      </a:r>
+                      <a:r>
+                        <a:rPr lang="en-US" sz="1600" dirty="0">
+                          <a:solidFill>
+                            <a:srgbClr val="000000"/>
+                          </a:solidFill>
+                          <a:latin typeface="Consolas" panose="020B0609020204030204" pitchFamily="49" charset="0"/>
+                        </a:rPr>
+                        <a:t>0087f3aa-237b-4c08-a9dc-5927be11eadd</a:t>
+                      </a:r>
+                      <a:r>
+                        <a:rPr lang="en-US" sz="1600" dirty="0">
+                          <a:solidFill>
+                            <a:srgbClr val="0000FF"/>
+                          </a:solidFill>
+                          <a:latin typeface="Consolas" panose="020B0609020204030204" pitchFamily="49" charset="0"/>
+                        </a:rPr>
+                        <a:t>&lt;/</a:t>
+                      </a:r>
+                      <a:r>
+                        <a:rPr lang="en-US" sz="1600" dirty="0" err="1">
+                          <a:solidFill>
+                            <a:srgbClr val="A31515"/>
+                          </a:solidFill>
+                          <a:latin typeface="Consolas" panose="020B0609020204030204" pitchFamily="49" charset="0"/>
+                        </a:rPr>
+                        <a:t>UserSecretsId</a:t>
+                      </a:r>
+                      <a:r>
+                        <a:rPr lang="en-US" sz="1600" dirty="0">
+                          <a:solidFill>
+                            <a:srgbClr val="0000FF"/>
+                          </a:solidFill>
+                          <a:latin typeface="Consolas" panose="020B0609020204030204" pitchFamily="49" charset="0"/>
+                        </a:rPr>
+                        <a:t>&gt;</a:t>
+                      </a:r>
+                      <a:endParaRPr lang="en-US" sz="1600" dirty="0">
+                        <a:solidFill>
+                          <a:srgbClr val="000000"/>
+                        </a:solidFill>
+                        <a:latin typeface="Consolas" panose="020B0609020204030204" pitchFamily="49" charset="0"/>
+                      </a:endParaRPr>
+                    </a:p>
+                    <a:p>
+                      <a:r>
+                        <a:rPr lang="en-US" sz="1600" dirty="0">
+                          <a:solidFill>
+                            <a:srgbClr val="0000FF"/>
+                          </a:solidFill>
+                          <a:latin typeface="Consolas" panose="020B0609020204030204" pitchFamily="49" charset="0"/>
+                        </a:rPr>
+                        <a:t>  &lt;/</a:t>
+                      </a:r>
+                      <a:r>
+                        <a:rPr lang="en-US" sz="1600" dirty="0" err="1">
+                          <a:solidFill>
+                            <a:srgbClr val="A31515"/>
+                          </a:solidFill>
+                          <a:latin typeface="Consolas" panose="020B0609020204030204" pitchFamily="49" charset="0"/>
+                        </a:rPr>
+                        <a:t>PropertyGroup</a:t>
+                      </a:r>
+                      <a:r>
+                        <a:rPr lang="en-US" sz="1600" dirty="0">
+                          <a:solidFill>
+                            <a:srgbClr val="0000FF"/>
+                          </a:solidFill>
+                          <a:latin typeface="Consolas" panose="020B0609020204030204" pitchFamily="49" charset="0"/>
+                        </a:rPr>
+                        <a:t>&gt;</a:t>
+                      </a:r>
+                      <a:endParaRPr lang="en-US" sz="1600" dirty="0">
+                        <a:solidFill>
+                          <a:srgbClr val="000000"/>
+                        </a:solidFill>
+                        <a:latin typeface="Consolas" panose="020B0609020204030204" pitchFamily="49" charset="0"/>
+                      </a:endParaRPr>
+                    </a:p>
+                  </a:txBody>
+                  <a:tcPr>
+                    <a:lnL w="12700" cap="flat" cmpd="sng" algn="ctr">
+                      <a:solidFill>
+                        <a:sysClr val="window" lastClr="FFFFFF"/>
+                      </a:solidFill>
+                      <a:prstDash val="solid"/>
+                      <a:round/>
+                      <a:headEnd type="none" w="med" len="med"/>
+                      <a:tailEnd type="none" w="med" len="med"/>
+                    </a:lnL>
+                    <a:lnR w="12700" cap="flat" cmpd="sng" algn="ctr">
+                      <a:solidFill>
+                        <a:sysClr val="window" lastClr="FFFFFF"/>
+                      </a:solidFill>
+                      <a:prstDash val="solid"/>
+                      <a:round/>
+                      <a:headEnd type="none" w="med" len="med"/>
+                      <a:tailEnd type="none" w="med" len="med"/>
+                    </a:lnR>
+                    <a:lnT w="12700" cap="flat" cmpd="sng" algn="ctr">
+                      <a:solidFill>
+                        <a:sysClr val="window" lastClr="FFFFFF"/>
+                      </a:solidFill>
+                      <a:prstDash val="solid"/>
+                      <a:round/>
+                      <a:headEnd type="none" w="med" len="med"/>
+                      <a:tailEnd type="none" w="med" len="med"/>
+                    </a:lnT>
+                    <a:lnB w="12700" cap="flat" cmpd="sng" algn="ctr">
+                      <a:solidFill>
+                        <a:sysClr val="window" lastClr="FFFFFF"/>
+                      </a:solidFill>
+                      <a:prstDash val="solid"/>
+                      <a:round/>
+                      <a:headEnd type="none" w="med" len="med"/>
+                      <a:tailEnd type="none" w="med" len="med"/>
+                    </a:lnB>
+                    <a:lnTlToBr w="12700" cmpd="sng">
+                      <a:noFill/>
+                      <a:prstDash val="solid"/>
+                    </a:lnTlToBr>
+                    <a:lnBlToTr w="12700" cmpd="sng">
+                      <a:noFill/>
+                      <a:prstDash val="solid"/>
+                    </a:lnBlToTr>
+                    <a:solidFill>
+                      <a:sysClr val="window" lastClr="FFFFFF"/>
+                    </a:solidFill>
+                  </a:tcPr>
+                </a:tc>
+                <a:extLst>
+                  <a:ext uri="{0D108BD9-81ED-4DB2-BD59-A6C34878D82A}">
+                    <a16:rowId xmlns:a16="http://schemas.microsoft.com/office/drawing/2014/main" val="3473222697"/>
+                  </a:ext>
+                </a:extLst>
+              </a:tr>
+            </a:tbl>
+          </a:graphicData>
+        </a:graphic>
+      </p:graphicFrame>
+      <p:sp>
+        <p:nvSpPr>
+          <p:cNvPr id="18" name="Rectangle 17">
+            <a:extLst>
+              <a:ext uri="{FF2B5EF4-FFF2-40B4-BE49-F238E27FC236}">
+                <a16:creationId xmlns:a16="http://schemas.microsoft.com/office/drawing/2014/main" id="{5940E52A-4BCB-4A62-AA2C-726ACE00FA72}"/>
+              </a:ext>
+            </a:extLst>
+          </p:cNvPr>
+          <p:cNvSpPr/>
+          <p:nvPr/>
+        </p:nvSpPr>
+        <p:spPr>
+          <a:xfrm>
+            <a:off x="832403" y="2910526"/>
+            <a:ext cx="2195881" cy="446567"/>
+          </a:xfrm>
+          <a:prstGeom prst="rect">
+            <a:avLst/>
+          </a:prstGeom>
+          <a:gradFill rotWithShape="1">
+            <a:gsLst>
+              <a:gs pos="0">
+                <a:srgbClr val="5B9BD5">
+                  <a:lumMod val="110000"/>
+                  <a:satMod val="105000"/>
+                  <a:tint val="67000"/>
+                </a:srgbClr>
+              </a:gs>
+              <a:gs pos="50000">
+                <a:srgbClr val="5B9BD5">
+                  <a:lumMod val="105000"/>
+                  <a:satMod val="103000"/>
+                  <a:tint val="73000"/>
+                </a:srgbClr>
+              </a:gs>
+              <a:gs pos="100000">
+                <a:srgbClr val="5B9BD5">
+                  <a:lumMod val="105000"/>
+                  <a:satMod val="109000"/>
+                  <a:tint val="81000"/>
+                </a:srgbClr>
+              </a:gs>
+            </a:gsLst>
+            <a:lin ang="5400000" scaled="0"/>
+          </a:gradFill>
+          <a:ln w="6350" cap="flat" cmpd="sng" algn="ctr">
+            <a:solidFill>
+              <a:srgbClr val="5B9BD5"/>
+            </a:solidFill>
+            <a:prstDash val="solid"/>
+            <a:miter lim="800000"/>
+          </a:ln>
+          <a:effectLst/>
+        </p:spPr>
+        <p:txBody>
+          <a:bodyPr rtlCol="0" anchor="ctr"/>
+          <a:lstStyle/>
+          <a:p>
+            <a:pPr marL="0" marR="0" lvl="0" indent="0" algn="ctr" defTabSz="914400" eaLnBrk="1" fontAlgn="auto" latinLnBrk="0" hangingPunct="1">
+              <a:lnSpc>
+                <a:spcPct val="100000"/>
+              </a:lnSpc>
+              <a:spcBef>
+                <a:spcPts val="0"/>
+              </a:spcBef>
+              <a:spcAft>
+                <a:spcPts val="0"/>
+              </a:spcAft>
+              <a:buClrTx/>
+              <a:buSzTx/>
+              <a:buFontTx/>
+              <a:buNone/>
+              <a:tabLst/>
+              <a:defRPr/>
+            </a:pPr>
+            <a:r>
+              <a:rPr lang="en-US" b="1" kern="0" noProof="0" dirty="0" err="1">
+                <a:solidFill>
+                  <a:prstClr val="black"/>
+                </a:solidFill>
+                <a:latin typeface="Segoe UI Light"/>
+              </a:rPr>
+              <a:t>MovieCatalog</a:t>
+            </a:r>
+            <a:r>
+              <a:rPr kumimoji="0" lang="en-US" sz="1800" b="1" i="0" u="none" strike="noStrike" kern="0" cap="none" spc="0" normalizeH="0" baseline="0" noProof="0" dirty="0" err="1">
+                <a:ln>
+                  <a:noFill/>
+                </a:ln>
+                <a:solidFill>
+                  <a:prstClr val="black"/>
+                </a:solidFill>
+                <a:effectLst/>
+                <a:uLnTx/>
+                <a:uFillTx/>
+                <a:latin typeface="Segoe UI Light"/>
+                <a:ea typeface="+mn-ea"/>
+                <a:cs typeface="+mn-cs"/>
+              </a:rPr>
+              <a:t>.csproj</a:t>
+            </a:r>
+            <a:endParaRPr kumimoji="0" lang="en-US" sz="1800" b="1" i="0" u="none" strike="noStrike" kern="0" cap="none" spc="0" normalizeH="0" baseline="0" noProof="0" dirty="0">
+              <a:ln>
+                <a:noFill/>
+              </a:ln>
+              <a:solidFill>
+                <a:prstClr val="black"/>
+              </a:solidFill>
+              <a:effectLst/>
+              <a:uLnTx/>
+              <a:uFillTx/>
+              <a:latin typeface="Segoe UI Light"/>
+              <a:ea typeface="+mn-ea"/>
+              <a:cs typeface="+mn-cs"/>
+            </a:endParaRPr>
+          </a:p>
+        </p:txBody>
+      </p:sp>
+      <p:sp>
+        <p:nvSpPr>
+          <p:cNvPr id="21" name="Rounded Rectangle 33">
+            <a:extLst>
+              <a:ext uri="{FF2B5EF4-FFF2-40B4-BE49-F238E27FC236}">
+                <a16:creationId xmlns:a16="http://schemas.microsoft.com/office/drawing/2014/main" id="{6AFE4F7A-E550-4C62-A076-FB8E38CCBF2C}"/>
+              </a:ext>
+            </a:extLst>
+          </p:cNvPr>
+          <p:cNvSpPr/>
+          <p:nvPr/>
+        </p:nvSpPr>
+        <p:spPr>
+          <a:xfrm>
+            <a:off x="832403" y="4938045"/>
+            <a:ext cx="4923882" cy="691116"/>
+          </a:xfrm>
+          <a:prstGeom prst="roundRect">
+            <a:avLst/>
+          </a:prstGeom>
+          <a:solidFill>
+            <a:schemeClr val="bg2"/>
+          </a:solidFill>
+        </p:spPr>
+        <p:style>
+          <a:lnRef idx="2">
+            <a:schemeClr val="accent1">
+              <a:shade val="50000"/>
+            </a:schemeClr>
+          </a:lnRef>
+          <a:fillRef idx="1">
+            <a:schemeClr val="accent1"/>
+          </a:fillRef>
+          <a:effectRef idx="0">
+            <a:schemeClr val="accent1"/>
+          </a:effectRef>
+          <a:fontRef idx="minor">
+            <a:schemeClr val="lt1"/>
+          </a:fontRef>
+        </p:style>
+        <p:txBody>
+          <a:bodyPr rtlCol="0" anchor="ctr"/>
+          <a:lstStyle/>
+          <a:p>
+            <a:pPr algn="r"/>
+            <a:r>
+              <a:rPr lang="en-US" b="1" dirty="0"/>
+              <a:t>~/.</a:t>
+            </a:r>
+            <a:r>
+              <a:rPr lang="en-US" b="1" dirty="0" err="1"/>
+              <a:t>microsoft</a:t>
+            </a:r>
+            <a:r>
+              <a:rPr lang="en-US" b="1" dirty="0"/>
+              <a:t>/</a:t>
+            </a:r>
+            <a:r>
+              <a:rPr lang="en-US" b="1" dirty="0" err="1"/>
+              <a:t>usersecrets</a:t>
+            </a:r>
+            <a:r>
+              <a:rPr lang="en-US" b="1" dirty="0"/>
+              <a:t>/&lt;id&gt;/</a:t>
+            </a:r>
+          </a:p>
+        </p:txBody>
+      </p:sp>
+      <p:pic>
+        <p:nvPicPr>
+          <p:cNvPr id="22" name="Picture 2" descr="http://files.softicons.com/download/system-icons/windows-8-metro-icons-by-dakirby309/png/512x512/Folders%20&amp;%20OS/Linux.png">
+            <a:extLst>
+              <a:ext uri="{FF2B5EF4-FFF2-40B4-BE49-F238E27FC236}">
+                <a16:creationId xmlns:a16="http://schemas.microsoft.com/office/drawing/2014/main" id="{E7649DFC-684E-4B40-B1F3-772480D769E7}"/>
+              </a:ext>
+            </a:extLst>
+          </p:cNvPr>
+          <p:cNvPicPr>
+            <a:picLocks noChangeAspect="1" noChangeArrowheads="1"/>
+          </p:cNvPicPr>
+          <p:nvPr/>
+        </p:nvPicPr>
+        <p:blipFill>
+          <a:blip r:embed="rId3" cstate="print">
+            <a:extLst>
+              <a:ext uri="{BEBA8EAE-BF5A-486C-A8C5-ECC9F3942E4B}">
+                <a14:imgProps xmlns:a14="http://schemas.microsoft.com/office/drawing/2010/main">
+                  <a14:imgLayer r:embed="rId4">
+                    <a14:imgEffect>
+                      <a14:backgroundRemoval t="10000" b="90000" l="10000" r="90000"/>
+                    </a14:imgEffect>
+                  </a14:imgLayer>
+                </a14:imgProps>
+              </a:ext>
+              <a:ext uri="{28A0092B-C50C-407E-A947-70E740481C1C}">
+                <a14:useLocalDpi xmlns:a14="http://schemas.microsoft.com/office/drawing/2010/main" val="0"/>
+              </a:ext>
+            </a:extLst>
+          </a:blip>
+          <a:srcRect/>
+          <a:stretch>
+            <a:fillRect/>
+          </a:stretch>
+        </p:blipFill>
+        <p:spPr bwMode="auto">
+          <a:xfrm>
+            <a:off x="919113" y="5012110"/>
+            <a:ext cx="507863" cy="498593"/>
+          </a:xfrm>
+          <a:prstGeom prst="rect">
+            <a:avLst/>
+          </a:prstGeom>
+          <a:noFill/>
+          <a:extLst>
+            <a:ext uri="{909E8E84-426E-40DD-AFC4-6F175D3DCCD1}">
+              <a14:hiddenFill xmlns:a14="http://schemas.microsoft.com/office/drawing/2010/main">
+                <a:solidFill>
+                  <a:srgbClr val="FFFFFF"/>
+                </a:solidFill>
+              </a14:hiddenFill>
+            </a:ext>
+          </a:extLst>
+        </p:spPr>
+      </p:pic>
+      <p:pic>
+        <p:nvPicPr>
+          <p:cNvPr id="23" name="Picture 22">
+            <a:extLst>
+              <a:ext uri="{FF2B5EF4-FFF2-40B4-BE49-F238E27FC236}">
+                <a16:creationId xmlns:a16="http://schemas.microsoft.com/office/drawing/2014/main" id="{A5D81AF3-B696-42DE-ADDB-C258A83509C1}"/>
+              </a:ext>
+            </a:extLst>
+          </p:cNvPr>
+          <p:cNvPicPr>
+            <a:picLocks noChangeAspect="1"/>
+          </p:cNvPicPr>
+          <p:nvPr/>
+        </p:nvPicPr>
+        <p:blipFill>
+          <a:blip r:embed="rId5" cstate="print">
+            <a:lum bright="70000" contrast="-70000"/>
+            <a:extLst>
+              <a:ext uri="{28A0092B-C50C-407E-A947-70E740481C1C}">
+                <a14:useLocalDpi xmlns:a14="http://schemas.microsoft.com/office/drawing/2010/main" val="0"/>
+              </a:ext>
+            </a:extLst>
+          </a:blip>
+          <a:stretch>
+            <a:fillRect/>
+          </a:stretch>
+        </p:blipFill>
+        <p:spPr>
+          <a:xfrm>
+            <a:off x="1420328" y="5012110"/>
+            <a:ext cx="385752" cy="454164"/>
+          </a:xfrm>
+          <a:prstGeom prst="rect">
+            <a:avLst/>
+          </a:prstGeom>
+        </p:spPr>
+      </p:pic>
+      <p:sp>
+        <p:nvSpPr>
+          <p:cNvPr id="30" name="Rounded Rectangle 33">
+            <a:extLst>
+              <a:ext uri="{FF2B5EF4-FFF2-40B4-BE49-F238E27FC236}">
+                <a16:creationId xmlns:a16="http://schemas.microsoft.com/office/drawing/2014/main" id="{C42CA6AF-7109-4AFA-A004-B35DCE3D8F3A}"/>
+              </a:ext>
+            </a:extLst>
+          </p:cNvPr>
+          <p:cNvSpPr/>
+          <p:nvPr/>
+        </p:nvSpPr>
+        <p:spPr>
+          <a:xfrm>
+            <a:off x="832402" y="5645640"/>
+            <a:ext cx="4934427" cy="691116"/>
+          </a:xfrm>
+          <a:prstGeom prst="roundRect">
+            <a:avLst/>
+          </a:prstGeom>
+          <a:solidFill>
+            <a:schemeClr val="bg2"/>
+          </a:solidFill>
+        </p:spPr>
+        <p:style>
+          <a:lnRef idx="2">
+            <a:schemeClr val="accent1">
+              <a:shade val="50000"/>
+            </a:schemeClr>
+          </a:lnRef>
+          <a:fillRef idx="1">
+            <a:schemeClr val="accent1"/>
+          </a:fillRef>
+          <a:effectRef idx="0">
+            <a:schemeClr val="accent1"/>
+          </a:effectRef>
+          <a:fontRef idx="minor">
+            <a:schemeClr val="lt1"/>
+          </a:fontRef>
+        </p:style>
+        <p:txBody>
+          <a:bodyPr rtlCol="0" anchor="ctr"/>
+          <a:lstStyle/>
+          <a:p>
+            <a:pPr algn="r"/>
+            <a:r>
+              <a:rPr lang="en-US" b="1" dirty="0"/>
+              <a:t>%APPDATA%\Microsoft\</a:t>
+            </a:r>
+            <a:r>
+              <a:rPr lang="en-US" b="1" dirty="0" err="1"/>
+              <a:t>UserSecrets</a:t>
+            </a:r>
+            <a:r>
+              <a:rPr lang="en-US" b="1" dirty="0"/>
+              <a:t>\&lt;id&gt;\</a:t>
+            </a:r>
+          </a:p>
+        </p:txBody>
+      </p:sp>
+      <p:pic>
+        <p:nvPicPr>
+          <p:cNvPr id="15" name="Picture 6" descr="C:\temp\WinAzure_rgb_Wht_S.png">
+            <a:extLst>
+              <a:ext uri="{FF2B5EF4-FFF2-40B4-BE49-F238E27FC236}">
+                <a16:creationId xmlns:a16="http://schemas.microsoft.com/office/drawing/2014/main" id="{9E236C65-B717-4E03-A30D-5799CF2DF5E1}"/>
+              </a:ext>
+            </a:extLst>
+          </p:cNvPr>
+          <p:cNvPicPr>
+            <a:picLocks noChangeAspect="1" noChangeArrowheads="1"/>
+          </p:cNvPicPr>
+          <p:nvPr/>
+        </p:nvPicPr>
+        <p:blipFill rotWithShape="1">
+          <a:blip r:embed="rId6" cstate="print">
+            <a:extLst>
+              <a:ext uri="{28A0092B-C50C-407E-A947-70E740481C1C}">
+                <a14:useLocalDpi xmlns:a14="http://schemas.microsoft.com/office/drawing/2010/main" val="0"/>
+              </a:ext>
+            </a:extLst>
+          </a:blip>
+          <a:srcRect l="3371" t="15460" r="80628" b="15496"/>
+          <a:stretch/>
+        </p:blipFill>
+        <p:spPr bwMode="auto">
+          <a:xfrm>
+            <a:off x="945120" y="5759716"/>
+            <a:ext cx="455848" cy="462964"/>
+          </a:xfrm>
+          <a:prstGeom prst="rect">
+            <a:avLst/>
+          </a:prstGeom>
+          <a:noFill/>
+          <a:extLst>
+            <a:ext uri="{909E8E84-426E-40DD-AFC4-6F175D3DCCD1}">
+              <a14:hiddenFill xmlns:a14="http://schemas.microsoft.com/office/drawing/2010/main">
+                <a:solidFill>
+                  <a:srgbClr val="FFFFFF"/>
+                </a:solidFill>
+              </a14:hiddenFill>
+            </a:ext>
+          </a:extLst>
+        </p:spPr>
+      </p:pic>
       <p:sp>
         <p:nvSpPr>
           <p:cNvPr id="26" name="Arrow: Down 25">
@@ -15088,9 +15597,9 @@
           <p:nvPr/>
         </p:nvSpPr>
         <p:spPr>
-          <a:xfrm>
-            <a:off x="4998875" y="2711302"/>
-            <a:ext cx="424254" cy="628779"/>
+          <a:xfrm rot="2065940">
+            <a:off x="4715271" y="2623424"/>
+            <a:ext cx="424254" cy="1631919"/>
           </a:xfrm>
           <a:prstGeom prst="downArrow">
             <a:avLst/>
@@ -15123,6 +15632,58 @@
       </p:sp>
       <p:sp>
         <p:nvSpPr>
+          <p:cNvPr id="31" name="Rectangle 30">
+            <a:extLst>
+              <a:ext uri="{FF2B5EF4-FFF2-40B4-BE49-F238E27FC236}">
+                <a16:creationId xmlns:a16="http://schemas.microsoft.com/office/drawing/2014/main" id="{C1232EE9-6DC4-4EAA-9752-FC7A7A739EBE}"/>
+              </a:ext>
+            </a:extLst>
+          </p:cNvPr>
+          <p:cNvSpPr/>
+          <p:nvPr/>
+        </p:nvSpPr>
+        <p:spPr>
+          <a:xfrm>
+            <a:off x="1324372" y="4125462"/>
+            <a:ext cx="7525630" cy="277638"/>
+          </a:xfrm>
+          <a:prstGeom prst="rect">
+            <a:avLst/>
+          </a:prstGeom>
+          <a:noFill/>
+          <a:ln w="38100">
+            <a:solidFill>
+              <a:schemeClr val="accent1"/>
+            </a:solidFill>
+          </a:ln>
+        </p:spPr>
+        <p:style>
+          <a:lnRef idx="2">
+            <a:schemeClr val="accent1">
+              <a:shade val="50000"/>
+            </a:schemeClr>
+          </a:lnRef>
+          <a:fillRef idx="1">
+            <a:schemeClr val="accent1"/>
+          </a:fillRef>
+          <a:effectRef idx="0">
+            <a:schemeClr val="accent1"/>
+          </a:effectRef>
+          <a:fontRef idx="minor">
+            <a:schemeClr val="lt1"/>
+          </a:fontRef>
+        </p:style>
+        <p:txBody>
+          <a:bodyPr rtlCol="0" anchor="ctr"/>
+          <a:lstStyle/>
+          <a:p>
+            <a:pPr algn="ctr"/>
+            <a:endParaRPr lang="en-US"/>
+          </a:p>
+        </p:txBody>
+      </p:sp>
+      <p:sp>
+        <p:nvSpPr>
           <p:cNvPr id="27" name="Arrow: Down 26">
             <a:extLst>
               <a:ext uri="{FF2B5EF4-FFF2-40B4-BE49-F238E27FC236}">
@@ -15134,8 +15695,8 @@
           <p:nvPr/>
         </p:nvSpPr>
         <p:spPr>
-          <a:xfrm rot="2984580">
-            <a:off x="4612609" y="4135011"/>
+          <a:xfrm rot="19265801">
+            <a:off x="4649274" y="4367720"/>
             <a:ext cx="424254" cy="880286"/>
           </a:xfrm>
           <a:prstGeom prst="downArrow">
@@ -15164,6 +15725,104 @@
           <a:p>
             <a:pPr algn="ctr"/>
             <a:endParaRPr lang="en-US" dirty="0"/>
+          </a:p>
+        </p:txBody>
+      </p:sp>
+      <p:sp>
+        <p:nvSpPr>
+          <p:cNvPr id="32" name="Arrow: Down 31">
+            <a:extLst>
+              <a:ext uri="{FF2B5EF4-FFF2-40B4-BE49-F238E27FC236}">
+                <a16:creationId xmlns:a16="http://schemas.microsoft.com/office/drawing/2014/main" id="{6657C575-E8A6-409F-8D48-3C1718512A67}"/>
+              </a:ext>
+            </a:extLst>
+          </p:cNvPr>
+          <p:cNvSpPr/>
+          <p:nvPr/>
+        </p:nvSpPr>
+        <p:spPr>
+          <a:xfrm rot="16200000">
+            <a:off x="5953976" y="5204124"/>
+            <a:ext cx="424254" cy="880286"/>
+          </a:xfrm>
+          <a:prstGeom prst="downArrow">
+            <a:avLst/>
+          </a:prstGeom>
+        </p:spPr>
+        <p:style>
+          <a:lnRef idx="2">
+            <a:schemeClr val="accent1">
+              <a:shade val="50000"/>
+            </a:schemeClr>
+          </a:lnRef>
+          <a:fillRef idx="1">
+            <a:schemeClr val="accent1"/>
+          </a:fillRef>
+          <a:effectRef idx="0">
+            <a:schemeClr val="accent1"/>
+          </a:effectRef>
+          <a:fontRef idx="minor">
+            <a:schemeClr val="lt1"/>
+          </a:fontRef>
+        </p:style>
+        <p:txBody>
+          <a:bodyPr rtlCol="0" anchor="ctr"/>
+          <a:lstStyle/>
+          <a:p>
+            <a:pPr algn="ctr"/>
+            <a:endParaRPr lang="en-US" dirty="0"/>
+          </a:p>
+        </p:txBody>
+      </p:sp>
+      <p:sp>
+        <p:nvSpPr>
+          <p:cNvPr id="33" name="Rectangle 32">
+            <a:extLst>
+              <a:ext uri="{FF2B5EF4-FFF2-40B4-BE49-F238E27FC236}">
+                <a16:creationId xmlns:a16="http://schemas.microsoft.com/office/drawing/2014/main" id="{853C5F33-C267-44A2-98A4-E0AE5E5503EF}"/>
+              </a:ext>
+            </a:extLst>
+          </p:cNvPr>
+          <p:cNvSpPr/>
+          <p:nvPr/>
+        </p:nvSpPr>
+        <p:spPr>
+          <a:xfrm>
+            <a:off x="5089007" y="5155298"/>
+            <a:ext cx="465280" cy="993247"/>
+          </a:xfrm>
+          <a:prstGeom prst="rect">
+            <a:avLst/>
+          </a:prstGeom>
+          <a:noFill/>
+          <a:ln w="38100">
+            <a:solidFill>
+              <a:schemeClr val="accent1"/>
+            </a:solidFill>
+          </a:ln>
+        </p:spPr>
+        <p:style>
+          <a:lnRef idx="2">
+            <a:schemeClr val="accent1">
+              <a:shade val="50000"/>
+            </a:schemeClr>
+          </a:lnRef>
+          <a:fillRef idx="1">
+            <a:schemeClr val="accent1"/>
+          </a:fillRef>
+          <a:effectRef idx="0">
+            <a:schemeClr val="accent1"/>
+          </a:effectRef>
+          <a:fontRef idx="minor">
+            <a:schemeClr val="lt1"/>
+          </a:fontRef>
+        </p:style>
+        <p:txBody>
+          <a:bodyPr rtlCol="0" anchor="ctr"/>
+          <a:lstStyle/>
+          <a:p>
+            <a:pPr algn="ctr"/>
+            <a:endParaRPr lang="en-US"/>
           </a:p>
         </p:txBody>
       </p:sp>
@@ -15315,7 +15974,7 @@
                                           </p:stCondLst>
                                         </p:cTn>
                                         <p:tgtEl>
-                                          <p:spTgt spid="12"/>
+                                          <p:spTgt spid="18"/>
                                         </p:tgtEl>
                                         <p:attrNameLst>
                                           <p:attrName>style.visibility</p:attrName>
@@ -15329,31 +15988,57 @@
                                       <p:cBhvr>
                                         <p:cTn id="15" dur="500"/>
                                         <p:tgtEl>
-                                          <p:spTgt spid="12"/>
+                                          <p:spTgt spid="18"/>
                                         </p:tgtEl>
                                       </p:cBhvr>
                                     </p:animEffect>
                                   </p:childTnLst>
                                 </p:cTn>
                               </p:par>
-                            </p:childTnLst>
-                          </p:cTn>
-                        </p:par>
-                        <p:par>
-                          <p:cTn id="16" fill="hold">
-                            <p:stCondLst>
-                              <p:cond delay="500"/>
-                            </p:stCondLst>
-                            <p:childTnLst>
                               <p:par>
-                                <p:cTn id="17" presetID="10" presetClass="entr" presetSubtype="0" fill="hold" grpId="0" nodeType="afterEffect">
+                                <p:cTn id="16" presetID="10" presetClass="entr" presetSubtype="0" fill="hold" nodeType="withEffect">
                                   <p:stCondLst>
                                     <p:cond delay="0"/>
                                   </p:stCondLst>
                                   <p:childTnLst>
                                     <p:set>
                                       <p:cBhvr>
-                                        <p:cTn id="18" dur="1" fill="hold">
+                                        <p:cTn id="17" dur="1" fill="hold">
+                                          <p:stCondLst>
+                                            <p:cond delay="0"/>
+                                          </p:stCondLst>
+                                        </p:cTn>
+                                        <p:tgtEl>
+                                          <p:spTgt spid="17"/>
+                                        </p:tgtEl>
+                                        <p:attrNameLst>
+                                          <p:attrName>style.visibility</p:attrName>
+                                        </p:attrNameLst>
+                                      </p:cBhvr>
+                                      <p:to>
+                                        <p:strVal val="visible"/>
+                                      </p:to>
+                                    </p:set>
+                                    <p:animEffect transition="in" filter="fade">
+                                      <p:cBhvr>
+                                        <p:cTn id="18" dur="500"/>
+                                        <p:tgtEl>
+                                          <p:spTgt spid="17"/>
+                                        </p:tgtEl>
+                                      </p:cBhvr>
+                                    </p:animEffect>
+                                  </p:childTnLst>
+                                </p:cTn>
+                              </p:par>
+                              <p:par>
+                                <p:cTn id="19" presetID="10" presetClass="entr" presetSubtype="0" fill="hold" grpId="0" nodeType="withEffect">
+                                  <p:stCondLst>
+                                    <p:cond delay="0"/>
+                                  </p:stCondLst>
+                                  <p:childTnLst>
+                                    <p:set>
+                                      <p:cBhvr>
+                                        <p:cTn id="20" dur="1" fill="hold">
                                           <p:stCondLst>
                                             <p:cond delay="0"/>
                                           </p:stCondLst>
@@ -15371,7 +16056,7 @@
                                     </p:set>
                                     <p:animEffect transition="in" filter="fade">
                                       <p:cBhvr>
-                                        <p:cTn id="19" dur="500"/>
+                                        <p:cTn id="21" dur="500"/>
                                         <p:tgtEl>
                                           <p:spTgt spid="26"/>
                                         </p:tgtEl>
@@ -15381,20 +16066,20 @@
                                 </p:cTn>
                               </p:par>
                               <p:par>
-                                <p:cTn id="20" presetID="10" presetClass="entr" presetSubtype="0" fill="hold" nodeType="withEffect">
+                                <p:cTn id="22" presetID="10" presetClass="entr" presetSubtype="0" fill="hold" grpId="0" nodeType="withEffect">
                                   <p:stCondLst>
                                     <p:cond delay="0"/>
                                   </p:stCondLst>
                                   <p:childTnLst>
                                     <p:set>
                                       <p:cBhvr>
-                                        <p:cTn id="21" dur="1" fill="hold">
+                                        <p:cTn id="23" dur="1" fill="hold">
                                           <p:stCondLst>
                                             <p:cond delay="0"/>
                                           </p:stCondLst>
                                         </p:cTn>
                                         <p:tgtEl>
-                                          <p:spTgt spid="13"/>
+                                          <p:spTgt spid="31"/>
                                         </p:tgtEl>
                                         <p:attrNameLst>
                                           <p:attrName>style.visibility</p:attrName>
@@ -15406,30 +16091,48 @@
                                     </p:set>
                                     <p:animEffect transition="in" filter="fade">
                                       <p:cBhvr>
-                                        <p:cTn id="22" dur="500"/>
+                                        <p:cTn id="24" dur="500"/>
                                         <p:tgtEl>
-                                          <p:spTgt spid="13"/>
+                                          <p:spTgt spid="31"/>
                                         </p:tgtEl>
                                       </p:cBhvr>
                                     </p:animEffect>
                                   </p:childTnLst>
                                 </p:cTn>
                               </p:par>
+                            </p:childTnLst>
+                          </p:cTn>
+                        </p:par>
+                      </p:childTnLst>
+                    </p:cTn>
+                  </p:par>
+                  <p:par>
+                    <p:cTn id="25" fill="hold">
+                      <p:stCondLst>
+                        <p:cond delay="indefinite"/>
+                      </p:stCondLst>
+                      <p:childTnLst>
+                        <p:par>
+                          <p:cTn id="26" fill="hold">
+                            <p:stCondLst>
+                              <p:cond delay="0"/>
+                            </p:stCondLst>
+                            <p:childTnLst>
                               <p:par>
-                                <p:cTn id="23" presetID="10" presetClass="entr" presetSubtype="0" fill="hold" nodeType="withEffect">
+                                <p:cTn id="27" presetID="10" presetClass="entr" presetSubtype="0" fill="hold" grpId="0" nodeType="clickEffect">
                                   <p:stCondLst>
                                     <p:cond delay="0"/>
                                   </p:stCondLst>
                                   <p:childTnLst>
                                     <p:set>
                                       <p:cBhvr>
-                                        <p:cTn id="24" dur="1" fill="hold">
+                                        <p:cTn id="28" dur="1" fill="hold">
                                           <p:stCondLst>
                                             <p:cond delay="0"/>
                                           </p:stCondLst>
                                         </p:cTn>
                                         <p:tgtEl>
-                                          <p:spTgt spid="14"/>
+                                          <p:spTgt spid="27"/>
                                         </p:tgtEl>
                                         <p:attrNameLst>
                                           <p:attrName>style.visibility</p:attrName>
@@ -15441,9 +16144,9 @@
                                     </p:set>
                                     <p:animEffect transition="in" filter="fade">
                                       <p:cBhvr>
-                                        <p:cTn id="25" dur="500"/>
+                                        <p:cTn id="29" dur="500"/>
                                         <p:tgtEl>
-                                          <p:spTgt spid="14"/>
+                                          <p:spTgt spid="27"/>
                                         </p:tgtEl>
                                       </p:cBhvr>
                                     </p:animEffect>
@@ -15451,14 +16154,154 @@
                                 </p:cTn>
                               </p:par>
                               <p:par>
-                                <p:cTn id="26" presetID="10" presetClass="entr" presetSubtype="0" fill="hold" nodeType="withEffect">
+                                <p:cTn id="30" presetID="10" presetClass="entr" presetSubtype="0" fill="hold" grpId="0" nodeType="withEffect">
                                   <p:stCondLst>
                                     <p:cond delay="0"/>
                                   </p:stCondLst>
                                   <p:childTnLst>
                                     <p:set>
                                       <p:cBhvr>
-                                        <p:cTn id="27" dur="1" fill="hold">
+                                        <p:cTn id="31" dur="1" fill="hold">
+                                          <p:stCondLst>
+                                            <p:cond delay="0"/>
+                                          </p:stCondLst>
+                                        </p:cTn>
+                                        <p:tgtEl>
+                                          <p:spTgt spid="21"/>
+                                        </p:tgtEl>
+                                        <p:attrNameLst>
+                                          <p:attrName>style.visibility</p:attrName>
+                                        </p:attrNameLst>
+                                      </p:cBhvr>
+                                      <p:to>
+                                        <p:strVal val="visible"/>
+                                      </p:to>
+                                    </p:set>
+                                    <p:animEffect transition="in" filter="fade">
+                                      <p:cBhvr>
+                                        <p:cTn id="32" dur="500"/>
+                                        <p:tgtEl>
+                                          <p:spTgt spid="21"/>
+                                        </p:tgtEl>
+                                      </p:cBhvr>
+                                    </p:animEffect>
+                                  </p:childTnLst>
+                                </p:cTn>
+                              </p:par>
+                              <p:par>
+                                <p:cTn id="33" presetID="10" presetClass="entr" presetSubtype="0" fill="hold" nodeType="withEffect">
+                                  <p:stCondLst>
+                                    <p:cond delay="0"/>
+                                  </p:stCondLst>
+                                  <p:childTnLst>
+                                    <p:set>
+                                      <p:cBhvr>
+                                        <p:cTn id="34" dur="1" fill="hold">
+                                          <p:stCondLst>
+                                            <p:cond delay="0"/>
+                                          </p:stCondLst>
+                                        </p:cTn>
+                                        <p:tgtEl>
+                                          <p:spTgt spid="22"/>
+                                        </p:tgtEl>
+                                        <p:attrNameLst>
+                                          <p:attrName>style.visibility</p:attrName>
+                                        </p:attrNameLst>
+                                      </p:cBhvr>
+                                      <p:to>
+                                        <p:strVal val="visible"/>
+                                      </p:to>
+                                    </p:set>
+                                    <p:animEffect transition="in" filter="fade">
+                                      <p:cBhvr>
+                                        <p:cTn id="35" dur="500"/>
+                                        <p:tgtEl>
+                                          <p:spTgt spid="22"/>
+                                        </p:tgtEl>
+                                      </p:cBhvr>
+                                    </p:animEffect>
+                                  </p:childTnLst>
+                                </p:cTn>
+                              </p:par>
+                              <p:par>
+                                <p:cTn id="36" presetID="10" presetClass="entr" presetSubtype="0" fill="hold" nodeType="withEffect">
+                                  <p:stCondLst>
+                                    <p:cond delay="0"/>
+                                  </p:stCondLst>
+                                  <p:childTnLst>
+                                    <p:set>
+                                      <p:cBhvr>
+                                        <p:cTn id="37" dur="1" fill="hold">
+                                          <p:stCondLst>
+                                            <p:cond delay="0"/>
+                                          </p:stCondLst>
+                                        </p:cTn>
+                                        <p:tgtEl>
+                                          <p:spTgt spid="23"/>
+                                        </p:tgtEl>
+                                        <p:attrNameLst>
+                                          <p:attrName>style.visibility</p:attrName>
+                                        </p:attrNameLst>
+                                      </p:cBhvr>
+                                      <p:to>
+                                        <p:strVal val="visible"/>
+                                      </p:to>
+                                    </p:set>
+                                    <p:animEffect transition="in" filter="fade">
+                                      <p:cBhvr>
+                                        <p:cTn id="38" dur="500"/>
+                                        <p:tgtEl>
+                                          <p:spTgt spid="23"/>
+                                        </p:tgtEl>
+                                      </p:cBhvr>
+                                    </p:animEffect>
+                                  </p:childTnLst>
+                                </p:cTn>
+                              </p:par>
+                              <p:par>
+                                <p:cTn id="39" presetID="10" presetClass="entr" presetSubtype="0" fill="hold" grpId="0" nodeType="withEffect">
+                                  <p:stCondLst>
+                                    <p:cond delay="0"/>
+                                  </p:stCondLst>
+                                  <p:childTnLst>
+                                    <p:set>
+                                      <p:cBhvr>
+                                        <p:cTn id="40" dur="1" fill="hold">
+                                          <p:stCondLst>
+                                            <p:cond delay="0"/>
+                                          </p:stCondLst>
+                                        </p:cTn>
+                                        <p:tgtEl>
+                                          <p:spTgt spid="30"/>
+                                        </p:tgtEl>
+                                        <p:attrNameLst>
+                                          <p:attrName>style.visibility</p:attrName>
+                                        </p:attrNameLst>
+                                      </p:cBhvr>
+                                      <p:to>
+                                        <p:strVal val="visible"/>
+                                      </p:to>
+                                    </p:set>
+                                    <p:animEffect transition="in" filter="fade">
+                                      <p:cBhvr>
+                                        <p:cTn id="41" dur="500"/>
+                                        <p:tgtEl>
+                                          <p:spTgt spid="30"/>
+                                        </p:tgtEl>
+                                      </p:cBhvr>
+                                    </p:animEffect>
+                                  </p:childTnLst>
+                                </p:cTn>
+                              </p:par>
+                              <p:par>
+                                <p:cTn id="42" presetID="10" presetClass="entr" presetSubtype="0" fill="hold" nodeType="withEffect">
+                                  <p:stCondLst>
+                                    <p:cond delay="0"/>
+                                  </p:stCondLst>
+                                  <p:childTnLst>
+                                    <p:set>
+                                      <p:cBhvr>
+                                        <p:cTn id="43" dur="1" fill="hold">
                                           <p:stCondLst>
                                             <p:cond delay="0"/>
                                           </p:stCondLst>
@@ -15476,7 +16319,7 @@
                                     </p:set>
                                     <p:animEffect transition="in" filter="fade">
                                       <p:cBhvr>
-                                        <p:cTn id="28" dur="500"/>
+                                        <p:cTn id="44" dur="500"/>
                                         <p:tgtEl>
                                           <p:spTgt spid="15"/>
                                         </p:tgtEl>
@@ -15486,20 +16329,20 @@
                                 </p:cTn>
                               </p:par>
                               <p:par>
-                                <p:cTn id="29" presetID="10" presetClass="entr" presetSubtype="0" fill="hold" nodeType="withEffect">
+                                <p:cTn id="45" presetID="10" presetClass="entr" presetSubtype="0" fill="hold" grpId="0" nodeType="withEffect">
                                   <p:stCondLst>
                                     <p:cond delay="0"/>
                                   </p:stCondLst>
                                   <p:childTnLst>
                                     <p:set>
                                       <p:cBhvr>
-                                        <p:cTn id="30" dur="1" fill="hold">
+                                        <p:cTn id="46" dur="1" fill="hold">
                                           <p:stCondLst>
                                             <p:cond delay="0"/>
                                           </p:stCondLst>
                                         </p:cTn>
                                         <p:tgtEl>
-                                          <p:spTgt spid="16"/>
+                                          <p:spTgt spid="33"/>
                                         </p:tgtEl>
                                         <p:attrNameLst>
                                           <p:attrName>style.visibility</p:attrName>
@@ -15511,79 +16354,9 @@
                                     </p:set>
                                     <p:animEffect transition="in" filter="fade">
                                       <p:cBhvr>
-                                        <p:cTn id="31" dur="500"/>
+                                        <p:cTn id="47" dur="500"/>
                                         <p:tgtEl>
-                                          <p:spTgt spid="16"/>
-                                        </p:tgtEl>
-                                      </p:cBhvr>
-                                    </p:animEffect>
-                                  </p:childTnLst>
-                                </p:cTn>
-                              </p:par>
-                              <p:par>
-                                <p:cTn id="32" presetID="10" presetClass="entr" presetSubtype="0" fill="hold" grpId="0" nodeType="withEffect">
-                                  <p:stCondLst>
-                                    <p:cond delay="0"/>
-                                  </p:stCondLst>
-                                  <p:childTnLst>
-                                    <p:set>
-                                      <p:cBhvr>
-                                        <p:cTn id="33" dur="1" fill="hold">
-                                          <p:stCondLst>
-                                            <p:cond delay="0"/>
-                                          </p:stCondLst>
-                                        </p:cTn>
-                                        <p:tgtEl>
-                                          <p:spTgt spid="19"/>
-                                        </p:tgtEl>
-                                        <p:attrNameLst>
-                                          <p:attrName>style.visibility</p:attrName>
-                                        </p:attrNameLst>
-                                      </p:cBhvr>
-                                      <p:to>
-                                        <p:strVal val="visible"/>
-                                      </p:to>
-                                    </p:set>
-                                    <p:animEffect transition="in" filter="fade">
-                                      <p:cBhvr>
-                                        <p:cTn id="34" dur="500"/>
-                                        <p:tgtEl>
-                                          <p:spTgt spid="19"/>
-                                        </p:tgtEl>
-                                      </p:cBhvr>
-                                    </p:animEffect>
-                                  </p:childTnLst>
-                                </p:cTn>
-                              </p:par>
-                              <p:par>
-                                <p:cTn id="35" presetID="10" presetClass="entr" presetSubtype="0" fill="hold" grpId="0" nodeType="withEffect">
-                                  <p:stCondLst>
-                                    <p:cond delay="0"/>
-                                  </p:stCondLst>
-                                  <p:childTnLst>
-                                    <p:set>
-                                      <p:cBhvr>
-                                        <p:cTn id="36" dur="1" fill="hold">
-                                          <p:stCondLst>
-                                            <p:cond delay="0"/>
-                                          </p:stCondLst>
-                                        </p:cTn>
-                                        <p:tgtEl>
-                                          <p:spTgt spid="20"/>
-                                        </p:tgtEl>
-                                        <p:attrNameLst>
-                                          <p:attrName>style.visibility</p:attrName>
-                                        </p:attrNameLst>
-                                      </p:cBhvr>
-                                      <p:to>
-                                        <p:strVal val="visible"/>
-                                      </p:to>
-                                    </p:set>
-                                    <p:animEffect transition="in" filter="fade">
-                                      <p:cBhvr>
-                                        <p:cTn id="37" dur="500"/>
-                                        <p:tgtEl>
-                                          <p:spTgt spid="20"/>
+                                          <p:spTgt spid="33"/>
                                         </p:tgtEl>
                                       </p:cBhvr>
                                     </p:animEffect>
@@ -15597,32 +16370,32 @@
                     </p:cTn>
                   </p:par>
                   <p:par>
-                    <p:cTn id="38" fill="hold">
+                    <p:cTn id="48" fill="hold">
                       <p:stCondLst>
                         <p:cond delay="indefinite"/>
                       </p:stCondLst>
                       <p:childTnLst>
                         <p:par>
-                          <p:cTn id="39" fill="hold">
+                          <p:cTn id="49" fill="hold">
                             <p:stCondLst>
                               <p:cond delay="0"/>
                             </p:stCondLst>
                             <p:childTnLst>
                               <p:par>
-                                <p:cTn id="40" presetID="10" presetClass="entr" presetSubtype="0" fill="hold" grpId="0" nodeType="clickEffect">
+                                <p:cTn id="50" presetID="10" presetClass="entr" presetSubtype="0" fill="hold" nodeType="clickEffect">
                                   <p:stCondLst>
                                     <p:cond delay="0"/>
                                   </p:stCondLst>
                                   <p:childTnLst>
                                     <p:set>
                                       <p:cBhvr>
-                                        <p:cTn id="41" dur="1" fill="hold">
+                                        <p:cTn id="51" dur="1" fill="hold">
                                           <p:stCondLst>
                                             <p:cond delay="0"/>
                                           </p:stCondLst>
                                         </p:cTn>
                                         <p:tgtEl>
-                                          <p:spTgt spid="27"/>
+                                          <p:spTgt spid="24"/>
                                         </p:tgtEl>
                                         <p:attrNameLst>
                                           <p:attrName>style.visibility</p:attrName>
@@ -15634,9 +16407,9 @@
                                     </p:set>
                                     <p:animEffect transition="in" filter="fade">
                                       <p:cBhvr>
-                                        <p:cTn id="42" dur="500"/>
+                                        <p:cTn id="52" dur="500"/>
                                         <p:tgtEl>
-                                          <p:spTgt spid="27"/>
+                                          <p:spTgt spid="24"/>
                                         </p:tgtEl>
                                       </p:cBhvr>
                                     </p:animEffect>
@@ -15644,14 +16417,14 @@
                                 </p:cTn>
                               </p:par>
                               <p:par>
-                                <p:cTn id="43" presetID="10" presetClass="entr" presetSubtype="0" fill="hold" grpId="0" nodeType="withEffect">
+                                <p:cTn id="53" presetID="10" presetClass="entr" presetSubtype="0" fill="hold" grpId="0" nodeType="withEffect">
                                   <p:stCondLst>
                                     <p:cond delay="0"/>
                                   </p:stCondLst>
                                   <p:childTnLst>
                                     <p:set>
                                       <p:cBhvr>
-                                        <p:cTn id="44" dur="1" fill="hold">
+                                        <p:cTn id="54" dur="1" fill="hold">
                                           <p:stCondLst>
                                             <p:cond delay="0"/>
                                           </p:stCondLst>
@@ -15669,7 +16442,7 @@
                                     </p:set>
                                     <p:animEffect transition="in" filter="fade">
                                       <p:cBhvr>
-                                        <p:cTn id="45" dur="500"/>
+                                        <p:cTn id="55" dur="500"/>
                                         <p:tgtEl>
                                           <p:spTgt spid="25"/>
                                         </p:tgtEl>
@@ -15679,20 +16452,20 @@
                                 </p:cTn>
                               </p:par>
                               <p:par>
-                                <p:cTn id="46" presetID="10" presetClass="entr" presetSubtype="0" fill="hold" nodeType="withEffect">
+                                <p:cTn id="56" presetID="10" presetClass="entr" presetSubtype="0" fill="hold" grpId="0" nodeType="withEffect">
                                   <p:stCondLst>
                                     <p:cond delay="0"/>
                                   </p:stCondLst>
                                   <p:childTnLst>
                                     <p:set>
                                       <p:cBhvr>
-                                        <p:cTn id="47" dur="1" fill="hold">
+                                        <p:cTn id="57" dur="1" fill="hold">
                                           <p:stCondLst>
                                             <p:cond delay="0"/>
                                           </p:stCondLst>
                                         </p:cTn>
                                         <p:tgtEl>
-                                          <p:spTgt spid="24"/>
+                                          <p:spTgt spid="32"/>
                                         </p:tgtEl>
                                         <p:attrNameLst>
                                           <p:attrName>style.visibility</p:attrName>
@@ -15704,9 +16477,9 @@
                                     </p:set>
                                     <p:animEffect transition="in" filter="fade">
                                       <p:cBhvr>
-                                        <p:cTn id="48" dur="500"/>
+                                        <p:cTn id="58" dur="500"/>
                                         <p:tgtEl>
-                                          <p:spTgt spid="24"/>
+                                          <p:spTgt spid="32"/>
                                         </p:tgtEl>
                                       </p:cBhvr>
                                     </p:animEffect>
@@ -15741,12 +16514,15 @@
       </p:par>
     </p:tnLst>
     <p:bldLst>
-      <p:bldP spid="12" grpId="0" animBg="1"/>
-      <p:bldP spid="19" grpId="0"/>
-      <p:bldP spid="20" grpId="0"/>
       <p:bldP spid="25" grpId="0" animBg="1"/>
+      <p:bldP spid="18" grpId="0" animBg="1"/>
+      <p:bldP spid="21" grpId="0" animBg="1"/>
+      <p:bldP spid="30" grpId="0" animBg="1"/>
       <p:bldP spid="26" grpId="0" animBg="1"/>
+      <p:bldP spid="31" grpId="0" animBg="1"/>
       <p:bldP spid="27" grpId="0" animBg="1"/>
+      <p:bldP spid="32" grpId="0" animBg="1"/>
+      <p:bldP spid="33" grpId="0" animBg="1"/>
     </p:bldLst>
   </p:timing>
 </p:sld>

</xml_diff>

<commit_message>
More Key Vault info
</commit_message>
<xml_diff>
--- a/Protecting App Secrets.pptx
+++ b/Protecting App Secrets.pptx
@@ -6,7 +6,7 @@
     <p:sldMasterId id="2147483660" r:id="rId2"/>
   </p:sldMasterIdLst>
   <p:notesMasterIdLst>
-    <p:notesMasterId r:id="rId15"/>
+    <p:notesMasterId r:id="rId18"/>
   </p:notesMasterIdLst>
   <p:sldIdLst>
     <p:sldId id="256" r:id="rId3"/>
@@ -19,8 +19,11 @@
     <p:sldId id="332" r:id="rId10"/>
     <p:sldId id="333" r:id="rId11"/>
     <p:sldId id="325" r:id="rId12"/>
-    <p:sldId id="331" r:id="rId13"/>
-    <p:sldId id="326" r:id="rId14"/>
+    <p:sldId id="335" r:id="rId13"/>
+    <p:sldId id="336" r:id="rId14"/>
+    <p:sldId id="331" r:id="rId15"/>
+    <p:sldId id="334" r:id="rId16"/>
+    <p:sldId id="326" r:id="rId17"/>
   </p:sldIdLst>
   <p:sldSz cx="12192000" cy="6858000"/>
   <p:notesSz cx="6858000" cy="9144000"/>
@@ -617,6 +620,12 @@
           <a:p>
             <a:r>
               <a:rPr lang="en-US" dirty="0"/>
+              <a:t>- VS 15.7 introduces Connected Services node Key Vault creation</a:t>
+            </a:r>
+          </a:p>
+          <a:p>
+            <a:r>
+              <a:rPr lang="en-US" dirty="0"/>
               <a:t>- Key Vault takes precedence over Secret Manager at runtime, since it’s more secure</a:t>
             </a:r>
           </a:p>
@@ -762,7 +771,7 @@
           <a:bodyPr/>
           <a:lstStyle/>
           <a:p>
-            <a:endParaRPr lang="en-US" dirty="0"/>
+            <a:endParaRPr lang="en-US"/>
           </a:p>
         </p:txBody>
       </p:sp>
@@ -852,7 +861,7 @@
     </p:spTree>
     <p:extLst>
       <p:ext uri="{BB962C8B-B14F-4D97-AF65-F5344CB8AC3E}">
-        <p14:creationId xmlns:p14="http://schemas.microsoft.com/office/powerpoint/2010/main" val="2232734480"/>
+        <p14:creationId xmlns:p14="http://schemas.microsoft.com/office/powerpoint/2010/main" val="2284713912"/>
       </p:ext>
     </p:extLst>
   </p:cSld>
@@ -996,6 +1005,438 @@
     </p:spTree>
     <p:extLst>
       <p:ext uri="{BB962C8B-B14F-4D97-AF65-F5344CB8AC3E}">
+        <p14:creationId xmlns:p14="http://schemas.microsoft.com/office/powerpoint/2010/main" val="662898044"/>
+      </p:ext>
+    </p:extLst>
+  </p:cSld>
+  <p:clrMapOvr>
+    <a:masterClrMapping/>
+  </p:clrMapOvr>
+</p:notes>
+</file>
+
+<file path=ppt/notesSlides/notesSlide13.xml><?xml version="1.0" encoding="utf-8"?>
+<p:notes xmlns:a="http://schemas.openxmlformats.org/drawingml/2006/main" xmlns:r="http://schemas.openxmlformats.org/officeDocument/2006/relationships" xmlns:p="http://schemas.openxmlformats.org/presentationml/2006/main">
+  <p:cSld>
+    <p:spTree>
+      <p:nvGrpSpPr>
+        <p:cNvPr id="1" name=""/>
+        <p:cNvGrpSpPr/>
+        <p:nvPr/>
+      </p:nvGrpSpPr>
+      <p:grpSpPr>
+        <a:xfrm>
+          <a:off x="0" y="0"/>
+          <a:ext cx="0" cy="0"/>
+          <a:chOff x="0" y="0"/>
+          <a:chExt cx="0" cy="0"/>
+        </a:xfrm>
+      </p:grpSpPr>
+      <p:sp>
+        <p:nvSpPr>
+          <p:cNvPr id="2" name="Slide Image Placeholder 1"/>
+          <p:cNvSpPr>
+            <a:spLocks noGrp="1" noRot="1" noChangeAspect="1"/>
+          </p:cNvSpPr>
+          <p:nvPr>
+            <p:ph type="sldImg"/>
+          </p:nvPr>
+        </p:nvSpPr>
+        <p:spPr/>
+      </p:sp>
+      <p:sp>
+        <p:nvSpPr>
+          <p:cNvPr id="3" name="Notes Placeholder 2"/>
+          <p:cNvSpPr>
+            <a:spLocks noGrp="1"/>
+          </p:cNvSpPr>
+          <p:nvPr>
+            <p:ph type="body" idx="1"/>
+          </p:nvPr>
+        </p:nvSpPr>
+        <p:spPr/>
+        <p:txBody>
+          <a:bodyPr/>
+          <a:lstStyle/>
+          <a:p>
+            <a:endParaRPr lang="en-US" dirty="0"/>
+          </a:p>
+        </p:txBody>
+      </p:sp>
+      <p:sp>
+        <p:nvSpPr>
+          <p:cNvPr id="4" name="Slide Number Placeholder 3"/>
+          <p:cNvSpPr>
+            <a:spLocks noGrp="1"/>
+          </p:cNvSpPr>
+          <p:nvPr>
+            <p:ph type="sldNum" sz="quarter" idx="10"/>
+          </p:nvPr>
+        </p:nvSpPr>
+        <p:spPr/>
+        <p:txBody>
+          <a:bodyPr/>
+          <a:lstStyle/>
+          <a:p>
+            <a:pPr marL="0" marR="0" lvl="0" indent="0" algn="r" defTabSz="457200" rtl="0" eaLnBrk="1" fontAlgn="auto" latinLnBrk="0" hangingPunct="1">
+              <a:lnSpc>
+                <a:spcPct val="100000"/>
+              </a:lnSpc>
+              <a:spcBef>
+                <a:spcPts val="0"/>
+              </a:spcBef>
+              <a:spcAft>
+                <a:spcPts val="0"/>
+              </a:spcAft>
+              <a:buClrTx/>
+              <a:buSzTx/>
+              <a:buFontTx/>
+              <a:buNone/>
+              <a:tabLst/>
+              <a:defRPr/>
+            </a:pPr>
+            <a:fld id="{16A87904-88DE-4022-A424-ACD2E6FC1751}" type="slidenum">
+              <a:rPr kumimoji="0" lang="en-US" sz="1200" b="0" i="0" u="none" strike="noStrike" kern="1200" cap="none" spc="0" normalizeH="0" baseline="0" noProof="0" smtClean="0">
+                <a:ln>
+                  <a:noFill/>
+                </a:ln>
+                <a:solidFill>
+                  <a:prstClr val="black"/>
+                </a:solidFill>
+                <a:effectLst/>
+                <a:uLnTx/>
+                <a:uFillTx/>
+                <a:latin typeface="Calibri" panose="020F0502020204030204"/>
+                <a:ea typeface="+mn-ea"/>
+                <a:cs typeface="+mn-cs"/>
+              </a:rPr>
+              <a:pPr marL="0" marR="0" lvl="0" indent="0" algn="r" defTabSz="457200" rtl="0" eaLnBrk="1" fontAlgn="auto" latinLnBrk="0" hangingPunct="1">
+                <a:lnSpc>
+                  <a:spcPct val="100000"/>
+                </a:lnSpc>
+                <a:spcBef>
+                  <a:spcPts val="0"/>
+                </a:spcBef>
+                <a:spcAft>
+                  <a:spcPts val="0"/>
+                </a:spcAft>
+                <a:buClrTx/>
+                <a:buSzTx/>
+                <a:buFontTx/>
+                <a:buNone/>
+                <a:tabLst/>
+                <a:defRPr/>
+              </a:pPr>
+              <a:t>13</a:t>
+            </a:fld>
+            <a:endParaRPr kumimoji="0" lang="en-US" sz="1200" b="0" i="0" u="none" strike="noStrike" kern="1200" cap="none" spc="0" normalizeH="0" baseline="0" noProof="0">
+              <a:ln>
+                <a:noFill/>
+              </a:ln>
+              <a:solidFill>
+                <a:prstClr val="black"/>
+              </a:solidFill>
+              <a:effectLst/>
+              <a:uLnTx/>
+              <a:uFillTx/>
+              <a:latin typeface="Calibri" panose="020F0502020204030204"/>
+              <a:ea typeface="+mn-ea"/>
+              <a:cs typeface="+mn-cs"/>
+            </a:endParaRPr>
+          </a:p>
+        </p:txBody>
+      </p:sp>
+    </p:spTree>
+    <p:extLst>
+      <p:ext uri="{BB962C8B-B14F-4D97-AF65-F5344CB8AC3E}">
+        <p14:creationId xmlns:p14="http://schemas.microsoft.com/office/powerpoint/2010/main" val="2232734480"/>
+      </p:ext>
+    </p:extLst>
+  </p:cSld>
+  <p:clrMapOvr>
+    <a:masterClrMapping/>
+  </p:clrMapOvr>
+</p:notes>
+</file>
+
+<file path=ppt/notesSlides/notesSlide14.xml><?xml version="1.0" encoding="utf-8"?>
+<p:notes xmlns:a="http://schemas.openxmlformats.org/drawingml/2006/main" xmlns:r="http://schemas.openxmlformats.org/officeDocument/2006/relationships" xmlns:p="http://schemas.openxmlformats.org/presentationml/2006/main">
+  <p:cSld>
+    <p:spTree>
+      <p:nvGrpSpPr>
+        <p:cNvPr id="1" name=""/>
+        <p:cNvGrpSpPr/>
+        <p:nvPr/>
+      </p:nvGrpSpPr>
+      <p:grpSpPr>
+        <a:xfrm>
+          <a:off x="0" y="0"/>
+          <a:ext cx="0" cy="0"/>
+          <a:chOff x="0" y="0"/>
+          <a:chExt cx="0" cy="0"/>
+        </a:xfrm>
+      </p:grpSpPr>
+      <p:sp>
+        <p:nvSpPr>
+          <p:cNvPr id="2" name="Slide Image Placeholder 1"/>
+          <p:cNvSpPr>
+            <a:spLocks noGrp="1" noRot="1" noChangeAspect="1"/>
+          </p:cNvSpPr>
+          <p:nvPr>
+            <p:ph type="sldImg"/>
+          </p:nvPr>
+        </p:nvSpPr>
+        <p:spPr/>
+      </p:sp>
+      <p:sp>
+        <p:nvSpPr>
+          <p:cNvPr id="3" name="Notes Placeholder 2"/>
+          <p:cNvSpPr>
+            <a:spLocks noGrp="1"/>
+          </p:cNvSpPr>
+          <p:nvPr>
+            <p:ph type="body" idx="1"/>
+          </p:nvPr>
+        </p:nvSpPr>
+        <p:spPr/>
+        <p:txBody>
+          <a:bodyPr/>
+          <a:lstStyle/>
+          <a:p>
+            <a:endParaRPr lang="en-US" dirty="0"/>
+          </a:p>
+        </p:txBody>
+      </p:sp>
+      <p:sp>
+        <p:nvSpPr>
+          <p:cNvPr id="4" name="Slide Number Placeholder 3"/>
+          <p:cNvSpPr>
+            <a:spLocks noGrp="1"/>
+          </p:cNvSpPr>
+          <p:nvPr>
+            <p:ph type="sldNum" sz="quarter" idx="10"/>
+          </p:nvPr>
+        </p:nvSpPr>
+        <p:spPr/>
+        <p:txBody>
+          <a:bodyPr/>
+          <a:lstStyle/>
+          <a:p>
+            <a:pPr marL="0" marR="0" lvl="0" indent="0" algn="r" defTabSz="457200" rtl="0" eaLnBrk="1" fontAlgn="auto" latinLnBrk="0" hangingPunct="1">
+              <a:lnSpc>
+                <a:spcPct val="100000"/>
+              </a:lnSpc>
+              <a:spcBef>
+                <a:spcPts val="0"/>
+              </a:spcBef>
+              <a:spcAft>
+                <a:spcPts val="0"/>
+              </a:spcAft>
+              <a:buClrTx/>
+              <a:buSzTx/>
+              <a:buFontTx/>
+              <a:buNone/>
+              <a:tabLst/>
+              <a:defRPr/>
+            </a:pPr>
+            <a:fld id="{16A87904-88DE-4022-A424-ACD2E6FC1751}" type="slidenum">
+              <a:rPr kumimoji="0" lang="en-US" sz="1200" b="0" i="0" u="none" strike="noStrike" kern="1200" cap="none" spc="0" normalizeH="0" baseline="0" noProof="0" smtClean="0">
+                <a:ln>
+                  <a:noFill/>
+                </a:ln>
+                <a:solidFill>
+                  <a:prstClr val="black"/>
+                </a:solidFill>
+                <a:effectLst/>
+                <a:uLnTx/>
+                <a:uFillTx/>
+                <a:latin typeface="Calibri" panose="020F0502020204030204"/>
+                <a:ea typeface="+mn-ea"/>
+                <a:cs typeface="+mn-cs"/>
+              </a:rPr>
+              <a:pPr marL="0" marR="0" lvl="0" indent="0" algn="r" defTabSz="457200" rtl="0" eaLnBrk="1" fontAlgn="auto" latinLnBrk="0" hangingPunct="1">
+                <a:lnSpc>
+                  <a:spcPct val="100000"/>
+                </a:lnSpc>
+                <a:spcBef>
+                  <a:spcPts val="0"/>
+                </a:spcBef>
+                <a:spcAft>
+                  <a:spcPts val="0"/>
+                </a:spcAft>
+                <a:buClrTx/>
+                <a:buSzTx/>
+                <a:buFontTx/>
+                <a:buNone/>
+                <a:tabLst/>
+                <a:defRPr/>
+              </a:pPr>
+              <a:t>14</a:t>
+            </a:fld>
+            <a:endParaRPr kumimoji="0" lang="en-US" sz="1200" b="0" i="0" u="none" strike="noStrike" kern="1200" cap="none" spc="0" normalizeH="0" baseline="0" noProof="0">
+              <a:ln>
+                <a:noFill/>
+              </a:ln>
+              <a:solidFill>
+                <a:prstClr val="black"/>
+              </a:solidFill>
+              <a:effectLst/>
+              <a:uLnTx/>
+              <a:uFillTx/>
+              <a:latin typeface="Calibri" panose="020F0502020204030204"/>
+              <a:ea typeface="+mn-ea"/>
+              <a:cs typeface="+mn-cs"/>
+            </a:endParaRPr>
+          </a:p>
+        </p:txBody>
+      </p:sp>
+    </p:spTree>
+    <p:extLst>
+      <p:ext uri="{BB962C8B-B14F-4D97-AF65-F5344CB8AC3E}">
+        <p14:creationId xmlns:p14="http://schemas.microsoft.com/office/powerpoint/2010/main" val="1203295569"/>
+      </p:ext>
+    </p:extLst>
+  </p:cSld>
+  <p:clrMapOvr>
+    <a:masterClrMapping/>
+  </p:clrMapOvr>
+</p:notes>
+</file>
+
+<file path=ppt/notesSlides/notesSlide15.xml><?xml version="1.0" encoding="utf-8"?>
+<p:notes xmlns:a="http://schemas.openxmlformats.org/drawingml/2006/main" xmlns:r="http://schemas.openxmlformats.org/officeDocument/2006/relationships" xmlns:p="http://schemas.openxmlformats.org/presentationml/2006/main">
+  <p:cSld>
+    <p:spTree>
+      <p:nvGrpSpPr>
+        <p:cNvPr id="1" name=""/>
+        <p:cNvGrpSpPr/>
+        <p:nvPr/>
+      </p:nvGrpSpPr>
+      <p:grpSpPr>
+        <a:xfrm>
+          <a:off x="0" y="0"/>
+          <a:ext cx="0" cy="0"/>
+          <a:chOff x="0" y="0"/>
+          <a:chExt cx="0" cy="0"/>
+        </a:xfrm>
+      </p:grpSpPr>
+      <p:sp>
+        <p:nvSpPr>
+          <p:cNvPr id="2" name="Slide Image Placeholder 1"/>
+          <p:cNvSpPr>
+            <a:spLocks noGrp="1" noRot="1" noChangeAspect="1"/>
+          </p:cNvSpPr>
+          <p:nvPr>
+            <p:ph type="sldImg"/>
+          </p:nvPr>
+        </p:nvSpPr>
+        <p:spPr/>
+      </p:sp>
+      <p:sp>
+        <p:nvSpPr>
+          <p:cNvPr id="3" name="Notes Placeholder 2"/>
+          <p:cNvSpPr>
+            <a:spLocks noGrp="1"/>
+          </p:cNvSpPr>
+          <p:nvPr>
+            <p:ph type="body" idx="1"/>
+          </p:nvPr>
+        </p:nvSpPr>
+        <p:spPr/>
+        <p:txBody>
+          <a:bodyPr/>
+          <a:lstStyle/>
+          <a:p>
+            <a:endParaRPr lang="en-US"/>
+          </a:p>
+        </p:txBody>
+      </p:sp>
+      <p:sp>
+        <p:nvSpPr>
+          <p:cNvPr id="4" name="Slide Number Placeholder 3"/>
+          <p:cNvSpPr>
+            <a:spLocks noGrp="1"/>
+          </p:cNvSpPr>
+          <p:nvPr>
+            <p:ph type="sldNum" sz="quarter" idx="10"/>
+          </p:nvPr>
+        </p:nvSpPr>
+        <p:spPr/>
+        <p:txBody>
+          <a:bodyPr/>
+          <a:lstStyle/>
+          <a:p>
+            <a:pPr marL="0" marR="0" lvl="0" indent="0" algn="r" defTabSz="457200" rtl="0" eaLnBrk="1" fontAlgn="auto" latinLnBrk="0" hangingPunct="1">
+              <a:lnSpc>
+                <a:spcPct val="100000"/>
+              </a:lnSpc>
+              <a:spcBef>
+                <a:spcPts val="0"/>
+              </a:spcBef>
+              <a:spcAft>
+                <a:spcPts val="0"/>
+              </a:spcAft>
+              <a:buClrTx/>
+              <a:buSzTx/>
+              <a:buFontTx/>
+              <a:buNone/>
+              <a:tabLst/>
+              <a:defRPr/>
+            </a:pPr>
+            <a:fld id="{16A87904-88DE-4022-A424-ACD2E6FC1751}" type="slidenum">
+              <a:rPr kumimoji="0" lang="en-US" sz="1200" b="0" i="0" u="none" strike="noStrike" kern="1200" cap="none" spc="0" normalizeH="0" baseline="0" noProof="0" smtClean="0">
+                <a:ln>
+                  <a:noFill/>
+                </a:ln>
+                <a:solidFill>
+                  <a:prstClr val="black"/>
+                </a:solidFill>
+                <a:effectLst/>
+                <a:uLnTx/>
+                <a:uFillTx/>
+                <a:latin typeface="Calibri" panose="020F0502020204030204"/>
+                <a:ea typeface="+mn-ea"/>
+                <a:cs typeface="+mn-cs"/>
+              </a:rPr>
+              <a:pPr marL="0" marR="0" lvl="0" indent="0" algn="r" defTabSz="457200" rtl="0" eaLnBrk="1" fontAlgn="auto" latinLnBrk="0" hangingPunct="1">
+                <a:lnSpc>
+                  <a:spcPct val="100000"/>
+                </a:lnSpc>
+                <a:spcBef>
+                  <a:spcPts val="0"/>
+                </a:spcBef>
+                <a:spcAft>
+                  <a:spcPts val="0"/>
+                </a:spcAft>
+                <a:buClrTx/>
+                <a:buSzTx/>
+                <a:buFontTx/>
+                <a:buNone/>
+                <a:tabLst/>
+                <a:defRPr/>
+              </a:pPr>
+              <a:t>15</a:t>
+            </a:fld>
+            <a:endParaRPr kumimoji="0" lang="en-US" sz="1200" b="0" i="0" u="none" strike="noStrike" kern="1200" cap="none" spc="0" normalizeH="0" baseline="0" noProof="0">
+              <a:ln>
+                <a:noFill/>
+              </a:ln>
+              <a:solidFill>
+                <a:prstClr val="black"/>
+              </a:solidFill>
+              <a:effectLst/>
+              <a:uLnTx/>
+              <a:uFillTx/>
+              <a:latin typeface="Calibri" panose="020F0502020204030204"/>
+              <a:ea typeface="+mn-ea"/>
+              <a:cs typeface="+mn-cs"/>
+            </a:endParaRPr>
+          </a:p>
+        </p:txBody>
+      </p:sp>
+    </p:spTree>
+    <p:extLst>
+      <p:ext uri="{BB962C8B-B14F-4D97-AF65-F5344CB8AC3E}">
         <p14:creationId xmlns:p14="http://schemas.microsoft.com/office/powerpoint/2010/main" val="2271797707"/>
       </p:ext>
     </p:extLst>
@@ -1779,9 +2220,13 @@
             </a:r>
           </a:p>
           <a:p>
+            <a:pPr marL="171450" indent="-171450">
+              <a:buFontTx/>
+              <a:buChar char="-"/>
+            </a:pPr>
             <a:r>
               <a:rPr lang="en-US" dirty="0"/>
-              <a:t>- .NET Core support ONLY in 15.7 (</a:t>
+              <a:t>.NET Core support ONLY in 15.7 (</a:t>
             </a:r>
             <a:r>
               <a:rPr lang="en-US" dirty="0" err="1"/>
@@ -1793,9 +2238,30 @@
             </a:r>
           </a:p>
           <a:p>
+            <a:pPr marL="171450" indent="-171450">
+              <a:buFontTx/>
+              <a:buChar char="-"/>
+            </a:pPr>
             <a:r>
               <a:rPr lang="en-US" dirty="0"/>
-              <a:t>- .NET Framework support in 15.8 (secrets.xml)</a:t>
+              <a:t>.NET Framework support in 15.8 (secrets.xml)</a:t>
+            </a:r>
+          </a:p>
+          <a:p>
+            <a:pPr marL="171450" indent="-171450">
+              <a:buFontTx/>
+              <a:buChar char="-"/>
+            </a:pPr>
+            <a:endParaRPr lang="en-US" dirty="0"/>
+          </a:p>
+          <a:p>
+            <a:pPr marL="0" indent="0">
+              <a:buFontTx/>
+              <a:buNone/>
+            </a:pPr>
+            <a:r>
+              <a:rPr lang="en-US" dirty="0"/>
+              <a:t>.NET Core SDK 2.1.300 bundles user-secrets command</a:t>
             </a:r>
           </a:p>
         </p:txBody>
@@ -8974,19 +9440,118 @@
           </a:xfrm>
         </p:spPr>
         <p:txBody>
-          <a:bodyPr/>
+          <a:bodyPr>
+            <a:normAutofit/>
+          </a:bodyPr>
           <a:lstStyle/>
           <a:p>
+            <a:pPr marL="0" indent="0">
+              <a:buNone/>
+            </a:pPr>
+            <a:r>
+              <a:rPr lang="en-US" b="1" dirty="0">
+                <a:solidFill>
+                  <a:schemeClr val="accent4"/>
+                </a:solidFill>
+              </a:rPr>
+              <a:t>Prerequisites</a:t>
+            </a:r>
+          </a:p>
+          <a:p>
             <a:r>
               <a:rPr lang="en-US" dirty="0"/>
-              <a:t>VS 15.7 introduces Connected Services node Key Vault creation</a:t>
-            </a:r>
-          </a:p>
-          <a:p>
-            <a:pPr lvl="1"/>
+              <a:t>Azure subscription</a:t>
+            </a:r>
+          </a:p>
+          <a:p>
+            <a:endParaRPr lang="en-US" dirty="0"/>
+          </a:p>
+          <a:p>
+            <a:pPr marL="0" indent="0">
+              <a:buNone/>
+            </a:pPr>
+            <a:r>
+              <a:rPr lang="en-US" b="1" dirty="0">
+                <a:solidFill>
+                  <a:schemeClr val="accent4"/>
+                </a:solidFill>
+              </a:rPr>
+              <a:t>Usage</a:t>
+            </a:r>
+          </a:p>
+          <a:p>
+            <a:pPr marL="0" indent="0">
+              <a:buNone/>
+            </a:pPr>
+            <a:r>
+              <a:rPr lang="en-US" b="1" dirty="0">
+                <a:latin typeface="Courier New" panose="02070309020205020404" pitchFamily="49" charset="0"/>
+                <a:cs typeface="Courier New" panose="02070309020205020404" pitchFamily="49" charset="0"/>
+              </a:rPr>
+              <a:t>&gt;</a:t>
+            </a:r>
+            <a:r>
+              <a:rPr lang="en-US" dirty="0">
+                <a:latin typeface="Courier New" panose="02070309020205020404" pitchFamily="49" charset="0"/>
+                <a:cs typeface="Courier New" panose="02070309020205020404" pitchFamily="49" charset="0"/>
+              </a:rPr>
+              <a:t> </a:t>
+            </a:r>
+            <a:r>
+              <a:rPr lang="en-US" dirty="0" err="1">
+                <a:latin typeface="Courier New" panose="02070309020205020404" pitchFamily="49" charset="0"/>
+                <a:cs typeface="Courier New" panose="02070309020205020404" pitchFamily="49" charset="0"/>
+              </a:rPr>
+              <a:t>az</a:t>
+            </a:r>
+            <a:r>
+              <a:rPr lang="en-US" dirty="0">
+                <a:latin typeface="Courier New" panose="02070309020205020404" pitchFamily="49" charset="0"/>
+                <a:cs typeface="Courier New" panose="02070309020205020404" pitchFamily="49" charset="0"/>
+              </a:rPr>
+              <a:t> </a:t>
+            </a:r>
+            <a:r>
+              <a:rPr lang="en-US" dirty="0" err="1">
+                <a:latin typeface="Courier New" panose="02070309020205020404" pitchFamily="49" charset="0"/>
+                <a:cs typeface="Courier New" panose="02070309020205020404" pitchFamily="49" charset="0"/>
+              </a:rPr>
+              <a:t>keyvault</a:t>
+            </a:r>
+            <a:endParaRPr lang="en-US" dirty="0"/>
+          </a:p>
+          <a:p>
+            <a:pPr marL="0" indent="0">
+              <a:buNone/>
+            </a:pPr>
             <a:r>
               <a:rPr lang="en-US" dirty="0"/>
-              <a:t>Solution Explorer &gt; double-click Connected Services &gt; Secure Secrets with Azure Key Vault</a:t>
+              <a:t>	- or –</a:t>
+            </a:r>
+          </a:p>
+          <a:p>
+            <a:pPr marL="0" indent="0">
+              <a:buNone/>
+            </a:pPr>
+            <a:r>
+              <a:rPr lang="en-US" dirty="0"/>
+              <a:t>Solution Explorer </a:t>
+            </a:r>
+            <a:r>
+              <a:rPr lang="en-US" b="1" dirty="0"/>
+              <a:t>&gt;</a:t>
+            </a:r>
+            <a:r>
+              <a:rPr lang="en-US" dirty="0"/>
+              <a:t> double-click Connected Services </a:t>
+            </a:r>
+            <a:r>
+              <a:rPr lang="en-US" b="1" dirty="0"/>
+              <a:t>&gt;</a:t>
+            </a:r>
+            <a:r>
+              <a:rPr lang="en-US" dirty="0"/>
+              <a:t> Secure Secrets with Azure Key Vault</a:t>
             </a:r>
           </a:p>
         </p:txBody>
@@ -9131,6 +9696,250 @@
                       </p:childTnLst>
                     </p:cTn>
                   </p:par>
+                  <p:par>
+                    <p:cTn id="13" fill="hold">
+                      <p:stCondLst>
+                        <p:cond delay="indefinite"/>
+                      </p:stCondLst>
+                      <p:childTnLst>
+                        <p:par>
+                          <p:cTn id="14" fill="hold">
+                            <p:stCondLst>
+                              <p:cond delay="0"/>
+                            </p:stCondLst>
+                            <p:childTnLst>
+                              <p:par>
+                                <p:cTn id="15" presetID="10" presetClass="entr" presetSubtype="0" fill="hold" nodeType="clickEffect">
+                                  <p:stCondLst>
+                                    <p:cond delay="0"/>
+                                  </p:stCondLst>
+                                  <p:childTnLst>
+                                    <p:set>
+                                      <p:cBhvr>
+                                        <p:cTn id="16" dur="1" fill="hold">
+                                          <p:stCondLst>
+                                            <p:cond delay="0"/>
+                                          </p:stCondLst>
+                                        </p:cTn>
+                                        <p:tgtEl>
+                                          <p:spTgt spid="3">
+                                            <p:txEl>
+                                              <p:pRg st="3" end="3"/>
+                                            </p:txEl>
+                                          </p:spTgt>
+                                        </p:tgtEl>
+                                        <p:attrNameLst>
+                                          <p:attrName>style.visibility</p:attrName>
+                                        </p:attrNameLst>
+                                      </p:cBhvr>
+                                      <p:to>
+                                        <p:strVal val="visible"/>
+                                      </p:to>
+                                    </p:set>
+                                    <p:animEffect transition="in" filter="fade">
+                                      <p:cBhvr>
+                                        <p:cTn id="17" dur="500"/>
+                                        <p:tgtEl>
+                                          <p:spTgt spid="3">
+                                            <p:txEl>
+                                              <p:pRg st="3" end="3"/>
+                                            </p:txEl>
+                                          </p:spTgt>
+                                        </p:tgtEl>
+                                      </p:cBhvr>
+                                    </p:animEffect>
+                                  </p:childTnLst>
+                                </p:cTn>
+                              </p:par>
+                            </p:childTnLst>
+                          </p:cTn>
+                        </p:par>
+                      </p:childTnLst>
+                    </p:cTn>
+                  </p:par>
+                  <p:par>
+                    <p:cTn id="18" fill="hold">
+                      <p:stCondLst>
+                        <p:cond delay="indefinite"/>
+                      </p:stCondLst>
+                      <p:childTnLst>
+                        <p:par>
+                          <p:cTn id="19" fill="hold">
+                            <p:stCondLst>
+                              <p:cond delay="0"/>
+                            </p:stCondLst>
+                            <p:childTnLst>
+                              <p:par>
+                                <p:cTn id="20" presetID="10" presetClass="entr" presetSubtype="0" fill="hold" nodeType="clickEffect">
+                                  <p:stCondLst>
+                                    <p:cond delay="0"/>
+                                  </p:stCondLst>
+                                  <p:childTnLst>
+                                    <p:set>
+                                      <p:cBhvr>
+                                        <p:cTn id="21" dur="1" fill="hold">
+                                          <p:stCondLst>
+                                            <p:cond delay="0"/>
+                                          </p:stCondLst>
+                                        </p:cTn>
+                                        <p:tgtEl>
+                                          <p:spTgt spid="3">
+                                            <p:txEl>
+                                              <p:pRg st="4" end="4"/>
+                                            </p:txEl>
+                                          </p:spTgt>
+                                        </p:tgtEl>
+                                        <p:attrNameLst>
+                                          <p:attrName>style.visibility</p:attrName>
+                                        </p:attrNameLst>
+                                      </p:cBhvr>
+                                      <p:to>
+                                        <p:strVal val="visible"/>
+                                      </p:to>
+                                    </p:set>
+                                    <p:animEffect transition="in" filter="fade">
+                                      <p:cBhvr>
+                                        <p:cTn id="22" dur="500"/>
+                                        <p:tgtEl>
+                                          <p:spTgt spid="3">
+                                            <p:txEl>
+                                              <p:pRg st="4" end="4"/>
+                                            </p:txEl>
+                                          </p:spTgt>
+                                        </p:tgtEl>
+                                      </p:cBhvr>
+                                    </p:animEffect>
+                                  </p:childTnLst>
+                                </p:cTn>
+                              </p:par>
+                            </p:childTnLst>
+                          </p:cTn>
+                        </p:par>
+                      </p:childTnLst>
+                    </p:cTn>
+                  </p:par>
+                  <p:par>
+                    <p:cTn id="23" fill="hold">
+                      <p:stCondLst>
+                        <p:cond delay="indefinite"/>
+                      </p:stCondLst>
+                      <p:childTnLst>
+                        <p:par>
+                          <p:cTn id="24" fill="hold">
+                            <p:stCondLst>
+                              <p:cond delay="0"/>
+                            </p:stCondLst>
+                            <p:childTnLst>
+                              <p:par>
+                                <p:cTn id="25" presetID="10" presetClass="entr" presetSubtype="0" fill="hold" nodeType="clickEffect">
+                                  <p:stCondLst>
+                                    <p:cond delay="0"/>
+                                  </p:stCondLst>
+                                  <p:childTnLst>
+                                    <p:set>
+                                      <p:cBhvr>
+                                        <p:cTn id="26" dur="1" fill="hold">
+                                          <p:stCondLst>
+                                            <p:cond delay="0"/>
+                                          </p:stCondLst>
+                                        </p:cTn>
+                                        <p:tgtEl>
+                                          <p:spTgt spid="3">
+                                            <p:txEl>
+                                              <p:pRg st="5" end="5"/>
+                                            </p:txEl>
+                                          </p:spTgt>
+                                        </p:tgtEl>
+                                        <p:attrNameLst>
+                                          <p:attrName>style.visibility</p:attrName>
+                                        </p:attrNameLst>
+                                      </p:cBhvr>
+                                      <p:to>
+                                        <p:strVal val="visible"/>
+                                      </p:to>
+                                    </p:set>
+                                    <p:animEffect transition="in" filter="fade">
+                                      <p:cBhvr>
+                                        <p:cTn id="27" dur="500"/>
+                                        <p:tgtEl>
+                                          <p:spTgt spid="3">
+                                            <p:txEl>
+                                              <p:pRg st="5" end="5"/>
+                                            </p:txEl>
+                                          </p:spTgt>
+                                        </p:tgtEl>
+                                      </p:cBhvr>
+                                    </p:animEffect>
+                                  </p:childTnLst>
+                                </p:cTn>
+                              </p:par>
+                            </p:childTnLst>
+                          </p:cTn>
+                        </p:par>
+                      </p:childTnLst>
+                    </p:cTn>
+                  </p:par>
+                  <p:par>
+                    <p:cTn id="28" fill="hold">
+                      <p:stCondLst>
+                        <p:cond delay="indefinite"/>
+                      </p:stCondLst>
+                      <p:childTnLst>
+                        <p:par>
+                          <p:cTn id="29" fill="hold">
+                            <p:stCondLst>
+                              <p:cond delay="0"/>
+                            </p:stCondLst>
+                            <p:childTnLst>
+                              <p:par>
+                                <p:cTn id="30" presetID="10" presetClass="entr" presetSubtype="0" fill="hold" nodeType="clickEffect">
+                                  <p:stCondLst>
+                                    <p:cond delay="0"/>
+                                  </p:stCondLst>
+                                  <p:childTnLst>
+                                    <p:set>
+                                      <p:cBhvr>
+                                        <p:cTn id="31" dur="1" fill="hold">
+                                          <p:stCondLst>
+                                            <p:cond delay="0"/>
+                                          </p:stCondLst>
+                                        </p:cTn>
+                                        <p:tgtEl>
+                                          <p:spTgt spid="3">
+                                            <p:txEl>
+                                              <p:pRg st="6" end="6"/>
+                                            </p:txEl>
+                                          </p:spTgt>
+                                        </p:tgtEl>
+                                        <p:attrNameLst>
+                                          <p:attrName>style.visibility</p:attrName>
+                                        </p:attrNameLst>
+                                      </p:cBhvr>
+                                      <p:to>
+                                        <p:strVal val="visible"/>
+                                      </p:to>
+                                    </p:set>
+                                    <p:animEffect transition="in" filter="fade">
+                                      <p:cBhvr>
+                                        <p:cTn id="32" dur="500"/>
+                                        <p:tgtEl>
+                                          <p:spTgt spid="3">
+                                            <p:txEl>
+                                              <p:pRg st="6" end="6"/>
+                                            </p:txEl>
+                                          </p:spTgt>
+                                        </p:tgtEl>
+                                      </p:cBhvr>
+                                    </p:animEffect>
+                                  </p:childTnLst>
+                                </p:cTn>
+                              </p:par>
+                            </p:childTnLst>
+                          </p:cTn>
+                        </p:par>
+                      </p:childTnLst>
+                    </p:cTn>
+                  </p:par>
                 </p:childTnLst>
               </p:cTn>
               <p:prevCondLst>
@@ -9157,6 +9966,1448 @@
 </file>
 
 <file path=ppt/slides/slide11.xml><?xml version="1.0" encoding="utf-8"?>
+<p:sld xmlns:a="http://schemas.openxmlformats.org/drawingml/2006/main" xmlns:r="http://schemas.openxmlformats.org/officeDocument/2006/relationships" xmlns:p="http://schemas.openxmlformats.org/presentationml/2006/main">
+  <p:cSld>
+    <p:bg>
+      <p:bgPr>
+        <a:solidFill>
+          <a:srgbClr val="505050"/>
+        </a:solidFill>
+        <a:effectLst/>
+      </p:bgPr>
+    </p:bg>
+    <p:spTree>
+      <p:nvGrpSpPr>
+        <p:cNvPr id="1" name=""/>
+        <p:cNvGrpSpPr/>
+        <p:nvPr/>
+      </p:nvGrpSpPr>
+      <p:grpSpPr>
+        <a:xfrm>
+          <a:off x="0" y="0"/>
+          <a:ext cx="0" cy="0"/>
+          <a:chOff x="0" y="0"/>
+          <a:chExt cx="0" cy="0"/>
+        </a:xfrm>
+      </p:grpSpPr>
+      <p:sp>
+        <p:nvSpPr>
+          <p:cNvPr id="2" name="Title 1"/>
+          <p:cNvSpPr>
+            <a:spLocks noGrp="1"/>
+          </p:cNvSpPr>
+          <p:nvPr>
+            <p:ph type="title"/>
+          </p:nvPr>
+        </p:nvSpPr>
+        <p:spPr/>
+        <p:txBody>
+          <a:bodyPr/>
+          <a:lstStyle/>
+          <a:p>
+            <a:r>
+              <a:rPr lang="en-US" dirty="0"/>
+              <a:t>Key Vault: Azure CLI</a:t>
+            </a:r>
+          </a:p>
+        </p:txBody>
+      </p:sp>
+      <p:sp>
+        <p:nvSpPr>
+          <p:cNvPr id="3" name="Content Placeholder 2"/>
+          <p:cNvSpPr>
+            <a:spLocks noGrp="1"/>
+          </p:cNvSpPr>
+          <p:nvPr>
+            <p:ph idx="1"/>
+          </p:nvPr>
+        </p:nvSpPr>
+        <p:spPr/>
+        <p:txBody>
+          <a:bodyPr/>
+          <a:lstStyle/>
+          <a:p>
+            <a:pPr marL="0" indent="0">
+              <a:buNone/>
+            </a:pPr>
+            <a:r>
+              <a:rPr lang="en-US" sz="2400" b="1" dirty="0">
+                <a:latin typeface="Courier New" panose="02070309020205020404" pitchFamily="49" charset="0"/>
+                <a:cs typeface="Courier New" panose="02070309020205020404" pitchFamily="49" charset="0"/>
+              </a:rPr>
+              <a:t>&gt; </a:t>
+            </a:r>
+            <a:r>
+              <a:rPr lang="en-US" sz="2400" dirty="0" err="1">
+                <a:latin typeface="Courier New" panose="02070309020205020404" pitchFamily="49" charset="0"/>
+                <a:cs typeface="Courier New" panose="02070309020205020404" pitchFamily="49" charset="0"/>
+              </a:rPr>
+              <a:t>az</a:t>
+            </a:r>
+            <a:r>
+              <a:rPr lang="en-US" sz="2400" dirty="0">
+                <a:latin typeface="Courier New" panose="02070309020205020404" pitchFamily="49" charset="0"/>
+                <a:cs typeface="Courier New" panose="02070309020205020404" pitchFamily="49" charset="0"/>
+              </a:rPr>
+              <a:t> </a:t>
+            </a:r>
+            <a:r>
+              <a:rPr lang="en-US" sz="2400" dirty="0" err="1">
+                <a:latin typeface="Courier New" panose="02070309020205020404" pitchFamily="49" charset="0"/>
+                <a:cs typeface="Courier New" panose="02070309020205020404" pitchFamily="49" charset="0"/>
+              </a:rPr>
+              <a:t>keyvault</a:t>
+            </a:r>
+            <a:r>
+              <a:rPr lang="en-US" sz="2400" dirty="0">
+                <a:latin typeface="Courier New" panose="02070309020205020404" pitchFamily="49" charset="0"/>
+                <a:cs typeface="Courier New" panose="02070309020205020404" pitchFamily="49" charset="0"/>
+              </a:rPr>
+              <a:t> create --name `</a:t>
+            </a:r>
+            <a:r>
+              <a:rPr lang="en-US" sz="2400" dirty="0" err="1">
+                <a:latin typeface="Courier New" panose="02070309020205020404" pitchFamily="49" charset="0"/>
+                <a:cs typeface="Courier New" panose="02070309020205020404" pitchFamily="49" charset="0"/>
+              </a:rPr>
+              <a:t>MoviesVault</a:t>
+            </a:r>
+            <a:r>
+              <a:rPr lang="en-US" sz="2400" dirty="0">
+                <a:latin typeface="Courier New" panose="02070309020205020404" pitchFamily="49" charset="0"/>
+                <a:cs typeface="Courier New" panose="02070309020205020404" pitchFamily="49" charset="0"/>
+              </a:rPr>
+              <a:t>`</a:t>
+            </a:r>
+          </a:p>
+          <a:p>
+            <a:pPr marL="0" indent="0">
+              <a:buNone/>
+            </a:pPr>
+            <a:r>
+              <a:rPr lang="en-US" sz="2400" dirty="0">
+                <a:latin typeface="Courier New" panose="02070309020205020404" pitchFamily="49" charset="0"/>
+                <a:cs typeface="Courier New" panose="02070309020205020404" pitchFamily="49" charset="0"/>
+              </a:rPr>
+              <a:t>				 --resource-group `</a:t>
+            </a:r>
+            <a:r>
+              <a:rPr lang="en-US" sz="2400" dirty="0" err="1">
+                <a:latin typeface="Courier New" panose="02070309020205020404" pitchFamily="49" charset="0"/>
+                <a:cs typeface="Courier New" panose="02070309020205020404" pitchFamily="49" charset="0"/>
+              </a:rPr>
+              <a:t>MoviesRG</a:t>
+            </a:r>
+            <a:r>
+              <a:rPr lang="en-US" sz="2400" dirty="0">
+                <a:latin typeface="Courier New" panose="02070309020205020404" pitchFamily="49" charset="0"/>
+                <a:cs typeface="Courier New" panose="02070309020205020404" pitchFamily="49" charset="0"/>
+              </a:rPr>
+              <a:t>`</a:t>
+            </a:r>
+          </a:p>
+          <a:p>
+            <a:pPr marL="0" indent="0">
+              <a:buNone/>
+            </a:pPr>
+            <a:r>
+              <a:rPr lang="en-US" sz="2400" dirty="0">
+                <a:latin typeface="Courier New" panose="02070309020205020404" pitchFamily="49" charset="0"/>
+                <a:cs typeface="Courier New" panose="02070309020205020404" pitchFamily="49" charset="0"/>
+              </a:rPr>
+              <a:t>				 --location </a:t>
+            </a:r>
+            <a:r>
+              <a:rPr lang="en-US" sz="2400" dirty="0" err="1">
+                <a:latin typeface="Courier New" panose="02070309020205020404" pitchFamily="49" charset="0"/>
+                <a:cs typeface="Courier New" panose="02070309020205020404" pitchFamily="49" charset="0"/>
+              </a:rPr>
+              <a:t>eastus</a:t>
+            </a:r>
+            <a:endParaRPr lang="en-US" sz="2400" dirty="0">
+              <a:latin typeface="Courier New" panose="02070309020205020404" pitchFamily="49" charset="0"/>
+              <a:cs typeface="Courier New" panose="02070309020205020404" pitchFamily="49" charset="0"/>
+            </a:endParaRPr>
+          </a:p>
+          <a:p>
+            <a:pPr marL="0" indent="0">
+              <a:buNone/>
+            </a:pPr>
+            <a:r>
+              <a:rPr lang="en-US" sz="2400" b="1" dirty="0">
+                <a:latin typeface="Courier New" panose="02070309020205020404" pitchFamily="49" charset="0"/>
+                <a:cs typeface="Courier New" panose="02070309020205020404" pitchFamily="49" charset="0"/>
+              </a:rPr>
+              <a:t>&gt; </a:t>
+            </a:r>
+            <a:r>
+              <a:rPr lang="en-US" sz="2400" dirty="0" err="1">
+                <a:latin typeface="Courier New" panose="02070309020205020404" pitchFamily="49" charset="0"/>
+                <a:cs typeface="Courier New" panose="02070309020205020404" pitchFamily="49" charset="0"/>
+              </a:rPr>
+              <a:t>az</a:t>
+            </a:r>
+            <a:r>
+              <a:rPr lang="en-US" sz="2400" dirty="0">
+                <a:latin typeface="Courier New" panose="02070309020205020404" pitchFamily="49" charset="0"/>
+                <a:cs typeface="Courier New" panose="02070309020205020404" pitchFamily="49" charset="0"/>
+              </a:rPr>
+              <a:t> </a:t>
+            </a:r>
+            <a:r>
+              <a:rPr lang="en-US" sz="2400" dirty="0" err="1">
+                <a:latin typeface="Courier New" panose="02070309020205020404" pitchFamily="49" charset="0"/>
+                <a:cs typeface="Courier New" panose="02070309020205020404" pitchFamily="49" charset="0"/>
+              </a:rPr>
+              <a:t>keyvault</a:t>
+            </a:r>
+            <a:r>
+              <a:rPr lang="en-US" sz="2400" dirty="0">
+                <a:latin typeface="Courier New" panose="02070309020205020404" pitchFamily="49" charset="0"/>
+                <a:cs typeface="Courier New" panose="02070309020205020404" pitchFamily="49" charset="0"/>
+              </a:rPr>
+              <a:t> secret set --vault-name `</a:t>
+            </a:r>
+            <a:r>
+              <a:rPr lang="en-US" sz="2400" dirty="0" err="1">
+                <a:latin typeface="Courier New" panose="02070309020205020404" pitchFamily="49" charset="0"/>
+                <a:cs typeface="Courier New" panose="02070309020205020404" pitchFamily="49" charset="0"/>
+              </a:rPr>
+              <a:t>MoviesVault</a:t>
+            </a:r>
+            <a:r>
+              <a:rPr lang="en-US" sz="2400" dirty="0">
+                <a:latin typeface="Courier New" panose="02070309020205020404" pitchFamily="49" charset="0"/>
+                <a:cs typeface="Courier New" panose="02070309020205020404" pitchFamily="49" charset="0"/>
+              </a:rPr>
+              <a:t>`</a:t>
+            </a:r>
+          </a:p>
+          <a:p>
+            <a:pPr marL="0" indent="0">
+              <a:buNone/>
+            </a:pPr>
+            <a:r>
+              <a:rPr lang="en-US" dirty="0">
+                <a:latin typeface="Courier New" panose="02070309020205020404" pitchFamily="49" charset="0"/>
+                <a:cs typeface="Courier New" panose="02070309020205020404" pitchFamily="49" charset="0"/>
+              </a:rPr>
+              <a:t>					</a:t>
+            </a:r>
+            <a:r>
+              <a:rPr lang="en-US" sz="2400" dirty="0">
+                <a:latin typeface="Courier New" panose="02070309020205020404" pitchFamily="49" charset="0"/>
+                <a:cs typeface="Courier New" panose="02070309020205020404" pitchFamily="49" charset="0"/>
+              </a:rPr>
+              <a:t>--name `Password`</a:t>
+            </a:r>
+          </a:p>
+          <a:p>
+            <a:pPr marL="0" indent="0">
+              <a:buNone/>
+            </a:pPr>
+            <a:r>
+              <a:rPr lang="en-US" sz="2400" dirty="0">
+                <a:latin typeface="Courier New" panose="02070309020205020404" pitchFamily="49" charset="0"/>
+                <a:cs typeface="Courier New" panose="02070309020205020404" pitchFamily="49" charset="0"/>
+              </a:rPr>
+              <a:t>					--value `pass123`</a:t>
+            </a:r>
+            <a:endParaRPr lang="en-US" b="1" dirty="0">
+              <a:latin typeface="Courier New" panose="02070309020205020404" pitchFamily="49" charset="0"/>
+              <a:cs typeface="Courier New" panose="02070309020205020404" pitchFamily="49" charset="0"/>
+            </a:endParaRPr>
+          </a:p>
+          <a:p>
+            <a:pPr marL="0" indent="0">
+              <a:buNone/>
+            </a:pPr>
+            <a:r>
+              <a:rPr lang="en-US" sz="2400" b="1" dirty="0">
+                <a:latin typeface="Courier New" panose="02070309020205020404" pitchFamily="49" charset="0"/>
+                <a:cs typeface="Courier New" panose="02070309020205020404" pitchFamily="49" charset="0"/>
+              </a:rPr>
+              <a:t>&gt; </a:t>
+            </a:r>
+            <a:r>
+              <a:rPr lang="en-US" sz="2400" dirty="0" err="1">
+                <a:latin typeface="Courier New" panose="02070309020205020404" pitchFamily="49" charset="0"/>
+                <a:cs typeface="Courier New" panose="02070309020205020404" pitchFamily="49" charset="0"/>
+              </a:rPr>
+              <a:t>az</a:t>
+            </a:r>
+            <a:r>
+              <a:rPr lang="en-US" sz="2400" dirty="0">
+                <a:latin typeface="Courier New" panose="02070309020205020404" pitchFamily="49" charset="0"/>
+                <a:cs typeface="Courier New" panose="02070309020205020404" pitchFamily="49" charset="0"/>
+              </a:rPr>
+              <a:t> </a:t>
+            </a:r>
+            <a:r>
+              <a:rPr lang="en-US" sz="2400" dirty="0" err="1">
+                <a:latin typeface="Courier New" panose="02070309020205020404" pitchFamily="49" charset="0"/>
+                <a:cs typeface="Courier New" panose="02070309020205020404" pitchFamily="49" charset="0"/>
+              </a:rPr>
+              <a:t>keyvault</a:t>
+            </a:r>
+            <a:r>
+              <a:rPr lang="en-US" sz="2400" dirty="0">
+                <a:latin typeface="Courier New" panose="02070309020205020404" pitchFamily="49" charset="0"/>
+                <a:cs typeface="Courier New" panose="02070309020205020404" pitchFamily="49" charset="0"/>
+              </a:rPr>
+              <a:t> secret set --vault-name `</a:t>
+            </a:r>
+            <a:r>
+              <a:rPr lang="en-US" sz="2400" dirty="0" err="1">
+                <a:latin typeface="Courier New" panose="02070309020205020404" pitchFamily="49" charset="0"/>
+                <a:cs typeface="Courier New" panose="02070309020205020404" pitchFamily="49" charset="0"/>
+              </a:rPr>
+              <a:t>MoviesVault</a:t>
+            </a:r>
+            <a:r>
+              <a:rPr lang="en-US" sz="2400" dirty="0">
+                <a:latin typeface="Courier New" panose="02070309020205020404" pitchFamily="49" charset="0"/>
+                <a:cs typeface="Courier New" panose="02070309020205020404" pitchFamily="49" charset="0"/>
+              </a:rPr>
+              <a:t>`</a:t>
+            </a:r>
+          </a:p>
+          <a:p>
+            <a:pPr marL="0" indent="0">
+              <a:buNone/>
+            </a:pPr>
+            <a:r>
+              <a:rPr lang="en-US" sz="2400" dirty="0">
+                <a:latin typeface="Courier New" panose="02070309020205020404" pitchFamily="49" charset="0"/>
+                <a:cs typeface="Courier New" panose="02070309020205020404" pitchFamily="49" charset="0"/>
+              </a:rPr>
+              <a:t>					--name `User`</a:t>
+            </a:r>
+          </a:p>
+          <a:p>
+            <a:pPr marL="0" indent="0">
+              <a:buNone/>
+            </a:pPr>
+            <a:r>
+              <a:rPr lang="en-US" sz="2400" dirty="0">
+                <a:latin typeface="Courier New" panose="02070309020205020404" pitchFamily="49" charset="0"/>
+                <a:cs typeface="Courier New" panose="02070309020205020404" pitchFamily="49" charset="0"/>
+              </a:rPr>
+              <a:t>					--value `</a:t>
+            </a:r>
+            <a:r>
+              <a:rPr lang="en-US" sz="2400" dirty="0" err="1">
+                <a:latin typeface="Courier New" panose="02070309020205020404" pitchFamily="49" charset="0"/>
+                <a:cs typeface="Courier New" panose="02070309020205020404" pitchFamily="49" charset="0"/>
+              </a:rPr>
+              <a:t>johndoe</a:t>
+            </a:r>
+            <a:r>
+              <a:rPr lang="en-US" sz="2400" dirty="0">
+                <a:latin typeface="Courier New" panose="02070309020205020404" pitchFamily="49" charset="0"/>
+                <a:cs typeface="Courier New" panose="02070309020205020404" pitchFamily="49" charset="0"/>
+              </a:rPr>
+              <a:t>`</a:t>
+            </a:r>
+          </a:p>
+          <a:p>
+            <a:pPr marL="0" indent="0">
+              <a:buNone/>
+            </a:pPr>
+            <a:endParaRPr lang="en-US" sz="2400" dirty="0">
+              <a:latin typeface="Courier New" panose="02070309020205020404" pitchFamily="49" charset="0"/>
+              <a:cs typeface="Courier New" panose="02070309020205020404" pitchFamily="49" charset="0"/>
+            </a:endParaRPr>
+          </a:p>
+        </p:txBody>
+      </p:sp>
+    </p:spTree>
+    <p:extLst>
+      <p:ext uri="{BB962C8B-B14F-4D97-AF65-F5344CB8AC3E}">
+        <p14:creationId xmlns:p14="http://schemas.microsoft.com/office/powerpoint/2010/main" val="774116234"/>
+      </p:ext>
+    </p:extLst>
+  </p:cSld>
+  <p:clrMapOvr>
+    <a:masterClrMapping/>
+  </p:clrMapOvr>
+  <p:timing>
+    <p:tnLst>
+      <p:par>
+        <p:cTn id="1" dur="indefinite" restart="never" nodeType="tmRoot">
+          <p:childTnLst>
+            <p:seq concurrent="1" nextAc="seek">
+              <p:cTn id="2" dur="indefinite" nodeType="mainSeq">
+                <p:childTnLst>
+                  <p:par>
+                    <p:cTn id="3" fill="hold">
+                      <p:stCondLst>
+                        <p:cond delay="indefinite"/>
+                      </p:stCondLst>
+                      <p:childTnLst>
+                        <p:par>
+                          <p:cTn id="4" fill="hold">
+                            <p:stCondLst>
+                              <p:cond delay="0"/>
+                            </p:stCondLst>
+                            <p:childTnLst>
+                              <p:par>
+                                <p:cTn id="5" presetID="10" presetClass="entr" presetSubtype="0" fill="hold" nodeType="clickEffect">
+                                  <p:stCondLst>
+                                    <p:cond delay="0"/>
+                                  </p:stCondLst>
+                                  <p:childTnLst>
+                                    <p:set>
+                                      <p:cBhvr>
+                                        <p:cTn id="6" dur="1" fill="hold">
+                                          <p:stCondLst>
+                                            <p:cond delay="0"/>
+                                          </p:stCondLst>
+                                        </p:cTn>
+                                        <p:tgtEl>
+                                          <p:spTgt spid="3">
+                                            <p:txEl>
+                                              <p:pRg st="3" end="3"/>
+                                            </p:txEl>
+                                          </p:spTgt>
+                                        </p:tgtEl>
+                                        <p:attrNameLst>
+                                          <p:attrName>style.visibility</p:attrName>
+                                        </p:attrNameLst>
+                                      </p:cBhvr>
+                                      <p:to>
+                                        <p:strVal val="visible"/>
+                                      </p:to>
+                                    </p:set>
+                                    <p:animEffect transition="in" filter="fade">
+                                      <p:cBhvr>
+                                        <p:cTn id="7" dur="500"/>
+                                        <p:tgtEl>
+                                          <p:spTgt spid="3">
+                                            <p:txEl>
+                                              <p:pRg st="3" end="3"/>
+                                            </p:txEl>
+                                          </p:spTgt>
+                                        </p:tgtEl>
+                                      </p:cBhvr>
+                                    </p:animEffect>
+                                  </p:childTnLst>
+                                </p:cTn>
+                              </p:par>
+                            </p:childTnLst>
+                          </p:cTn>
+                        </p:par>
+                      </p:childTnLst>
+                    </p:cTn>
+                  </p:par>
+                  <p:par>
+                    <p:cTn id="8" fill="hold">
+                      <p:stCondLst>
+                        <p:cond delay="indefinite"/>
+                      </p:stCondLst>
+                      <p:childTnLst>
+                        <p:par>
+                          <p:cTn id="9" fill="hold">
+                            <p:stCondLst>
+                              <p:cond delay="0"/>
+                            </p:stCondLst>
+                            <p:childTnLst>
+                              <p:par>
+                                <p:cTn id="10" presetID="10" presetClass="entr" presetSubtype="0" fill="hold" nodeType="clickEffect">
+                                  <p:stCondLst>
+                                    <p:cond delay="0"/>
+                                  </p:stCondLst>
+                                  <p:childTnLst>
+                                    <p:set>
+                                      <p:cBhvr>
+                                        <p:cTn id="11" dur="1" fill="hold">
+                                          <p:stCondLst>
+                                            <p:cond delay="0"/>
+                                          </p:stCondLst>
+                                        </p:cTn>
+                                        <p:tgtEl>
+                                          <p:spTgt spid="3">
+                                            <p:txEl>
+                                              <p:pRg st="4" end="4"/>
+                                            </p:txEl>
+                                          </p:spTgt>
+                                        </p:tgtEl>
+                                        <p:attrNameLst>
+                                          <p:attrName>style.visibility</p:attrName>
+                                        </p:attrNameLst>
+                                      </p:cBhvr>
+                                      <p:to>
+                                        <p:strVal val="visible"/>
+                                      </p:to>
+                                    </p:set>
+                                    <p:animEffect transition="in" filter="fade">
+                                      <p:cBhvr>
+                                        <p:cTn id="12" dur="500"/>
+                                        <p:tgtEl>
+                                          <p:spTgt spid="3">
+                                            <p:txEl>
+                                              <p:pRg st="4" end="4"/>
+                                            </p:txEl>
+                                          </p:spTgt>
+                                        </p:tgtEl>
+                                      </p:cBhvr>
+                                    </p:animEffect>
+                                  </p:childTnLst>
+                                </p:cTn>
+                              </p:par>
+                            </p:childTnLst>
+                          </p:cTn>
+                        </p:par>
+                      </p:childTnLst>
+                    </p:cTn>
+                  </p:par>
+                  <p:par>
+                    <p:cTn id="13" fill="hold">
+                      <p:stCondLst>
+                        <p:cond delay="indefinite"/>
+                      </p:stCondLst>
+                      <p:childTnLst>
+                        <p:par>
+                          <p:cTn id="14" fill="hold">
+                            <p:stCondLst>
+                              <p:cond delay="0"/>
+                            </p:stCondLst>
+                            <p:childTnLst>
+                              <p:par>
+                                <p:cTn id="15" presetID="10" presetClass="entr" presetSubtype="0" fill="hold" nodeType="clickEffect">
+                                  <p:stCondLst>
+                                    <p:cond delay="0"/>
+                                  </p:stCondLst>
+                                  <p:childTnLst>
+                                    <p:set>
+                                      <p:cBhvr>
+                                        <p:cTn id="16" dur="1" fill="hold">
+                                          <p:stCondLst>
+                                            <p:cond delay="0"/>
+                                          </p:stCondLst>
+                                        </p:cTn>
+                                        <p:tgtEl>
+                                          <p:spTgt spid="3">
+                                            <p:txEl>
+                                              <p:pRg st="5" end="5"/>
+                                            </p:txEl>
+                                          </p:spTgt>
+                                        </p:tgtEl>
+                                        <p:attrNameLst>
+                                          <p:attrName>style.visibility</p:attrName>
+                                        </p:attrNameLst>
+                                      </p:cBhvr>
+                                      <p:to>
+                                        <p:strVal val="visible"/>
+                                      </p:to>
+                                    </p:set>
+                                    <p:animEffect transition="in" filter="fade">
+                                      <p:cBhvr>
+                                        <p:cTn id="17" dur="500"/>
+                                        <p:tgtEl>
+                                          <p:spTgt spid="3">
+                                            <p:txEl>
+                                              <p:pRg st="5" end="5"/>
+                                            </p:txEl>
+                                          </p:spTgt>
+                                        </p:tgtEl>
+                                      </p:cBhvr>
+                                    </p:animEffect>
+                                  </p:childTnLst>
+                                </p:cTn>
+                              </p:par>
+                            </p:childTnLst>
+                          </p:cTn>
+                        </p:par>
+                      </p:childTnLst>
+                    </p:cTn>
+                  </p:par>
+                  <p:par>
+                    <p:cTn id="18" fill="hold">
+                      <p:stCondLst>
+                        <p:cond delay="indefinite"/>
+                      </p:stCondLst>
+                      <p:childTnLst>
+                        <p:par>
+                          <p:cTn id="19" fill="hold">
+                            <p:stCondLst>
+                              <p:cond delay="0"/>
+                            </p:stCondLst>
+                            <p:childTnLst>
+                              <p:par>
+                                <p:cTn id="20" presetID="10" presetClass="entr" presetSubtype="0" fill="hold" nodeType="clickEffect">
+                                  <p:stCondLst>
+                                    <p:cond delay="0"/>
+                                  </p:stCondLst>
+                                  <p:childTnLst>
+                                    <p:set>
+                                      <p:cBhvr>
+                                        <p:cTn id="21" dur="1" fill="hold">
+                                          <p:stCondLst>
+                                            <p:cond delay="0"/>
+                                          </p:stCondLst>
+                                        </p:cTn>
+                                        <p:tgtEl>
+                                          <p:spTgt spid="3">
+                                            <p:txEl>
+                                              <p:pRg st="6" end="6"/>
+                                            </p:txEl>
+                                          </p:spTgt>
+                                        </p:tgtEl>
+                                        <p:attrNameLst>
+                                          <p:attrName>style.visibility</p:attrName>
+                                        </p:attrNameLst>
+                                      </p:cBhvr>
+                                      <p:to>
+                                        <p:strVal val="visible"/>
+                                      </p:to>
+                                    </p:set>
+                                    <p:animEffect transition="in" filter="fade">
+                                      <p:cBhvr>
+                                        <p:cTn id="22" dur="500"/>
+                                        <p:tgtEl>
+                                          <p:spTgt spid="3">
+                                            <p:txEl>
+                                              <p:pRg st="6" end="6"/>
+                                            </p:txEl>
+                                          </p:spTgt>
+                                        </p:tgtEl>
+                                      </p:cBhvr>
+                                    </p:animEffect>
+                                  </p:childTnLst>
+                                </p:cTn>
+                              </p:par>
+                            </p:childTnLst>
+                          </p:cTn>
+                        </p:par>
+                      </p:childTnLst>
+                    </p:cTn>
+                  </p:par>
+                  <p:par>
+                    <p:cTn id="23" fill="hold">
+                      <p:stCondLst>
+                        <p:cond delay="indefinite"/>
+                      </p:stCondLst>
+                      <p:childTnLst>
+                        <p:par>
+                          <p:cTn id="24" fill="hold">
+                            <p:stCondLst>
+                              <p:cond delay="0"/>
+                            </p:stCondLst>
+                            <p:childTnLst>
+                              <p:par>
+                                <p:cTn id="25" presetID="10" presetClass="entr" presetSubtype="0" fill="hold" nodeType="clickEffect">
+                                  <p:stCondLst>
+                                    <p:cond delay="0"/>
+                                  </p:stCondLst>
+                                  <p:childTnLst>
+                                    <p:set>
+                                      <p:cBhvr>
+                                        <p:cTn id="26" dur="1" fill="hold">
+                                          <p:stCondLst>
+                                            <p:cond delay="0"/>
+                                          </p:stCondLst>
+                                        </p:cTn>
+                                        <p:tgtEl>
+                                          <p:spTgt spid="3">
+                                            <p:txEl>
+                                              <p:pRg st="7" end="7"/>
+                                            </p:txEl>
+                                          </p:spTgt>
+                                        </p:tgtEl>
+                                        <p:attrNameLst>
+                                          <p:attrName>style.visibility</p:attrName>
+                                        </p:attrNameLst>
+                                      </p:cBhvr>
+                                      <p:to>
+                                        <p:strVal val="visible"/>
+                                      </p:to>
+                                    </p:set>
+                                    <p:animEffect transition="in" filter="fade">
+                                      <p:cBhvr>
+                                        <p:cTn id="27" dur="500"/>
+                                        <p:tgtEl>
+                                          <p:spTgt spid="3">
+                                            <p:txEl>
+                                              <p:pRg st="7" end="7"/>
+                                            </p:txEl>
+                                          </p:spTgt>
+                                        </p:tgtEl>
+                                      </p:cBhvr>
+                                    </p:animEffect>
+                                  </p:childTnLst>
+                                </p:cTn>
+                              </p:par>
+                            </p:childTnLst>
+                          </p:cTn>
+                        </p:par>
+                      </p:childTnLst>
+                    </p:cTn>
+                  </p:par>
+                  <p:par>
+                    <p:cTn id="28" fill="hold">
+                      <p:stCondLst>
+                        <p:cond delay="indefinite"/>
+                      </p:stCondLst>
+                      <p:childTnLst>
+                        <p:par>
+                          <p:cTn id="29" fill="hold">
+                            <p:stCondLst>
+                              <p:cond delay="0"/>
+                            </p:stCondLst>
+                            <p:childTnLst>
+                              <p:par>
+                                <p:cTn id="30" presetID="10" presetClass="entr" presetSubtype="0" fill="hold" nodeType="clickEffect">
+                                  <p:stCondLst>
+                                    <p:cond delay="0"/>
+                                  </p:stCondLst>
+                                  <p:childTnLst>
+                                    <p:set>
+                                      <p:cBhvr>
+                                        <p:cTn id="31" dur="1" fill="hold">
+                                          <p:stCondLst>
+                                            <p:cond delay="0"/>
+                                          </p:stCondLst>
+                                        </p:cTn>
+                                        <p:tgtEl>
+                                          <p:spTgt spid="3">
+                                            <p:txEl>
+                                              <p:pRg st="8" end="8"/>
+                                            </p:txEl>
+                                          </p:spTgt>
+                                        </p:tgtEl>
+                                        <p:attrNameLst>
+                                          <p:attrName>style.visibility</p:attrName>
+                                        </p:attrNameLst>
+                                      </p:cBhvr>
+                                      <p:to>
+                                        <p:strVal val="visible"/>
+                                      </p:to>
+                                    </p:set>
+                                    <p:animEffect transition="in" filter="fade">
+                                      <p:cBhvr>
+                                        <p:cTn id="32" dur="500"/>
+                                        <p:tgtEl>
+                                          <p:spTgt spid="3">
+                                            <p:txEl>
+                                              <p:pRg st="8" end="8"/>
+                                            </p:txEl>
+                                          </p:spTgt>
+                                        </p:tgtEl>
+                                      </p:cBhvr>
+                                    </p:animEffect>
+                                  </p:childTnLst>
+                                </p:cTn>
+                              </p:par>
+                              <p:par>
+                                <p:cTn id="33" presetID="10" presetClass="entr" presetSubtype="0" fill="hold" nodeType="withEffect">
+                                  <p:stCondLst>
+                                    <p:cond delay="0"/>
+                                  </p:stCondLst>
+                                  <p:childTnLst>
+                                    <p:set>
+                                      <p:cBhvr>
+                                        <p:cTn id="34" dur="1" fill="hold">
+                                          <p:stCondLst>
+                                            <p:cond delay="0"/>
+                                          </p:stCondLst>
+                                        </p:cTn>
+                                        <p:tgtEl>
+                                          <p:spTgt spid="3">
+                                            <p:txEl>
+                                              <p:pRg st="0" end="0"/>
+                                            </p:txEl>
+                                          </p:spTgt>
+                                        </p:tgtEl>
+                                        <p:attrNameLst>
+                                          <p:attrName>style.visibility</p:attrName>
+                                        </p:attrNameLst>
+                                      </p:cBhvr>
+                                      <p:to>
+                                        <p:strVal val="visible"/>
+                                      </p:to>
+                                    </p:set>
+                                    <p:animEffect transition="in" filter="fade">
+                                      <p:cBhvr>
+                                        <p:cTn id="35" dur="500"/>
+                                        <p:tgtEl>
+                                          <p:spTgt spid="3">
+                                            <p:txEl>
+                                              <p:pRg st="0" end="0"/>
+                                            </p:txEl>
+                                          </p:spTgt>
+                                        </p:tgtEl>
+                                      </p:cBhvr>
+                                    </p:animEffect>
+                                  </p:childTnLst>
+                                </p:cTn>
+                              </p:par>
+                              <p:par>
+                                <p:cTn id="36" presetID="10" presetClass="entr" presetSubtype="0" fill="hold" nodeType="withEffect">
+                                  <p:stCondLst>
+                                    <p:cond delay="0"/>
+                                  </p:stCondLst>
+                                  <p:childTnLst>
+                                    <p:set>
+                                      <p:cBhvr>
+                                        <p:cTn id="37" dur="1" fill="hold">
+                                          <p:stCondLst>
+                                            <p:cond delay="0"/>
+                                          </p:stCondLst>
+                                        </p:cTn>
+                                        <p:tgtEl>
+                                          <p:spTgt spid="3">
+                                            <p:txEl>
+                                              <p:pRg st="1" end="1"/>
+                                            </p:txEl>
+                                          </p:spTgt>
+                                        </p:tgtEl>
+                                        <p:attrNameLst>
+                                          <p:attrName>style.visibility</p:attrName>
+                                        </p:attrNameLst>
+                                      </p:cBhvr>
+                                      <p:to>
+                                        <p:strVal val="visible"/>
+                                      </p:to>
+                                    </p:set>
+                                    <p:animEffect transition="in" filter="fade">
+                                      <p:cBhvr>
+                                        <p:cTn id="38" dur="500"/>
+                                        <p:tgtEl>
+                                          <p:spTgt spid="3">
+                                            <p:txEl>
+                                              <p:pRg st="1" end="1"/>
+                                            </p:txEl>
+                                          </p:spTgt>
+                                        </p:tgtEl>
+                                      </p:cBhvr>
+                                    </p:animEffect>
+                                  </p:childTnLst>
+                                </p:cTn>
+                              </p:par>
+                              <p:par>
+                                <p:cTn id="39" presetID="10" presetClass="entr" presetSubtype="0" fill="hold" nodeType="withEffect">
+                                  <p:stCondLst>
+                                    <p:cond delay="0"/>
+                                  </p:stCondLst>
+                                  <p:childTnLst>
+                                    <p:set>
+                                      <p:cBhvr>
+                                        <p:cTn id="40" dur="1" fill="hold">
+                                          <p:stCondLst>
+                                            <p:cond delay="0"/>
+                                          </p:stCondLst>
+                                        </p:cTn>
+                                        <p:tgtEl>
+                                          <p:spTgt spid="3">
+                                            <p:txEl>
+                                              <p:pRg st="2" end="2"/>
+                                            </p:txEl>
+                                          </p:spTgt>
+                                        </p:tgtEl>
+                                        <p:attrNameLst>
+                                          <p:attrName>style.visibility</p:attrName>
+                                        </p:attrNameLst>
+                                      </p:cBhvr>
+                                      <p:to>
+                                        <p:strVal val="visible"/>
+                                      </p:to>
+                                    </p:set>
+                                    <p:animEffect transition="in" filter="fade">
+                                      <p:cBhvr>
+                                        <p:cTn id="41" dur="500"/>
+                                        <p:tgtEl>
+                                          <p:spTgt spid="3">
+                                            <p:txEl>
+                                              <p:pRg st="2" end="2"/>
+                                            </p:txEl>
+                                          </p:spTgt>
+                                        </p:tgtEl>
+                                      </p:cBhvr>
+                                    </p:animEffect>
+                                  </p:childTnLst>
+                                </p:cTn>
+                              </p:par>
+                            </p:childTnLst>
+                          </p:cTn>
+                        </p:par>
+                      </p:childTnLst>
+                    </p:cTn>
+                  </p:par>
+                </p:childTnLst>
+              </p:cTn>
+              <p:prevCondLst>
+                <p:cond evt="onPrev" delay="0">
+                  <p:tgtEl>
+                    <p:sldTgt/>
+                  </p:tgtEl>
+                </p:cond>
+              </p:prevCondLst>
+              <p:nextCondLst>
+                <p:cond evt="onNext" delay="0">
+                  <p:tgtEl>
+                    <p:sldTgt/>
+                  </p:tgtEl>
+                </p:cond>
+              </p:nextCondLst>
+            </p:seq>
+          </p:childTnLst>
+        </p:cTn>
+      </p:par>
+    </p:tnLst>
+  </p:timing>
+</p:sld>
+</file>
+
+<file path=ppt/slides/slide12.xml><?xml version="1.0" encoding="utf-8"?>
+<p:sld xmlns:a="http://schemas.openxmlformats.org/drawingml/2006/main" xmlns:r="http://schemas.openxmlformats.org/officeDocument/2006/relationships" xmlns:p="http://schemas.openxmlformats.org/presentationml/2006/main">
+  <p:cSld>
+    <p:bg>
+      <p:bgPr>
+        <a:solidFill>
+          <a:srgbClr val="505050"/>
+        </a:solidFill>
+        <a:effectLst/>
+      </p:bgPr>
+    </p:bg>
+    <p:spTree>
+      <p:nvGrpSpPr>
+        <p:cNvPr id="1" name=""/>
+        <p:cNvGrpSpPr/>
+        <p:nvPr/>
+      </p:nvGrpSpPr>
+      <p:grpSpPr>
+        <a:xfrm>
+          <a:off x="0" y="0"/>
+          <a:ext cx="0" cy="0"/>
+          <a:chOff x="0" y="0"/>
+          <a:chExt cx="0" cy="0"/>
+        </a:xfrm>
+      </p:grpSpPr>
+      <p:sp>
+        <p:nvSpPr>
+          <p:cNvPr id="2" name="Title 1"/>
+          <p:cNvSpPr>
+            <a:spLocks noGrp="1"/>
+          </p:cNvSpPr>
+          <p:nvPr>
+            <p:ph type="title"/>
+          </p:nvPr>
+        </p:nvSpPr>
+        <p:spPr/>
+        <p:txBody>
+          <a:bodyPr/>
+          <a:lstStyle/>
+          <a:p>
+            <a:r>
+              <a:rPr lang="en-US" dirty="0"/>
+              <a:t>Key Vault: Retrieval</a:t>
+            </a:r>
+          </a:p>
+        </p:txBody>
+      </p:sp>
+      <p:graphicFrame>
+        <p:nvGraphicFramePr>
+          <p:cNvPr id="4" name="Table 3">
+            <a:extLst>
+              <a:ext uri="{FF2B5EF4-FFF2-40B4-BE49-F238E27FC236}">
+                <a16:creationId xmlns:a16="http://schemas.microsoft.com/office/drawing/2014/main" id="{FB18C7D4-3492-4E4E-800A-CAFC344516DD}"/>
+              </a:ext>
+            </a:extLst>
+          </p:cNvPr>
+          <p:cNvGraphicFramePr>
+            <a:graphicFrameLocks noGrp="1"/>
+          </p:cNvGraphicFramePr>
+          <p:nvPr>
+            <p:extLst>
+              <p:ext uri="{D42A27DB-BD31-4B8C-83A1-F6EECF244321}">
+                <p14:modId xmlns:p14="http://schemas.microsoft.com/office/powerpoint/2010/main" val="3815910926"/>
+              </p:ext>
+            </p:extLst>
+          </p:nvPr>
+        </p:nvGraphicFramePr>
+        <p:xfrm>
+          <a:off x="844462" y="1920876"/>
+          <a:ext cx="9165812" cy="4135854"/>
+        </p:xfrm>
+        <a:graphic>
+          <a:graphicData uri="http://schemas.openxmlformats.org/drawingml/2006/table">
+            <a:tbl>
+              <a:tblPr firstRow="1" bandRow="1"/>
+              <a:tblGrid>
+                <a:gridCol w="9165812">
+                  <a:extLst>
+                    <a:ext uri="{9D8B030D-6E8A-4147-A177-3AD203B41FA5}">
+                      <a16:colId xmlns:a16="http://schemas.microsoft.com/office/drawing/2014/main" val="1057070397"/>
+                    </a:ext>
+                  </a:extLst>
+                </a:gridCol>
+              </a:tblGrid>
+              <a:tr h="3800574">
+                <a:tc>
+                  <a:txBody>
+                    <a:bodyPr/>
+                    <a:lstStyle>
+                      <a:lvl1pPr marL="0" algn="l" defTabSz="914400" rtl="0" eaLnBrk="1" latinLnBrk="0" hangingPunct="1">
+                        <a:defRPr sz="1800" b="1" kern="1200">
+                          <a:solidFill>
+                            <a:schemeClr val="lt1"/>
+                          </a:solidFill>
+                          <a:latin typeface="Segoe UI Light"/>
+                        </a:defRPr>
+                      </a:lvl1pPr>
+                      <a:lvl2pPr marL="457200" algn="l" defTabSz="914400" rtl="0" eaLnBrk="1" latinLnBrk="0" hangingPunct="1">
+                        <a:defRPr sz="1800" b="1" kern="1200">
+                          <a:solidFill>
+                            <a:schemeClr val="lt1"/>
+                          </a:solidFill>
+                          <a:latin typeface="Segoe UI Light"/>
+                        </a:defRPr>
+                      </a:lvl2pPr>
+                      <a:lvl3pPr marL="914400" algn="l" defTabSz="914400" rtl="0" eaLnBrk="1" latinLnBrk="0" hangingPunct="1">
+                        <a:defRPr sz="1800" b="1" kern="1200">
+                          <a:solidFill>
+                            <a:schemeClr val="lt1"/>
+                          </a:solidFill>
+                          <a:latin typeface="Segoe UI Light"/>
+                        </a:defRPr>
+                      </a:lvl3pPr>
+                      <a:lvl4pPr marL="1371600" algn="l" defTabSz="914400" rtl="0" eaLnBrk="1" latinLnBrk="0" hangingPunct="1">
+                        <a:defRPr sz="1800" b="1" kern="1200">
+                          <a:solidFill>
+                            <a:schemeClr val="lt1"/>
+                          </a:solidFill>
+                          <a:latin typeface="Segoe UI Light"/>
+                        </a:defRPr>
+                      </a:lvl4pPr>
+                      <a:lvl5pPr marL="1828800" algn="l" defTabSz="914400" rtl="0" eaLnBrk="1" latinLnBrk="0" hangingPunct="1">
+                        <a:defRPr sz="1800" b="1" kern="1200">
+                          <a:solidFill>
+                            <a:schemeClr val="lt1"/>
+                          </a:solidFill>
+                          <a:latin typeface="Segoe UI Light"/>
+                        </a:defRPr>
+                      </a:lvl5pPr>
+                      <a:lvl6pPr marL="2286000" algn="l" defTabSz="914400" rtl="0" eaLnBrk="1" latinLnBrk="0" hangingPunct="1">
+                        <a:defRPr sz="1800" b="1" kern="1200">
+                          <a:solidFill>
+                            <a:schemeClr val="lt1"/>
+                          </a:solidFill>
+                          <a:latin typeface="Segoe UI Light"/>
+                        </a:defRPr>
+                      </a:lvl6pPr>
+                      <a:lvl7pPr marL="2743200" algn="l" defTabSz="914400" rtl="0" eaLnBrk="1" latinLnBrk="0" hangingPunct="1">
+                        <a:defRPr sz="1800" b="1" kern="1200">
+                          <a:solidFill>
+                            <a:schemeClr val="lt1"/>
+                          </a:solidFill>
+                          <a:latin typeface="Segoe UI Light"/>
+                        </a:defRPr>
+                      </a:lvl7pPr>
+                      <a:lvl8pPr marL="3200400" algn="l" defTabSz="914400" rtl="0" eaLnBrk="1" latinLnBrk="0" hangingPunct="1">
+                        <a:defRPr sz="1800" b="1" kern="1200">
+                          <a:solidFill>
+                            <a:schemeClr val="lt1"/>
+                          </a:solidFill>
+                          <a:latin typeface="Segoe UI Light"/>
+                        </a:defRPr>
+                      </a:lvl8pPr>
+                      <a:lvl9pPr marL="3657600" algn="l" defTabSz="914400" rtl="0" eaLnBrk="1" latinLnBrk="0" hangingPunct="1">
+                        <a:defRPr sz="1800" b="1" kern="1200">
+                          <a:solidFill>
+                            <a:schemeClr val="lt1"/>
+                          </a:solidFill>
+                          <a:latin typeface="Segoe UI Light"/>
+                        </a:defRPr>
+                      </a:lvl9pPr>
+                    </a:lstStyle>
+                    <a:p>
+                      <a:endParaRPr lang="en-US" sz="1600" dirty="0">
+                        <a:solidFill>
+                          <a:srgbClr val="000000"/>
+                        </a:solidFill>
+                        <a:latin typeface="Consolas" panose="020B0609020204030204" pitchFamily="49" charset="0"/>
+                      </a:endParaRPr>
+                    </a:p>
+                  </a:txBody>
+                  <a:tcPr>
+                    <a:lnL w="12700" cap="flat" cmpd="sng" algn="ctr">
+                      <a:solidFill>
+                        <a:sysClr val="window" lastClr="FFFFFF"/>
+                      </a:solidFill>
+                      <a:prstDash val="solid"/>
+                      <a:round/>
+                      <a:headEnd type="none" w="med" len="med"/>
+                      <a:tailEnd type="none" w="med" len="med"/>
+                    </a:lnL>
+                    <a:lnR w="12700" cap="flat" cmpd="sng" algn="ctr">
+                      <a:solidFill>
+                        <a:sysClr val="window" lastClr="FFFFFF"/>
+                      </a:solidFill>
+                      <a:prstDash val="solid"/>
+                      <a:round/>
+                      <a:headEnd type="none" w="med" len="med"/>
+                      <a:tailEnd type="none" w="med" len="med"/>
+                    </a:lnR>
+                    <a:lnT w="12700" cap="flat" cmpd="sng" algn="ctr">
+                      <a:solidFill>
+                        <a:sysClr val="window" lastClr="FFFFFF"/>
+                      </a:solidFill>
+                      <a:prstDash val="solid"/>
+                      <a:round/>
+                      <a:headEnd type="none" w="med" len="med"/>
+                      <a:tailEnd type="none" w="med" len="med"/>
+                    </a:lnT>
+                    <a:lnB w="12700" cap="flat" cmpd="sng" algn="ctr">
+                      <a:solidFill>
+                        <a:sysClr val="window" lastClr="FFFFFF"/>
+                      </a:solidFill>
+                      <a:prstDash val="solid"/>
+                      <a:round/>
+                      <a:headEnd type="none" w="med" len="med"/>
+                      <a:tailEnd type="none" w="med" len="med"/>
+                    </a:lnB>
+                    <a:lnTlToBr w="12700" cmpd="sng">
+                      <a:noFill/>
+                      <a:prstDash val="solid"/>
+                    </a:lnTlToBr>
+                    <a:lnBlToTr w="12700" cmpd="sng">
+                      <a:noFill/>
+                      <a:prstDash val="solid"/>
+                    </a:lnBlToTr>
+                    <a:solidFill>
+                      <a:sysClr val="window" lastClr="FFFFFF"/>
+                    </a:solidFill>
+                  </a:tcPr>
+                </a:tc>
+                <a:extLst>
+                  <a:ext uri="{0D108BD9-81ED-4DB2-BD59-A6C34878D82A}">
+                    <a16:rowId xmlns:a16="http://schemas.microsoft.com/office/drawing/2014/main" val="3473222697"/>
+                  </a:ext>
+                </a:extLst>
+              </a:tr>
+              <a:tr h="319132">
+                <a:tc>
+                  <a:txBody>
+                    <a:bodyPr/>
+                    <a:lstStyle/>
+                    <a:p>
+                      <a:endParaRPr lang="en-US" sz="1600" dirty="0">
+                        <a:solidFill>
+                          <a:srgbClr val="000000"/>
+                        </a:solidFill>
+                        <a:latin typeface="Consolas" panose="020B0609020204030204" pitchFamily="49" charset="0"/>
+                      </a:endParaRPr>
+                    </a:p>
+                  </a:txBody>
+                  <a:tcPr>
+                    <a:lnL w="12700" cap="flat" cmpd="sng" algn="ctr">
+                      <a:solidFill>
+                        <a:sysClr val="window" lastClr="FFFFFF"/>
+                      </a:solidFill>
+                      <a:prstDash val="solid"/>
+                      <a:round/>
+                      <a:headEnd type="none" w="med" len="med"/>
+                      <a:tailEnd type="none" w="med" len="med"/>
+                    </a:lnL>
+                    <a:lnR w="12700" cap="flat" cmpd="sng" algn="ctr">
+                      <a:solidFill>
+                        <a:sysClr val="window" lastClr="FFFFFF"/>
+                      </a:solidFill>
+                      <a:prstDash val="solid"/>
+                      <a:round/>
+                      <a:headEnd type="none" w="med" len="med"/>
+                      <a:tailEnd type="none" w="med" len="med"/>
+                    </a:lnR>
+                    <a:lnT w="12700" cap="flat" cmpd="sng" algn="ctr">
+                      <a:solidFill>
+                        <a:sysClr val="window" lastClr="FFFFFF"/>
+                      </a:solidFill>
+                      <a:prstDash val="solid"/>
+                      <a:round/>
+                      <a:headEnd type="none" w="med" len="med"/>
+                      <a:tailEnd type="none" w="med" len="med"/>
+                    </a:lnT>
+                    <a:lnB w="12700" cap="flat" cmpd="sng" algn="ctr">
+                      <a:solidFill>
+                        <a:sysClr val="window" lastClr="FFFFFF"/>
+                      </a:solidFill>
+                      <a:prstDash val="solid"/>
+                      <a:round/>
+                      <a:headEnd type="none" w="med" len="med"/>
+                      <a:tailEnd type="none" w="med" len="med"/>
+                    </a:lnB>
+                    <a:lnTlToBr w="12700" cmpd="sng">
+                      <a:noFill/>
+                      <a:prstDash val="solid"/>
+                    </a:lnTlToBr>
+                    <a:lnBlToTr w="12700" cmpd="sng">
+                      <a:noFill/>
+                      <a:prstDash val="solid"/>
+                    </a:lnBlToTr>
+                    <a:solidFill>
+                      <a:sysClr val="window" lastClr="FFFFFF"/>
+                    </a:solidFill>
+                  </a:tcPr>
+                </a:tc>
+                <a:extLst>
+                  <a:ext uri="{0D108BD9-81ED-4DB2-BD59-A6C34878D82A}">
+                    <a16:rowId xmlns:a16="http://schemas.microsoft.com/office/drawing/2014/main" val="97062865"/>
+                  </a:ext>
+                </a:extLst>
+              </a:tr>
+            </a:tbl>
+          </a:graphicData>
+        </a:graphic>
+      </p:graphicFrame>
+      <p:sp>
+        <p:nvSpPr>
+          <p:cNvPr id="5" name="Rectangle 4">
+            <a:extLst>
+              <a:ext uri="{FF2B5EF4-FFF2-40B4-BE49-F238E27FC236}">
+                <a16:creationId xmlns:a16="http://schemas.microsoft.com/office/drawing/2014/main" id="{968B1320-9F80-48D4-8F49-987C2A75ECD9}"/>
+              </a:ext>
+            </a:extLst>
+          </p:cNvPr>
+          <p:cNvSpPr/>
+          <p:nvPr/>
+        </p:nvSpPr>
+        <p:spPr>
+          <a:xfrm>
+            <a:off x="838200" y="1474306"/>
+            <a:ext cx="1978891" cy="446567"/>
+          </a:xfrm>
+          <a:prstGeom prst="rect">
+            <a:avLst/>
+          </a:prstGeom>
+          <a:gradFill rotWithShape="1">
+            <a:gsLst>
+              <a:gs pos="0">
+                <a:srgbClr val="5B9BD5">
+                  <a:lumMod val="110000"/>
+                  <a:satMod val="105000"/>
+                  <a:tint val="67000"/>
+                </a:srgbClr>
+              </a:gs>
+              <a:gs pos="50000">
+                <a:srgbClr val="5B9BD5">
+                  <a:lumMod val="105000"/>
+                  <a:satMod val="103000"/>
+                  <a:tint val="73000"/>
+                </a:srgbClr>
+              </a:gs>
+              <a:gs pos="100000">
+                <a:srgbClr val="5B9BD5">
+                  <a:lumMod val="105000"/>
+                  <a:satMod val="109000"/>
+                  <a:tint val="81000"/>
+                </a:srgbClr>
+              </a:gs>
+            </a:gsLst>
+            <a:lin ang="5400000" scaled="0"/>
+          </a:gradFill>
+          <a:ln w="6350" cap="flat" cmpd="sng" algn="ctr">
+            <a:solidFill>
+              <a:srgbClr val="5B9BD5"/>
+            </a:solidFill>
+            <a:prstDash val="solid"/>
+            <a:miter lim="800000"/>
+          </a:ln>
+          <a:effectLst/>
+        </p:spPr>
+        <p:txBody>
+          <a:bodyPr rtlCol="0" anchor="ctr"/>
+          <a:lstStyle/>
+          <a:p>
+            <a:pPr marL="0" marR="0" lvl="0" indent="0" algn="ctr" defTabSz="914400" rtl="0" eaLnBrk="1" fontAlgn="auto" latinLnBrk="0" hangingPunct="1">
+              <a:lnSpc>
+                <a:spcPct val="100000"/>
+              </a:lnSpc>
+              <a:spcBef>
+                <a:spcPts val="0"/>
+              </a:spcBef>
+              <a:spcAft>
+                <a:spcPts val="0"/>
+              </a:spcAft>
+              <a:buClrTx/>
+              <a:buSzTx/>
+              <a:buFontTx/>
+              <a:buNone/>
+              <a:tabLst/>
+              <a:defRPr/>
+            </a:pPr>
+            <a:r>
+              <a:rPr kumimoji="0" lang="en-US" sz="1800" b="1" i="0" u="none" strike="noStrike" kern="0" cap="none" spc="0" normalizeH="0" baseline="0" noProof="0" dirty="0" err="1">
+                <a:ln>
+                  <a:noFill/>
+                </a:ln>
+                <a:solidFill>
+                  <a:prstClr val="black"/>
+                </a:solidFill>
+                <a:effectLst/>
+                <a:uLnTx/>
+                <a:uFillTx/>
+                <a:latin typeface="Segoe UI Light"/>
+                <a:ea typeface="+mn-ea"/>
+                <a:cs typeface="+mn-cs"/>
+              </a:rPr>
+              <a:t>Program.cs</a:t>
+            </a:r>
+            <a:endParaRPr kumimoji="0" lang="en-US" sz="1800" b="1" i="0" u="none" strike="noStrike" kern="0" cap="none" spc="0" normalizeH="0" baseline="0" noProof="0" dirty="0">
+              <a:ln>
+                <a:noFill/>
+              </a:ln>
+              <a:solidFill>
+                <a:prstClr val="black"/>
+              </a:solidFill>
+              <a:effectLst/>
+              <a:uLnTx/>
+              <a:uFillTx/>
+              <a:latin typeface="Segoe UI Light"/>
+              <a:ea typeface="+mn-ea"/>
+              <a:cs typeface="+mn-cs"/>
+            </a:endParaRPr>
+          </a:p>
+        </p:txBody>
+      </p:sp>
+    </p:spTree>
+    <p:extLst>
+      <p:ext uri="{BB962C8B-B14F-4D97-AF65-F5344CB8AC3E}">
+        <p14:creationId xmlns:p14="http://schemas.microsoft.com/office/powerpoint/2010/main" val="496605018"/>
+      </p:ext>
+    </p:extLst>
+  </p:cSld>
+  <p:clrMapOvr>
+    <a:masterClrMapping/>
+  </p:clrMapOvr>
+  <p:timing>
+    <p:tnLst>
+      <p:par>
+        <p:cTn id="1" dur="indefinite" restart="never" nodeType="tmRoot">
+          <p:childTnLst>
+            <p:seq concurrent="1" nextAc="seek">
+              <p:cTn id="2" dur="indefinite" nodeType="mainSeq">
+                <p:childTnLst>
+                  <p:par>
+                    <p:cTn id="3" fill="hold">
+                      <p:stCondLst>
+                        <p:cond delay="indefinite"/>
+                        <p:cond evt="onBegin" delay="0">
+                          <p:tn val="2"/>
+                        </p:cond>
+                      </p:stCondLst>
+                      <p:childTnLst>
+                        <p:par>
+                          <p:cTn id="4" fill="hold">
+                            <p:stCondLst>
+                              <p:cond delay="0"/>
+                            </p:stCondLst>
+                            <p:childTnLst>
+                              <p:par>
+                                <p:cTn id="5" presetID="10" presetClass="entr" presetSubtype="0" fill="hold" grpId="0" nodeType="withEffect">
+                                  <p:stCondLst>
+                                    <p:cond delay="0"/>
+                                  </p:stCondLst>
+                                  <p:childTnLst>
+                                    <p:set>
+                                      <p:cBhvr>
+                                        <p:cTn id="6" dur="1" fill="hold">
+                                          <p:stCondLst>
+                                            <p:cond delay="0"/>
+                                          </p:stCondLst>
+                                        </p:cTn>
+                                        <p:tgtEl>
+                                          <p:spTgt spid="5"/>
+                                        </p:tgtEl>
+                                        <p:attrNameLst>
+                                          <p:attrName>style.visibility</p:attrName>
+                                        </p:attrNameLst>
+                                      </p:cBhvr>
+                                      <p:to>
+                                        <p:strVal val="visible"/>
+                                      </p:to>
+                                    </p:set>
+                                    <p:animEffect transition="in" filter="fade">
+                                      <p:cBhvr>
+                                        <p:cTn id="7" dur="500"/>
+                                        <p:tgtEl>
+                                          <p:spTgt spid="5"/>
+                                        </p:tgtEl>
+                                      </p:cBhvr>
+                                    </p:animEffect>
+                                  </p:childTnLst>
+                                </p:cTn>
+                              </p:par>
+                              <p:par>
+                                <p:cTn id="8" presetID="10" presetClass="entr" presetSubtype="0" fill="hold" nodeType="withEffect">
+                                  <p:stCondLst>
+                                    <p:cond delay="0"/>
+                                  </p:stCondLst>
+                                  <p:childTnLst>
+                                    <p:set>
+                                      <p:cBhvr>
+                                        <p:cTn id="9" dur="1" fill="hold">
+                                          <p:stCondLst>
+                                            <p:cond delay="0"/>
+                                          </p:stCondLst>
+                                        </p:cTn>
+                                        <p:tgtEl>
+                                          <p:spTgt spid="4"/>
+                                        </p:tgtEl>
+                                        <p:attrNameLst>
+                                          <p:attrName>style.visibility</p:attrName>
+                                        </p:attrNameLst>
+                                      </p:cBhvr>
+                                      <p:to>
+                                        <p:strVal val="visible"/>
+                                      </p:to>
+                                    </p:set>
+                                    <p:animEffect transition="in" filter="fade">
+                                      <p:cBhvr>
+                                        <p:cTn id="10" dur="500"/>
+                                        <p:tgtEl>
+                                          <p:spTgt spid="4"/>
+                                        </p:tgtEl>
+                                      </p:cBhvr>
+                                    </p:animEffect>
+                                  </p:childTnLst>
+                                </p:cTn>
+                              </p:par>
+                            </p:childTnLst>
+                          </p:cTn>
+                        </p:par>
+                      </p:childTnLst>
+                    </p:cTn>
+                  </p:par>
+                </p:childTnLst>
+              </p:cTn>
+              <p:prevCondLst>
+                <p:cond evt="onPrev" delay="0">
+                  <p:tgtEl>
+                    <p:sldTgt/>
+                  </p:tgtEl>
+                </p:cond>
+              </p:prevCondLst>
+              <p:nextCondLst>
+                <p:cond evt="onNext" delay="0">
+                  <p:tgtEl>
+                    <p:sldTgt/>
+                  </p:tgtEl>
+                </p:cond>
+              </p:nextCondLst>
+            </p:seq>
+          </p:childTnLst>
+        </p:cTn>
+      </p:par>
+    </p:tnLst>
+    <p:bldLst>
+      <p:bldP spid="5" grpId="0" animBg="1"/>
+    </p:bldLst>
+  </p:timing>
+</p:sld>
+</file>
+
+<file path=ppt/slides/slide13.xml><?xml version="1.0" encoding="utf-8"?>
 <p:sld xmlns:a="http://schemas.openxmlformats.org/drawingml/2006/main" xmlns:r="http://schemas.openxmlformats.org/officeDocument/2006/relationships" xmlns:p="http://schemas.openxmlformats.org/presentationml/2006/main">
   <p:cSld>
     <p:bg>
@@ -10151,7 +12402,154 @@
 </p:sld>
 </file>
 
-<file path=ppt/slides/slide12.xml><?xml version="1.0" encoding="utf-8"?>
+<file path=ppt/slides/slide14.xml><?xml version="1.0" encoding="utf-8"?>
+<p:sld xmlns:a="http://schemas.openxmlformats.org/drawingml/2006/main" xmlns:r="http://schemas.openxmlformats.org/officeDocument/2006/relationships" xmlns:p="http://schemas.openxmlformats.org/presentationml/2006/main">
+  <p:cSld>
+    <p:bg>
+      <p:bgPr>
+        <a:solidFill>
+          <a:srgbClr val="505050"/>
+        </a:solidFill>
+        <a:effectLst/>
+      </p:bgPr>
+    </p:bg>
+    <p:spTree>
+      <p:nvGrpSpPr>
+        <p:cNvPr id="1" name=""/>
+        <p:cNvGrpSpPr/>
+        <p:nvPr/>
+      </p:nvGrpSpPr>
+      <p:grpSpPr>
+        <a:xfrm>
+          <a:off x="0" y="0"/>
+          <a:ext cx="0" cy="0"/>
+          <a:chOff x="0" y="0"/>
+          <a:chExt cx="0" cy="0"/>
+        </a:xfrm>
+      </p:grpSpPr>
+      <p:pic>
+        <p:nvPicPr>
+          <p:cNvPr id="3074" name="Picture 2" descr="Image result for azure key vault">
+            <a:extLst>
+              <a:ext uri="{FF2B5EF4-FFF2-40B4-BE49-F238E27FC236}">
+                <a16:creationId xmlns:a16="http://schemas.microsoft.com/office/drawing/2014/main" id="{6061F9CD-076F-4429-BE2C-CFC00CE4E774}"/>
+              </a:ext>
+            </a:extLst>
+          </p:cNvPr>
+          <p:cNvPicPr>
+            <a:picLocks noChangeAspect="1" noChangeArrowheads="1"/>
+          </p:cNvPicPr>
+          <p:nvPr/>
+        </p:nvPicPr>
+        <p:blipFill>
+          <a:blip r:embed="rId3">
+            <a:extLst>
+              <a:ext uri="{28A0092B-C50C-407E-A947-70E740481C1C}">
+                <a14:useLocalDpi xmlns:a14="http://schemas.microsoft.com/office/drawing/2010/main" val="0"/>
+              </a:ext>
+            </a:extLst>
+          </a:blip>
+          <a:srcRect/>
+          <a:stretch>
+            <a:fillRect/>
+          </a:stretch>
+        </p:blipFill>
+        <p:spPr bwMode="auto">
+          <a:xfrm>
+            <a:off x="2977795" y="2956896"/>
+            <a:ext cx="2600325" cy="1714500"/>
+          </a:xfrm>
+          <a:prstGeom prst="rect">
+            <a:avLst/>
+          </a:prstGeom>
+          <a:noFill/>
+          <a:extLst>
+            <a:ext uri="{909E8E84-426E-40DD-AFC4-6F175D3DCCD1}">
+              <a14:hiddenFill xmlns:a14="http://schemas.microsoft.com/office/drawing/2010/main">
+                <a:solidFill>
+                  <a:srgbClr val="FFFFFF"/>
+                </a:solidFill>
+              </a14:hiddenFill>
+            </a:ext>
+          </a:extLst>
+        </p:spPr>
+      </p:pic>
+      <p:sp>
+        <p:nvSpPr>
+          <p:cNvPr id="2" name="Title 1"/>
+          <p:cNvSpPr>
+            <a:spLocks noGrp="1"/>
+          </p:cNvSpPr>
+          <p:nvPr>
+            <p:ph type="title"/>
+          </p:nvPr>
+        </p:nvSpPr>
+        <p:spPr>
+          <a:xfrm>
+            <a:off x="831850" y="1709738"/>
+            <a:ext cx="10515600" cy="2852737"/>
+          </a:xfrm>
+        </p:spPr>
+        <p:txBody>
+          <a:bodyPr/>
+          <a:lstStyle/>
+          <a:p>
+            <a:r>
+              <a:rPr lang="en-US"/>
+              <a:t>Demo</a:t>
+            </a:r>
+            <a:endParaRPr lang="en-US" dirty="0"/>
+          </a:p>
+        </p:txBody>
+      </p:sp>
+      <p:sp>
+        <p:nvSpPr>
+          <p:cNvPr id="4" name="Text Placeholder 3">
+            <a:extLst>
+              <a:ext uri="{FF2B5EF4-FFF2-40B4-BE49-F238E27FC236}">
+                <a16:creationId xmlns:a16="http://schemas.microsoft.com/office/drawing/2014/main" id="{3BCC483B-E1AE-440E-BC8D-2AA2A6FD23E2}"/>
+              </a:ext>
+            </a:extLst>
+          </p:cNvPr>
+          <p:cNvSpPr>
+            <a:spLocks noGrp="1"/>
+          </p:cNvSpPr>
+          <p:nvPr>
+            <p:ph type="body" idx="1"/>
+          </p:nvPr>
+        </p:nvSpPr>
+        <p:spPr>
+          <a:xfrm>
+            <a:off x="831850" y="4589463"/>
+            <a:ext cx="10515600" cy="1500187"/>
+          </a:xfrm>
+        </p:spPr>
+        <p:txBody>
+          <a:bodyPr/>
+          <a:lstStyle/>
+          <a:p>
+            <a:r>
+              <a:rPr lang="en-US"/>
+              <a:t>Secret Manager + Azure Key Vault</a:t>
+            </a:r>
+            <a:endParaRPr lang="en-US" dirty="0"/>
+          </a:p>
+        </p:txBody>
+      </p:sp>
+    </p:spTree>
+    <p:extLst>
+      <p:ext uri="{BB962C8B-B14F-4D97-AF65-F5344CB8AC3E}">
+        <p14:creationId xmlns:p14="http://schemas.microsoft.com/office/powerpoint/2010/main" val="2460411575"/>
+      </p:ext>
+    </p:extLst>
+  </p:cSld>
+  <p:clrMapOvr>
+    <a:masterClrMapping/>
+  </p:clrMapOvr>
+</p:sld>
+</file>
+
+<file path=ppt/slides/slide15.xml><?xml version="1.0" encoding="utf-8"?>
 <p:sld xmlns:a="http://schemas.openxmlformats.org/drawingml/2006/main" xmlns:r="http://schemas.openxmlformats.org/officeDocument/2006/relationships" xmlns:p="http://schemas.openxmlformats.org/presentationml/2006/main">
   <p:cSld>
     <p:bg>
@@ -10263,15 +12661,15 @@
               <a:rPr lang="en-US" dirty="0">
                 <a:hlinkClick r:id="rId4"/>
               </a:rPr>
-              <a:t>https://docs.microsoft.com/aspnet/core/security/app-secrets</a:t>
+              <a:t>aka.ms/dotnet-secret-mgr</a:t>
             </a:r>
           </a:p>
           <a:p>
             <a:r>
               <a:rPr lang="en-US" dirty="0">
-                <a:hlinkClick r:id="rId4"/>
+                <a:hlinkClick r:id="rId5"/>
               </a:rPr>
-              <a:t>https://docs.microsoft.com/azure/key-vault/vs-key-vault-add-connected-service</a:t>
+              <a:t>aka.ms/az-key-vault</a:t>
             </a:r>
             <a:endParaRPr lang="en-US" dirty="0"/>
           </a:p>
@@ -10323,7 +12721,7 @@
                                         <p:tgtEl>
                                           <p:spTgt spid="3">
                                             <p:txEl>
-                                              <p:pRg st="1" end="1"/>
+                                              <p:pRg st="0" end="0"/>
                                             </p:txEl>
                                           </p:spTgt>
                                         </p:tgtEl>
@@ -10338,67 +12736,6 @@
                                     <p:animEffect transition="in" filter="fade">
                                       <p:cBhvr>
                                         <p:cTn id="7" dur="500"/>
-                                        <p:tgtEl>
-                                          <p:spTgt spid="3">
-                                            <p:txEl>
-                                              <p:pRg st="1" end="1"/>
-                                            </p:txEl>
-                                          </p:spTgt>
-                                        </p:tgtEl>
-                                      </p:cBhvr>
-                                    </p:animEffect>
-                                  </p:childTnLst>
-                                </p:cTn>
-                              </p:par>
-                            </p:childTnLst>
-                          </p:cTn>
-                        </p:par>
-                      </p:childTnLst>
-                    </p:cTn>
-                  </p:par>
-                  <p:par>
-                    <p:cTn id="8" fill="hold">
-                      <p:stCondLst>
-                        <p:cond delay="indefinite"/>
-                      </p:stCondLst>
-                      <p:childTnLst>
-                        <p:par>
-                          <p:cTn id="9" fill="hold">
-                            <p:stCondLst>
-                              <p:cond delay="0"/>
-                            </p:stCondLst>
-                            <p:childTnLst>
-                              <p:par>
-                                <p:cTn id="10" presetID="10" presetClass="entr" presetSubtype="0" fill="hold" nodeType="clickEffect">
-                                  <p:stCondLst>
-                                    <p:cond delay="0"/>
-                                  </p:stCondLst>
-                                  <p:childTnLst>
-                                    <p:set>
-                                      <p:cBhvr>
-                                        <p:cTn id="11" dur="1" fill="hold">
-                                          <p:stCondLst>
-                                            <p:cond delay="0"/>
-                                          </p:stCondLst>
-                                        </p:cTn>
-                                        <p:tgtEl>
-                                          <p:spTgt spid="3">
-                                            <p:txEl>
-                                              <p:pRg st="0" end="0"/>
-                                            </p:txEl>
-                                          </p:spTgt>
-                                        </p:tgtEl>
-                                        <p:attrNameLst>
-                                          <p:attrName>style.visibility</p:attrName>
-                                        </p:attrNameLst>
-                                      </p:cBhvr>
-                                      <p:to>
-                                        <p:strVal val="visible"/>
-                                      </p:to>
-                                    </p:set>
-                                    <p:animEffect transition="in" filter="fade">
-                                      <p:cBhvr>
-                                        <p:cTn id="12" dur="500"/>
                                         <p:tgtEl>
                                           <p:spTgt spid="3">
                                             <p:txEl>
@@ -13601,15 +15938,21 @@
             <p:ph type="title"/>
           </p:nvPr>
         </p:nvSpPr>
-        <p:spPr/>
+        <p:spPr>
+          <a:xfrm>
+            <a:off x="838200" y="365125"/>
+            <a:ext cx="10515600" cy="1325563"/>
+          </a:xfrm>
+        </p:spPr>
         <p:txBody>
           <a:bodyPr/>
           <a:lstStyle/>
           <a:p>
             <a:r>
-              <a:rPr lang="en-US" dirty="0"/>
+              <a:rPr lang="en-US"/>
               <a:t>Secret Manager</a:t>
             </a:r>
+            <a:endParaRPr lang="en-US" dirty="0"/>
           </a:p>
         </p:txBody>
       </p:sp>
@@ -13623,7 +15966,12 @@
             <p:ph idx="1"/>
           </p:nvPr>
         </p:nvSpPr>
-        <p:spPr/>
+        <p:spPr>
+          <a:xfrm>
+            <a:off x="838200" y="1825625"/>
+            <a:ext cx="10515600" cy="4351338"/>
+          </a:xfrm>
+        </p:spPr>
         <p:txBody>
           <a:bodyPr>
             <a:normAutofit fontScale="92500" lnSpcReduction="10000"/>
@@ -13634,7 +15982,7 @@
               <a:buNone/>
             </a:pPr>
             <a:r>
-              <a:rPr lang="en-US" dirty="0">
+              <a:rPr lang="en-US" b="1" dirty="0">
                 <a:solidFill>
                   <a:schemeClr val="accent4"/>
                 </a:solidFill>
@@ -13677,7 +16025,7 @@
               <a:buNone/>
             </a:pPr>
             <a:r>
-              <a:rPr lang="en-US" dirty="0">
+              <a:rPr lang="en-US" b="1" dirty="0">
                 <a:solidFill>
                   <a:schemeClr val="accent4"/>
                 </a:solidFill>
@@ -16575,28 +18923,6 @@
           </a:p>
         </p:txBody>
       </p:sp>
-      <p:sp>
-        <p:nvSpPr>
-          <p:cNvPr id="3" name="Content Placeholder 2"/>
-          <p:cNvSpPr>
-            <a:spLocks noGrp="1"/>
-          </p:cNvSpPr>
-          <p:nvPr>
-            <p:ph idx="1"/>
-          </p:nvPr>
-        </p:nvSpPr>
-        <p:spPr/>
-        <p:txBody>
-          <a:bodyPr/>
-          <a:lstStyle/>
-          <a:p>
-            <a:pPr marL="0" indent="0">
-              <a:buNone/>
-            </a:pPr>
-            <a:endParaRPr lang="en-US" dirty="0"/>
-          </a:p>
-        </p:txBody>
-      </p:sp>
       <p:graphicFrame>
         <p:nvGraphicFramePr>
           <p:cNvPr id="4" name="Table 3">
@@ -16612,14 +18938,14 @@
           <p:nvPr>
             <p:extLst>
               <p:ext uri="{D42A27DB-BD31-4B8C-83A1-F6EECF244321}">
-                <p14:modId xmlns:p14="http://schemas.microsoft.com/office/powerpoint/2010/main" val="3139221817"/>
+                <p14:modId xmlns:p14="http://schemas.microsoft.com/office/powerpoint/2010/main" val="2112485447"/>
               </p:ext>
             </p:extLst>
           </p:nvPr>
         </p:nvGraphicFramePr>
         <p:xfrm>
-          <a:off x="844462" y="1920875"/>
-          <a:ext cx="9165812" cy="4849684"/>
+          <a:off x="844462" y="1920876"/>
+          <a:ext cx="9165812" cy="4328160"/>
         </p:xfrm>
         <a:graphic>
           <a:graphicData uri="http://schemas.openxmlformats.org/drawingml/2006/table">
@@ -16634,7 +18960,7 @@
                   </a:extLst>
                 </a:gridCol>
               </a:tblGrid>
-              <a:tr h="4483924">
+              <a:tr h="3800574">
                 <a:tc>
                   <a:txBody>
                     <a:bodyPr/>
@@ -16714,7 +19040,7 @@
                     </a:lstStyle>
                     <a:p>
                       <a:r>
-                        <a:rPr lang="en-US" sz="1800" dirty="0">
+                        <a:rPr lang="en-US" sz="1600" dirty="0">
                           <a:solidFill>
                             <a:srgbClr val="0000FF"/>
                           </a:solidFill>
@@ -16723,7 +19049,7 @@
                         <a:t>public</a:t>
                       </a:r>
                       <a:r>
-                        <a:rPr lang="en-US" sz="1800" dirty="0">
+                        <a:rPr lang="en-US" sz="1600" dirty="0">
                           <a:solidFill>
                             <a:srgbClr val="000000"/>
                           </a:solidFill>
@@ -16732,7 +19058,7 @@
                         <a:t> </a:t>
                       </a:r>
                       <a:r>
-                        <a:rPr lang="en-US" sz="1800" dirty="0">
+                        <a:rPr lang="en-US" sz="1600" dirty="0">
                           <a:solidFill>
                             <a:srgbClr val="0000FF"/>
                           </a:solidFill>
@@ -16741,7 +19067,7 @@
                         <a:t>class</a:t>
                       </a:r>
                       <a:r>
-                        <a:rPr lang="en-US" sz="1800" dirty="0">
+                        <a:rPr lang="en-US" sz="1600" dirty="0">
                           <a:solidFill>
                             <a:srgbClr val="000000"/>
                           </a:solidFill>
@@ -16750,7 +19076,7 @@
                         <a:t> </a:t>
                       </a:r>
                       <a:r>
-                        <a:rPr lang="en-US" sz="1800" dirty="0">
+                        <a:rPr lang="en-US" sz="1600" dirty="0">
                           <a:solidFill>
                             <a:srgbClr val="2B91AF"/>
                           </a:solidFill>
@@ -16758,7 +19084,7 @@
                         </a:rPr>
                         <a:t>Startup</a:t>
                       </a:r>
-                      <a:endParaRPr lang="en-US" sz="1800" dirty="0">
+                      <a:endParaRPr lang="en-US" sz="1600" dirty="0">
                         <a:solidFill>
                           <a:srgbClr val="000000"/>
                         </a:solidFill>
@@ -16767,7 +19093,7 @@
                     </a:p>
                     <a:p>
                       <a:r>
-                        <a:rPr lang="en-US" sz="1800" dirty="0">
+                        <a:rPr lang="en-US" sz="1600" dirty="0">
                           <a:solidFill>
                             <a:srgbClr val="000000"/>
                           </a:solidFill>
@@ -16778,7 +19104,7 @@
                     </a:p>
                     <a:p>
                       <a:r>
-                        <a:rPr lang="en-US" sz="1800" dirty="0">
+                        <a:rPr lang="en-US" sz="1600" dirty="0">
                           <a:solidFill>
                             <a:srgbClr val="000000"/>
                           </a:solidFill>
@@ -16787,7 +19113,7 @@
                         <a:t>    </a:t>
                       </a:r>
                       <a:r>
-                        <a:rPr lang="en-US" sz="1800" dirty="0">
+                        <a:rPr lang="en-US" sz="1600" dirty="0">
                           <a:solidFill>
                             <a:srgbClr val="0000FF"/>
                           </a:solidFill>
@@ -16796,7 +19122,7 @@
                         <a:t>private</a:t>
                       </a:r>
                       <a:r>
-                        <a:rPr lang="en-US" sz="1800" dirty="0">
+                        <a:rPr lang="en-US" sz="1600" dirty="0">
                           <a:solidFill>
                             <a:srgbClr val="000000"/>
                           </a:solidFill>
@@ -16805,7 +19131,7 @@
                         <a:t> </a:t>
                       </a:r>
                       <a:r>
-                        <a:rPr lang="en-US" sz="1800" dirty="0">
+                        <a:rPr lang="en-US" sz="1600" dirty="0">
                           <a:solidFill>
                             <a:srgbClr val="0000FF"/>
                           </a:solidFill>
@@ -16814,7 +19140,7 @@
                         <a:t>string</a:t>
                       </a:r>
                       <a:r>
-                        <a:rPr lang="en-US" sz="1800" dirty="0">
+                        <a:rPr lang="en-US" sz="1600" dirty="0">
                           <a:solidFill>
                             <a:srgbClr val="000000"/>
                           </a:solidFill>
@@ -16823,7 +19149,7 @@
                         <a:t> _connection = </a:t>
                       </a:r>
                       <a:r>
-                        <a:rPr lang="en-US" sz="1800" dirty="0">
+                        <a:rPr lang="en-US" sz="1600" dirty="0">
                           <a:solidFill>
                             <a:srgbClr val="0000FF"/>
                           </a:solidFill>
@@ -16832,7 +19158,7 @@
                         <a:t>null</a:t>
                       </a:r>
                       <a:r>
-                        <a:rPr lang="en-US" sz="1800" dirty="0">
+                        <a:rPr lang="en-US" sz="1600" dirty="0">
                           <a:solidFill>
                             <a:srgbClr val="000000"/>
                           </a:solidFill>
@@ -16842,7 +19168,7 @@
                       </a:r>
                     </a:p>
                     <a:p>
-                      <a:endParaRPr lang="en-US" sz="1800" dirty="0">
+                      <a:endParaRPr lang="en-US" sz="1600" dirty="0">
                         <a:solidFill>
                           <a:srgbClr val="000000"/>
                         </a:solidFill>
@@ -16851,7 +19177,7 @@
                     </a:p>
                     <a:p>
                       <a:r>
-                        <a:rPr lang="en-US" sz="1800" dirty="0">
+                        <a:rPr lang="en-US" sz="1600" dirty="0">
                           <a:solidFill>
                             <a:srgbClr val="000000"/>
                           </a:solidFill>
@@ -16860,7 +19186,7 @@
                         <a:t>    </a:t>
                       </a:r>
                       <a:r>
-                        <a:rPr lang="en-US" sz="1800" dirty="0">
+                        <a:rPr lang="en-US" sz="1600" dirty="0">
                           <a:solidFill>
                             <a:srgbClr val="0000FF"/>
                           </a:solidFill>
@@ -16869,7 +19195,7 @@
                         <a:t>public</a:t>
                       </a:r>
                       <a:r>
-                        <a:rPr lang="en-US" sz="1800" dirty="0">
+                        <a:rPr lang="en-US" sz="1600" dirty="0">
                           <a:solidFill>
                             <a:srgbClr val="000000"/>
                           </a:solidFill>
@@ -16878,7 +19204,7 @@
                         <a:t> Startup(</a:t>
                       </a:r>
                       <a:r>
-                        <a:rPr lang="en-US" sz="1800" dirty="0" err="1">
+                        <a:rPr lang="en-US" sz="1600" dirty="0" err="1">
                           <a:solidFill>
                             <a:srgbClr val="000000"/>
                           </a:solidFill>
@@ -16887,7 +19213,7 @@
                         <a:t>IConfiguration</a:t>
                       </a:r>
                       <a:r>
-                        <a:rPr lang="en-US" sz="1800" dirty="0">
+                        <a:rPr lang="en-US" sz="1600" dirty="0">
                           <a:solidFill>
                             <a:srgbClr val="000000"/>
                           </a:solidFill>
@@ -16898,7 +19224,7 @@
                     </a:p>
                     <a:p>
                       <a:r>
-                        <a:rPr lang="en-US" sz="1800" dirty="0">
+                        <a:rPr lang="en-US" sz="1600" dirty="0">
                           <a:solidFill>
                             <a:srgbClr val="000000"/>
                           </a:solidFill>
@@ -16908,7 +19234,7 @@
                       </a:r>
                     </a:p>
                     <a:p>
-                      <a:endParaRPr lang="en-US" sz="1800" dirty="0">
+                      <a:endParaRPr lang="en-US" sz="1600" dirty="0">
                         <a:solidFill>
                           <a:srgbClr val="000000"/>
                         </a:solidFill>
@@ -16917,7 +19243,7 @@
                     </a:p>
                     <a:p>
                       <a:r>
-                        <a:rPr lang="en-US" sz="1800" dirty="0">
+                        <a:rPr lang="en-US" sz="1600" dirty="0">
                           <a:solidFill>
                             <a:srgbClr val="000000"/>
                           </a:solidFill>
@@ -16926,7 +19252,7 @@
                         <a:t>    </a:t>
                       </a:r>
                       <a:r>
-                        <a:rPr lang="en-US" sz="1800" dirty="0">
+                        <a:rPr lang="en-US" sz="1600" dirty="0">
                           <a:solidFill>
                             <a:srgbClr val="0000FF"/>
                           </a:solidFill>
@@ -16935,7 +19261,7 @@
                         <a:t>public</a:t>
                       </a:r>
                       <a:r>
-                        <a:rPr lang="en-US" sz="1800" dirty="0">
+                        <a:rPr lang="en-US" sz="1600" dirty="0">
                           <a:solidFill>
                             <a:srgbClr val="000000"/>
                           </a:solidFill>
@@ -16944,7 +19270,7 @@
                         <a:t> </a:t>
                       </a:r>
                       <a:r>
-                        <a:rPr lang="en-US" sz="1800" dirty="0" err="1">
+                        <a:rPr lang="en-US" sz="1600" dirty="0" err="1">
                           <a:solidFill>
                             <a:srgbClr val="000000"/>
                           </a:solidFill>
@@ -16953,7 +19279,7 @@
                         <a:t>IConfiguration</a:t>
                       </a:r>
                       <a:r>
-                        <a:rPr lang="en-US" sz="1800" dirty="0">
+                        <a:rPr lang="en-US" sz="1600" dirty="0">
                           <a:solidFill>
                             <a:srgbClr val="000000"/>
                           </a:solidFill>
@@ -16962,7 +19288,7 @@
                         <a:t> Configuration { </a:t>
                       </a:r>
                       <a:r>
-                        <a:rPr lang="en-US" sz="1800" dirty="0">
+                        <a:rPr lang="en-US" sz="1600" dirty="0">
                           <a:solidFill>
                             <a:srgbClr val="0000FF"/>
                           </a:solidFill>
@@ -16971,7 +19297,7 @@
                         <a:t>get</a:t>
                       </a:r>
                       <a:r>
-                        <a:rPr lang="en-US" sz="1800" dirty="0">
+                        <a:rPr lang="en-US" sz="1600" dirty="0">
                           <a:solidFill>
                             <a:srgbClr val="000000"/>
                           </a:solidFill>
@@ -16981,7 +19307,7 @@
                       </a:r>
                     </a:p>
                     <a:p>
-                      <a:endParaRPr lang="en-US" sz="1800" dirty="0">
+                      <a:endParaRPr lang="en-US" sz="1600" dirty="0">
                         <a:solidFill>
                           <a:srgbClr val="000000"/>
                         </a:solidFill>
@@ -16990,7 +19316,7 @@
                     </a:p>
                     <a:p>
                       <a:r>
-                        <a:rPr lang="en-US" sz="1800" dirty="0">
+                        <a:rPr lang="en-US" sz="1600" dirty="0">
                           <a:solidFill>
                             <a:srgbClr val="000000"/>
                           </a:solidFill>
@@ -16999,7 +19325,7 @@
                         <a:t>    </a:t>
                       </a:r>
                       <a:r>
-                        <a:rPr lang="en-US" sz="1800" dirty="0">
+                        <a:rPr lang="en-US" sz="1600" dirty="0">
                           <a:solidFill>
                             <a:srgbClr val="0000FF"/>
                           </a:solidFill>
@@ -17008,7 +19334,7 @@
                         <a:t>public</a:t>
                       </a:r>
                       <a:r>
-                        <a:rPr lang="en-US" sz="1800" dirty="0">
+                        <a:rPr lang="en-US" sz="1600" dirty="0">
                           <a:solidFill>
                             <a:srgbClr val="000000"/>
                           </a:solidFill>
@@ -17017,7 +19343,7 @@
                         <a:t> </a:t>
                       </a:r>
                       <a:r>
-                        <a:rPr lang="en-US" sz="1800" dirty="0">
+                        <a:rPr lang="en-US" sz="1600" dirty="0">
                           <a:solidFill>
                             <a:srgbClr val="0000FF"/>
                           </a:solidFill>
@@ -17026,7 +19352,7 @@
                         <a:t>void</a:t>
                       </a:r>
                       <a:r>
-                        <a:rPr lang="en-US" sz="1800" dirty="0">
+                        <a:rPr lang="en-US" sz="1600" dirty="0">
                           <a:solidFill>
                             <a:srgbClr val="000000"/>
                           </a:solidFill>
@@ -17035,7 +19361,7 @@
                         <a:t> </a:t>
                       </a:r>
                       <a:r>
-                        <a:rPr lang="en-US" sz="1800" dirty="0" err="1">
+                        <a:rPr lang="en-US" sz="1600" dirty="0" err="1">
                           <a:solidFill>
                             <a:srgbClr val="000000"/>
                           </a:solidFill>
@@ -17044,7 +19370,7 @@
                         <a:t>ConfigureServices</a:t>
                       </a:r>
                       <a:r>
-                        <a:rPr lang="en-US" sz="1800" dirty="0">
+                        <a:rPr lang="en-US" sz="1600" dirty="0">
                           <a:solidFill>
                             <a:srgbClr val="000000"/>
                           </a:solidFill>
@@ -17053,7 +19379,7 @@
                         <a:t>(</a:t>
                       </a:r>
                       <a:r>
-                        <a:rPr lang="en-US" sz="1800" dirty="0" err="1">
+                        <a:rPr lang="en-US" sz="1600" dirty="0" err="1">
                           <a:solidFill>
                             <a:srgbClr val="000000"/>
                           </a:solidFill>
@@ -17062,7 +19388,7 @@
                         <a:t>IServiceCollection</a:t>
                       </a:r>
                       <a:r>
-                        <a:rPr lang="en-US" sz="1800" dirty="0">
+                        <a:rPr lang="en-US" sz="1600" dirty="0">
                           <a:solidFill>
                             <a:srgbClr val="000000"/>
                           </a:solidFill>
@@ -17073,7 +19399,7 @@
                     </a:p>
                     <a:p>
                       <a:r>
-                        <a:rPr lang="en-US" sz="1800" dirty="0">
+                        <a:rPr lang="en-US" sz="1600" dirty="0">
                           <a:solidFill>
                             <a:srgbClr val="000000"/>
                           </a:solidFill>
@@ -17084,7 +19410,7 @@
                     </a:p>
                     <a:p>
                       <a:r>
-                        <a:rPr lang="en-US" sz="1800" dirty="0">
+                        <a:rPr lang="en-US" sz="1600" dirty="0">
                           <a:solidFill>
                             <a:srgbClr val="000000"/>
                           </a:solidFill>
@@ -17093,7 +19419,7 @@
                         <a:t>        </a:t>
                       </a:r>
                       <a:r>
-                        <a:rPr lang="en-US" sz="1800" dirty="0">
+                        <a:rPr lang="en-US" sz="1600" dirty="0">
                           <a:solidFill>
                             <a:srgbClr val="0000FF"/>
                           </a:solidFill>
@@ -17102,7 +19428,7 @@
                         <a:t>var</a:t>
                       </a:r>
                       <a:r>
-                        <a:rPr lang="en-US" sz="1800" dirty="0">
+                        <a:rPr lang="en-US" sz="1600" dirty="0">
                           <a:solidFill>
                             <a:srgbClr val="000000"/>
                           </a:solidFill>
@@ -17111,7 +19437,7 @@
                         <a:t> builder = </a:t>
                       </a:r>
                       <a:r>
-                        <a:rPr lang="en-US" sz="1800" dirty="0">
+                        <a:rPr lang="en-US" sz="1600" dirty="0">
                           <a:solidFill>
                             <a:srgbClr val="0000FF"/>
                           </a:solidFill>
@@ -17120,7 +19446,7 @@
                         <a:t>new</a:t>
                       </a:r>
                       <a:r>
-                        <a:rPr lang="en-US" sz="1800" dirty="0">
+                        <a:rPr lang="en-US" sz="1600" dirty="0">
                           <a:solidFill>
                             <a:srgbClr val="000000"/>
                           </a:solidFill>
@@ -17129,7 +19455,7 @@
                         <a:t> </a:t>
                       </a:r>
                       <a:r>
-                        <a:rPr lang="en-US" sz="1800" dirty="0" err="1">
+                        <a:rPr lang="en-US" sz="1600" dirty="0" err="1">
                           <a:solidFill>
                             <a:srgbClr val="000000"/>
                           </a:solidFill>
@@ -17138,7 +19464,7 @@
                         <a:t>SqlConnectionStringBuilder</a:t>
                       </a:r>
                       <a:r>
-                        <a:rPr lang="en-US" sz="1800" dirty="0">
+                        <a:rPr lang="en-US" sz="1600" dirty="0">
                           <a:solidFill>
                             <a:srgbClr val="000000"/>
                           </a:solidFill>
@@ -17149,7 +19475,7 @@
                     </a:p>
                     <a:p>
                       <a:r>
-                        <a:rPr lang="en-US" sz="1800" dirty="0">
+                        <a:rPr lang="en-US" sz="1600" dirty="0">
                           <a:solidFill>
                             <a:srgbClr val="000000"/>
                           </a:solidFill>
@@ -17158,7 +19484,7 @@
                         <a:t>            </a:t>
                       </a:r>
                       <a:r>
-                        <a:rPr lang="en-US" sz="1800" dirty="0" err="1">
+                        <a:rPr lang="en-US" sz="1600" dirty="0" err="1">
                           <a:solidFill>
                             <a:srgbClr val="000000"/>
                           </a:solidFill>
@@ -17167,7 +19493,7 @@
                         <a:t>Configuration.GetConnectionString</a:t>
                       </a:r>
                       <a:r>
-                        <a:rPr lang="en-US" sz="1800" dirty="0">
+                        <a:rPr lang="en-US" sz="1600" dirty="0">
                           <a:solidFill>
                             <a:srgbClr val="000000"/>
                           </a:solidFill>
@@ -17176,7 +19502,7 @@
                         <a:t>(</a:t>
                       </a:r>
                       <a:r>
-                        <a:rPr lang="en-US" sz="1800" dirty="0">
+                        <a:rPr lang="en-US" sz="1600" dirty="0">
                           <a:solidFill>
                             <a:srgbClr val="A31515"/>
                           </a:solidFill>
@@ -17185,7 +19511,7 @@
                         <a:t>"Movies"</a:t>
                       </a:r>
                       <a:r>
-                        <a:rPr lang="en-US" sz="1800" dirty="0">
+                        <a:rPr lang="en-US" sz="1600" dirty="0">
                           <a:solidFill>
                             <a:srgbClr val="000000"/>
                           </a:solidFill>
@@ -17196,7 +19522,7 @@
                     </a:p>
                     <a:p>
                       <a:r>
-                        <a:rPr lang="en-US" sz="1800" dirty="0">
+                        <a:rPr lang="en-US" sz="1600" dirty="0">
                           <a:solidFill>
                             <a:srgbClr val="000000"/>
                           </a:solidFill>
@@ -17205,7 +19531,7 @@
                         <a:t>        </a:t>
                       </a:r>
                       <a:r>
-                        <a:rPr lang="en-US" sz="1800" dirty="0" err="1">
+                        <a:rPr lang="en-US" sz="1600" dirty="0" err="1">
                           <a:solidFill>
                             <a:srgbClr val="000000"/>
                           </a:solidFill>
@@ -17214,7 +19540,7 @@
                         <a:t>builder.UserID</a:t>
                       </a:r>
                       <a:r>
-                        <a:rPr lang="en-US" sz="1800" dirty="0">
+                        <a:rPr lang="en-US" sz="1600" dirty="0">
                           <a:solidFill>
                             <a:srgbClr val="000000"/>
                           </a:solidFill>
@@ -17223,7 +19549,7 @@
                         <a:t> = Configuration[</a:t>
                       </a:r>
                       <a:r>
-                        <a:rPr lang="en-US" sz="1800" dirty="0">
+                        <a:rPr lang="en-US" sz="1600" dirty="0">
                           <a:solidFill>
                             <a:srgbClr val="A31515"/>
                           </a:solidFill>
@@ -17232,7 +19558,7 @@
                         <a:t>"</a:t>
                       </a:r>
                       <a:r>
-                        <a:rPr lang="en-US" sz="1800" dirty="0" err="1">
+                        <a:rPr lang="en-US" sz="1600" dirty="0" err="1">
                           <a:solidFill>
                             <a:srgbClr val="A31515"/>
                           </a:solidFill>
@@ -17241,7 +19567,7 @@
                         <a:t>Movies:User</a:t>
                       </a:r>
                       <a:r>
-                        <a:rPr lang="en-US" sz="1800" dirty="0">
+                        <a:rPr lang="en-US" sz="1600" dirty="0">
                           <a:solidFill>
                             <a:srgbClr val="A31515"/>
                           </a:solidFill>
@@ -17250,7 +19576,7 @@
                         <a:t>"</a:t>
                       </a:r>
                       <a:r>
-                        <a:rPr lang="en-US" sz="1800" dirty="0">
+                        <a:rPr lang="en-US" sz="1600" dirty="0">
                           <a:solidFill>
                             <a:srgbClr val="000000"/>
                           </a:solidFill>
@@ -17261,7 +19587,7 @@
                     </a:p>
                     <a:p>
                       <a:r>
-                        <a:rPr lang="en-US" sz="1800" dirty="0">
+                        <a:rPr lang="en-US" sz="1600" dirty="0">
                           <a:solidFill>
                             <a:srgbClr val="000000"/>
                           </a:solidFill>
@@ -17270,7 +19596,7 @@
                         <a:t>        </a:t>
                       </a:r>
                       <a:r>
-                        <a:rPr lang="en-US" sz="1800" dirty="0" err="1">
+                        <a:rPr lang="en-US" sz="1600" dirty="0" err="1">
                           <a:solidFill>
                             <a:srgbClr val="000000"/>
                           </a:solidFill>
@@ -17279,7 +19605,7 @@
                         <a:t>builder.Password</a:t>
                       </a:r>
                       <a:r>
-                        <a:rPr lang="en-US" sz="1800" dirty="0">
+                        <a:rPr lang="en-US" sz="1600" dirty="0">
                           <a:solidFill>
                             <a:srgbClr val="000000"/>
                           </a:solidFill>
@@ -17288,7 +19614,7 @@
                         <a:t> = Configuration[</a:t>
                       </a:r>
                       <a:r>
-                        <a:rPr lang="en-US" sz="1800" dirty="0">
+                        <a:rPr lang="en-US" sz="1600" dirty="0">
                           <a:solidFill>
                             <a:srgbClr val="A31515"/>
                           </a:solidFill>
@@ -17297,7 +19623,7 @@
                         <a:t>"</a:t>
                       </a:r>
                       <a:r>
-                        <a:rPr lang="en-US" sz="1800" dirty="0" err="1">
+                        <a:rPr lang="en-US" sz="1600" dirty="0" err="1">
                           <a:solidFill>
                             <a:srgbClr val="A31515"/>
                           </a:solidFill>
@@ -17306,7 +19632,7 @@
                         <a:t>Movies:Password</a:t>
                       </a:r>
                       <a:r>
-                        <a:rPr lang="en-US" sz="1800" dirty="0">
+                        <a:rPr lang="en-US" sz="1600" dirty="0">
                           <a:solidFill>
                             <a:srgbClr val="A31515"/>
                           </a:solidFill>
@@ -17315,7 +19641,7 @@
                         <a:t>"</a:t>
                       </a:r>
                       <a:r>
-                        <a:rPr lang="en-US" sz="1800" dirty="0">
+                        <a:rPr lang="en-US" sz="1600" dirty="0">
                           <a:solidFill>
                             <a:srgbClr val="000000"/>
                           </a:solidFill>
@@ -17326,7 +19652,7 @@
                     </a:p>
                     <a:p>
                       <a:r>
-                        <a:rPr lang="en-US" sz="1800" dirty="0">
+                        <a:rPr lang="en-US" sz="1600" dirty="0">
                           <a:solidFill>
                             <a:srgbClr val="000000"/>
                           </a:solidFill>
@@ -17335,7 +19661,7 @@
                         <a:t>        _connection = </a:t>
                       </a:r>
                       <a:r>
-                        <a:rPr lang="en-US" sz="1800" dirty="0" err="1">
+                        <a:rPr lang="en-US" sz="1600" dirty="0" err="1">
                           <a:solidFill>
                             <a:srgbClr val="000000"/>
                           </a:solidFill>
@@ -17344,7 +19670,7 @@
                         <a:t>builder.ConnectionString</a:t>
                       </a:r>
                       <a:r>
-                        <a:rPr lang="en-US" sz="1800">
+                        <a:rPr lang="en-US" sz="1600" dirty="0">
                           <a:solidFill>
                             <a:srgbClr val="000000"/>
                           </a:solidFill>
@@ -17352,12 +19678,6 @@
                         </a:rPr>
                         <a:t>;</a:t>
                       </a:r>
-                      <a:endParaRPr lang="en-US" sz="1800" dirty="0">
-                        <a:solidFill>
-                          <a:srgbClr val="000000"/>
-                        </a:solidFill>
-                        <a:latin typeface="Consolas" panose="020B0609020204030204" pitchFamily="49" charset="0"/>
-                      </a:endParaRPr>
                     </a:p>
                   </a:txBody>
                   <a:tcPr>
@@ -17416,13 +19736,13 @@
                   </a:ext>
                 </a:extLst>
               </a:tr>
-              <a:tr h="344917">
+              <a:tr h="319132">
                 <a:tc>
                   <a:txBody>
                     <a:bodyPr/>
                     <a:lstStyle/>
                     <a:p>
-                      <a:endParaRPr lang="en-US" sz="1800" dirty="0">
+                      <a:endParaRPr lang="en-US" sz="1600" dirty="0">
                         <a:solidFill>
                           <a:srgbClr val="000000"/>
                         </a:solidFill>
@@ -17592,6 +19912,61 @@
           </a:p>
         </p:txBody>
       </p:sp>
+      <p:sp>
+        <p:nvSpPr>
+          <p:cNvPr id="6" name="Content Placeholder 5">
+            <a:extLst>
+              <a:ext uri="{FF2B5EF4-FFF2-40B4-BE49-F238E27FC236}">
+                <a16:creationId xmlns:a16="http://schemas.microsoft.com/office/drawing/2014/main" id="{E5A9F2D8-89AD-4C13-B6B2-AF06F5805B64}"/>
+              </a:ext>
+            </a:extLst>
+          </p:cNvPr>
+          <p:cNvSpPr>
+            <a:spLocks noGrp="1"/>
+          </p:cNvSpPr>
+          <p:nvPr>
+            <p:ph idx="1"/>
+          </p:nvPr>
+        </p:nvSpPr>
+        <p:spPr>
+          <a:xfrm>
+            <a:off x="1745673" y="5135418"/>
+            <a:ext cx="5902036" cy="517238"/>
+          </a:xfrm>
+          <a:prstGeom prst="rect">
+            <a:avLst/>
+          </a:prstGeom>
+          <a:noFill/>
+          <a:ln w="38100">
+            <a:solidFill>
+              <a:schemeClr val="accent1"/>
+            </a:solidFill>
+          </a:ln>
+        </p:spPr>
+        <p:style>
+          <a:lnRef idx="2">
+            <a:schemeClr val="accent1">
+              <a:shade val="50000"/>
+            </a:schemeClr>
+          </a:lnRef>
+          <a:fillRef idx="1">
+            <a:schemeClr val="accent1"/>
+          </a:fillRef>
+          <a:effectRef idx="0">
+            <a:schemeClr val="accent1"/>
+          </a:effectRef>
+          <a:fontRef idx="minor">
+            <a:schemeClr val="lt1"/>
+          </a:fontRef>
+        </p:style>
+        <p:txBody>
+          <a:bodyPr rtlCol="0" anchor="ctr"/>
+          <a:lstStyle/>
+          <a:p>
+            <a:endParaRPr lang="en-US" dirty="0"/>
+          </a:p>
+        </p:txBody>
+      </p:sp>
     </p:spTree>
     <p:extLst>
       <p:ext uri="{BB962C8B-B14F-4D97-AF65-F5344CB8AC3E}">
@@ -17614,6 +19989,9 @@
                     <p:cTn id="3" fill="hold">
                       <p:stCondLst>
                         <p:cond delay="indefinite"/>
+                        <p:cond evt="onBegin" delay="0">
+                          <p:tn val="2"/>
+                        </p:cond>
                       </p:stCondLst>
                       <p:childTnLst>
                         <p:par>
@@ -17623,62 +20001,14 @@
                             </p:stCondLst>
                             <p:childTnLst>
                               <p:par>
-                                <p:cTn id="5" presetID="10" presetClass="entr" presetSubtype="0" fill="hold" nodeType="clickEffect" nodePh="1">
-                                  <p:stCondLst>
-                                    <p:cond delay="0"/>
-                                  </p:stCondLst>
-                                  <p:endCondLst>
-                                    <p:cond evt="begin" delay="0">
-                                      <p:tn val="5"/>
-                                    </p:cond>
-                                  </p:endCondLst>
-                                  <p:childTnLst>
-                                    <p:set>
-                                      <p:cBhvr>
-                                        <p:cTn id="6" dur="1" fill="hold">
-                                          <p:stCondLst>
-                                            <p:cond delay="0"/>
-                                          </p:stCondLst>
-                                        </p:cTn>
-                                        <p:tgtEl>
-                                          <p:spTgt spid="3">
-                                            <p:txEl>
-                                              <p:pRg st="0" end="0"/>
-                                            </p:txEl>
-                                          </p:spTgt>
-                                        </p:tgtEl>
-                                        <p:attrNameLst>
-                                          <p:attrName>style.visibility</p:attrName>
-                                        </p:attrNameLst>
-                                      </p:cBhvr>
-                                      <p:to>
-                                        <p:strVal val="visible"/>
-                                      </p:to>
-                                    </p:set>
-                                    <p:animEffect transition="in" filter="fade">
-                                      <p:cBhvr>
-                                        <p:cTn id="7" dur="500"/>
-                                        <p:tgtEl>
-                                          <p:spTgt spid="3">
-                                            <p:txEl>
-                                              <p:pRg st="0" end="0"/>
-                                            </p:txEl>
-                                          </p:spTgt>
-                                        </p:tgtEl>
-                                      </p:cBhvr>
-                                    </p:animEffect>
-                                  </p:childTnLst>
-                                </p:cTn>
-                              </p:par>
-                              <p:par>
-                                <p:cTn id="8" presetID="10" presetClass="entr" presetSubtype="0" fill="hold" grpId="0" nodeType="withEffect">
+                                <p:cTn id="5" presetID="10" presetClass="entr" presetSubtype="0" fill="hold" grpId="0" nodeType="withEffect">
                                   <p:stCondLst>
                                     <p:cond delay="0"/>
                                   </p:stCondLst>
                                   <p:childTnLst>
                                     <p:set>
                                       <p:cBhvr>
-                                        <p:cTn id="9" dur="1" fill="hold">
+                                        <p:cTn id="6" dur="1" fill="hold">
                                           <p:stCondLst>
                                             <p:cond delay="0"/>
                                           </p:stCondLst>
@@ -17696,7 +20026,7 @@
                                     </p:set>
                                     <p:animEffect transition="in" filter="fade">
                                       <p:cBhvr>
-                                        <p:cTn id="10" dur="500"/>
+                                        <p:cTn id="7" dur="500"/>
                                         <p:tgtEl>
                                           <p:spTgt spid="5"/>
                                         </p:tgtEl>
@@ -17706,14 +20036,14 @@
                                 </p:cTn>
                               </p:par>
                               <p:par>
-                                <p:cTn id="11" presetID="10" presetClass="entr" presetSubtype="0" fill="hold" nodeType="withEffect">
+                                <p:cTn id="8" presetID="10" presetClass="entr" presetSubtype="0" fill="hold" nodeType="withEffect">
                                   <p:stCondLst>
                                     <p:cond delay="0"/>
                                   </p:stCondLst>
                                   <p:childTnLst>
                                     <p:set>
                                       <p:cBhvr>
-                                        <p:cTn id="12" dur="1" fill="hold">
+                                        <p:cTn id="9" dur="1" fill="hold">
                                           <p:stCondLst>
                                             <p:cond delay="0"/>
                                           </p:stCondLst>
@@ -17731,9 +20061,44 @@
                                     </p:set>
                                     <p:animEffect transition="in" filter="fade">
                                       <p:cBhvr>
+                                        <p:cTn id="10" dur="500"/>
+                                        <p:tgtEl>
+                                          <p:spTgt spid="4"/>
+                                        </p:tgtEl>
+                                      </p:cBhvr>
+                                    </p:animEffect>
+                                  </p:childTnLst>
+                                </p:cTn>
+                              </p:par>
+                              <p:par>
+                                <p:cTn id="11" presetID="10" presetClass="entr" presetSubtype="0" fill="hold" grpId="0" nodeType="withEffect">
+                                  <p:stCondLst>
+                                    <p:cond delay="0"/>
+                                  </p:stCondLst>
+                                  <p:childTnLst>
+                                    <p:set>
+                                      <p:cBhvr>
+                                        <p:cTn id="12" dur="1" fill="hold">
+                                          <p:stCondLst>
+                                            <p:cond delay="0"/>
+                                          </p:stCondLst>
+                                        </p:cTn>
+                                        <p:tgtEl>
+                                          <p:spTgt spid="6"/>
+                                        </p:tgtEl>
+                                        <p:attrNameLst>
+                                          <p:attrName>style.visibility</p:attrName>
+                                        </p:attrNameLst>
+                                      </p:cBhvr>
+                                      <p:to>
+                                        <p:strVal val="visible"/>
+                                      </p:to>
+                                    </p:set>
+                                    <p:animEffect transition="in" filter="fade">
+                                      <p:cBhvr>
                                         <p:cTn id="13" dur="500"/>
                                         <p:tgtEl>
-                                          <p:spTgt spid="4"/>
+                                          <p:spTgt spid="6"/>
                                         </p:tgtEl>
                                       </p:cBhvr>
                                     </p:animEffect>
@@ -17769,6 +20134,7 @@
     </p:tnLst>
     <p:bldLst>
       <p:bldP spid="5" grpId="0" animBg="1"/>
+      <p:bldP spid="6" grpId="0" animBg="1"/>
     </p:bldLst>
   </p:timing>
 </p:sld>

</xml_diff>

<commit_message>
More Key Vault content
</commit_message>
<xml_diff>
--- a/Protecting App Secrets.pptx
+++ b/Protecting App Secrets.pptx
@@ -15,10 +15,10 @@
     <p:sldId id="328" r:id="rId6"/>
     <p:sldId id="330" r:id="rId7"/>
     <p:sldId id="323" r:id="rId8"/>
-    <p:sldId id="324" r:id="rId9"/>
+    <p:sldId id="337" r:id="rId9"/>
     <p:sldId id="332" r:id="rId10"/>
     <p:sldId id="333" r:id="rId11"/>
-    <p:sldId id="325" r:id="rId12"/>
+    <p:sldId id="338" r:id="rId12"/>
     <p:sldId id="335" r:id="rId13"/>
     <p:sldId id="336" r:id="rId14"/>
     <p:sldId id="331" r:id="rId15"/>
@@ -717,7 +717,7 @@
     </p:spTree>
     <p:extLst>
       <p:ext uri="{BB962C8B-B14F-4D97-AF65-F5344CB8AC3E}">
-        <p14:creationId xmlns:p14="http://schemas.microsoft.com/office/powerpoint/2010/main" val="2216393245"/>
+        <p14:creationId xmlns:p14="http://schemas.microsoft.com/office/powerpoint/2010/main" val="3438339408"/>
       </p:ext>
     </p:extLst>
   </p:cSld>
@@ -2352,7 +2352,7 @@
     </p:spTree>
     <p:extLst>
       <p:ext uri="{BB962C8B-B14F-4D97-AF65-F5344CB8AC3E}">
-        <p14:creationId xmlns:p14="http://schemas.microsoft.com/office/powerpoint/2010/main" val="2727991651"/>
+        <p14:creationId xmlns:p14="http://schemas.microsoft.com/office/powerpoint/2010/main" val="1196958691"/>
       </p:ext>
     </p:extLst>
   </p:cSld>
@@ -9405,21 +9405,43 @@
             <p:ph type="title"/>
           </p:nvPr>
         </p:nvSpPr>
-        <p:spPr>
-          <a:xfrm>
-            <a:off x="838200" y="365125"/>
-            <a:ext cx="10515600" cy="1325563"/>
-          </a:xfrm>
-        </p:spPr>
+        <p:spPr/>
         <p:txBody>
           <a:bodyPr/>
           <a:lstStyle/>
           <a:p>
             <a:r>
-              <a:rPr lang="en-US"/>
+              <a:rPr lang="en-US" dirty="0"/>
               <a:t>Azure Key Vault</a:t>
             </a:r>
-            <a:endParaRPr lang="en-US" dirty="0"/>
+          </a:p>
+        </p:txBody>
+      </p:sp>
+      <p:sp>
+        <p:nvSpPr>
+          <p:cNvPr id="4" name="Text Placeholder 3">
+            <a:extLst>
+              <a:ext uri="{FF2B5EF4-FFF2-40B4-BE49-F238E27FC236}">
+                <a16:creationId xmlns:a16="http://schemas.microsoft.com/office/drawing/2014/main" id="{109FC969-AA43-422D-90BF-A85F00DB39CB}"/>
+              </a:ext>
+            </a:extLst>
+          </p:cNvPr>
+          <p:cNvSpPr>
+            <a:spLocks noGrp="1"/>
+          </p:cNvSpPr>
+          <p:nvPr>
+            <p:ph type="body" idx="1"/>
+          </p:nvPr>
+        </p:nvSpPr>
+        <p:spPr/>
+        <p:txBody>
+          <a:bodyPr/>
+          <a:lstStyle/>
+          <a:p>
+            <a:r>
+              <a:rPr lang="en-US" dirty="0"/>
+              <a:t>CLI</a:t>
+            </a:r>
           </a:p>
         </p:txBody>
       </p:sp>
@@ -9430,18 +9452,13 @@
             <a:spLocks noGrp="1"/>
           </p:cNvSpPr>
           <p:nvPr>
-            <p:ph idx="1"/>
-          </p:nvPr>
-        </p:nvSpPr>
-        <p:spPr>
-          <a:xfrm>
-            <a:off x="838200" y="1825625"/>
-            <a:ext cx="10515600" cy="4351338"/>
-          </a:xfrm>
-        </p:spPr>
+            <p:ph sz="half" idx="2"/>
+          </p:nvPr>
+        </p:nvSpPr>
+        <p:spPr/>
         <p:txBody>
           <a:bodyPr>
-            <a:normAutofit/>
+            <a:normAutofit fontScale="77500" lnSpcReduction="20000"/>
           </a:bodyPr>
           <a:lstStyle/>
           <a:p>
@@ -9464,7 +9481,44 @@
             </a:r>
           </a:p>
           <a:p>
+            <a:r>
+              <a:rPr lang="en-US" dirty="0"/>
+              <a:t>Azure CLI</a:t>
+            </a:r>
+          </a:p>
+          <a:p>
+            <a:pPr lvl="1"/>
             <a:endParaRPr lang="en-US" dirty="0"/>
+          </a:p>
+          <a:p>
+            <a:pPr marL="0" indent="0">
+              <a:buNone/>
+            </a:pPr>
+            <a:endParaRPr lang="en-US" b="1" dirty="0">
+              <a:solidFill>
+                <a:schemeClr val="accent4"/>
+              </a:solidFill>
+            </a:endParaRPr>
+          </a:p>
+          <a:p>
+            <a:pPr marL="0" indent="0">
+              <a:buNone/>
+            </a:pPr>
+            <a:endParaRPr lang="en-US" b="1" dirty="0">
+              <a:solidFill>
+                <a:schemeClr val="accent4"/>
+              </a:solidFill>
+            </a:endParaRPr>
+          </a:p>
+          <a:p>
+            <a:pPr marL="0" indent="0">
+              <a:buNone/>
+            </a:pPr>
+            <a:endParaRPr lang="en-US" b="1" dirty="0">
+              <a:solidFill>
+                <a:schemeClr val="accent4"/>
+              </a:solidFill>
+            </a:endParaRPr>
           </a:p>
           <a:p>
             <a:pPr marL="0" indent="0">
@@ -9520,19 +9574,140 @@
             </a:r>
             <a:endParaRPr lang="en-US" dirty="0"/>
           </a:p>
+        </p:txBody>
+      </p:sp>
+      <p:sp>
+        <p:nvSpPr>
+          <p:cNvPr id="5" name="Text Placeholder 4">
+            <a:extLst>
+              <a:ext uri="{FF2B5EF4-FFF2-40B4-BE49-F238E27FC236}">
+                <a16:creationId xmlns:a16="http://schemas.microsoft.com/office/drawing/2014/main" id="{ECDC9AF0-AA09-4AB1-A66F-A4F1038AE417}"/>
+              </a:ext>
+            </a:extLst>
+          </p:cNvPr>
+          <p:cNvSpPr>
+            <a:spLocks noGrp="1"/>
+          </p:cNvSpPr>
+          <p:nvPr>
+            <p:ph type="body" sz="quarter" idx="3"/>
+          </p:nvPr>
+        </p:nvSpPr>
+        <p:spPr>
+          <a:xfrm>
+            <a:off x="5421854" y="1681163"/>
+            <a:ext cx="5933534" cy="823912"/>
+          </a:xfrm>
+        </p:spPr>
+        <p:txBody>
+          <a:bodyPr/>
+          <a:lstStyle/>
+          <a:p>
+            <a:r>
+              <a:rPr lang="en-US" dirty="0"/>
+              <a:t>IDE</a:t>
+            </a:r>
+          </a:p>
+        </p:txBody>
+      </p:sp>
+      <p:sp>
+        <p:nvSpPr>
+          <p:cNvPr id="6" name="Content Placeholder 5">
+            <a:extLst>
+              <a:ext uri="{FF2B5EF4-FFF2-40B4-BE49-F238E27FC236}">
+                <a16:creationId xmlns:a16="http://schemas.microsoft.com/office/drawing/2014/main" id="{3446258C-CBD9-4682-9583-5FEA1E9B2882}"/>
+              </a:ext>
+            </a:extLst>
+          </p:cNvPr>
+          <p:cNvSpPr>
+            <a:spLocks noGrp="1"/>
+          </p:cNvSpPr>
+          <p:nvPr>
+            <p:ph sz="quarter" idx="4"/>
+          </p:nvPr>
+        </p:nvSpPr>
+        <p:spPr>
+          <a:xfrm>
+            <a:off x="5421854" y="2505075"/>
+            <a:ext cx="5933534" cy="3684588"/>
+          </a:xfrm>
+        </p:spPr>
+        <p:txBody>
+          <a:bodyPr>
+            <a:normAutofit fontScale="77500" lnSpcReduction="20000"/>
+          </a:bodyPr>
+          <a:lstStyle/>
           <a:p>
             <a:pPr marL="0" indent="0">
               <a:buNone/>
             </a:pPr>
             <a:r>
+              <a:rPr lang="en-US" b="1" dirty="0">
+                <a:solidFill>
+                  <a:schemeClr val="accent4"/>
+                </a:solidFill>
+              </a:rPr>
+              <a:t>Prerequisites</a:t>
+            </a:r>
+          </a:p>
+          <a:p>
+            <a:r>
               <a:rPr lang="en-US" dirty="0"/>
-              <a:t>	- or –</a:t>
+              <a:t>Azure subscription</a:t>
+            </a:r>
+          </a:p>
+          <a:p>
+            <a:r>
+              <a:rPr lang="en-US" dirty="0"/>
+              <a:t>.NET Core SDK v2.1</a:t>
+            </a:r>
+          </a:p>
+          <a:p>
+            <a:r>
+              <a:rPr lang="en-US" dirty="0"/>
+              <a:t>VS 2017</a:t>
+            </a:r>
+          </a:p>
+          <a:p>
+            <a:pPr lvl="1"/>
+            <a:r>
+              <a:rPr lang="en-US" dirty="0"/>
+              <a:t>.NET Core cross-platform development</a:t>
+            </a:r>
+          </a:p>
+          <a:p>
+            <a:pPr lvl="1"/>
+            <a:r>
+              <a:rPr lang="en-US" dirty="0"/>
+              <a:t>ASP.NET and web development</a:t>
             </a:r>
           </a:p>
           <a:p>
             <a:pPr marL="0" indent="0">
               <a:buNone/>
             </a:pPr>
+            <a:endParaRPr lang="en-US" b="1" dirty="0">
+              <a:solidFill>
+                <a:schemeClr val="accent4"/>
+              </a:solidFill>
+            </a:endParaRPr>
+          </a:p>
+          <a:p>
+            <a:pPr marL="0" indent="0">
+              <a:buNone/>
+            </a:pPr>
+            <a:r>
+              <a:rPr lang="en-US" b="1" dirty="0">
+                <a:solidFill>
+                  <a:schemeClr val="accent4"/>
+                </a:solidFill>
+              </a:rPr>
+              <a:t>Usage</a:t>
+            </a:r>
+          </a:p>
+          <a:p>
+            <a:pPr marL="0" indent="0">
+              <a:buNone/>
+            </a:pPr>
             <a:r>
               <a:rPr lang="en-US" dirty="0"/>
               <a:t>Solution Explorer </a:t>
@@ -9556,10 +9731,51 @@
           </a:p>
         </p:txBody>
       </p:sp>
+      <p:cxnSp>
+        <p:nvCxnSpPr>
+          <p:cNvPr id="8" name="Straight Connector 7">
+            <a:extLst>
+              <a:ext uri="{FF2B5EF4-FFF2-40B4-BE49-F238E27FC236}">
+                <a16:creationId xmlns:a16="http://schemas.microsoft.com/office/drawing/2014/main" id="{F0E94C23-5E74-4562-86A4-F6B443133B32}"/>
+              </a:ext>
+            </a:extLst>
+          </p:cNvPr>
+          <p:cNvCxnSpPr/>
+          <p:nvPr/>
+        </p:nvCxnSpPr>
+        <p:spPr>
+          <a:xfrm>
+            <a:off x="5181600" y="1925619"/>
+            <a:ext cx="0" cy="4264044"/>
+          </a:xfrm>
+          <a:prstGeom prst="line">
+            <a:avLst/>
+          </a:prstGeom>
+          <a:ln w="38100">
+            <a:solidFill>
+              <a:schemeClr val="tx2"/>
+            </a:solidFill>
+          </a:ln>
+        </p:spPr>
+        <p:style>
+          <a:lnRef idx="3">
+            <a:schemeClr val="accent1"/>
+          </a:lnRef>
+          <a:fillRef idx="0">
+            <a:schemeClr val="accent1"/>
+          </a:fillRef>
+          <a:effectRef idx="2">
+            <a:schemeClr val="accent1"/>
+          </a:effectRef>
+          <a:fontRef idx="minor">
+            <a:schemeClr val="tx1"/>
+          </a:fontRef>
+        </p:style>
+      </p:cxnSp>
     </p:spTree>
     <p:extLst>
       <p:ext uri="{BB962C8B-B14F-4D97-AF65-F5344CB8AC3E}">
-        <p14:creationId xmlns:p14="http://schemas.microsoft.com/office/powerpoint/2010/main" val="1332892662"/>
+        <p14:creationId xmlns:p14="http://schemas.microsoft.com/office/powerpoint/2010/main" val="3241453242"/>
       </p:ext>
     </p:extLst>
   </p:cSld>
@@ -9587,7 +9803,7 @@
                             </p:stCondLst>
                             <p:childTnLst>
                               <p:par>
-                                <p:cTn id="5" presetID="10" presetClass="entr" presetSubtype="0" fill="hold" nodeType="clickEffect">
+                                <p:cTn id="5" presetID="1" presetClass="entr" presetSubtype="0" fill="hold" nodeType="clickEffect">
                                   <p:stCondLst>
                                     <p:cond delay="0"/>
                                   </p:stCondLst>
@@ -9602,7 +9818,7 @@
                                         <p:tgtEl>
                                           <p:spTgt spid="3">
                                             <p:txEl>
-                                              <p:pRg st="0" end="0"/>
+                                              <p:pRg st="2" end="2"/>
                                             </p:txEl>
                                           </p:spTgt>
                                         </p:tgtEl>
@@ -9614,18 +9830,6 @@
                                         <p:strVal val="visible"/>
                                       </p:to>
                                     </p:set>
-                                    <p:animEffect transition="in" filter="fade">
-                                      <p:cBhvr>
-                                        <p:cTn id="7" dur="500"/>
-                                        <p:tgtEl>
-                                          <p:spTgt spid="3">
-                                            <p:txEl>
-                                              <p:pRg st="0" end="0"/>
-                                            </p:txEl>
-                                          </p:spTgt>
-                                        </p:tgtEl>
-                                      </p:cBhvr>
-                                    </p:animEffect>
                                   </p:childTnLst>
                                 </p:cTn>
                               </p:par>
@@ -9636,26 +9840,26 @@
                     </p:cTn>
                   </p:par>
                   <p:par>
-                    <p:cTn id="8" fill="hold">
+                    <p:cTn id="7" fill="hold">
                       <p:stCondLst>
                         <p:cond delay="indefinite"/>
                       </p:stCondLst>
                       <p:childTnLst>
                         <p:par>
-                          <p:cTn id="9" fill="hold">
+                          <p:cTn id="8" fill="hold">
                             <p:stCondLst>
                               <p:cond delay="0"/>
                             </p:stCondLst>
                             <p:childTnLst>
                               <p:par>
-                                <p:cTn id="10" presetID="10" presetClass="entr" presetSubtype="0" fill="hold" nodeType="clickEffect">
+                                <p:cTn id="9" presetID="1" presetClass="entr" presetSubtype="0" fill="hold" nodeType="clickEffect">
                                   <p:stCondLst>
                                     <p:cond delay="0"/>
                                   </p:stCondLst>
                                   <p:childTnLst>
                                     <p:set>
                                       <p:cBhvr>
-                                        <p:cTn id="11" dur="1" fill="hold">
+                                        <p:cTn id="10" dur="1" fill="hold">
                                           <p:stCondLst>
                                             <p:cond delay="0"/>
                                           </p:stCondLst>
@@ -9663,7 +9867,7 @@
                                         <p:tgtEl>
                                           <p:spTgt spid="3">
                                             <p:txEl>
-                                              <p:pRg st="1" end="1"/>
+                                              <p:pRg st="7" end="7"/>
                                             </p:txEl>
                                           </p:spTgt>
                                         </p:tgtEl>
@@ -9675,48 +9879,18 @@
                                         <p:strVal val="visible"/>
                                       </p:to>
                                     </p:set>
-                                    <p:animEffect transition="in" filter="fade">
-                                      <p:cBhvr>
-                                        <p:cTn id="12" dur="500"/>
-                                        <p:tgtEl>
-                                          <p:spTgt spid="3">
-                                            <p:txEl>
-                                              <p:pRg st="1" end="1"/>
-                                            </p:txEl>
-                                          </p:spTgt>
-                                        </p:tgtEl>
-                                      </p:cBhvr>
-                                    </p:animEffect>
                                   </p:childTnLst>
                                 </p:cTn>
                               </p:par>
-                            </p:childTnLst>
-                          </p:cTn>
-                        </p:par>
-                      </p:childTnLst>
-                    </p:cTn>
-                  </p:par>
-                  <p:par>
-                    <p:cTn id="13" fill="hold">
-                      <p:stCondLst>
-                        <p:cond delay="indefinite"/>
-                      </p:stCondLst>
-                      <p:childTnLst>
-                        <p:par>
-                          <p:cTn id="14" fill="hold">
-                            <p:stCondLst>
-                              <p:cond delay="0"/>
-                            </p:stCondLst>
-                            <p:childTnLst>
                               <p:par>
-                                <p:cTn id="15" presetID="10" presetClass="entr" presetSubtype="0" fill="hold" nodeType="clickEffect">
+                                <p:cTn id="11" presetID="1" presetClass="entr" presetSubtype="0" fill="hold" nodeType="withEffect">
                                   <p:stCondLst>
                                     <p:cond delay="0"/>
                                   </p:stCondLst>
                                   <p:childTnLst>
                                     <p:set>
                                       <p:cBhvr>
-                                        <p:cTn id="16" dur="1" fill="hold">
+                                        <p:cTn id="12" dur="1" fill="hold">
                                           <p:stCondLst>
                                             <p:cond delay="0"/>
                                           </p:stCondLst>
@@ -9724,7 +9898,7 @@
                                         <p:tgtEl>
                                           <p:spTgt spid="3">
                                             <p:txEl>
-                                              <p:pRg st="3" end="3"/>
+                                              <p:pRg st="8" end="8"/>
                                             </p:txEl>
                                           </p:spTgt>
                                         </p:tgtEl>
@@ -9736,201 +9910,6 @@
                                         <p:strVal val="visible"/>
                                       </p:to>
                                     </p:set>
-                                    <p:animEffect transition="in" filter="fade">
-                                      <p:cBhvr>
-                                        <p:cTn id="17" dur="500"/>
-                                        <p:tgtEl>
-                                          <p:spTgt spid="3">
-                                            <p:txEl>
-                                              <p:pRg st="3" end="3"/>
-                                            </p:txEl>
-                                          </p:spTgt>
-                                        </p:tgtEl>
-                                      </p:cBhvr>
-                                    </p:animEffect>
-                                  </p:childTnLst>
-                                </p:cTn>
-                              </p:par>
-                            </p:childTnLst>
-                          </p:cTn>
-                        </p:par>
-                      </p:childTnLst>
-                    </p:cTn>
-                  </p:par>
-                  <p:par>
-                    <p:cTn id="18" fill="hold">
-                      <p:stCondLst>
-                        <p:cond delay="indefinite"/>
-                      </p:stCondLst>
-                      <p:childTnLst>
-                        <p:par>
-                          <p:cTn id="19" fill="hold">
-                            <p:stCondLst>
-                              <p:cond delay="0"/>
-                            </p:stCondLst>
-                            <p:childTnLst>
-                              <p:par>
-                                <p:cTn id="20" presetID="10" presetClass="entr" presetSubtype="0" fill="hold" nodeType="clickEffect">
-                                  <p:stCondLst>
-                                    <p:cond delay="0"/>
-                                  </p:stCondLst>
-                                  <p:childTnLst>
-                                    <p:set>
-                                      <p:cBhvr>
-                                        <p:cTn id="21" dur="1" fill="hold">
-                                          <p:stCondLst>
-                                            <p:cond delay="0"/>
-                                          </p:stCondLst>
-                                        </p:cTn>
-                                        <p:tgtEl>
-                                          <p:spTgt spid="3">
-                                            <p:txEl>
-                                              <p:pRg st="4" end="4"/>
-                                            </p:txEl>
-                                          </p:spTgt>
-                                        </p:tgtEl>
-                                        <p:attrNameLst>
-                                          <p:attrName>style.visibility</p:attrName>
-                                        </p:attrNameLst>
-                                      </p:cBhvr>
-                                      <p:to>
-                                        <p:strVal val="visible"/>
-                                      </p:to>
-                                    </p:set>
-                                    <p:animEffect transition="in" filter="fade">
-                                      <p:cBhvr>
-                                        <p:cTn id="22" dur="500"/>
-                                        <p:tgtEl>
-                                          <p:spTgt spid="3">
-                                            <p:txEl>
-                                              <p:pRg st="4" end="4"/>
-                                            </p:txEl>
-                                          </p:spTgt>
-                                        </p:tgtEl>
-                                      </p:cBhvr>
-                                    </p:animEffect>
-                                  </p:childTnLst>
-                                </p:cTn>
-                              </p:par>
-                            </p:childTnLst>
-                          </p:cTn>
-                        </p:par>
-                      </p:childTnLst>
-                    </p:cTn>
-                  </p:par>
-                  <p:par>
-                    <p:cTn id="23" fill="hold">
-                      <p:stCondLst>
-                        <p:cond delay="indefinite"/>
-                      </p:stCondLst>
-                      <p:childTnLst>
-                        <p:par>
-                          <p:cTn id="24" fill="hold">
-                            <p:stCondLst>
-                              <p:cond delay="0"/>
-                            </p:stCondLst>
-                            <p:childTnLst>
-                              <p:par>
-                                <p:cTn id="25" presetID="10" presetClass="entr" presetSubtype="0" fill="hold" nodeType="clickEffect">
-                                  <p:stCondLst>
-                                    <p:cond delay="0"/>
-                                  </p:stCondLst>
-                                  <p:childTnLst>
-                                    <p:set>
-                                      <p:cBhvr>
-                                        <p:cTn id="26" dur="1" fill="hold">
-                                          <p:stCondLst>
-                                            <p:cond delay="0"/>
-                                          </p:stCondLst>
-                                        </p:cTn>
-                                        <p:tgtEl>
-                                          <p:spTgt spid="3">
-                                            <p:txEl>
-                                              <p:pRg st="5" end="5"/>
-                                            </p:txEl>
-                                          </p:spTgt>
-                                        </p:tgtEl>
-                                        <p:attrNameLst>
-                                          <p:attrName>style.visibility</p:attrName>
-                                        </p:attrNameLst>
-                                      </p:cBhvr>
-                                      <p:to>
-                                        <p:strVal val="visible"/>
-                                      </p:to>
-                                    </p:set>
-                                    <p:animEffect transition="in" filter="fade">
-                                      <p:cBhvr>
-                                        <p:cTn id="27" dur="500"/>
-                                        <p:tgtEl>
-                                          <p:spTgt spid="3">
-                                            <p:txEl>
-                                              <p:pRg st="5" end="5"/>
-                                            </p:txEl>
-                                          </p:spTgt>
-                                        </p:tgtEl>
-                                      </p:cBhvr>
-                                    </p:animEffect>
-                                  </p:childTnLst>
-                                </p:cTn>
-                              </p:par>
-                            </p:childTnLst>
-                          </p:cTn>
-                        </p:par>
-                      </p:childTnLst>
-                    </p:cTn>
-                  </p:par>
-                  <p:par>
-                    <p:cTn id="28" fill="hold">
-                      <p:stCondLst>
-                        <p:cond delay="indefinite"/>
-                      </p:stCondLst>
-                      <p:childTnLst>
-                        <p:par>
-                          <p:cTn id="29" fill="hold">
-                            <p:stCondLst>
-                              <p:cond delay="0"/>
-                            </p:stCondLst>
-                            <p:childTnLst>
-                              <p:par>
-                                <p:cTn id="30" presetID="10" presetClass="entr" presetSubtype="0" fill="hold" nodeType="clickEffect">
-                                  <p:stCondLst>
-                                    <p:cond delay="0"/>
-                                  </p:stCondLst>
-                                  <p:childTnLst>
-                                    <p:set>
-                                      <p:cBhvr>
-                                        <p:cTn id="31" dur="1" fill="hold">
-                                          <p:stCondLst>
-                                            <p:cond delay="0"/>
-                                          </p:stCondLst>
-                                        </p:cTn>
-                                        <p:tgtEl>
-                                          <p:spTgt spid="3">
-                                            <p:txEl>
-                                              <p:pRg st="6" end="6"/>
-                                            </p:txEl>
-                                          </p:spTgt>
-                                        </p:tgtEl>
-                                        <p:attrNameLst>
-                                          <p:attrName>style.visibility</p:attrName>
-                                        </p:attrNameLst>
-                                      </p:cBhvr>
-                                      <p:to>
-                                        <p:strVal val="visible"/>
-                                      </p:to>
-                                    </p:set>
-                                    <p:animEffect transition="in" filter="fade">
-                                      <p:cBhvr>
-                                        <p:cTn id="32" dur="500"/>
-                                        <p:tgtEl>
-                                          <p:spTgt spid="3">
-                                            <p:txEl>
-                                              <p:pRg st="6" end="6"/>
-                                            </p:txEl>
-                                          </p:spTgt>
-                                        </p:tgtEl>
-                                      </p:cBhvr>
-                                    </p:animEffect>
                                   </p:childTnLst>
                                 </p:cTn>
                               </p:par>
@@ -10921,14 +10900,14 @@
           <p:nvPr>
             <p:extLst>
               <p:ext uri="{D42A27DB-BD31-4B8C-83A1-F6EECF244321}">
-                <p14:modId xmlns:p14="http://schemas.microsoft.com/office/powerpoint/2010/main" val="3815910926"/>
+                <p14:modId xmlns:p14="http://schemas.microsoft.com/office/powerpoint/2010/main" val="18966878"/>
               </p:ext>
             </p:extLst>
           </p:nvPr>
         </p:nvGraphicFramePr>
         <p:xfrm>
           <a:off x="844462" y="1920876"/>
-          <a:ext cx="9165812" cy="4135854"/>
+          <a:ext cx="9165812" cy="2133600"/>
         </p:xfrm>
         <a:graphic>
           <a:graphicData uri="http://schemas.openxmlformats.org/drawingml/2006/table">
@@ -10943,7 +10922,7 @@
                   </a:extLst>
                 </a:gridCol>
               </a:tblGrid>
-              <a:tr h="3800574">
+              <a:tr h="1754102">
                 <a:tc>
                   <a:txBody>
                     <a:bodyPr/>
@@ -11022,12 +11001,359 @@
                       </a:lvl9pPr>
                     </a:lstStyle>
                     <a:p>
+                      <a:r>
+                        <a:rPr lang="en-US" sz="1600" dirty="0">
+                          <a:solidFill>
+                            <a:srgbClr val="000000"/>
+                          </a:solidFill>
+                          <a:highlight>
+                            <a:srgbClr val="FFFF00"/>
+                          </a:highlight>
+                          <a:latin typeface="Consolas" panose="020B0609020204030204" pitchFamily="49" charset="0"/>
+                        </a:rPr>
+                        <a:t>@page</a:t>
+                      </a:r>
+                    </a:p>
+                    <a:p>
+                      <a:r>
+                        <a:rPr lang="en-US" sz="1600" dirty="0">
+                          <a:solidFill>
+                            <a:srgbClr val="000000"/>
+                          </a:solidFill>
+                          <a:highlight>
+                            <a:srgbClr val="FFFF00"/>
+                          </a:highlight>
+                          <a:latin typeface="Consolas" panose="020B0609020204030204" pitchFamily="49" charset="0"/>
+                        </a:rPr>
+                        <a:t>@model</a:t>
+                      </a:r>
+                      <a:r>
+                        <a:rPr lang="en-US" sz="1600" dirty="0">
+                          <a:solidFill>
+                            <a:srgbClr val="000000"/>
+                          </a:solidFill>
+                          <a:latin typeface="Consolas" panose="020B0609020204030204" pitchFamily="49" charset="0"/>
+                        </a:rPr>
+                        <a:t> </a:t>
+                      </a:r>
+                      <a:r>
+                        <a:rPr lang="en-US" sz="1600" dirty="0" err="1">
+                          <a:solidFill>
+                            <a:srgbClr val="000000"/>
+                          </a:solidFill>
+                          <a:latin typeface="Consolas" panose="020B0609020204030204" pitchFamily="49" charset="0"/>
+                        </a:rPr>
+                        <a:t>IndexModel</a:t>
+                      </a:r>
                       <a:endParaRPr lang="en-US" sz="1600" dirty="0">
                         <a:solidFill>
                           <a:srgbClr val="000000"/>
                         </a:solidFill>
+                        <a:highlight>
+                          <a:srgbClr val="FFFF00"/>
+                        </a:highlight>
                         <a:latin typeface="Consolas" panose="020B0609020204030204" pitchFamily="49" charset="0"/>
                       </a:endParaRPr>
+                    </a:p>
+                    <a:p>
+                      <a:r>
+                        <a:rPr lang="en-US" sz="1600" dirty="0">
+                          <a:solidFill>
+                            <a:srgbClr val="000000"/>
+                          </a:solidFill>
+                          <a:highlight>
+                            <a:srgbClr val="FFFF00"/>
+                          </a:highlight>
+                          <a:latin typeface="Consolas" panose="020B0609020204030204" pitchFamily="49" charset="0"/>
+                        </a:rPr>
+                        <a:t>@inject</a:t>
+                      </a:r>
+                      <a:r>
+                        <a:rPr lang="en-US" sz="1600" dirty="0">
+                          <a:solidFill>
+                            <a:srgbClr val="000000"/>
+                          </a:solidFill>
+                          <a:latin typeface="Consolas" panose="020B0609020204030204" pitchFamily="49" charset="0"/>
+                        </a:rPr>
+                        <a:t> </a:t>
+                      </a:r>
+                      <a:r>
+                        <a:rPr lang="en-US" sz="1600" dirty="0" err="1">
+                          <a:solidFill>
+                            <a:srgbClr val="000000"/>
+                          </a:solidFill>
+                          <a:latin typeface="Consolas" panose="020B0609020204030204" pitchFamily="49" charset="0"/>
+                        </a:rPr>
+                        <a:t>Microsoft.Extensions.Configuration.IConfiguration</a:t>
+                      </a:r>
+                      <a:r>
+                        <a:rPr lang="en-US" sz="1600" dirty="0">
+                          <a:solidFill>
+                            <a:srgbClr val="000000"/>
+                          </a:solidFill>
+                          <a:latin typeface="Consolas" panose="020B0609020204030204" pitchFamily="49" charset="0"/>
+                        </a:rPr>
+                        <a:t> config</a:t>
+                      </a:r>
+                    </a:p>
+                    <a:p>
+                      <a:endParaRPr lang="en-US" sz="1600" dirty="0">
+                        <a:solidFill>
+                          <a:srgbClr val="0000FF"/>
+                        </a:solidFill>
+                        <a:latin typeface="Consolas" panose="020B0609020204030204" pitchFamily="49" charset="0"/>
+                      </a:endParaRPr>
+                    </a:p>
+                    <a:p>
+                      <a:pPr marL="0" marR="0" lvl="0" indent="0" algn="l" defTabSz="914400" rtl="0" eaLnBrk="1" fontAlgn="auto" latinLnBrk="0" hangingPunct="1">
+                        <a:lnSpc>
+                          <a:spcPct val="100000"/>
+                        </a:lnSpc>
+                        <a:spcBef>
+                          <a:spcPts val="0"/>
+                        </a:spcBef>
+                        <a:spcAft>
+                          <a:spcPts val="0"/>
+                        </a:spcAft>
+                        <a:buClrTx/>
+                        <a:buSzTx/>
+                        <a:buFontTx/>
+                        <a:buNone/>
+                        <a:tabLst/>
+                        <a:defRPr/>
+                      </a:pPr>
+                      <a:r>
+                        <a:rPr lang="en-US" sz="1600" dirty="0">
+                          <a:solidFill>
+                            <a:srgbClr val="0000FF"/>
+                          </a:solidFill>
+                          <a:latin typeface="Consolas" panose="020B0609020204030204" pitchFamily="49" charset="0"/>
+                        </a:rPr>
+                        <a:t>&lt;</a:t>
+                      </a:r>
+                      <a:r>
+                        <a:rPr lang="en-US" sz="1600" dirty="0">
+                          <a:solidFill>
+                            <a:srgbClr val="800000"/>
+                          </a:solidFill>
+                          <a:latin typeface="Consolas" panose="020B0609020204030204" pitchFamily="49" charset="0"/>
+                        </a:rPr>
+                        <a:t>strong</a:t>
+                      </a:r>
+                      <a:r>
+                        <a:rPr lang="en-US" sz="1600" dirty="0">
+                          <a:solidFill>
+                            <a:srgbClr val="0000FF"/>
+                          </a:solidFill>
+                          <a:latin typeface="Consolas" panose="020B0609020204030204" pitchFamily="49" charset="0"/>
+                        </a:rPr>
+                        <a:t>&gt;</a:t>
+                      </a:r>
+                      <a:r>
+                        <a:rPr lang="en-US" sz="1600" dirty="0">
+                          <a:solidFill>
+                            <a:srgbClr val="000000"/>
+                          </a:solidFill>
+                          <a:latin typeface="Consolas" panose="020B0609020204030204" pitchFamily="49" charset="0"/>
+                        </a:rPr>
+                        <a:t>Username:</a:t>
+                      </a:r>
+                      <a:r>
+                        <a:rPr lang="en-US" sz="1600" dirty="0">
+                          <a:solidFill>
+                            <a:srgbClr val="0000FF"/>
+                          </a:solidFill>
+                          <a:latin typeface="Consolas" panose="020B0609020204030204" pitchFamily="49" charset="0"/>
+                        </a:rPr>
+                        <a:t>&lt;/</a:t>
+                      </a:r>
+                      <a:r>
+                        <a:rPr lang="en-US" sz="1600" dirty="0">
+                          <a:solidFill>
+                            <a:srgbClr val="800000"/>
+                          </a:solidFill>
+                          <a:latin typeface="Consolas" panose="020B0609020204030204" pitchFamily="49" charset="0"/>
+                        </a:rPr>
+                        <a:t>strong</a:t>
+                      </a:r>
+                      <a:r>
+                        <a:rPr lang="en-US" sz="1600" dirty="0">
+                          <a:solidFill>
+                            <a:srgbClr val="0000FF"/>
+                          </a:solidFill>
+                          <a:latin typeface="Consolas" panose="020B0609020204030204" pitchFamily="49" charset="0"/>
+                        </a:rPr>
+                        <a:t>&gt;</a:t>
+                      </a:r>
+                      <a:r>
+                        <a:rPr lang="en-US" sz="1600" dirty="0">
+                          <a:solidFill>
+                            <a:srgbClr val="000000"/>
+                          </a:solidFill>
+                          <a:latin typeface="Consolas" panose="020B0609020204030204" pitchFamily="49" charset="0"/>
+                        </a:rPr>
+                        <a:t> </a:t>
+                      </a:r>
+                      <a:r>
+                        <a:rPr lang="en-US" sz="1600" dirty="0">
+                          <a:solidFill>
+                            <a:srgbClr val="000000"/>
+                          </a:solidFill>
+                          <a:highlight>
+                            <a:srgbClr val="FFFF00"/>
+                          </a:highlight>
+                          <a:latin typeface="Consolas" panose="020B0609020204030204" pitchFamily="49" charset="0"/>
+                        </a:rPr>
+                        <a:t>@</a:t>
+                      </a:r>
+                      <a:r>
+                        <a:rPr lang="en-US" sz="1600" dirty="0">
+                          <a:solidFill>
+                            <a:srgbClr val="000000"/>
+                          </a:solidFill>
+                          <a:latin typeface="Consolas" panose="020B0609020204030204" pitchFamily="49" charset="0"/>
+                        </a:rPr>
+                        <a:t>config[</a:t>
+                      </a:r>
+                      <a:r>
+                        <a:rPr lang="en-US" sz="1600" dirty="0">
+                          <a:solidFill>
+                            <a:srgbClr val="A31515"/>
+                          </a:solidFill>
+                          <a:latin typeface="Consolas" panose="020B0609020204030204" pitchFamily="49" charset="0"/>
+                        </a:rPr>
+                        <a:t>"User"</a:t>
+                      </a:r>
+                      <a:r>
+                        <a:rPr lang="en-US" sz="1600" dirty="0">
+                          <a:solidFill>
+                            <a:srgbClr val="000000"/>
+                          </a:solidFill>
+                          <a:latin typeface="Consolas" panose="020B0609020204030204" pitchFamily="49" charset="0"/>
+                        </a:rPr>
+                        <a:t>]</a:t>
+                      </a:r>
+                    </a:p>
+                    <a:p>
+                      <a:endParaRPr lang="en-US" sz="1600" dirty="0">
+                        <a:solidFill>
+                          <a:srgbClr val="0000FF"/>
+                        </a:solidFill>
+                        <a:latin typeface="Consolas" panose="020B0609020204030204" pitchFamily="49" charset="0"/>
+                      </a:endParaRPr>
+                    </a:p>
+                    <a:p>
+                      <a:r>
+                        <a:rPr lang="en-US" sz="1600" dirty="0">
+                          <a:solidFill>
+                            <a:srgbClr val="0000FF"/>
+                          </a:solidFill>
+                          <a:latin typeface="Consolas" panose="020B0609020204030204" pitchFamily="49" charset="0"/>
+                        </a:rPr>
+                        <a:t>&lt;</a:t>
+                      </a:r>
+                      <a:r>
+                        <a:rPr lang="en-US" sz="1600" dirty="0">
+                          <a:solidFill>
+                            <a:srgbClr val="800000"/>
+                          </a:solidFill>
+                          <a:latin typeface="Consolas" panose="020B0609020204030204" pitchFamily="49" charset="0"/>
+                        </a:rPr>
+                        <a:t>strong</a:t>
+                      </a:r>
+                      <a:r>
+                        <a:rPr lang="en-US" sz="1600" dirty="0">
+                          <a:solidFill>
+                            <a:srgbClr val="0000FF"/>
+                          </a:solidFill>
+                          <a:latin typeface="Consolas" panose="020B0609020204030204" pitchFamily="49" charset="0"/>
+                        </a:rPr>
+                        <a:t>&gt;</a:t>
+                      </a:r>
+                      <a:r>
+                        <a:rPr lang="en-US" sz="1600" dirty="0">
+                          <a:solidFill>
+                            <a:srgbClr val="000000"/>
+                          </a:solidFill>
+                          <a:latin typeface="Consolas" panose="020B0609020204030204" pitchFamily="49" charset="0"/>
+                        </a:rPr>
+                        <a:t>Password:</a:t>
+                      </a:r>
+                      <a:r>
+                        <a:rPr lang="en-US" sz="1600" dirty="0">
+                          <a:solidFill>
+                            <a:srgbClr val="0000FF"/>
+                          </a:solidFill>
+                          <a:latin typeface="Consolas" panose="020B0609020204030204" pitchFamily="49" charset="0"/>
+                        </a:rPr>
+                        <a:t>&lt;/</a:t>
+                      </a:r>
+                      <a:r>
+                        <a:rPr lang="en-US" sz="1600" dirty="0">
+                          <a:solidFill>
+                            <a:srgbClr val="800000"/>
+                          </a:solidFill>
+                          <a:latin typeface="Consolas" panose="020B0609020204030204" pitchFamily="49" charset="0"/>
+                        </a:rPr>
+                        <a:t>strong</a:t>
+                      </a:r>
+                      <a:r>
+                        <a:rPr lang="en-US" sz="1600" dirty="0">
+                          <a:solidFill>
+                            <a:srgbClr val="0000FF"/>
+                          </a:solidFill>
+                          <a:latin typeface="Consolas" panose="020B0609020204030204" pitchFamily="49" charset="0"/>
+                        </a:rPr>
+                        <a:t>&gt;</a:t>
+                      </a:r>
+                      <a:r>
+                        <a:rPr lang="en-US" sz="1600" dirty="0">
+                          <a:solidFill>
+                            <a:srgbClr val="000000"/>
+                          </a:solidFill>
+                          <a:latin typeface="Consolas" panose="020B0609020204030204" pitchFamily="49" charset="0"/>
+                        </a:rPr>
+                        <a:t> </a:t>
+                      </a:r>
+                      <a:r>
+                        <a:rPr lang="en-US" sz="1600" dirty="0">
+                          <a:solidFill>
+                            <a:srgbClr val="000000"/>
+                          </a:solidFill>
+                          <a:highlight>
+                            <a:srgbClr val="FFFF00"/>
+                          </a:highlight>
+                          <a:latin typeface="Consolas" panose="020B0609020204030204" pitchFamily="49" charset="0"/>
+                        </a:rPr>
+                        <a:t>@</a:t>
+                      </a:r>
+                      <a:r>
+                        <a:rPr lang="en-US" sz="1600" dirty="0">
+                          <a:solidFill>
+                            <a:srgbClr val="000000"/>
+                          </a:solidFill>
+                          <a:latin typeface="Consolas" panose="020B0609020204030204" pitchFamily="49" charset="0"/>
+                        </a:rPr>
+                        <a:t>config[</a:t>
+                      </a:r>
+                      <a:r>
+                        <a:rPr lang="en-US" sz="1600" dirty="0">
+                          <a:solidFill>
+                            <a:srgbClr val="A31515"/>
+                          </a:solidFill>
+                          <a:latin typeface="Consolas" panose="020B0609020204030204" pitchFamily="49" charset="0"/>
+                        </a:rPr>
+                        <a:t>"Password"</a:t>
+                      </a:r>
+                      <a:r>
+                        <a:rPr lang="en-US" sz="1600" dirty="0">
+                          <a:solidFill>
+                            <a:srgbClr val="000000"/>
+                          </a:solidFill>
+                          <a:latin typeface="Consolas" panose="020B0609020204030204" pitchFamily="49" charset="0"/>
+                        </a:rPr>
+                        <a:t>]</a:t>
+                      </a:r>
                     </a:p>
                   </a:txBody>
                   <a:tcPr>
@@ -11086,7 +11412,7 @@
                   </a:ext>
                 </a:extLst>
               </a:tr>
-              <a:tr h="319132">
+              <a:tr h="154744">
                 <a:tc>
                   <a:txBody>
                     <a:bodyPr/>
@@ -11251,7 +11577,7 @@
                 <a:ea typeface="+mn-ea"/>
                 <a:cs typeface="+mn-cs"/>
               </a:rPr>
-              <a:t>Program.cs</a:t>
+              <a:t>Index.cshtml</a:t>
             </a:r>
             <a:endParaRPr kumimoji="0" lang="en-US" sz="1800" b="1" i="0" u="none" strike="noStrike" kern="0" cap="none" spc="0" normalizeH="0" baseline="0" noProof="0" dirty="0">
               <a:ln>
@@ -15938,12 +16264,7 @@
             <p:ph type="title"/>
           </p:nvPr>
         </p:nvSpPr>
-        <p:spPr>
-          <a:xfrm>
-            <a:off x="838200" y="365125"/>
-            <a:ext cx="10515600" cy="1325563"/>
-          </a:xfrm>
-        </p:spPr>
+        <p:spPr/>
         <p:txBody>
           <a:bodyPr/>
           <a:lstStyle/>
@@ -15953,6 +16274,34 @@
               <a:t>Secret Manager</a:t>
             </a:r>
             <a:endParaRPr lang="en-US" dirty="0"/>
+          </a:p>
+        </p:txBody>
+      </p:sp>
+      <p:sp>
+        <p:nvSpPr>
+          <p:cNvPr id="4" name="Text Placeholder 3">
+            <a:extLst>
+              <a:ext uri="{FF2B5EF4-FFF2-40B4-BE49-F238E27FC236}">
+                <a16:creationId xmlns:a16="http://schemas.microsoft.com/office/drawing/2014/main" id="{109FC969-AA43-422D-90BF-A85F00DB39CB}"/>
+              </a:ext>
+            </a:extLst>
+          </p:cNvPr>
+          <p:cNvSpPr>
+            <a:spLocks noGrp="1"/>
+          </p:cNvSpPr>
+          <p:nvPr>
+            <p:ph type="body" idx="1"/>
+          </p:nvPr>
+        </p:nvSpPr>
+        <p:spPr/>
+        <p:txBody>
+          <a:bodyPr/>
+          <a:lstStyle/>
+          <a:p>
+            <a:r>
+              <a:rPr lang="en-US" dirty="0"/>
+              <a:t>CLI</a:t>
+            </a:r>
           </a:p>
         </p:txBody>
       </p:sp>
@@ -15963,18 +16312,13 @@
             <a:spLocks noGrp="1"/>
           </p:cNvSpPr>
           <p:nvPr>
-            <p:ph idx="1"/>
-          </p:nvPr>
-        </p:nvSpPr>
-        <p:spPr>
-          <a:xfrm>
-            <a:off x="838200" y="1825625"/>
-            <a:ext cx="10515600" cy="4351338"/>
-          </a:xfrm>
-        </p:spPr>
+            <p:ph sz="half" idx="2"/>
+          </p:nvPr>
+        </p:nvSpPr>
+        <p:spPr/>
         <p:txBody>
           <a:bodyPr>
-            <a:normAutofit fontScale="92500" lnSpcReduction="10000"/>
+            <a:normAutofit fontScale="92500" lnSpcReduction="20000"/>
           </a:bodyPr>
           <a:lstStyle/>
           <a:p>
@@ -15997,28 +16341,38 @@
             </a:r>
           </a:p>
           <a:p>
-            <a:r>
-              <a:rPr lang="en-US" dirty="0"/>
-              <a:t>Visual Studio 2017</a:t>
-            </a:r>
-          </a:p>
-          <a:p>
-            <a:pPr lvl="1"/>
-            <a:r>
-              <a:rPr lang="en-US" dirty="0"/>
-              <a:t>.NET Core cross-platform development</a:t>
-            </a:r>
-          </a:p>
-          <a:p>
-            <a:pPr lvl="1"/>
-            <a:r>
-              <a:rPr lang="en-US" dirty="0"/>
-              <a:t>ASP.NET and web development</a:t>
-            </a:r>
-          </a:p>
-          <a:p>
             <a:pPr lvl="1"/>
             <a:endParaRPr lang="en-US" dirty="0"/>
+          </a:p>
+          <a:p>
+            <a:pPr marL="0" indent="0">
+              <a:buNone/>
+            </a:pPr>
+            <a:endParaRPr lang="en-US" b="1" dirty="0">
+              <a:solidFill>
+                <a:schemeClr val="accent4"/>
+              </a:solidFill>
+            </a:endParaRPr>
+          </a:p>
+          <a:p>
+            <a:pPr marL="0" indent="0">
+              <a:buNone/>
+            </a:pPr>
+            <a:endParaRPr lang="en-US" b="1" dirty="0">
+              <a:solidFill>
+                <a:schemeClr val="accent4"/>
+              </a:solidFill>
+            </a:endParaRPr>
+          </a:p>
+          <a:p>
+            <a:pPr marL="0" indent="0">
+              <a:buNone/>
+            </a:pPr>
+            <a:endParaRPr lang="en-US" b="1" dirty="0">
+              <a:solidFill>
+                <a:schemeClr val="accent4"/>
+              </a:solidFill>
+            </a:endParaRPr>
           </a:p>
           <a:p>
             <a:pPr marL="0" indent="0">
@@ -16051,30 +16405,142 @@
               </a:rPr>
               <a:t> dotnet user-secrets</a:t>
             </a:r>
+            <a:endParaRPr lang="en-US" dirty="0"/>
+          </a:p>
+        </p:txBody>
+      </p:sp>
+      <p:sp>
+        <p:nvSpPr>
+          <p:cNvPr id="5" name="Text Placeholder 4">
+            <a:extLst>
+              <a:ext uri="{FF2B5EF4-FFF2-40B4-BE49-F238E27FC236}">
+                <a16:creationId xmlns:a16="http://schemas.microsoft.com/office/drawing/2014/main" id="{ECDC9AF0-AA09-4AB1-A66F-A4F1038AE417}"/>
+              </a:ext>
+            </a:extLst>
+          </p:cNvPr>
+          <p:cNvSpPr>
+            <a:spLocks noGrp="1"/>
+          </p:cNvSpPr>
+          <p:nvPr>
+            <p:ph type="body" sz="quarter" idx="3"/>
+          </p:nvPr>
+        </p:nvSpPr>
+        <p:spPr>
+          <a:xfrm>
+            <a:off x="5421854" y="1681163"/>
+            <a:ext cx="5933534" cy="823912"/>
+          </a:xfrm>
+        </p:spPr>
+        <p:txBody>
+          <a:bodyPr/>
+          <a:lstStyle/>
+          <a:p>
             <a:r>
               <a:rPr lang="en-US" dirty="0"/>
-              <a:t> </a:t>
-            </a:r>
-          </a:p>
+              <a:t>IDE</a:t>
+            </a:r>
+          </a:p>
+        </p:txBody>
+      </p:sp>
+      <p:sp>
+        <p:nvSpPr>
+          <p:cNvPr id="6" name="Content Placeholder 5">
+            <a:extLst>
+              <a:ext uri="{FF2B5EF4-FFF2-40B4-BE49-F238E27FC236}">
+                <a16:creationId xmlns:a16="http://schemas.microsoft.com/office/drawing/2014/main" id="{3446258C-CBD9-4682-9583-5FEA1E9B2882}"/>
+              </a:ext>
+            </a:extLst>
+          </p:cNvPr>
+          <p:cNvSpPr>
+            <a:spLocks noGrp="1"/>
+          </p:cNvSpPr>
+          <p:nvPr>
+            <p:ph sz="quarter" idx="4"/>
+          </p:nvPr>
+        </p:nvSpPr>
+        <p:spPr>
+          <a:xfrm>
+            <a:off x="5421854" y="2505075"/>
+            <a:ext cx="5933534" cy="3684588"/>
+          </a:xfrm>
+        </p:spPr>
+        <p:txBody>
+          <a:bodyPr>
+            <a:normAutofit fontScale="92500" lnSpcReduction="20000"/>
+          </a:bodyPr>
+          <a:lstStyle/>
           <a:p>
             <a:pPr marL="0" indent="0">
               <a:buNone/>
             </a:pPr>
             <a:r>
+              <a:rPr lang="en-US" b="1" dirty="0">
+                <a:solidFill>
+                  <a:schemeClr val="accent4"/>
+                </a:solidFill>
+              </a:rPr>
+              <a:t>Prerequisites</a:t>
+            </a:r>
+          </a:p>
+          <a:p>
+            <a:r>
               <a:rPr lang="en-US" dirty="0"/>
-              <a:t>	- or -</a:t>
+              <a:t>.NET Core SDK v2.1</a:t>
+            </a:r>
+          </a:p>
+          <a:p>
+            <a:r>
+              <a:rPr lang="en-US" dirty="0"/>
+              <a:t>VS 2017</a:t>
+            </a:r>
+          </a:p>
+          <a:p>
+            <a:pPr lvl="1"/>
+            <a:r>
+              <a:rPr lang="en-US" dirty="0"/>
+              <a:t>.NET Core cross-platform development</a:t>
+            </a:r>
+          </a:p>
+          <a:p>
+            <a:pPr lvl="1"/>
+            <a:r>
+              <a:rPr lang="en-US" dirty="0"/>
+              <a:t>ASP.NET and web development</a:t>
             </a:r>
           </a:p>
           <a:p>
             <a:pPr marL="0" indent="0">
               <a:buNone/>
             </a:pPr>
+            <a:endParaRPr lang="en-US" b="1" dirty="0">
+              <a:solidFill>
+                <a:schemeClr val="accent4"/>
+              </a:solidFill>
+            </a:endParaRPr>
+          </a:p>
+          <a:p>
+            <a:pPr marL="0" indent="0">
+              <a:buNone/>
+            </a:pPr>
+            <a:r>
+              <a:rPr lang="en-US" b="1" dirty="0">
+                <a:solidFill>
+                  <a:schemeClr val="accent4"/>
+                </a:solidFill>
+              </a:rPr>
+              <a:t>Usage</a:t>
+            </a:r>
+          </a:p>
+          <a:p>
+            <a:pPr marL="0" indent="0">
+              <a:buNone/>
+            </a:pPr>
             <a:r>
               <a:rPr lang="en-US" dirty="0"/>
               <a:t>Solution Explorer </a:t>
             </a:r>
             <a:r>
-              <a:rPr lang="en-US" sz="3500" b="1" dirty="0"/>
+              <a:rPr lang="en-US" sz="3600" b="1" dirty="0"/>
               <a:t>&gt;</a:t>
             </a:r>
             <a:r>
@@ -16082,7 +16548,7 @@
               <a:t> right-click project </a:t>
             </a:r>
             <a:r>
-              <a:rPr lang="en-US" sz="3500" b="1" dirty="0"/>
+              <a:rPr lang="en-US" sz="3600" b="1" dirty="0"/>
               <a:t>&gt;</a:t>
             </a:r>
             <a:r>
@@ -16092,10 +16558,51 @@
           </a:p>
         </p:txBody>
       </p:sp>
+      <p:cxnSp>
+        <p:nvCxnSpPr>
+          <p:cNvPr id="8" name="Straight Connector 7">
+            <a:extLst>
+              <a:ext uri="{FF2B5EF4-FFF2-40B4-BE49-F238E27FC236}">
+                <a16:creationId xmlns:a16="http://schemas.microsoft.com/office/drawing/2014/main" id="{F0E94C23-5E74-4562-86A4-F6B443133B32}"/>
+              </a:ext>
+            </a:extLst>
+          </p:cNvPr>
+          <p:cNvCxnSpPr/>
+          <p:nvPr/>
+        </p:nvCxnSpPr>
+        <p:spPr>
+          <a:xfrm>
+            <a:off x="5267661" y="1925619"/>
+            <a:ext cx="0" cy="4264044"/>
+          </a:xfrm>
+          <a:prstGeom prst="line">
+            <a:avLst/>
+          </a:prstGeom>
+          <a:ln w="38100">
+            <a:solidFill>
+              <a:schemeClr val="tx2"/>
+            </a:solidFill>
+          </a:ln>
+        </p:spPr>
+        <p:style>
+          <a:lnRef idx="3">
+            <a:schemeClr val="accent1"/>
+          </a:lnRef>
+          <a:fillRef idx="0">
+            <a:schemeClr val="accent1"/>
+          </a:fillRef>
+          <a:effectRef idx="2">
+            <a:schemeClr val="accent1"/>
+          </a:effectRef>
+          <a:fontRef idx="minor">
+            <a:schemeClr val="tx1"/>
+          </a:fontRef>
+        </p:style>
+      </p:cxnSp>
     </p:spTree>
     <p:extLst>
       <p:ext uri="{BB962C8B-B14F-4D97-AF65-F5344CB8AC3E}">
-        <p14:creationId xmlns:p14="http://schemas.microsoft.com/office/powerpoint/2010/main" val="1291707926"/>
+        <p14:creationId xmlns:p14="http://schemas.microsoft.com/office/powerpoint/2010/main" val="394954555"/>
       </p:ext>
     </p:extLst>
   </p:cSld>
@@ -16187,7 +16694,7 @@
                                         <p:tgtEl>
                                           <p:spTgt spid="3">
                                             <p:txEl>
-                                              <p:pRg st="2" end="2"/>
+                                              <p:pRg st="6" end="6"/>
                                             </p:txEl>
                                           </p:spTgt>
                                         </p:tgtEl>
@@ -16218,198 +16725,7 @@
                                         <p:tgtEl>
                                           <p:spTgt spid="3">
                                             <p:txEl>
-                                              <p:pRg st="3" end="3"/>
-                                            </p:txEl>
-                                          </p:spTgt>
-                                        </p:tgtEl>
-                                        <p:attrNameLst>
-                                          <p:attrName>style.visibility</p:attrName>
-                                        </p:attrNameLst>
-                                      </p:cBhvr>
-                                      <p:to>
-                                        <p:strVal val="visible"/>
-                                      </p:to>
-                                    </p:set>
-                                  </p:childTnLst>
-                                </p:cTn>
-                              </p:par>
-                              <p:par>
-                                <p:cTn id="13" presetID="1" presetClass="entr" presetSubtype="0" fill="hold" nodeType="withEffect">
-                                  <p:stCondLst>
-                                    <p:cond delay="0"/>
-                                  </p:stCondLst>
-                                  <p:childTnLst>
-                                    <p:set>
-                                      <p:cBhvr>
-                                        <p:cTn id="14" dur="1" fill="hold">
-                                          <p:stCondLst>
-                                            <p:cond delay="0"/>
-                                          </p:stCondLst>
-                                        </p:cTn>
-                                        <p:tgtEl>
-                                          <p:spTgt spid="3">
-                                            <p:txEl>
-                                              <p:pRg st="4" end="4"/>
-                                            </p:txEl>
-                                          </p:spTgt>
-                                        </p:tgtEl>
-                                        <p:attrNameLst>
-                                          <p:attrName>style.visibility</p:attrName>
-                                        </p:attrNameLst>
-                                      </p:cBhvr>
-                                      <p:to>
-                                        <p:strVal val="visible"/>
-                                      </p:to>
-                                    </p:set>
-                                  </p:childTnLst>
-                                </p:cTn>
-                              </p:par>
-                            </p:childTnLst>
-                          </p:cTn>
-                        </p:par>
-                      </p:childTnLst>
-                    </p:cTn>
-                  </p:par>
-                  <p:par>
-                    <p:cTn id="15" fill="hold">
-                      <p:stCondLst>
-                        <p:cond delay="indefinite"/>
-                      </p:stCondLst>
-                      <p:childTnLst>
-                        <p:par>
-                          <p:cTn id="16" fill="hold">
-                            <p:stCondLst>
-                              <p:cond delay="0"/>
-                            </p:stCondLst>
-                            <p:childTnLst>
-                              <p:par>
-                                <p:cTn id="17" presetID="1" presetClass="entr" presetSubtype="0" fill="hold" nodeType="clickEffect">
-                                  <p:stCondLst>
-                                    <p:cond delay="0"/>
-                                  </p:stCondLst>
-                                  <p:childTnLst>
-                                    <p:set>
-                                      <p:cBhvr>
-                                        <p:cTn id="18" dur="1" fill="hold">
-                                          <p:stCondLst>
-                                            <p:cond delay="0"/>
-                                          </p:stCondLst>
-                                        </p:cTn>
-                                        <p:tgtEl>
-                                          <p:spTgt spid="3">
-                                            <p:txEl>
-                                              <p:pRg st="6" end="6"/>
-                                            </p:txEl>
-                                          </p:spTgt>
-                                        </p:tgtEl>
-                                        <p:attrNameLst>
-                                          <p:attrName>style.visibility</p:attrName>
-                                        </p:attrNameLst>
-                                      </p:cBhvr>
-                                      <p:to>
-                                        <p:strVal val="visible"/>
-                                      </p:to>
-                                    </p:set>
-                                  </p:childTnLst>
-                                </p:cTn>
-                              </p:par>
-                              <p:par>
-                                <p:cTn id="19" presetID="1" presetClass="entr" presetSubtype="0" fill="hold" nodeType="withEffect">
-                                  <p:stCondLst>
-                                    <p:cond delay="0"/>
-                                  </p:stCondLst>
-                                  <p:childTnLst>
-                                    <p:set>
-                                      <p:cBhvr>
-                                        <p:cTn id="20" dur="1" fill="hold">
-                                          <p:stCondLst>
-                                            <p:cond delay="0"/>
-                                          </p:stCondLst>
-                                        </p:cTn>
-                                        <p:tgtEl>
-                                          <p:spTgt spid="3">
-                                            <p:txEl>
                                               <p:pRg st="7" end="7"/>
-                                            </p:txEl>
-                                          </p:spTgt>
-                                        </p:tgtEl>
-                                        <p:attrNameLst>
-                                          <p:attrName>style.visibility</p:attrName>
-                                        </p:attrNameLst>
-                                      </p:cBhvr>
-                                      <p:to>
-                                        <p:strVal val="visible"/>
-                                      </p:to>
-                                    </p:set>
-                                  </p:childTnLst>
-                                </p:cTn>
-                              </p:par>
-                            </p:childTnLst>
-                          </p:cTn>
-                        </p:par>
-                      </p:childTnLst>
-                    </p:cTn>
-                  </p:par>
-                  <p:par>
-                    <p:cTn id="21" fill="hold">
-                      <p:stCondLst>
-                        <p:cond delay="indefinite"/>
-                      </p:stCondLst>
-                      <p:childTnLst>
-                        <p:par>
-                          <p:cTn id="22" fill="hold">
-                            <p:stCondLst>
-                              <p:cond delay="0"/>
-                            </p:stCondLst>
-                            <p:childTnLst>
-                              <p:par>
-                                <p:cTn id="23" presetID="1" presetClass="entr" presetSubtype="0" fill="hold" nodeType="clickEffect">
-                                  <p:stCondLst>
-                                    <p:cond delay="0"/>
-                                  </p:stCondLst>
-                                  <p:childTnLst>
-                                    <p:set>
-                                      <p:cBhvr>
-                                        <p:cTn id="24" dur="1" fill="hold">
-                                          <p:stCondLst>
-                                            <p:cond delay="0"/>
-                                          </p:stCondLst>
-                                        </p:cTn>
-                                        <p:tgtEl>
-                                          <p:spTgt spid="3">
-                                            <p:txEl>
-                                              <p:pRg st="8" end="8"/>
-                                            </p:txEl>
-                                          </p:spTgt>
-                                        </p:tgtEl>
-                                        <p:attrNameLst>
-                                          <p:attrName>style.visibility</p:attrName>
-                                        </p:attrNameLst>
-                                      </p:cBhvr>
-                                      <p:to>
-                                        <p:strVal val="visible"/>
-                                      </p:to>
-                                    </p:set>
-                                  </p:childTnLst>
-                                </p:cTn>
-                              </p:par>
-                              <p:par>
-                                <p:cTn id="25" presetID="1" presetClass="entr" presetSubtype="0" fill="hold" nodeType="withEffect">
-                                  <p:stCondLst>
-                                    <p:cond delay="0"/>
-                                  </p:stCondLst>
-                                  <p:childTnLst>
-                                    <p:set>
-                                      <p:cBhvr>
-                                        <p:cTn id="26" dur="1" fill="hold">
-                                          <p:stCondLst>
-                                            <p:cond delay="0"/>
-                                          </p:stCondLst>
-                                        </p:cTn>
-                                        <p:tgtEl>
-                                          <p:spTgt spid="3">
-                                            <p:txEl>
-                                              <p:pRg st="9" end="9"/>
                                             </p:txEl>
                                           </p:spTgt>
                                         </p:tgtEl>

</xml_diff>

<commit_message>
Add Key Vault build task content
</commit_message>
<xml_diff>
--- a/Protecting App Secrets.pptx
+++ b/Protecting App Secrets.pptx
@@ -6,7 +6,7 @@
     <p:sldMasterId id="2147483660" r:id="rId2"/>
   </p:sldMasterIdLst>
   <p:notesMasterIdLst>
-    <p:notesMasterId r:id="rId18"/>
+    <p:notesMasterId r:id="rId19"/>
   </p:notesMasterIdLst>
   <p:sldIdLst>
     <p:sldId id="256" r:id="rId3"/>
@@ -21,9 +21,10 @@
     <p:sldId id="338" r:id="rId12"/>
     <p:sldId id="335" r:id="rId13"/>
     <p:sldId id="336" r:id="rId14"/>
-    <p:sldId id="331" r:id="rId15"/>
-    <p:sldId id="334" r:id="rId16"/>
-    <p:sldId id="326" r:id="rId17"/>
+    <p:sldId id="339" r:id="rId15"/>
+    <p:sldId id="331" r:id="rId16"/>
+    <p:sldId id="334" r:id="rId17"/>
+    <p:sldId id="326" r:id="rId18"/>
   </p:sldIdLst>
   <p:sldSz cx="12192000" cy="6858000"/>
   <p:notesSz cx="6858000" cy="9144000"/>
@@ -223,7 +224,7 @@
           <a:p>
             <a:fld id="{03886B9A-ACA2-4D2C-AAF6-D8003DE96699}" type="datetimeFigureOut">
               <a:rPr lang="en-US" smtClean="0"/>
-              <a:t>9/4/2018</a:t>
+              <a:t>9/19/2018</a:t>
             </a:fld>
             <a:endParaRPr lang="en-US"/>
           </a:p>
@@ -1095,7 +1096,24 @@
           <a:bodyPr/>
           <a:lstStyle/>
           <a:p>
-            <a:endParaRPr lang="en-US" dirty="0"/>
+            <a:pPr marL="171450" indent="-171450">
+              <a:buFontTx/>
+              <a:buChar char="-"/>
+            </a:pPr>
+            <a:r>
+              <a:rPr lang="en-US" dirty="0"/>
+              <a:t>Download secrets from key vault with build task</a:t>
+            </a:r>
+          </a:p>
+          <a:p>
+            <a:pPr marL="628650" lvl="1" indent="-171450">
+              <a:buFontTx/>
+              <a:buChar char="-"/>
+            </a:pPr>
+            <a:r>
+              <a:rPr lang="en-US" dirty="0"/>
+              <a:t>Can use secrets as task variables in other build tasks</a:t>
+            </a:r>
           </a:p>
         </p:txBody>
       </p:sp>
@@ -1185,7 +1203,7 @@
     </p:spTree>
     <p:extLst>
       <p:ext uri="{BB962C8B-B14F-4D97-AF65-F5344CB8AC3E}">
-        <p14:creationId xmlns:p14="http://schemas.microsoft.com/office/powerpoint/2010/main" val="2232734480"/>
+        <p14:creationId xmlns:p14="http://schemas.microsoft.com/office/powerpoint/2010/main" val="585389256"/>
       </p:ext>
     </p:extLst>
   </p:cSld>
@@ -1329,7 +1347,7 @@
     </p:spTree>
     <p:extLst>
       <p:ext uri="{BB962C8B-B14F-4D97-AF65-F5344CB8AC3E}">
-        <p14:creationId xmlns:p14="http://schemas.microsoft.com/office/powerpoint/2010/main" val="1203295569"/>
+        <p14:creationId xmlns:p14="http://schemas.microsoft.com/office/powerpoint/2010/main" val="2232734480"/>
       </p:ext>
     </p:extLst>
   </p:cSld>
@@ -1383,7 +1401,7 @@
           <a:bodyPr/>
           <a:lstStyle/>
           <a:p>
-            <a:endParaRPr lang="en-US"/>
+            <a:endParaRPr lang="en-US" dirty="0"/>
           </a:p>
         </p:txBody>
       </p:sp>
@@ -1473,6 +1491,150 @@
     </p:spTree>
     <p:extLst>
       <p:ext uri="{BB962C8B-B14F-4D97-AF65-F5344CB8AC3E}">
+        <p14:creationId xmlns:p14="http://schemas.microsoft.com/office/powerpoint/2010/main" val="1203295569"/>
+      </p:ext>
+    </p:extLst>
+  </p:cSld>
+  <p:clrMapOvr>
+    <a:masterClrMapping/>
+  </p:clrMapOvr>
+</p:notes>
+</file>
+
+<file path=ppt/notesSlides/notesSlide16.xml><?xml version="1.0" encoding="utf-8"?>
+<p:notes xmlns:a="http://schemas.openxmlformats.org/drawingml/2006/main" xmlns:r="http://schemas.openxmlformats.org/officeDocument/2006/relationships" xmlns:p="http://schemas.openxmlformats.org/presentationml/2006/main">
+  <p:cSld>
+    <p:spTree>
+      <p:nvGrpSpPr>
+        <p:cNvPr id="1" name=""/>
+        <p:cNvGrpSpPr/>
+        <p:nvPr/>
+      </p:nvGrpSpPr>
+      <p:grpSpPr>
+        <a:xfrm>
+          <a:off x="0" y="0"/>
+          <a:ext cx="0" cy="0"/>
+          <a:chOff x="0" y="0"/>
+          <a:chExt cx="0" cy="0"/>
+        </a:xfrm>
+      </p:grpSpPr>
+      <p:sp>
+        <p:nvSpPr>
+          <p:cNvPr id="2" name="Slide Image Placeholder 1"/>
+          <p:cNvSpPr>
+            <a:spLocks noGrp="1" noRot="1" noChangeAspect="1"/>
+          </p:cNvSpPr>
+          <p:nvPr>
+            <p:ph type="sldImg"/>
+          </p:nvPr>
+        </p:nvSpPr>
+        <p:spPr/>
+      </p:sp>
+      <p:sp>
+        <p:nvSpPr>
+          <p:cNvPr id="3" name="Notes Placeholder 2"/>
+          <p:cNvSpPr>
+            <a:spLocks noGrp="1"/>
+          </p:cNvSpPr>
+          <p:nvPr>
+            <p:ph type="body" idx="1"/>
+          </p:nvPr>
+        </p:nvSpPr>
+        <p:spPr/>
+        <p:txBody>
+          <a:bodyPr/>
+          <a:lstStyle/>
+          <a:p>
+            <a:endParaRPr lang="en-US"/>
+          </a:p>
+        </p:txBody>
+      </p:sp>
+      <p:sp>
+        <p:nvSpPr>
+          <p:cNvPr id="4" name="Slide Number Placeholder 3"/>
+          <p:cNvSpPr>
+            <a:spLocks noGrp="1"/>
+          </p:cNvSpPr>
+          <p:nvPr>
+            <p:ph type="sldNum" sz="quarter" idx="10"/>
+          </p:nvPr>
+        </p:nvSpPr>
+        <p:spPr/>
+        <p:txBody>
+          <a:bodyPr/>
+          <a:lstStyle/>
+          <a:p>
+            <a:pPr marL="0" marR="0" lvl="0" indent="0" algn="r" defTabSz="457200" rtl="0" eaLnBrk="1" fontAlgn="auto" latinLnBrk="0" hangingPunct="1">
+              <a:lnSpc>
+                <a:spcPct val="100000"/>
+              </a:lnSpc>
+              <a:spcBef>
+                <a:spcPts val="0"/>
+              </a:spcBef>
+              <a:spcAft>
+                <a:spcPts val="0"/>
+              </a:spcAft>
+              <a:buClrTx/>
+              <a:buSzTx/>
+              <a:buFontTx/>
+              <a:buNone/>
+              <a:tabLst/>
+              <a:defRPr/>
+            </a:pPr>
+            <a:fld id="{16A87904-88DE-4022-A424-ACD2E6FC1751}" type="slidenum">
+              <a:rPr kumimoji="0" lang="en-US" sz="1200" b="0" i="0" u="none" strike="noStrike" kern="1200" cap="none" spc="0" normalizeH="0" baseline="0" noProof="0" smtClean="0">
+                <a:ln>
+                  <a:noFill/>
+                </a:ln>
+                <a:solidFill>
+                  <a:prstClr val="black"/>
+                </a:solidFill>
+                <a:effectLst/>
+                <a:uLnTx/>
+                <a:uFillTx/>
+                <a:latin typeface="Calibri" panose="020F0502020204030204"/>
+                <a:ea typeface="+mn-ea"/>
+                <a:cs typeface="+mn-cs"/>
+              </a:rPr>
+              <a:pPr marL="0" marR="0" lvl="0" indent="0" algn="r" defTabSz="457200" rtl="0" eaLnBrk="1" fontAlgn="auto" latinLnBrk="0" hangingPunct="1">
+                <a:lnSpc>
+                  <a:spcPct val="100000"/>
+                </a:lnSpc>
+                <a:spcBef>
+                  <a:spcPts val="0"/>
+                </a:spcBef>
+                <a:spcAft>
+                  <a:spcPts val="0"/>
+                </a:spcAft>
+                <a:buClrTx/>
+                <a:buSzTx/>
+                <a:buFontTx/>
+                <a:buNone/>
+                <a:tabLst/>
+                <a:defRPr/>
+              </a:pPr>
+              <a:t>16</a:t>
+            </a:fld>
+            <a:endParaRPr kumimoji="0" lang="en-US" sz="1200" b="0" i="0" u="none" strike="noStrike" kern="1200" cap="none" spc="0" normalizeH="0" baseline="0" noProof="0">
+              <a:ln>
+                <a:noFill/>
+              </a:ln>
+              <a:solidFill>
+                <a:prstClr val="black"/>
+              </a:solidFill>
+              <a:effectLst/>
+              <a:uLnTx/>
+              <a:uFillTx/>
+              <a:latin typeface="Calibri" panose="020F0502020204030204"/>
+              <a:ea typeface="+mn-ea"/>
+              <a:cs typeface="+mn-cs"/>
+            </a:endParaRPr>
+          </a:p>
+        </p:txBody>
+      </p:sp>
+    </p:spTree>
+    <p:extLst>
+      <p:ext uri="{BB962C8B-B14F-4D97-AF65-F5344CB8AC3E}">
         <p14:creationId xmlns:p14="http://schemas.microsoft.com/office/powerpoint/2010/main" val="2271797707"/>
       </p:ext>
     </p:extLst>
@@ -2836,7 +2998,7 @@
           <a:p>
             <a:fld id="{B5D86D52-4857-4668-9EB7-B41E21252CF7}" type="datetimeFigureOut">
               <a:rPr lang="en-US" smtClean="0"/>
-              <a:t>9/4/2018</a:t>
+              <a:t>9/19/2018</a:t>
             </a:fld>
             <a:endParaRPr lang="en-US"/>
           </a:p>
@@ -3034,7 +3196,7 @@
           <a:p>
             <a:fld id="{B5D86D52-4857-4668-9EB7-B41E21252CF7}" type="datetimeFigureOut">
               <a:rPr lang="en-US" smtClean="0"/>
-              <a:t>9/4/2018</a:t>
+              <a:t>9/19/2018</a:t>
             </a:fld>
             <a:endParaRPr lang="en-US"/>
           </a:p>
@@ -3242,7 +3404,7 @@
           <a:p>
             <a:fld id="{B5D86D52-4857-4668-9EB7-B41E21252CF7}" type="datetimeFigureOut">
               <a:rPr lang="en-US" smtClean="0"/>
-              <a:t>9/4/2018</a:t>
+              <a:t>9/19/2018</a:t>
             </a:fld>
             <a:endParaRPr lang="en-US"/>
           </a:p>
@@ -3446,7 +3608,7 @@
           <a:p>
             <a:fld id="{EEC3160E-2579-4584-9765-DC1BA0B358F9}" type="datetimeFigureOut">
               <a:rPr lang="en-US" smtClean="0"/>
-              <a:t>9/4/2018</a:t>
+              <a:t>9/19/2018</a:t>
             </a:fld>
             <a:endParaRPr lang="en-US"/>
           </a:p>
@@ -3616,7 +3778,7 @@
           <a:p>
             <a:fld id="{EEC3160E-2579-4584-9765-DC1BA0B358F9}" type="datetimeFigureOut">
               <a:rPr lang="en-US" smtClean="0"/>
-              <a:t>9/4/2018</a:t>
+              <a:t>9/19/2018</a:t>
             </a:fld>
             <a:endParaRPr lang="en-US"/>
           </a:p>
@@ -3862,7 +4024,7 @@
           <a:p>
             <a:fld id="{EEC3160E-2579-4584-9765-DC1BA0B358F9}" type="datetimeFigureOut">
               <a:rPr lang="en-US" smtClean="0"/>
-              <a:t>9/4/2018</a:t>
+              <a:t>9/19/2018</a:t>
             </a:fld>
             <a:endParaRPr lang="en-US"/>
           </a:p>
@@ -4094,7 +4256,7 @@
           <a:p>
             <a:fld id="{EEC3160E-2579-4584-9765-DC1BA0B358F9}" type="datetimeFigureOut">
               <a:rPr lang="en-US" smtClean="0"/>
-              <a:t>9/4/2018</a:t>
+              <a:t>9/19/2018</a:t>
             </a:fld>
             <a:endParaRPr lang="en-US"/>
           </a:p>
@@ -4461,7 +4623,7 @@
           <a:p>
             <a:fld id="{EEC3160E-2579-4584-9765-DC1BA0B358F9}" type="datetimeFigureOut">
               <a:rPr lang="en-US" smtClean="0"/>
-              <a:t>9/4/2018</a:t>
+              <a:t>9/19/2018</a:t>
             </a:fld>
             <a:endParaRPr lang="en-US"/>
           </a:p>
@@ -4579,7 +4741,7 @@
           <a:p>
             <a:fld id="{EEC3160E-2579-4584-9765-DC1BA0B358F9}" type="datetimeFigureOut">
               <a:rPr lang="en-US" smtClean="0"/>
-              <a:t>9/4/2018</a:t>
+              <a:t>9/19/2018</a:t>
             </a:fld>
             <a:endParaRPr lang="en-US"/>
           </a:p>
@@ -4674,7 +4836,7 @@
           <a:p>
             <a:fld id="{EEC3160E-2579-4584-9765-DC1BA0B358F9}" type="datetimeFigureOut">
               <a:rPr lang="en-US" smtClean="0"/>
-              <a:t>9/4/2018</a:t>
+              <a:t>9/19/2018</a:t>
             </a:fld>
             <a:endParaRPr lang="en-US"/>
           </a:p>
@@ -4951,7 +5113,7 @@
           <a:p>
             <a:fld id="{EEC3160E-2579-4584-9765-DC1BA0B358F9}" type="datetimeFigureOut">
               <a:rPr lang="en-US" smtClean="0"/>
-              <a:t>9/4/2018</a:t>
+              <a:t>9/19/2018</a:t>
             </a:fld>
             <a:endParaRPr lang="en-US"/>
           </a:p>
@@ -5137,7 +5299,7 @@
           <a:p>
             <a:fld id="{B5D86D52-4857-4668-9EB7-B41E21252CF7}" type="datetimeFigureOut">
               <a:rPr lang="en-US" smtClean="0"/>
-              <a:t>9/4/2018</a:t>
+              <a:t>9/19/2018</a:t>
             </a:fld>
             <a:endParaRPr lang="en-US"/>
           </a:p>
@@ -5406,7 +5568,7 @@
           <a:p>
             <a:fld id="{EEC3160E-2579-4584-9765-DC1BA0B358F9}" type="datetimeFigureOut">
               <a:rPr lang="en-US" smtClean="0"/>
-              <a:t>9/4/2018</a:t>
+              <a:t>9/19/2018</a:t>
             </a:fld>
             <a:endParaRPr lang="en-US"/>
           </a:p>
@@ -5576,7 +5738,7 @@
           <a:p>
             <a:fld id="{EEC3160E-2579-4584-9765-DC1BA0B358F9}" type="datetimeFigureOut">
               <a:rPr lang="en-US" smtClean="0"/>
-              <a:t>9/4/2018</a:t>
+              <a:t>9/19/2018</a:t>
             </a:fld>
             <a:endParaRPr lang="en-US"/>
           </a:p>
@@ -5756,7 +5918,7 @@
           <a:p>
             <a:fld id="{EEC3160E-2579-4584-9765-DC1BA0B358F9}" type="datetimeFigureOut">
               <a:rPr lang="en-US" smtClean="0"/>
-              <a:t>9/4/2018</a:t>
+              <a:t>9/19/2018</a:t>
             </a:fld>
             <a:endParaRPr lang="en-US"/>
           </a:p>
@@ -6019,7 +6181,7 @@
           <a:p>
             <a:fld id="{B5D86D52-4857-4668-9EB7-B41E21252CF7}" type="datetimeFigureOut">
               <a:rPr lang="en-US" smtClean="0"/>
-              <a:t>9/4/2018</a:t>
+              <a:t>9/19/2018</a:t>
             </a:fld>
             <a:endParaRPr lang="en-US"/>
           </a:p>
@@ -6284,7 +6446,7 @@
           <a:p>
             <a:fld id="{B5D86D52-4857-4668-9EB7-B41E21252CF7}" type="datetimeFigureOut">
               <a:rPr lang="en-US" smtClean="0"/>
-              <a:t>9/4/2018</a:t>
+              <a:t>9/19/2018</a:t>
             </a:fld>
             <a:endParaRPr lang="en-US"/>
           </a:p>
@@ -6696,7 +6858,7 @@
           <a:p>
             <a:fld id="{B5D86D52-4857-4668-9EB7-B41E21252CF7}" type="datetimeFigureOut">
               <a:rPr lang="en-US" smtClean="0"/>
-              <a:t>9/4/2018</a:t>
+              <a:t>9/19/2018</a:t>
             </a:fld>
             <a:endParaRPr lang="en-US"/>
           </a:p>
@@ -6837,7 +6999,7 @@
           <a:p>
             <a:fld id="{B5D86D52-4857-4668-9EB7-B41E21252CF7}" type="datetimeFigureOut">
               <a:rPr lang="en-US" smtClean="0"/>
-              <a:t>9/4/2018</a:t>
+              <a:t>9/19/2018</a:t>
             </a:fld>
             <a:endParaRPr lang="en-US"/>
           </a:p>
@@ -6950,7 +7112,7 @@
           <a:p>
             <a:fld id="{B5D86D52-4857-4668-9EB7-B41E21252CF7}" type="datetimeFigureOut">
               <a:rPr lang="en-US" smtClean="0"/>
-              <a:t>9/4/2018</a:t>
+              <a:t>9/19/2018</a:t>
             </a:fld>
             <a:endParaRPr lang="en-US"/>
           </a:p>
@@ -7261,7 +7423,7 @@
           <a:p>
             <a:fld id="{B5D86D52-4857-4668-9EB7-B41E21252CF7}" type="datetimeFigureOut">
               <a:rPr lang="en-US" smtClean="0"/>
-              <a:t>9/4/2018</a:t>
+              <a:t>9/19/2018</a:t>
             </a:fld>
             <a:endParaRPr lang="en-US"/>
           </a:p>
@@ -7549,7 +7711,7 @@
           <a:p>
             <a:fld id="{B5D86D52-4857-4668-9EB7-B41E21252CF7}" type="datetimeFigureOut">
               <a:rPr lang="en-US" smtClean="0"/>
-              <a:t>9/4/2018</a:t>
+              <a:t>9/19/2018</a:t>
             </a:fld>
             <a:endParaRPr lang="en-US"/>
           </a:p>
@@ -7790,7 +7952,7 @@
           <a:p>
             <a:fld id="{B5D86D52-4857-4668-9EB7-B41E21252CF7}" type="datetimeFigureOut">
               <a:rPr lang="en-US" smtClean="0"/>
-              <a:t>9/4/2018</a:t>
+              <a:t>9/19/2018</a:t>
             </a:fld>
             <a:endParaRPr lang="en-US"/>
           </a:p>
@@ -8342,7 +8504,7 @@
           <a:p>
             <a:fld id="{EEC3160E-2579-4584-9765-DC1BA0B358F9}" type="datetimeFigureOut">
               <a:rPr lang="en-US" smtClean="0"/>
-              <a:t>9/4/2018</a:t>
+              <a:t>9/19/2018</a:t>
             </a:fld>
             <a:endParaRPr lang="en-US"/>
           </a:p>
@@ -11557,6 +11719,9 @@
           <a:bodyPr/>
           <a:lstStyle/>
           <a:p>
+            <a:pPr marL="0" indent="0">
+              <a:buNone/>
+            </a:pPr>
             <a:r>
               <a:rPr lang="en-US" dirty="0"/>
               <a:t>ASP.NET Core app:</a:t>
@@ -11575,20 +11740,10 @@
             <a:endParaRPr lang="en-US" dirty="0"/>
           </a:p>
           <a:p>
+            <a:pPr marL="0" indent="0">
+              <a:buNone/>
+            </a:pPr>
             <a:endParaRPr lang="en-US" dirty="0"/>
-          </a:p>
-          <a:p>
-            <a:r>
-              <a:rPr lang="en-US" dirty="0"/>
-              <a:t>Azure Pipelines build:</a:t>
-            </a:r>
-          </a:p>
-          <a:p>
-            <a:pPr lvl="1"/>
-            <a:r>
-              <a:rPr lang="en-US" dirty="0"/>
-              <a:t>Azure Key Vault task</a:t>
-            </a:r>
           </a:p>
         </p:txBody>
       </p:sp>
@@ -12322,6 +12477,370 @@
     <p:bg>
       <p:bgPr>
         <a:solidFill>
+          <a:srgbClr val="505050"/>
+        </a:solidFill>
+        <a:effectLst/>
+      </p:bgPr>
+    </p:bg>
+    <p:spTree>
+      <p:nvGrpSpPr>
+        <p:cNvPr id="1" name=""/>
+        <p:cNvGrpSpPr/>
+        <p:nvPr/>
+      </p:nvGrpSpPr>
+      <p:grpSpPr>
+        <a:xfrm>
+          <a:off x="0" y="0"/>
+          <a:ext cx="0" cy="0"/>
+          <a:chOff x="0" y="0"/>
+          <a:chExt cx="0" cy="0"/>
+        </a:xfrm>
+      </p:grpSpPr>
+      <p:sp>
+        <p:nvSpPr>
+          <p:cNvPr id="2" name="Title 1"/>
+          <p:cNvSpPr>
+            <a:spLocks noGrp="1"/>
+          </p:cNvSpPr>
+          <p:nvPr>
+            <p:ph type="title"/>
+          </p:nvPr>
+        </p:nvSpPr>
+        <p:spPr/>
+        <p:txBody>
+          <a:bodyPr/>
+          <a:lstStyle/>
+          <a:p>
+            <a:r>
+              <a:rPr lang="en-US" dirty="0"/>
+              <a:t>Key Vault: Retrieval (cont.)</a:t>
+            </a:r>
+          </a:p>
+        </p:txBody>
+      </p:sp>
+      <p:sp>
+        <p:nvSpPr>
+          <p:cNvPr id="3" name="Content Placeholder 2">
+            <a:extLst>
+              <a:ext uri="{FF2B5EF4-FFF2-40B4-BE49-F238E27FC236}">
+                <a16:creationId xmlns:a16="http://schemas.microsoft.com/office/drawing/2014/main" id="{309C1DDD-9C6F-4C98-B29C-D7570234B882}"/>
+              </a:ext>
+            </a:extLst>
+          </p:cNvPr>
+          <p:cNvSpPr>
+            <a:spLocks noGrp="1"/>
+          </p:cNvSpPr>
+          <p:nvPr>
+            <p:ph idx="1"/>
+          </p:nvPr>
+        </p:nvSpPr>
+        <p:spPr/>
+        <p:txBody>
+          <a:bodyPr/>
+          <a:lstStyle/>
+          <a:p>
+            <a:pPr marL="0" indent="0">
+              <a:buNone/>
+            </a:pPr>
+            <a:r>
+              <a:rPr lang="en-US" dirty="0"/>
+              <a:t>Azure Pipelines build:</a:t>
+            </a:r>
+          </a:p>
+          <a:p>
+            <a:pPr lvl="1"/>
+            <a:r>
+              <a:rPr lang="en-US" dirty="0"/>
+              <a:t>Azure Key Vault task</a:t>
+            </a:r>
+          </a:p>
+          <a:p>
+            <a:pPr marL="457200" lvl="1" indent="0">
+              <a:buNone/>
+            </a:pPr>
+            <a:endParaRPr lang="en-US" dirty="0"/>
+          </a:p>
+        </p:txBody>
+      </p:sp>
+      <p:pic>
+        <p:nvPicPr>
+          <p:cNvPr id="4" name="Picture 3">
+            <a:extLst>
+              <a:ext uri="{FF2B5EF4-FFF2-40B4-BE49-F238E27FC236}">
+                <a16:creationId xmlns:a16="http://schemas.microsoft.com/office/drawing/2014/main" id="{9761853C-59CC-49CF-A4E2-54A3B3A2EF92}"/>
+              </a:ext>
+            </a:extLst>
+          </p:cNvPr>
+          <p:cNvPicPr>
+            <a:picLocks noChangeAspect="1"/>
+          </p:cNvPicPr>
+          <p:nvPr/>
+        </p:nvPicPr>
+        <p:blipFill>
+          <a:blip r:embed="rId3"/>
+          <a:stretch>
+            <a:fillRect/>
+          </a:stretch>
+        </p:blipFill>
+        <p:spPr>
+          <a:xfrm>
+            <a:off x="6143625" y="1576388"/>
+            <a:ext cx="5210175" cy="4600575"/>
+          </a:xfrm>
+          <a:prstGeom prst="rect">
+            <a:avLst/>
+          </a:prstGeom>
+        </p:spPr>
+      </p:pic>
+      <p:pic>
+        <p:nvPicPr>
+          <p:cNvPr id="5" name="Picture 4">
+            <a:extLst>
+              <a:ext uri="{FF2B5EF4-FFF2-40B4-BE49-F238E27FC236}">
+                <a16:creationId xmlns:a16="http://schemas.microsoft.com/office/drawing/2014/main" id="{AEE02EFB-0CE1-466A-BCC7-C684081FF5E8}"/>
+              </a:ext>
+              <a:ext uri="{C183D7F6-B498-43B3-948B-1728B52AA6E4}">
+                <adec:decorative xmlns:adec="http://schemas.microsoft.com/office/drawing/2017/decorative" val="1"/>
+              </a:ext>
+            </a:extLst>
+          </p:cNvPr>
+          <p:cNvPicPr>
+            <a:picLocks noChangeAspect="1"/>
+          </p:cNvPicPr>
+          <p:nvPr/>
+        </p:nvPicPr>
+        <p:blipFill>
+          <a:blip r:embed="rId4"/>
+          <a:stretch>
+            <a:fillRect/>
+          </a:stretch>
+        </p:blipFill>
+        <p:spPr>
+          <a:xfrm>
+            <a:off x="4363361" y="1801851"/>
+            <a:ext cx="722780" cy="720000"/>
+          </a:xfrm>
+          <a:prstGeom prst="rect">
+            <a:avLst/>
+          </a:prstGeom>
+        </p:spPr>
+      </p:pic>
+      <p:pic>
+        <p:nvPicPr>
+          <p:cNvPr id="7" name="Picture 6">
+            <a:extLst>
+              <a:ext uri="{FF2B5EF4-FFF2-40B4-BE49-F238E27FC236}">
+                <a16:creationId xmlns:a16="http://schemas.microsoft.com/office/drawing/2014/main" id="{453379C1-F107-4D23-BA80-6D6A87828491}"/>
+              </a:ext>
+            </a:extLst>
+          </p:cNvPr>
+          <p:cNvPicPr>
+            <a:picLocks noChangeAspect="1"/>
+          </p:cNvPicPr>
+          <p:nvPr/>
+        </p:nvPicPr>
+        <p:blipFill>
+          <a:blip r:embed="rId5"/>
+          <a:stretch>
+            <a:fillRect/>
+          </a:stretch>
+        </p:blipFill>
+        <p:spPr>
+          <a:xfrm>
+            <a:off x="967459" y="2987320"/>
+            <a:ext cx="3286125" cy="2733675"/>
+          </a:xfrm>
+          <a:prstGeom prst="rect">
+            <a:avLst/>
+          </a:prstGeom>
+        </p:spPr>
+      </p:pic>
+      <p:sp>
+        <p:nvSpPr>
+          <p:cNvPr id="8" name="Arrow: Down 7">
+            <a:extLst>
+              <a:ext uri="{FF2B5EF4-FFF2-40B4-BE49-F238E27FC236}">
+                <a16:creationId xmlns:a16="http://schemas.microsoft.com/office/drawing/2014/main" id="{F7807FDB-B944-4A3B-9C81-715F4B8CCB09}"/>
+              </a:ext>
+            </a:extLst>
+          </p:cNvPr>
+          <p:cNvSpPr/>
+          <p:nvPr/>
+        </p:nvSpPr>
+        <p:spPr>
+          <a:xfrm rot="14773509">
+            <a:off x="4985029" y="3828606"/>
+            <a:ext cx="424254" cy="2142415"/>
+          </a:xfrm>
+          <a:prstGeom prst="downArrow">
+            <a:avLst/>
+          </a:prstGeom>
+        </p:spPr>
+        <p:style>
+          <a:lnRef idx="2">
+            <a:schemeClr val="accent1">
+              <a:shade val="50000"/>
+            </a:schemeClr>
+          </a:lnRef>
+          <a:fillRef idx="1">
+            <a:schemeClr val="accent1"/>
+          </a:fillRef>
+          <a:effectRef idx="0">
+            <a:schemeClr val="accent1"/>
+          </a:effectRef>
+          <a:fontRef idx="minor">
+            <a:schemeClr val="lt1"/>
+          </a:fontRef>
+        </p:style>
+        <p:txBody>
+          <a:bodyPr rtlCol="0" anchor="ctr"/>
+          <a:lstStyle/>
+          <a:p>
+            <a:pPr algn="ctr"/>
+            <a:endParaRPr lang="en-US" dirty="0"/>
+          </a:p>
+        </p:txBody>
+      </p:sp>
+    </p:spTree>
+    <p:extLst>
+      <p:ext uri="{BB962C8B-B14F-4D97-AF65-F5344CB8AC3E}">
+        <p14:creationId xmlns:p14="http://schemas.microsoft.com/office/powerpoint/2010/main" val="1130521262"/>
+      </p:ext>
+    </p:extLst>
+  </p:cSld>
+  <p:clrMapOvr>
+    <a:masterClrMapping/>
+  </p:clrMapOvr>
+  <p:timing>
+    <p:tnLst>
+      <p:par>
+        <p:cTn id="1" dur="indefinite" restart="never" nodeType="tmRoot">
+          <p:childTnLst>
+            <p:seq concurrent="1" nextAc="seek">
+              <p:cTn id="2" dur="indefinite" nodeType="mainSeq">
+                <p:childTnLst>
+                  <p:par>
+                    <p:cTn id="3" fill="hold">
+                      <p:stCondLst>
+                        <p:cond delay="indefinite"/>
+                      </p:stCondLst>
+                      <p:childTnLst>
+                        <p:par>
+                          <p:cTn id="4" fill="hold">
+                            <p:stCondLst>
+                              <p:cond delay="0"/>
+                            </p:stCondLst>
+                            <p:childTnLst>
+                              <p:par>
+                                <p:cTn id="5" presetID="10" presetClass="entr" presetSubtype="0" fill="hold" grpId="0" nodeType="clickEffect">
+                                  <p:stCondLst>
+                                    <p:cond delay="0"/>
+                                  </p:stCondLst>
+                                  <p:childTnLst>
+                                    <p:set>
+                                      <p:cBhvr>
+                                        <p:cTn id="6" dur="1" fill="hold">
+                                          <p:stCondLst>
+                                            <p:cond delay="0"/>
+                                          </p:stCondLst>
+                                        </p:cTn>
+                                        <p:tgtEl>
+                                          <p:spTgt spid="8"/>
+                                        </p:tgtEl>
+                                        <p:attrNameLst>
+                                          <p:attrName>style.visibility</p:attrName>
+                                        </p:attrNameLst>
+                                      </p:cBhvr>
+                                      <p:to>
+                                        <p:strVal val="visible"/>
+                                      </p:to>
+                                    </p:set>
+                                    <p:animEffect transition="in" filter="fade">
+                                      <p:cBhvr>
+                                        <p:cTn id="7" dur="500"/>
+                                        <p:tgtEl>
+                                          <p:spTgt spid="8"/>
+                                        </p:tgtEl>
+                                      </p:cBhvr>
+                                    </p:animEffect>
+                                  </p:childTnLst>
+                                </p:cTn>
+                              </p:par>
+                              <p:par>
+                                <p:cTn id="8" presetID="10" presetClass="entr" presetSubtype="0" fill="hold" nodeType="withEffect">
+                                  <p:stCondLst>
+                                    <p:cond delay="0"/>
+                                  </p:stCondLst>
+                                  <p:childTnLst>
+                                    <p:set>
+                                      <p:cBhvr>
+                                        <p:cTn id="9" dur="1" fill="hold">
+                                          <p:stCondLst>
+                                            <p:cond delay="0"/>
+                                          </p:stCondLst>
+                                        </p:cTn>
+                                        <p:tgtEl>
+                                          <p:spTgt spid="4"/>
+                                        </p:tgtEl>
+                                        <p:attrNameLst>
+                                          <p:attrName>style.visibility</p:attrName>
+                                        </p:attrNameLst>
+                                      </p:cBhvr>
+                                      <p:to>
+                                        <p:strVal val="visible"/>
+                                      </p:to>
+                                    </p:set>
+                                    <p:animEffect transition="in" filter="fade">
+                                      <p:cBhvr>
+                                        <p:cTn id="10" dur="500"/>
+                                        <p:tgtEl>
+                                          <p:spTgt spid="4"/>
+                                        </p:tgtEl>
+                                      </p:cBhvr>
+                                    </p:animEffect>
+                                  </p:childTnLst>
+                                </p:cTn>
+                              </p:par>
+                            </p:childTnLst>
+                          </p:cTn>
+                        </p:par>
+                      </p:childTnLst>
+                    </p:cTn>
+                  </p:par>
+                </p:childTnLst>
+              </p:cTn>
+              <p:prevCondLst>
+                <p:cond evt="onPrev" delay="0">
+                  <p:tgtEl>
+                    <p:sldTgt/>
+                  </p:tgtEl>
+                </p:cond>
+              </p:prevCondLst>
+              <p:nextCondLst>
+                <p:cond evt="onNext" delay="0">
+                  <p:tgtEl>
+                    <p:sldTgt/>
+                  </p:tgtEl>
+                </p:cond>
+              </p:nextCondLst>
+            </p:seq>
+          </p:childTnLst>
+        </p:cTn>
+      </p:par>
+    </p:tnLst>
+    <p:bldLst>
+      <p:bldP spid="8" grpId="0" animBg="1"/>
+    </p:bldLst>
+  </p:timing>
+</p:sld>
+</file>
+
+<file path=ppt/slides/slide14.xml><?xml version="1.0" encoding="utf-8"?>
+<p:sld xmlns:a="http://schemas.openxmlformats.org/drawingml/2006/main" xmlns:r="http://schemas.openxmlformats.org/officeDocument/2006/relationships" xmlns:p="http://schemas.openxmlformats.org/presentationml/2006/main">
+  <p:cSld>
+    <p:bg>
+      <p:bgPr>
+        <a:solidFill>
           <a:schemeClr val="bg1"/>
         </a:solidFill>
         <a:effectLst/>
@@ -12839,7 +13358,7 @@
 </p:sld>
 </file>
 
-<file path=ppt/slides/slide14.xml><?xml version="1.0" encoding="utf-8"?>
+<file path=ppt/slides/slide15.xml><?xml version="1.0" encoding="utf-8"?>
 <p:sld xmlns:a="http://schemas.openxmlformats.org/drawingml/2006/main" xmlns:r="http://schemas.openxmlformats.org/officeDocument/2006/relationships" xmlns:p="http://schemas.openxmlformats.org/presentationml/2006/main">
   <p:cSld>
     <p:bg>
@@ -12985,7 +13504,7 @@
 </p:sld>
 </file>
 
-<file path=ppt/slides/slide15.xml><?xml version="1.0" encoding="utf-8"?>
+<file path=ppt/slides/slide16.xml><?xml version="1.0" encoding="utf-8"?>
 <p:sld xmlns:a="http://schemas.openxmlformats.org/drawingml/2006/main" xmlns:r="http://schemas.openxmlformats.org/officeDocument/2006/relationships" xmlns:p="http://schemas.openxmlformats.org/presentationml/2006/main">
   <p:cSld>
     <p:bg>

</xml_diff>

<commit_message>
More work on DevOps slides
</commit_message>
<xml_diff>
--- a/Protecting App Secrets.pptx
+++ b/Protecting App Secrets.pptx
@@ -224,7 +224,7 @@
           <a:p>
             <a:fld id="{03886B9A-ACA2-4D2C-AAF6-D8003DE96699}" type="datetimeFigureOut">
               <a:rPr lang="en-US" smtClean="0"/>
-              <a:t>9/19/2018</a:t>
+              <a:t>10/1/2018</a:t>
             </a:fld>
             <a:endParaRPr lang="en-US"/>
           </a:p>
@@ -2998,7 +2998,7 @@
           <a:p>
             <a:fld id="{B5D86D52-4857-4668-9EB7-B41E21252CF7}" type="datetimeFigureOut">
               <a:rPr lang="en-US" smtClean="0"/>
-              <a:t>9/19/2018</a:t>
+              <a:t>10/1/2018</a:t>
             </a:fld>
             <a:endParaRPr lang="en-US"/>
           </a:p>
@@ -3196,7 +3196,7 @@
           <a:p>
             <a:fld id="{B5D86D52-4857-4668-9EB7-B41E21252CF7}" type="datetimeFigureOut">
               <a:rPr lang="en-US" smtClean="0"/>
-              <a:t>9/19/2018</a:t>
+              <a:t>10/1/2018</a:t>
             </a:fld>
             <a:endParaRPr lang="en-US"/>
           </a:p>
@@ -3404,7 +3404,7 @@
           <a:p>
             <a:fld id="{B5D86D52-4857-4668-9EB7-B41E21252CF7}" type="datetimeFigureOut">
               <a:rPr lang="en-US" smtClean="0"/>
-              <a:t>9/19/2018</a:t>
+              <a:t>10/1/2018</a:t>
             </a:fld>
             <a:endParaRPr lang="en-US"/>
           </a:p>
@@ -3608,7 +3608,7 @@
           <a:p>
             <a:fld id="{EEC3160E-2579-4584-9765-DC1BA0B358F9}" type="datetimeFigureOut">
               <a:rPr lang="en-US" smtClean="0"/>
-              <a:t>9/19/2018</a:t>
+              <a:t>10/1/2018</a:t>
             </a:fld>
             <a:endParaRPr lang="en-US"/>
           </a:p>
@@ -3778,7 +3778,7 @@
           <a:p>
             <a:fld id="{EEC3160E-2579-4584-9765-DC1BA0B358F9}" type="datetimeFigureOut">
               <a:rPr lang="en-US" smtClean="0"/>
-              <a:t>9/19/2018</a:t>
+              <a:t>10/1/2018</a:t>
             </a:fld>
             <a:endParaRPr lang="en-US"/>
           </a:p>
@@ -4024,7 +4024,7 @@
           <a:p>
             <a:fld id="{EEC3160E-2579-4584-9765-DC1BA0B358F9}" type="datetimeFigureOut">
               <a:rPr lang="en-US" smtClean="0"/>
-              <a:t>9/19/2018</a:t>
+              <a:t>10/1/2018</a:t>
             </a:fld>
             <a:endParaRPr lang="en-US"/>
           </a:p>
@@ -4256,7 +4256,7 @@
           <a:p>
             <a:fld id="{EEC3160E-2579-4584-9765-DC1BA0B358F9}" type="datetimeFigureOut">
               <a:rPr lang="en-US" smtClean="0"/>
-              <a:t>9/19/2018</a:t>
+              <a:t>10/1/2018</a:t>
             </a:fld>
             <a:endParaRPr lang="en-US"/>
           </a:p>
@@ -4623,7 +4623,7 @@
           <a:p>
             <a:fld id="{EEC3160E-2579-4584-9765-DC1BA0B358F9}" type="datetimeFigureOut">
               <a:rPr lang="en-US" smtClean="0"/>
-              <a:t>9/19/2018</a:t>
+              <a:t>10/1/2018</a:t>
             </a:fld>
             <a:endParaRPr lang="en-US"/>
           </a:p>
@@ -4741,7 +4741,7 @@
           <a:p>
             <a:fld id="{EEC3160E-2579-4584-9765-DC1BA0B358F9}" type="datetimeFigureOut">
               <a:rPr lang="en-US" smtClean="0"/>
-              <a:t>9/19/2018</a:t>
+              <a:t>10/1/2018</a:t>
             </a:fld>
             <a:endParaRPr lang="en-US"/>
           </a:p>
@@ -4836,7 +4836,7 @@
           <a:p>
             <a:fld id="{EEC3160E-2579-4584-9765-DC1BA0B358F9}" type="datetimeFigureOut">
               <a:rPr lang="en-US" smtClean="0"/>
-              <a:t>9/19/2018</a:t>
+              <a:t>10/1/2018</a:t>
             </a:fld>
             <a:endParaRPr lang="en-US"/>
           </a:p>
@@ -5113,7 +5113,7 @@
           <a:p>
             <a:fld id="{EEC3160E-2579-4584-9765-DC1BA0B358F9}" type="datetimeFigureOut">
               <a:rPr lang="en-US" smtClean="0"/>
-              <a:t>9/19/2018</a:t>
+              <a:t>10/1/2018</a:t>
             </a:fld>
             <a:endParaRPr lang="en-US"/>
           </a:p>
@@ -5299,7 +5299,7 @@
           <a:p>
             <a:fld id="{B5D86D52-4857-4668-9EB7-B41E21252CF7}" type="datetimeFigureOut">
               <a:rPr lang="en-US" smtClean="0"/>
-              <a:t>9/19/2018</a:t>
+              <a:t>10/1/2018</a:t>
             </a:fld>
             <a:endParaRPr lang="en-US"/>
           </a:p>
@@ -5568,7 +5568,7 @@
           <a:p>
             <a:fld id="{EEC3160E-2579-4584-9765-DC1BA0B358F9}" type="datetimeFigureOut">
               <a:rPr lang="en-US" smtClean="0"/>
-              <a:t>9/19/2018</a:t>
+              <a:t>10/1/2018</a:t>
             </a:fld>
             <a:endParaRPr lang="en-US"/>
           </a:p>
@@ -5738,7 +5738,7 @@
           <a:p>
             <a:fld id="{EEC3160E-2579-4584-9765-DC1BA0B358F9}" type="datetimeFigureOut">
               <a:rPr lang="en-US" smtClean="0"/>
-              <a:t>9/19/2018</a:t>
+              <a:t>10/1/2018</a:t>
             </a:fld>
             <a:endParaRPr lang="en-US"/>
           </a:p>
@@ -5918,7 +5918,7 @@
           <a:p>
             <a:fld id="{EEC3160E-2579-4584-9765-DC1BA0B358F9}" type="datetimeFigureOut">
               <a:rPr lang="en-US" smtClean="0"/>
-              <a:t>9/19/2018</a:t>
+              <a:t>10/1/2018</a:t>
             </a:fld>
             <a:endParaRPr lang="en-US"/>
           </a:p>
@@ -6181,7 +6181,7 @@
           <a:p>
             <a:fld id="{B5D86D52-4857-4668-9EB7-B41E21252CF7}" type="datetimeFigureOut">
               <a:rPr lang="en-US" smtClean="0"/>
-              <a:t>9/19/2018</a:t>
+              <a:t>10/1/2018</a:t>
             </a:fld>
             <a:endParaRPr lang="en-US"/>
           </a:p>
@@ -6446,7 +6446,7 @@
           <a:p>
             <a:fld id="{B5D86D52-4857-4668-9EB7-B41E21252CF7}" type="datetimeFigureOut">
               <a:rPr lang="en-US" smtClean="0"/>
-              <a:t>9/19/2018</a:t>
+              <a:t>10/1/2018</a:t>
             </a:fld>
             <a:endParaRPr lang="en-US"/>
           </a:p>
@@ -6858,7 +6858,7 @@
           <a:p>
             <a:fld id="{B5D86D52-4857-4668-9EB7-B41E21252CF7}" type="datetimeFigureOut">
               <a:rPr lang="en-US" smtClean="0"/>
-              <a:t>9/19/2018</a:t>
+              <a:t>10/1/2018</a:t>
             </a:fld>
             <a:endParaRPr lang="en-US"/>
           </a:p>
@@ -6999,7 +6999,7 @@
           <a:p>
             <a:fld id="{B5D86D52-4857-4668-9EB7-B41E21252CF7}" type="datetimeFigureOut">
               <a:rPr lang="en-US" smtClean="0"/>
-              <a:t>9/19/2018</a:t>
+              <a:t>10/1/2018</a:t>
             </a:fld>
             <a:endParaRPr lang="en-US"/>
           </a:p>
@@ -7112,7 +7112,7 @@
           <a:p>
             <a:fld id="{B5D86D52-4857-4668-9EB7-B41E21252CF7}" type="datetimeFigureOut">
               <a:rPr lang="en-US" smtClean="0"/>
-              <a:t>9/19/2018</a:t>
+              <a:t>10/1/2018</a:t>
             </a:fld>
             <a:endParaRPr lang="en-US"/>
           </a:p>
@@ -7423,7 +7423,7 @@
           <a:p>
             <a:fld id="{B5D86D52-4857-4668-9EB7-B41E21252CF7}" type="datetimeFigureOut">
               <a:rPr lang="en-US" smtClean="0"/>
-              <a:t>9/19/2018</a:t>
+              <a:t>10/1/2018</a:t>
             </a:fld>
             <a:endParaRPr lang="en-US"/>
           </a:p>
@@ -7711,7 +7711,7 @@
           <a:p>
             <a:fld id="{B5D86D52-4857-4668-9EB7-B41E21252CF7}" type="datetimeFigureOut">
               <a:rPr lang="en-US" smtClean="0"/>
-              <a:t>9/19/2018</a:t>
+              <a:t>10/1/2018</a:t>
             </a:fld>
             <a:endParaRPr lang="en-US"/>
           </a:p>
@@ -7952,7 +7952,7 @@
           <a:p>
             <a:fld id="{B5D86D52-4857-4668-9EB7-B41E21252CF7}" type="datetimeFigureOut">
               <a:rPr lang="en-US" smtClean="0"/>
-              <a:t>9/19/2018</a:t>
+              <a:t>10/1/2018</a:t>
             </a:fld>
             <a:endParaRPr lang="en-US"/>
           </a:p>
@@ -8504,7 +8504,7 @@
           <a:p>
             <a:fld id="{EEC3160E-2579-4584-9765-DC1BA0B358F9}" type="datetimeFigureOut">
               <a:rPr lang="en-US" smtClean="0"/>
-              <a:t>9/19/2018</a:t>
+              <a:t>10/1/2018</a:t>
             </a:fld>
             <a:endParaRPr lang="en-US"/>
           </a:p>

</xml_diff>

<commit_message>
App secrets slide tweaks
</commit_message>
<xml_diff>
--- a/Protecting App Secrets.pptx
+++ b/Protecting App Secrets.pptx
@@ -6,12 +6,12 @@
     <p:sldMasterId id="2147483660" r:id="rId2"/>
   </p:sldMasterIdLst>
   <p:notesMasterIdLst>
-    <p:notesMasterId r:id="rId19"/>
+    <p:notesMasterId r:id="rId21"/>
   </p:notesMasterIdLst>
   <p:sldIdLst>
     <p:sldId id="256" r:id="rId3"/>
     <p:sldId id="322" r:id="rId4"/>
-    <p:sldId id="329" r:id="rId5"/>
+    <p:sldId id="342" r:id="rId5"/>
     <p:sldId id="328" r:id="rId6"/>
     <p:sldId id="330" r:id="rId7"/>
     <p:sldId id="323" r:id="rId8"/>
@@ -20,11 +20,13 @@
     <p:sldId id="333" r:id="rId11"/>
     <p:sldId id="338" r:id="rId12"/>
     <p:sldId id="335" r:id="rId13"/>
-    <p:sldId id="336" r:id="rId14"/>
-    <p:sldId id="339" r:id="rId15"/>
-    <p:sldId id="331" r:id="rId16"/>
-    <p:sldId id="334" r:id="rId17"/>
-    <p:sldId id="326" r:id="rId18"/>
+    <p:sldId id="340" r:id="rId14"/>
+    <p:sldId id="341" r:id="rId15"/>
+    <p:sldId id="336" r:id="rId16"/>
+    <p:sldId id="339" r:id="rId17"/>
+    <p:sldId id="331" r:id="rId18"/>
+    <p:sldId id="334" r:id="rId19"/>
+    <p:sldId id="326" r:id="rId20"/>
   </p:sldIdLst>
   <p:sldSz cx="12192000" cy="6858000"/>
   <p:notesSz cx="6858000" cy="9144000"/>
@@ -224,7 +226,7 @@
           <a:p>
             <a:fld id="{03886B9A-ACA2-4D2C-AAF6-D8003DE96699}" type="datetimeFigureOut">
               <a:rPr lang="en-US" smtClean="0"/>
-              <a:t>10/6/2018</a:t>
+              <a:t>10/7/2018</a:t>
             </a:fld>
             <a:endParaRPr lang="en-US"/>
           </a:p>
@@ -935,11 +937,7 @@
           <a:bodyPr/>
           <a:lstStyle/>
           <a:p>
-            <a:pPr marL="0" indent="0">
-              <a:buFontTx/>
-              <a:buNone/>
-            </a:pPr>
-            <a:endParaRPr lang="en-US" dirty="0"/>
+            <a:endParaRPr lang="en-US"/>
           </a:p>
         </p:txBody>
       </p:sp>
@@ -1029,7 +1027,7 @@
     </p:spTree>
     <p:extLst>
       <p:ext uri="{BB962C8B-B14F-4D97-AF65-F5344CB8AC3E}">
-        <p14:creationId xmlns:p14="http://schemas.microsoft.com/office/powerpoint/2010/main" val="662898044"/>
+        <p14:creationId xmlns:p14="http://schemas.microsoft.com/office/powerpoint/2010/main" val="2089021986"/>
       </p:ext>
     </p:extLst>
   </p:cSld>
@@ -1083,24 +1081,7 @@
           <a:bodyPr/>
           <a:lstStyle/>
           <a:p>
-            <a:pPr marL="171450" indent="-171450">
-              <a:buFontTx/>
-              <a:buChar char="-"/>
-            </a:pPr>
-            <a:r>
-              <a:rPr lang="en-US" dirty="0"/>
-              <a:t>Download secrets from key vault with build task</a:t>
-            </a:r>
-          </a:p>
-          <a:p>
-            <a:pPr marL="628650" lvl="1" indent="-171450">
-              <a:buFontTx/>
-              <a:buChar char="-"/>
-            </a:pPr>
-            <a:r>
-              <a:rPr lang="en-US" dirty="0"/>
-              <a:t>Can use secrets as task variables in other build tasks</a:t>
-            </a:r>
+            <a:endParaRPr lang="en-US"/>
           </a:p>
         </p:txBody>
       </p:sp>
@@ -1190,7 +1171,7 @@
     </p:spTree>
     <p:extLst>
       <p:ext uri="{BB962C8B-B14F-4D97-AF65-F5344CB8AC3E}">
-        <p14:creationId xmlns:p14="http://schemas.microsoft.com/office/powerpoint/2010/main" val="585389256"/>
+        <p14:creationId xmlns:p14="http://schemas.microsoft.com/office/powerpoint/2010/main" val="2286787676"/>
       </p:ext>
     </p:extLst>
   </p:cSld>
@@ -1244,6 +1225,10 @@
           <a:bodyPr/>
           <a:lstStyle/>
           <a:p>
+            <a:pPr marL="0" indent="0">
+              <a:buFontTx/>
+              <a:buNone/>
+            </a:pPr>
             <a:endParaRPr lang="en-US" dirty="0"/>
           </a:p>
         </p:txBody>
@@ -1334,7 +1319,7 @@
     </p:spTree>
     <p:extLst>
       <p:ext uri="{BB962C8B-B14F-4D97-AF65-F5344CB8AC3E}">
-        <p14:creationId xmlns:p14="http://schemas.microsoft.com/office/powerpoint/2010/main" val="2232734480"/>
+        <p14:creationId xmlns:p14="http://schemas.microsoft.com/office/powerpoint/2010/main" val="662898044"/>
       </p:ext>
     </p:extLst>
   </p:cSld>
@@ -1388,7 +1373,24 @@
           <a:bodyPr/>
           <a:lstStyle/>
           <a:p>
-            <a:endParaRPr lang="en-US" dirty="0"/>
+            <a:pPr marL="171450" indent="-171450">
+              <a:buFontTx/>
+              <a:buChar char="-"/>
+            </a:pPr>
+            <a:r>
+              <a:rPr lang="en-US" dirty="0"/>
+              <a:t>Download secrets from key vault with build task</a:t>
+            </a:r>
+          </a:p>
+          <a:p>
+            <a:pPr marL="628650" lvl="1" indent="-171450">
+              <a:buFontTx/>
+              <a:buChar char="-"/>
+            </a:pPr>
+            <a:r>
+              <a:rPr lang="en-US" dirty="0"/>
+              <a:t>Can use secrets as task variables in other build tasks</a:t>
+            </a:r>
           </a:p>
         </p:txBody>
       </p:sp>
@@ -1478,7 +1480,7 @@
     </p:spTree>
     <p:extLst>
       <p:ext uri="{BB962C8B-B14F-4D97-AF65-F5344CB8AC3E}">
-        <p14:creationId xmlns:p14="http://schemas.microsoft.com/office/powerpoint/2010/main" val="1203295569"/>
+        <p14:creationId xmlns:p14="http://schemas.microsoft.com/office/powerpoint/2010/main" val="585389256"/>
       </p:ext>
     </p:extLst>
   </p:cSld>
@@ -1532,7 +1534,7 @@
           <a:bodyPr/>
           <a:lstStyle/>
           <a:p>
-            <a:endParaRPr lang="en-US"/>
+            <a:endParaRPr lang="en-US" dirty="0"/>
           </a:p>
         </p:txBody>
       </p:sp>
@@ -1622,6 +1624,294 @@
     </p:spTree>
     <p:extLst>
       <p:ext uri="{BB962C8B-B14F-4D97-AF65-F5344CB8AC3E}">
+        <p14:creationId xmlns:p14="http://schemas.microsoft.com/office/powerpoint/2010/main" val="2232734480"/>
+      </p:ext>
+    </p:extLst>
+  </p:cSld>
+  <p:clrMapOvr>
+    <a:masterClrMapping/>
+  </p:clrMapOvr>
+</p:notes>
+</file>
+
+<file path=ppt/notesSlides/notesSlide17.xml><?xml version="1.0" encoding="utf-8"?>
+<p:notes xmlns:a="http://schemas.openxmlformats.org/drawingml/2006/main" xmlns:r="http://schemas.openxmlformats.org/officeDocument/2006/relationships" xmlns:p="http://schemas.openxmlformats.org/presentationml/2006/main">
+  <p:cSld>
+    <p:spTree>
+      <p:nvGrpSpPr>
+        <p:cNvPr id="1" name=""/>
+        <p:cNvGrpSpPr/>
+        <p:nvPr/>
+      </p:nvGrpSpPr>
+      <p:grpSpPr>
+        <a:xfrm>
+          <a:off x="0" y="0"/>
+          <a:ext cx="0" cy="0"/>
+          <a:chOff x="0" y="0"/>
+          <a:chExt cx="0" cy="0"/>
+        </a:xfrm>
+      </p:grpSpPr>
+      <p:sp>
+        <p:nvSpPr>
+          <p:cNvPr id="2" name="Slide Image Placeholder 1"/>
+          <p:cNvSpPr>
+            <a:spLocks noGrp="1" noRot="1" noChangeAspect="1"/>
+          </p:cNvSpPr>
+          <p:nvPr>
+            <p:ph type="sldImg"/>
+          </p:nvPr>
+        </p:nvSpPr>
+        <p:spPr/>
+      </p:sp>
+      <p:sp>
+        <p:nvSpPr>
+          <p:cNvPr id="3" name="Notes Placeholder 2"/>
+          <p:cNvSpPr>
+            <a:spLocks noGrp="1"/>
+          </p:cNvSpPr>
+          <p:nvPr>
+            <p:ph type="body" idx="1"/>
+          </p:nvPr>
+        </p:nvSpPr>
+        <p:spPr/>
+        <p:txBody>
+          <a:bodyPr/>
+          <a:lstStyle/>
+          <a:p>
+            <a:endParaRPr lang="en-US" dirty="0"/>
+          </a:p>
+        </p:txBody>
+      </p:sp>
+      <p:sp>
+        <p:nvSpPr>
+          <p:cNvPr id="4" name="Slide Number Placeholder 3"/>
+          <p:cNvSpPr>
+            <a:spLocks noGrp="1"/>
+          </p:cNvSpPr>
+          <p:nvPr>
+            <p:ph type="sldNum" sz="quarter" idx="10"/>
+          </p:nvPr>
+        </p:nvSpPr>
+        <p:spPr/>
+        <p:txBody>
+          <a:bodyPr/>
+          <a:lstStyle/>
+          <a:p>
+            <a:pPr marL="0" marR="0" lvl="0" indent="0" algn="r" defTabSz="457200" rtl="0" eaLnBrk="1" fontAlgn="auto" latinLnBrk="0" hangingPunct="1">
+              <a:lnSpc>
+                <a:spcPct val="100000"/>
+              </a:lnSpc>
+              <a:spcBef>
+                <a:spcPts val="0"/>
+              </a:spcBef>
+              <a:spcAft>
+                <a:spcPts val="0"/>
+              </a:spcAft>
+              <a:buClrTx/>
+              <a:buSzTx/>
+              <a:buFontTx/>
+              <a:buNone/>
+              <a:tabLst/>
+              <a:defRPr/>
+            </a:pPr>
+            <a:fld id="{16A87904-88DE-4022-A424-ACD2E6FC1751}" type="slidenum">
+              <a:rPr kumimoji="0" lang="en-US" sz="1200" b="0" i="0" u="none" strike="noStrike" kern="1200" cap="none" spc="0" normalizeH="0" baseline="0" noProof="0" smtClean="0">
+                <a:ln>
+                  <a:noFill/>
+                </a:ln>
+                <a:solidFill>
+                  <a:prstClr val="black"/>
+                </a:solidFill>
+                <a:effectLst/>
+                <a:uLnTx/>
+                <a:uFillTx/>
+                <a:latin typeface="Calibri" panose="020F0502020204030204"/>
+                <a:ea typeface="+mn-ea"/>
+                <a:cs typeface="+mn-cs"/>
+              </a:rPr>
+              <a:pPr marL="0" marR="0" lvl="0" indent="0" algn="r" defTabSz="457200" rtl="0" eaLnBrk="1" fontAlgn="auto" latinLnBrk="0" hangingPunct="1">
+                <a:lnSpc>
+                  <a:spcPct val="100000"/>
+                </a:lnSpc>
+                <a:spcBef>
+                  <a:spcPts val="0"/>
+                </a:spcBef>
+                <a:spcAft>
+                  <a:spcPts val="0"/>
+                </a:spcAft>
+                <a:buClrTx/>
+                <a:buSzTx/>
+                <a:buFontTx/>
+                <a:buNone/>
+                <a:tabLst/>
+                <a:defRPr/>
+              </a:pPr>
+              <a:t>17</a:t>
+            </a:fld>
+            <a:endParaRPr kumimoji="0" lang="en-US" sz="1200" b="0" i="0" u="none" strike="noStrike" kern="1200" cap="none" spc="0" normalizeH="0" baseline="0" noProof="0">
+              <a:ln>
+                <a:noFill/>
+              </a:ln>
+              <a:solidFill>
+                <a:prstClr val="black"/>
+              </a:solidFill>
+              <a:effectLst/>
+              <a:uLnTx/>
+              <a:uFillTx/>
+              <a:latin typeface="Calibri" panose="020F0502020204030204"/>
+              <a:ea typeface="+mn-ea"/>
+              <a:cs typeface="+mn-cs"/>
+            </a:endParaRPr>
+          </a:p>
+        </p:txBody>
+      </p:sp>
+    </p:spTree>
+    <p:extLst>
+      <p:ext uri="{BB962C8B-B14F-4D97-AF65-F5344CB8AC3E}">
+        <p14:creationId xmlns:p14="http://schemas.microsoft.com/office/powerpoint/2010/main" val="1203295569"/>
+      </p:ext>
+    </p:extLst>
+  </p:cSld>
+  <p:clrMapOvr>
+    <a:masterClrMapping/>
+  </p:clrMapOvr>
+</p:notes>
+</file>
+
+<file path=ppt/notesSlides/notesSlide18.xml><?xml version="1.0" encoding="utf-8"?>
+<p:notes xmlns:a="http://schemas.openxmlformats.org/drawingml/2006/main" xmlns:r="http://schemas.openxmlformats.org/officeDocument/2006/relationships" xmlns:p="http://schemas.openxmlformats.org/presentationml/2006/main">
+  <p:cSld>
+    <p:spTree>
+      <p:nvGrpSpPr>
+        <p:cNvPr id="1" name=""/>
+        <p:cNvGrpSpPr/>
+        <p:nvPr/>
+      </p:nvGrpSpPr>
+      <p:grpSpPr>
+        <a:xfrm>
+          <a:off x="0" y="0"/>
+          <a:ext cx="0" cy="0"/>
+          <a:chOff x="0" y="0"/>
+          <a:chExt cx="0" cy="0"/>
+        </a:xfrm>
+      </p:grpSpPr>
+      <p:sp>
+        <p:nvSpPr>
+          <p:cNvPr id="2" name="Slide Image Placeholder 1"/>
+          <p:cNvSpPr>
+            <a:spLocks noGrp="1" noRot="1" noChangeAspect="1"/>
+          </p:cNvSpPr>
+          <p:nvPr>
+            <p:ph type="sldImg"/>
+          </p:nvPr>
+        </p:nvSpPr>
+        <p:spPr/>
+      </p:sp>
+      <p:sp>
+        <p:nvSpPr>
+          <p:cNvPr id="3" name="Notes Placeholder 2"/>
+          <p:cNvSpPr>
+            <a:spLocks noGrp="1"/>
+          </p:cNvSpPr>
+          <p:nvPr>
+            <p:ph type="body" idx="1"/>
+          </p:nvPr>
+        </p:nvSpPr>
+        <p:spPr/>
+        <p:txBody>
+          <a:bodyPr/>
+          <a:lstStyle/>
+          <a:p>
+            <a:endParaRPr lang="en-US"/>
+          </a:p>
+        </p:txBody>
+      </p:sp>
+      <p:sp>
+        <p:nvSpPr>
+          <p:cNvPr id="4" name="Slide Number Placeholder 3"/>
+          <p:cNvSpPr>
+            <a:spLocks noGrp="1"/>
+          </p:cNvSpPr>
+          <p:nvPr>
+            <p:ph type="sldNum" sz="quarter" idx="10"/>
+          </p:nvPr>
+        </p:nvSpPr>
+        <p:spPr/>
+        <p:txBody>
+          <a:bodyPr/>
+          <a:lstStyle/>
+          <a:p>
+            <a:pPr marL="0" marR="0" lvl="0" indent="0" algn="r" defTabSz="457200" rtl="0" eaLnBrk="1" fontAlgn="auto" latinLnBrk="0" hangingPunct="1">
+              <a:lnSpc>
+                <a:spcPct val="100000"/>
+              </a:lnSpc>
+              <a:spcBef>
+                <a:spcPts val="0"/>
+              </a:spcBef>
+              <a:spcAft>
+                <a:spcPts val="0"/>
+              </a:spcAft>
+              <a:buClrTx/>
+              <a:buSzTx/>
+              <a:buFontTx/>
+              <a:buNone/>
+              <a:tabLst/>
+              <a:defRPr/>
+            </a:pPr>
+            <a:fld id="{16A87904-88DE-4022-A424-ACD2E6FC1751}" type="slidenum">
+              <a:rPr kumimoji="0" lang="en-US" sz="1200" b="0" i="0" u="none" strike="noStrike" kern="1200" cap="none" spc="0" normalizeH="0" baseline="0" noProof="0" smtClean="0">
+                <a:ln>
+                  <a:noFill/>
+                </a:ln>
+                <a:solidFill>
+                  <a:prstClr val="black"/>
+                </a:solidFill>
+                <a:effectLst/>
+                <a:uLnTx/>
+                <a:uFillTx/>
+                <a:latin typeface="Calibri" panose="020F0502020204030204"/>
+                <a:ea typeface="+mn-ea"/>
+                <a:cs typeface="+mn-cs"/>
+              </a:rPr>
+              <a:pPr marL="0" marR="0" lvl="0" indent="0" algn="r" defTabSz="457200" rtl="0" eaLnBrk="1" fontAlgn="auto" latinLnBrk="0" hangingPunct="1">
+                <a:lnSpc>
+                  <a:spcPct val="100000"/>
+                </a:lnSpc>
+                <a:spcBef>
+                  <a:spcPts val="0"/>
+                </a:spcBef>
+                <a:spcAft>
+                  <a:spcPts val="0"/>
+                </a:spcAft>
+                <a:buClrTx/>
+                <a:buSzTx/>
+                <a:buFontTx/>
+                <a:buNone/>
+                <a:tabLst/>
+                <a:defRPr/>
+              </a:pPr>
+              <a:t>18</a:t>
+            </a:fld>
+            <a:endParaRPr kumimoji="0" lang="en-US" sz="1200" b="0" i="0" u="none" strike="noStrike" kern="1200" cap="none" spc="0" normalizeH="0" baseline="0" noProof="0">
+              <a:ln>
+                <a:noFill/>
+              </a:ln>
+              <a:solidFill>
+                <a:prstClr val="black"/>
+              </a:solidFill>
+              <a:effectLst/>
+              <a:uLnTx/>
+              <a:uFillTx/>
+              <a:latin typeface="Calibri" panose="020F0502020204030204"/>
+              <a:ea typeface="+mn-ea"/>
+              <a:cs typeface="+mn-cs"/>
+            </a:endParaRPr>
+          </a:p>
+        </p:txBody>
+      </p:sp>
+    </p:spTree>
+    <p:extLst>
+      <p:ext uri="{BB962C8B-B14F-4D97-AF65-F5344CB8AC3E}">
         <p14:creationId xmlns:p14="http://schemas.microsoft.com/office/powerpoint/2010/main" val="2271797707"/>
       </p:ext>
     </p:extLst>
@@ -1913,7 +2203,7 @@
     </p:spTree>
     <p:extLst>
       <p:ext uri="{BB962C8B-B14F-4D97-AF65-F5344CB8AC3E}">
-        <p14:creationId xmlns:p14="http://schemas.microsoft.com/office/powerpoint/2010/main" val="3690956939"/>
+        <p14:creationId xmlns:p14="http://schemas.microsoft.com/office/powerpoint/2010/main" val="3314926284"/>
       </p:ext>
     </p:extLst>
   </p:cSld>
@@ -2985,7 +3275,7 @@
           <a:p>
             <a:fld id="{B5D86D52-4857-4668-9EB7-B41E21252CF7}" type="datetimeFigureOut">
               <a:rPr lang="en-US" smtClean="0"/>
-              <a:t>10/6/2018</a:t>
+              <a:t>10/7/2018</a:t>
             </a:fld>
             <a:endParaRPr lang="en-US"/>
           </a:p>
@@ -3183,7 +3473,7 @@
           <a:p>
             <a:fld id="{B5D86D52-4857-4668-9EB7-B41E21252CF7}" type="datetimeFigureOut">
               <a:rPr lang="en-US" smtClean="0"/>
-              <a:t>10/6/2018</a:t>
+              <a:t>10/7/2018</a:t>
             </a:fld>
             <a:endParaRPr lang="en-US"/>
           </a:p>
@@ -3391,7 +3681,7 @@
           <a:p>
             <a:fld id="{B5D86D52-4857-4668-9EB7-B41E21252CF7}" type="datetimeFigureOut">
               <a:rPr lang="en-US" smtClean="0"/>
-              <a:t>10/6/2018</a:t>
+              <a:t>10/7/2018</a:t>
             </a:fld>
             <a:endParaRPr lang="en-US"/>
           </a:p>
@@ -3595,7 +3885,7 @@
           <a:p>
             <a:fld id="{EEC3160E-2579-4584-9765-DC1BA0B358F9}" type="datetimeFigureOut">
               <a:rPr lang="en-US" smtClean="0"/>
-              <a:t>10/6/2018</a:t>
+              <a:t>10/7/2018</a:t>
             </a:fld>
             <a:endParaRPr lang="en-US"/>
           </a:p>
@@ -3765,7 +4055,7 @@
           <a:p>
             <a:fld id="{EEC3160E-2579-4584-9765-DC1BA0B358F9}" type="datetimeFigureOut">
               <a:rPr lang="en-US" smtClean="0"/>
-              <a:t>10/6/2018</a:t>
+              <a:t>10/7/2018</a:t>
             </a:fld>
             <a:endParaRPr lang="en-US"/>
           </a:p>
@@ -4011,7 +4301,7 @@
           <a:p>
             <a:fld id="{EEC3160E-2579-4584-9765-DC1BA0B358F9}" type="datetimeFigureOut">
               <a:rPr lang="en-US" smtClean="0"/>
-              <a:t>10/6/2018</a:t>
+              <a:t>10/7/2018</a:t>
             </a:fld>
             <a:endParaRPr lang="en-US"/>
           </a:p>
@@ -4243,7 +4533,7 @@
           <a:p>
             <a:fld id="{EEC3160E-2579-4584-9765-DC1BA0B358F9}" type="datetimeFigureOut">
               <a:rPr lang="en-US" smtClean="0"/>
-              <a:t>10/6/2018</a:t>
+              <a:t>10/7/2018</a:t>
             </a:fld>
             <a:endParaRPr lang="en-US"/>
           </a:p>
@@ -4610,7 +4900,7 @@
           <a:p>
             <a:fld id="{EEC3160E-2579-4584-9765-DC1BA0B358F9}" type="datetimeFigureOut">
               <a:rPr lang="en-US" smtClean="0"/>
-              <a:t>10/6/2018</a:t>
+              <a:t>10/7/2018</a:t>
             </a:fld>
             <a:endParaRPr lang="en-US"/>
           </a:p>
@@ -4728,7 +5018,7 @@
           <a:p>
             <a:fld id="{EEC3160E-2579-4584-9765-DC1BA0B358F9}" type="datetimeFigureOut">
               <a:rPr lang="en-US" smtClean="0"/>
-              <a:t>10/6/2018</a:t>
+              <a:t>10/7/2018</a:t>
             </a:fld>
             <a:endParaRPr lang="en-US"/>
           </a:p>
@@ -4823,7 +5113,7 @@
           <a:p>
             <a:fld id="{EEC3160E-2579-4584-9765-DC1BA0B358F9}" type="datetimeFigureOut">
               <a:rPr lang="en-US" smtClean="0"/>
-              <a:t>10/6/2018</a:t>
+              <a:t>10/7/2018</a:t>
             </a:fld>
             <a:endParaRPr lang="en-US"/>
           </a:p>
@@ -5100,7 +5390,7 @@
           <a:p>
             <a:fld id="{EEC3160E-2579-4584-9765-DC1BA0B358F9}" type="datetimeFigureOut">
               <a:rPr lang="en-US" smtClean="0"/>
-              <a:t>10/6/2018</a:t>
+              <a:t>10/7/2018</a:t>
             </a:fld>
             <a:endParaRPr lang="en-US"/>
           </a:p>
@@ -5286,7 +5576,7 @@
           <a:p>
             <a:fld id="{B5D86D52-4857-4668-9EB7-B41E21252CF7}" type="datetimeFigureOut">
               <a:rPr lang="en-US" smtClean="0"/>
-              <a:t>10/6/2018</a:t>
+              <a:t>10/7/2018</a:t>
             </a:fld>
             <a:endParaRPr lang="en-US"/>
           </a:p>
@@ -5555,7 +5845,7 @@
           <a:p>
             <a:fld id="{EEC3160E-2579-4584-9765-DC1BA0B358F9}" type="datetimeFigureOut">
               <a:rPr lang="en-US" smtClean="0"/>
-              <a:t>10/6/2018</a:t>
+              <a:t>10/7/2018</a:t>
             </a:fld>
             <a:endParaRPr lang="en-US"/>
           </a:p>
@@ -5725,7 +6015,7 @@
           <a:p>
             <a:fld id="{EEC3160E-2579-4584-9765-DC1BA0B358F9}" type="datetimeFigureOut">
               <a:rPr lang="en-US" smtClean="0"/>
-              <a:t>10/6/2018</a:t>
+              <a:t>10/7/2018</a:t>
             </a:fld>
             <a:endParaRPr lang="en-US"/>
           </a:p>
@@ -5905,7 +6195,7 @@
           <a:p>
             <a:fld id="{EEC3160E-2579-4584-9765-DC1BA0B358F9}" type="datetimeFigureOut">
               <a:rPr lang="en-US" smtClean="0"/>
-              <a:t>10/6/2018</a:t>
+              <a:t>10/7/2018</a:t>
             </a:fld>
             <a:endParaRPr lang="en-US"/>
           </a:p>
@@ -6168,7 +6458,7 @@
           <a:p>
             <a:fld id="{B5D86D52-4857-4668-9EB7-B41E21252CF7}" type="datetimeFigureOut">
               <a:rPr lang="en-US" smtClean="0"/>
-              <a:t>10/6/2018</a:t>
+              <a:t>10/7/2018</a:t>
             </a:fld>
             <a:endParaRPr lang="en-US"/>
           </a:p>
@@ -6433,7 +6723,7 @@
           <a:p>
             <a:fld id="{B5D86D52-4857-4668-9EB7-B41E21252CF7}" type="datetimeFigureOut">
               <a:rPr lang="en-US" smtClean="0"/>
-              <a:t>10/6/2018</a:t>
+              <a:t>10/7/2018</a:t>
             </a:fld>
             <a:endParaRPr lang="en-US"/>
           </a:p>
@@ -6845,7 +7135,7 @@
           <a:p>
             <a:fld id="{B5D86D52-4857-4668-9EB7-B41E21252CF7}" type="datetimeFigureOut">
               <a:rPr lang="en-US" smtClean="0"/>
-              <a:t>10/6/2018</a:t>
+              <a:t>10/7/2018</a:t>
             </a:fld>
             <a:endParaRPr lang="en-US"/>
           </a:p>
@@ -6986,7 +7276,7 @@
           <a:p>
             <a:fld id="{B5D86D52-4857-4668-9EB7-B41E21252CF7}" type="datetimeFigureOut">
               <a:rPr lang="en-US" smtClean="0"/>
-              <a:t>10/6/2018</a:t>
+              <a:t>10/7/2018</a:t>
             </a:fld>
             <a:endParaRPr lang="en-US"/>
           </a:p>
@@ -7099,7 +7389,7 @@
           <a:p>
             <a:fld id="{B5D86D52-4857-4668-9EB7-B41E21252CF7}" type="datetimeFigureOut">
               <a:rPr lang="en-US" smtClean="0"/>
-              <a:t>10/6/2018</a:t>
+              <a:t>10/7/2018</a:t>
             </a:fld>
             <a:endParaRPr lang="en-US"/>
           </a:p>
@@ -7410,7 +7700,7 @@
           <a:p>
             <a:fld id="{B5D86D52-4857-4668-9EB7-B41E21252CF7}" type="datetimeFigureOut">
               <a:rPr lang="en-US" smtClean="0"/>
-              <a:t>10/6/2018</a:t>
+              <a:t>10/7/2018</a:t>
             </a:fld>
             <a:endParaRPr lang="en-US"/>
           </a:p>
@@ -7698,7 +7988,7 @@
           <a:p>
             <a:fld id="{B5D86D52-4857-4668-9EB7-B41E21252CF7}" type="datetimeFigureOut">
               <a:rPr lang="en-US" smtClean="0"/>
-              <a:t>10/6/2018</a:t>
+              <a:t>10/7/2018</a:t>
             </a:fld>
             <a:endParaRPr lang="en-US"/>
           </a:p>
@@ -7939,7 +8229,7 @@
           <a:p>
             <a:fld id="{B5D86D52-4857-4668-9EB7-B41E21252CF7}" type="datetimeFigureOut">
               <a:rPr lang="en-US" smtClean="0"/>
-              <a:t>10/6/2018</a:t>
+              <a:t>10/7/2018</a:t>
             </a:fld>
             <a:endParaRPr lang="en-US"/>
           </a:p>
@@ -8491,7 +8781,7 @@
           <a:p>
             <a:fld id="{EEC3160E-2579-4584-9765-DC1BA0B358F9}" type="datetimeFigureOut">
               <a:rPr lang="en-US" smtClean="0"/>
-              <a:t>10/6/2018</a:t>
+              <a:t>10/7/2018</a:t>
             </a:fld>
             <a:endParaRPr lang="en-US"/>
           </a:p>
@@ -9646,7 +9936,7 @@
         <p:spPr/>
         <p:txBody>
           <a:bodyPr>
-            <a:normAutofit fontScale="77500" lnSpcReduction="20000"/>
+            <a:normAutofit fontScale="70000" lnSpcReduction="20000"/>
           </a:bodyPr>
           <a:lstStyle/>
           <a:p>
@@ -9654,7 +9944,7 @@
               <a:buNone/>
             </a:pPr>
             <a:r>
-              <a:rPr lang="en-US" b="1" dirty="0">
+              <a:rPr lang="en-US" sz="3400" b="1" dirty="0">
                 <a:solidFill>
                   <a:schemeClr val="accent4"/>
                 </a:solidFill>
@@ -9664,13 +9954,13 @@
           </a:p>
           <a:p>
             <a:r>
-              <a:rPr lang="en-US" dirty="0"/>
+              <a:rPr lang="en-US" sz="3100" dirty="0"/>
               <a:t>Azure subscription</a:t>
             </a:r>
           </a:p>
           <a:p>
             <a:r>
-              <a:rPr lang="en-US" dirty="0"/>
+              <a:rPr lang="en-US" sz="3100" dirty="0"/>
               <a:t>Azure CLI</a:t>
             </a:r>
           </a:p>
@@ -9713,7 +10003,7 @@
               <a:buNone/>
             </a:pPr>
             <a:r>
-              <a:rPr lang="en-US" b="1" dirty="0">
+              <a:rPr lang="en-US" sz="3400" b="1" dirty="0">
                 <a:solidFill>
                   <a:schemeClr val="accent4"/>
                 </a:solidFill>
@@ -9726,41 +10016,41 @@
               <a:buNone/>
             </a:pPr>
             <a:r>
-              <a:rPr lang="en-US" b="1" dirty="0">
+              <a:rPr lang="en-US" sz="3100" b="1" dirty="0">
                 <a:latin typeface="Courier New" panose="02070309020205020404" pitchFamily="49" charset="0"/>
                 <a:cs typeface="Courier New" panose="02070309020205020404" pitchFamily="49" charset="0"/>
               </a:rPr>
               <a:t>&gt;</a:t>
             </a:r>
             <a:r>
-              <a:rPr lang="en-US" dirty="0">
+              <a:rPr lang="en-US" sz="3100" dirty="0">
                 <a:latin typeface="Courier New" panose="02070309020205020404" pitchFamily="49" charset="0"/>
                 <a:cs typeface="Courier New" panose="02070309020205020404" pitchFamily="49" charset="0"/>
               </a:rPr>
               <a:t> </a:t>
             </a:r>
             <a:r>
-              <a:rPr lang="en-US" dirty="0" err="1">
+              <a:rPr lang="en-US" sz="3100" dirty="0" err="1">
                 <a:latin typeface="Courier New" panose="02070309020205020404" pitchFamily="49" charset="0"/>
                 <a:cs typeface="Courier New" panose="02070309020205020404" pitchFamily="49" charset="0"/>
               </a:rPr>
               <a:t>az</a:t>
             </a:r>
             <a:r>
-              <a:rPr lang="en-US" dirty="0">
+              <a:rPr lang="en-US" sz="3100" dirty="0">
                 <a:latin typeface="Courier New" panose="02070309020205020404" pitchFamily="49" charset="0"/>
                 <a:cs typeface="Courier New" panose="02070309020205020404" pitchFamily="49" charset="0"/>
               </a:rPr>
               <a:t> </a:t>
             </a:r>
             <a:r>
-              <a:rPr lang="en-US" dirty="0" err="1">
+              <a:rPr lang="en-US" sz="3100" dirty="0" err="1">
                 <a:latin typeface="Courier New" panose="02070309020205020404" pitchFamily="49" charset="0"/>
                 <a:cs typeface="Courier New" panose="02070309020205020404" pitchFamily="49" charset="0"/>
               </a:rPr>
               <a:t>keyvault</a:t>
             </a:r>
-            <a:endParaRPr lang="en-US" dirty="0"/>
+            <a:endParaRPr lang="en-US" sz="3100" dirty="0"/>
           </a:p>
         </p:txBody>
       </p:sp>
@@ -9821,7 +10111,7 @@
         </p:spPr>
         <p:txBody>
           <a:bodyPr>
-            <a:normAutofit fontScale="77500" lnSpcReduction="20000"/>
+            <a:normAutofit fontScale="70000" lnSpcReduction="20000"/>
           </a:bodyPr>
           <a:lstStyle/>
           <a:p>
@@ -9829,7 +10119,7 @@
               <a:buNone/>
             </a:pPr>
             <a:r>
-              <a:rPr lang="en-US" b="1" dirty="0">
+              <a:rPr lang="en-US" sz="3400" b="1" dirty="0">
                 <a:solidFill>
                   <a:schemeClr val="accent4"/>
                 </a:solidFill>
@@ -9839,34 +10129,33 @@
           </a:p>
           <a:p>
             <a:r>
-              <a:rPr lang="en-US" dirty="0"/>
+              <a:rPr lang="en-US" sz="3100" dirty="0"/>
               <a:t>Azure subscription</a:t>
             </a:r>
           </a:p>
           <a:p>
             <a:r>
-              <a:rPr lang="en-US" dirty="0"/>
+              <a:rPr lang="en-US" sz="3100" dirty="0"/>
               <a:t>.NET Core SDK v2.1+</a:t>
             </a:r>
           </a:p>
           <a:p>
             <a:r>
-              <a:rPr lang="en-US"/>
+              <a:rPr lang="en-US" sz="3100" dirty="0"/>
               <a:t>VS 2017 15.7+</a:t>
             </a:r>
-            <a:endParaRPr lang="en-US" dirty="0"/>
           </a:p>
           <a:p>
             <a:pPr lvl="1"/>
             <a:r>
-              <a:rPr lang="en-US" dirty="0"/>
+              <a:rPr lang="en-US" sz="3100" dirty="0"/>
               <a:t>.NET Core cross-platform development</a:t>
             </a:r>
           </a:p>
           <a:p>
             <a:pPr lvl="1"/>
             <a:r>
-              <a:rPr lang="en-US" dirty="0"/>
+              <a:rPr lang="en-US" sz="3100" dirty="0"/>
               <a:t>ASP.NET and web development</a:t>
             </a:r>
           </a:p>
@@ -9885,7 +10174,7 @@
               <a:buNone/>
             </a:pPr>
             <a:r>
-              <a:rPr lang="en-US" b="1" dirty="0">
+              <a:rPr lang="en-US" sz="3400" b="1" dirty="0">
                 <a:solidFill>
                   <a:schemeClr val="accent4"/>
                 </a:solidFill>
@@ -9902,7 +10191,11 @@
               <a:t>Solution Explorer </a:t>
             </a:r>
             <a:r>
-              <a:rPr lang="en-US" b="1" dirty="0"/>
+              <a:rPr lang="en-US" sz="4300" b="1" dirty="0">
+                <a:solidFill>
+                  <a:schemeClr val="accent4"/>
+                </a:solidFill>
+              </a:rPr>
               <a:t>&gt;</a:t>
             </a:r>
             <a:r>
@@ -9910,7 +10203,11 @@
               <a:t> double-click Connected Services </a:t>
             </a:r>
             <a:r>
-              <a:rPr lang="en-US" b="1" dirty="0"/>
+              <a:rPr lang="en-US" sz="4300" b="1" dirty="0">
+                <a:solidFill>
+                  <a:schemeClr val="accent4"/>
+                </a:solidFill>
+              </a:rPr>
               <a:t>&gt;</a:t>
             </a:r>
             <a:r>
@@ -11680,6 +11977,527 @@
           <a:p>
             <a:r>
               <a:rPr lang="en-US" dirty="0"/>
+              <a:t>Key Vault: Configure access</a:t>
+            </a:r>
+          </a:p>
+        </p:txBody>
+      </p:sp>
+      <p:pic>
+        <p:nvPicPr>
+          <p:cNvPr id="4" name="Content Placeholder 3">
+            <a:extLst>
+              <a:ext uri="{FF2B5EF4-FFF2-40B4-BE49-F238E27FC236}">
+                <a16:creationId xmlns:a16="http://schemas.microsoft.com/office/drawing/2014/main" id="{14BEC922-47AD-4973-84E6-93B63223D7ED}"/>
+              </a:ext>
+            </a:extLst>
+          </p:cNvPr>
+          <p:cNvPicPr>
+            <a:picLocks noGrp="1" noChangeAspect="1"/>
+          </p:cNvPicPr>
+          <p:nvPr>
+            <p:ph idx="1"/>
+          </p:nvPr>
+        </p:nvPicPr>
+        <p:blipFill>
+          <a:blip r:embed="rId3"/>
+          <a:stretch>
+            <a:fillRect/>
+          </a:stretch>
+        </p:blipFill>
+        <p:spPr>
+          <a:xfrm>
+            <a:off x="938372" y="1606303"/>
+            <a:ext cx="10555399" cy="3849412"/>
+          </a:xfrm>
+          <a:prstGeom prst="rect">
+            <a:avLst/>
+          </a:prstGeom>
+        </p:spPr>
+      </p:pic>
+    </p:spTree>
+    <p:extLst>
+      <p:ext uri="{BB962C8B-B14F-4D97-AF65-F5344CB8AC3E}">
+        <p14:creationId xmlns:p14="http://schemas.microsoft.com/office/powerpoint/2010/main" val="2178576446"/>
+      </p:ext>
+    </p:extLst>
+  </p:cSld>
+  <p:clrMapOvr>
+    <a:masterClrMapping/>
+  </p:clrMapOvr>
+</p:sld>
+</file>
+
+<file path=ppt/slides/slide13.xml><?xml version="1.0" encoding="utf-8"?>
+<p:sld xmlns:a="http://schemas.openxmlformats.org/drawingml/2006/main" xmlns:r="http://schemas.openxmlformats.org/officeDocument/2006/relationships" xmlns:p="http://schemas.openxmlformats.org/presentationml/2006/main">
+  <p:cSld>
+    <p:bg>
+      <p:bgPr>
+        <a:solidFill>
+          <a:srgbClr val="505050"/>
+        </a:solidFill>
+        <a:effectLst/>
+      </p:bgPr>
+    </p:bg>
+    <p:spTree>
+      <p:nvGrpSpPr>
+        <p:cNvPr id="1" name=""/>
+        <p:cNvGrpSpPr/>
+        <p:nvPr/>
+      </p:nvGrpSpPr>
+      <p:grpSpPr>
+        <a:xfrm>
+          <a:off x="0" y="0"/>
+          <a:ext cx="0" cy="0"/>
+          <a:chOff x="0" y="0"/>
+          <a:chExt cx="0" cy="0"/>
+        </a:xfrm>
+      </p:grpSpPr>
+      <p:sp>
+        <p:nvSpPr>
+          <p:cNvPr id="2" name="Title 1"/>
+          <p:cNvSpPr>
+            <a:spLocks noGrp="1"/>
+          </p:cNvSpPr>
+          <p:nvPr>
+            <p:ph type="title"/>
+          </p:nvPr>
+        </p:nvSpPr>
+        <p:spPr/>
+        <p:txBody>
+          <a:bodyPr/>
+          <a:lstStyle/>
+          <a:p>
+            <a:r>
+              <a:rPr lang="en-US" dirty="0"/>
+              <a:t>Key Vault: Configure access (cont.)</a:t>
+            </a:r>
+          </a:p>
+        </p:txBody>
+      </p:sp>
+      <p:pic>
+        <p:nvPicPr>
+          <p:cNvPr id="7" name="Content Placeholder 6">
+            <a:extLst>
+              <a:ext uri="{FF2B5EF4-FFF2-40B4-BE49-F238E27FC236}">
+                <a16:creationId xmlns:a16="http://schemas.microsoft.com/office/drawing/2014/main" id="{F5811D25-5A94-4382-AD6B-B6F8A24C1411}"/>
+              </a:ext>
+            </a:extLst>
+          </p:cNvPr>
+          <p:cNvPicPr>
+            <a:picLocks noGrp="1" noChangeAspect="1"/>
+          </p:cNvPicPr>
+          <p:nvPr>
+            <p:ph idx="1"/>
+          </p:nvPr>
+        </p:nvPicPr>
+        <p:blipFill>
+          <a:blip r:embed="rId3"/>
+          <a:stretch>
+            <a:fillRect/>
+          </a:stretch>
+        </p:blipFill>
+        <p:spPr>
+          <a:xfrm>
+            <a:off x="6465780" y="1805218"/>
+            <a:ext cx="2637174" cy="4351338"/>
+          </a:xfrm>
+          <a:prstGeom prst="rect">
+            <a:avLst/>
+          </a:prstGeom>
+        </p:spPr>
+      </p:pic>
+      <p:pic>
+        <p:nvPicPr>
+          <p:cNvPr id="6" name="Picture 5">
+            <a:extLst>
+              <a:ext uri="{FF2B5EF4-FFF2-40B4-BE49-F238E27FC236}">
+                <a16:creationId xmlns:a16="http://schemas.microsoft.com/office/drawing/2014/main" id="{0571DCE1-58E5-454B-9E00-505CC5F52BED}"/>
+              </a:ext>
+            </a:extLst>
+          </p:cNvPr>
+          <p:cNvPicPr>
+            <a:picLocks noChangeAspect="1"/>
+          </p:cNvPicPr>
+          <p:nvPr/>
+        </p:nvPicPr>
+        <p:blipFill>
+          <a:blip r:embed="rId4"/>
+          <a:stretch>
+            <a:fillRect/>
+          </a:stretch>
+        </p:blipFill>
+        <p:spPr>
+          <a:xfrm>
+            <a:off x="838200" y="1825625"/>
+            <a:ext cx="5452136" cy="4357578"/>
+          </a:xfrm>
+          <a:prstGeom prst="rect">
+            <a:avLst/>
+          </a:prstGeom>
+        </p:spPr>
+      </p:pic>
+      <p:pic>
+        <p:nvPicPr>
+          <p:cNvPr id="8" name="Picture 7">
+            <a:extLst>
+              <a:ext uri="{FF2B5EF4-FFF2-40B4-BE49-F238E27FC236}">
+                <a16:creationId xmlns:a16="http://schemas.microsoft.com/office/drawing/2014/main" id="{41B33B12-2E78-4E84-8699-A6C11F13B1FF}"/>
+              </a:ext>
+            </a:extLst>
+          </p:cNvPr>
+          <p:cNvPicPr>
+            <a:picLocks noChangeAspect="1"/>
+          </p:cNvPicPr>
+          <p:nvPr/>
+        </p:nvPicPr>
+        <p:blipFill>
+          <a:blip r:embed="rId5"/>
+          <a:stretch>
+            <a:fillRect/>
+          </a:stretch>
+        </p:blipFill>
+        <p:spPr>
+          <a:xfrm>
+            <a:off x="8492857" y="2440668"/>
+            <a:ext cx="2633682" cy="2952772"/>
+          </a:xfrm>
+          <a:prstGeom prst="rect">
+            <a:avLst/>
+          </a:prstGeom>
+          <a:effectLst>
+            <a:outerShdw blurRad="50800" dist="38100" dir="8100000" algn="tr" rotWithShape="0">
+              <a:prstClr val="black">
+                <a:alpha val="40000"/>
+              </a:prstClr>
+            </a:outerShdw>
+          </a:effectLst>
+        </p:spPr>
+      </p:pic>
+      <p:sp>
+        <p:nvSpPr>
+          <p:cNvPr id="9" name="Arrow: Down 8">
+            <a:extLst>
+              <a:ext uri="{FF2B5EF4-FFF2-40B4-BE49-F238E27FC236}">
+                <a16:creationId xmlns:a16="http://schemas.microsoft.com/office/drawing/2014/main" id="{A0E20085-73EB-424C-A3FC-37C6B46F76FD}"/>
+              </a:ext>
+            </a:extLst>
+          </p:cNvPr>
+          <p:cNvSpPr/>
+          <p:nvPr/>
+        </p:nvSpPr>
+        <p:spPr>
+          <a:xfrm rot="14773509">
+            <a:off x="5555692" y="1963016"/>
+            <a:ext cx="424254" cy="1812869"/>
+          </a:xfrm>
+          <a:prstGeom prst="downArrow">
+            <a:avLst/>
+          </a:prstGeom>
+        </p:spPr>
+        <p:style>
+          <a:lnRef idx="2">
+            <a:schemeClr val="accent1">
+              <a:shade val="50000"/>
+            </a:schemeClr>
+          </a:lnRef>
+          <a:fillRef idx="1">
+            <a:schemeClr val="accent1"/>
+          </a:fillRef>
+          <a:effectRef idx="0">
+            <a:schemeClr val="accent1"/>
+          </a:effectRef>
+          <a:fontRef idx="minor">
+            <a:schemeClr val="lt1"/>
+          </a:fontRef>
+        </p:style>
+        <p:txBody>
+          <a:bodyPr rtlCol="0" anchor="ctr"/>
+          <a:lstStyle/>
+          <a:p>
+            <a:pPr algn="ctr"/>
+            <a:endParaRPr lang="en-US" dirty="0"/>
+          </a:p>
+        </p:txBody>
+      </p:sp>
+      <p:sp>
+        <p:nvSpPr>
+          <p:cNvPr id="10" name="Arrow: Down 9">
+            <a:extLst>
+              <a:ext uri="{FF2B5EF4-FFF2-40B4-BE49-F238E27FC236}">
+                <a16:creationId xmlns:a16="http://schemas.microsoft.com/office/drawing/2014/main" id="{7FF33B08-6944-44F1-9883-DFD480ABD01D}"/>
+              </a:ext>
+            </a:extLst>
+          </p:cNvPr>
+          <p:cNvSpPr/>
+          <p:nvPr/>
+        </p:nvSpPr>
+        <p:spPr>
+          <a:xfrm rot="14773509">
+            <a:off x="7841689" y="3315120"/>
+            <a:ext cx="424254" cy="997005"/>
+          </a:xfrm>
+          <a:prstGeom prst="downArrow">
+            <a:avLst/>
+          </a:prstGeom>
+        </p:spPr>
+        <p:style>
+          <a:lnRef idx="2">
+            <a:schemeClr val="accent1">
+              <a:shade val="50000"/>
+            </a:schemeClr>
+          </a:lnRef>
+          <a:fillRef idx="1">
+            <a:schemeClr val="accent1"/>
+          </a:fillRef>
+          <a:effectRef idx="0">
+            <a:schemeClr val="accent1"/>
+          </a:effectRef>
+          <a:fontRef idx="minor">
+            <a:schemeClr val="lt1"/>
+          </a:fontRef>
+        </p:style>
+        <p:txBody>
+          <a:bodyPr rtlCol="0" anchor="ctr"/>
+          <a:lstStyle/>
+          <a:p>
+            <a:pPr algn="ctr"/>
+            <a:endParaRPr lang="en-US" dirty="0"/>
+          </a:p>
+        </p:txBody>
+      </p:sp>
+    </p:spTree>
+    <p:extLst>
+      <p:ext uri="{BB962C8B-B14F-4D97-AF65-F5344CB8AC3E}">
+        <p14:creationId xmlns:p14="http://schemas.microsoft.com/office/powerpoint/2010/main" val="4017086765"/>
+      </p:ext>
+    </p:extLst>
+  </p:cSld>
+  <p:clrMapOvr>
+    <a:masterClrMapping/>
+  </p:clrMapOvr>
+  <p:timing>
+    <p:tnLst>
+      <p:par>
+        <p:cTn id="1" dur="indefinite" restart="never" nodeType="tmRoot">
+          <p:childTnLst>
+            <p:seq concurrent="1" nextAc="seek">
+              <p:cTn id="2" dur="indefinite" nodeType="mainSeq">
+                <p:childTnLst>
+                  <p:par>
+                    <p:cTn id="3" fill="hold">
+                      <p:stCondLst>
+                        <p:cond delay="indefinite"/>
+                      </p:stCondLst>
+                      <p:childTnLst>
+                        <p:par>
+                          <p:cTn id="4" fill="hold">
+                            <p:stCondLst>
+                              <p:cond delay="0"/>
+                            </p:stCondLst>
+                            <p:childTnLst>
+                              <p:par>
+                                <p:cTn id="5" presetID="1" presetClass="entr" presetSubtype="0" fill="hold" grpId="0" nodeType="clickEffect">
+                                  <p:stCondLst>
+                                    <p:cond delay="0"/>
+                                  </p:stCondLst>
+                                  <p:childTnLst>
+                                    <p:set>
+                                      <p:cBhvr>
+                                        <p:cTn id="6" dur="1" fill="hold">
+                                          <p:stCondLst>
+                                            <p:cond delay="0"/>
+                                          </p:stCondLst>
+                                        </p:cTn>
+                                        <p:tgtEl>
+                                          <p:spTgt spid="9"/>
+                                        </p:tgtEl>
+                                        <p:attrNameLst>
+                                          <p:attrName>style.visibility</p:attrName>
+                                        </p:attrNameLst>
+                                      </p:cBhvr>
+                                      <p:to>
+                                        <p:strVal val="visible"/>
+                                      </p:to>
+                                    </p:set>
+                                  </p:childTnLst>
+                                </p:cTn>
+                              </p:par>
+                              <p:par>
+                                <p:cTn id="7" presetID="1" presetClass="entr" presetSubtype="0" fill="hold" nodeType="withEffect">
+                                  <p:stCondLst>
+                                    <p:cond delay="0"/>
+                                  </p:stCondLst>
+                                  <p:childTnLst>
+                                    <p:set>
+                                      <p:cBhvr>
+                                        <p:cTn id="8" dur="1" fill="hold">
+                                          <p:stCondLst>
+                                            <p:cond delay="0"/>
+                                          </p:stCondLst>
+                                        </p:cTn>
+                                        <p:tgtEl>
+                                          <p:spTgt spid="7"/>
+                                        </p:tgtEl>
+                                        <p:attrNameLst>
+                                          <p:attrName>style.visibility</p:attrName>
+                                        </p:attrNameLst>
+                                      </p:cBhvr>
+                                      <p:to>
+                                        <p:strVal val="visible"/>
+                                      </p:to>
+                                    </p:set>
+                                  </p:childTnLst>
+                                </p:cTn>
+                              </p:par>
+                            </p:childTnLst>
+                          </p:cTn>
+                        </p:par>
+                      </p:childTnLst>
+                    </p:cTn>
+                  </p:par>
+                  <p:par>
+                    <p:cTn id="9" fill="hold">
+                      <p:stCondLst>
+                        <p:cond delay="indefinite"/>
+                      </p:stCondLst>
+                      <p:childTnLst>
+                        <p:par>
+                          <p:cTn id="10" fill="hold">
+                            <p:stCondLst>
+                              <p:cond delay="0"/>
+                            </p:stCondLst>
+                            <p:childTnLst>
+                              <p:par>
+                                <p:cTn id="11" presetID="1" presetClass="entr" presetSubtype="0" fill="hold" grpId="0" nodeType="clickEffect">
+                                  <p:stCondLst>
+                                    <p:cond delay="0"/>
+                                  </p:stCondLst>
+                                  <p:childTnLst>
+                                    <p:set>
+                                      <p:cBhvr>
+                                        <p:cTn id="12" dur="1" fill="hold">
+                                          <p:stCondLst>
+                                            <p:cond delay="0"/>
+                                          </p:stCondLst>
+                                        </p:cTn>
+                                        <p:tgtEl>
+                                          <p:spTgt spid="10"/>
+                                        </p:tgtEl>
+                                        <p:attrNameLst>
+                                          <p:attrName>style.visibility</p:attrName>
+                                        </p:attrNameLst>
+                                      </p:cBhvr>
+                                      <p:to>
+                                        <p:strVal val="visible"/>
+                                      </p:to>
+                                    </p:set>
+                                  </p:childTnLst>
+                                </p:cTn>
+                              </p:par>
+                              <p:par>
+                                <p:cTn id="13" presetID="1" presetClass="entr" presetSubtype="0" fill="hold" nodeType="withEffect">
+                                  <p:stCondLst>
+                                    <p:cond delay="0"/>
+                                  </p:stCondLst>
+                                  <p:childTnLst>
+                                    <p:set>
+                                      <p:cBhvr>
+                                        <p:cTn id="14" dur="1" fill="hold">
+                                          <p:stCondLst>
+                                            <p:cond delay="0"/>
+                                          </p:stCondLst>
+                                        </p:cTn>
+                                        <p:tgtEl>
+                                          <p:spTgt spid="8"/>
+                                        </p:tgtEl>
+                                        <p:attrNameLst>
+                                          <p:attrName>style.visibility</p:attrName>
+                                        </p:attrNameLst>
+                                      </p:cBhvr>
+                                      <p:to>
+                                        <p:strVal val="visible"/>
+                                      </p:to>
+                                    </p:set>
+                                  </p:childTnLst>
+                                </p:cTn>
+                              </p:par>
+                            </p:childTnLst>
+                          </p:cTn>
+                        </p:par>
+                      </p:childTnLst>
+                    </p:cTn>
+                  </p:par>
+                </p:childTnLst>
+              </p:cTn>
+              <p:prevCondLst>
+                <p:cond evt="onPrev" delay="0">
+                  <p:tgtEl>
+                    <p:sldTgt/>
+                  </p:tgtEl>
+                </p:cond>
+              </p:prevCondLst>
+              <p:nextCondLst>
+                <p:cond evt="onNext" delay="0">
+                  <p:tgtEl>
+                    <p:sldTgt/>
+                  </p:tgtEl>
+                </p:cond>
+              </p:nextCondLst>
+            </p:seq>
+          </p:childTnLst>
+        </p:cTn>
+      </p:par>
+    </p:tnLst>
+    <p:bldLst>
+      <p:bldP spid="9" grpId="0" animBg="1"/>
+      <p:bldP spid="10" grpId="0" animBg="1"/>
+    </p:bldLst>
+  </p:timing>
+</p:sld>
+</file>
+
+<file path=ppt/slides/slide14.xml><?xml version="1.0" encoding="utf-8"?>
+<p:sld xmlns:a="http://schemas.openxmlformats.org/drawingml/2006/main" xmlns:r="http://schemas.openxmlformats.org/officeDocument/2006/relationships" xmlns:p="http://schemas.openxmlformats.org/presentationml/2006/main">
+  <p:cSld>
+    <p:bg>
+      <p:bgPr>
+        <a:solidFill>
+          <a:srgbClr val="505050"/>
+        </a:solidFill>
+        <a:effectLst/>
+      </p:bgPr>
+    </p:bg>
+    <p:spTree>
+      <p:nvGrpSpPr>
+        <p:cNvPr id="1" name=""/>
+        <p:cNvGrpSpPr/>
+        <p:nvPr/>
+      </p:nvGrpSpPr>
+      <p:grpSpPr>
+        <a:xfrm>
+          <a:off x="0" y="0"/>
+          <a:ext cx="0" cy="0"/>
+          <a:chOff x="0" y="0"/>
+          <a:chExt cx="0" cy="0"/>
+        </a:xfrm>
+      </p:grpSpPr>
+      <p:sp>
+        <p:nvSpPr>
+          <p:cNvPr id="2" name="Title 1"/>
+          <p:cNvSpPr>
+            <a:spLocks noGrp="1"/>
+          </p:cNvSpPr>
+          <p:nvPr>
+            <p:ph type="title"/>
+          </p:nvPr>
+        </p:nvSpPr>
+        <p:spPr/>
+        <p:txBody>
+          <a:bodyPr/>
+          <a:lstStyle/>
+          <a:p>
+            <a:r>
+              <a:rPr lang="en-US" dirty="0"/>
               <a:t>Key Vault: Retrieval</a:t>
             </a:r>
           </a:p>
@@ -12458,7 +13276,7 @@
 </p:sld>
 </file>
 
-<file path=ppt/slides/slide13.xml><?xml version="1.0" encoding="utf-8"?>
+<file path=ppt/slides/slide15.xml><?xml version="1.0" encoding="utf-8"?>
 <p:sld xmlns:a="http://schemas.openxmlformats.org/drawingml/2006/main" xmlns:r="http://schemas.openxmlformats.org/officeDocument/2006/relationships" xmlns:p="http://schemas.openxmlformats.org/presentationml/2006/main">
   <p:cSld>
     <p:bg>
@@ -12822,7 +13640,7 @@
 </p:sld>
 </file>
 
-<file path=ppt/slides/slide14.xml><?xml version="1.0" encoding="utf-8"?>
+<file path=ppt/slides/slide16.xml><?xml version="1.0" encoding="utf-8"?>
 <p:sld xmlns:a="http://schemas.openxmlformats.org/drawingml/2006/main" xmlns:r="http://schemas.openxmlformats.org/officeDocument/2006/relationships" xmlns:p="http://schemas.openxmlformats.org/presentationml/2006/main">
   <p:cSld>
     <p:bg>
@@ -13345,7 +14163,7 @@
 </p:sld>
 </file>
 
-<file path=ppt/slides/slide15.xml><?xml version="1.0" encoding="utf-8"?>
+<file path=ppt/slides/slide17.xml><?xml version="1.0" encoding="utf-8"?>
 <p:sld xmlns:a="http://schemas.openxmlformats.org/drawingml/2006/main" xmlns:r="http://schemas.openxmlformats.org/officeDocument/2006/relationships" xmlns:p="http://schemas.openxmlformats.org/presentationml/2006/main">
   <p:cSld>
     <p:bg>
@@ -13491,7 +14309,7 @@
 </p:sld>
 </file>
 
-<file path=ppt/slides/slide16.xml><?xml version="1.0" encoding="utf-8"?>
+<file path=ppt/slides/slide18.xml><?xml version="1.0" encoding="utf-8"?>
 <p:sld xmlns:a="http://schemas.openxmlformats.org/drawingml/2006/main" xmlns:r="http://schemas.openxmlformats.org/officeDocument/2006/relationships" xmlns:p="http://schemas.openxmlformats.org/presentationml/2006/main">
   <p:cSld>
     <p:bg>
@@ -13621,14 +14439,32 @@
             </a:endParaRPr>
           </a:p>
           <a:p>
+            <a:pPr marL="0" indent="0">
+              <a:buNone/>
+            </a:pPr>
+            <a:r>
+              <a:rPr lang="en-US">
+                <a:hlinkClick r:id="rId4"/>
+              </a:rPr>
+              <a:t>a</a:t>
+            </a:r>
+            <a:r>
+              <a:rPr lang="en-US">
+                <a:hlinkClick r:id="rId4"/>
+              </a:rPr>
+              <a:t>ka</a:t>
+            </a:r>
             <a:r>
               <a:rPr lang="en-US" dirty="0">
                 <a:hlinkClick r:id="rId4"/>
               </a:rPr>
-              <a:t>aka.ms/dotnet-secret-mgr</a:t>
-            </a:r>
-          </a:p>
-          <a:p>
+              <a:t>.ms/dotnet-secret-mgr</a:t>
+            </a:r>
+          </a:p>
+          <a:p>
+            <a:pPr marL="0" indent="0">
+              <a:buNone/>
+            </a:pPr>
             <a:r>
               <a:rPr lang="en-US" dirty="0">
                 <a:hlinkClick r:id="rId5"/>
@@ -13815,7 +14651,7 @@
           <a:p>
             <a:r>
               <a:rPr lang="en-US" dirty="0"/>
-              <a:t>The problem</a:t>
+              <a:t>Identify the problem</a:t>
             </a:r>
           </a:p>
           <a:p>
@@ -14300,10 +15136,12 @@
             <a:picLocks noChangeAspect="1"/>
           </p:cNvPicPr>
           <p:nvPr>
-            <a:videoFile r:link="rId2"/>
+            <a:videoFile r:link="rId1"/>
             <p:extLst>
               <p:ext uri="{DAA4B4D4-6D71-4841-9C94-3DE7FCFB9230}">
-                <p14:media xmlns:p14="http://schemas.microsoft.com/office/powerpoint/2010/main" r:embed="rId1"/>
+                <p14:media xmlns:p14="http://schemas.microsoft.com/office/powerpoint/2010/main" r:embed="rId2">
+                  <p14:trim end="197"/>
+                </p14:media>
               </p:ext>
             </p:extLst>
           </p:nvPr>
@@ -14337,11 +15175,7 @@
             <a:graphicFrameLocks noGrp="1"/>
           </p:cNvGraphicFramePr>
           <p:nvPr>
-            <p:extLst>
-              <p:ext uri="{D42A27DB-BD31-4B8C-83A1-F6EECF244321}">
-                <p14:modId xmlns:p14="http://schemas.microsoft.com/office/powerpoint/2010/main" val="4261986974"/>
-              </p:ext>
-            </p:extLst>
+            <p:extLst/>
           </p:nvPr>
         </p:nvGraphicFramePr>
         <p:xfrm>
@@ -15012,7 +15846,7 @@
         </p:nvSpPr>
         <p:spPr>
           <a:xfrm>
-            <a:off x="0" y="333121"/>
+            <a:off x="0" y="327511"/>
             <a:ext cx="7428089" cy="338554"/>
           </a:xfrm>
           <a:prstGeom prst="rect">
@@ -15087,7 +15921,7 @@
         </p:nvSpPr>
         <p:spPr>
           <a:xfrm>
-            <a:off x="0" y="672720"/>
+            <a:off x="0" y="667110"/>
             <a:ext cx="7428089" cy="338554"/>
           </a:xfrm>
           <a:prstGeom prst="rect">
@@ -15203,7 +16037,7 @@
     </p:spTree>
     <p:extLst>
       <p:ext uri="{BB962C8B-B14F-4D97-AF65-F5344CB8AC3E}">
-        <p14:creationId xmlns:p14="http://schemas.microsoft.com/office/powerpoint/2010/main" val="2501423874"/>
+        <p14:creationId xmlns:p14="http://schemas.microsoft.com/office/powerpoint/2010/main" val="2690261117"/>
       </p:ext>
     </p:extLst>
   </p:cSld>
@@ -15222,6 +16056,9 @@
                     <p:cTn id="3" fill="hold">
                       <p:stCondLst>
                         <p:cond delay="indefinite"/>
+                        <p:cond evt="onBegin" delay="0">
+                          <p:tn val="2"/>
+                        </p:cond>
                       </p:stCondLst>
                       <p:childTnLst>
                         <p:par>
@@ -15231,14 +16068,14 @@
                             </p:stCondLst>
                             <p:childTnLst>
                               <p:par>
-                                <p:cTn id="5" presetID="1" presetClass="mediacall" presetSubtype="0" fill="hold" nodeType="clickEffect">
+                                <p:cTn id="5" presetID="1" presetClass="mediacall" presetSubtype="0" fill="hold" nodeType="afterEffect">
                                   <p:stCondLst>
                                     <p:cond delay="0"/>
                                   </p:stCondLst>
                                   <p:childTnLst>
                                     <p:cmd type="call" cmd="playFrom(0.0)">
                                       <p:cBhvr>
-                                        <p:cTn id="6" dur="24320" fill="hold"/>
+                                        <p:cTn id="6" dur="24123" fill="hold"/>
                                         <p:tgtEl>
                                           <p:spTgt spid="7"/>
                                         </p:tgtEl>
@@ -15247,33 +16084,15 @@
                                   </p:childTnLst>
                                 </p:cTn>
                               </p:par>
-                            </p:childTnLst>
-                          </p:cTn>
-                        </p:par>
-                      </p:childTnLst>
-                    </p:cTn>
-                  </p:par>
-                  <p:par>
-                    <p:cTn id="7" fill="hold">
-                      <p:stCondLst>
-                        <p:cond delay="indefinite"/>
-                      </p:stCondLst>
-                      <p:childTnLst>
-                        <p:par>
-                          <p:cTn id="8" fill="hold">
-                            <p:stCondLst>
-                              <p:cond delay="0"/>
-                            </p:stCondLst>
-                            <p:childTnLst>
                               <p:par>
-                                <p:cTn id="9" presetID="10" presetClass="entr" presetSubtype="0" fill="hold" grpId="0" nodeType="clickEffect">
+                                <p:cTn id="7" presetID="10" presetClass="entr" presetSubtype="0" fill="hold" grpId="0" nodeType="withEffect">
                                   <p:stCondLst>
-                                    <p:cond delay="0"/>
+                                    <p:cond delay="1000"/>
                                   </p:stCondLst>
                                   <p:childTnLst>
                                     <p:set>
                                       <p:cBhvr>
-                                        <p:cTn id="10" dur="1" fill="hold">
+                                        <p:cTn id="8" dur="1" fill="hold">
                                           <p:stCondLst>
                                             <p:cond delay="0"/>
                                           </p:stCondLst>
@@ -15291,7 +16110,7 @@
                                     </p:set>
                                     <p:animEffect transition="in" filter="fade">
                                       <p:cBhvr>
-                                        <p:cTn id="11" dur="500"/>
+                                        <p:cTn id="9" dur="500"/>
                                         <p:tgtEl>
                                           <p:spTgt spid="2"/>
                                         </p:tgtEl>
@@ -15301,14 +16120,14 @@
                                 </p:cTn>
                               </p:par>
                               <p:par>
-                                <p:cTn id="12" presetID="10" presetClass="entr" presetSubtype="0" fill="hold" grpId="0" nodeType="withEffect">
+                                <p:cTn id="10" presetID="10" presetClass="entr" presetSubtype="0" fill="hold" grpId="0" nodeType="withEffect">
                                   <p:stCondLst>
-                                    <p:cond delay="0"/>
+                                    <p:cond delay="1000"/>
                                   </p:stCondLst>
                                   <p:childTnLst>
                                     <p:set>
                                       <p:cBhvr>
-                                        <p:cTn id="13" dur="1" fill="hold">
+                                        <p:cTn id="11" dur="1" fill="hold">
                                           <p:stCondLst>
                                             <p:cond delay="0"/>
                                           </p:stCondLst>
@@ -15326,7 +16145,7 @@
                                     </p:set>
                                     <p:animEffect transition="in" filter="fade">
                                       <p:cBhvr>
-                                        <p:cTn id="14" dur="500"/>
+                                        <p:cTn id="12" dur="500"/>
                                         <p:tgtEl>
                                           <p:spTgt spid="9"/>
                                         </p:tgtEl>
@@ -15336,14 +16155,14 @@
                                 </p:cTn>
                               </p:par>
                               <p:par>
-                                <p:cTn id="15" presetID="10" presetClass="entr" presetSubtype="0" fill="hold" nodeType="withEffect">
+                                <p:cTn id="13" presetID="10" presetClass="entr" presetSubtype="0" fill="hold" nodeType="withEffect">
                                   <p:stCondLst>
-                                    <p:cond delay="0"/>
+                                    <p:cond delay="1000"/>
                                   </p:stCondLst>
                                   <p:childTnLst>
                                     <p:set>
                                       <p:cBhvr>
-                                        <p:cTn id="16" dur="1" fill="hold">
+                                        <p:cTn id="14" dur="1" fill="hold">
                                           <p:stCondLst>
                                             <p:cond delay="0"/>
                                           </p:stCondLst>
@@ -15361,7 +16180,7 @@
                                     </p:set>
                                     <p:animEffect transition="in" filter="fade">
                                       <p:cBhvr>
-                                        <p:cTn id="17" dur="500"/>
+                                        <p:cTn id="15" dur="500"/>
                                         <p:tgtEl>
                                           <p:spTgt spid="8"/>
                                         </p:tgtEl>
@@ -15370,33 +16189,15 @@
                                   </p:childTnLst>
                                 </p:cTn>
                               </p:par>
-                            </p:childTnLst>
-                          </p:cTn>
-                        </p:par>
-                      </p:childTnLst>
-                    </p:cTn>
-                  </p:par>
-                  <p:par>
-                    <p:cTn id="18" fill="hold">
-                      <p:stCondLst>
-                        <p:cond delay="indefinite"/>
-                      </p:stCondLst>
-                      <p:childTnLst>
-                        <p:par>
-                          <p:cTn id="19" fill="hold">
-                            <p:stCondLst>
-                              <p:cond delay="0"/>
-                            </p:stCondLst>
-                            <p:childTnLst>
                               <p:par>
-                                <p:cTn id="20" presetID="10" presetClass="entr" presetSubtype="0" fill="hold" grpId="0" nodeType="clickEffect">
+                                <p:cTn id="16" presetID="10" presetClass="entr" presetSubtype="0" fill="hold" grpId="0" nodeType="withEffect">
                                   <p:stCondLst>
-                                    <p:cond delay="0"/>
+                                    <p:cond delay="1000"/>
                                   </p:stCondLst>
                                   <p:childTnLst>
                                     <p:set>
                                       <p:cBhvr>
-                                        <p:cTn id="21" dur="1" fill="hold">
+                                        <p:cTn id="17" dur="1" fill="hold">
                                           <p:stCondLst>
                                             <p:cond delay="0"/>
                                           </p:stCondLst>
@@ -15414,7 +16215,7 @@
                                     </p:set>
                                     <p:animEffect transition="in" filter="fade">
                                       <p:cBhvr>
-                                        <p:cTn id="22" dur="500"/>
+                                        <p:cTn id="18" dur="500"/>
                                         <p:tgtEl>
                                           <p:spTgt spid="3"/>
                                         </p:tgtEl>
@@ -15424,14 +16225,14 @@
                                 </p:cTn>
                               </p:par>
                               <p:par>
-                                <p:cTn id="23" presetID="10" presetClass="entr" presetSubtype="0" fill="hold" grpId="0" nodeType="withEffect">
+                                <p:cTn id="19" presetID="10" presetClass="entr" presetSubtype="0" fill="hold" grpId="0" nodeType="withEffect">
                                   <p:stCondLst>
-                                    <p:cond delay="0"/>
+                                    <p:cond delay="1000"/>
                                   </p:stCondLst>
                                   <p:childTnLst>
                                     <p:set>
                                       <p:cBhvr>
-                                        <p:cTn id="24" dur="1" fill="hold">
+                                        <p:cTn id="20" dur="1" fill="hold">
                                           <p:stCondLst>
                                             <p:cond delay="0"/>
                                           </p:stCondLst>
@@ -15449,7 +16250,7 @@
                                     </p:set>
                                     <p:animEffect transition="in" filter="fade">
                                       <p:cBhvr>
-                                        <p:cTn id="25" dur="500"/>
+                                        <p:cTn id="21" dur="500"/>
                                         <p:tgtEl>
                                           <p:spTgt spid="10"/>
                                         </p:tgtEl>
@@ -15458,28 +16259,10 @@
                                   </p:childTnLst>
                                 </p:cTn>
                               </p:par>
-                            </p:childTnLst>
-                          </p:cTn>
-                        </p:par>
-                      </p:childTnLst>
-                    </p:cTn>
-                  </p:par>
-                  <p:par>
-                    <p:cTn id="26" fill="hold">
-                      <p:stCondLst>
-                        <p:cond delay="indefinite"/>
-                      </p:stCondLst>
-                      <p:childTnLst>
-                        <p:par>
-                          <p:cTn id="27" fill="hold">
-                            <p:stCondLst>
-                              <p:cond delay="0"/>
-                            </p:stCondLst>
-                            <p:childTnLst>
                               <p:par>
-                                <p:cTn id="28" presetID="1" presetClass="entr" presetSubtype="0" fill="hold" nodeType="clickEffect">
+                                <p:cTn id="22" presetID="1" presetClass="entr" presetSubtype="0" fill="hold" nodeType="withEffect">
                                   <p:stCondLst>
-                                    <p:cond delay="0"/>
+                                    <p:cond delay="2000"/>
                                   </p:stCondLst>
                                   <p:iterate type="lt">
                                     <p:tmAbs val="100"/>
@@ -15487,7 +16270,7 @@
                                   <p:childTnLst>
                                     <p:set>
                                       <p:cBhvr>
-                                        <p:cTn id="29" dur="1" fill="hold">
+                                        <p:cTn id="23" dur="1" fill="hold">
                                           <p:stCondLst>
                                             <p:cond delay="0"/>
                                           </p:stCondLst>
@@ -15510,28 +16293,10 @@
                                   </p:childTnLst>
                                 </p:cTn>
                               </p:par>
-                            </p:childTnLst>
-                          </p:cTn>
-                        </p:par>
-                      </p:childTnLst>
-                    </p:cTn>
-                  </p:par>
-                  <p:par>
-                    <p:cTn id="30" fill="hold">
-                      <p:stCondLst>
-                        <p:cond delay="indefinite"/>
-                      </p:stCondLst>
-                      <p:childTnLst>
-                        <p:par>
-                          <p:cTn id="31" fill="hold">
-                            <p:stCondLst>
-                              <p:cond delay="0"/>
-                            </p:stCondLst>
-                            <p:childTnLst>
                               <p:par>
-                                <p:cTn id="32" presetID="1" presetClass="entr" presetSubtype="0" fill="hold" nodeType="clickEffect">
+                                <p:cTn id="24" presetID="1" presetClass="entr" presetSubtype="0" fill="hold" nodeType="withEffect">
                                   <p:stCondLst>
-                                    <p:cond delay="0"/>
+                                    <p:cond delay="4000"/>
                                   </p:stCondLst>
                                   <p:iterate type="lt">
                                     <p:tmAbs val="100"/>
@@ -15539,7 +16304,7 @@
                                   <p:childTnLst>
                                     <p:set>
                                       <p:cBhvr>
-                                        <p:cTn id="33" dur="1" fill="hold">
+                                        <p:cTn id="25" dur="1" fill="hold">
                                           <p:stCondLst>
                                             <p:cond delay="0"/>
                                           </p:stCondLst>
@@ -15562,28 +16327,10 @@
                                   </p:childTnLst>
                                 </p:cTn>
                               </p:par>
-                            </p:childTnLst>
-                          </p:cTn>
-                        </p:par>
-                      </p:childTnLst>
-                    </p:cTn>
-                  </p:par>
-                  <p:par>
-                    <p:cTn id="34" fill="hold">
-                      <p:stCondLst>
-                        <p:cond delay="indefinite"/>
-                      </p:stCondLst>
-                      <p:childTnLst>
-                        <p:par>
-                          <p:cTn id="35" fill="hold">
-                            <p:stCondLst>
-                              <p:cond delay="0"/>
-                            </p:stCondLst>
-                            <p:childTnLst>
                               <p:par>
-                                <p:cTn id="36" presetID="1" presetClass="entr" presetSubtype="0" fill="hold" nodeType="clickEffect">
+                                <p:cTn id="26" presetID="1" presetClass="entr" presetSubtype="0" fill="hold" nodeType="withEffect">
                                   <p:stCondLst>
-                                    <p:cond delay="0"/>
+                                    <p:cond delay="10000"/>
                                   </p:stCondLst>
                                   <p:iterate type="lt">
                                     <p:tmAbs val="100"/>
@@ -15591,7 +16338,7 @@
                                   <p:childTnLst>
                                     <p:set>
                                       <p:cBhvr>
-                                        <p:cTn id="37" dur="1" fill="hold">
+                                        <p:cTn id="27" dur="1" fill="hold">
                                           <p:stCondLst>
                                             <p:cond delay="0"/>
                                           </p:stCondLst>
@@ -15614,28 +16361,10 @@
                                   </p:childTnLst>
                                 </p:cTn>
                               </p:par>
-                            </p:childTnLst>
-                          </p:cTn>
-                        </p:par>
-                      </p:childTnLst>
-                    </p:cTn>
-                  </p:par>
-                  <p:par>
-                    <p:cTn id="38" fill="hold">
-                      <p:stCondLst>
-                        <p:cond delay="indefinite"/>
-                      </p:stCondLst>
-                      <p:childTnLst>
-                        <p:par>
-                          <p:cTn id="39" fill="hold">
-                            <p:stCondLst>
-                              <p:cond delay="0"/>
-                            </p:stCondLst>
-                            <p:childTnLst>
                               <p:par>
-                                <p:cTn id="40" presetID="1" presetClass="entr" presetSubtype="0" fill="hold" nodeType="clickEffect">
+                                <p:cTn id="28" presetID="1" presetClass="entr" presetSubtype="0" fill="hold" nodeType="withEffect">
                                   <p:stCondLst>
-                                    <p:cond delay="0"/>
+                                    <p:cond delay="17500"/>
                                   </p:stCondLst>
                                   <p:iterate type="lt">
                                     <p:tmAbs val="300"/>
@@ -15643,9 +16372,9 @@
                                   <p:childTnLst>
                                     <p:set>
                                       <p:cBhvr>
-                                        <p:cTn id="41" dur="1" fill="hold">
+                                        <p:cTn id="29" dur="1" fill="hold">
                                           <p:stCondLst>
-                                            <p:cond delay="0"/>
+                                            <p:cond delay="499"/>
                                           </p:stCondLst>
                                         </p:cTn>
                                         <p:tgtEl>
@@ -15691,7 +16420,7 @@
             </p:seq>
             <p:video>
               <p:cMediaNode vol="80000">
-                <p:cTn id="42" fill="hold" display="0">
+                <p:cTn id="30" fill="hold" display="0">
                   <p:stCondLst>
                     <p:cond delay="indefinite"/>
                   </p:stCondLst>
@@ -15701,64 +16430,6 @@
                 </p:tgtEl>
               </p:cMediaNode>
             </p:video>
-            <p:seq concurrent="1" nextAc="seek">
-              <p:cTn id="43" restart="whenNotActive" fill="hold" evtFilter="cancelBubble" nodeType="interactiveSeq">
-                <p:stCondLst>
-                  <p:cond evt="onClick" delay="0">
-                    <p:tgtEl>
-                      <p:spTgt spid="7"/>
-                    </p:tgtEl>
-                  </p:cond>
-                </p:stCondLst>
-                <p:endSync evt="end" delay="0">
-                  <p:rtn val="all"/>
-                </p:endSync>
-                <p:childTnLst>
-                  <p:par>
-                    <p:cTn id="44" fill="hold">
-                      <p:stCondLst>
-                        <p:cond delay="0"/>
-                      </p:stCondLst>
-                      <p:childTnLst>
-                        <p:par>
-                          <p:cTn id="45" fill="hold">
-                            <p:stCondLst>
-                              <p:cond delay="0"/>
-                            </p:stCondLst>
-                            <p:childTnLst>
-                              <p:par>
-                                <p:cTn id="46" presetID="2" presetClass="mediacall" presetSubtype="0" fill="hold" nodeType="clickEffect">
-                                  <p:stCondLst>
-                                    <p:cond delay="0"/>
-                                  </p:stCondLst>
-                                  <p:childTnLst>
-                                    <p:cmd type="call" cmd="togglePause">
-                                      <p:cBhvr>
-                                        <p:cTn id="47" dur="1" fill="hold"/>
-                                        <p:tgtEl>
-                                          <p:spTgt spid="7"/>
-                                        </p:tgtEl>
-                                      </p:cBhvr>
-                                    </p:cmd>
-                                  </p:childTnLst>
-                                </p:cTn>
-                              </p:par>
-                            </p:childTnLst>
-                          </p:cTn>
-                        </p:par>
-                      </p:childTnLst>
-                    </p:cTn>
-                  </p:par>
-                </p:childTnLst>
-              </p:cTn>
-              <p:nextCondLst>
-                <p:cond evt="onClick" delay="0">
-                  <p:tgtEl>
-                    <p:spTgt spid="7"/>
-                  </p:tgtEl>
-                </p:cond>
-              </p:nextCondLst>
-            </p:seq>
           </p:childTnLst>
         </p:cTn>
       </p:par>
@@ -17217,7 +17888,11 @@
               <a:t>Solution Explorer </a:t>
             </a:r>
             <a:r>
-              <a:rPr lang="en-US" sz="3600" b="1" dirty="0"/>
+              <a:rPr lang="en-US" sz="3600" b="1" dirty="0">
+                <a:solidFill>
+                  <a:schemeClr val="accent4"/>
+                </a:solidFill>
+              </a:rPr>
               <a:t>&gt;</a:t>
             </a:r>
             <a:r>
@@ -17225,7 +17900,11 @@
               <a:t> right-click project </a:t>
             </a:r>
             <a:r>
-              <a:rPr lang="en-US" sz="3600" b="1" dirty="0"/>
+              <a:rPr lang="en-US" sz="3600" b="1" dirty="0">
+                <a:solidFill>
+                  <a:schemeClr val="accent4"/>
+                </a:solidFill>
+              </a:rPr>
               <a:t>&gt;</a:t>
             </a:r>
             <a:r>

</xml_diff>

<commit_message>
Add Secret Manager demo slide
</commit_message>
<xml_diff>
--- a/Protecting App Secrets.pptx
+++ b/Protecting App Secrets.pptx
@@ -6,7 +6,7 @@
     <p:sldMasterId id="2147483660" r:id="rId2"/>
   </p:sldMasterIdLst>
   <p:notesMasterIdLst>
-    <p:notesMasterId r:id="rId22"/>
+    <p:notesMasterId r:id="rId23"/>
   </p:notesMasterIdLst>
   <p:sldIdLst>
     <p:sldId id="256" r:id="rId3"/>
@@ -19,15 +19,16 @@
     <p:sldId id="337" r:id="rId10"/>
     <p:sldId id="332" r:id="rId11"/>
     <p:sldId id="333" r:id="rId12"/>
-    <p:sldId id="338" r:id="rId13"/>
-    <p:sldId id="335" r:id="rId14"/>
-    <p:sldId id="336" r:id="rId15"/>
-    <p:sldId id="339" r:id="rId16"/>
-    <p:sldId id="340" r:id="rId17"/>
-    <p:sldId id="341" r:id="rId18"/>
-    <p:sldId id="331" r:id="rId19"/>
-    <p:sldId id="334" r:id="rId20"/>
-    <p:sldId id="326" r:id="rId21"/>
+    <p:sldId id="343" r:id="rId13"/>
+    <p:sldId id="338" r:id="rId14"/>
+    <p:sldId id="335" r:id="rId15"/>
+    <p:sldId id="336" r:id="rId16"/>
+    <p:sldId id="339" r:id="rId17"/>
+    <p:sldId id="340" r:id="rId18"/>
+    <p:sldId id="341" r:id="rId19"/>
+    <p:sldId id="331" r:id="rId20"/>
+    <p:sldId id="334" r:id="rId21"/>
+    <p:sldId id="326" r:id="rId22"/>
   </p:sldIdLst>
   <p:sldSz cx="12192000" cy="6858000"/>
   <p:notesSz cx="6858000" cy="9144000"/>
@@ -622,35 +623,7 @@
           <a:bodyPr/>
           <a:lstStyle/>
           <a:p>
-            <a:r>
-              <a:rPr lang="en-US" dirty="0"/>
-              <a:t>- Azure Cloud Shell </a:t>
-            </a:r>
-            <a:r>
-              <a:rPr lang="en-US" dirty="0">
-                <a:sym typeface="Wingdings" panose="05000000000000000000" pitchFamily="2" charset="2"/>
-              </a:rPr>
-              <a:t> the best CLI is the one you don’t have </a:t>
-            </a:r>
-            <a:r>
-              <a:rPr lang="en-US">
-                <a:sym typeface="Wingdings" panose="05000000000000000000" pitchFamily="2" charset="2"/>
-              </a:rPr>
-              <a:t>to install</a:t>
-            </a:r>
-            <a:endParaRPr lang="en-US"/>
-          </a:p>
-          <a:p>
-            <a:r>
-              <a:rPr lang="en-US" dirty="0"/>
-              <a:t>- VS 15.7 introduces Connected Services node Key Vault creation</a:t>
-            </a:r>
-          </a:p>
-          <a:p>
-            <a:r>
-              <a:rPr lang="en-US" dirty="0"/>
-              <a:t>- Key Vault takes precedence over Secret Manager at runtime, since it’s more secure</a:t>
-            </a:r>
+            <a:endParaRPr lang="en-US" dirty="0"/>
           </a:p>
         </p:txBody>
       </p:sp>
@@ -740,7 +713,7 @@
     </p:spTree>
     <p:extLst>
       <p:ext uri="{BB962C8B-B14F-4D97-AF65-F5344CB8AC3E}">
-        <p14:creationId xmlns:p14="http://schemas.microsoft.com/office/powerpoint/2010/main" val="3438339408"/>
+        <p14:creationId xmlns:p14="http://schemas.microsoft.com/office/powerpoint/2010/main" val="2295546409"/>
       </p:ext>
     </p:extLst>
   </p:cSld>
@@ -794,7 +767,35 @@
           <a:bodyPr/>
           <a:lstStyle/>
           <a:p>
+            <a:r>
+              <a:rPr lang="en-US" dirty="0"/>
+              <a:t>- Azure Cloud Shell </a:t>
+            </a:r>
+            <a:r>
+              <a:rPr lang="en-US" dirty="0">
+                <a:sym typeface="Wingdings" panose="05000000000000000000" pitchFamily="2" charset="2"/>
+              </a:rPr>
+              <a:t> the best CLI is the one you don’t have </a:t>
+            </a:r>
+            <a:r>
+              <a:rPr lang="en-US">
+                <a:sym typeface="Wingdings" panose="05000000000000000000" pitchFamily="2" charset="2"/>
+              </a:rPr>
+              <a:t>to install</a:t>
+            </a:r>
             <a:endParaRPr lang="en-US"/>
+          </a:p>
+          <a:p>
+            <a:r>
+              <a:rPr lang="en-US" dirty="0"/>
+              <a:t>- VS 15.7 introduces Connected Services node Key Vault creation</a:t>
+            </a:r>
+          </a:p>
+          <a:p>
+            <a:r>
+              <a:rPr lang="en-US" dirty="0"/>
+              <a:t>- Key Vault takes precedence over Secret Manager at runtime, since it’s more secure</a:t>
+            </a:r>
           </a:p>
         </p:txBody>
       </p:sp>
@@ -884,7 +885,7 @@
     </p:spTree>
     <p:extLst>
       <p:ext uri="{BB962C8B-B14F-4D97-AF65-F5344CB8AC3E}">
-        <p14:creationId xmlns:p14="http://schemas.microsoft.com/office/powerpoint/2010/main" val="2284713912"/>
+        <p14:creationId xmlns:p14="http://schemas.microsoft.com/office/powerpoint/2010/main" val="3438339408"/>
       </p:ext>
     </p:extLst>
   </p:cSld>
@@ -938,11 +939,7 @@
           <a:bodyPr/>
           <a:lstStyle/>
           <a:p>
-            <a:pPr marL="0" indent="0">
-              <a:buFontTx/>
-              <a:buNone/>
-            </a:pPr>
-            <a:endParaRPr lang="en-US" dirty="0"/>
+            <a:endParaRPr lang="en-US"/>
           </a:p>
         </p:txBody>
       </p:sp>
@@ -1032,7 +1029,7 @@
     </p:spTree>
     <p:extLst>
       <p:ext uri="{BB962C8B-B14F-4D97-AF65-F5344CB8AC3E}">
-        <p14:creationId xmlns:p14="http://schemas.microsoft.com/office/powerpoint/2010/main" val="662898044"/>
+        <p14:creationId xmlns:p14="http://schemas.microsoft.com/office/powerpoint/2010/main" val="2284713912"/>
       </p:ext>
     </p:extLst>
   </p:cSld>
@@ -1086,24 +1083,11 @@
           <a:bodyPr/>
           <a:lstStyle/>
           <a:p>
-            <a:pPr marL="171450" indent="-171450">
+            <a:pPr marL="0" indent="0">
               <a:buFontTx/>
-              <a:buChar char="-"/>
+              <a:buNone/>
             </a:pPr>
-            <a:r>
-              <a:rPr lang="en-US" dirty="0"/>
-              <a:t>Download secrets from key vault with build task</a:t>
-            </a:r>
-          </a:p>
-          <a:p>
-            <a:pPr marL="628650" lvl="1" indent="-171450">
-              <a:buFontTx/>
-              <a:buChar char="-"/>
-            </a:pPr>
-            <a:r>
-              <a:rPr lang="en-US" dirty="0"/>
-              <a:t>Can use secrets as task variables in other build tasks</a:t>
-            </a:r>
+            <a:endParaRPr lang="en-US" dirty="0"/>
           </a:p>
         </p:txBody>
       </p:sp>
@@ -1193,7 +1177,7 @@
     </p:spTree>
     <p:extLst>
       <p:ext uri="{BB962C8B-B14F-4D97-AF65-F5344CB8AC3E}">
-        <p14:creationId xmlns:p14="http://schemas.microsoft.com/office/powerpoint/2010/main" val="585389256"/>
+        <p14:creationId xmlns:p14="http://schemas.microsoft.com/office/powerpoint/2010/main" val="662898044"/>
       </p:ext>
     </p:extLst>
   </p:cSld>
@@ -1247,7 +1231,24 @@
           <a:bodyPr/>
           <a:lstStyle/>
           <a:p>
-            <a:endParaRPr lang="en-US"/>
+            <a:pPr marL="171450" indent="-171450">
+              <a:buFontTx/>
+              <a:buChar char="-"/>
+            </a:pPr>
+            <a:r>
+              <a:rPr lang="en-US" dirty="0"/>
+              <a:t>Download secrets from key vault with build task</a:t>
+            </a:r>
+          </a:p>
+          <a:p>
+            <a:pPr marL="628650" lvl="1" indent="-171450">
+              <a:buFontTx/>
+              <a:buChar char="-"/>
+            </a:pPr>
+            <a:r>
+              <a:rPr lang="en-US" dirty="0"/>
+              <a:t>Can use secrets as task variables in other build tasks</a:t>
+            </a:r>
           </a:p>
         </p:txBody>
       </p:sp>
@@ -1337,7 +1338,7 @@
     </p:spTree>
     <p:extLst>
       <p:ext uri="{BB962C8B-B14F-4D97-AF65-F5344CB8AC3E}">
-        <p14:creationId xmlns:p14="http://schemas.microsoft.com/office/powerpoint/2010/main" val="2089021986"/>
+        <p14:creationId xmlns:p14="http://schemas.microsoft.com/office/powerpoint/2010/main" val="585389256"/>
       </p:ext>
     </p:extLst>
   </p:cSld>
@@ -1481,7 +1482,7 @@
     </p:spTree>
     <p:extLst>
       <p:ext uri="{BB962C8B-B14F-4D97-AF65-F5344CB8AC3E}">
-        <p14:creationId xmlns:p14="http://schemas.microsoft.com/office/powerpoint/2010/main" val="2286787676"/>
+        <p14:creationId xmlns:p14="http://schemas.microsoft.com/office/powerpoint/2010/main" val="2089021986"/>
       </p:ext>
     </p:extLst>
   </p:cSld>
@@ -1535,7 +1536,7 @@
           <a:bodyPr/>
           <a:lstStyle/>
           <a:p>
-            <a:endParaRPr lang="en-US" dirty="0"/>
+            <a:endParaRPr lang="en-US"/>
           </a:p>
         </p:txBody>
       </p:sp>
@@ -1625,7 +1626,7 @@
     </p:spTree>
     <p:extLst>
       <p:ext uri="{BB962C8B-B14F-4D97-AF65-F5344CB8AC3E}">
-        <p14:creationId xmlns:p14="http://schemas.microsoft.com/office/powerpoint/2010/main" val="2232734480"/>
+        <p14:creationId xmlns:p14="http://schemas.microsoft.com/office/powerpoint/2010/main" val="2286787676"/>
       </p:ext>
     </p:extLst>
   </p:cSld>
@@ -1769,7 +1770,7 @@
     </p:spTree>
     <p:extLst>
       <p:ext uri="{BB962C8B-B14F-4D97-AF65-F5344CB8AC3E}">
-        <p14:creationId xmlns:p14="http://schemas.microsoft.com/office/powerpoint/2010/main" val="1203295569"/>
+        <p14:creationId xmlns:p14="http://schemas.microsoft.com/office/powerpoint/2010/main" val="2232734480"/>
       </p:ext>
     </p:extLst>
   </p:cSld>
@@ -1823,7 +1824,7 @@
           <a:bodyPr/>
           <a:lstStyle/>
           <a:p>
-            <a:endParaRPr lang="en-US"/>
+            <a:endParaRPr lang="en-US" dirty="0"/>
           </a:p>
         </p:txBody>
       </p:sp>
@@ -1892,6 +1893,150 @@
                 <a:defRPr/>
               </a:pPr>
               <a:t>19</a:t>
+            </a:fld>
+            <a:endParaRPr kumimoji="0" lang="en-US" sz="1200" b="0" i="0" u="none" strike="noStrike" kern="1200" cap="none" spc="0" normalizeH="0" baseline="0" noProof="0">
+              <a:ln>
+                <a:noFill/>
+              </a:ln>
+              <a:solidFill>
+                <a:prstClr val="black"/>
+              </a:solidFill>
+              <a:effectLst/>
+              <a:uLnTx/>
+              <a:uFillTx/>
+              <a:latin typeface="Calibri" panose="020F0502020204030204"/>
+              <a:ea typeface="+mn-ea"/>
+              <a:cs typeface="+mn-cs"/>
+            </a:endParaRPr>
+          </a:p>
+        </p:txBody>
+      </p:sp>
+    </p:spTree>
+    <p:extLst>
+      <p:ext uri="{BB962C8B-B14F-4D97-AF65-F5344CB8AC3E}">
+        <p14:creationId xmlns:p14="http://schemas.microsoft.com/office/powerpoint/2010/main" val="1203295569"/>
+      </p:ext>
+    </p:extLst>
+  </p:cSld>
+  <p:clrMapOvr>
+    <a:masterClrMapping/>
+  </p:clrMapOvr>
+</p:notes>
+</file>
+
+<file path=ppt/notesSlides/notesSlide19.xml><?xml version="1.0" encoding="utf-8"?>
+<p:notes xmlns:a="http://schemas.openxmlformats.org/drawingml/2006/main" xmlns:r="http://schemas.openxmlformats.org/officeDocument/2006/relationships" xmlns:p="http://schemas.openxmlformats.org/presentationml/2006/main">
+  <p:cSld>
+    <p:spTree>
+      <p:nvGrpSpPr>
+        <p:cNvPr id="1" name=""/>
+        <p:cNvGrpSpPr/>
+        <p:nvPr/>
+      </p:nvGrpSpPr>
+      <p:grpSpPr>
+        <a:xfrm>
+          <a:off x="0" y="0"/>
+          <a:ext cx="0" cy="0"/>
+          <a:chOff x="0" y="0"/>
+          <a:chExt cx="0" cy="0"/>
+        </a:xfrm>
+      </p:grpSpPr>
+      <p:sp>
+        <p:nvSpPr>
+          <p:cNvPr id="2" name="Slide Image Placeholder 1"/>
+          <p:cNvSpPr>
+            <a:spLocks noGrp="1" noRot="1" noChangeAspect="1"/>
+          </p:cNvSpPr>
+          <p:nvPr>
+            <p:ph type="sldImg"/>
+          </p:nvPr>
+        </p:nvSpPr>
+        <p:spPr/>
+      </p:sp>
+      <p:sp>
+        <p:nvSpPr>
+          <p:cNvPr id="3" name="Notes Placeholder 2"/>
+          <p:cNvSpPr>
+            <a:spLocks noGrp="1"/>
+          </p:cNvSpPr>
+          <p:nvPr>
+            <p:ph type="body" idx="1"/>
+          </p:nvPr>
+        </p:nvSpPr>
+        <p:spPr/>
+        <p:txBody>
+          <a:bodyPr/>
+          <a:lstStyle/>
+          <a:p>
+            <a:endParaRPr lang="en-US"/>
+          </a:p>
+        </p:txBody>
+      </p:sp>
+      <p:sp>
+        <p:nvSpPr>
+          <p:cNvPr id="4" name="Slide Number Placeholder 3"/>
+          <p:cNvSpPr>
+            <a:spLocks noGrp="1"/>
+          </p:cNvSpPr>
+          <p:nvPr>
+            <p:ph type="sldNum" sz="quarter" idx="10"/>
+          </p:nvPr>
+        </p:nvSpPr>
+        <p:spPr/>
+        <p:txBody>
+          <a:bodyPr/>
+          <a:lstStyle/>
+          <a:p>
+            <a:pPr marL="0" marR="0" lvl="0" indent="0" algn="r" defTabSz="457200" rtl="0" eaLnBrk="1" fontAlgn="auto" latinLnBrk="0" hangingPunct="1">
+              <a:lnSpc>
+                <a:spcPct val="100000"/>
+              </a:lnSpc>
+              <a:spcBef>
+                <a:spcPts val="0"/>
+              </a:spcBef>
+              <a:spcAft>
+                <a:spcPts val="0"/>
+              </a:spcAft>
+              <a:buClrTx/>
+              <a:buSzTx/>
+              <a:buFontTx/>
+              <a:buNone/>
+              <a:tabLst/>
+              <a:defRPr/>
+            </a:pPr>
+            <a:fld id="{16A87904-88DE-4022-A424-ACD2E6FC1751}" type="slidenum">
+              <a:rPr kumimoji="0" lang="en-US" sz="1200" b="0" i="0" u="none" strike="noStrike" kern="1200" cap="none" spc="0" normalizeH="0" baseline="0" noProof="0" smtClean="0">
+                <a:ln>
+                  <a:noFill/>
+                </a:ln>
+                <a:solidFill>
+                  <a:prstClr val="black"/>
+                </a:solidFill>
+                <a:effectLst/>
+                <a:uLnTx/>
+                <a:uFillTx/>
+                <a:latin typeface="Calibri" panose="020F0502020204030204"/>
+                <a:ea typeface="+mn-ea"/>
+                <a:cs typeface="+mn-cs"/>
+              </a:rPr>
+              <a:pPr marL="0" marR="0" lvl="0" indent="0" algn="r" defTabSz="457200" rtl="0" eaLnBrk="1" fontAlgn="auto" latinLnBrk="0" hangingPunct="1">
+                <a:lnSpc>
+                  <a:spcPct val="100000"/>
+                </a:lnSpc>
+                <a:spcBef>
+                  <a:spcPts val="0"/>
+                </a:spcBef>
+                <a:spcAft>
+                  <a:spcPts val="0"/>
+                </a:spcAft>
+                <a:buClrTx/>
+                <a:buSzTx/>
+                <a:buFontTx/>
+                <a:buNone/>
+                <a:tabLst/>
+                <a:defRPr/>
+              </a:pPr>
+              <a:t>20</a:t>
             </a:fld>
             <a:endParaRPr kumimoji="0" lang="en-US" sz="1200" b="0" i="0" u="none" strike="noStrike" kern="1200" cap="none" spc="0" normalizeH="0" baseline="0" noProof="0">
               <a:ln>
@@ -11114,6 +11259,140 @@
 </file>
 
 <file path=ppt/slides/slide11.xml><?xml version="1.0" encoding="utf-8"?>
+<p:sld xmlns:a="http://schemas.openxmlformats.org/drawingml/2006/main" xmlns:r="http://schemas.openxmlformats.org/officeDocument/2006/relationships" xmlns:p="http://schemas.openxmlformats.org/presentationml/2006/main">
+  <p:cSld>
+    <p:bg>
+      <p:bgPr>
+        <a:solidFill>
+          <a:srgbClr val="505050"/>
+        </a:solidFill>
+        <a:effectLst/>
+      </p:bgPr>
+    </p:bg>
+    <p:spTree>
+      <p:nvGrpSpPr>
+        <p:cNvPr id="1" name=""/>
+        <p:cNvGrpSpPr/>
+        <p:nvPr/>
+      </p:nvGrpSpPr>
+      <p:grpSpPr>
+        <a:xfrm>
+          <a:off x="0" y="0"/>
+          <a:ext cx="0" cy="0"/>
+          <a:chOff x="0" y="0"/>
+          <a:chExt cx="0" cy="0"/>
+        </a:xfrm>
+      </p:grpSpPr>
+      <p:sp>
+        <p:nvSpPr>
+          <p:cNvPr id="2" name="Title 1"/>
+          <p:cNvSpPr>
+            <a:spLocks noGrp="1"/>
+          </p:cNvSpPr>
+          <p:nvPr>
+            <p:ph type="title"/>
+          </p:nvPr>
+        </p:nvSpPr>
+        <p:spPr>
+          <a:xfrm>
+            <a:off x="831850" y="1709738"/>
+            <a:ext cx="10515600" cy="2852737"/>
+          </a:xfrm>
+        </p:spPr>
+        <p:txBody>
+          <a:bodyPr/>
+          <a:lstStyle/>
+          <a:p>
+            <a:r>
+              <a:rPr lang="en-US" dirty="0"/>
+              <a:t>Demo</a:t>
+            </a:r>
+          </a:p>
+        </p:txBody>
+      </p:sp>
+      <p:sp>
+        <p:nvSpPr>
+          <p:cNvPr id="4" name="Text Placeholder 3">
+            <a:extLst>
+              <a:ext uri="{FF2B5EF4-FFF2-40B4-BE49-F238E27FC236}">
+                <a16:creationId xmlns:a16="http://schemas.microsoft.com/office/drawing/2014/main" id="{3BCC483B-E1AE-440E-BC8D-2AA2A6FD23E2}"/>
+              </a:ext>
+            </a:extLst>
+          </p:cNvPr>
+          <p:cNvSpPr>
+            <a:spLocks noGrp="1"/>
+          </p:cNvSpPr>
+          <p:nvPr>
+            <p:ph type="body" idx="1"/>
+          </p:nvPr>
+        </p:nvSpPr>
+        <p:spPr>
+          <a:xfrm>
+            <a:off x="831850" y="4589463"/>
+            <a:ext cx="10515600" cy="1500187"/>
+          </a:xfrm>
+        </p:spPr>
+        <p:txBody>
+          <a:bodyPr/>
+          <a:lstStyle/>
+          <a:p>
+            <a:r>
+              <a:rPr lang="en-US" dirty="0"/>
+              <a:t>Secret Manager</a:t>
+            </a:r>
+          </a:p>
+        </p:txBody>
+      </p:sp>
+      <p:pic>
+        <p:nvPicPr>
+          <p:cNvPr id="6" name="Picture 5" descr="A close up of a sign&#10;&#10;Description generated with very high confidence">
+            <a:extLst>
+              <a:ext uri="{FF2B5EF4-FFF2-40B4-BE49-F238E27FC236}">
+                <a16:creationId xmlns:a16="http://schemas.microsoft.com/office/drawing/2014/main" id="{02AC1B6C-66AF-40EE-9B7A-82FA201F2FB9}"/>
+              </a:ext>
+            </a:extLst>
+          </p:cNvPr>
+          <p:cNvPicPr>
+            <a:picLocks noChangeAspect="1"/>
+          </p:cNvPicPr>
+          <p:nvPr/>
+        </p:nvPicPr>
+        <p:blipFill>
+          <a:blip r:embed="rId3">
+            <a:extLst>
+              <a:ext uri="{28A0092B-C50C-407E-A947-70E740481C1C}">
+                <a14:useLocalDpi xmlns:a14="http://schemas.microsoft.com/office/drawing/2010/main" val="0"/>
+              </a:ext>
+            </a:extLst>
+          </a:blip>
+          <a:stretch>
+            <a:fillRect/>
+          </a:stretch>
+        </p:blipFill>
+        <p:spPr>
+          <a:xfrm>
+            <a:off x="3072589" y="3632287"/>
+            <a:ext cx="1515975" cy="1515975"/>
+          </a:xfrm>
+          <a:prstGeom prst="rect">
+            <a:avLst/>
+          </a:prstGeom>
+        </p:spPr>
+      </p:pic>
+    </p:spTree>
+    <p:extLst>
+      <p:ext uri="{BB962C8B-B14F-4D97-AF65-F5344CB8AC3E}">
+        <p14:creationId xmlns:p14="http://schemas.microsoft.com/office/powerpoint/2010/main" val="1475834865"/>
+      </p:ext>
+    </p:extLst>
+  </p:cSld>
+  <p:clrMapOvr>
+    <a:masterClrMapping/>
+  </p:clrMapOvr>
+</p:sld>
+</file>
+
+<file path=ppt/slides/slide12.xml><?xml version="1.0" encoding="utf-8"?>
 <p:sld xmlns:a="http://schemas.openxmlformats.org/drawingml/2006/main" xmlns:r="http://schemas.openxmlformats.org/officeDocument/2006/relationships" xmlns:p="http://schemas.openxmlformats.org/presentationml/2006/main">
   <p:cSld>
     <p:bg>
@@ -12378,7 +12657,7 @@
 </p:sld>
 </file>
 
-<file path=ppt/slides/slide12.xml><?xml version="1.0" encoding="utf-8"?>
+<file path=ppt/slides/slide13.xml><?xml version="1.0" encoding="utf-8"?>
 <p:sld xmlns:a="http://schemas.openxmlformats.org/drawingml/2006/main" xmlns:r="http://schemas.openxmlformats.org/officeDocument/2006/relationships" xmlns:p="http://schemas.openxmlformats.org/presentationml/2006/main">
   <p:cSld>
     <p:bg>
@@ -13200,7 +13479,7 @@
 </p:sld>
 </file>
 
-<file path=ppt/slides/slide13.xml><?xml version="1.0" encoding="utf-8"?>
+<file path=ppt/slides/slide14.xml><?xml version="1.0" encoding="utf-8"?>
 <p:sld xmlns:a="http://schemas.openxmlformats.org/drawingml/2006/main" xmlns:r="http://schemas.openxmlformats.org/officeDocument/2006/relationships" xmlns:p="http://schemas.openxmlformats.org/presentationml/2006/main">
   <p:cSld>
     <p:bg>
@@ -14020,7 +14299,7 @@
 </p:sld>
 </file>
 
-<file path=ppt/slides/slide14.xml><?xml version="1.0" encoding="utf-8"?>
+<file path=ppt/slides/slide15.xml><?xml version="1.0" encoding="utf-8"?>
 <p:sld xmlns:a="http://schemas.openxmlformats.org/drawingml/2006/main" xmlns:r="http://schemas.openxmlformats.org/officeDocument/2006/relationships" xmlns:p="http://schemas.openxmlformats.org/presentationml/2006/main">
   <p:cSld>
     <p:bg>
@@ -14384,7 +14663,7 @@
 </p:sld>
 </file>
 
-<file path=ppt/slides/slide15.xml><?xml version="1.0" encoding="utf-8"?>
+<file path=ppt/slides/slide16.xml><?xml version="1.0" encoding="utf-8"?>
 <p:sld xmlns:a="http://schemas.openxmlformats.org/drawingml/2006/main" xmlns:r="http://schemas.openxmlformats.org/officeDocument/2006/relationships" xmlns:p="http://schemas.openxmlformats.org/presentationml/2006/main">
   <p:cSld>
     <p:bg>
@@ -14476,7 +14755,7 @@
 </p:sld>
 </file>
 
-<file path=ppt/slides/slide16.xml><?xml version="1.0" encoding="utf-8"?>
+<file path=ppt/slides/slide17.xml><?xml version="1.0" encoding="utf-8"?>
 <p:sld xmlns:a="http://schemas.openxmlformats.org/drawingml/2006/main" xmlns:r="http://schemas.openxmlformats.org/officeDocument/2006/relationships" xmlns:p="http://schemas.openxmlformats.org/presentationml/2006/main">
   <p:cSld>
     <p:bg>
@@ -14905,7 +15184,7 @@
 </p:sld>
 </file>
 
-<file path=ppt/slides/slide17.xml><?xml version="1.0" encoding="utf-8"?>
+<file path=ppt/slides/slide18.xml><?xml version="1.0" encoding="utf-8"?>
 <p:sld xmlns:a="http://schemas.openxmlformats.org/drawingml/2006/main" xmlns:r="http://schemas.openxmlformats.org/officeDocument/2006/relationships" xmlns:p="http://schemas.openxmlformats.org/presentationml/2006/main">
   <p:cSld>
     <p:bg>
@@ -15428,7 +15707,7 @@
 </p:sld>
 </file>
 
-<file path=ppt/slides/slide18.xml><?xml version="1.0" encoding="utf-8"?>
+<file path=ppt/slides/slide19.xml><?xml version="1.0" encoding="utf-8"?>
 <p:sld xmlns:a="http://schemas.openxmlformats.org/drawingml/2006/main" xmlns:r="http://schemas.openxmlformats.org/officeDocument/2006/relationships" xmlns:p="http://schemas.openxmlformats.org/presentationml/2006/main">
   <p:cSld>
     <p:bg>
@@ -15601,272 +15880,6 @@
     <p:extLst>
       <p:ext uri="{BB962C8B-B14F-4D97-AF65-F5344CB8AC3E}">
         <p14:creationId xmlns:p14="http://schemas.microsoft.com/office/powerpoint/2010/main" val="2460411575"/>
-      </p:ext>
-    </p:extLst>
-  </p:cSld>
-  <p:clrMapOvr>
-    <a:masterClrMapping/>
-  </p:clrMapOvr>
-</p:sld>
-</file>
-
-<file path=ppt/slides/slide19.xml><?xml version="1.0" encoding="utf-8"?>
-<p:sld xmlns:a="http://schemas.openxmlformats.org/drawingml/2006/main" xmlns:r="http://schemas.openxmlformats.org/officeDocument/2006/relationships" xmlns:p="http://schemas.openxmlformats.org/presentationml/2006/main">
-  <p:cSld>
-    <p:bg>
-      <p:bgPr>
-        <a:solidFill>
-          <a:srgbClr val="505050"/>
-        </a:solidFill>
-        <a:effectLst/>
-      </p:bgPr>
-    </p:bg>
-    <p:spTree>
-      <p:nvGrpSpPr>
-        <p:cNvPr id="1" name=""/>
-        <p:cNvGrpSpPr/>
-        <p:nvPr/>
-      </p:nvGrpSpPr>
-      <p:grpSpPr>
-        <a:xfrm>
-          <a:off x="0" y="0"/>
-          <a:ext cx="0" cy="0"/>
-          <a:chOff x="0" y="0"/>
-          <a:chExt cx="0" cy="0"/>
-        </a:xfrm>
-      </p:grpSpPr>
-      <p:sp>
-        <p:nvSpPr>
-          <p:cNvPr id="2" name="Title 1"/>
-          <p:cNvSpPr>
-            <a:spLocks noGrp="1"/>
-          </p:cNvSpPr>
-          <p:nvPr>
-            <p:ph type="title"/>
-          </p:nvPr>
-        </p:nvSpPr>
-        <p:spPr/>
-        <p:txBody>
-          <a:bodyPr/>
-          <a:lstStyle/>
-          <a:p>
-            <a:r>
-              <a:rPr lang="en-US" dirty="0"/>
-              <a:t>Resources</a:t>
-            </a:r>
-          </a:p>
-        </p:txBody>
-      </p:sp>
-      <p:pic>
-        <p:nvPicPr>
-          <p:cNvPr id="4" name="Picture 3">
-            <a:extLst>
-              <a:ext uri="{FF2B5EF4-FFF2-40B4-BE49-F238E27FC236}">
-                <a16:creationId xmlns:a16="http://schemas.microsoft.com/office/drawing/2014/main" id="{C303AB34-3270-4436-AF86-1E8F97294EB6}"/>
-              </a:ext>
-            </a:extLst>
-          </p:cNvPr>
-          <p:cNvPicPr>
-            <a:picLocks noChangeAspect="1"/>
-          </p:cNvPicPr>
-          <p:nvPr/>
-        </p:nvPicPr>
-        <p:blipFill>
-          <a:blip r:embed="rId3">
-            <a:clrChange>
-              <a:clrFrom>
-                <a:srgbClr val="002050"/>
-              </a:clrFrom>
-              <a:clrTo>
-                <a:srgbClr val="002050">
-                  <a:alpha val="0"/>
-                </a:srgbClr>
-              </a:clrTo>
-            </a:clrChange>
-          </a:blip>
-          <a:stretch>
-            <a:fillRect/>
-          </a:stretch>
-        </p:blipFill>
-        <p:spPr>
-          <a:xfrm>
-            <a:off x="8325292" y="2991292"/>
-            <a:ext cx="3866707" cy="3866707"/>
-          </a:xfrm>
-          <a:prstGeom prst="rect">
-            <a:avLst/>
-          </a:prstGeom>
-        </p:spPr>
-      </p:pic>
-      <p:sp>
-        <p:nvSpPr>
-          <p:cNvPr id="3" name="Content Placeholder 2"/>
-          <p:cNvSpPr>
-            <a:spLocks noGrp="1"/>
-          </p:cNvSpPr>
-          <p:nvPr>
-            <p:ph idx="1"/>
-          </p:nvPr>
-        </p:nvSpPr>
-        <p:spPr>
-          <a:xfrm>
-            <a:off x="838199" y="1825625"/>
-            <a:ext cx="10411047" cy="4351338"/>
-          </a:xfrm>
-        </p:spPr>
-        <p:txBody>
-          <a:bodyPr>
-            <a:normAutofit fontScale="92500"/>
-          </a:bodyPr>
-          <a:lstStyle/>
-          <a:p>
-            <a:pPr marL="0" indent="0">
-              <a:buNone/>
-            </a:pPr>
-            <a:r>
-              <a:rPr lang="en-US" b="1" dirty="0"/>
-              <a:t>Docs 									</a:t>
-            </a:r>
-            <a:r>
-              <a:rPr lang="en-US" dirty="0"/>
-              <a:t>@</a:t>
-            </a:r>
-            <a:r>
-              <a:rPr lang="en-US" dirty="0" err="1"/>
-              <a:t>Scott_Addie</a:t>
-            </a:r>
-            <a:endParaRPr lang="en-US" dirty="0">
-              <a:hlinkClick r:id="rId4"/>
-            </a:endParaRPr>
-          </a:p>
-          <a:p>
-            <a:pPr marL="0" indent="0">
-              <a:buNone/>
-            </a:pPr>
-            <a:r>
-              <a:rPr lang="en-US" dirty="0">
-                <a:hlinkClick r:id="rId4"/>
-              </a:rPr>
-              <a:t>aka.ms/dotnet-secret-mgr</a:t>
-            </a:r>
-          </a:p>
-          <a:p>
-            <a:pPr marL="0" indent="0">
-              <a:buNone/>
-            </a:pPr>
-            <a:r>
-              <a:rPr lang="en-US" dirty="0">
-                <a:hlinkClick r:id="rId5"/>
-              </a:rPr>
-              <a:t>aka.ms/</a:t>
-            </a:r>
-            <a:r>
-              <a:rPr lang="en-US" dirty="0" err="1">
-                <a:hlinkClick r:id="rId5"/>
-              </a:rPr>
-              <a:t>az</a:t>
-            </a:r>
-            <a:r>
-              <a:rPr lang="en-US" dirty="0">
-                <a:hlinkClick r:id="rId5"/>
-              </a:rPr>
-              <a:t>-key-vault</a:t>
-            </a:r>
-            <a:endParaRPr lang="en-US" dirty="0"/>
-          </a:p>
-          <a:p>
-            <a:endParaRPr lang="en-US" dirty="0"/>
-          </a:p>
-          <a:p>
-            <a:pPr marL="0" indent="0">
-              <a:buNone/>
-            </a:pPr>
-            <a:r>
-              <a:rPr lang="en-US" b="1" dirty="0"/>
-              <a:t>Slides</a:t>
-            </a:r>
-          </a:p>
-          <a:p>
-            <a:pPr marL="0" indent="0">
-              <a:buNone/>
-            </a:pPr>
-            <a:r>
-              <a:rPr lang="en-US" dirty="0">
-                <a:hlinkClick r:id="rId6"/>
-              </a:rPr>
-              <a:t>aka.ms/app-secrets-slides</a:t>
-            </a:r>
-            <a:endParaRPr lang="en-US" dirty="0"/>
-          </a:p>
-          <a:p>
-            <a:pPr marL="0" indent="0">
-              <a:buNone/>
-            </a:pPr>
-            <a:endParaRPr lang="en-US" b="1" dirty="0"/>
-          </a:p>
-          <a:p>
-            <a:pPr marL="0" indent="0">
-              <a:buNone/>
-            </a:pPr>
-            <a:r>
-              <a:rPr lang="en-US" b="1" dirty="0"/>
-              <a:t>Code</a:t>
-            </a:r>
-          </a:p>
-          <a:p>
-            <a:pPr marL="0" indent="0">
-              <a:buNone/>
-            </a:pPr>
-            <a:r>
-              <a:rPr lang="en-US" dirty="0">
-                <a:hlinkClick r:id="rId7"/>
-              </a:rPr>
-              <a:t>aka.ms/app-secrets-code</a:t>
-            </a:r>
-            <a:endParaRPr lang="en-US" dirty="0"/>
-          </a:p>
-        </p:txBody>
-      </p:sp>
-      <p:pic>
-        <p:nvPicPr>
-          <p:cNvPr id="5" name="Picture 4">
-            <a:extLst>
-              <a:ext uri="{FF2B5EF4-FFF2-40B4-BE49-F238E27FC236}">
-                <a16:creationId xmlns:a16="http://schemas.microsoft.com/office/drawing/2014/main" id="{A87E2C7C-B662-43BA-A5DB-0A1A5D5542DE}"/>
-              </a:ext>
-            </a:extLst>
-          </p:cNvPr>
-          <p:cNvPicPr>
-            <a:picLocks noChangeAspect="1"/>
-          </p:cNvPicPr>
-          <p:nvPr/>
-        </p:nvPicPr>
-        <p:blipFill>
-          <a:blip r:embed="rId8" cstate="print">
-            <a:extLst>
-              <a:ext uri="{28A0092B-C50C-407E-A947-70E740481C1C}">
-                <a14:useLocalDpi xmlns:a14="http://schemas.microsoft.com/office/drawing/2010/main" val="0"/>
-              </a:ext>
-            </a:extLst>
-          </a:blip>
-          <a:stretch>
-            <a:fillRect/>
-          </a:stretch>
-        </p:blipFill>
-        <p:spPr>
-          <a:xfrm>
-            <a:off x="8474876" y="1753612"/>
-            <a:ext cx="682893" cy="555188"/>
-          </a:xfrm>
-          <a:prstGeom prst="rect">
-            <a:avLst/>
-          </a:prstGeom>
-        </p:spPr>
-      </p:pic>
-    </p:spTree>
-    <p:extLst>
-      <p:ext uri="{BB962C8B-B14F-4D97-AF65-F5344CB8AC3E}">
-        <p14:creationId xmlns:p14="http://schemas.microsoft.com/office/powerpoint/2010/main" val="2369877498"/>
       </p:ext>
     </p:extLst>
   </p:cSld>
@@ -17551,6 +17564,272 @@
     <p:extLst>
       <p:ext uri="{BB962C8B-B14F-4D97-AF65-F5344CB8AC3E}">
         <p14:creationId xmlns:p14="http://schemas.microsoft.com/office/powerpoint/2010/main" val="2245526147"/>
+      </p:ext>
+    </p:extLst>
+  </p:cSld>
+  <p:clrMapOvr>
+    <a:masterClrMapping/>
+  </p:clrMapOvr>
+</p:sld>
+</file>
+
+<file path=ppt/slides/slide20.xml><?xml version="1.0" encoding="utf-8"?>
+<p:sld xmlns:a="http://schemas.openxmlformats.org/drawingml/2006/main" xmlns:r="http://schemas.openxmlformats.org/officeDocument/2006/relationships" xmlns:p="http://schemas.openxmlformats.org/presentationml/2006/main">
+  <p:cSld>
+    <p:bg>
+      <p:bgPr>
+        <a:solidFill>
+          <a:srgbClr val="505050"/>
+        </a:solidFill>
+        <a:effectLst/>
+      </p:bgPr>
+    </p:bg>
+    <p:spTree>
+      <p:nvGrpSpPr>
+        <p:cNvPr id="1" name=""/>
+        <p:cNvGrpSpPr/>
+        <p:nvPr/>
+      </p:nvGrpSpPr>
+      <p:grpSpPr>
+        <a:xfrm>
+          <a:off x="0" y="0"/>
+          <a:ext cx="0" cy="0"/>
+          <a:chOff x="0" y="0"/>
+          <a:chExt cx="0" cy="0"/>
+        </a:xfrm>
+      </p:grpSpPr>
+      <p:sp>
+        <p:nvSpPr>
+          <p:cNvPr id="2" name="Title 1"/>
+          <p:cNvSpPr>
+            <a:spLocks noGrp="1"/>
+          </p:cNvSpPr>
+          <p:nvPr>
+            <p:ph type="title"/>
+          </p:nvPr>
+        </p:nvSpPr>
+        <p:spPr/>
+        <p:txBody>
+          <a:bodyPr/>
+          <a:lstStyle/>
+          <a:p>
+            <a:r>
+              <a:rPr lang="en-US" dirty="0"/>
+              <a:t>Resources</a:t>
+            </a:r>
+          </a:p>
+        </p:txBody>
+      </p:sp>
+      <p:pic>
+        <p:nvPicPr>
+          <p:cNvPr id="4" name="Picture 3">
+            <a:extLst>
+              <a:ext uri="{FF2B5EF4-FFF2-40B4-BE49-F238E27FC236}">
+                <a16:creationId xmlns:a16="http://schemas.microsoft.com/office/drawing/2014/main" id="{C303AB34-3270-4436-AF86-1E8F97294EB6}"/>
+              </a:ext>
+            </a:extLst>
+          </p:cNvPr>
+          <p:cNvPicPr>
+            <a:picLocks noChangeAspect="1"/>
+          </p:cNvPicPr>
+          <p:nvPr/>
+        </p:nvPicPr>
+        <p:blipFill>
+          <a:blip r:embed="rId3">
+            <a:clrChange>
+              <a:clrFrom>
+                <a:srgbClr val="002050"/>
+              </a:clrFrom>
+              <a:clrTo>
+                <a:srgbClr val="002050">
+                  <a:alpha val="0"/>
+                </a:srgbClr>
+              </a:clrTo>
+            </a:clrChange>
+          </a:blip>
+          <a:stretch>
+            <a:fillRect/>
+          </a:stretch>
+        </p:blipFill>
+        <p:spPr>
+          <a:xfrm>
+            <a:off x="8325292" y="2991292"/>
+            <a:ext cx="3866707" cy="3866707"/>
+          </a:xfrm>
+          <a:prstGeom prst="rect">
+            <a:avLst/>
+          </a:prstGeom>
+        </p:spPr>
+      </p:pic>
+      <p:sp>
+        <p:nvSpPr>
+          <p:cNvPr id="3" name="Content Placeholder 2"/>
+          <p:cNvSpPr>
+            <a:spLocks noGrp="1"/>
+          </p:cNvSpPr>
+          <p:nvPr>
+            <p:ph idx="1"/>
+          </p:nvPr>
+        </p:nvSpPr>
+        <p:spPr>
+          <a:xfrm>
+            <a:off x="838199" y="1825625"/>
+            <a:ext cx="10411047" cy="4351338"/>
+          </a:xfrm>
+        </p:spPr>
+        <p:txBody>
+          <a:bodyPr>
+            <a:normAutofit fontScale="92500"/>
+          </a:bodyPr>
+          <a:lstStyle/>
+          <a:p>
+            <a:pPr marL="0" indent="0">
+              <a:buNone/>
+            </a:pPr>
+            <a:r>
+              <a:rPr lang="en-US" b="1" dirty="0"/>
+              <a:t>Docs 									</a:t>
+            </a:r>
+            <a:r>
+              <a:rPr lang="en-US" dirty="0"/>
+              <a:t>@</a:t>
+            </a:r>
+            <a:r>
+              <a:rPr lang="en-US" dirty="0" err="1"/>
+              <a:t>Scott_Addie</a:t>
+            </a:r>
+            <a:endParaRPr lang="en-US" dirty="0">
+              <a:hlinkClick r:id="rId4"/>
+            </a:endParaRPr>
+          </a:p>
+          <a:p>
+            <a:pPr marL="0" indent="0">
+              <a:buNone/>
+            </a:pPr>
+            <a:r>
+              <a:rPr lang="en-US" dirty="0">
+                <a:hlinkClick r:id="rId4"/>
+              </a:rPr>
+              <a:t>aka.ms/dotnet-secret-mgr</a:t>
+            </a:r>
+          </a:p>
+          <a:p>
+            <a:pPr marL="0" indent="0">
+              <a:buNone/>
+            </a:pPr>
+            <a:r>
+              <a:rPr lang="en-US" dirty="0">
+                <a:hlinkClick r:id="rId5"/>
+              </a:rPr>
+              <a:t>aka.ms/</a:t>
+            </a:r>
+            <a:r>
+              <a:rPr lang="en-US" dirty="0" err="1">
+                <a:hlinkClick r:id="rId5"/>
+              </a:rPr>
+              <a:t>az</a:t>
+            </a:r>
+            <a:r>
+              <a:rPr lang="en-US" dirty="0">
+                <a:hlinkClick r:id="rId5"/>
+              </a:rPr>
+              <a:t>-key-vault</a:t>
+            </a:r>
+            <a:endParaRPr lang="en-US" dirty="0"/>
+          </a:p>
+          <a:p>
+            <a:endParaRPr lang="en-US" dirty="0"/>
+          </a:p>
+          <a:p>
+            <a:pPr marL="0" indent="0">
+              <a:buNone/>
+            </a:pPr>
+            <a:r>
+              <a:rPr lang="en-US" b="1" dirty="0"/>
+              <a:t>Slides</a:t>
+            </a:r>
+          </a:p>
+          <a:p>
+            <a:pPr marL="0" indent="0">
+              <a:buNone/>
+            </a:pPr>
+            <a:r>
+              <a:rPr lang="en-US" dirty="0">
+                <a:hlinkClick r:id="rId6"/>
+              </a:rPr>
+              <a:t>aka.ms/app-secrets-slides</a:t>
+            </a:r>
+            <a:endParaRPr lang="en-US" dirty="0"/>
+          </a:p>
+          <a:p>
+            <a:pPr marL="0" indent="0">
+              <a:buNone/>
+            </a:pPr>
+            <a:endParaRPr lang="en-US" b="1" dirty="0"/>
+          </a:p>
+          <a:p>
+            <a:pPr marL="0" indent="0">
+              <a:buNone/>
+            </a:pPr>
+            <a:r>
+              <a:rPr lang="en-US" b="1" dirty="0"/>
+              <a:t>Code</a:t>
+            </a:r>
+          </a:p>
+          <a:p>
+            <a:pPr marL="0" indent="0">
+              <a:buNone/>
+            </a:pPr>
+            <a:r>
+              <a:rPr lang="en-US" dirty="0">
+                <a:hlinkClick r:id="rId7"/>
+              </a:rPr>
+              <a:t>aka.ms/app-secrets-code</a:t>
+            </a:r>
+            <a:endParaRPr lang="en-US" dirty="0"/>
+          </a:p>
+        </p:txBody>
+      </p:sp>
+      <p:pic>
+        <p:nvPicPr>
+          <p:cNvPr id="5" name="Picture 4">
+            <a:extLst>
+              <a:ext uri="{FF2B5EF4-FFF2-40B4-BE49-F238E27FC236}">
+                <a16:creationId xmlns:a16="http://schemas.microsoft.com/office/drawing/2014/main" id="{A87E2C7C-B662-43BA-A5DB-0A1A5D5542DE}"/>
+              </a:ext>
+            </a:extLst>
+          </p:cNvPr>
+          <p:cNvPicPr>
+            <a:picLocks noChangeAspect="1"/>
+          </p:cNvPicPr>
+          <p:nvPr/>
+        </p:nvPicPr>
+        <p:blipFill>
+          <a:blip r:embed="rId8" cstate="print">
+            <a:extLst>
+              <a:ext uri="{28A0092B-C50C-407E-A947-70E740481C1C}">
+                <a14:useLocalDpi xmlns:a14="http://schemas.microsoft.com/office/drawing/2010/main" val="0"/>
+              </a:ext>
+            </a:extLst>
+          </a:blip>
+          <a:stretch>
+            <a:fillRect/>
+          </a:stretch>
+        </p:blipFill>
+        <p:spPr>
+          <a:xfrm>
+            <a:off x="8474876" y="1753612"/>
+            <a:ext cx="682893" cy="555188"/>
+          </a:xfrm>
+          <a:prstGeom prst="rect">
+            <a:avLst/>
+          </a:prstGeom>
+        </p:spPr>
+      </p:pic>
+    </p:spTree>
+    <p:extLst>
+      <p:ext uri="{BB962C8B-B14F-4D97-AF65-F5344CB8AC3E}">
+        <p14:creationId xmlns:p14="http://schemas.microsoft.com/office/powerpoint/2010/main" val="2369877498"/>
       </p:ext>
     </p:extLst>
   </p:cSld>

</xml_diff>

<commit_message>
2.2 updates to slides
</commit_message>
<xml_diff>
--- a/Protecting App Secrets.pptx
+++ b/Protecting App Secrets.pptx
@@ -6,7 +6,7 @@
     <p:sldMasterId id="2147483660" r:id="rId2"/>
   </p:sldMasterIdLst>
   <p:notesMasterIdLst>
-    <p:notesMasterId r:id="rId22"/>
+    <p:notesMasterId r:id="rId23"/>
   </p:notesMasterIdLst>
   <p:sldIdLst>
     <p:sldId id="256" r:id="rId3"/>
@@ -25,9 +25,10 @@
     <p:sldId id="339" r:id="rId16"/>
     <p:sldId id="345" r:id="rId17"/>
     <p:sldId id="341" r:id="rId18"/>
-    <p:sldId id="331" r:id="rId19"/>
-    <p:sldId id="334" r:id="rId20"/>
-    <p:sldId id="326" r:id="rId21"/>
+    <p:sldId id="346" r:id="rId19"/>
+    <p:sldId id="331" r:id="rId20"/>
+    <p:sldId id="334" r:id="rId21"/>
+    <p:sldId id="326" r:id="rId22"/>
   </p:sldIdLst>
   <p:sldSz cx="12192000" cy="6858000"/>
   <p:notesSz cx="6858000" cy="9144000"/>
@@ -227,7 +228,7 @@
           <a:p>
             <a:fld id="{03886B9A-ACA2-4D2C-AAF6-D8003DE96699}" type="datetimeFigureOut">
               <a:rPr lang="en-US" smtClean="0"/>
-              <a:t>2/25/2019</a:t>
+              <a:t>3/1/2019</a:t>
             </a:fld>
             <a:endParaRPr lang="en-US"/>
           </a:p>
@@ -622,20 +623,24 @@
           <a:bodyPr/>
           <a:lstStyle/>
           <a:p>
-            <a:pPr marL="228600" indent="-228600">
-              <a:buAutoNum type="arabicPeriod"/>
+            <a:pPr marL="0" indent="0">
+              <a:buNone/>
             </a:pPr>
             <a:r>
               <a:rPr lang="en-US" dirty="0"/>
-              <a:t>Add to </a:t>
-            </a:r>
-            <a:r>
-              <a:rPr lang="en-US" dirty="0" err="1"/>
+              <a:t>1. </a:t>
+            </a:r>
+            <a:r>
+              <a:rPr lang="en-US" b="1" dirty="0" err="1"/>
               <a:t>secrets.json</a:t>
             </a:r>
             <a:r>
+              <a:rPr lang="en-US" b="1" dirty="0"/>
+              <a:t>:</a:t>
+            </a:r>
+            <a:r>
               <a:rPr lang="en-US" dirty="0"/>
-              <a:t>: “Event”: { “Name”: “Cream City Code” }</a:t>
+              <a:t> “Event”: { “Name”: “SFLCC” }</a:t>
             </a:r>
           </a:p>
           <a:p>
@@ -648,10 +653,10 @@
                 <a:ea typeface="+mn-ea"/>
                 <a:cs typeface="+mn-cs"/>
               </a:rPr>
-              <a:t>2. Add to </a:t>
-            </a:r>
-            <a:r>
-              <a:rPr lang="en-US" sz="1200" kern="1200" dirty="0" err="1">
+              <a:t>2. </a:t>
+            </a:r>
+            <a:r>
+              <a:rPr lang="en-US" sz="1200" b="1" kern="1200" dirty="0" err="1">
                 <a:solidFill>
                   <a:schemeClr val="tx1"/>
                 </a:solidFill>
@@ -662,7 +667,7 @@
               <a:t>Index.cshtml.cs</a:t>
             </a:r>
             <a:r>
-              <a:rPr lang="en-US" sz="1200" kern="1200" dirty="0">
+              <a:rPr lang="en-US" sz="1200" b="1" kern="1200" dirty="0">
                 <a:solidFill>
                   <a:schemeClr val="tx1"/>
                 </a:solidFill>
@@ -830,6 +835,51 @@
                 <a:ea typeface="+mn-ea"/>
                 <a:cs typeface="+mn-cs"/>
               </a:rPr>
+              <a:t>        public string </a:t>
+            </a:r>
+            <a:r>
+              <a:rPr lang="en-US" sz="1200" kern="1200" dirty="0" err="1">
+                <a:solidFill>
+                  <a:schemeClr val="tx1"/>
+                </a:solidFill>
+                <a:latin typeface="+mn-lt"/>
+                <a:ea typeface="+mn-ea"/>
+                <a:cs typeface="+mn-cs"/>
+              </a:rPr>
+              <a:t>EventName</a:t>
+            </a:r>
+            <a:r>
+              <a:rPr lang="en-US" sz="1200" kern="1200" dirty="0">
+                <a:solidFill>
+                  <a:schemeClr val="tx1"/>
+                </a:solidFill>
+                <a:latin typeface="+mn-lt"/>
+                <a:ea typeface="+mn-ea"/>
+                <a:cs typeface="+mn-cs"/>
+              </a:rPr>
+              <a:t> { get; set; }</a:t>
+            </a:r>
+          </a:p>
+          <a:p>
+            <a:endParaRPr lang="en-US" sz="1200" kern="1200" dirty="0">
+              <a:solidFill>
+                <a:schemeClr val="tx1"/>
+              </a:solidFill>
+              <a:latin typeface="+mn-lt"/>
+              <a:ea typeface="+mn-ea"/>
+              <a:cs typeface="+mn-cs"/>
+            </a:endParaRPr>
+          </a:p>
+          <a:p>
+            <a:r>
+              <a:rPr lang="en-US" sz="1200" kern="1200" dirty="0">
+                <a:solidFill>
+                  <a:schemeClr val="tx1"/>
+                </a:solidFill>
+                <a:latin typeface="+mn-lt"/>
+                <a:ea typeface="+mn-ea"/>
+                <a:cs typeface="+mn-cs"/>
+              </a:rPr>
               <a:t>        public void </a:t>
             </a:r>
             <a:r>
@@ -876,7 +926,7 @@
                 <a:ea typeface="+mn-ea"/>
                 <a:cs typeface="+mn-cs"/>
               </a:rPr>
-              <a:t>ViewData</a:t>
+              <a:t>EventName</a:t>
             </a:r>
             <a:r>
               <a:rPr lang="en-US" sz="1200" kern="1200" dirty="0">
@@ -887,29 +937,7 @@
                 <a:ea typeface="+mn-ea"/>
                 <a:cs typeface="+mn-cs"/>
               </a:rPr>
-              <a:t>["</a:t>
-            </a:r>
-            <a:r>
-              <a:rPr lang="en-US" sz="1200" kern="1200" dirty="0" err="1">
-                <a:solidFill>
-                  <a:schemeClr val="tx1"/>
-                </a:solidFill>
-                <a:latin typeface="+mn-lt"/>
-                <a:ea typeface="+mn-ea"/>
-                <a:cs typeface="+mn-cs"/>
-              </a:rPr>
-              <a:t>EventName</a:t>
-            </a:r>
-            <a:r>
-              <a:rPr lang="en-US" sz="1200" kern="1200" dirty="0">
-                <a:solidFill>
-                  <a:schemeClr val="tx1"/>
-                </a:solidFill>
-                <a:latin typeface="+mn-lt"/>
-                <a:ea typeface="+mn-ea"/>
-                <a:cs typeface="+mn-cs"/>
-              </a:rPr>
-              <a:t>"] = _config["</a:t>
+              <a:t> = _config["</a:t>
             </a:r>
             <a:r>
               <a:rPr lang="en-US" sz="1200" kern="1200" dirty="0" err="1">
@@ -933,6 +961,71 @@
               </a:rPr>
               <a:t>"];</a:t>
             </a:r>
+          </a:p>
+          <a:p>
+            <a:r>
+              <a:rPr lang="en-US" sz="1200" kern="1200" dirty="0">
+                <a:solidFill>
+                  <a:schemeClr val="tx1"/>
+                </a:solidFill>
+                <a:latin typeface="+mn-lt"/>
+                <a:ea typeface="+mn-ea"/>
+                <a:cs typeface="+mn-cs"/>
+              </a:rPr>
+              <a:t>3. </a:t>
+            </a:r>
+            <a:r>
+              <a:rPr lang="en-US" sz="1200" b="1" kern="1200" dirty="0" err="1">
+                <a:solidFill>
+                  <a:schemeClr val="tx1"/>
+                </a:solidFill>
+                <a:latin typeface="+mn-lt"/>
+                <a:ea typeface="+mn-ea"/>
+                <a:cs typeface="+mn-cs"/>
+              </a:rPr>
+              <a:t>Index.cshtml</a:t>
+            </a:r>
+            <a:r>
+              <a:rPr lang="en-US" sz="1200" b="1" kern="1200" dirty="0">
+                <a:solidFill>
+                  <a:schemeClr val="tx1"/>
+                </a:solidFill>
+                <a:latin typeface="+mn-lt"/>
+                <a:ea typeface="+mn-ea"/>
+                <a:cs typeface="+mn-cs"/>
+              </a:rPr>
+              <a:t>:</a:t>
+            </a:r>
+            <a:r>
+              <a:rPr lang="en-US" sz="1200" kern="1200" dirty="0">
+                <a:solidFill>
+                  <a:schemeClr val="tx1"/>
+                </a:solidFill>
+                <a:latin typeface="+mn-lt"/>
+                <a:ea typeface="+mn-ea"/>
+                <a:cs typeface="+mn-cs"/>
+              </a:rPr>
+              <a:t> @</a:t>
+            </a:r>
+            <a:r>
+              <a:rPr lang="en-US" sz="1200" kern="1200" dirty="0" err="1">
+                <a:solidFill>
+                  <a:schemeClr val="tx1"/>
+                </a:solidFill>
+                <a:latin typeface="+mn-lt"/>
+                <a:ea typeface="+mn-ea"/>
+                <a:cs typeface="+mn-cs"/>
+              </a:rPr>
+              <a:t>Model.EventName</a:t>
+            </a:r>
+            <a:endParaRPr lang="en-US" sz="1200" kern="1200" dirty="0">
+              <a:solidFill>
+                <a:schemeClr val="tx1"/>
+              </a:solidFill>
+              <a:latin typeface="+mn-lt"/>
+              <a:ea typeface="+mn-ea"/>
+              <a:cs typeface="+mn-cs"/>
+            </a:endParaRPr>
           </a:p>
         </p:txBody>
       </p:sp>
@@ -1995,7 +2088,10 @@
           <a:bodyPr/>
           <a:lstStyle/>
           <a:p>
-            <a:endParaRPr lang="en-US" dirty="0"/>
+            <a:r>
+              <a:rPr lang="en-US" dirty="0"/>
+              <a:t>--object-id = GUID that identifies the principal that will receive permissions</a:t>
+            </a:r>
           </a:p>
         </p:txBody>
       </p:sp>
@@ -2006,7 +2102,7 @@
             <a:spLocks noGrp="1"/>
           </p:cNvSpPr>
           <p:nvPr>
-            <p:ph type="sldNum" sz="quarter" idx="10"/>
+            <p:ph type="sldNum" sz="quarter" idx="5"/>
           </p:nvPr>
         </p:nvSpPr>
         <p:spPr/>
@@ -2014,78 +2110,18 @@
           <a:bodyPr/>
           <a:lstStyle/>
           <a:p>
-            <a:pPr marL="0" marR="0" lvl="0" indent="0" algn="r" defTabSz="457200" rtl="0" eaLnBrk="1" fontAlgn="auto" latinLnBrk="0" hangingPunct="1">
-              <a:lnSpc>
-                <a:spcPct val="100000"/>
-              </a:lnSpc>
-              <a:spcBef>
-                <a:spcPts val="0"/>
-              </a:spcBef>
-              <a:spcAft>
-                <a:spcPts val="0"/>
-              </a:spcAft>
-              <a:buClrTx/>
-              <a:buSzTx/>
-              <a:buFontTx/>
-              <a:buNone/>
-              <a:tabLst/>
-              <a:defRPr/>
-            </a:pPr>
-            <a:fld id="{16A87904-88DE-4022-A424-ACD2E6FC1751}" type="slidenum">
-              <a:rPr kumimoji="0" lang="en-US" sz="1200" b="0" i="0" u="none" strike="noStrike" kern="1200" cap="none" spc="0" normalizeH="0" baseline="0" noProof="0" smtClean="0">
-                <a:ln>
-                  <a:noFill/>
-                </a:ln>
-                <a:solidFill>
-                  <a:prstClr val="black"/>
-                </a:solidFill>
-                <a:effectLst/>
-                <a:uLnTx/>
-                <a:uFillTx/>
-                <a:latin typeface="Calibri" panose="020F0502020204030204"/>
-                <a:ea typeface="+mn-ea"/>
-                <a:cs typeface="+mn-cs"/>
-              </a:rPr>
-              <a:pPr marL="0" marR="0" lvl="0" indent="0" algn="r" defTabSz="457200" rtl="0" eaLnBrk="1" fontAlgn="auto" latinLnBrk="0" hangingPunct="1">
-                <a:lnSpc>
-                  <a:spcPct val="100000"/>
-                </a:lnSpc>
-                <a:spcBef>
-                  <a:spcPts val="0"/>
-                </a:spcBef>
-                <a:spcAft>
-                  <a:spcPts val="0"/>
-                </a:spcAft>
-                <a:buClrTx/>
-                <a:buSzTx/>
-                <a:buFontTx/>
-                <a:buNone/>
-                <a:tabLst/>
-                <a:defRPr/>
-              </a:pPr>
+            <a:fld id="{40D55A08-0E86-45D7-AB2B-D5F1B665F082}" type="slidenum">
+              <a:rPr lang="en-US" smtClean="0"/>
               <a:t>17</a:t>
             </a:fld>
-            <a:endParaRPr kumimoji="0" lang="en-US" sz="1200" b="0" i="0" u="none" strike="noStrike" kern="1200" cap="none" spc="0" normalizeH="0" baseline="0" noProof="0">
-              <a:ln>
-                <a:noFill/>
-              </a:ln>
-              <a:solidFill>
-                <a:prstClr val="black"/>
-              </a:solidFill>
-              <a:effectLst/>
-              <a:uLnTx/>
-              <a:uFillTx/>
-              <a:latin typeface="Calibri" panose="020F0502020204030204"/>
-              <a:ea typeface="+mn-ea"/>
-              <a:cs typeface="+mn-cs"/>
-            </a:endParaRPr>
+            <a:endParaRPr lang="en-US"/>
           </a:p>
         </p:txBody>
       </p:sp>
     </p:spTree>
     <p:extLst>
       <p:ext uri="{BB962C8B-B14F-4D97-AF65-F5344CB8AC3E}">
-        <p14:creationId xmlns:p14="http://schemas.microsoft.com/office/powerpoint/2010/main" val="2232734480"/>
+        <p14:creationId xmlns:p14="http://schemas.microsoft.com/office/powerpoint/2010/main" val="2479955224"/>
       </p:ext>
     </p:extLst>
   </p:cSld>
@@ -2229,7 +2265,7 @@
     </p:spTree>
     <p:extLst>
       <p:ext uri="{BB962C8B-B14F-4D97-AF65-F5344CB8AC3E}">
-        <p14:creationId xmlns:p14="http://schemas.microsoft.com/office/powerpoint/2010/main" val="1203295569"/>
+        <p14:creationId xmlns:p14="http://schemas.microsoft.com/office/powerpoint/2010/main" val="2232734480"/>
       </p:ext>
     </p:extLst>
   </p:cSld>
@@ -2283,6 +2319,22 @@
           <a:bodyPr/>
           <a:lstStyle/>
           <a:p>
+            <a:r>
+              <a:rPr lang="en-US" dirty="0"/>
+              <a:t>show </a:t>
+            </a:r>
+            <a:r>
+              <a:rPr lang="en-US" dirty="0" err="1"/>
+              <a:t>Program.ConfigureKeyVault</a:t>
+            </a:r>
+            <a:r>
+              <a:rPr lang="en-US" dirty="0"/>
+              <a:t> in </a:t>
+            </a:r>
+            <a:r>
+              <a:rPr lang="en-US" dirty="0" err="1"/>
+              <a:t>ViewComponentsDemo</a:t>
+            </a:r>
             <a:endParaRPr lang="en-US" dirty="0"/>
           </a:p>
         </p:txBody>
@@ -2373,7 +2425,7 @@
     </p:spTree>
     <p:extLst>
       <p:ext uri="{BB962C8B-B14F-4D97-AF65-F5344CB8AC3E}">
-        <p14:creationId xmlns:p14="http://schemas.microsoft.com/office/powerpoint/2010/main" val="2271797707"/>
+        <p14:creationId xmlns:p14="http://schemas.microsoft.com/office/powerpoint/2010/main" val="1203295569"/>
       </p:ext>
     </p:extLst>
   </p:cSld>
@@ -2527,6 +2579,150 @@
 </p:notes>
 </file>
 
+<file path=ppt/notesSlides/notesSlide20.xml><?xml version="1.0" encoding="utf-8"?>
+<p:notes xmlns:a="http://schemas.openxmlformats.org/drawingml/2006/main" xmlns:r="http://schemas.openxmlformats.org/officeDocument/2006/relationships" xmlns:p="http://schemas.openxmlformats.org/presentationml/2006/main">
+  <p:cSld>
+    <p:spTree>
+      <p:nvGrpSpPr>
+        <p:cNvPr id="1" name=""/>
+        <p:cNvGrpSpPr/>
+        <p:nvPr/>
+      </p:nvGrpSpPr>
+      <p:grpSpPr>
+        <a:xfrm>
+          <a:off x="0" y="0"/>
+          <a:ext cx="0" cy="0"/>
+          <a:chOff x="0" y="0"/>
+          <a:chExt cx="0" cy="0"/>
+        </a:xfrm>
+      </p:grpSpPr>
+      <p:sp>
+        <p:nvSpPr>
+          <p:cNvPr id="2" name="Slide Image Placeholder 1"/>
+          <p:cNvSpPr>
+            <a:spLocks noGrp="1" noRot="1" noChangeAspect="1"/>
+          </p:cNvSpPr>
+          <p:nvPr>
+            <p:ph type="sldImg"/>
+          </p:nvPr>
+        </p:nvSpPr>
+        <p:spPr/>
+      </p:sp>
+      <p:sp>
+        <p:nvSpPr>
+          <p:cNvPr id="3" name="Notes Placeholder 2"/>
+          <p:cNvSpPr>
+            <a:spLocks noGrp="1"/>
+          </p:cNvSpPr>
+          <p:nvPr>
+            <p:ph type="body" idx="1"/>
+          </p:nvPr>
+        </p:nvSpPr>
+        <p:spPr/>
+        <p:txBody>
+          <a:bodyPr/>
+          <a:lstStyle/>
+          <a:p>
+            <a:endParaRPr lang="en-US" dirty="0"/>
+          </a:p>
+        </p:txBody>
+      </p:sp>
+      <p:sp>
+        <p:nvSpPr>
+          <p:cNvPr id="4" name="Slide Number Placeholder 3"/>
+          <p:cNvSpPr>
+            <a:spLocks noGrp="1"/>
+          </p:cNvSpPr>
+          <p:nvPr>
+            <p:ph type="sldNum" sz="quarter" idx="10"/>
+          </p:nvPr>
+        </p:nvSpPr>
+        <p:spPr/>
+        <p:txBody>
+          <a:bodyPr/>
+          <a:lstStyle/>
+          <a:p>
+            <a:pPr marL="0" marR="0" lvl="0" indent="0" algn="r" defTabSz="457200" rtl="0" eaLnBrk="1" fontAlgn="auto" latinLnBrk="0" hangingPunct="1">
+              <a:lnSpc>
+                <a:spcPct val="100000"/>
+              </a:lnSpc>
+              <a:spcBef>
+                <a:spcPts val="0"/>
+              </a:spcBef>
+              <a:spcAft>
+                <a:spcPts val="0"/>
+              </a:spcAft>
+              <a:buClrTx/>
+              <a:buSzTx/>
+              <a:buFontTx/>
+              <a:buNone/>
+              <a:tabLst/>
+              <a:defRPr/>
+            </a:pPr>
+            <a:fld id="{16A87904-88DE-4022-A424-ACD2E6FC1751}" type="slidenum">
+              <a:rPr kumimoji="0" lang="en-US" sz="1200" b="0" i="0" u="none" strike="noStrike" kern="1200" cap="none" spc="0" normalizeH="0" baseline="0" noProof="0" smtClean="0">
+                <a:ln>
+                  <a:noFill/>
+                </a:ln>
+                <a:solidFill>
+                  <a:prstClr val="black"/>
+                </a:solidFill>
+                <a:effectLst/>
+                <a:uLnTx/>
+                <a:uFillTx/>
+                <a:latin typeface="Calibri" panose="020F0502020204030204"/>
+                <a:ea typeface="+mn-ea"/>
+                <a:cs typeface="+mn-cs"/>
+              </a:rPr>
+              <a:pPr marL="0" marR="0" lvl="0" indent="0" algn="r" defTabSz="457200" rtl="0" eaLnBrk="1" fontAlgn="auto" latinLnBrk="0" hangingPunct="1">
+                <a:lnSpc>
+                  <a:spcPct val="100000"/>
+                </a:lnSpc>
+                <a:spcBef>
+                  <a:spcPts val="0"/>
+                </a:spcBef>
+                <a:spcAft>
+                  <a:spcPts val="0"/>
+                </a:spcAft>
+                <a:buClrTx/>
+                <a:buSzTx/>
+                <a:buFontTx/>
+                <a:buNone/>
+                <a:tabLst/>
+                <a:defRPr/>
+              </a:pPr>
+              <a:t>20</a:t>
+            </a:fld>
+            <a:endParaRPr kumimoji="0" lang="en-US" sz="1200" b="0" i="0" u="none" strike="noStrike" kern="1200" cap="none" spc="0" normalizeH="0" baseline="0" noProof="0">
+              <a:ln>
+                <a:noFill/>
+              </a:ln>
+              <a:solidFill>
+                <a:prstClr val="black"/>
+              </a:solidFill>
+              <a:effectLst/>
+              <a:uLnTx/>
+              <a:uFillTx/>
+              <a:latin typeface="Calibri" panose="020F0502020204030204"/>
+              <a:ea typeface="+mn-ea"/>
+              <a:cs typeface="+mn-cs"/>
+            </a:endParaRPr>
+          </a:p>
+        </p:txBody>
+      </p:sp>
+    </p:spTree>
+    <p:extLst>
+      <p:ext uri="{BB962C8B-B14F-4D97-AF65-F5344CB8AC3E}">
+        <p14:creationId xmlns:p14="http://schemas.microsoft.com/office/powerpoint/2010/main" val="2271797707"/>
+      </p:ext>
+    </p:extLst>
+  </p:cSld>
+  <p:clrMapOvr>
+    <a:masterClrMapping/>
+  </p:clrMapOvr>
+</p:notes>
+</file>
+
 <file path=ppt/notesSlides/notesSlide3.xml><?xml version="1.0" encoding="utf-8"?>
 <p:notes xmlns:a="http://schemas.openxmlformats.org/drawingml/2006/main" xmlns:r="http://schemas.openxmlformats.org/officeDocument/2006/relationships" xmlns:p="http://schemas.openxmlformats.org/presentationml/2006/main">
   <p:cSld>
@@ -3748,7 +3944,7 @@
           <a:p>
             <a:fld id="{B5D86D52-4857-4668-9EB7-B41E21252CF7}" type="datetimeFigureOut">
               <a:rPr lang="en-US" smtClean="0"/>
-              <a:t>2/25/2019</a:t>
+              <a:t>3/1/2019</a:t>
             </a:fld>
             <a:endParaRPr lang="en-US"/>
           </a:p>
@@ -3946,7 +4142,7 @@
           <a:p>
             <a:fld id="{B5D86D52-4857-4668-9EB7-B41E21252CF7}" type="datetimeFigureOut">
               <a:rPr lang="en-US" smtClean="0"/>
-              <a:t>2/25/2019</a:t>
+              <a:t>3/1/2019</a:t>
             </a:fld>
             <a:endParaRPr lang="en-US"/>
           </a:p>
@@ -4154,7 +4350,7 @@
           <a:p>
             <a:fld id="{B5D86D52-4857-4668-9EB7-B41E21252CF7}" type="datetimeFigureOut">
               <a:rPr lang="en-US" smtClean="0"/>
-              <a:t>2/25/2019</a:t>
+              <a:t>3/1/2019</a:t>
             </a:fld>
             <a:endParaRPr lang="en-US"/>
           </a:p>
@@ -4358,7 +4554,7 @@
           <a:p>
             <a:fld id="{EEC3160E-2579-4584-9765-DC1BA0B358F9}" type="datetimeFigureOut">
               <a:rPr lang="en-US" smtClean="0"/>
-              <a:t>2/25/2019</a:t>
+              <a:t>3/1/2019</a:t>
             </a:fld>
             <a:endParaRPr lang="en-US"/>
           </a:p>
@@ -4528,7 +4724,7 @@
           <a:p>
             <a:fld id="{EEC3160E-2579-4584-9765-DC1BA0B358F9}" type="datetimeFigureOut">
               <a:rPr lang="en-US" smtClean="0"/>
-              <a:t>2/25/2019</a:t>
+              <a:t>3/1/2019</a:t>
             </a:fld>
             <a:endParaRPr lang="en-US"/>
           </a:p>
@@ -4774,7 +4970,7 @@
           <a:p>
             <a:fld id="{EEC3160E-2579-4584-9765-DC1BA0B358F9}" type="datetimeFigureOut">
               <a:rPr lang="en-US" smtClean="0"/>
-              <a:t>2/25/2019</a:t>
+              <a:t>3/1/2019</a:t>
             </a:fld>
             <a:endParaRPr lang="en-US"/>
           </a:p>
@@ -5006,7 +5202,7 @@
           <a:p>
             <a:fld id="{EEC3160E-2579-4584-9765-DC1BA0B358F9}" type="datetimeFigureOut">
               <a:rPr lang="en-US" smtClean="0"/>
-              <a:t>2/25/2019</a:t>
+              <a:t>3/1/2019</a:t>
             </a:fld>
             <a:endParaRPr lang="en-US"/>
           </a:p>
@@ -5373,7 +5569,7 @@
           <a:p>
             <a:fld id="{EEC3160E-2579-4584-9765-DC1BA0B358F9}" type="datetimeFigureOut">
               <a:rPr lang="en-US" smtClean="0"/>
-              <a:t>2/25/2019</a:t>
+              <a:t>3/1/2019</a:t>
             </a:fld>
             <a:endParaRPr lang="en-US"/>
           </a:p>
@@ -5491,7 +5687,7 @@
           <a:p>
             <a:fld id="{EEC3160E-2579-4584-9765-DC1BA0B358F9}" type="datetimeFigureOut">
               <a:rPr lang="en-US" smtClean="0"/>
-              <a:t>2/25/2019</a:t>
+              <a:t>3/1/2019</a:t>
             </a:fld>
             <a:endParaRPr lang="en-US"/>
           </a:p>
@@ -5586,7 +5782,7 @@
           <a:p>
             <a:fld id="{EEC3160E-2579-4584-9765-DC1BA0B358F9}" type="datetimeFigureOut">
               <a:rPr lang="en-US" smtClean="0"/>
-              <a:t>2/25/2019</a:t>
+              <a:t>3/1/2019</a:t>
             </a:fld>
             <a:endParaRPr lang="en-US"/>
           </a:p>
@@ -5863,7 +6059,7 @@
           <a:p>
             <a:fld id="{EEC3160E-2579-4584-9765-DC1BA0B358F9}" type="datetimeFigureOut">
               <a:rPr lang="en-US" smtClean="0"/>
-              <a:t>2/25/2019</a:t>
+              <a:t>3/1/2019</a:t>
             </a:fld>
             <a:endParaRPr lang="en-US"/>
           </a:p>
@@ -6049,7 +6245,7 @@
           <a:p>
             <a:fld id="{B5D86D52-4857-4668-9EB7-B41E21252CF7}" type="datetimeFigureOut">
               <a:rPr lang="en-US" smtClean="0"/>
-              <a:t>2/25/2019</a:t>
+              <a:t>3/1/2019</a:t>
             </a:fld>
             <a:endParaRPr lang="en-US"/>
           </a:p>
@@ -6318,7 +6514,7 @@
           <a:p>
             <a:fld id="{EEC3160E-2579-4584-9765-DC1BA0B358F9}" type="datetimeFigureOut">
               <a:rPr lang="en-US" smtClean="0"/>
-              <a:t>2/25/2019</a:t>
+              <a:t>3/1/2019</a:t>
             </a:fld>
             <a:endParaRPr lang="en-US"/>
           </a:p>
@@ -6488,7 +6684,7 @@
           <a:p>
             <a:fld id="{EEC3160E-2579-4584-9765-DC1BA0B358F9}" type="datetimeFigureOut">
               <a:rPr lang="en-US" smtClean="0"/>
-              <a:t>2/25/2019</a:t>
+              <a:t>3/1/2019</a:t>
             </a:fld>
             <a:endParaRPr lang="en-US"/>
           </a:p>
@@ -6668,7 +6864,7 @@
           <a:p>
             <a:fld id="{EEC3160E-2579-4584-9765-DC1BA0B358F9}" type="datetimeFigureOut">
               <a:rPr lang="en-US" smtClean="0"/>
-              <a:t>2/25/2019</a:t>
+              <a:t>3/1/2019</a:t>
             </a:fld>
             <a:endParaRPr lang="en-US"/>
           </a:p>
@@ -6931,7 +7127,7 @@
           <a:p>
             <a:fld id="{B5D86D52-4857-4668-9EB7-B41E21252CF7}" type="datetimeFigureOut">
               <a:rPr lang="en-US" smtClean="0"/>
-              <a:t>2/25/2019</a:t>
+              <a:t>3/1/2019</a:t>
             </a:fld>
             <a:endParaRPr lang="en-US"/>
           </a:p>
@@ -7196,7 +7392,7 @@
           <a:p>
             <a:fld id="{B5D86D52-4857-4668-9EB7-B41E21252CF7}" type="datetimeFigureOut">
               <a:rPr lang="en-US" smtClean="0"/>
-              <a:t>2/25/2019</a:t>
+              <a:t>3/1/2019</a:t>
             </a:fld>
             <a:endParaRPr lang="en-US"/>
           </a:p>
@@ -7608,7 +7804,7 @@
           <a:p>
             <a:fld id="{B5D86D52-4857-4668-9EB7-B41E21252CF7}" type="datetimeFigureOut">
               <a:rPr lang="en-US" smtClean="0"/>
-              <a:t>2/25/2019</a:t>
+              <a:t>3/1/2019</a:t>
             </a:fld>
             <a:endParaRPr lang="en-US"/>
           </a:p>
@@ -7749,7 +7945,7 @@
           <a:p>
             <a:fld id="{B5D86D52-4857-4668-9EB7-B41E21252CF7}" type="datetimeFigureOut">
               <a:rPr lang="en-US" smtClean="0"/>
-              <a:t>2/25/2019</a:t>
+              <a:t>3/1/2019</a:t>
             </a:fld>
             <a:endParaRPr lang="en-US"/>
           </a:p>
@@ -7862,7 +8058,7 @@
           <a:p>
             <a:fld id="{B5D86D52-4857-4668-9EB7-B41E21252CF7}" type="datetimeFigureOut">
               <a:rPr lang="en-US" smtClean="0"/>
-              <a:t>2/25/2019</a:t>
+              <a:t>3/1/2019</a:t>
             </a:fld>
             <a:endParaRPr lang="en-US"/>
           </a:p>
@@ -8173,7 +8369,7 @@
           <a:p>
             <a:fld id="{B5D86D52-4857-4668-9EB7-B41E21252CF7}" type="datetimeFigureOut">
               <a:rPr lang="en-US" smtClean="0"/>
-              <a:t>2/25/2019</a:t>
+              <a:t>3/1/2019</a:t>
             </a:fld>
             <a:endParaRPr lang="en-US"/>
           </a:p>
@@ -8461,7 +8657,7 @@
           <a:p>
             <a:fld id="{B5D86D52-4857-4668-9EB7-B41E21252CF7}" type="datetimeFigureOut">
               <a:rPr lang="en-US" smtClean="0"/>
-              <a:t>2/25/2019</a:t>
+              <a:t>3/1/2019</a:t>
             </a:fld>
             <a:endParaRPr lang="en-US"/>
           </a:p>
@@ -8702,7 +8898,7 @@
           <a:p>
             <a:fld id="{B5D86D52-4857-4668-9EB7-B41E21252CF7}" type="datetimeFigureOut">
               <a:rPr lang="en-US" smtClean="0"/>
-              <a:t>2/25/2019</a:t>
+              <a:t>3/1/2019</a:t>
             </a:fld>
             <a:endParaRPr lang="en-US"/>
           </a:p>
@@ -9254,7 +9450,7 @@
           <a:p>
             <a:fld id="{EEC3160E-2579-4584-9765-DC1BA0B358F9}" type="datetimeFigureOut">
               <a:rPr lang="en-US" smtClean="0"/>
-              <a:t>2/25/2019</a:t>
+              <a:t>3/1/2019</a:t>
             </a:fld>
             <a:endParaRPr lang="en-US"/>
           </a:p>
@@ -9961,8 +10157,8 @@
         </p:nvSpPr>
         <p:spPr>
           <a:xfrm>
-            <a:off x="120399" y="5946883"/>
-            <a:ext cx="6618051" cy="911117"/>
+            <a:off x="120399" y="5558445"/>
+            <a:ext cx="6618051" cy="1299556"/>
           </a:xfrm>
         </p:spPr>
         <p:txBody>
@@ -9974,15 +10170,26 @@
             <a:pPr algn="l"/>
             <a:r>
               <a:rPr lang="en-US" sz="2000" b="1" dirty="0"/>
-              <a:t>Scott Addie | @</a:t>
+              <a:t>Scott Addie</a:t>
+            </a:r>
+          </a:p>
+          <a:p>
+            <a:pPr algn="l"/>
+            <a:r>
+              <a:rPr lang="en-US" sz="2000" b="1" dirty="0"/>
+              <a:t>@</a:t>
             </a:r>
             <a:r>
               <a:rPr lang="en-US" sz="2000" b="1" dirty="0" err="1"/>
               <a:t>Scott_Addie</a:t>
             </a:r>
+            <a:endParaRPr lang="en-US" sz="2000" b="1" dirty="0"/>
+          </a:p>
+          <a:p>
+            <a:pPr algn="l"/>
             <a:r>
               <a:rPr lang="en-US" sz="2000" b="1" dirty="0"/>
-              <a:t> | Senior Content Developer</a:t>
+              <a:t>Senior Content Developer</a:t>
             </a:r>
           </a:p>
         </p:txBody>
@@ -11786,14 +11993,13 @@
               <a:buNone/>
             </a:pPr>
             <a:r>
-              <a:rPr lang="en-US" sz="2400" b="1" dirty="0">
-                <a:latin typeface="Courier New" panose="02070309020205020404" pitchFamily="49" charset="0"/>
-                <a:cs typeface="Courier New" panose="02070309020205020404" pitchFamily="49" charset="0"/>
-              </a:rPr>
-              <a:t>&gt; </a:t>
-            </a:r>
-            <a:r>
               <a:rPr lang="en-US" sz="2400" dirty="0" err="1">
+                <a:solidFill>
+                  <a:schemeClr val="accent1">
+                    <a:lumMod val="40000"/>
+                    <a:lumOff val="60000"/>
+                  </a:schemeClr>
+                </a:solidFill>
                 <a:latin typeface="Courier New" panose="02070309020205020404" pitchFamily="49" charset="0"/>
                 <a:cs typeface="Courier New" panose="02070309020205020404" pitchFamily="49" charset="0"/>
               </a:rPr>
@@ -11801,6 +12007,12 @@
             </a:r>
             <a:r>
               <a:rPr lang="en-US" sz="2400" dirty="0">
+                <a:solidFill>
+                  <a:schemeClr val="accent1">
+                    <a:lumMod val="40000"/>
+                    <a:lumOff val="60000"/>
+                  </a:schemeClr>
+                </a:solidFill>
                 <a:latin typeface="Courier New" panose="02070309020205020404" pitchFamily="49" charset="0"/>
                 <a:cs typeface="Courier New" panose="02070309020205020404" pitchFamily="49" charset="0"/>
               </a:rPr>
@@ -11808,6 +12020,12 @@
             </a:r>
             <a:r>
               <a:rPr lang="en-US" sz="2400" dirty="0" err="1">
+                <a:solidFill>
+                  <a:schemeClr val="accent1">
+                    <a:lumMod val="40000"/>
+                    <a:lumOff val="60000"/>
+                  </a:schemeClr>
+                </a:solidFill>
                 <a:latin typeface="Courier New" panose="02070309020205020404" pitchFamily="49" charset="0"/>
                 <a:cs typeface="Courier New" panose="02070309020205020404" pitchFamily="49" charset="0"/>
               </a:rPr>
@@ -11815,13 +12033,39 @@
             </a:r>
             <a:r>
               <a:rPr lang="en-US" sz="2400" dirty="0">
+                <a:solidFill>
+                  <a:schemeClr val="accent1">
+                    <a:lumMod val="40000"/>
+                    <a:lumOff val="60000"/>
+                  </a:schemeClr>
+                </a:solidFill>
                 <a:latin typeface="Courier New" panose="02070309020205020404" pitchFamily="49" charset="0"/>
                 <a:cs typeface="Courier New" panose="02070309020205020404" pitchFamily="49" charset="0"/>
               </a:rPr>
-              <a:t> create --name `</a:t>
+              <a:t> create</a:t>
+            </a:r>
+            <a:r>
+              <a:rPr lang="en-US" sz="2400" dirty="0">
+                <a:latin typeface="Courier New" panose="02070309020205020404" pitchFamily="49" charset="0"/>
+                <a:cs typeface="Courier New" panose="02070309020205020404" pitchFamily="49" charset="0"/>
+              </a:rPr>
+              <a:t> --name </a:t>
+            </a:r>
+            <a:r>
+              <a:rPr lang="en-US" sz="2400" dirty="0">
+                <a:solidFill>
+                  <a:schemeClr val="accent4"/>
+                </a:solidFill>
+                <a:latin typeface="Courier New" panose="02070309020205020404" pitchFamily="49" charset="0"/>
+                <a:cs typeface="Courier New" panose="02070309020205020404" pitchFamily="49" charset="0"/>
+              </a:rPr>
+              <a:t>`</a:t>
             </a:r>
             <a:r>
               <a:rPr lang="en-US" sz="2400" dirty="0" err="1">
+                <a:solidFill>
+                  <a:schemeClr val="accent4"/>
+                </a:solidFill>
                 <a:latin typeface="Courier New" panose="02070309020205020404" pitchFamily="49" charset="0"/>
                 <a:cs typeface="Courier New" panose="02070309020205020404" pitchFamily="49" charset="0"/>
               </a:rPr>
@@ -11829,25 +12073,48 @@
             </a:r>
             <a:r>
               <a:rPr lang="en-US" sz="2400" dirty="0">
+                <a:solidFill>
+                  <a:schemeClr val="accent4"/>
+                </a:solidFill>
                 <a:latin typeface="Courier New" panose="02070309020205020404" pitchFamily="49" charset="0"/>
                 <a:cs typeface="Courier New" panose="02070309020205020404" pitchFamily="49" charset="0"/>
               </a:rPr>
               <a:t>`</a:t>
             </a:r>
-          </a:p>
-          <a:p>
-            <a:pPr marL="0" indent="0">
-              <a:buNone/>
-            </a:pPr>
             <a:r>
               <a:rPr lang="en-US" sz="2400" dirty="0">
                 <a:latin typeface="Courier New" panose="02070309020205020404" pitchFamily="49" charset="0"/>
                 <a:cs typeface="Courier New" panose="02070309020205020404" pitchFamily="49" charset="0"/>
               </a:rPr>
-              <a:t>				 --resource-group `</a:t>
+              <a:t> \</a:t>
+            </a:r>
+          </a:p>
+          <a:p>
+            <a:pPr marL="0" indent="0">
+              <a:buNone/>
+            </a:pPr>
+            <a:r>
+              <a:rPr lang="en-US" sz="2400" dirty="0">
+                <a:latin typeface="Courier New" panose="02070309020205020404" pitchFamily="49" charset="0"/>
+                <a:cs typeface="Courier New" panose="02070309020205020404" pitchFamily="49" charset="0"/>
+              </a:rPr>
+              <a:t>			    --resource-group </a:t>
+            </a:r>
+            <a:r>
+              <a:rPr lang="en-US" sz="2400" dirty="0">
+                <a:solidFill>
+                  <a:schemeClr val="accent4"/>
+                </a:solidFill>
+                <a:latin typeface="Courier New" panose="02070309020205020404" pitchFamily="49" charset="0"/>
+                <a:cs typeface="Courier New" panose="02070309020205020404" pitchFamily="49" charset="0"/>
+              </a:rPr>
+              <a:t>`</a:t>
             </a:r>
             <a:r>
               <a:rPr lang="en-US" sz="2400" dirty="0" err="1">
+                <a:solidFill>
+                  <a:schemeClr val="accent4"/>
+                </a:solidFill>
                 <a:latin typeface="Courier New" panose="02070309020205020404" pitchFamily="49" charset="0"/>
                 <a:cs typeface="Courier New" panose="02070309020205020404" pitchFamily="49" charset="0"/>
               </a:rPr>
@@ -11855,31 +12122,47 @@
             </a:r>
             <a:r>
               <a:rPr lang="en-US" sz="2400" dirty="0">
+                <a:solidFill>
+                  <a:schemeClr val="accent4"/>
+                </a:solidFill>
                 <a:latin typeface="Courier New" panose="02070309020205020404" pitchFamily="49" charset="0"/>
                 <a:cs typeface="Courier New" panose="02070309020205020404" pitchFamily="49" charset="0"/>
               </a:rPr>
               <a:t>`</a:t>
             </a:r>
-          </a:p>
-          <a:p>
-            <a:pPr marL="0" indent="0">
-              <a:buNone/>
-            </a:pPr>
             <a:r>
               <a:rPr lang="en-US" sz="2400" dirty="0">
                 <a:latin typeface="Courier New" panose="02070309020205020404" pitchFamily="49" charset="0"/>
                 <a:cs typeface="Courier New" panose="02070309020205020404" pitchFamily="49" charset="0"/>
               </a:rPr>
-              <a:t>				 --location </a:t>
+              <a:t> \</a:t>
+            </a:r>
+          </a:p>
+          <a:p>
+            <a:pPr marL="0" indent="0">
+              <a:buNone/>
+            </a:pPr>
+            <a:r>
+              <a:rPr lang="en-US" sz="2400" dirty="0">
+                <a:latin typeface="Courier New" panose="02070309020205020404" pitchFamily="49" charset="0"/>
+                <a:cs typeface="Courier New" panose="02070309020205020404" pitchFamily="49" charset="0"/>
+              </a:rPr>
+              <a:t>			    --location </a:t>
             </a:r>
             <a:r>
               <a:rPr lang="en-US" sz="2400" dirty="0" err="1">
+                <a:solidFill>
+                  <a:schemeClr val="accent4"/>
+                </a:solidFill>
                 <a:latin typeface="Courier New" panose="02070309020205020404" pitchFamily="49" charset="0"/>
                 <a:cs typeface="Courier New" panose="02070309020205020404" pitchFamily="49" charset="0"/>
               </a:rPr>
               <a:t>eastus</a:t>
             </a:r>
             <a:endParaRPr lang="en-US" sz="2400" dirty="0">
+              <a:solidFill>
+                <a:schemeClr val="accent4"/>
+              </a:solidFill>
               <a:latin typeface="Courier New" panose="02070309020205020404" pitchFamily="49" charset="0"/>
               <a:cs typeface="Courier New" panose="02070309020205020404" pitchFamily="49" charset="0"/>
             </a:endParaRPr>
@@ -11889,14 +12172,13 @@
               <a:buNone/>
             </a:pPr>
             <a:r>
-              <a:rPr lang="en-US" sz="2400" b="1" dirty="0">
-                <a:latin typeface="Courier New" panose="02070309020205020404" pitchFamily="49" charset="0"/>
-                <a:cs typeface="Courier New" panose="02070309020205020404" pitchFamily="49" charset="0"/>
-              </a:rPr>
-              <a:t>&gt; </a:t>
-            </a:r>
-            <a:r>
               <a:rPr lang="en-US" sz="2400" dirty="0" err="1">
+                <a:solidFill>
+                  <a:schemeClr val="accent1">
+                    <a:lumMod val="40000"/>
+                    <a:lumOff val="60000"/>
+                  </a:schemeClr>
+                </a:solidFill>
                 <a:latin typeface="Courier New" panose="02070309020205020404" pitchFamily="49" charset="0"/>
                 <a:cs typeface="Courier New" panose="02070309020205020404" pitchFamily="49" charset="0"/>
               </a:rPr>
@@ -11904,6 +12186,12 @@
             </a:r>
             <a:r>
               <a:rPr lang="en-US" sz="2400" dirty="0">
+                <a:solidFill>
+                  <a:schemeClr val="accent1">
+                    <a:lumMod val="40000"/>
+                    <a:lumOff val="60000"/>
+                  </a:schemeClr>
+                </a:solidFill>
                 <a:latin typeface="Courier New" panose="02070309020205020404" pitchFamily="49" charset="0"/>
                 <a:cs typeface="Courier New" panose="02070309020205020404" pitchFamily="49" charset="0"/>
               </a:rPr>
@@ -11911,6 +12199,12 @@
             </a:r>
             <a:r>
               <a:rPr lang="en-US" sz="2400" dirty="0" err="1">
+                <a:solidFill>
+                  <a:schemeClr val="accent1">
+                    <a:lumMod val="40000"/>
+                    <a:lumOff val="60000"/>
+                  </a:schemeClr>
+                </a:solidFill>
                 <a:latin typeface="Courier New" panose="02070309020205020404" pitchFamily="49" charset="0"/>
                 <a:cs typeface="Courier New" panose="02070309020205020404" pitchFamily="49" charset="0"/>
               </a:rPr>
@@ -11918,13 +12212,39 @@
             </a:r>
             <a:r>
               <a:rPr lang="en-US" sz="2400" dirty="0">
+                <a:solidFill>
+                  <a:schemeClr val="accent1">
+                    <a:lumMod val="40000"/>
+                    <a:lumOff val="60000"/>
+                  </a:schemeClr>
+                </a:solidFill>
                 <a:latin typeface="Courier New" panose="02070309020205020404" pitchFamily="49" charset="0"/>
                 <a:cs typeface="Courier New" panose="02070309020205020404" pitchFamily="49" charset="0"/>
               </a:rPr>
-              <a:t> secret set --vault-name `</a:t>
+              <a:t> secret set</a:t>
+            </a:r>
+            <a:r>
+              <a:rPr lang="en-US" sz="2400" dirty="0">
+                <a:latin typeface="Courier New" panose="02070309020205020404" pitchFamily="49" charset="0"/>
+                <a:cs typeface="Courier New" panose="02070309020205020404" pitchFamily="49" charset="0"/>
+              </a:rPr>
+              <a:t> --vault-name </a:t>
+            </a:r>
+            <a:r>
+              <a:rPr lang="en-US" sz="2400" dirty="0">
+                <a:solidFill>
+                  <a:schemeClr val="accent4"/>
+                </a:solidFill>
+                <a:latin typeface="Courier New" panose="02070309020205020404" pitchFamily="49" charset="0"/>
+                <a:cs typeface="Courier New" panose="02070309020205020404" pitchFamily="49" charset="0"/>
+              </a:rPr>
+              <a:t>`</a:t>
             </a:r>
             <a:r>
               <a:rPr lang="en-US" sz="2400" dirty="0" err="1">
+                <a:solidFill>
+                  <a:schemeClr val="accent4"/>
+                </a:solidFill>
                 <a:latin typeface="Courier New" panose="02070309020205020404" pitchFamily="49" charset="0"/>
                 <a:cs typeface="Courier New" panose="02070309020205020404" pitchFamily="49" charset="0"/>
               </a:rPr>
@@ -11932,11 +12252,21 @@
             </a:r>
             <a:r>
               <a:rPr lang="en-US" sz="2400" dirty="0">
+                <a:solidFill>
+                  <a:schemeClr val="accent4"/>
+                </a:solidFill>
                 <a:latin typeface="Courier New" panose="02070309020205020404" pitchFamily="49" charset="0"/>
                 <a:cs typeface="Courier New" panose="02070309020205020404" pitchFamily="49" charset="0"/>
               </a:rPr>
               <a:t>`</a:t>
             </a:r>
+            <a:r>
+              <a:rPr lang="en-US" sz="2400" dirty="0">
+                <a:latin typeface="Courier New" panose="02070309020205020404" pitchFamily="49" charset="0"/>
+                <a:cs typeface="Courier New" panose="02070309020205020404" pitchFamily="49" charset="0"/>
+              </a:rPr>
+              <a:t> \</a:t>
+            </a:r>
           </a:p>
           <a:p>
             <a:pPr marL="0" indent="0">
@@ -11947,28 +12277,58 @@
                 <a:latin typeface="Courier New" panose="02070309020205020404" pitchFamily="49" charset="0"/>
                 <a:cs typeface="Courier New" panose="02070309020205020404" pitchFamily="49" charset="0"/>
               </a:rPr>
-              <a:t>					</a:t>
+              <a:t>				   </a:t>
             </a:r>
             <a:r>
               <a:rPr lang="en-US" sz="2400" dirty="0">
                 <a:latin typeface="Courier New" panose="02070309020205020404" pitchFamily="49" charset="0"/>
                 <a:cs typeface="Courier New" panose="02070309020205020404" pitchFamily="49" charset="0"/>
               </a:rPr>
-              <a:t>--name `Password`</a:t>
-            </a:r>
-          </a:p>
-          <a:p>
-            <a:pPr marL="0" indent="0">
-              <a:buNone/>
-            </a:pPr>
+              <a:t>--name </a:t>
+            </a:r>
+            <a:r>
+              <a:rPr lang="en-US" sz="2400" dirty="0">
+                <a:solidFill>
+                  <a:schemeClr val="accent4"/>
+                </a:solidFill>
+                <a:latin typeface="Courier New" panose="02070309020205020404" pitchFamily="49" charset="0"/>
+                <a:cs typeface="Courier New" panose="02070309020205020404" pitchFamily="49" charset="0"/>
+              </a:rPr>
+              <a:t>`Password`</a:t>
+            </a:r>
             <a:r>
               <a:rPr lang="en-US" sz="2400" dirty="0">
                 <a:latin typeface="Courier New" panose="02070309020205020404" pitchFamily="49" charset="0"/>
                 <a:cs typeface="Courier New" panose="02070309020205020404" pitchFamily="49" charset="0"/>
               </a:rPr>
-              <a:t>					--value `pass123`</a:t>
+              <a:t> \</a:t>
+            </a:r>
+          </a:p>
+          <a:p>
+            <a:pPr marL="0" indent="0">
+              <a:buNone/>
+            </a:pPr>
+            <a:r>
+              <a:rPr lang="en-US" sz="2400" dirty="0">
+                <a:latin typeface="Courier New" panose="02070309020205020404" pitchFamily="49" charset="0"/>
+                <a:cs typeface="Courier New" panose="02070309020205020404" pitchFamily="49" charset="0"/>
+              </a:rPr>
+              <a:t>				   --value </a:t>
+            </a:r>
+            <a:r>
+              <a:rPr lang="en-US" sz="2400" dirty="0">
+                <a:solidFill>
+                  <a:schemeClr val="accent4"/>
+                </a:solidFill>
+                <a:latin typeface="Courier New" panose="02070309020205020404" pitchFamily="49" charset="0"/>
+                <a:cs typeface="Courier New" panose="02070309020205020404" pitchFamily="49" charset="0"/>
+              </a:rPr>
+              <a:t>`pass123`</a:t>
             </a:r>
             <a:endParaRPr lang="en-US" b="1" dirty="0">
+              <a:solidFill>
+                <a:schemeClr val="accent4"/>
+              </a:solidFill>
               <a:latin typeface="Courier New" panose="02070309020205020404" pitchFamily="49" charset="0"/>
               <a:cs typeface="Courier New" panose="02070309020205020404" pitchFamily="49" charset="0"/>
             </a:endParaRPr>
@@ -11978,14 +12338,13 @@
               <a:buNone/>
             </a:pPr>
             <a:r>
-              <a:rPr lang="en-US" sz="2400" b="1" dirty="0">
-                <a:latin typeface="Courier New" panose="02070309020205020404" pitchFamily="49" charset="0"/>
-                <a:cs typeface="Courier New" panose="02070309020205020404" pitchFamily="49" charset="0"/>
-              </a:rPr>
-              <a:t>&gt; </a:t>
-            </a:r>
-            <a:r>
               <a:rPr lang="en-US" sz="2400" dirty="0" err="1">
+                <a:solidFill>
+                  <a:schemeClr val="accent1">
+                    <a:lumMod val="40000"/>
+                    <a:lumOff val="60000"/>
+                  </a:schemeClr>
+                </a:solidFill>
                 <a:latin typeface="Courier New" panose="02070309020205020404" pitchFamily="49" charset="0"/>
                 <a:cs typeface="Courier New" panose="02070309020205020404" pitchFamily="49" charset="0"/>
               </a:rPr>
@@ -11993,6 +12352,12 @@
             </a:r>
             <a:r>
               <a:rPr lang="en-US" sz="2400" dirty="0">
+                <a:solidFill>
+                  <a:schemeClr val="accent1">
+                    <a:lumMod val="40000"/>
+                    <a:lumOff val="60000"/>
+                  </a:schemeClr>
+                </a:solidFill>
                 <a:latin typeface="Courier New" panose="02070309020205020404" pitchFamily="49" charset="0"/>
                 <a:cs typeface="Courier New" panose="02070309020205020404" pitchFamily="49" charset="0"/>
               </a:rPr>
@@ -12000,6 +12365,12 @@
             </a:r>
             <a:r>
               <a:rPr lang="en-US" sz="2400" dirty="0" err="1">
+                <a:solidFill>
+                  <a:schemeClr val="accent1">
+                    <a:lumMod val="40000"/>
+                    <a:lumOff val="60000"/>
+                  </a:schemeClr>
+                </a:solidFill>
                 <a:latin typeface="Courier New" panose="02070309020205020404" pitchFamily="49" charset="0"/>
                 <a:cs typeface="Courier New" panose="02070309020205020404" pitchFamily="49" charset="0"/>
               </a:rPr>
@@ -12007,13 +12378,39 @@
             </a:r>
             <a:r>
               <a:rPr lang="en-US" sz="2400" dirty="0">
+                <a:solidFill>
+                  <a:schemeClr val="accent1">
+                    <a:lumMod val="40000"/>
+                    <a:lumOff val="60000"/>
+                  </a:schemeClr>
+                </a:solidFill>
                 <a:latin typeface="Courier New" panose="02070309020205020404" pitchFamily="49" charset="0"/>
                 <a:cs typeface="Courier New" panose="02070309020205020404" pitchFamily="49" charset="0"/>
               </a:rPr>
-              <a:t> secret set --vault-name `</a:t>
+              <a:t> secret set</a:t>
+            </a:r>
+            <a:r>
+              <a:rPr lang="en-US" sz="2400" dirty="0">
+                <a:latin typeface="Courier New" panose="02070309020205020404" pitchFamily="49" charset="0"/>
+                <a:cs typeface="Courier New" panose="02070309020205020404" pitchFamily="49" charset="0"/>
+              </a:rPr>
+              <a:t> --vault-name </a:t>
+            </a:r>
+            <a:r>
+              <a:rPr lang="en-US" sz="2400" dirty="0">
+                <a:solidFill>
+                  <a:schemeClr val="accent4"/>
+                </a:solidFill>
+                <a:latin typeface="Courier New" panose="02070309020205020404" pitchFamily="49" charset="0"/>
+                <a:cs typeface="Courier New" panose="02070309020205020404" pitchFamily="49" charset="0"/>
+              </a:rPr>
+              <a:t>`</a:t>
             </a:r>
             <a:r>
               <a:rPr lang="en-US" sz="2400" dirty="0" err="1">
+                <a:solidFill>
+                  <a:schemeClr val="accent4"/>
+                </a:solidFill>
                 <a:latin typeface="Courier New" panose="02070309020205020404" pitchFamily="49" charset="0"/>
                 <a:cs typeface="Courier New" panose="02070309020205020404" pitchFamily="49" charset="0"/>
               </a:rPr>
@@ -12021,22 +12418,20 @@
             </a:r>
             <a:r>
               <a:rPr lang="en-US" sz="2400" dirty="0">
+                <a:solidFill>
+                  <a:schemeClr val="accent4"/>
+                </a:solidFill>
                 <a:latin typeface="Courier New" panose="02070309020205020404" pitchFamily="49" charset="0"/>
                 <a:cs typeface="Courier New" panose="02070309020205020404" pitchFamily="49" charset="0"/>
               </a:rPr>
               <a:t>`</a:t>
             </a:r>
-          </a:p>
-          <a:p>
-            <a:pPr marL="0" indent="0">
-              <a:buNone/>
-            </a:pPr>
             <a:r>
               <a:rPr lang="en-US" sz="2400" dirty="0">
                 <a:latin typeface="Courier New" panose="02070309020205020404" pitchFamily="49" charset="0"/>
                 <a:cs typeface="Courier New" panose="02070309020205020404" pitchFamily="49" charset="0"/>
               </a:rPr>
-              <a:t>					--name `User`</a:t>
+              <a:t> \</a:t>
             </a:r>
           </a:p>
           <a:p>
@@ -12048,10 +12443,52 @@
                 <a:latin typeface="Courier New" panose="02070309020205020404" pitchFamily="49" charset="0"/>
                 <a:cs typeface="Courier New" panose="02070309020205020404" pitchFamily="49" charset="0"/>
               </a:rPr>
-              <a:t>					--value `</a:t>
+              <a:t>				   --name </a:t>
+            </a:r>
+            <a:r>
+              <a:rPr lang="en-US" sz="2400" dirty="0">
+                <a:solidFill>
+                  <a:schemeClr val="accent4"/>
+                </a:solidFill>
+                <a:latin typeface="Courier New" panose="02070309020205020404" pitchFamily="49" charset="0"/>
+                <a:cs typeface="Courier New" panose="02070309020205020404" pitchFamily="49" charset="0"/>
+              </a:rPr>
+              <a:t>`User`</a:t>
+            </a:r>
+            <a:r>
+              <a:rPr lang="en-US" sz="2400" dirty="0">
+                <a:latin typeface="Courier New" panose="02070309020205020404" pitchFamily="49" charset="0"/>
+                <a:cs typeface="Courier New" panose="02070309020205020404" pitchFamily="49" charset="0"/>
+              </a:rPr>
+              <a:t> \</a:t>
+            </a:r>
+          </a:p>
+          <a:p>
+            <a:pPr marL="0" indent="0">
+              <a:buNone/>
+            </a:pPr>
+            <a:r>
+              <a:rPr lang="en-US" sz="2400" dirty="0">
+                <a:latin typeface="Courier New" panose="02070309020205020404" pitchFamily="49" charset="0"/>
+                <a:cs typeface="Courier New" panose="02070309020205020404" pitchFamily="49" charset="0"/>
+              </a:rPr>
+              <a:t>				   --value </a:t>
+            </a:r>
+            <a:r>
+              <a:rPr lang="en-US" sz="2400" dirty="0">
+                <a:solidFill>
+                  <a:schemeClr val="accent4"/>
+                </a:solidFill>
+                <a:latin typeface="Courier New" panose="02070309020205020404" pitchFamily="49" charset="0"/>
+                <a:cs typeface="Courier New" panose="02070309020205020404" pitchFamily="49" charset="0"/>
+              </a:rPr>
+              <a:t>`</a:t>
             </a:r>
             <a:r>
               <a:rPr lang="en-US" sz="2400" dirty="0" err="1">
+                <a:solidFill>
+                  <a:schemeClr val="accent4"/>
+                </a:solidFill>
                 <a:latin typeface="Courier New" panose="02070309020205020404" pitchFamily="49" charset="0"/>
                 <a:cs typeface="Courier New" panose="02070309020205020404" pitchFamily="49" charset="0"/>
               </a:rPr>
@@ -12059,6 +12496,9 @@
             </a:r>
             <a:r>
               <a:rPr lang="en-US" sz="2400" dirty="0">
+                <a:solidFill>
+                  <a:schemeClr val="accent4"/>
+                </a:solidFill>
                 <a:latin typeface="Courier New" panose="02070309020205020404" pitchFamily="49" charset="0"/>
                 <a:cs typeface="Courier New" panose="02070309020205020404" pitchFamily="49" charset="0"/>
               </a:rPr>
@@ -12653,13 +13093,13 @@
           <p:nvPr>
             <p:extLst>
               <p:ext uri="{D42A27DB-BD31-4B8C-83A1-F6EECF244321}">
-                <p14:modId xmlns:p14="http://schemas.microsoft.com/office/powerpoint/2010/main" val="2652412917"/>
+                <p14:modId xmlns:p14="http://schemas.microsoft.com/office/powerpoint/2010/main" val="1429947681"/>
               </p:ext>
             </p:extLst>
           </p:nvPr>
         </p:nvGraphicFramePr>
         <p:xfrm>
-          <a:off x="1167192" y="2738457"/>
+          <a:off x="844462" y="2915796"/>
           <a:ext cx="9165812" cy="2133600"/>
         </p:xfrm>
         <a:graphic>
@@ -13253,7 +13693,7 @@
         </p:nvSpPr>
         <p:spPr>
           <a:xfrm>
-            <a:off x="1160930" y="2291887"/>
+            <a:off x="838200" y="2469226"/>
             <a:ext cx="1978891" cy="446567"/>
           </a:xfrm>
           <a:prstGeom prst="rect">
@@ -13768,7 +14208,7 @@
           <a:p>
             <a:r>
               <a:rPr lang="en-US" dirty="0"/>
-              <a:t>Key Vault: Configure access</a:t>
+              <a:t>Key Vault: Configure access via portal</a:t>
             </a:r>
           </a:p>
         </p:txBody>
@@ -13883,7 +14323,7 @@
           <a:p>
             <a:r>
               <a:rPr lang="en-US" dirty="0"/>
-              <a:t>Key Vault: Configure access (cont.)</a:t>
+              <a:t>Key Vault: Configure access via portal (cont.)</a:t>
             </a:r>
           </a:p>
         </p:txBody>
@@ -14271,6 +14711,800 @@
 </file>
 
 <file path=ppt/slides/slide17.xml><?xml version="1.0" encoding="utf-8"?>
+<p:sld xmlns:a="http://schemas.openxmlformats.org/drawingml/2006/main" xmlns:r="http://schemas.openxmlformats.org/officeDocument/2006/relationships" xmlns:p="http://schemas.openxmlformats.org/presentationml/2006/main">
+  <p:cSld>
+    <p:spTree>
+      <p:nvGrpSpPr>
+        <p:cNvPr id="1" name=""/>
+        <p:cNvGrpSpPr/>
+        <p:nvPr/>
+      </p:nvGrpSpPr>
+      <p:grpSpPr>
+        <a:xfrm>
+          <a:off x="0" y="0"/>
+          <a:ext cx="0" cy="0"/>
+          <a:chOff x="0" y="0"/>
+          <a:chExt cx="0" cy="0"/>
+        </a:xfrm>
+      </p:grpSpPr>
+      <p:sp>
+        <p:nvSpPr>
+          <p:cNvPr id="2" name="Title 1">
+            <a:extLst>
+              <a:ext uri="{FF2B5EF4-FFF2-40B4-BE49-F238E27FC236}">
+                <a16:creationId xmlns:a16="http://schemas.microsoft.com/office/drawing/2014/main" id="{E4AF77D7-080D-49CB-9A0B-C43A678A607B}"/>
+              </a:ext>
+            </a:extLst>
+          </p:cNvPr>
+          <p:cNvSpPr>
+            <a:spLocks noGrp="1"/>
+          </p:cNvSpPr>
+          <p:nvPr>
+            <p:ph type="title"/>
+          </p:nvPr>
+        </p:nvSpPr>
+        <p:spPr/>
+        <p:txBody>
+          <a:bodyPr/>
+          <a:lstStyle/>
+          <a:p>
+            <a:r>
+              <a:rPr lang="en-US" dirty="0"/>
+              <a:t>Key Vault: Configure access via CLI</a:t>
+            </a:r>
+          </a:p>
+        </p:txBody>
+      </p:sp>
+      <p:sp>
+        <p:nvSpPr>
+          <p:cNvPr id="3" name="Content Placeholder 2">
+            <a:extLst>
+              <a:ext uri="{FF2B5EF4-FFF2-40B4-BE49-F238E27FC236}">
+                <a16:creationId xmlns:a16="http://schemas.microsoft.com/office/drawing/2014/main" id="{90573141-237E-41E8-BDC1-6D8AA08DD4C6}"/>
+              </a:ext>
+            </a:extLst>
+          </p:cNvPr>
+          <p:cNvSpPr>
+            <a:spLocks noGrp="1"/>
+          </p:cNvSpPr>
+          <p:nvPr>
+            <p:ph idx="1"/>
+          </p:nvPr>
+        </p:nvSpPr>
+        <p:spPr/>
+        <p:txBody>
+          <a:bodyPr>
+            <a:normAutofit lnSpcReduction="10000"/>
+          </a:bodyPr>
+          <a:lstStyle/>
+          <a:p>
+            <a:pPr marL="0" indent="0">
+              <a:buNone/>
+            </a:pPr>
+            <a:r>
+              <a:rPr lang="en-US" sz="2600" b="1" dirty="0">
+                <a:solidFill>
+                  <a:schemeClr val="accent6"/>
+                </a:solidFill>
+                <a:latin typeface="Courier New" panose="02070309020205020404" pitchFamily="49" charset="0"/>
+                <a:cs typeface="Courier New" panose="02070309020205020404" pitchFamily="49" charset="0"/>
+              </a:rPr>
+              <a:t># Enable Managed Service Identity on web app</a:t>
+            </a:r>
+          </a:p>
+          <a:p>
+            <a:pPr marL="0" indent="0">
+              <a:buNone/>
+            </a:pPr>
+            <a:r>
+              <a:rPr lang="en-US" sz="2600" dirty="0" err="1">
+                <a:latin typeface="Courier New" panose="02070309020205020404" pitchFamily="49" charset="0"/>
+                <a:cs typeface="Courier New" panose="02070309020205020404" pitchFamily="49" charset="0"/>
+              </a:rPr>
+              <a:t>webAppPrincipalId</a:t>
+            </a:r>
+            <a:r>
+              <a:rPr lang="en-US" sz="2600" dirty="0">
+                <a:latin typeface="Courier New" panose="02070309020205020404" pitchFamily="49" charset="0"/>
+                <a:cs typeface="Courier New" panose="02070309020205020404" pitchFamily="49" charset="0"/>
+              </a:rPr>
+              <a:t>=$(</a:t>
+            </a:r>
+            <a:r>
+              <a:rPr lang="en-US" sz="2600" dirty="0" err="1">
+                <a:solidFill>
+                  <a:schemeClr val="accent1">
+                    <a:lumMod val="40000"/>
+                    <a:lumOff val="60000"/>
+                  </a:schemeClr>
+                </a:solidFill>
+                <a:latin typeface="Courier New" panose="02070309020205020404" pitchFamily="49" charset="0"/>
+                <a:cs typeface="Courier New" panose="02070309020205020404" pitchFamily="49" charset="0"/>
+              </a:rPr>
+              <a:t>az</a:t>
+            </a:r>
+            <a:r>
+              <a:rPr lang="en-US" sz="2600" dirty="0">
+                <a:solidFill>
+                  <a:schemeClr val="accent1">
+                    <a:lumMod val="40000"/>
+                    <a:lumOff val="60000"/>
+                  </a:schemeClr>
+                </a:solidFill>
+                <a:latin typeface="Courier New" panose="02070309020205020404" pitchFamily="49" charset="0"/>
+                <a:cs typeface="Courier New" panose="02070309020205020404" pitchFamily="49" charset="0"/>
+              </a:rPr>
+              <a:t> </a:t>
+            </a:r>
+            <a:r>
+              <a:rPr lang="en-US" sz="2600" dirty="0" err="1">
+                <a:solidFill>
+                  <a:schemeClr val="accent1">
+                    <a:lumMod val="40000"/>
+                    <a:lumOff val="60000"/>
+                  </a:schemeClr>
+                </a:solidFill>
+                <a:latin typeface="Courier New" panose="02070309020205020404" pitchFamily="49" charset="0"/>
+                <a:cs typeface="Courier New" panose="02070309020205020404" pitchFamily="49" charset="0"/>
+              </a:rPr>
+              <a:t>webapp</a:t>
+            </a:r>
+            <a:r>
+              <a:rPr lang="en-US" sz="2600" dirty="0">
+                <a:solidFill>
+                  <a:schemeClr val="accent1">
+                    <a:lumMod val="40000"/>
+                    <a:lumOff val="60000"/>
+                  </a:schemeClr>
+                </a:solidFill>
+                <a:latin typeface="Courier New" panose="02070309020205020404" pitchFamily="49" charset="0"/>
+                <a:cs typeface="Courier New" panose="02070309020205020404" pitchFamily="49" charset="0"/>
+              </a:rPr>
+              <a:t> identity assign</a:t>
+            </a:r>
+            <a:r>
+              <a:rPr lang="en-US" sz="2600" dirty="0">
+                <a:latin typeface="Courier New" panose="02070309020205020404" pitchFamily="49" charset="0"/>
+                <a:cs typeface="Courier New" panose="02070309020205020404" pitchFamily="49" charset="0"/>
+              </a:rPr>
+              <a:t> \</a:t>
+            </a:r>
+          </a:p>
+          <a:p>
+            <a:pPr marL="0" indent="0">
+              <a:buNone/>
+            </a:pPr>
+            <a:r>
+              <a:rPr lang="en-US" sz="2600" dirty="0">
+                <a:latin typeface="Courier New" panose="02070309020205020404" pitchFamily="49" charset="0"/>
+                <a:cs typeface="Courier New" panose="02070309020205020404" pitchFamily="49" charset="0"/>
+              </a:rPr>
+              <a:t>		--query </a:t>
+            </a:r>
+            <a:r>
+              <a:rPr lang="en-US" sz="2600" dirty="0" err="1">
+                <a:solidFill>
+                  <a:schemeClr val="accent4"/>
+                </a:solidFill>
+                <a:latin typeface="Courier New" panose="02070309020205020404" pitchFamily="49" charset="0"/>
+                <a:cs typeface="Courier New" panose="02070309020205020404" pitchFamily="49" charset="0"/>
+              </a:rPr>
+              <a:t>principalId</a:t>
+            </a:r>
+            <a:r>
+              <a:rPr lang="en-US" sz="2600" dirty="0">
+                <a:latin typeface="Courier New" panose="02070309020205020404" pitchFamily="49" charset="0"/>
+                <a:cs typeface="Courier New" panose="02070309020205020404" pitchFamily="49" charset="0"/>
+              </a:rPr>
+              <a:t> \</a:t>
+            </a:r>
+          </a:p>
+          <a:p>
+            <a:pPr marL="0" indent="0">
+              <a:buNone/>
+            </a:pPr>
+            <a:r>
+              <a:rPr lang="en-US" sz="2600" dirty="0">
+                <a:latin typeface="Courier New" panose="02070309020205020404" pitchFamily="49" charset="0"/>
+                <a:cs typeface="Courier New" panose="02070309020205020404" pitchFamily="49" charset="0"/>
+              </a:rPr>
+              <a:t>		--output </a:t>
+            </a:r>
+            <a:r>
+              <a:rPr lang="en-US" sz="2600" dirty="0" err="1">
+                <a:solidFill>
+                  <a:schemeClr val="accent4"/>
+                </a:solidFill>
+                <a:latin typeface="Courier New" panose="02070309020205020404" pitchFamily="49" charset="0"/>
+                <a:cs typeface="Courier New" panose="02070309020205020404" pitchFamily="49" charset="0"/>
+              </a:rPr>
+              <a:t>tsv</a:t>
+            </a:r>
+            <a:r>
+              <a:rPr lang="en-US" sz="2600" dirty="0">
+                <a:latin typeface="Courier New" panose="02070309020205020404" pitchFamily="49" charset="0"/>
+                <a:cs typeface="Courier New" panose="02070309020205020404" pitchFamily="49" charset="0"/>
+              </a:rPr>
+              <a:t>)</a:t>
+            </a:r>
+          </a:p>
+          <a:p>
+            <a:pPr marL="0" indent="0">
+              <a:buNone/>
+            </a:pPr>
+            <a:endParaRPr lang="en-US" sz="2600" b="1" dirty="0">
+              <a:latin typeface="Courier New" panose="02070309020205020404" pitchFamily="49" charset="0"/>
+              <a:cs typeface="Courier New" panose="02070309020205020404" pitchFamily="49" charset="0"/>
+            </a:endParaRPr>
+          </a:p>
+          <a:p>
+            <a:pPr marL="0" indent="0">
+              <a:buNone/>
+            </a:pPr>
+            <a:r>
+              <a:rPr lang="en-US" sz="2600" dirty="0" err="1">
+                <a:solidFill>
+                  <a:schemeClr val="accent1">
+                    <a:lumMod val="40000"/>
+                    <a:lumOff val="60000"/>
+                  </a:schemeClr>
+                </a:solidFill>
+                <a:latin typeface="Courier New" panose="02070309020205020404" pitchFamily="49" charset="0"/>
+                <a:cs typeface="Courier New" panose="02070309020205020404" pitchFamily="49" charset="0"/>
+              </a:rPr>
+              <a:t>az</a:t>
+            </a:r>
+            <a:r>
+              <a:rPr lang="en-US" sz="2600" dirty="0">
+                <a:solidFill>
+                  <a:schemeClr val="accent1">
+                    <a:lumMod val="40000"/>
+                    <a:lumOff val="60000"/>
+                  </a:schemeClr>
+                </a:solidFill>
+                <a:latin typeface="Courier New" panose="02070309020205020404" pitchFamily="49" charset="0"/>
+                <a:cs typeface="Courier New" panose="02070309020205020404" pitchFamily="49" charset="0"/>
+              </a:rPr>
+              <a:t> </a:t>
+            </a:r>
+            <a:r>
+              <a:rPr lang="en-US" sz="2600" dirty="0" err="1">
+                <a:solidFill>
+                  <a:schemeClr val="accent1">
+                    <a:lumMod val="40000"/>
+                    <a:lumOff val="60000"/>
+                  </a:schemeClr>
+                </a:solidFill>
+                <a:latin typeface="Courier New" panose="02070309020205020404" pitchFamily="49" charset="0"/>
+                <a:cs typeface="Courier New" panose="02070309020205020404" pitchFamily="49" charset="0"/>
+              </a:rPr>
+              <a:t>keyvault</a:t>
+            </a:r>
+            <a:r>
+              <a:rPr lang="en-US" sz="2600" dirty="0">
+                <a:solidFill>
+                  <a:schemeClr val="accent1">
+                    <a:lumMod val="40000"/>
+                    <a:lumOff val="60000"/>
+                  </a:schemeClr>
+                </a:solidFill>
+                <a:latin typeface="Courier New" panose="02070309020205020404" pitchFamily="49" charset="0"/>
+                <a:cs typeface="Courier New" panose="02070309020205020404" pitchFamily="49" charset="0"/>
+              </a:rPr>
+              <a:t> set-policy</a:t>
+            </a:r>
+            <a:r>
+              <a:rPr lang="en-US" sz="2600" dirty="0">
+                <a:latin typeface="Courier New" panose="02070309020205020404" pitchFamily="49" charset="0"/>
+                <a:cs typeface="Courier New" panose="02070309020205020404" pitchFamily="49" charset="0"/>
+              </a:rPr>
+              <a:t> --name </a:t>
+            </a:r>
+            <a:r>
+              <a:rPr lang="en-US" dirty="0">
+                <a:solidFill>
+                  <a:schemeClr val="accent4"/>
+                </a:solidFill>
+                <a:latin typeface="Courier New" panose="02070309020205020404" pitchFamily="49" charset="0"/>
+                <a:cs typeface="Courier New" panose="02070309020205020404" pitchFamily="49" charset="0"/>
+              </a:rPr>
+              <a:t>`</a:t>
+            </a:r>
+            <a:r>
+              <a:rPr lang="en-US" dirty="0" err="1">
+                <a:solidFill>
+                  <a:schemeClr val="accent4"/>
+                </a:solidFill>
+                <a:latin typeface="Courier New" panose="02070309020205020404" pitchFamily="49" charset="0"/>
+                <a:cs typeface="Courier New" panose="02070309020205020404" pitchFamily="49" charset="0"/>
+              </a:rPr>
+              <a:t>MoviesVault</a:t>
+            </a:r>
+            <a:r>
+              <a:rPr lang="en-US" dirty="0">
+                <a:solidFill>
+                  <a:schemeClr val="accent4"/>
+                </a:solidFill>
+                <a:latin typeface="Courier New" panose="02070309020205020404" pitchFamily="49" charset="0"/>
+                <a:cs typeface="Courier New" panose="02070309020205020404" pitchFamily="49" charset="0"/>
+              </a:rPr>
+              <a:t>`</a:t>
+            </a:r>
+            <a:r>
+              <a:rPr lang="en-US" sz="2600" dirty="0">
+                <a:latin typeface="Courier New" panose="02070309020205020404" pitchFamily="49" charset="0"/>
+                <a:cs typeface="Courier New" panose="02070309020205020404" pitchFamily="49" charset="0"/>
+              </a:rPr>
+              <a:t> \</a:t>
+            </a:r>
+          </a:p>
+          <a:p>
+            <a:pPr marL="0" indent="0">
+              <a:buNone/>
+            </a:pPr>
+            <a:r>
+              <a:rPr lang="en-US" sz="2600" b="1" dirty="0">
+                <a:latin typeface="Courier New" panose="02070309020205020404" pitchFamily="49" charset="0"/>
+                <a:cs typeface="Courier New" panose="02070309020205020404" pitchFamily="49" charset="0"/>
+              </a:rPr>
+              <a:t>		</a:t>
+            </a:r>
+            <a:r>
+              <a:rPr lang="en-US" sz="2600" dirty="0">
+                <a:latin typeface="Courier New" panose="02070309020205020404" pitchFamily="49" charset="0"/>
+                <a:cs typeface="Courier New" panose="02070309020205020404" pitchFamily="49" charset="0"/>
+              </a:rPr>
+              <a:t>--object-id </a:t>
+            </a:r>
+            <a:r>
+              <a:rPr lang="en-US" sz="2600" dirty="0">
+                <a:solidFill>
+                  <a:schemeClr val="accent4"/>
+                </a:solidFill>
+                <a:latin typeface="Courier New" panose="02070309020205020404" pitchFamily="49" charset="0"/>
+                <a:cs typeface="Courier New" panose="02070309020205020404" pitchFamily="49" charset="0"/>
+              </a:rPr>
+              <a:t>$</a:t>
+            </a:r>
+            <a:r>
+              <a:rPr lang="en-US" sz="2600" dirty="0" err="1">
+                <a:solidFill>
+                  <a:schemeClr val="accent4"/>
+                </a:solidFill>
+                <a:latin typeface="Courier New" panose="02070309020205020404" pitchFamily="49" charset="0"/>
+                <a:cs typeface="Courier New" panose="02070309020205020404" pitchFamily="49" charset="0"/>
+              </a:rPr>
+              <a:t>webAppPrincipalId</a:t>
+            </a:r>
+            <a:r>
+              <a:rPr lang="en-US" sz="2600" dirty="0">
+                <a:latin typeface="Courier New" panose="02070309020205020404" pitchFamily="49" charset="0"/>
+                <a:cs typeface="Courier New" panose="02070309020205020404" pitchFamily="49" charset="0"/>
+              </a:rPr>
+              <a:t> \</a:t>
+            </a:r>
+          </a:p>
+          <a:p>
+            <a:pPr marL="0" indent="0">
+              <a:buNone/>
+            </a:pPr>
+            <a:r>
+              <a:rPr lang="en-US" sz="2600" b="1" dirty="0">
+                <a:latin typeface="Courier New" panose="02070309020205020404" pitchFamily="49" charset="0"/>
+                <a:cs typeface="Courier New" panose="02070309020205020404" pitchFamily="49" charset="0"/>
+              </a:rPr>
+              <a:t>		</a:t>
+            </a:r>
+            <a:r>
+              <a:rPr lang="en-US" sz="2600" dirty="0">
+                <a:latin typeface="Courier New" panose="02070309020205020404" pitchFamily="49" charset="0"/>
+                <a:cs typeface="Courier New" panose="02070309020205020404" pitchFamily="49" charset="0"/>
+              </a:rPr>
+              <a:t>--secret-permissions </a:t>
+            </a:r>
+            <a:r>
+              <a:rPr lang="en-US" sz="2600" dirty="0">
+                <a:solidFill>
+                  <a:schemeClr val="accent4"/>
+                </a:solidFill>
+                <a:latin typeface="Courier New" panose="02070309020205020404" pitchFamily="49" charset="0"/>
+                <a:cs typeface="Courier New" panose="02070309020205020404" pitchFamily="49" charset="0"/>
+              </a:rPr>
+              <a:t>get list</a:t>
+            </a:r>
+          </a:p>
+          <a:p>
+            <a:pPr marL="0" indent="0">
+              <a:buNone/>
+            </a:pPr>
+            <a:r>
+              <a:rPr lang="en-US" dirty="0"/>
+              <a:t> </a:t>
+            </a:r>
+          </a:p>
+        </p:txBody>
+      </p:sp>
+    </p:spTree>
+    <p:extLst>
+      <p:ext uri="{BB962C8B-B14F-4D97-AF65-F5344CB8AC3E}">
+        <p14:creationId xmlns:p14="http://schemas.microsoft.com/office/powerpoint/2010/main" val="1081566271"/>
+      </p:ext>
+    </p:extLst>
+  </p:cSld>
+  <p:clrMapOvr>
+    <a:masterClrMapping/>
+  </p:clrMapOvr>
+  <p:timing>
+    <p:tnLst>
+      <p:par>
+        <p:cTn id="1" dur="indefinite" restart="never" nodeType="tmRoot">
+          <p:childTnLst>
+            <p:seq concurrent="1" nextAc="seek">
+              <p:cTn id="2" dur="indefinite" nodeType="mainSeq">
+                <p:childTnLst>
+                  <p:par>
+                    <p:cTn id="3" fill="hold">
+                      <p:stCondLst>
+                        <p:cond delay="indefinite"/>
+                      </p:stCondLst>
+                      <p:childTnLst>
+                        <p:par>
+                          <p:cTn id="4" fill="hold">
+                            <p:stCondLst>
+                              <p:cond delay="0"/>
+                            </p:stCondLst>
+                            <p:childTnLst>
+                              <p:par>
+                                <p:cTn id="5" presetID="10" presetClass="entr" presetSubtype="0" fill="hold" nodeType="clickEffect">
+                                  <p:stCondLst>
+                                    <p:cond delay="0"/>
+                                  </p:stCondLst>
+                                  <p:childTnLst>
+                                    <p:set>
+                                      <p:cBhvr>
+                                        <p:cTn id="6" dur="1" fill="hold">
+                                          <p:stCondLst>
+                                            <p:cond delay="0"/>
+                                          </p:stCondLst>
+                                        </p:cTn>
+                                        <p:tgtEl>
+                                          <p:spTgt spid="3">
+                                            <p:txEl>
+                                              <p:pRg st="0" end="0"/>
+                                            </p:txEl>
+                                          </p:spTgt>
+                                        </p:tgtEl>
+                                        <p:attrNameLst>
+                                          <p:attrName>style.visibility</p:attrName>
+                                        </p:attrNameLst>
+                                      </p:cBhvr>
+                                      <p:to>
+                                        <p:strVal val="visible"/>
+                                      </p:to>
+                                    </p:set>
+                                    <p:animEffect transition="in" filter="fade">
+                                      <p:cBhvr>
+                                        <p:cTn id="7" dur="500"/>
+                                        <p:tgtEl>
+                                          <p:spTgt spid="3">
+                                            <p:txEl>
+                                              <p:pRg st="0" end="0"/>
+                                            </p:txEl>
+                                          </p:spTgt>
+                                        </p:tgtEl>
+                                      </p:cBhvr>
+                                    </p:animEffect>
+                                  </p:childTnLst>
+                                </p:cTn>
+                              </p:par>
+                              <p:par>
+                                <p:cTn id="8" presetID="10" presetClass="entr" presetSubtype="0" fill="hold" nodeType="withEffect">
+                                  <p:stCondLst>
+                                    <p:cond delay="0"/>
+                                  </p:stCondLst>
+                                  <p:childTnLst>
+                                    <p:set>
+                                      <p:cBhvr>
+                                        <p:cTn id="9" dur="1" fill="hold">
+                                          <p:stCondLst>
+                                            <p:cond delay="0"/>
+                                          </p:stCondLst>
+                                        </p:cTn>
+                                        <p:tgtEl>
+                                          <p:spTgt spid="3">
+                                            <p:txEl>
+                                              <p:pRg st="1" end="1"/>
+                                            </p:txEl>
+                                          </p:spTgt>
+                                        </p:tgtEl>
+                                        <p:attrNameLst>
+                                          <p:attrName>style.visibility</p:attrName>
+                                        </p:attrNameLst>
+                                      </p:cBhvr>
+                                      <p:to>
+                                        <p:strVal val="visible"/>
+                                      </p:to>
+                                    </p:set>
+                                    <p:animEffect transition="in" filter="fade">
+                                      <p:cBhvr>
+                                        <p:cTn id="10" dur="500"/>
+                                        <p:tgtEl>
+                                          <p:spTgt spid="3">
+                                            <p:txEl>
+                                              <p:pRg st="1" end="1"/>
+                                            </p:txEl>
+                                          </p:spTgt>
+                                        </p:tgtEl>
+                                      </p:cBhvr>
+                                    </p:animEffect>
+                                  </p:childTnLst>
+                                </p:cTn>
+                              </p:par>
+                              <p:par>
+                                <p:cTn id="11" presetID="10" presetClass="entr" presetSubtype="0" fill="hold" nodeType="withEffect">
+                                  <p:stCondLst>
+                                    <p:cond delay="0"/>
+                                  </p:stCondLst>
+                                  <p:childTnLst>
+                                    <p:set>
+                                      <p:cBhvr>
+                                        <p:cTn id="12" dur="1" fill="hold">
+                                          <p:stCondLst>
+                                            <p:cond delay="0"/>
+                                          </p:stCondLst>
+                                        </p:cTn>
+                                        <p:tgtEl>
+                                          <p:spTgt spid="3">
+                                            <p:txEl>
+                                              <p:pRg st="2" end="2"/>
+                                            </p:txEl>
+                                          </p:spTgt>
+                                        </p:tgtEl>
+                                        <p:attrNameLst>
+                                          <p:attrName>style.visibility</p:attrName>
+                                        </p:attrNameLst>
+                                      </p:cBhvr>
+                                      <p:to>
+                                        <p:strVal val="visible"/>
+                                      </p:to>
+                                    </p:set>
+                                    <p:animEffect transition="in" filter="fade">
+                                      <p:cBhvr>
+                                        <p:cTn id="13" dur="500"/>
+                                        <p:tgtEl>
+                                          <p:spTgt spid="3">
+                                            <p:txEl>
+                                              <p:pRg st="2" end="2"/>
+                                            </p:txEl>
+                                          </p:spTgt>
+                                        </p:tgtEl>
+                                      </p:cBhvr>
+                                    </p:animEffect>
+                                  </p:childTnLst>
+                                </p:cTn>
+                              </p:par>
+                              <p:par>
+                                <p:cTn id="14" presetID="10" presetClass="entr" presetSubtype="0" fill="hold" nodeType="withEffect">
+                                  <p:stCondLst>
+                                    <p:cond delay="0"/>
+                                  </p:stCondLst>
+                                  <p:childTnLst>
+                                    <p:set>
+                                      <p:cBhvr>
+                                        <p:cTn id="15" dur="1" fill="hold">
+                                          <p:stCondLst>
+                                            <p:cond delay="0"/>
+                                          </p:stCondLst>
+                                        </p:cTn>
+                                        <p:tgtEl>
+                                          <p:spTgt spid="3">
+                                            <p:txEl>
+                                              <p:pRg st="3" end="3"/>
+                                            </p:txEl>
+                                          </p:spTgt>
+                                        </p:tgtEl>
+                                        <p:attrNameLst>
+                                          <p:attrName>style.visibility</p:attrName>
+                                        </p:attrNameLst>
+                                      </p:cBhvr>
+                                      <p:to>
+                                        <p:strVal val="visible"/>
+                                      </p:to>
+                                    </p:set>
+                                    <p:animEffect transition="in" filter="fade">
+                                      <p:cBhvr>
+                                        <p:cTn id="16" dur="500"/>
+                                        <p:tgtEl>
+                                          <p:spTgt spid="3">
+                                            <p:txEl>
+                                              <p:pRg st="3" end="3"/>
+                                            </p:txEl>
+                                          </p:spTgt>
+                                        </p:tgtEl>
+                                      </p:cBhvr>
+                                    </p:animEffect>
+                                  </p:childTnLst>
+                                </p:cTn>
+                              </p:par>
+                            </p:childTnLst>
+                          </p:cTn>
+                        </p:par>
+                      </p:childTnLst>
+                    </p:cTn>
+                  </p:par>
+                  <p:par>
+                    <p:cTn id="17" fill="hold">
+                      <p:stCondLst>
+                        <p:cond delay="indefinite"/>
+                      </p:stCondLst>
+                      <p:childTnLst>
+                        <p:par>
+                          <p:cTn id="18" fill="hold">
+                            <p:stCondLst>
+                              <p:cond delay="0"/>
+                            </p:stCondLst>
+                            <p:childTnLst>
+                              <p:par>
+                                <p:cTn id="19" presetID="10" presetClass="entr" presetSubtype="0" fill="hold" nodeType="clickEffect">
+                                  <p:stCondLst>
+                                    <p:cond delay="0"/>
+                                  </p:stCondLst>
+                                  <p:childTnLst>
+                                    <p:set>
+                                      <p:cBhvr>
+                                        <p:cTn id="20" dur="1" fill="hold">
+                                          <p:stCondLst>
+                                            <p:cond delay="0"/>
+                                          </p:stCondLst>
+                                        </p:cTn>
+                                        <p:tgtEl>
+                                          <p:spTgt spid="3">
+                                            <p:txEl>
+                                              <p:pRg st="5" end="5"/>
+                                            </p:txEl>
+                                          </p:spTgt>
+                                        </p:tgtEl>
+                                        <p:attrNameLst>
+                                          <p:attrName>style.visibility</p:attrName>
+                                        </p:attrNameLst>
+                                      </p:cBhvr>
+                                      <p:to>
+                                        <p:strVal val="visible"/>
+                                      </p:to>
+                                    </p:set>
+                                    <p:animEffect transition="in" filter="fade">
+                                      <p:cBhvr>
+                                        <p:cTn id="21" dur="500"/>
+                                        <p:tgtEl>
+                                          <p:spTgt spid="3">
+                                            <p:txEl>
+                                              <p:pRg st="5" end="5"/>
+                                            </p:txEl>
+                                          </p:spTgt>
+                                        </p:tgtEl>
+                                      </p:cBhvr>
+                                    </p:animEffect>
+                                  </p:childTnLst>
+                                </p:cTn>
+                              </p:par>
+                              <p:par>
+                                <p:cTn id="22" presetID="10" presetClass="entr" presetSubtype="0" fill="hold" nodeType="withEffect">
+                                  <p:stCondLst>
+                                    <p:cond delay="0"/>
+                                  </p:stCondLst>
+                                  <p:childTnLst>
+                                    <p:set>
+                                      <p:cBhvr>
+                                        <p:cTn id="23" dur="1" fill="hold">
+                                          <p:stCondLst>
+                                            <p:cond delay="0"/>
+                                          </p:stCondLst>
+                                        </p:cTn>
+                                        <p:tgtEl>
+                                          <p:spTgt spid="3">
+                                            <p:txEl>
+                                              <p:pRg st="6" end="6"/>
+                                            </p:txEl>
+                                          </p:spTgt>
+                                        </p:tgtEl>
+                                        <p:attrNameLst>
+                                          <p:attrName>style.visibility</p:attrName>
+                                        </p:attrNameLst>
+                                      </p:cBhvr>
+                                      <p:to>
+                                        <p:strVal val="visible"/>
+                                      </p:to>
+                                    </p:set>
+                                    <p:animEffect transition="in" filter="fade">
+                                      <p:cBhvr>
+                                        <p:cTn id="24" dur="500"/>
+                                        <p:tgtEl>
+                                          <p:spTgt spid="3">
+                                            <p:txEl>
+                                              <p:pRg st="6" end="6"/>
+                                            </p:txEl>
+                                          </p:spTgt>
+                                        </p:tgtEl>
+                                      </p:cBhvr>
+                                    </p:animEffect>
+                                  </p:childTnLst>
+                                </p:cTn>
+                              </p:par>
+                              <p:par>
+                                <p:cTn id="25" presetID="10" presetClass="entr" presetSubtype="0" fill="hold" nodeType="withEffect">
+                                  <p:stCondLst>
+                                    <p:cond delay="0"/>
+                                  </p:stCondLst>
+                                  <p:childTnLst>
+                                    <p:set>
+                                      <p:cBhvr>
+                                        <p:cTn id="26" dur="1" fill="hold">
+                                          <p:stCondLst>
+                                            <p:cond delay="0"/>
+                                          </p:stCondLst>
+                                        </p:cTn>
+                                        <p:tgtEl>
+                                          <p:spTgt spid="3">
+                                            <p:txEl>
+                                              <p:pRg st="7" end="7"/>
+                                            </p:txEl>
+                                          </p:spTgt>
+                                        </p:tgtEl>
+                                        <p:attrNameLst>
+                                          <p:attrName>style.visibility</p:attrName>
+                                        </p:attrNameLst>
+                                      </p:cBhvr>
+                                      <p:to>
+                                        <p:strVal val="visible"/>
+                                      </p:to>
+                                    </p:set>
+                                    <p:animEffect transition="in" filter="fade">
+                                      <p:cBhvr>
+                                        <p:cTn id="27" dur="500"/>
+                                        <p:tgtEl>
+                                          <p:spTgt spid="3">
+                                            <p:txEl>
+                                              <p:pRg st="7" end="7"/>
+                                            </p:txEl>
+                                          </p:spTgt>
+                                        </p:tgtEl>
+                                      </p:cBhvr>
+                                    </p:animEffect>
+                                  </p:childTnLst>
+                                </p:cTn>
+                              </p:par>
+                            </p:childTnLst>
+                          </p:cTn>
+                        </p:par>
+                      </p:childTnLst>
+                    </p:cTn>
+                  </p:par>
+                </p:childTnLst>
+              </p:cTn>
+              <p:prevCondLst>
+                <p:cond evt="onPrev" delay="0">
+                  <p:tgtEl>
+                    <p:sldTgt/>
+                  </p:tgtEl>
+                </p:cond>
+              </p:prevCondLst>
+              <p:nextCondLst>
+                <p:cond evt="onNext" delay="0">
+                  <p:tgtEl>
+                    <p:sldTgt/>
+                  </p:tgtEl>
+                </p:cond>
+              </p:nextCondLst>
+            </p:seq>
+          </p:childTnLst>
+        </p:cTn>
+      </p:par>
+    </p:tnLst>
+  </p:timing>
+</p:sld>
+</file>
+
+<file path=ppt/slides/slide18.xml><?xml version="1.0" encoding="utf-8"?>
 <p:sld xmlns:a="http://schemas.openxmlformats.org/drawingml/2006/main" xmlns:r="http://schemas.openxmlformats.org/officeDocument/2006/relationships" xmlns:p="http://schemas.openxmlformats.org/presentationml/2006/main">
   <p:cSld>
     <p:bg>
@@ -14856,7 +16090,7 @@
 </p:sld>
 </file>
 
-<file path=ppt/slides/slide18.xml><?xml version="1.0" encoding="utf-8"?>
+<file path=ppt/slides/slide19.xml><?xml version="1.0" encoding="utf-8"?>
 <p:sld xmlns:a="http://schemas.openxmlformats.org/drawingml/2006/main" xmlns:r="http://schemas.openxmlformats.org/officeDocument/2006/relationships" xmlns:p="http://schemas.openxmlformats.org/presentationml/2006/main">
   <p:cSld>
     <p:bg>
@@ -15029,338 +16263,6 @@
     <p:extLst>
       <p:ext uri="{BB962C8B-B14F-4D97-AF65-F5344CB8AC3E}">
         <p14:creationId xmlns:p14="http://schemas.microsoft.com/office/powerpoint/2010/main" val="2460411575"/>
-      </p:ext>
-    </p:extLst>
-  </p:cSld>
-  <p:clrMapOvr>
-    <a:masterClrMapping/>
-  </p:clrMapOvr>
-</p:sld>
-</file>
-
-<file path=ppt/slides/slide19.xml><?xml version="1.0" encoding="utf-8"?>
-<p:sld xmlns:a="http://schemas.openxmlformats.org/drawingml/2006/main" xmlns:r="http://schemas.openxmlformats.org/officeDocument/2006/relationships" xmlns:p="http://schemas.openxmlformats.org/presentationml/2006/main">
-  <p:cSld>
-    <p:bg>
-      <p:bgPr>
-        <a:solidFill>
-          <a:srgbClr val="505050"/>
-        </a:solidFill>
-        <a:effectLst/>
-      </p:bgPr>
-    </p:bg>
-    <p:spTree>
-      <p:nvGrpSpPr>
-        <p:cNvPr id="1" name=""/>
-        <p:cNvGrpSpPr/>
-        <p:nvPr/>
-      </p:nvGrpSpPr>
-      <p:grpSpPr>
-        <a:xfrm>
-          <a:off x="0" y="0"/>
-          <a:ext cx="0" cy="0"/>
-          <a:chOff x="0" y="0"/>
-          <a:chExt cx="0" cy="0"/>
-        </a:xfrm>
-      </p:grpSpPr>
-      <p:sp>
-        <p:nvSpPr>
-          <p:cNvPr id="2" name="Title 1"/>
-          <p:cNvSpPr>
-            <a:spLocks noGrp="1"/>
-          </p:cNvSpPr>
-          <p:nvPr>
-            <p:ph type="title"/>
-          </p:nvPr>
-        </p:nvSpPr>
-        <p:spPr/>
-        <p:txBody>
-          <a:bodyPr/>
-          <a:lstStyle/>
-          <a:p>
-            <a:r>
-              <a:rPr lang="en-US" dirty="0"/>
-              <a:t>Resources</a:t>
-            </a:r>
-          </a:p>
-        </p:txBody>
-      </p:sp>
-      <p:sp>
-        <p:nvSpPr>
-          <p:cNvPr id="3" name="Content Placeholder 2"/>
-          <p:cNvSpPr>
-            <a:spLocks noGrp="1"/>
-          </p:cNvSpPr>
-          <p:nvPr>
-            <p:ph idx="1"/>
-          </p:nvPr>
-        </p:nvSpPr>
-        <p:spPr>
-          <a:xfrm>
-            <a:off x="838199" y="1825625"/>
-            <a:ext cx="10411047" cy="4351338"/>
-          </a:xfrm>
-        </p:spPr>
-        <p:txBody>
-          <a:bodyPr>
-            <a:normAutofit fontScale="92500"/>
-          </a:bodyPr>
-          <a:lstStyle/>
-          <a:p>
-            <a:pPr marL="0" indent="0">
-              <a:buNone/>
-            </a:pPr>
-            <a:r>
-              <a:rPr lang="en-US" b="1" dirty="0"/>
-              <a:t>Docs 									</a:t>
-            </a:r>
-            <a:r>
-              <a:rPr lang="en-US" dirty="0"/>
-              <a:t>@</a:t>
-            </a:r>
-            <a:r>
-              <a:rPr lang="en-US" dirty="0" err="1"/>
-              <a:t>Scott_Addie</a:t>
-            </a:r>
-            <a:endParaRPr lang="en-US" dirty="0">
-              <a:hlinkClick r:id="rId3"/>
-            </a:endParaRPr>
-          </a:p>
-          <a:p>
-            <a:pPr marL="0" indent="0">
-              <a:buNone/>
-            </a:pPr>
-            <a:r>
-              <a:rPr lang="en-US" dirty="0">
-                <a:hlinkClick r:id="rId3"/>
-              </a:rPr>
-              <a:t>aka.ms/dotnet-secret-mgr</a:t>
-            </a:r>
-          </a:p>
-          <a:p>
-            <a:pPr marL="0" indent="0">
-              <a:buNone/>
-            </a:pPr>
-            <a:r>
-              <a:rPr lang="en-US" dirty="0">
-                <a:hlinkClick r:id="rId4"/>
-              </a:rPr>
-              <a:t>aka.ms/</a:t>
-            </a:r>
-            <a:r>
-              <a:rPr lang="en-US" dirty="0" err="1">
-                <a:hlinkClick r:id="rId4"/>
-              </a:rPr>
-              <a:t>az</a:t>
-            </a:r>
-            <a:r>
-              <a:rPr lang="en-US" dirty="0">
-                <a:hlinkClick r:id="rId4"/>
-              </a:rPr>
-              <a:t>-key-vault</a:t>
-            </a:r>
-            <a:endParaRPr lang="en-US" dirty="0"/>
-          </a:p>
-          <a:p>
-            <a:endParaRPr lang="en-US" dirty="0"/>
-          </a:p>
-          <a:p>
-            <a:pPr marL="0" indent="0">
-              <a:buNone/>
-            </a:pPr>
-            <a:r>
-              <a:rPr lang="en-US" b="1" dirty="0"/>
-              <a:t>Slides</a:t>
-            </a:r>
-          </a:p>
-          <a:p>
-            <a:pPr marL="0" indent="0">
-              <a:buNone/>
-            </a:pPr>
-            <a:r>
-              <a:rPr lang="en-US" dirty="0">
-                <a:hlinkClick r:id="rId5"/>
-              </a:rPr>
-              <a:t>aka.ms/app-secrets-slides</a:t>
-            </a:r>
-            <a:endParaRPr lang="en-US" dirty="0"/>
-          </a:p>
-          <a:p>
-            <a:pPr marL="0" indent="0">
-              <a:buNone/>
-            </a:pPr>
-            <a:endParaRPr lang="en-US" b="1" dirty="0"/>
-          </a:p>
-          <a:p>
-            <a:pPr marL="0" indent="0">
-              <a:buNone/>
-            </a:pPr>
-            <a:r>
-              <a:rPr lang="en-US" b="1" dirty="0"/>
-              <a:t>Code</a:t>
-            </a:r>
-          </a:p>
-          <a:p>
-            <a:pPr marL="0" indent="0">
-              <a:buNone/>
-            </a:pPr>
-            <a:r>
-              <a:rPr lang="en-US" dirty="0">
-                <a:hlinkClick r:id="rId6"/>
-              </a:rPr>
-              <a:t>aka.ms/app-secrets-code</a:t>
-            </a:r>
-            <a:endParaRPr lang="en-US" dirty="0"/>
-          </a:p>
-        </p:txBody>
-      </p:sp>
-      <p:pic>
-        <p:nvPicPr>
-          <p:cNvPr id="5" name="Picture 4">
-            <a:extLst>
-              <a:ext uri="{FF2B5EF4-FFF2-40B4-BE49-F238E27FC236}">
-                <a16:creationId xmlns:a16="http://schemas.microsoft.com/office/drawing/2014/main" id="{A87E2C7C-B662-43BA-A5DB-0A1A5D5542DE}"/>
-              </a:ext>
-            </a:extLst>
-          </p:cNvPr>
-          <p:cNvPicPr>
-            <a:picLocks noChangeAspect="1"/>
-          </p:cNvPicPr>
-          <p:nvPr/>
-        </p:nvPicPr>
-        <p:blipFill>
-          <a:blip r:embed="rId7" cstate="print">
-            <a:extLst>
-              <a:ext uri="{28A0092B-C50C-407E-A947-70E740481C1C}">
-                <a14:useLocalDpi xmlns:a14="http://schemas.microsoft.com/office/drawing/2010/main" val="0"/>
-              </a:ext>
-            </a:extLst>
-          </a:blip>
-          <a:stretch>
-            <a:fillRect/>
-          </a:stretch>
-        </p:blipFill>
-        <p:spPr>
-          <a:xfrm>
-            <a:off x="8474876" y="1753612"/>
-            <a:ext cx="682893" cy="555188"/>
-          </a:xfrm>
-          <a:prstGeom prst="rect">
-            <a:avLst/>
-          </a:prstGeom>
-        </p:spPr>
-      </p:pic>
-      <p:pic>
-        <p:nvPicPr>
-          <p:cNvPr id="7" name="Picture 6">
-            <a:extLst>
-              <a:ext uri="{FF2B5EF4-FFF2-40B4-BE49-F238E27FC236}">
-                <a16:creationId xmlns:a16="http://schemas.microsoft.com/office/drawing/2014/main" id="{867EAFBD-EBC0-4665-8891-DDEC61E19AA5}"/>
-              </a:ext>
-            </a:extLst>
-          </p:cNvPr>
-          <p:cNvPicPr>
-            <a:picLocks noChangeAspect="1"/>
-          </p:cNvPicPr>
-          <p:nvPr/>
-        </p:nvPicPr>
-        <p:blipFill>
-          <a:blip r:embed="rId8"/>
-          <a:stretch>
-            <a:fillRect/>
-          </a:stretch>
-        </p:blipFill>
-        <p:spPr>
-          <a:xfrm>
-            <a:off x="8739977" y="4501541"/>
-            <a:ext cx="3340898" cy="2261812"/>
-          </a:xfrm>
-          <a:prstGeom prst="rect">
-            <a:avLst/>
-          </a:prstGeom>
-        </p:spPr>
-      </p:pic>
-      <p:pic>
-        <p:nvPicPr>
-          <p:cNvPr id="8" name="Picture 7">
-            <a:extLst>
-              <a:ext uri="{FF2B5EF4-FFF2-40B4-BE49-F238E27FC236}">
-                <a16:creationId xmlns:a16="http://schemas.microsoft.com/office/drawing/2014/main" id="{435929FE-5E07-494B-A7F9-349E51255D53}"/>
-              </a:ext>
-            </a:extLst>
-          </p:cNvPr>
-          <p:cNvPicPr>
-            <a:picLocks noChangeAspect="1"/>
-          </p:cNvPicPr>
-          <p:nvPr/>
-        </p:nvPicPr>
-        <p:blipFill>
-          <a:blip r:embed="rId8"/>
-          <a:stretch>
-            <a:fillRect/>
-          </a:stretch>
-        </p:blipFill>
-        <p:spPr>
-          <a:xfrm>
-            <a:off x="6743040" y="3415126"/>
-            <a:ext cx="3340898" cy="2261812"/>
-          </a:xfrm>
-          <a:prstGeom prst="rect">
-            <a:avLst/>
-          </a:prstGeom>
-        </p:spPr>
-      </p:pic>
-      <p:pic>
-        <p:nvPicPr>
-          <p:cNvPr id="10" name="Picture 2">
-            <a:extLst>
-              <a:ext uri="{FF2B5EF4-FFF2-40B4-BE49-F238E27FC236}">
-                <a16:creationId xmlns:a16="http://schemas.microsoft.com/office/drawing/2014/main" id="{0FD61B34-5DDF-4160-BC16-3296F9AF6F72}"/>
-              </a:ext>
-            </a:extLst>
-          </p:cNvPr>
-          <p:cNvPicPr>
-            <a:picLocks noChangeAspect="1" noChangeArrowheads="1"/>
-          </p:cNvPicPr>
-          <p:nvPr/>
-        </p:nvPicPr>
-        <p:blipFill>
-          <a:blip r:embed="rId9">
-            <a:extLst>
-              <a:ext uri="{28A0092B-C50C-407E-A947-70E740481C1C}">
-                <a14:useLocalDpi xmlns:a14="http://schemas.microsoft.com/office/drawing/2010/main" val="0"/>
-              </a:ext>
-            </a:extLst>
-          </a:blip>
-          <a:srcRect/>
-          <a:stretch>
-            <a:fillRect/>
-          </a:stretch>
-        </p:blipFill>
-        <p:spPr bwMode="auto">
-          <a:xfrm>
-            <a:off x="7582605" y="2862710"/>
-            <a:ext cx="4352925" cy="3133725"/>
-          </a:xfrm>
-          <a:prstGeom prst="rect">
-            <a:avLst/>
-          </a:prstGeom>
-          <a:noFill/>
-          <a:extLst>
-            <a:ext uri="{909E8E84-426E-40DD-AFC4-6F175D3DCCD1}">
-              <a14:hiddenFill xmlns:a14="http://schemas.microsoft.com/office/drawing/2010/main">
-                <a:solidFill>
-                  <a:srgbClr val="FFFFFF"/>
-                </a:solidFill>
-              </a14:hiddenFill>
-            </a:ext>
-          </a:extLst>
-        </p:spPr>
-      </p:pic>
-    </p:spTree>
-    <p:extLst>
-      <p:ext uri="{BB962C8B-B14F-4D97-AF65-F5344CB8AC3E}">
-        <p14:creationId xmlns:p14="http://schemas.microsoft.com/office/powerpoint/2010/main" val="2369877498"/>
       </p:ext>
     </p:extLst>
   </p:cSld>
@@ -15877,6 +16779,338 @@
       </p:par>
     </p:tnLst>
   </p:timing>
+</p:sld>
+</file>
+
+<file path=ppt/slides/slide20.xml><?xml version="1.0" encoding="utf-8"?>
+<p:sld xmlns:a="http://schemas.openxmlformats.org/drawingml/2006/main" xmlns:r="http://schemas.openxmlformats.org/officeDocument/2006/relationships" xmlns:p="http://schemas.openxmlformats.org/presentationml/2006/main">
+  <p:cSld>
+    <p:bg>
+      <p:bgPr>
+        <a:solidFill>
+          <a:srgbClr val="505050"/>
+        </a:solidFill>
+        <a:effectLst/>
+      </p:bgPr>
+    </p:bg>
+    <p:spTree>
+      <p:nvGrpSpPr>
+        <p:cNvPr id="1" name=""/>
+        <p:cNvGrpSpPr/>
+        <p:nvPr/>
+      </p:nvGrpSpPr>
+      <p:grpSpPr>
+        <a:xfrm>
+          <a:off x="0" y="0"/>
+          <a:ext cx="0" cy="0"/>
+          <a:chOff x="0" y="0"/>
+          <a:chExt cx="0" cy="0"/>
+        </a:xfrm>
+      </p:grpSpPr>
+      <p:sp>
+        <p:nvSpPr>
+          <p:cNvPr id="2" name="Title 1"/>
+          <p:cNvSpPr>
+            <a:spLocks noGrp="1"/>
+          </p:cNvSpPr>
+          <p:nvPr>
+            <p:ph type="title"/>
+          </p:nvPr>
+        </p:nvSpPr>
+        <p:spPr/>
+        <p:txBody>
+          <a:bodyPr/>
+          <a:lstStyle/>
+          <a:p>
+            <a:r>
+              <a:rPr lang="en-US" dirty="0"/>
+              <a:t>Resources</a:t>
+            </a:r>
+          </a:p>
+        </p:txBody>
+      </p:sp>
+      <p:sp>
+        <p:nvSpPr>
+          <p:cNvPr id="3" name="Content Placeholder 2"/>
+          <p:cNvSpPr>
+            <a:spLocks noGrp="1"/>
+          </p:cNvSpPr>
+          <p:nvPr>
+            <p:ph idx="1"/>
+          </p:nvPr>
+        </p:nvSpPr>
+        <p:spPr>
+          <a:xfrm>
+            <a:off x="838199" y="1825625"/>
+            <a:ext cx="10411047" cy="4351338"/>
+          </a:xfrm>
+        </p:spPr>
+        <p:txBody>
+          <a:bodyPr>
+            <a:normAutofit fontScale="92500"/>
+          </a:bodyPr>
+          <a:lstStyle/>
+          <a:p>
+            <a:pPr marL="0" indent="0">
+              <a:buNone/>
+            </a:pPr>
+            <a:r>
+              <a:rPr lang="en-US" b="1" dirty="0"/>
+              <a:t>Docs 									</a:t>
+            </a:r>
+            <a:r>
+              <a:rPr lang="en-US" dirty="0"/>
+              <a:t>@</a:t>
+            </a:r>
+            <a:r>
+              <a:rPr lang="en-US" dirty="0" err="1"/>
+              <a:t>Scott_Addie</a:t>
+            </a:r>
+            <a:endParaRPr lang="en-US" dirty="0">
+              <a:hlinkClick r:id="rId3"/>
+            </a:endParaRPr>
+          </a:p>
+          <a:p>
+            <a:pPr marL="0" indent="0">
+              <a:buNone/>
+            </a:pPr>
+            <a:r>
+              <a:rPr lang="en-US" dirty="0">
+                <a:hlinkClick r:id="rId3"/>
+              </a:rPr>
+              <a:t>aka.ms/dotnet-secret-mgr</a:t>
+            </a:r>
+          </a:p>
+          <a:p>
+            <a:pPr marL="0" indent="0">
+              <a:buNone/>
+            </a:pPr>
+            <a:r>
+              <a:rPr lang="en-US" dirty="0">
+                <a:hlinkClick r:id="rId4"/>
+              </a:rPr>
+              <a:t>aka.ms/</a:t>
+            </a:r>
+            <a:r>
+              <a:rPr lang="en-US" dirty="0" err="1">
+                <a:hlinkClick r:id="rId4"/>
+              </a:rPr>
+              <a:t>az</a:t>
+            </a:r>
+            <a:r>
+              <a:rPr lang="en-US" dirty="0">
+                <a:hlinkClick r:id="rId4"/>
+              </a:rPr>
+              <a:t>-key-vault</a:t>
+            </a:r>
+            <a:endParaRPr lang="en-US" dirty="0"/>
+          </a:p>
+          <a:p>
+            <a:endParaRPr lang="en-US" dirty="0"/>
+          </a:p>
+          <a:p>
+            <a:pPr marL="0" indent="0">
+              <a:buNone/>
+            </a:pPr>
+            <a:r>
+              <a:rPr lang="en-US" b="1" dirty="0"/>
+              <a:t>Slides</a:t>
+            </a:r>
+          </a:p>
+          <a:p>
+            <a:pPr marL="0" indent="0">
+              <a:buNone/>
+            </a:pPr>
+            <a:r>
+              <a:rPr lang="en-US" dirty="0">
+                <a:hlinkClick r:id="rId5"/>
+              </a:rPr>
+              <a:t>aka.ms/app-secrets-slides</a:t>
+            </a:r>
+            <a:endParaRPr lang="en-US" dirty="0"/>
+          </a:p>
+          <a:p>
+            <a:pPr marL="0" indent="0">
+              <a:buNone/>
+            </a:pPr>
+            <a:endParaRPr lang="en-US" b="1" dirty="0"/>
+          </a:p>
+          <a:p>
+            <a:pPr marL="0" indent="0">
+              <a:buNone/>
+            </a:pPr>
+            <a:r>
+              <a:rPr lang="en-US" b="1" dirty="0"/>
+              <a:t>Code</a:t>
+            </a:r>
+          </a:p>
+          <a:p>
+            <a:pPr marL="0" indent="0">
+              <a:buNone/>
+            </a:pPr>
+            <a:r>
+              <a:rPr lang="en-US" dirty="0">
+                <a:hlinkClick r:id="rId6"/>
+              </a:rPr>
+              <a:t>aka.ms/app-secrets-code</a:t>
+            </a:r>
+            <a:endParaRPr lang="en-US" dirty="0"/>
+          </a:p>
+        </p:txBody>
+      </p:sp>
+      <p:pic>
+        <p:nvPicPr>
+          <p:cNvPr id="5" name="Picture 4">
+            <a:extLst>
+              <a:ext uri="{FF2B5EF4-FFF2-40B4-BE49-F238E27FC236}">
+                <a16:creationId xmlns:a16="http://schemas.microsoft.com/office/drawing/2014/main" id="{A87E2C7C-B662-43BA-A5DB-0A1A5D5542DE}"/>
+              </a:ext>
+            </a:extLst>
+          </p:cNvPr>
+          <p:cNvPicPr>
+            <a:picLocks noChangeAspect="1"/>
+          </p:cNvPicPr>
+          <p:nvPr/>
+        </p:nvPicPr>
+        <p:blipFill>
+          <a:blip r:embed="rId7" cstate="print">
+            <a:extLst>
+              <a:ext uri="{28A0092B-C50C-407E-A947-70E740481C1C}">
+                <a14:useLocalDpi xmlns:a14="http://schemas.microsoft.com/office/drawing/2010/main" val="0"/>
+              </a:ext>
+            </a:extLst>
+          </a:blip>
+          <a:stretch>
+            <a:fillRect/>
+          </a:stretch>
+        </p:blipFill>
+        <p:spPr>
+          <a:xfrm>
+            <a:off x="8474876" y="1753612"/>
+            <a:ext cx="682893" cy="555188"/>
+          </a:xfrm>
+          <a:prstGeom prst="rect">
+            <a:avLst/>
+          </a:prstGeom>
+        </p:spPr>
+      </p:pic>
+      <p:pic>
+        <p:nvPicPr>
+          <p:cNvPr id="7" name="Picture 6">
+            <a:extLst>
+              <a:ext uri="{FF2B5EF4-FFF2-40B4-BE49-F238E27FC236}">
+                <a16:creationId xmlns:a16="http://schemas.microsoft.com/office/drawing/2014/main" id="{867EAFBD-EBC0-4665-8891-DDEC61E19AA5}"/>
+              </a:ext>
+            </a:extLst>
+          </p:cNvPr>
+          <p:cNvPicPr>
+            <a:picLocks noChangeAspect="1"/>
+          </p:cNvPicPr>
+          <p:nvPr/>
+        </p:nvPicPr>
+        <p:blipFill>
+          <a:blip r:embed="rId8"/>
+          <a:stretch>
+            <a:fillRect/>
+          </a:stretch>
+        </p:blipFill>
+        <p:spPr>
+          <a:xfrm>
+            <a:off x="8739977" y="4501541"/>
+            <a:ext cx="3340898" cy="2261812"/>
+          </a:xfrm>
+          <a:prstGeom prst="rect">
+            <a:avLst/>
+          </a:prstGeom>
+        </p:spPr>
+      </p:pic>
+      <p:pic>
+        <p:nvPicPr>
+          <p:cNvPr id="8" name="Picture 7">
+            <a:extLst>
+              <a:ext uri="{FF2B5EF4-FFF2-40B4-BE49-F238E27FC236}">
+                <a16:creationId xmlns:a16="http://schemas.microsoft.com/office/drawing/2014/main" id="{435929FE-5E07-494B-A7F9-349E51255D53}"/>
+              </a:ext>
+            </a:extLst>
+          </p:cNvPr>
+          <p:cNvPicPr>
+            <a:picLocks noChangeAspect="1"/>
+          </p:cNvPicPr>
+          <p:nvPr/>
+        </p:nvPicPr>
+        <p:blipFill>
+          <a:blip r:embed="rId8"/>
+          <a:stretch>
+            <a:fillRect/>
+          </a:stretch>
+        </p:blipFill>
+        <p:spPr>
+          <a:xfrm>
+            <a:off x="6743040" y="3415126"/>
+            <a:ext cx="3340898" cy="2261812"/>
+          </a:xfrm>
+          <a:prstGeom prst="rect">
+            <a:avLst/>
+          </a:prstGeom>
+        </p:spPr>
+      </p:pic>
+      <p:pic>
+        <p:nvPicPr>
+          <p:cNvPr id="10" name="Picture 2">
+            <a:extLst>
+              <a:ext uri="{FF2B5EF4-FFF2-40B4-BE49-F238E27FC236}">
+                <a16:creationId xmlns:a16="http://schemas.microsoft.com/office/drawing/2014/main" id="{0FD61B34-5DDF-4160-BC16-3296F9AF6F72}"/>
+              </a:ext>
+            </a:extLst>
+          </p:cNvPr>
+          <p:cNvPicPr>
+            <a:picLocks noChangeAspect="1" noChangeArrowheads="1"/>
+          </p:cNvPicPr>
+          <p:nvPr/>
+        </p:nvPicPr>
+        <p:blipFill>
+          <a:blip r:embed="rId9">
+            <a:extLst>
+              <a:ext uri="{28A0092B-C50C-407E-A947-70E740481C1C}">
+                <a14:useLocalDpi xmlns:a14="http://schemas.microsoft.com/office/drawing/2010/main" val="0"/>
+              </a:ext>
+            </a:extLst>
+          </a:blip>
+          <a:srcRect/>
+          <a:stretch>
+            <a:fillRect/>
+          </a:stretch>
+        </p:blipFill>
+        <p:spPr bwMode="auto">
+          <a:xfrm>
+            <a:off x="7582605" y="2862710"/>
+            <a:ext cx="4352925" cy="3133725"/>
+          </a:xfrm>
+          <a:prstGeom prst="rect">
+            <a:avLst/>
+          </a:prstGeom>
+          <a:noFill/>
+          <a:extLst>
+            <a:ext uri="{909E8E84-426E-40DD-AFC4-6F175D3DCCD1}">
+              <a14:hiddenFill xmlns:a14="http://schemas.microsoft.com/office/drawing/2010/main">
+                <a:solidFill>
+                  <a:srgbClr val="FFFFFF"/>
+                </a:solidFill>
+              </a14:hiddenFill>
+            </a:ext>
+          </a:extLst>
+        </p:spPr>
+      </p:pic>
+    </p:spTree>
+    <p:extLst>
+      <p:ext uri="{BB962C8B-B14F-4D97-AF65-F5344CB8AC3E}">
+        <p14:creationId xmlns:p14="http://schemas.microsoft.com/office/powerpoint/2010/main" val="2369877498"/>
+      </p:ext>
+    </p:extLst>
+  </p:cSld>
+  <p:clrMapOvr>
+    <a:masterClrMapping/>
+  </p:clrMapOvr>
 </p:sld>
 </file>
 
@@ -19582,13 +20816,39 @@
             </a:r>
             <a:r>
               <a:rPr lang="en-US" sz="2400" dirty="0">
+                <a:solidFill>
+                  <a:schemeClr val="accent1">
+                    <a:lumMod val="40000"/>
+                    <a:lumOff val="60000"/>
+                  </a:schemeClr>
+                </a:solidFill>
                 <a:latin typeface="Courier New" panose="02070309020205020404" pitchFamily="49" charset="0"/>
                 <a:cs typeface="Courier New" panose="02070309020205020404" pitchFamily="49" charset="0"/>
               </a:rPr>
-              <a:t>dotnet user-secrets set “</a:t>
+              <a:t>dotnet user-secrets set</a:t>
+            </a:r>
+            <a:r>
+              <a:rPr lang="en-US" sz="2400" dirty="0">
+                <a:latin typeface="Courier New" panose="02070309020205020404" pitchFamily="49" charset="0"/>
+                <a:cs typeface="Courier New" panose="02070309020205020404" pitchFamily="49" charset="0"/>
+              </a:rPr>
+              <a:t> </a:t>
+            </a:r>
+            <a:r>
+              <a:rPr lang="en-US" sz="2400" dirty="0">
+                <a:solidFill>
+                  <a:schemeClr val="accent4"/>
+                </a:solidFill>
+                <a:latin typeface="Courier New" panose="02070309020205020404" pitchFamily="49" charset="0"/>
+                <a:cs typeface="Courier New" panose="02070309020205020404" pitchFamily="49" charset="0"/>
+              </a:rPr>
+              <a:t>“</a:t>
             </a:r>
             <a:r>
               <a:rPr lang="en-US" sz="2400" dirty="0" err="1">
+                <a:solidFill>
+                  <a:schemeClr val="accent4"/>
+                </a:solidFill>
                 <a:latin typeface="Courier New" panose="02070309020205020404" pitchFamily="49" charset="0"/>
                 <a:cs typeface="Courier New" panose="02070309020205020404" pitchFamily="49" charset="0"/>
               </a:rPr>
@@ -19596,6 +20856,9 @@
             </a:r>
             <a:r>
               <a:rPr lang="en-US" sz="2400" dirty="0">
+                <a:solidFill>
+                  <a:schemeClr val="accent4"/>
+                </a:solidFill>
                 <a:latin typeface="Courier New" panose="02070309020205020404" pitchFamily="49" charset="0"/>
                 <a:cs typeface="Courier New" panose="02070309020205020404" pitchFamily="49" charset="0"/>
               </a:rPr>
@@ -19615,13 +20878,39 @@
             </a:r>
             <a:r>
               <a:rPr lang="en-US" sz="2400" dirty="0">
+                <a:solidFill>
+                  <a:schemeClr val="accent1">
+                    <a:lumMod val="40000"/>
+                    <a:lumOff val="60000"/>
+                  </a:schemeClr>
+                </a:solidFill>
                 <a:latin typeface="Courier New" panose="02070309020205020404" pitchFamily="49" charset="0"/>
                 <a:cs typeface="Courier New" panose="02070309020205020404" pitchFamily="49" charset="0"/>
               </a:rPr>
-              <a:t>dotnet user-secrets set “</a:t>
+              <a:t>dotnet user-secrets set</a:t>
+            </a:r>
+            <a:r>
+              <a:rPr lang="en-US" sz="2400" dirty="0">
+                <a:latin typeface="Courier New" panose="02070309020205020404" pitchFamily="49" charset="0"/>
+                <a:cs typeface="Courier New" panose="02070309020205020404" pitchFamily="49" charset="0"/>
+              </a:rPr>
+              <a:t> </a:t>
+            </a:r>
+            <a:r>
+              <a:rPr lang="en-US" sz="2400" dirty="0">
+                <a:solidFill>
+                  <a:schemeClr val="accent4"/>
+                </a:solidFill>
+                <a:latin typeface="Courier New" panose="02070309020205020404" pitchFamily="49" charset="0"/>
+                <a:cs typeface="Courier New" panose="02070309020205020404" pitchFamily="49" charset="0"/>
+              </a:rPr>
+              <a:t>“</a:t>
             </a:r>
             <a:r>
               <a:rPr lang="en-US" sz="2400" dirty="0" err="1">
+                <a:solidFill>
+                  <a:schemeClr val="accent4"/>
+                </a:solidFill>
                 <a:latin typeface="Courier New" panose="02070309020205020404" pitchFamily="49" charset="0"/>
                 <a:cs typeface="Courier New" panose="02070309020205020404" pitchFamily="49" charset="0"/>
               </a:rPr>
@@ -19629,6 +20918,9 @@
             </a:r>
             <a:r>
               <a:rPr lang="en-US" sz="2400" dirty="0">
+                <a:solidFill>
+                  <a:schemeClr val="accent4"/>
+                </a:solidFill>
                 <a:latin typeface="Courier New" panose="02070309020205020404" pitchFamily="49" charset="0"/>
                 <a:cs typeface="Courier New" panose="02070309020205020404" pitchFamily="49" charset="0"/>
               </a:rPr>
@@ -19636,6 +20928,9 @@
             </a:r>
             <a:r>
               <a:rPr lang="en-US" sz="2400" dirty="0" err="1">
+                <a:solidFill>
+                  <a:schemeClr val="accent4"/>
+                </a:solidFill>
                 <a:latin typeface="Courier New" panose="02070309020205020404" pitchFamily="49" charset="0"/>
                 <a:cs typeface="Courier New" panose="02070309020205020404" pitchFamily="49" charset="0"/>
               </a:rPr>
@@ -19643,12 +20938,18 @@
             </a:r>
             <a:r>
               <a:rPr lang="en-US" sz="2400" dirty="0">
+                <a:solidFill>
+                  <a:schemeClr val="accent4"/>
+                </a:solidFill>
                 <a:latin typeface="Courier New" panose="02070309020205020404" pitchFamily="49" charset="0"/>
                 <a:cs typeface="Courier New" panose="02070309020205020404" pitchFamily="49" charset="0"/>
               </a:rPr>
               <a:t>”</a:t>
             </a:r>
             <a:endParaRPr lang="en-US" dirty="0">
+              <a:solidFill>
+                <a:schemeClr val="accent4"/>
+              </a:solidFill>
               <a:latin typeface="Courier New" panose="02070309020205020404" pitchFamily="49" charset="0"/>
               <a:cs typeface="Courier New" panose="02070309020205020404" pitchFamily="49" charset="0"/>
             </a:endParaRPr>
@@ -20138,7 +21439,7 @@
           <p:nvPr>
             <p:extLst>
               <p:ext uri="{D42A27DB-BD31-4B8C-83A1-F6EECF244321}">
-                <p14:modId xmlns:p14="http://schemas.microsoft.com/office/powerpoint/2010/main" val="3142848316"/>
+                <p14:modId xmlns:p14="http://schemas.microsoft.com/office/powerpoint/2010/main" val="3956552339"/>
               </p:ext>
             </p:extLst>
           </p:nvPr>
@@ -20397,7 +21698,7 @@
                           </a:solidFill>
                           <a:latin typeface="Consolas" panose="020B0609020204030204" pitchFamily="49" charset="0"/>
                         </a:rPr>
-                        <a:t>netcoreapp2.1</a:t>
+                        <a:t>netcoreapp2.2</a:t>
                       </a:r>
                       <a:r>
                         <a:rPr lang="en-US" sz="1600" dirty="0">

</xml_diff>

<commit_message>
.NET Core CLI slide updates
</commit_message>
<xml_diff>
--- a/Protecting App Secrets.pptx
+++ b/Protecting App Secrets.pptx
@@ -230,7 +230,7 @@
           <a:p>
             <a:fld id="{03886B9A-ACA2-4D2C-AAF6-D8003DE96699}" type="datetimeFigureOut">
               <a:rPr lang="en-US" smtClean="0"/>
-              <a:t>4/11/2019</a:t>
+              <a:t>4/13/2019</a:t>
             </a:fld>
             <a:endParaRPr lang="en-US"/>
           </a:p>
@@ -2321,6 +2321,14 @@
           <a:bodyPr/>
           <a:lstStyle/>
           <a:p>
+            <a:r>
+              <a:rPr lang="en-US" dirty="0"/>
+              <a:t>Key Vault – secrets stored as sequences of octets (8-bit bytes) w/ max. size of 25 </a:t>
+            </a:r>
+            <a:r>
+              <a:rPr lang="en-US"/>
+              <a:t>kbs</a:t>
+            </a:r>
             <a:endParaRPr lang="en-US" dirty="0"/>
           </a:p>
         </p:txBody>
@@ -4094,7 +4102,7 @@
           <a:p>
             <a:fld id="{B5D86D52-4857-4668-9EB7-B41E21252CF7}" type="datetimeFigureOut">
               <a:rPr lang="en-US" smtClean="0"/>
-              <a:t>4/11/2019</a:t>
+              <a:t>4/13/2019</a:t>
             </a:fld>
             <a:endParaRPr lang="en-US"/>
           </a:p>
@@ -4292,7 +4300,7 @@
           <a:p>
             <a:fld id="{B5D86D52-4857-4668-9EB7-B41E21252CF7}" type="datetimeFigureOut">
               <a:rPr lang="en-US" smtClean="0"/>
-              <a:t>4/11/2019</a:t>
+              <a:t>4/13/2019</a:t>
             </a:fld>
             <a:endParaRPr lang="en-US"/>
           </a:p>
@@ -4500,7 +4508,7 @@
           <a:p>
             <a:fld id="{B5D86D52-4857-4668-9EB7-B41E21252CF7}" type="datetimeFigureOut">
               <a:rPr lang="en-US" smtClean="0"/>
-              <a:t>4/11/2019</a:t>
+              <a:t>4/13/2019</a:t>
             </a:fld>
             <a:endParaRPr lang="en-US"/>
           </a:p>
@@ -4704,7 +4712,7 @@
           <a:p>
             <a:fld id="{EEC3160E-2579-4584-9765-DC1BA0B358F9}" type="datetimeFigureOut">
               <a:rPr lang="en-US" smtClean="0"/>
-              <a:t>4/11/2019</a:t>
+              <a:t>4/13/2019</a:t>
             </a:fld>
             <a:endParaRPr lang="en-US"/>
           </a:p>
@@ -4874,7 +4882,7 @@
           <a:p>
             <a:fld id="{EEC3160E-2579-4584-9765-DC1BA0B358F9}" type="datetimeFigureOut">
               <a:rPr lang="en-US" smtClean="0"/>
-              <a:t>4/11/2019</a:t>
+              <a:t>4/13/2019</a:t>
             </a:fld>
             <a:endParaRPr lang="en-US"/>
           </a:p>
@@ -5120,7 +5128,7 @@
           <a:p>
             <a:fld id="{EEC3160E-2579-4584-9765-DC1BA0B358F9}" type="datetimeFigureOut">
               <a:rPr lang="en-US" smtClean="0"/>
-              <a:t>4/11/2019</a:t>
+              <a:t>4/13/2019</a:t>
             </a:fld>
             <a:endParaRPr lang="en-US"/>
           </a:p>
@@ -5352,7 +5360,7 @@
           <a:p>
             <a:fld id="{EEC3160E-2579-4584-9765-DC1BA0B358F9}" type="datetimeFigureOut">
               <a:rPr lang="en-US" smtClean="0"/>
-              <a:t>4/11/2019</a:t>
+              <a:t>4/13/2019</a:t>
             </a:fld>
             <a:endParaRPr lang="en-US"/>
           </a:p>
@@ -5719,7 +5727,7 @@
           <a:p>
             <a:fld id="{EEC3160E-2579-4584-9765-DC1BA0B358F9}" type="datetimeFigureOut">
               <a:rPr lang="en-US" smtClean="0"/>
-              <a:t>4/11/2019</a:t>
+              <a:t>4/13/2019</a:t>
             </a:fld>
             <a:endParaRPr lang="en-US"/>
           </a:p>
@@ -5837,7 +5845,7 @@
           <a:p>
             <a:fld id="{EEC3160E-2579-4584-9765-DC1BA0B358F9}" type="datetimeFigureOut">
               <a:rPr lang="en-US" smtClean="0"/>
-              <a:t>4/11/2019</a:t>
+              <a:t>4/13/2019</a:t>
             </a:fld>
             <a:endParaRPr lang="en-US"/>
           </a:p>
@@ -5932,7 +5940,7 @@
           <a:p>
             <a:fld id="{EEC3160E-2579-4584-9765-DC1BA0B358F9}" type="datetimeFigureOut">
               <a:rPr lang="en-US" smtClean="0"/>
-              <a:t>4/11/2019</a:t>
+              <a:t>4/13/2019</a:t>
             </a:fld>
             <a:endParaRPr lang="en-US"/>
           </a:p>
@@ -6209,7 +6217,7 @@
           <a:p>
             <a:fld id="{EEC3160E-2579-4584-9765-DC1BA0B358F9}" type="datetimeFigureOut">
               <a:rPr lang="en-US" smtClean="0"/>
-              <a:t>4/11/2019</a:t>
+              <a:t>4/13/2019</a:t>
             </a:fld>
             <a:endParaRPr lang="en-US"/>
           </a:p>
@@ -6395,7 +6403,7 @@
           <a:p>
             <a:fld id="{B5D86D52-4857-4668-9EB7-B41E21252CF7}" type="datetimeFigureOut">
               <a:rPr lang="en-US" smtClean="0"/>
-              <a:t>4/11/2019</a:t>
+              <a:t>4/13/2019</a:t>
             </a:fld>
             <a:endParaRPr lang="en-US"/>
           </a:p>
@@ -6664,7 +6672,7 @@
           <a:p>
             <a:fld id="{EEC3160E-2579-4584-9765-DC1BA0B358F9}" type="datetimeFigureOut">
               <a:rPr lang="en-US" smtClean="0"/>
-              <a:t>4/11/2019</a:t>
+              <a:t>4/13/2019</a:t>
             </a:fld>
             <a:endParaRPr lang="en-US"/>
           </a:p>
@@ -6834,7 +6842,7 @@
           <a:p>
             <a:fld id="{EEC3160E-2579-4584-9765-DC1BA0B358F9}" type="datetimeFigureOut">
               <a:rPr lang="en-US" smtClean="0"/>
-              <a:t>4/11/2019</a:t>
+              <a:t>4/13/2019</a:t>
             </a:fld>
             <a:endParaRPr lang="en-US"/>
           </a:p>
@@ -7014,7 +7022,7 @@
           <a:p>
             <a:fld id="{EEC3160E-2579-4584-9765-DC1BA0B358F9}" type="datetimeFigureOut">
               <a:rPr lang="en-US" smtClean="0"/>
-              <a:t>4/11/2019</a:t>
+              <a:t>4/13/2019</a:t>
             </a:fld>
             <a:endParaRPr lang="en-US"/>
           </a:p>
@@ -7277,7 +7285,7 @@
           <a:p>
             <a:fld id="{B5D86D52-4857-4668-9EB7-B41E21252CF7}" type="datetimeFigureOut">
               <a:rPr lang="en-US" smtClean="0"/>
-              <a:t>4/11/2019</a:t>
+              <a:t>4/13/2019</a:t>
             </a:fld>
             <a:endParaRPr lang="en-US"/>
           </a:p>
@@ -7542,7 +7550,7 @@
           <a:p>
             <a:fld id="{B5D86D52-4857-4668-9EB7-B41E21252CF7}" type="datetimeFigureOut">
               <a:rPr lang="en-US" smtClean="0"/>
-              <a:t>4/11/2019</a:t>
+              <a:t>4/13/2019</a:t>
             </a:fld>
             <a:endParaRPr lang="en-US"/>
           </a:p>
@@ -7954,7 +7962,7 @@
           <a:p>
             <a:fld id="{B5D86D52-4857-4668-9EB7-B41E21252CF7}" type="datetimeFigureOut">
               <a:rPr lang="en-US" smtClean="0"/>
-              <a:t>4/11/2019</a:t>
+              <a:t>4/13/2019</a:t>
             </a:fld>
             <a:endParaRPr lang="en-US"/>
           </a:p>
@@ -8095,7 +8103,7 @@
           <a:p>
             <a:fld id="{B5D86D52-4857-4668-9EB7-B41E21252CF7}" type="datetimeFigureOut">
               <a:rPr lang="en-US" smtClean="0"/>
-              <a:t>4/11/2019</a:t>
+              <a:t>4/13/2019</a:t>
             </a:fld>
             <a:endParaRPr lang="en-US"/>
           </a:p>
@@ -8208,7 +8216,7 @@
           <a:p>
             <a:fld id="{B5D86D52-4857-4668-9EB7-B41E21252CF7}" type="datetimeFigureOut">
               <a:rPr lang="en-US" smtClean="0"/>
-              <a:t>4/11/2019</a:t>
+              <a:t>4/13/2019</a:t>
             </a:fld>
             <a:endParaRPr lang="en-US"/>
           </a:p>
@@ -8519,7 +8527,7 @@
           <a:p>
             <a:fld id="{B5D86D52-4857-4668-9EB7-B41E21252CF7}" type="datetimeFigureOut">
               <a:rPr lang="en-US" smtClean="0"/>
-              <a:t>4/11/2019</a:t>
+              <a:t>4/13/2019</a:t>
             </a:fld>
             <a:endParaRPr lang="en-US"/>
           </a:p>
@@ -8807,7 +8815,7 @@
           <a:p>
             <a:fld id="{B5D86D52-4857-4668-9EB7-B41E21252CF7}" type="datetimeFigureOut">
               <a:rPr lang="en-US" smtClean="0"/>
-              <a:t>4/11/2019</a:t>
+              <a:t>4/13/2019</a:t>
             </a:fld>
             <a:endParaRPr lang="en-US"/>
           </a:p>
@@ -9048,7 +9056,7 @@
           <a:p>
             <a:fld id="{B5D86D52-4857-4668-9EB7-B41E21252CF7}" type="datetimeFigureOut">
               <a:rPr lang="en-US" smtClean="0"/>
-              <a:t>4/11/2019</a:t>
+              <a:t>4/13/2019</a:t>
             </a:fld>
             <a:endParaRPr lang="en-US"/>
           </a:p>
@@ -9600,7 +9608,7 @@
           <a:p>
             <a:fld id="{EEC3160E-2579-4584-9765-DC1BA0B358F9}" type="datetimeFigureOut">
               <a:rPr lang="en-US" smtClean="0"/>
-              <a:t>4/11/2019</a:t>
+              <a:t>4/13/2019</a:t>
             </a:fld>
             <a:endParaRPr lang="en-US"/>
           </a:p>

</xml_diff>

<commit_message>
Update az cli commands
</commit_message>
<xml_diff>
--- a/Protecting App Secrets.pptx
+++ b/Protecting App Secrets.pptx
@@ -27,7 +27,7 @@
     <p:sldId id="339" r:id="rId18"/>
     <p:sldId id="345" r:id="rId19"/>
     <p:sldId id="341" r:id="rId20"/>
-    <p:sldId id="346" r:id="rId21"/>
+    <p:sldId id="349" r:id="rId21"/>
     <p:sldId id="331" r:id="rId22"/>
     <p:sldId id="334" r:id="rId23"/>
     <p:sldId id="326" r:id="rId24"/>
@@ -230,7 +230,7 @@
           <a:p>
             <a:fld id="{03886B9A-ACA2-4D2C-AAF6-D8003DE96699}" type="datetimeFigureOut">
               <a:rPr lang="en-US" smtClean="0"/>
-              <a:t>7/15/2019</a:t>
+              <a:t>7/18/2019</a:t>
             </a:fld>
             <a:endParaRPr lang="en-US"/>
           </a:p>
@@ -930,7 +930,15 @@
             </a:r>
             <a:r>
               <a:rPr lang="en-US" dirty="0"/>
-              <a:t> “Event”: { “Name”: “MKE Azure” }</a:t>
+              <a:t> “Event”: { “Name”: “KCDC – </a:t>
+            </a:r>
+            <a:r>
+              <a:rPr lang="en-US" dirty="0" err="1"/>
+              <a:t>secrets.json</a:t>
+            </a:r>
+            <a:r>
+              <a:rPr lang="en-US" dirty="0"/>
+              <a:t>” }</a:t>
             </a:r>
           </a:p>
           <a:p>
@@ -1306,7 +1314,29 @@
                 <a:ea typeface="+mn-ea"/>
                 <a:cs typeface="+mn-cs"/>
               </a:rPr>
-              <a:t>Model.EventName</a:t>
+              <a:t>Model</a:t>
+            </a:r>
+            <a:r>
+              <a:rPr lang="en-US" sz="1200" kern="1200" err="1">
+                <a:solidFill>
+                  <a:schemeClr val="tx1"/>
+                </a:solidFill>
+                <a:latin typeface="+mn-lt"/>
+                <a:ea typeface="+mn-ea"/>
+                <a:cs typeface="+mn-cs"/>
+              </a:rPr>
+              <a:t>.</a:t>
+            </a:r>
+            <a:r>
+              <a:rPr lang="en-US" sz="1200" kern="1200">
+                <a:solidFill>
+                  <a:schemeClr val="tx1"/>
+                </a:solidFill>
+                <a:latin typeface="+mn-lt"/>
+                <a:ea typeface="+mn-ea"/>
+                <a:cs typeface="+mn-cs"/>
+              </a:rPr>
+              <a:t>EventName</a:t>
             </a:r>
             <a:endParaRPr lang="en-US" sz="1200" kern="1200" dirty="0">
               <a:solidFill>
@@ -2417,7 +2447,7 @@
     </p:spTree>
     <p:extLst>
       <p:ext uri="{BB962C8B-B14F-4D97-AF65-F5344CB8AC3E}">
-        <p14:creationId xmlns:p14="http://schemas.microsoft.com/office/powerpoint/2010/main" val="2479955224"/>
+        <p14:creationId xmlns:p14="http://schemas.microsoft.com/office/powerpoint/2010/main" val="2726663171"/>
       </p:ext>
     </p:extLst>
   </p:cSld>
@@ -3157,7 +3187,7 @@
           <a:p>
             <a:r>
               <a:rPr lang="en-US" dirty="0"/>
-              <a:t>“Meet John: an overworked, underpaid developer fueled by caffeine and pizza.”</a:t>
+              <a:t>“Meet John: an overworked, 10x developer fueled by caffeine and pizza.”</a:t>
             </a:r>
           </a:p>
         </p:txBody>
@@ -4200,7 +4230,7 @@
           <a:p>
             <a:fld id="{B5D86D52-4857-4668-9EB7-B41E21252CF7}" type="datetimeFigureOut">
               <a:rPr lang="en-US" smtClean="0"/>
-              <a:t>7/15/2019</a:t>
+              <a:t>7/18/2019</a:t>
             </a:fld>
             <a:endParaRPr lang="en-US"/>
           </a:p>
@@ -4398,7 +4428,7 @@
           <a:p>
             <a:fld id="{B5D86D52-4857-4668-9EB7-B41E21252CF7}" type="datetimeFigureOut">
               <a:rPr lang="en-US" smtClean="0"/>
-              <a:t>7/15/2019</a:t>
+              <a:t>7/18/2019</a:t>
             </a:fld>
             <a:endParaRPr lang="en-US"/>
           </a:p>
@@ -4606,7 +4636,7 @@
           <a:p>
             <a:fld id="{B5D86D52-4857-4668-9EB7-B41E21252CF7}" type="datetimeFigureOut">
               <a:rPr lang="en-US" smtClean="0"/>
-              <a:t>7/15/2019</a:t>
+              <a:t>7/18/2019</a:t>
             </a:fld>
             <a:endParaRPr lang="en-US"/>
           </a:p>
@@ -4810,7 +4840,7 @@
           <a:p>
             <a:fld id="{EEC3160E-2579-4584-9765-DC1BA0B358F9}" type="datetimeFigureOut">
               <a:rPr lang="en-US" smtClean="0"/>
-              <a:t>7/15/2019</a:t>
+              <a:t>7/18/2019</a:t>
             </a:fld>
             <a:endParaRPr lang="en-US"/>
           </a:p>
@@ -4980,7 +5010,7 @@
           <a:p>
             <a:fld id="{EEC3160E-2579-4584-9765-DC1BA0B358F9}" type="datetimeFigureOut">
               <a:rPr lang="en-US" smtClean="0"/>
-              <a:t>7/15/2019</a:t>
+              <a:t>7/18/2019</a:t>
             </a:fld>
             <a:endParaRPr lang="en-US"/>
           </a:p>
@@ -5226,7 +5256,7 @@
           <a:p>
             <a:fld id="{EEC3160E-2579-4584-9765-DC1BA0B358F9}" type="datetimeFigureOut">
               <a:rPr lang="en-US" smtClean="0"/>
-              <a:t>7/15/2019</a:t>
+              <a:t>7/18/2019</a:t>
             </a:fld>
             <a:endParaRPr lang="en-US"/>
           </a:p>
@@ -5458,7 +5488,7 @@
           <a:p>
             <a:fld id="{EEC3160E-2579-4584-9765-DC1BA0B358F9}" type="datetimeFigureOut">
               <a:rPr lang="en-US" smtClean="0"/>
-              <a:t>7/15/2019</a:t>
+              <a:t>7/18/2019</a:t>
             </a:fld>
             <a:endParaRPr lang="en-US"/>
           </a:p>
@@ -5825,7 +5855,7 @@
           <a:p>
             <a:fld id="{EEC3160E-2579-4584-9765-DC1BA0B358F9}" type="datetimeFigureOut">
               <a:rPr lang="en-US" smtClean="0"/>
-              <a:t>7/15/2019</a:t>
+              <a:t>7/18/2019</a:t>
             </a:fld>
             <a:endParaRPr lang="en-US"/>
           </a:p>
@@ -5943,7 +5973,7 @@
           <a:p>
             <a:fld id="{EEC3160E-2579-4584-9765-DC1BA0B358F9}" type="datetimeFigureOut">
               <a:rPr lang="en-US" smtClean="0"/>
-              <a:t>7/15/2019</a:t>
+              <a:t>7/18/2019</a:t>
             </a:fld>
             <a:endParaRPr lang="en-US"/>
           </a:p>
@@ -6038,7 +6068,7 @@
           <a:p>
             <a:fld id="{EEC3160E-2579-4584-9765-DC1BA0B358F9}" type="datetimeFigureOut">
               <a:rPr lang="en-US" smtClean="0"/>
-              <a:t>7/15/2019</a:t>
+              <a:t>7/18/2019</a:t>
             </a:fld>
             <a:endParaRPr lang="en-US"/>
           </a:p>
@@ -6315,7 +6345,7 @@
           <a:p>
             <a:fld id="{EEC3160E-2579-4584-9765-DC1BA0B358F9}" type="datetimeFigureOut">
               <a:rPr lang="en-US" smtClean="0"/>
-              <a:t>7/15/2019</a:t>
+              <a:t>7/18/2019</a:t>
             </a:fld>
             <a:endParaRPr lang="en-US"/>
           </a:p>
@@ -6501,7 +6531,7 @@
           <a:p>
             <a:fld id="{B5D86D52-4857-4668-9EB7-B41E21252CF7}" type="datetimeFigureOut">
               <a:rPr lang="en-US" smtClean="0"/>
-              <a:t>7/15/2019</a:t>
+              <a:t>7/18/2019</a:t>
             </a:fld>
             <a:endParaRPr lang="en-US"/>
           </a:p>
@@ -6770,7 +6800,7 @@
           <a:p>
             <a:fld id="{EEC3160E-2579-4584-9765-DC1BA0B358F9}" type="datetimeFigureOut">
               <a:rPr lang="en-US" smtClean="0"/>
-              <a:t>7/15/2019</a:t>
+              <a:t>7/18/2019</a:t>
             </a:fld>
             <a:endParaRPr lang="en-US"/>
           </a:p>
@@ -6940,7 +6970,7 @@
           <a:p>
             <a:fld id="{EEC3160E-2579-4584-9765-DC1BA0B358F9}" type="datetimeFigureOut">
               <a:rPr lang="en-US" smtClean="0"/>
-              <a:t>7/15/2019</a:t>
+              <a:t>7/18/2019</a:t>
             </a:fld>
             <a:endParaRPr lang="en-US"/>
           </a:p>
@@ -7120,7 +7150,7 @@
           <a:p>
             <a:fld id="{EEC3160E-2579-4584-9765-DC1BA0B358F9}" type="datetimeFigureOut">
               <a:rPr lang="en-US" smtClean="0"/>
-              <a:t>7/15/2019</a:t>
+              <a:t>7/18/2019</a:t>
             </a:fld>
             <a:endParaRPr lang="en-US"/>
           </a:p>
@@ -7383,7 +7413,7 @@
           <a:p>
             <a:fld id="{B5D86D52-4857-4668-9EB7-B41E21252CF7}" type="datetimeFigureOut">
               <a:rPr lang="en-US" smtClean="0"/>
-              <a:t>7/15/2019</a:t>
+              <a:t>7/18/2019</a:t>
             </a:fld>
             <a:endParaRPr lang="en-US"/>
           </a:p>
@@ -7648,7 +7678,7 @@
           <a:p>
             <a:fld id="{B5D86D52-4857-4668-9EB7-B41E21252CF7}" type="datetimeFigureOut">
               <a:rPr lang="en-US" smtClean="0"/>
-              <a:t>7/15/2019</a:t>
+              <a:t>7/18/2019</a:t>
             </a:fld>
             <a:endParaRPr lang="en-US"/>
           </a:p>
@@ -8060,7 +8090,7 @@
           <a:p>
             <a:fld id="{B5D86D52-4857-4668-9EB7-B41E21252CF7}" type="datetimeFigureOut">
               <a:rPr lang="en-US" smtClean="0"/>
-              <a:t>7/15/2019</a:t>
+              <a:t>7/18/2019</a:t>
             </a:fld>
             <a:endParaRPr lang="en-US"/>
           </a:p>
@@ -8201,7 +8231,7 @@
           <a:p>
             <a:fld id="{B5D86D52-4857-4668-9EB7-B41E21252CF7}" type="datetimeFigureOut">
               <a:rPr lang="en-US" smtClean="0"/>
-              <a:t>7/15/2019</a:t>
+              <a:t>7/18/2019</a:t>
             </a:fld>
             <a:endParaRPr lang="en-US"/>
           </a:p>
@@ -8314,7 +8344,7 @@
           <a:p>
             <a:fld id="{B5D86D52-4857-4668-9EB7-B41E21252CF7}" type="datetimeFigureOut">
               <a:rPr lang="en-US" smtClean="0"/>
-              <a:t>7/15/2019</a:t>
+              <a:t>7/18/2019</a:t>
             </a:fld>
             <a:endParaRPr lang="en-US"/>
           </a:p>
@@ -8625,7 +8655,7 @@
           <a:p>
             <a:fld id="{B5D86D52-4857-4668-9EB7-B41E21252CF7}" type="datetimeFigureOut">
               <a:rPr lang="en-US" smtClean="0"/>
-              <a:t>7/15/2019</a:t>
+              <a:t>7/18/2019</a:t>
             </a:fld>
             <a:endParaRPr lang="en-US"/>
           </a:p>
@@ -8913,7 +8943,7 @@
           <a:p>
             <a:fld id="{B5D86D52-4857-4668-9EB7-B41E21252CF7}" type="datetimeFigureOut">
               <a:rPr lang="en-US" smtClean="0"/>
-              <a:t>7/15/2019</a:t>
+              <a:t>7/18/2019</a:t>
             </a:fld>
             <a:endParaRPr lang="en-US"/>
           </a:p>
@@ -9154,7 +9184,7 @@
           <a:p>
             <a:fld id="{B5D86D52-4857-4668-9EB7-B41E21252CF7}" type="datetimeFigureOut">
               <a:rPr lang="en-US" smtClean="0"/>
-              <a:t>7/15/2019</a:t>
+              <a:t>7/18/2019</a:t>
             </a:fld>
             <a:endParaRPr lang="en-US"/>
           </a:p>
@@ -9706,7 +9736,7 @@
           <a:p>
             <a:fld id="{EEC3160E-2579-4584-9765-DC1BA0B358F9}" type="datetimeFigureOut">
               <a:rPr lang="en-US" smtClean="0"/>
-              <a:t>7/15/2019</a:t>
+              <a:t>7/18/2019</a:t>
             </a:fld>
             <a:endParaRPr lang="en-US"/>
           </a:p>
@@ -18831,7 +18861,7 @@
         <p:spPr/>
         <p:txBody>
           <a:bodyPr>
-            <a:normAutofit lnSpcReduction="10000"/>
+            <a:normAutofit fontScale="92500" lnSpcReduction="20000"/>
           </a:bodyPr>
           <a:lstStyle/>
           <a:p>
@@ -18853,20 +18883,6 @@
             <a:pPr marL="0" indent="0">
               <a:buNone/>
             </a:pPr>
-            <a:r>
-              <a:rPr lang="en-US" sz="2600" dirty="0" err="1">
-                <a:latin typeface="Courier New" panose="02070309020205020404" pitchFamily="49" charset="0"/>
-                <a:cs typeface="Courier New" panose="02070309020205020404" pitchFamily="49" charset="0"/>
-              </a:rPr>
-              <a:t>webAppPrincipalId</a:t>
-            </a:r>
-            <a:r>
-              <a:rPr lang="en-US" sz="2600" dirty="0">
-                <a:latin typeface="Courier New" panose="02070309020205020404" pitchFamily="49" charset="0"/>
-                <a:cs typeface="Courier New" panose="02070309020205020404" pitchFamily="49" charset="0"/>
-              </a:rPr>
-              <a:t>=$(</a:t>
-            </a:r>
             <a:r>
               <a:rPr lang="en-US" sz="2600" dirty="0" err="1">
                 <a:solidFill>
@@ -18924,19 +18940,17 @@
                 <a:latin typeface="Courier New" panose="02070309020205020404" pitchFamily="49" charset="0"/>
                 <a:cs typeface="Courier New" panose="02070309020205020404" pitchFamily="49" charset="0"/>
               </a:rPr>
-              <a:t> \</a:t>
-            </a:r>
-          </a:p>
-          <a:p>
-            <a:pPr marL="0" indent="0">
-              <a:buNone/>
-            </a:pPr>
+              <a:t> --name </a:t>
+            </a:r>
             <a:r>
               <a:rPr lang="en-US" sz="2600" dirty="0">
+                <a:solidFill>
+                  <a:schemeClr val="accent4"/>
+                </a:solidFill>
                 <a:latin typeface="Courier New" panose="02070309020205020404" pitchFamily="49" charset="0"/>
                 <a:cs typeface="Courier New" panose="02070309020205020404" pitchFamily="49" charset="0"/>
               </a:rPr>
-              <a:t>		--query </a:t>
+              <a:t>$</a:t>
             </a:r>
             <a:r>
               <a:rPr lang="en-US" sz="2600" dirty="0" err="1">
@@ -18946,58 +18960,46 @@
                 <a:latin typeface="Courier New" panose="02070309020205020404" pitchFamily="49" charset="0"/>
                 <a:cs typeface="Courier New" panose="02070309020205020404" pitchFamily="49" charset="0"/>
               </a:rPr>
-              <a:t>principalId</a:t>
+              <a:t>webAppName</a:t>
+            </a:r>
+            <a:endParaRPr lang="en-US" sz="2600" b="1" dirty="0">
+              <a:solidFill>
+                <a:schemeClr val="accent6"/>
+              </a:solidFill>
+              <a:latin typeface="Courier New" panose="02070309020205020404" pitchFamily="49" charset="0"/>
+              <a:cs typeface="Courier New" panose="02070309020205020404" pitchFamily="49" charset="0"/>
+            </a:endParaRPr>
+          </a:p>
+          <a:p>
+            <a:pPr marL="0" indent="0">
+              <a:buNone/>
+            </a:pPr>
+            <a:endParaRPr lang="en-US" sz="2600" b="1" dirty="0">
+              <a:solidFill>
+                <a:schemeClr val="accent6"/>
+              </a:solidFill>
+              <a:latin typeface="Courier New" panose="02070309020205020404" pitchFamily="49" charset="0"/>
+              <a:cs typeface="Courier New" panose="02070309020205020404" pitchFamily="49" charset="0"/>
+            </a:endParaRPr>
+          </a:p>
+          <a:p>
+            <a:pPr marL="0" indent="0">
+              <a:buNone/>
+            </a:pPr>
+            <a:r>
+              <a:rPr lang="en-US" sz="2600" dirty="0" err="1">
+                <a:latin typeface="Courier New" panose="02070309020205020404" pitchFamily="49" charset="0"/>
+                <a:cs typeface="Courier New" panose="02070309020205020404" pitchFamily="49" charset="0"/>
+              </a:rPr>
+              <a:t>webAppPrincipalId</a:t>
             </a:r>
             <a:r>
               <a:rPr lang="en-US" sz="2600" dirty="0">
                 <a:latin typeface="Courier New" panose="02070309020205020404" pitchFamily="49" charset="0"/>
                 <a:cs typeface="Courier New" panose="02070309020205020404" pitchFamily="49" charset="0"/>
               </a:rPr>
-              <a:t> \</a:t>
-            </a:r>
-          </a:p>
-          <a:p>
-            <a:pPr marL="0" indent="0">
-              <a:buNone/>
-            </a:pPr>
-            <a:r>
-              <a:rPr lang="en-US" sz="2600" dirty="0">
-                <a:latin typeface="Courier New" panose="02070309020205020404" pitchFamily="49" charset="0"/>
-                <a:cs typeface="Courier New" panose="02070309020205020404" pitchFamily="49" charset="0"/>
-              </a:rPr>
-              <a:t>		--output </a:t>
-            </a:r>
-            <a:r>
-              <a:rPr lang="en-US" sz="2600" dirty="0" err="1">
-                <a:solidFill>
-                  <a:schemeClr val="accent4"/>
-                </a:solidFill>
-                <a:latin typeface="Courier New" panose="02070309020205020404" pitchFamily="49" charset="0"/>
-                <a:cs typeface="Courier New" panose="02070309020205020404" pitchFamily="49" charset="0"/>
-              </a:rPr>
-              <a:t>tsv</a:t>
-            </a:r>
-            <a:r>
-              <a:rPr lang="en-US" sz="2600" dirty="0">
-                <a:latin typeface="Courier New" panose="02070309020205020404" pitchFamily="49" charset="0"/>
-                <a:cs typeface="Courier New" panose="02070309020205020404" pitchFamily="49" charset="0"/>
-              </a:rPr>
-              <a:t>)</a:t>
-            </a:r>
-          </a:p>
-          <a:p>
-            <a:pPr marL="0" indent="0">
-              <a:buNone/>
-            </a:pPr>
-            <a:endParaRPr lang="en-US" sz="2600" b="1" dirty="0">
-              <a:latin typeface="Courier New" panose="02070309020205020404" pitchFamily="49" charset="0"/>
-              <a:cs typeface="Courier New" panose="02070309020205020404" pitchFamily="49" charset="0"/>
-            </a:endParaRPr>
-          </a:p>
-          <a:p>
-            <a:pPr marL="0" indent="0">
-              <a:buNone/>
-            </a:pPr>
+              <a:t>=$(</a:t>
+            </a:r>
             <a:r>
               <a:rPr lang="en-US" sz="2600" dirty="0" err="1">
                 <a:solidFill>
@@ -19035,6 +19037,176 @@
                 <a:latin typeface="Courier New" panose="02070309020205020404" pitchFamily="49" charset="0"/>
                 <a:cs typeface="Courier New" panose="02070309020205020404" pitchFamily="49" charset="0"/>
               </a:rPr>
+              <a:t>webapp</a:t>
+            </a:r>
+            <a:r>
+              <a:rPr lang="en-US" sz="2600" dirty="0">
+                <a:solidFill>
+                  <a:schemeClr val="accent1">
+                    <a:lumMod val="40000"/>
+                    <a:lumOff val="60000"/>
+                  </a:schemeClr>
+                </a:solidFill>
+                <a:latin typeface="Courier New" panose="02070309020205020404" pitchFamily="49" charset="0"/>
+                <a:cs typeface="Courier New" panose="02070309020205020404" pitchFamily="49" charset="0"/>
+              </a:rPr>
+              <a:t> identity show</a:t>
+            </a:r>
+            <a:r>
+              <a:rPr lang="en-US" sz="2600" dirty="0">
+                <a:latin typeface="Courier New" panose="02070309020205020404" pitchFamily="49" charset="0"/>
+                <a:cs typeface="Courier New" panose="02070309020205020404" pitchFamily="49" charset="0"/>
+              </a:rPr>
+              <a:t> \</a:t>
+            </a:r>
+          </a:p>
+          <a:p>
+            <a:pPr marL="0" indent="0">
+              <a:buNone/>
+            </a:pPr>
+            <a:r>
+              <a:rPr lang="en-US" sz="2600" dirty="0">
+                <a:latin typeface="Courier New" panose="02070309020205020404" pitchFamily="49" charset="0"/>
+                <a:cs typeface="Courier New" panose="02070309020205020404" pitchFamily="49" charset="0"/>
+              </a:rPr>
+              <a:t>					--name </a:t>
+            </a:r>
+            <a:r>
+              <a:rPr lang="en-US" sz="2600" dirty="0">
+                <a:solidFill>
+                  <a:schemeClr val="accent4"/>
+                </a:solidFill>
+                <a:latin typeface="Courier New" panose="02070309020205020404" pitchFamily="49" charset="0"/>
+                <a:cs typeface="Courier New" panose="02070309020205020404" pitchFamily="49" charset="0"/>
+              </a:rPr>
+              <a:t>$</a:t>
+            </a:r>
+            <a:r>
+              <a:rPr lang="en-US" sz="2600" dirty="0" err="1">
+                <a:solidFill>
+                  <a:schemeClr val="accent4"/>
+                </a:solidFill>
+                <a:latin typeface="Courier New" panose="02070309020205020404" pitchFamily="49" charset="0"/>
+                <a:cs typeface="Courier New" panose="02070309020205020404" pitchFamily="49" charset="0"/>
+              </a:rPr>
+              <a:t>webAppName</a:t>
+            </a:r>
+            <a:r>
+              <a:rPr lang="en-US" sz="2600" dirty="0">
+                <a:latin typeface="Courier New" panose="02070309020205020404" pitchFamily="49" charset="0"/>
+                <a:cs typeface="Courier New" panose="02070309020205020404" pitchFamily="49" charset="0"/>
+              </a:rPr>
+              <a:t> \</a:t>
+            </a:r>
+          </a:p>
+          <a:p>
+            <a:pPr marL="0" indent="0">
+              <a:buNone/>
+            </a:pPr>
+            <a:r>
+              <a:rPr lang="en-US" sz="2600" dirty="0">
+                <a:latin typeface="Courier New" panose="02070309020205020404" pitchFamily="49" charset="0"/>
+                <a:cs typeface="Courier New" panose="02070309020205020404" pitchFamily="49" charset="0"/>
+              </a:rPr>
+              <a:t>					--query </a:t>
+            </a:r>
+            <a:r>
+              <a:rPr lang="en-US" sz="2600" dirty="0" err="1">
+                <a:solidFill>
+                  <a:schemeClr val="accent4"/>
+                </a:solidFill>
+                <a:latin typeface="Courier New" panose="02070309020205020404" pitchFamily="49" charset="0"/>
+                <a:cs typeface="Courier New" panose="02070309020205020404" pitchFamily="49" charset="0"/>
+              </a:rPr>
+              <a:t>principalId</a:t>
+            </a:r>
+            <a:r>
+              <a:rPr lang="en-US" sz="2600" dirty="0">
+                <a:latin typeface="Courier New" panose="02070309020205020404" pitchFamily="49" charset="0"/>
+                <a:cs typeface="Courier New" panose="02070309020205020404" pitchFamily="49" charset="0"/>
+              </a:rPr>
+              <a:t> \</a:t>
+            </a:r>
+          </a:p>
+          <a:p>
+            <a:pPr marL="0" indent="0">
+              <a:buNone/>
+            </a:pPr>
+            <a:r>
+              <a:rPr lang="en-US" sz="2600" dirty="0">
+                <a:latin typeface="Courier New" panose="02070309020205020404" pitchFamily="49" charset="0"/>
+                <a:cs typeface="Courier New" panose="02070309020205020404" pitchFamily="49" charset="0"/>
+              </a:rPr>
+              <a:t>					--output </a:t>
+            </a:r>
+            <a:r>
+              <a:rPr lang="en-US" sz="2600" dirty="0" err="1">
+                <a:solidFill>
+                  <a:schemeClr val="accent4"/>
+                </a:solidFill>
+                <a:latin typeface="Courier New" panose="02070309020205020404" pitchFamily="49" charset="0"/>
+                <a:cs typeface="Courier New" panose="02070309020205020404" pitchFamily="49" charset="0"/>
+              </a:rPr>
+              <a:t>tsv</a:t>
+            </a:r>
+            <a:r>
+              <a:rPr lang="en-US" sz="2600" dirty="0">
+                <a:latin typeface="Courier New" panose="02070309020205020404" pitchFamily="49" charset="0"/>
+                <a:cs typeface="Courier New" panose="02070309020205020404" pitchFamily="49" charset="0"/>
+              </a:rPr>
+              <a:t>)</a:t>
+            </a:r>
+          </a:p>
+          <a:p>
+            <a:pPr marL="0" indent="0">
+              <a:buNone/>
+            </a:pPr>
+            <a:endParaRPr lang="en-US" sz="2600" b="1" dirty="0">
+              <a:latin typeface="Courier New" panose="02070309020205020404" pitchFamily="49" charset="0"/>
+              <a:cs typeface="Courier New" panose="02070309020205020404" pitchFamily="49" charset="0"/>
+            </a:endParaRPr>
+          </a:p>
+          <a:p>
+            <a:pPr marL="0" indent="0">
+              <a:buNone/>
+            </a:pPr>
+            <a:r>
+              <a:rPr lang="en-US" sz="2600" dirty="0" err="1">
+                <a:solidFill>
+                  <a:schemeClr val="accent1">
+                    <a:lumMod val="40000"/>
+                    <a:lumOff val="60000"/>
+                  </a:schemeClr>
+                </a:solidFill>
+                <a:latin typeface="Courier New" panose="02070309020205020404" pitchFamily="49" charset="0"/>
+                <a:cs typeface="Courier New" panose="02070309020205020404" pitchFamily="49" charset="0"/>
+              </a:rPr>
+              <a:t>az</a:t>
+            </a:r>
+            <a:r>
+              <a:rPr lang="en-US" sz="2600" dirty="0">
+                <a:solidFill>
+                  <a:schemeClr val="accent1">
+                    <a:lumMod val="40000"/>
+                    <a:lumOff val="60000"/>
+                  </a:schemeClr>
+                </a:solidFill>
+                <a:latin typeface="Courier New" panose="02070309020205020404" pitchFamily="49" charset="0"/>
+                <a:cs typeface="Courier New" panose="02070309020205020404" pitchFamily="49" charset="0"/>
+              </a:rPr>
+              <a:t> </a:t>
+            </a:r>
+            <a:r>
+              <a:rPr lang="en-US" sz="2600" dirty="0" err="1">
+                <a:solidFill>
+                  <a:schemeClr val="accent1">
+                    <a:lumMod val="40000"/>
+                    <a:lumOff val="60000"/>
+                  </a:schemeClr>
+                </a:solidFill>
+                <a:latin typeface="Courier New" panose="02070309020205020404" pitchFamily="49" charset="0"/>
+                <a:cs typeface="Courier New" panose="02070309020205020404" pitchFamily="49" charset="0"/>
+              </a:rPr>
               <a:t>keyvault</a:t>
             </a:r>
             <a:r>
@@ -19174,390 +19346,20 @@
             <a:pPr marL="0" indent="0">
               <a:buNone/>
             </a:pPr>
-            <a:r>
-              <a:rPr lang="en-US" dirty="0"/>
-              <a:t> </a:t>
-            </a:r>
+            <a:endParaRPr lang="en-US" dirty="0"/>
           </a:p>
         </p:txBody>
       </p:sp>
     </p:spTree>
     <p:extLst>
       <p:ext uri="{BB962C8B-B14F-4D97-AF65-F5344CB8AC3E}">
-        <p14:creationId xmlns:p14="http://schemas.microsoft.com/office/powerpoint/2010/main" val="1081566271"/>
+        <p14:creationId xmlns:p14="http://schemas.microsoft.com/office/powerpoint/2010/main" val="2009973419"/>
       </p:ext>
     </p:extLst>
   </p:cSld>
   <p:clrMapOvr>
     <a:masterClrMapping/>
   </p:clrMapOvr>
-  <p:timing>
-    <p:tnLst>
-      <p:par>
-        <p:cTn id="1" dur="indefinite" restart="never" nodeType="tmRoot">
-          <p:childTnLst>
-            <p:seq concurrent="1" nextAc="seek">
-              <p:cTn id="2" dur="indefinite" nodeType="mainSeq">
-                <p:childTnLst>
-                  <p:par>
-                    <p:cTn id="3" fill="hold">
-                      <p:stCondLst>
-                        <p:cond delay="indefinite"/>
-                      </p:stCondLst>
-                      <p:childTnLst>
-                        <p:par>
-                          <p:cTn id="4" fill="hold">
-                            <p:stCondLst>
-                              <p:cond delay="0"/>
-                            </p:stCondLst>
-                            <p:childTnLst>
-                              <p:par>
-                                <p:cTn id="5" presetID="10" presetClass="entr" presetSubtype="0" fill="hold" nodeType="clickEffect">
-                                  <p:stCondLst>
-                                    <p:cond delay="0"/>
-                                  </p:stCondLst>
-                                  <p:childTnLst>
-                                    <p:set>
-                                      <p:cBhvr>
-                                        <p:cTn id="6" dur="1" fill="hold">
-                                          <p:stCondLst>
-                                            <p:cond delay="0"/>
-                                          </p:stCondLst>
-                                        </p:cTn>
-                                        <p:tgtEl>
-                                          <p:spTgt spid="3">
-                                            <p:txEl>
-                                              <p:pRg st="0" end="0"/>
-                                            </p:txEl>
-                                          </p:spTgt>
-                                        </p:tgtEl>
-                                        <p:attrNameLst>
-                                          <p:attrName>style.visibility</p:attrName>
-                                        </p:attrNameLst>
-                                      </p:cBhvr>
-                                      <p:to>
-                                        <p:strVal val="visible"/>
-                                      </p:to>
-                                    </p:set>
-                                    <p:animEffect transition="in" filter="fade">
-                                      <p:cBhvr>
-                                        <p:cTn id="7" dur="500"/>
-                                        <p:tgtEl>
-                                          <p:spTgt spid="3">
-                                            <p:txEl>
-                                              <p:pRg st="0" end="0"/>
-                                            </p:txEl>
-                                          </p:spTgt>
-                                        </p:tgtEl>
-                                      </p:cBhvr>
-                                    </p:animEffect>
-                                  </p:childTnLst>
-                                </p:cTn>
-                              </p:par>
-                              <p:par>
-                                <p:cTn id="8" presetID="10" presetClass="entr" presetSubtype="0" fill="hold" nodeType="withEffect">
-                                  <p:stCondLst>
-                                    <p:cond delay="0"/>
-                                  </p:stCondLst>
-                                  <p:childTnLst>
-                                    <p:set>
-                                      <p:cBhvr>
-                                        <p:cTn id="9" dur="1" fill="hold">
-                                          <p:stCondLst>
-                                            <p:cond delay="0"/>
-                                          </p:stCondLst>
-                                        </p:cTn>
-                                        <p:tgtEl>
-                                          <p:spTgt spid="3">
-                                            <p:txEl>
-                                              <p:pRg st="1" end="1"/>
-                                            </p:txEl>
-                                          </p:spTgt>
-                                        </p:tgtEl>
-                                        <p:attrNameLst>
-                                          <p:attrName>style.visibility</p:attrName>
-                                        </p:attrNameLst>
-                                      </p:cBhvr>
-                                      <p:to>
-                                        <p:strVal val="visible"/>
-                                      </p:to>
-                                    </p:set>
-                                    <p:animEffect transition="in" filter="fade">
-                                      <p:cBhvr>
-                                        <p:cTn id="10" dur="500"/>
-                                        <p:tgtEl>
-                                          <p:spTgt spid="3">
-                                            <p:txEl>
-                                              <p:pRg st="1" end="1"/>
-                                            </p:txEl>
-                                          </p:spTgt>
-                                        </p:tgtEl>
-                                      </p:cBhvr>
-                                    </p:animEffect>
-                                  </p:childTnLst>
-                                </p:cTn>
-                              </p:par>
-                              <p:par>
-                                <p:cTn id="11" presetID="10" presetClass="entr" presetSubtype="0" fill="hold" nodeType="withEffect">
-                                  <p:stCondLst>
-                                    <p:cond delay="0"/>
-                                  </p:stCondLst>
-                                  <p:childTnLst>
-                                    <p:set>
-                                      <p:cBhvr>
-                                        <p:cTn id="12" dur="1" fill="hold">
-                                          <p:stCondLst>
-                                            <p:cond delay="0"/>
-                                          </p:stCondLst>
-                                        </p:cTn>
-                                        <p:tgtEl>
-                                          <p:spTgt spid="3">
-                                            <p:txEl>
-                                              <p:pRg st="2" end="2"/>
-                                            </p:txEl>
-                                          </p:spTgt>
-                                        </p:tgtEl>
-                                        <p:attrNameLst>
-                                          <p:attrName>style.visibility</p:attrName>
-                                        </p:attrNameLst>
-                                      </p:cBhvr>
-                                      <p:to>
-                                        <p:strVal val="visible"/>
-                                      </p:to>
-                                    </p:set>
-                                    <p:animEffect transition="in" filter="fade">
-                                      <p:cBhvr>
-                                        <p:cTn id="13" dur="500"/>
-                                        <p:tgtEl>
-                                          <p:spTgt spid="3">
-                                            <p:txEl>
-                                              <p:pRg st="2" end="2"/>
-                                            </p:txEl>
-                                          </p:spTgt>
-                                        </p:tgtEl>
-                                      </p:cBhvr>
-                                    </p:animEffect>
-                                  </p:childTnLst>
-                                </p:cTn>
-                              </p:par>
-                              <p:par>
-                                <p:cTn id="14" presetID="10" presetClass="entr" presetSubtype="0" fill="hold" nodeType="withEffect">
-                                  <p:stCondLst>
-                                    <p:cond delay="0"/>
-                                  </p:stCondLst>
-                                  <p:childTnLst>
-                                    <p:set>
-                                      <p:cBhvr>
-                                        <p:cTn id="15" dur="1" fill="hold">
-                                          <p:stCondLst>
-                                            <p:cond delay="0"/>
-                                          </p:stCondLst>
-                                        </p:cTn>
-                                        <p:tgtEl>
-                                          <p:spTgt spid="3">
-                                            <p:txEl>
-                                              <p:pRg st="3" end="3"/>
-                                            </p:txEl>
-                                          </p:spTgt>
-                                        </p:tgtEl>
-                                        <p:attrNameLst>
-                                          <p:attrName>style.visibility</p:attrName>
-                                        </p:attrNameLst>
-                                      </p:cBhvr>
-                                      <p:to>
-                                        <p:strVal val="visible"/>
-                                      </p:to>
-                                    </p:set>
-                                    <p:animEffect transition="in" filter="fade">
-                                      <p:cBhvr>
-                                        <p:cTn id="16" dur="500"/>
-                                        <p:tgtEl>
-                                          <p:spTgt spid="3">
-                                            <p:txEl>
-                                              <p:pRg st="3" end="3"/>
-                                            </p:txEl>
-                                          </p:spTgt>
-                                        </p:tgtEl>
-                                      </p:cBhvr>
-                                    </p:animEffect>
-                                  </p:childTnLst>
-                                </p:cTn>
-                              </p:par>
-                            </p:childTnLst>
-                          </p:cTn>
-                        </p:par>
-                      </p:childTnLst>
-                    </p:cTn>
-                  </p:par>
-                  <p:par>
-                    <p:cTn id="17" fill="hold">
-                      <p:stCondLst>
-                        <p:cond delay="indefinite"/>
-                      </p:stCondLst>
-                      <p:childTnLst>
-                        <p:par>
-                          <p:cTn id="18" fill="hold">
-                            <p:stCondLst>
-                              <p:cond delay="0"/>
-                            </p:stCondLst>
-                            <p:childTnLst>
-                              <p:par>
-                                <p:cTn id="19" presetID="10" presetClass="entr" presetSubtype="0" fill="hold" nodeType="clickEffect">
-                                  <p:stCondLst>
-                                    <p:cond delay="0"/>
-                                  </p:stCondLst>
-                                  <p:childTnLst>
-                                    <p:set>
-                                      <p:cBhvr>
-                                        <p:cTn id="20" dur="1" fill="hold">
-                                          <p:stCondLst>
-                                            <p:cond delay="0"/>
-                                          </p:stCondLst>
-                                        </p:cTn>
-                                        <p:tgtEl>
-                                          <p:spTgt spid="3">
-                                            <p:txEl>
-                                              <p:pRg st="5" end="5"/>
-                                            </p:txEl>
-                                          </p:spTgt>
-                                        </p:tgtEl>
-                                        <p:attrNameLst>
-                                          <p:attrName>style.visibility</p:attrName>
-                                        </p:attrNameLst>
-                                      </p:cBhvr>
-                                      <p:to>
-                                        <p:strVal val="visible"/>
-                                      </p:to>
-                                    </p:set>
-                                    <p:animEffect transition="in" filter="fade">
-                                      <p:cBhvr>
-                                        <p:cTn id="21" dur="500"/>
-                                        <p:tgtEl>
-                                          <p:spTgt spid="3">
-                                            <p:txEl>
-                                              <p:pRg st="5" end="5"/>
-                                            </p:txEl>
-                                          </p:spTgt>
-                                        </p:tgtEl>
-                                      </p:cBhvr>
-                                    </p:animEffect>
-                                  </p:childTnLst>
-                                </p:cTn>
-                              </p:par>
-                              <p:par>
-                                <p:cTn id="22" presetID="10" presetClass="entr" presetSubtype="0" fill="hold" nodeType="withEffect">
-                                  <p:stCondLst>
-                                    <p:cond delay="0"/>
-                                  </p:stCondLst>
-                                  <p:childTnLst>
-                                    <p:set>
-                                      <p:cBhvr>
-                                        <p:cTn id="23" dur="1" fill="hold">
-                                          <p:stCondLst>
-                                            <p:cond delay="0"/>
-                                          </p:stCondLst>
-                                        </p:cTn>
-                                        <p:tgtEl>
-                                          <p:spTgt spid="3">
-                                            <p:txEl>
-                                              <p:pRg st="6" end="6"/>
-                                            </p:txEl>
-                                          </p:spTgt>
-                                        </p:tgtEl>
-                                        <p:attrNameLst>
-                                          <p:attrName>style.visibility</p:attrName>
-                                        </p:attrNameLst>
-                                      </p:cBhvr>
-                                      <p:to>
-                                        <p:strVal val="visible"/>
-                                      </p:to>
-                                    </p:set>
-                                    <p:animEffect transition="in" filter="fade">
-                                      <p:cBhvr>
-                                        <p:cTn id="24" dur="500"/>
-                                        <p:tgtEl>
-                                          <p:spTgt spid="3">
-                                            <p:txEl>
-                                              <p:pRg st="6" end="6"/>
-                                            </p:txEl>
-                                          </p:spTgt>
-                                        </p:tgtEl>
-                                      </p:cBhvr>
-                                    </p:animEffect>
-                                  </p:childTnLst>
-                                </p:cTn>
-                              </p:par>
-                              <p:par>
-                                <p:cTn id="25" presetID="10" presetClass="entr" presetSubtype="0" fill="hold" nodeType="withEffect">
-                                  <p:stCondLst>
-                                    <p:cond delay="0"/>
-                                  </p:stCondLst>
-                                  <p:childTnLst>
-                                    <p:set>
-                                      <p:cBhvr>
-                                        <p:cTn id="26" dur="1" fill="hold">
-                                          <p:stCondLst>
-                                            <p:cond delay="0"/>
-                                          </p:stCondLst>
-                                        </p:cTn>
-                                        <p:tgtEl>
-                                          <p:spTgt spid="3">
-                                            <p:txEl>
-                                              <p:pRg st="7" end="7"/>
-                                            </p:txEl>
-                                          </p:spTgt>
-                                        </p:tgtEl>
-                                        <p:attrNameLst>
-                                          <p:attrName>style.visibility</p:attrName>
-                                        </p:attrNameLst>
-                                      </p:cBhvr>
-                                      <p:to>
-                                        <p:strVal val="visible"/>
-                                      </p:to>
-                                    </p:set>
-                                    <p:animEffect transition="in" filter="fade">
-                                      <p:cBhvr>
-                                        <p:cTn id="27" dur="500"/>
-                                        <p:tgtEl>
-                                          <p:spTgt spid="3">
-                                            <p:txEl>
-                                              <p:pRg st="7" end="7"/>
-                                            </p:txEl>
-                                          </p:spTgt>
-                                        </p:tgtEl>
-                                      </p:cBhvr>
-                                    </p:animEffect>
-                                  </p:childTnLst>
-                                </p:cTn>
-                              </p:par>
-                            </p:childTnLst>
-                          </p:cTn>
-                        </p:par>
-                      </p:childTnLst>
-                    </p:cTn>
-                  </p:par>
-                </p:childTnLst>
-              </p:cTn>
-              <p:prevCondLst>
-                <p:cond evt="onPrev" delay="0">
-                  <p:tgtEl>
-                    <p:sldTgt/>
-                  </p:tgtEl>
-                </p:cond>
-              </p:prevCondLst>
-              <p:nextCondLst>
-                <p:cond evt="onNext" delay="0">
-                  <p:tgtEl>
-                    <p:sldTgt/>
-                  </p:tgtEl>
-                </p:cond>
-              </p:nextCondLst>
-            </p:seq>
-          </p:childTnLst>
-        </p:cTn>
-      </p:par>
-    </p:tnLst>
-  </p:timing>
 </p:sld>
 </file>
 

</xml_diff>